<commit_message>
Created version 1 of click and collect function
Basic instructions and input for name and phone number.
</commit_message>
<xml_diff>
--- a/Danett Pepito - 000_91896 _ 91897 Documentation - 2150400 (Git).pptx
+++ b/Danett Pepito - 000_91896 _ 91897 Documentation - 2150400 (Git).pptx
@@ -5,7 +5,7 @@
     <p:sldMasterId id="2147483659" r:id="rId1"/>
   </p:sldMasterIdLst>
   <p:notesMasterIdLst>
-    <p:notesMasterId r:id="rId48"/>
+    <p:notesMasterId r:id="rId50"/>
   </p:notesMasterIdLst>
   <p:sldIdLst>
     <p:sldId id="256" r:id="rId2"/>
@@ -37,23 +37,25 @@
     <p:sldId id="304" r:id="rId28"/>
     <p:sldId id="274" r:id="rId29"/>
     <p:sldId id="275" r:id="rId30"/>
-    <p:sldId id="276" r:id="rId31"/>
-    <p:sldId id="277" r:id="rId32"/>
-    <p:sldId id="278" r:id="rId33"/>
-    <p:sldId id="279" r:id="rId34"/>
-    <p:sldId id="280" r:id="rId35"/>
-    <p:sldId id="281" r:id="rId36"/>
-    <p:sldId id="282" r:id="rId37"/>
-    <p:sldId id="288" r:id="rId38"/>
-    <p:sldId id="290" r:id="rId39"/>
-    <p:sldId id="292" r:id="rId40"/>
-    <p:sldId id="291" r:id="rId41"/>
-    <p:sldId id="285" r:id="rId42"/>
-    <p:sldId id="261" r:id="rId43"/>
-    <p:sldId id="284" r:id="rId44"/>
-    <p:sldId id="286" r:id="rId45"/>
-    <p:sldId id="287" r:id="rId46"/>
-    <p:sldId id="262" r:id="rId47"/>
+    <p:sldId id="305" r:id="rId31"/>
+    <p:sldId id="306" r:id="rId32"/>
+    <p:sldId id="276" r:id="rId33"/>
+    <p:sldId id="277" r:id="rId34"/>
+    <p:sldId id="278" r:id="rId35"/>
+    <p:sldId id="279" r:id="rId36"/>
+    <p:sldId id="280" r:id="rId37"/>
+    <p:sldId id="281" r:id="rId38"/>
+    <p:sldId id="282" r:id="rId39"/>
+    <p:sldId id="288" r:id="rId40"/>
+    <p:sldId id="290" r:id="rId41"/>
+    <p:sldId id="292" r:id="rId42"/>
+    <p:sldId id="291" r:id="rId43"/>
+    <p:sldId id="285" r:id="rId44"/>
+    <p:sldId id="261" r:id="rId45"/>
+    <p:sldId id="284" r:id="rId46"/>
+    <p:sldId id="286" r:id="rId47"/>
+    <p:sldId id="287" r:id="rId48"/>
+    <p:sldId id="262" r:id="rId49"/>
   </p:sldIdLst>
   <p:sldSz cx="9144000" cy="5143500" type="screen16x9"/>
   <p:notesSz cx="6858000" cy="9144000"/>
@@ -308,7 +310,7 @@
 <file path=ppt/revisionInfo.xml><?xml version="1.0" encoding="utf-8"?>
 <p1510:revInfo xmlns:a="http://schemas.openxmlformats.org/drawingml/2006/main" xmlns:r="http://schemas.openxmlformats.org/officeDocument/2006/relationships" xmlns:p1510="http://schemas.microsoft.com/office/powerpoint/2015/10/main">
   <p1510:revLst>
-    <p1510:client id="{B2185394-3AFD-42B2-9285-3B672C598A56}" v="5" dt="2022-03-18T01:49:11.413"/>
+    <p1510:client id="{B2185394-3AFD-42B2-9285-3B672C598A56}" v="8" dt="2022-03-18T02:04:04.129"/>
   </p1510:revLst>
 </p1510:revInfo>
 </file>
@@ -318,7 +320,7 @@
   <pc:docChgLst>
     <pc:chgData name="Danett Pepito" userId="ddef1e2176689e9a" providerId="LiveId" clId="{B2185394-3AFD-42B2-9285-3B672C598A56}"/>
     <pc:docChg chg="undo custSel addSld delSld modSld sldOrd">
-      <pc:chgData name="Danett Pepito" userId="ddef1e2176689e9a" providerId="LiveId" clId="{B2185394-3AFD-42B2-9285-3B672C598A56}" dt="2022-03-18T01:49:51.430" v="595" actId="1076"/>
+      <pc:chgData name="Danett Pepito" userId="ddef1e2176689e9a" providerId="LiveId" clId="{B2185394-3AFD-42B2-9285-3B672C598A56}" dt="2022-03-18T02:05:22.760" v="744" actId="478"/>
       <pc:docMkLst>
         <pc:docMk/>
       </pc:docMkLst>
@@ -366,6 +368,21 @@
             <pc:docMk/>
             <pc:sldMk cId="0" sldId="260"/>
             <ac:picMk id="6" creationId="{81680A84-6532-45CE-B533-D6BEC1FD16E4}"/>
+          </ac:picMkLst>
+        </pc:picChg>
+      </pc:sldChg>
+      <pc:sldChg chg="addSp delSp mod">
+        <pc:chgData name="Danett Pepito" userId="ddef1e2176689e9a" providerId="LiveId" clId="{B2185394-3AFD-42B2-9285-3B672C598A56}" dt="2022-03-18T02:01:35.202" v="659" actId="22"/>
+        <pc:sldMkLst>
+          <pc:docMk/>
+          <pc:sldMk cId="1320346451" sldId="263"/>
+        </pc:sldMkLst>
+        <pc:picChg chg="add del">
+          <ac:chgData name="Danett Pepito" userId="ddef1e2176689e9a" providerId="LiveId" clId="{B2185394-3AFD-42B2-9285-3B672C598A56}" dt="2022-03-18T02:01:35.202" v="659" actId="22"/>
+          <ac:picMkLst>
+            <pc:docMk/>
+            <pc:sldMk cId="1320346451" sldId="263"/>
+            <ac:picMk id="6" creationId="{F02B132D-EB29-4617-BFD9-04968E0AF7F0}"/>
           </ac:picMkLst>
         </pc:picChg>
       </pc:sldChg>
@@ -452,6 +469,92 @@
             <pc:docMk/>
             <pc:sldMk cId="2116980625" sldId="273"/>
             <ac:picMk id="6" creationId="{3D56C34E-A9A5-4128-8622-C604C82A807B}"/>
+          </ac:picMkLst>
+        </pc:picChg>
+      </pc:sldChg>
+      <pc:sldChg chg="addSp modSp mod">
+        <pc:chgData name="Danett Pepito" userId="ddef1e2176689e9a" providerId="LiveId" clId="{B2185394-3AFD-42B2-9285-3B672C598A56}" dt="2022-03-18T02:00:26.845" v="657" actId="1076"/>
+        <pc:sldMkLst>
+          <pc:docMk/>
+          <pc:sldMk cId="3443263372" sldId="274"/>
+        </pc:sldMkLst>
+        <pc:spChg chg="mod">
+          <ac:chgData name="Danett Pepito" userId="ddef1e2176689e9a" providerId="LiveId" clId="{B2185394-3AFD-42B2-9285-3B672C598A56}" dt="2022-03-18T01:59:38.685" v="654" actId="1076"/>
+          <ac:spMkLst>
+            <pc:docMk/>
+            <pc:sldMk cId="3443263372" sldId="274"/>
+            <ac:spMk id="73" creationId="{00000000-0000-0000-0000-000000000000}"/>
+          </ac:spMkLst>
+        </pc:spChg>
+        <pc:picChg chg="add mod ord">
+          <ac:chgData name="Danett Pepito" userId="ddef1e2176689e9a" providerId="LiveId" clId="{B2185394-3AFD-42B2-9285-3B672C598A56}" dt="2022-03-18T01:58:52.288" v="607" actId="167"/>
+          <ac:picMkLst>
+            <pc:docMk/>
+            <pc:sldMk cId="3443263372" sldId="274"/>
+            <ac:picMk id="3" creationId="{56BED5EB-EF3D-4AC9-8995-621CB5CA184A}"/>
+          </ac:picMkLst>
+        </pc:picChg>
+        <pc:picChg chg="add mod">
+          <ac:chgData name="Danett Pepito" userId="ddef1e2176689e9a" providerId="LiveId" clId="{B2185394-3AFD-42B2-9285-3B672C598A56}" dt="2022-03-18T02:00:26.845" v="657" actId="1076"/>
+          <ac:picMkLst>
+            <pc:docMk/>
+            <pc:sldMk cId="3443263372" sldId="274"/>
+            <ac:picMk id="4" creationId="{302C65D9-1B88-4505-A39D-C2987CA70AEA}"/>
+          </ac:picMkLst>
+        </pc:picChg>
+      </pc:sldChg>
+      <pc:sldChg chg="addSp delSp modSp mod">
+        <pc:chgData name="Danett Pepito" userId="ddef1e2176689e9a" providerId="LiveId" clId="{B2185394-3AFD-42B2-9285-3B672C598A56}" dt="2022-03-18T02:04:59.767" v="695" actId="1076"/>
+        <pc:sldMkLst>
+          <pc:docMk/>
+          <pc:sldMk cId="3297752779" sldId="275"/>
+        </pc:sldMkLst>
+        <pc:spChg chg="mod">
+          <ac:chgData name="Danett Pepito" userId="ddef1e2176689e9a" providerId="LiveId" clId="{B2185394-3AFD-42B2-9285-3B672C598A56}" dt="2022-03-18T02:02:11.608" v="678" actId="20577"/>
+          <ac:spMkLst>
+            <pc:docMk/>
+            <pc:sldMk cId="3297752779" sldId="275"/>
+            <ac:spMk id="78" creationId="{00000000-0000-0000-0000-000000000000}"/>
+          </ac:spMkLst>
+        </pc:spChg>
+        <pc:graphicFrameChg chg="mod modGraphic">
+          <ac:chgData name="Danett Pepito" userId="ddef1e2176689e9a" providerId="LiveId" clId="{B2185394-3AFD-42B2-9285-3B672C598A56}" dt="2022-03-18T02:04:12.952" v="688" actId="1076"/>
+          <ac:graphicFrameMkLst>
+            <pc:docMk/>
+            <pc:sldMk cId="3297752779" sldId="275"/>
+            <ac:graphicFrameMk id="79" creationId="{00000000-0000-0000-0000-000000000000}"/>
+          </ac:graphicFrameMkLst>
+        </pc:graphicFrameChg>
+        <pc:picChg chg="add mod">
+          <ac:chgData name="Danett Pepito" userId="ddef1e2176689e9a" providerId="LiveId" clId="{B2185394-3AFD-42B2-9285-3B672C598A56}" dt="2022-03-18T02:04:08.791" v="686" actId="1076"/>
+          <ac:picMkLst>
+            <pc:docMk/>
+            <pc:sldMk cId="3297752779" sldId="275"/>
+            <ac:picMk id="3" creationId="{96D42F30-FC74-471E-BF44-DB20B32C0463}"/>
+          </ac:picMkLst>
+        </pc:picChg>
+        <pc:picChg chg="add mod ord">
+          <ac:chgData name="Danett Pepito" userId="ddef1e2176689e9a" providerId="LiveId" clId="{B2185394-3AFD-42B2-9285-3B672C598A56}" dt="2022-03-18T02:01:43.577" v="661" actId="167"/>
+          <ac:picMkLst>
+            <pc:docMk/>
+            <pc:sldMk cId="3297752779" sldId="275"/>
+            <ac:picMk id="4" creationId="{446BBD1D-F3F0-49A6-9D34-8F3222CF8E18}"/>
+          </ac:picMkLst>
+        </pc:picChg>
+        <pc:picChg chg="add del mod">
+          <ac:chgData name="Danett Pepito" userId="ddef1e2176689e9a" providerId="LiveId" clId="{B2185394-3AFD-42B2-9285-3B672C598A56}" dt="2022-03-18T02:04:41.775" v="689" actId="478"/>
+          <ac:picMkLst>
+            <pc:docMk/>
+            <pc:sldMk cId="3297752779" sldId="275"/>
+            <ac:picMk id="6" creationId="{FE8434BD-FE57-4A27-A688-9F9AF8DCEEFE}"/>
+          </ac:picMkLst>
+        </pc:picChg>
+        <pc:picChg chg="add mod">
+          <ac:chgData name="Danett Pepito" userId="ddef1e2176689e9a" providerId="LiveId" clId="{B2185394-3AFD-42B2-9285-3B672C598A56}" dt="2022-03-18T02:04:59.767" v="695" actId="1076"/>
+          <ac:picMkLst>
+            <pc:docMk/>
+            <pc:sldMk cId="3297752779" sldId="275"/>
+            <ac:picMk id="8" creationId="{D2797270-CC33-45E8-8021-5F45347D4FF7}"/>
           </ac:picMkLst>
         </pc:picChg>
       </pc:sldChg>
@@ -641,8 +744,8 @@
           </ac:picMkLst>
         </pc:picChg>
       </pc:sldChg>
-      <pc:sldChg chg="delSp modSp add mod">
-        <pc:chgData name="Danett Pepito" userId="ddef1e2176689e9a" providerId="LiveId" clId="{B2185394-3AFD-42B2-9285-3B672C598A56}" dt="2022-03-18T01:37:44.913" v="471" actId="478"/>
+      <pc:sldChg chg="addSp delSp modSp add mod">
+        <pc:chgData name="Danett Pepito" userId="ddef1e2176689e9a" providerId="LiveId" clId="{B2185394-3AFD-42B2-9285-3B672C598A56}" dt="2022-03-18T01:57:59.846" v="605" actId="1076"/>
         <pc:sldMkLst>
           <pc:docMk/>
           <pc:sldMk cId="2176582634" sldId="299"/>
@@ -655,6 +758,14 @@
             <ac:spMk id="73" creationId="{00000000-0000-0000-0000-000000000000}"/>
           </ac:spMkLst>
         </pc:spChg>
+        <pc:picChg chg="add mod">
+          <ac:chgData name="Danett Pepito" userId="ddef1e2176689e9a" providerId="LiveId" clId="{B2185394-3AFD-42B2-9285-3B672C598A56}" dt="2022-03-18T01:57:59.846" v="605" actId="1076"/>
+          <ac:picMkLst>
+            <pc:docMk/>
+            <pc:sldMk cId="2176582634" sldId="299"/>
+            <ac:picMk id="3" creationId="{0651BAB5-FBE9-40DD-978B-3BF416E6BFEC}"/>
+          </ac:picMkLst>
+        </pc:picChg>
         <pc:picChg chg="del">
           <ac:chgData name="Danett Pepito" userId="ddef1e2176689e9a" providerId="LiveId" clId="{B2185394-3AFD-42B2-9285-3B672C598A56}" dt="2022-03-18T01:37:44.913" v="471" actId="478"/>
           <ac:picMkLst>
@@ -719,8 +830,8 @@
           </ac:picMkLst>
         </pc:picChg>
       </pc:sldChg>
-      <pc:sldChg chg="modSp add mod">
-        <pc:chgData name="Danett Pepito" userId="ddef1e2176689e9a" providerId="LiveId" clId="{B2185394-3AFD-42B2-9285-3B672C598A56}" dt="2022-03-18T01:40:44.646" v="488" actId="20577"/>
+      <pc:sldChg chg="addSp modSp add mod">
+        <pc:chgData name="Danett Pepito" userId="ddef1e2176689e9a" providerId="LiveId" clId="{B2185394-3AFD-42B2-9285-3B672C598A56}" dt="2022-03-18T01:56:52.365" v="598" actId="1076"/>
         <pc:sldMkLst>
           <pc:docMk/>
           <pc:sldMk cId="2527487919" sldId="301"/>
@@ -733,6 +844,14 @@
             <ac:spMk id="73" creationId="{00000000-0000-0000-0000-000000000000}"/>
           </ac:spMkLst>
         </pc:spChg>
+        <pc:picChg chg="add mod">
+          <ac:chgData name="Danett Pepito" userId="ddef1e2176689e9a" providerId="LiveId" clId="{B2185394-3AFD-42B2-9285-3B672C598A56}" dt="2022-03-18T01:56:52.365" v="598" actId="1076"/>
+          <ac:picMkLst>
+            <pc:docMk/>
+            <pc:sldMk cId="2527487919" sldId="301"/>
+            <ac:picMk id="3" creationId="{D8F9AC02-3F90-4A50-858D-DFF1DD782842}"/>
+          </ac:picMkLst>
+        </pc:picChg>
       </pc:sldChg>
       <pc:sldChg chg="addSp delSp modSp add mod replId">
         <pc:chgData name="Danett Pepito" userId="ddef1e2176689e9a" providerId="LiveId" clId="{B2185394-3AFD-42B2-9285-3B672C598A56}" dt="2022-03-18T01:46:56.083" v="567" actId="14100"/>
@@ -789,8 +908,8 @@
           </ac:picMkLst>
         </pc:picChg>
       </pc:sldChg>
-      <pc:sldChg chg="modSp add mod">
-        <pc:chgData name="Danett Pepito" userId="ddef1e2176689e9a" providerId="LiveId" clId="{B2185394-3AFD-42B2-9285-3B672C598A56}" dt="2022-03-18T01:47:04.318" v="570" actId="20577"/>
+      <pc:sldChg chg="addSp modSp add mod">
+        <pc:chgData name="Danett Pepito" userId="ddef1e2176689e9a" providerId="LiveId" clId="{B2185394-3AFD-42B2-9285-3B672C598A56}" dt="2022-03-18T01:57:35.269" v="602" actId="14100"/>
         <pc:sldMkLst>
           <pc:docMk/>
           <pc:sldMk cId="524099565" sldId="303"/>
@@ -803,6 +922,14 @@
             <ac:spMk id="73" creationId="{00000000-0000-0000-0000-000000000000}"/>
           </ac:spMkLst>
         </pc:spChg>
+        <pc:picChg chg="add mod">
+          <ac:chgData name="Danett Pepito" userId="ddef1e2176689e9a" providerId="LiveId" clId="{B2185394-3AFD-42B2-9285-3B672C598A56}" dt="2022-03-18T01:57:35.269" v="602" actId="14100"/>
+          <ac:picMkLst>
+            <pc:docMk/>
+            <pc:sldMk cId="524099565" sldId="303"/>
+            <ac:picMk id="3" creationId="{C3AB372D-E51D-4011-82E9-478AB76B0259}"/>
+          </ac:picMkLst>
+        </pc:picChg>
       </pc:sldChg>
       <pc:sldChg chg="addSp delSp modSp add mod replId">
         <pc:chgData name="Danett Pepito" userId="ddef1e2176689e9a" providerId="LiveId" clId="{B2185394-3AFD-42B2-9285-3B672C598A56}" dt="2022-03-18T01:49:51.430" v="595" actId="1076"/>
@@ -856,6 +983,60 @@
             <pc:docMk/>
             <pc:sldMk cId="87919818" sldId="304"/>
             <ac:picMk id="8" creationId="{C693F0DE-5C85-4EB7-880A-519CB6F5813F}"/>
+          </ac:picMkLst>
+        </pc:picChg>
+      </pc:sldChg>
+      <pc:sldChg chg="delSp modSp add mod">
+        <pc:chgData name="Danett Pepito" userId="ddef1e2176689e9a" providerId="LiveId" clId="{B2185394-3AFD-42B2-9285-3B672C598A56}" dt="2022-03-18T02:05:16.286" v="740" actId="478"/>
+        <pc:sldMkLst>
+          <pc:docMk/>
+          <pc:sldMk cId="2668271614" sldId="305"/>
+        </pc:sldMkLst>
+        <pc:spChg chg="mod">
+          <ac:chgData name="Danett Pepito" userId="ddef1e2176689e9a" providerId="LiveId" clId="{B2185394-3AFD-42B2-9285-3B672C598A56}" dt="2022-03-18T02:05:15.106" v="739" actId="20577"/>
+          <ac:spMkLst>
+            <pc:docMk/>
+            <pc:sldMk cId="2668271614" sldId="305"/>
+            <ac:spMk id="73" creationId="{00000000-0000-0000-0000-000000000000}"/>
+          </ac:spMkLst>
+        </pc:spChg>
+        <pc:picChg chg="del">
+          <ac:chgData name="Danett Pepito" userId="ddef1e2176689e9a" providerId="LiveId" clId="{B2185394-3AFD-42B2-9285-3B672C598A56}" dt="2022-03-18T02:05:16.286" v="740" actId="478"/>
+          <ac:picMkLst>
+            <pc:docMk/>
+            <pc:sldMk cId="2668271614" sldId="305"/>
+            <ac:picMk id="4" creationId="{302C65D9-1B88-4505-A39D-C2987CA70AEA}"/>
+          </ac:picMkLst>
+        </pc:picChg>
+      </pc:sldChg>
+      <pc:sldChg chg="delSp modSp add mod replId">
+        <pc:chgData name="Danett Pepito" userId="ddef1e2176689e9a" providerId="LiveId" clId="{B2185394-3AFD-42B2-9285-3B672C598A56}" dt="2022-03-18T02:05:22.760" v="744" actId="478"/>
+        <pc:sldMkLst>
+          <pc:docMk/>
+          <pc:sldMk cId="3510681486" sldId="306"/>
+        </pc:sldMkLst>
+        <pc:spChg chg="mod">
+          <ac:chgData name="Danett Pepito" userId="ddef1e2176689e9a" providerId="LiveId" clId="{B2185394-3AFD-42B2-9285-3B672C598A56}" dt="2022-03-18T02:05:19.168" v="742" actId="20577"/>
+          <ac:spMkLst>
+            <pc:docMk/>
+            <pc:sldMk cId="3510681486" sldId="306"/>
+            <ac:spMk id="78" creationId="{00000000-0000-0000-0000-000000000000}"/>
+          </ac:spMkLst>
+        </pc:spChg>
+        <pc:picChg chg="del">
+          <ac:chgData name="Danett Pepito" userId="ddef1e2176689e9a" providerId="LiveId" clId="{B2185394-3AFD-42B2-9285-3B672C598A56}" dt="2022-03-18T02:05:20.966" v="743" actId="478"/>
+          <ac:picMkLst>
+            <pc:docMk/>
+            <pc:sldMk cId="3510681486" sldId="306"/>
+            <ac:picMk id="3" creationId="{96D42F30-FC74-471E-BF44-DB20B32C0463}"/>
+          </ac:picMkLst>
+        </pc:picChg>
+        <pc:picChg chg="del">
+          <ac:chgData name="Danett Pepito" userId="ddef1e2176689e9a" providerId="LiveId" clId="{B2185394-3AFD-42B2-9285-3B672C598A56}" dt="2022-03-18T02:05:22.760" v="744" actId="478"/>
+          <ac:picMkLst>
+            <pc:docMk/>
+            <pc:sldMk cId="3510681486" sldId="306"/>
+            <ac:picMk id="8" creationId="{D2797270-CC33-45E8-8021-5F45347D4FF7}"/>
           </ac:picMkLst>
         </pc:picChg>
       </pc:sldChg>
@@ -2707,7 +2888,7 @@
     </p:spTree>
     <p:extLst>
       <p:ext uri="{BB962C8B-B14F-4D97-AF65-F5344CB8AC3E}">
-        <p14:creationId xmlns:p14="http://schemas.microsoft.com/office/powerpoint/2010/main" val="3253485423"/>
+        <p14:creationId xmlns:p14="http://schemas.microsoft.com/office/powerpoint/2010/main" val="2966950720"/>
       </p:ext>
     </p:extLst>
   </p:cSld>
@@ -2816,7 +2997,7 @@
     </p:spTree>
     <p:extLst>
       <p:ext uri="{BB962C8B-B14F-4D97-AF65-F5344CB8AC3E}">
-        <p14:creationId xmlns:p14="http://schemas.microsoft.com/office/powerpoint/2010/main" val="1209413496"/>
+        <p14:creationId xmlns:p14="http://schemas.microsoft.com/office/powerpoint/2010/main" val="1499548468"/>
       </p:ext>
     </p:extLst>
   </p:cSld>
@@ -2925,7 +3106,7 @@
     </p:spTree>
     <p:extLst>
       <p:ext uri="{BB962C8B-B14F-4D97-AF65-F5344CB8AC3E}">
-        <p14:creationId xmlns:p14="http://schemas.microsoft.com/office/powerpoint/2010/main" val="698637762"/>
+        <p14:creationId xmlns:p14="http://schemas.microsoft.com/office/powerpoint/2010/main" val="3253485423"/>
       </p:ext>
     </p:extLst>
   </p:cSld>
@@ -3034,7 +3215,7 @@
     </p:spTree>
     <p:extLst>
       <p:ext uri="{BB962C8B-B14F-4D97-AF65-F5344CB8AC3E}">
-        <p14:creationId xmlns:p14="http://schemas.microsoft.com/office/powerpoint/2010/main" val="3726156782"/>
+        <p14:creationId xmlns:p14="http://schemas.microsoft.com/office/powerpoint/2010/main" val="1209413496"/>
       </p:ext>
     </p:extLst>
   </p:cSld>
@@ -3143,7 +3324,7 @@
     </p:spTree>
     <p:extLst>
       <p:ext uri="{BB962C8B-B14F-4D97-AF65-F5344CB8AC3E}">
-        <p14:creationId xmlns:p14="http://schemas.microsoft.com/office/powerpoint/2010/main" val="784738588"/>
+        <p14:creationId xmlns:p14="http://schemas.microsoft.com/office/powerpoint/2010/main" val="698637762"/>
       </p:ext>
     </p:extLst>
   </p:cSld>
@@ -3252,7 +3433,7 @@
     </p:spTree>
     <p:extLst>
       <p:ext uri="{BB962C8B-B14F-4D97-AF65-F5344CB8AC3E}">
-        <p14:creationId xmlns:p14="http://schemas.microsoft.com/office/powerpoint/2010/main" val="3494323208"/>
+        <p14:creationId xmlns:p14="http://schemas.microsoft.com/office/powerpoint/2010/main" val="3726156782"/>
       </p:ext>
     </p:extLst>
   </p:cSld>
@@ -3361,7 +3542,7 @@
     </p:spTree>
     <p:extLst>
       <p:ext uri="{BB962C8B-B14F-4D97-AF65-F5344CB8AC3E}">
-        <p14:creationId xmlns:p14="http://schemas.microsoft.com/office/powerpoint/2010/main" val="3006313543"/>
+        <p14:creationId xmlns:p14="http://schemas.microsoft.com/office/powerpoint/2010/main" val="784738588"/>
       </p:ext>
     </p:extLst>
   </p:cSld>
@@ -3376,7 +3557,7 @@
   <p:cSld>
     <p:spTree>
       <p:nvGrpSpPr>
-        <p:cNvPr id="1" name="Shape 69"/>
+        <p:cNvPr id="1" name="Shape 74"/>
         <p:cNvGrpSpPr/>
         <p:nvPr/>
       </p:nvGrpSpPr>
@@ -3390,7 +3571,7 @@
       </p:grpSpPr>
       <p:sp>
         <p:nvSpPr>
-          <p:cNvPr id="70" name="Google Shape;70;gac10fef634_0_16:notes"/>
+          <p:cNvPr id="75" name="Google Shape;75;gac10fef634_0_20:notes"/>
           <p:cNvSpPr>
             <a:spLocks noGrp="1" noRot="1" noChangeAspect="1"/>
           </p:cNvSpPr>
@@ -3431,7 +3612,7 @@
       </p:sp>
       <p:sp>
         <p:nvSpPr>
-          <p:cNvPr id="71" name="Google Shape;71;gac10fef634_0_16:notes"/>
+          <p:cNvPr id="76" name="Google Shape;76;gac10fef634_0_20:notes"/>
           <p:cNvSpPr txBox="1">
             <a:spLocks noGrp="1"/>
           </p:cNvSpPr>
@@ -3470,7 +3651,7 @@
     </p:spTree>
     <p:extLst>
       <p:ext uri="{BB962C8B-B14F-4D97-AF65-F5344CB8AC3E}">
-        <p14:creationId xmlns:p14="http://schemas.microsoft.com/office/powerpoint/2010/main" val="2149026663"/>
+        <p14:creationId xmlns:p14="http://schemas.microsoft.com/office/powerpoint/2010/main" val="3494323208"/>
       </p:ext>
     </p:extLst>
   </p:cSld>
@@ -3579,7 +3760,7 @@
     </p:spTree>
     <p:extLst>
       <p:ext uri="{BB962C8B-B14F-4D97-AF65-F5344CB8AC3E}">
-        <p14:creationId xmlns:p14="http://schemas.microsoft.com/office/powerpoint/2010/main" val="3194274356"/>
+        <p14:creationId xmlns:p14="http://schemas.microsoft.com/office/powerpoint/2010/main" val="3006313543"/>
       </p:ext>
     </p:extLst>
   </p:cSld>
@@ -3688,7 +3869,7 @@
     </p:spTree>
     <p:extLst>
       <p:ext uri="{BB962C8B-B14F-4D97-AF65-F5344CB8AC3E}">
-        <p14:creationId xmlns:p14="http://schemas.microsoft.com/office/powerpoint/2010/main" val="3014292639"/>
+        <p14:creationId xmlns:p14="http://schemas.microsoft.com/office/powerpoint/2010/main" val="2149026663"/>
       </p:ext>
     </p:extLst>
   </p:cSld>
@@ -3828,7 +4009,7 @@
   <p:cSld>
     <p:spTree>
       <p:nvGrpSpPr>
-        <p:cNvPr id="1" name="Shape 80"/>
+        <p:cNvPr id="1" name="Shape 69"/>
         <p:cNvGrpSpPr/>
         <p:nvPr/>
       </p:nvGrpSpPr>
@@ -3842,7 +4023,7 @@
       </p:grpSpPr>
       <p:sp>
         <p:nvSpPr>
-          <p:cNvPr id="81" name="Google Shape;81;gac10fef634_0_25:notes"/>
+          <p:cNvPr id="70" name="Google Shape;70;gac10fef634_0_16:notes"/>
           <p:cNvSpPr>
             <a:spLocks noGrp="1" noRot="1" noChangeAspect="1"/>
           </p:cNvSpPr>
@@ -3883,7 +4064,7 @@
       </p:sp>
       <p:sp>
         <p:nvSpPr>
-          <p:cNvPr id="82" name="Google Shape;82;gac10fef634_0_25:notes"/>
+          <p:cNvPr id="71" name="Google Shape;71;gac10fef634_0_16:notes"/>
           <p:cNvSpPr txBox="1">
             <a:spLocks noGrp="1"/>
           </p:cNvSpPr>
@@ -3913,27 +4094,6 @@
               <a:spcAft>
                 <a:spcPts val="0"/>
               </a:spcAft>
-              <a:buClr>
-                <a:schemeClr val="dk1"/>
-              </a:buClr>
-              <a:buSzPts val="1100"/>
-              <a:buFont typeface="Arial"/>
-              <a:buNone/>
-            </a:pPr>
-            <a:r>
-              <a:rPr lang="en"/>
-              <a:t>Your version control evidence should go here.  This could be in the form of annotated screenshots which show you you managed this process or you could make a brief screencast explaining how you implemented version control.</a:t>
-            </a:r>
-            <a:endParaRPr/>
-          </a:p>
-          <a:p>
-            <a:pPr marL="0" lvl="0" indent="0" algn="l" rtl="0">
-              <a:spcBef>
-                <a:spcPts val="0"/>
-              </a:spcBef>
-              <a:spcAft>
-                <a:spcPts val="0"/>
-              </a:spcAft>
               <a:buNone/>
             </a:pPr>
             <a:endParaRPr/>
@@ -3941,6 +4101,11 @@
         </p:txBody>
       </p:sp>
     </p:spTree>
+    <p:extLst>
+      <p:ext uri="{BB962C8B-B14F-4D97-AF65-F5344CB8AC3E}">
+        <p14:creationId xmlns:p14="http://schemas.microsoft.com/office/powerpoint/2010/main" val="3194274356"/>
+      </p:ext>
+    </p:extLst>
   </p:cSld>
   <p:clrMapOvr>
     <a:masterClrMapping/>
@@ -3953,7 +4118,7 @@
   <p:cSld>
     <p:spTree>
       <p:nvGrpSpPr>
-        <p:cNvPr id="1" name="Shape 80"/>
+        <p:cNvPr id="1" name="Shape 69"/>
         <p:cNvGrpSpPr/>
         <p:nvPr/>
       </p:nvGrpSpPr>
@@ -3967,7 +4132,7 @@
       </p:grpSpPr>
       <p:sp>
         <p:nvSpPr>
-          <p:cNvPr id="81" name="Google Shape;81;gac10fef634_0_25:notes"/>
+          <p:cNvPr id="70" name="Google Shape;70;gac10fef634_0_16:notes"/>
           <p:cNvSpPr>
             <a:spLocks noGrp="1" noRot="1" noChangeAspect="1"/>
           </p:cNvSpPr>
@@ -4008,7 +4173,7 @@
       </p:sp>
       <p:sp>
         <p:nvSpPr>
-          <p:cNvPr id="82" name="Google Shape;82;gac10fef634_0_25:notes"/>
+          <p:cNvPr id="71" name="Google Shape;71;gac10fef634_0_16:notes"/>
           <p:cNvSpPr txBox="1">
             <a:spLocks noGrp="1"/>
           </p:cNvSpPr>
@@ -4030,27 +4195,6 @@
             <a:noAutofit/>
           </a:bodyPr>
           <a:lstStyle/>
-          <a:p>
-            <a:pPr marL="0" lvl="0" indent="0" algn="l" rtl="0">
-              <a:spcBef>
-                <a:spcPts val="0"/>
-              </a:spcBef>
-              <a:spcAft>
-                <a:spcPts val="0"/>
-              </a:spcAft>
-              <a:buClr>
-                <a:schemeClr val="dk1"/>
-              </a:buClr>
-              <a:buSzPts val="1100"/>
-              <a:buFont typeface="Arial"/>
-              <a:buNone/>
-            </a:pPr>
-            <a:r>
-              <a:rPr lang="en"/>
-              <a:t>Your version control evidence should go here.  This could be in the form of annotated screenshots which show you you managed this process or you could make a brief screencast explaining how you implemented version control.</a:t>
-            </a:r>
-            <a:endParaRPr/>
-          </a:p>
           <a:p>
             <a:pPr marL="0" lvl="0" indent="0" algn="l" rtl="0">
               <a:spcBef>
@@ -4068,7 +4212,7 @@
     </p:spTree>
     <p:extLst>
       <p:ext uri="{BB962C8B-B14F-4D97-AF65-F5344CB8AC3E}">
-        <p14:creationId xmlns:p14="http://schemas.microsoft.com/office/powerpoint/2010/main" val="511959585"/>
+        <p14:creationId xmlns:p14="http://schemas.microsoft.com/office/powerpoint/2010/main" val="3014292639"/>
       </p:ext>
     </p:extLst>
   </p:cSld>
@@ -4196,6 +4340,261 @@
         </p:txBody>
       </p:sp>
     </p:spTree>
+  </p:cSld>
+  <p:clrMapOvr>
+    <a:masterClrMapping/>
+  </p:clrMapOvr>
+</p:notes>
+</file>
+
+<file path=ppt/notesSlides/notesSlide33.xml><?xml version="1.0" encoding="utf-8"?>
+<p:notes xmlns:a="http://schemas.openxmlformats.org/drawingml/2006/main" xmlns:r="http://schemas.openxmlformats.org/officeDocument/2006/relationships" xmlns:p="http://schemas.openxmlformats.org/presentationml/2006/main" showMasterSp="0" showMasterPhAnim="0">
+  <p:cSld>
+    <p:spTree>
+      <p:nvGrpSpPr>
+        <p:cNvPr id="1" name="Shape 80"/>
+        <p:cNvGrpSpPr/>
+        <p:nvPr/>
+      </p:nvGrpSpPr>
+      <p:grpSpPr>
+        <a:xfrm>
+          <a:off x="0" y="0"/>
+          <a:ext cx="0" cy="0"/>
+          <a:chOff x="0" y="0"/>
+          <a:chExt cx="0" cy="0"/>
+        </a:xfrm>
+      </p:grpSpPr>
+      <p:sp>
+        <p:nvSpPr>
+          <p:cNvPr id="81" name="Google Shape;81;gac10fef634_0_25:notes"/>
+          <p:cNvSpPr>
+            <a:spLocks noGrp="1" noRot="1" noChangeAspect="1"/>
+          </p:cNvSpPr>
+          <p:nvPr>
+            <p:ph type="sldImg" idx="2"/>
+          </p:nvPr>
+        </p:nvSpPr>
+        <p:spPr>
+          <a:xfrm>
+            <a:off x="381000" y="685800"/>
+            <a:ext cx="6096000" cy="3429000"/>
+          </a:xfrm>
+          <a:custGeom>
+            <a:avLst/>
+            <a:gdLst/>
+            <a:ahLst/>
+            <a:cxnLst/>
+            <a:rect l="l" t="t" r="r" b="b"/>
+            <a:pathLst>
+              <a:path w="120000" h="120000" extrusionOk="0">
+                <a:moveTo>
+                  <a:pt x="0" y="0"/>
+                </a:moveTo>
+                <a:lnTo>
+                  <a:pt x="120000" y="0"/>
+                </a:lnTo>
+                <a:lnTo>
+                  <a:pt x="120000" y="120000"/>
+                </a:lnTo>
+                <a:lnTo>
+                  <a:pt x="0" y="120000"/>
+                </a:lnTo>
+                <a:close/>
+              </a:path>
+            </a:pathLst>
+          </a:custGeom>
+        </p:spPr>
+      </p:sp>
+      <p:sp>
+        <p:nvSpPr>
+          <p:cNvPr id="82" name="Google Shape;82;gac10fef634_0_25:notes"/>
+          <p:cNvSpPr txBox="1">
+            <a:spLocks noGrp="1"/>
+          </p:cNvSpPr>
+          <p:nvPr>
+            <p:ph type="body" idx="1"/>
+          </p:nvPr>
+        </p:nvSpPr>
+        <p:spPr>
+          <a:xfrm>
+            <a:off x="685800" y="4343400"/>
+            <a:ext cx="5486400" cy="4114800"/>
+          </a:xfrm>
+          <a:prstGeom prst="rect">
+            <a:avLst/>
+          </a:prstGeom>
+        </p:spPr>
+        <p:txBody>
+          <a:bodyPr spcFirstLastPara="1" wrap="square" lIns="91425" tIns="91425" rIns="91425" bIns="91425" anchor="t" anchorCtr="0">
+            <a:noAutofit/>
+          </a:bodyPr>
+          <a:lstStyle/>
+          <a:p>
+            <a:pPr marL="0" lvl="0" indent="0" algn="l" rtl="0">
+              <a:spcBef>
+                <a:spcPts val="0"/>
+              </a:spcBef>
+              <a:spcAft>
+                <a:spcPts val="0"/>
+              </a:spcAft>
+              <a:buClr>
+                <a:schemeClr val="dk1"/>
+              </a:buClr>
+              <a:buSzPts val="1100"/>
+              <a:buFont typeface="Arial"/>
+              <a:buNone/>
+            </a:pPr>
+            <a:r>
+              <a:rPr lang="en"/>
+              <a:t>Your version control evidence should go here.  This could be in the form of annotated screenshots which show you you managed this process or you could make a brief screencast explaining how you implemented version control.</a:t>
+            </a:r>
+            <a:endParaRPr/>
+          </a:p>
+          <a:p>
+            <a:pPr marL="0" lvl="0" indent="0" algn="l" rtl="0">
+              <a:spcBef>
+                <a:spcPts val="0"/>
+              </a:spcBef>
+              <a:spcAft>
+                <a:spcPts val="0"/>
+              </a:spcAft>
+              <a:buNone/>
+            </a:pPr>
+            <a:endParaRPr/>
+          </a:p>
+        </p:txBody>
+      </p:sp>
+    </p:spTree>
+    <p:extLst>
+      <p:ext uri="{BB962C8B-B14F-4D97-AF65-F5344CB8AC3E}">
+        <p14:creationId xmlns:p14="http://schemas.microsoft.com/office/powerpoint/2010/main" val="511959585"/>
+      </p:ext>
+    </p:extLst>
+  </p:cSld>
+  <p:clrMapOvr>
+    <a:masterClrMapping/>
+  </p:clrMapOvr>
+</p:notes>
+</file>
+
+<file path=ppt/notesSlides/notesSlide34.xml><?xml version="1.0" encoding="utf-8"?>
+<p:notes xmlns:a="http://schemas.openxmlformats.org/drawingml/2006/main" xmlns:r="http://schemas.openxmlformats.org/officeDocument/2006/relationships" xmlns:p="http://schemas.openxmlformats.org/presentationml/2006/main" showMasterSp="0" showMasterPhAnim="0">
+  <p:cSld>
+    <p:spTree>
+      <p:nvGrpSpPr>
+        <p:cNvPr id="1" name="Shape 80"/>
+        <p:cNvGrpSpPr/>
+        <p:nvPr/>
+      </p:nvGrpSpPr>
+      <p:grpSpPr>
+        <a:xfrm>
+          <a:off x="0" y="0"/>
+          <a:ext cx="0" cy="0"/>
+          <a:chOff x="0" y="0"/>
+          <a:chExt cx="0" cy="0"/>
+        </a:xfrm>
+      </p:grpSpPr>
+      <p:sp>
+        <p:nvSpPr>
+          <p:cNvPr id="81" name="Google Shape;81;gac10fef634_0_25:notes"/>
+          <p:cNvSpPr>
+            <a:spLocks noGrp="1" noRot="1" noChangeAspect="1"/>
+          </p:cNvSpPr>
+          <p:nvPr>
+            <p:ph type="sldImg" idx="2"/>
+          </p:nvPr>
+        </p:nvSpPr>
+        <p:spPr>
+          <a:xfrm>
+            <a:off x="381000" y="685800"/>
+            <a:ext cx="6096000" cy="3429000"/>
+          </a:xfrm>
+          <a:custGeom>
+            <a:avLst/>
+            <a:gdLst/>
+            <a:ahLst/>
+            <a:cxnLst/>
+            <a:rect l="l" t="t" r="r" b="b"/>
+            <a:pathLst>
+              <a:path w="120000" h="120000" extrusionOk="0">
+                <a:moveTo>
+                  <a:pt x="0" y="0"/>
+                </a:moveTo>
+                <a:lnTo>
+                  <a:pt x="120000" y="0"/>
+                </a:lnTo>
+                <a:lnTo>
+                  <a:pt x="120000" y="120000"/>
+                </a:lnTo>
+                <a:lnTo>
+                  <a:pt x="0" y="120000"/>
+                </a:lnTo>
+                <a:close/>
+              </a:path>
+            </a:pathLst>
+          </a:custGeom>
+        </p:spPr>
+      </p:sp>
+      <p:sp>
+        <p:nvSpPr>
+          <p:cNvPr id="82" name="Google Shape;82;gac10fef634_0_25:notes"/>
+          <p:cNvSpPr txBox="1">
+            <a:spLocks noGrp="1"/>
+          </p:cNvSpPr>
+          <p:nvPr>
+            <p:ph type="body" idx="1"/>
+          </p:nvPr>
+        </p:nvSpPr>
+        <p:spPr>
+          <a:xfrm>
+            <a:off x="685800" y="4343400"/>
+            <a:ext cx="5486400" cy="4114800"/>
+          </a:xfrm>
+          <a:prstGeom prst="rect">
+            <a:avLst/>
+          </a:prstGeom>
+        </p:spPr>
+        <p:txBody>
+          <a:bodyPr spcFirstLastPara="1" wrap="square" lIns="91425" tIns="91425" rIns="91425" bIns="91425" anchor="t" anchorCtr="0">
+            <a:noAutofit/>
+          </a:bodyPr>
+          <a:lstStyle/>
+          <a:p>
+            <a:pPr marL="0" lvl="0" indent="0" algn="l" rtl="0">
+              <a:spcBef>
+                <a:spcPts val="0"/>
+              </a:spcBef>
+              <a:spcAft>
+                <a:spcPts val="0"/>
+              </a:spcAft>
+              <a:buClr>
+                <a:schemeClr val="dk1"/>
+              </a:buClr>
+              <a:buSzPts val="1100"/>
+              <a:buFont typeface="Arial"/>
+              <a:buNone/>
+            </a:pPr>
+            <a:r>
+              <a:rPr lang="en"/>
+              <a:t>Your version control evidence should go here.  This could be in the form of annotated screenshots which show you you managed this process or you could make a brief screencast explaining how you implemented version control.</a:t>
+            </a:r>
+            <a:endParaRPr/>
+          </a:p>
+          <a:p>
+            <a:pPr marL="0" lvl="0" indent="0" algn="l" rtl="0">
+              <a:spcBef>
+                <a:spcPts val="0"/>
+              </a:spcBef>
+              <a:spcAft>
+                <a:spcPts val="0"/>
+              </a:spcAft>
+              <a:buNone/>
+            </a:pPr>
+            <a:endParaRPr/>
+          </a:p>
+        </p:txBody>
+      </p:sp>
+    </p:spTree>
     <p:extLst>
       <p:ext uri="{BB962C8B-B14F-4D97-AF65-F5344CB8AC3E}">
         <p14:creationId xmlns:p14="http://schemas.microsoft.com/office/powerpoint/2010/main" val="3815843750"/>
@@ -4208,7 +4607,7 @@
 </p:notes>
 </file>
 
-<file path=ppt/notesSlides/notesSlide33.xml><?xml version="1.0" encoding="utf-8"?>
+<file path=ppt/notesSlides/notesSlide35.xml><?xml version="1.0" encoding="utf-8"?>
 <p:notes xmlns:a="http://schemas.openxmlformats.org/drawingml/2006/main" xmlns:r="http://schemas.openxmlformats.org/officeDocument/2006/relationships" xmlns:p="http://schemas.openxmlformats.org/presentationml/2006/main" showMasterSp="0" showMasterPhAnim="0">
   <p:cSld>
     <p:spTree>
@@ -12606,6 +13005,36 @@
           </a:p>
         </p:txBody>
       </p:sp>
+      <p:pic>
+        <p:nvPicPr>
+          <p:cNvPr id="3" name="Picture 2">
+            <a:extLst>
+              <a:ext uri="{FF2B5EF4-FFF2-40B4-BE49-F238E27FC236}">
+                <a16:creationId xmlns:a16="http://schemas.microsoft.com/office/drawing/2014/main" id="{0651BAB5-FBE9-40DD-978B-3BF416E6BFEC}"/>
+              </a:ext>
+            </a:extLst>
+          </p:cNvPr>
+          <p:cNvPicPr>
+            <a:picLocks noChangeAspect="1"/>
+          </p:cNvPicPr>
+          <p:nvPr/>
+        </p:nvPicPr>
+        <p:blipFill>
+          <a:blip r:embed="rId4"/>
+          <a:stretch>
+            <a:fillRect/>
+          </a:stretch>
+        </p:blipFill>
+        <p:spPr>
+          <a:xfrm>
+            <a:off x="155850" y="1540905"/>
+            <a:ext cx="8832300" cy="2184502"/>
+          </a:xfrm>
+          <a:prstGeom prst="rect">
+            <a:avLst/>
+          </a:prstGeom>
+        </p:spPr>
+      </p:pic>
     </p:spTree>
     <p:extLst>
       <p:ext uri="{BB962C8B-B14F-4D97-AF65-F5344CB8AC3E}">
@@ -13093,6 +13522,36 @@
           </a:p>
         </p:txBody>
       </p:sp>
+      <p:pic>
+        <p:nvPicPr>
+          <p:cNvPr id="3" name="Picture 2">
+            <a:extLst>
+              <a:ext uri="{FF2B5EF4-FFF2-40B4-BE49-F238E27FC236}">
+                <a16:creationId xmlns:a16="http://schemas.microsoft.com/office/drawing/2014/main" id="{D8F9AC02-3F90-4A50-858D-DFF1DD782842}"/>
+              </a:ext>
+            </a:extLst>
+          </p:cNvPr>
+          <p:cNvPicPr>
+            <a:picLocks noChangeAspect="1"/>
+          </p:cNvPicPr>
+          <p:nvPr/>
+        </p:nvPicPr>
+        <p:blipFill>
+          <a:blip r:embed="rId4"/>
+          <a:stretch>
+            <a:fillRect/>
+          </a:stretch>
+        </p:blipFill>
+        <p:spPr>
+          <a:xfrm>
+            <a:off x="262890" y="1518273"/>
+            <a:ext cx="8618220" cy="2099015"/>
+          </a:xfrm>
+          <a:prstGeom prst="rect">
+            <a:avLst/>
+          </a:prstGeom>
+        </p:spPr>
+      </p:pic>
     </p:spTree>
     <p:extLst>
       <p:ext uri="{BB962C8B-B14F-4D97-AF65-F5344CB8AC3E}">
@@ -13594,6 +14053,36 @@
           </a:p>
         </p:txBody>
       </p:sp>
+      <p:pic>
+        <p:nvPicPr>
+          <p:cNvPr id="3" name="Picture 2">
+            <a:extLst>
+              <a:ext uri="{FF2B5EF4-FFF2-40B4-BE49-F238E27FC236}">
+                <a16:creationId xmlns:a16="http://schemas.microsoft.com/office/drawing/2014/main" id="{C3AB372D-E51D-4011-82E9-478AB76B0259}"/>
+              </a:ext>
+            </a:extLst>
+          </p:cNvPr>
+          <p:cNvPicPr>
+            <a:picLocks noChangeAspect="1"/>
+          </p:cNvPicPr>
+          <p:nvPr/>
+        </p:nvPicPr>
+        <p:blipFill>
+          <a:blip r:embed="rId4"/>
+          <a:stretch>
+            <a:fillRect/>
+          </a:stretch>
+        </p:blipFill>
+        <p:spPr>
+          <a:xfrm>
+            <a:off x="205739" y="1297351"/>
+            <a:ext cx="8520599" cy="3020249"/>
+          </a:xfrm>
+          <a:prstGeom prst="rect">
+            <a:avLst/>
+          </a:prstGeom>
+        </p:spPr>
+      </p:pic>
     </p:spTree>
     <p:extLst>
       <p:ext uri="{BB962C8B-B14F-4D97-AF65-F5344CB8AC3E}">
@@ -14019,6 +14508,36 @@
           <a:chExt cx="0" cy="0"/>
         </a:xfrm>
       </p:grpSpPr>
+      <p:pic>
+        <p:nvPicPr>
+          <p:cNvPr id="3" name="Picture 2">
+            <a:extLst>
+              <a:ext uri="{FF2B5EF4-FFF2-40B4-BE49-F238E27FC236}">
+                <a16:creationId xmlns:a16="http://schemas.microsoft.com/office/drawing/2014/main" id="{56BED5EB-EF3D-4AC9-8995-621CB5CA184A}"/>
+              </a:ext>
+            </a:extLst>
+          </p:cNvPr>
+          <p:cNvPicPr>
+            <a:picLocks noChangeAspect="1"/>
+          </p:cNvPicPr>
+          <p:nvPr/>
+        </p:nvPicPr>
+        <p:blipFill>
+          <a:blip r:embed="rId3"/>
+          <a:stretch>
+            <a:fillRect/>
+          </a:stretch>
+        </p:blipFill>
+        <p:spPr>
+          <a:xfrm>
+            <a:off x="0" y="6680"/>
+            <a:ext cx="9144000" cy="5130140"/>
+          </a:xfrm>
+          <a:prstGeom prst="rect">
+            <a:avLst/>
+          </a:prstGeom>
+        </p:spPr>
+      </p:pic>
       <p:sp>
         <p:nvSpPr>
           <p:cNvPr id="73" name="Google Shape;73;p16"/>
@@ -14031,7 +14550,7 @@
         </p:nvSpPr>
         <p:spPr>
           <a:xfrm>
-            <a:off x="311700" y="445025"/>
+            <a:off x="205020" y="231665"/>
             <a:ext cx="8520600" cy="572700"/>
           </a:xfrm>
           <a:prstGeom prst="rect">
@@ -14044,7 +14563,7 @@
           </a:bodyPr>
           <a:lstStyle/>
           <a:p>
-            <a:pPr marL="0" lvl="0" indent="0" algn="l" rtl="0">
+            <a:pPr marL="0" lvl="0" indent="0" rtl="0">
               <a:spcBef>
                 <a:spcPts val="0"/>
               </a:spcBef>
@@ -14054,13 +14573,47 @@
               <a:buNone/>
             </a:pPr>
             <a:r>
-              <a:rPr lang="en" dirty="0"/>
-              <a:t>Component 3 (Trello screenshot)</a:t>
+              <a:rPr lang="en" b="1" dirty="0">
+                <a:latin typeface="Avenir Next LT Pro" panose="020B0504020202020204" pitchFamily="34" charset="0"/>
+              </a:rPr>
+              <a:t>Component 3 Click &amp; Collect info Version 1 (Trello screenshot)</a:t>
             </a:r>
-            <a:endParaRPr dirty="0"/>
+            <a:endParaRPr b="1" dirty="0">
+              <a:latin typeface="Avenir Next LT Pro" panose="020B0504020202020204" pitchFamily="34" charset="0"/>
+            </a:endParaRPr>
           </a:p>
         </p:txBody>
       </p:sp>
+      <p:pic>
+        <p:nvPicPr>
+          <p:cNvPr id="4" name="Picture 3">
+            <a:extLst>
+              <a:ext uri="{FF2B5EF4-FFF2-40B4-BE49-F238E27FC236}">
+                <a16:creationId xmlns:a16="http://schemas.microsoft.com/office/drawing/2014/main" id="{302C65D9-1B88-4505-A39D-C2987CA70AEA}"/>
+              </a:ext>
+            </a:extLst>
+          </p:cNvPr>
+          <p:cNvPicPr>
+            <a:picLocks noChangeAspect="1"/>
+          </p:cNvPicPr>
+          <p:nvPr/>
+        </p:nvPicPr>
+        <p:blipFill>
+          <a:blip r:embed="rId4"/>
+          <a:stretch>
+            <a:fillRect/>
+          </a:stretch>
+        </p:blipFill>
+        <p:spPr>
+          <a:xfrm>
+            <a:off x="441960" y="1418632"/>
+            <a:ext cx="8389620" cy="2935993"/>
+          </a:xfrm>
+          <a:prstGeom prst="rect">
+            <a:avLst/>
+          </a:prstGeom>
+        </p:spPr>
+      </p:pic>
     </p:spTree>
     <p:extLst>
       <p:ext uri="{BB962C8B-B14F-4D97-AF65-F5344CB8AC3E}">
@@ -14091,6 +14644,36 @@
           <a:chExt cx="0" cy="0"/>
         </a:xfrm>
       </p:grpSpPr>
+      <p:pic>
+        <p:nvPicPr>
+          <p:cNvPr id="4" name="Picture 3">
+            <a:extLst>
+              <a:ext uri="{FF2B5EF4-FFF2-40B4-BE49-F238E27FC236}">
+                <a16:creationId xmlns:a16="http://schemas.microsoft.com/office/drawing/2014/main" id="{446BBD1D-F3F0-49A6-9D34-8F3222CF8E18}"/>
+              </a:ext>
+            </a:extLst>
+          </p:cNvPr>
+          <p:cNvPicPr>
+            <a:picLocks noChangeAspect="1"/>
+          </p:cNvPicPr>
+          <p:nvPr/>
+        </p:nvPicPr>
+        <p:blipFill>
+          <a:blip r:embed="rId3"/>
+          <a:stretch>
+            <a:fillRect/>
+          </a:stretch>
+        </p:blipFill>
+        <p:spPr>
+          <a:xfrm>
+            <a:off x="0" y="5710"/>
+            <a:ext cx="9144000" cy="5132080"/>
+          </a:xfrm>
+          <a:prstGeom prst="rect">
+            <a:avLst/>
+          </a:prstGeom>
+        </p:spPr>
+      </p:pic>
       <p:sp>
         <p:nvSpPr>
           <p:cNvPr id="78" name="Google Shape;78;p17"/>
@@ -14126,10 +14709,14 @@
               <a:buNone/>
             </a:pPr>
             <a:r>
-              <a:rPr lang="en" dirty="0"/>
-              <a:t>Component 3  - Test Plan (?and screenshot)</a:t>
+              <a:rPr lang="en" b="1" dirty="0">
+                <a:latin typeface="Avenir Next LT Pro" panose="020B0504020202020204" pitchFamily="34" charset="0"/>
+              </a:rPr>
+              <a:t>Component 3 Version 1 - Test Plan</a:t>
             </a:r>
-            <a:endParaRPr dirty="0"/>
+            <a:endParaRPr b="1" dirty="0">
+              <a:latin typeface="Avenir Next LT Pro" panose="020B0504020202020204" pitchFamily="34" charset="0"/>
+            </a:endParaRPr>
           </a:p>
         </p:txBody>
       </p:sp>
@@ -14137,11 +14724,17 @@
         <p:nvGraphicFramePr>
           <p:cNvPr id="79" name="Google Shape;79;p17"/>
           <p:cNvGraphicFramePr/>
-          <p:nvPr/>
+          <p:nvPr>
+            <p:extLst>
+              <p:ext uri="{D42A27DB-BD31-4B8C-83A1-F6EECF244321}">
+                <p14:modId xmlns:p14="http://schemas.microsoft.com/office/powerpoint/2010/main" val="3928406445"/>
+              </p:ext>
+            </p:extLst>
+          </p:nvPr>
         </p:nvGraphicFramePr>
         <p:xfrm>
-          <a:off x="382475" y="1267725"/>
-          <a:ext cx="8520600" cy="914340"/>
+          <a:off x="311700" y="3459513"/>
+          <a:ext cx="8520600" cy="1462980"/>
         </p:xfrm>
         <a:graphic>
           <a:graphicData uri="http://schemas.openxmlformats.org/drawingml/2006/table">
@@ -14182,10 +14775,14 @@
                         <a:buNone/>
                       </a:pPr>
                       <a:r>
-                        <a:rPr lang="en" sz="1800" b="1"/>
+                        <a:rPr lang="en" sz="1800" b="1" dirty="0">
+                          <a:latin typeface="Avenir Next LT Pro" panose="020B0504020202020204" pitchFamily="34" charset="0"/>
+                        </a:rPr>
                         <a:t>Test Case</a:t>
                       </a:r>
-                      <a:endParaRPr sz="1800" b="1"/>
+                      <a:endParaRPr sz="1800" b="1" dirty="0">
+                        <a:latin typeface="Avenir Next LT Pro" panose="020B0504020202020204" pitchFamily="34" charset="0"/>
+                      </a:endParaRPr>
                     </a:p>
                   </a:txBody>
                   <a:tcPr marL="91425" marR="91425" marT="91425" marB="91425">
@@ -14209,10 +14806,14 @@
                         <a:buNone/>
                       </a:pPr>
                       <a:r>
-                        <a:rPr lang="en" sz="1800" b="1"/>
+                        <a:rPr lang="en" sz="1800" b="1" dirty="0">
+                          <a:latin typeface="Avenir Next LT Pro" panose="020B0504020202020204" pitchFamily="34" charset="0"/>
+                        </a:rPr>
                         <a:t>Expected Values</a:t>
                       </a:r>
-                      <a:endParaRPr sz="1800" b="1"/>
+                      <a:endParaRPr sz="1800" b="1" dirty="0">
+                        <a:latin typeface="Avenir Next LT Pro" panose="020B0504020202020204" pitchFamily="34" charset="0"/>
+                      </a:endParaRPr>
                     </a:p>
                   </a:txBody>
                   <a:tcPr marL="91425" marR="91425" marT="91425" marB="91425">
@@ -14242,7 +14843,49 @@
                         </a:spcAft>
                         <a:buNone/>
                       </a:pPr>
-                      <a:endParaRPr sz="1800"/>
+                      <a:r>
+                        <a:rPr lang="en-NZ" sz="1800" dirty="0">
+                          <a:latin typeface="Avenir Next LT Pro" panose="020B0504020202020204" pitchFamily="34" charset="0"/>
+                        </a:rPr>
+                        <a:t>Input name</a:t>
+                      </a:r>
+                    </a:p>
+                    <a:p>
+                      <a:pPr marL="0" lvl="0" indent="0" algn="l" rtl="0">
+                        <a:spcBef>
+                          <a:spcPts val="0"/>
+                        </a:spcBef>
+                        <a:spcAft>
+                          <a:spcPts val="0"/>
+                        </a:spcAft>
+                        <a:buNone/>
+                      </a:pPr>
+                      <a:r>
+                        <a:rPr lang="en-NZ" sz="1800" dirty="0">
+                          <a:latin typeface="Avenir Next LT Pro" panose="020B0504020202020204" pitchFamily="34" charset="0"/>
+                        </a:rPr>
+                        <a:t>Input phone number</a:t>
+                      </a:r>
+                    </a:p>
+                    <a:p>
+                      <a:pPr marL="0" lvl="0" indent="0" algn="l" rtl="0">
+                        <a:spcBef>
+                          <a:spcPts val="0"/>
+                        </a:spcBef>
+                        <a:spcAft>
+                          <a:spcPts val="0"/>
+                        </a:spcAft>
+                        <a:buNone/>
+                      </a:pPr>
+                      <a:r>
+                        <a:rPr lang="en-NZ" sz="1800" dirty="0">
+                          <a:latin typeface="Avenir Next LT Pro" panose="020B0504020202020204" pitchFamily="34" charset="0"/>
+                        </a:rPr>
+                        <a:t>Left input blank</a:t>
+                      </a:r>
+                      <a:endParaRPr sz="1800" dirty="0">
+                        <a:latin typeface="Avenir Next LT Pro" panose="020B0504020202020204" pitchFamily="34" charset="0"/>
+                      </a:endParaRPr>
                     </a:p>
                   </a:txBody>
                   <a:tcPr marL="91425" marR="91425" marT="91425" marB="91425"/>
@@ -14261,7 +14904,49 @@
                         </a:spcAft>
                         <a:buNone/>
                       </a:pPr>
-                      <a:endParaRPr sz="1800"/>
+                      <a:r>
+                        <a:rPr lang="en-NZ" sz="1800" dirty="0">
+                          <a:latin typeface="Avenir Next LT Pro" panose="020B0504020202020204" pitchFamily="34" charset="0"/>
+                        </a:rPr>
+                        <a:t>Printed name correctly</a:t>
+                      </a:r>
+                    </a:p>
+                    <a:p>
+                      <a:pPr marL="0" lvl="0" indent="0" algn="l" rtl="0">
+                        <a:spcBef>
+                          <a:spcPts val="0"/>
+                        </a:spcBef>
+                        <a:spcAft>
+                          <a:spcPts val="0"/>
+                        </a:spcAft>
+                        <a:buNone/>
+                      </a:pPr>
+                      <a:r>
+                        <a:rPr lang="en-NZ" sz="1800" dirty="0">
+                          <a:latin typeface="Avenir Next LT Pro" panose="020B0504020202020204" pitchFamily="34" charset="0"/>
+                        </a:rPr>
+                        <a:t>Printed phone number correctly </a:t>
+                      </a:r>
+                    </a:p>
+                    <a:p>
+                      <a:pPr marL="0" lvl="0" indent="0" algn="l" rtl="0">
+                        <a:spcBef>
+                          <a:spcPts val="0"/>
+                        </a:spcBef>
+                        <a:spcAft>
+                          <a:spcPts val="0"/>
+                        </a:spcAft>
+                        <a:buNone/>
+                      </a:pPr>
+                      <a:r>
+                        <a:rPr lang="en-NZ" sz="1800" dirty="0">
+                          <a:latin typeface="Avenir Next LT Pro" panose="020B0504020202020204" pitchFamily="34" charset="0"/>
+                        </a:rPr>
+                        <a:t>Accept blank and printed blank input</a:t>
+                      </a:r>
+                      <a:endParaRPr sz="1800" dirty="0">
+                        <a:latin typeface="Avenir Next LT Pro" panose="020B0504020202020204" pitchFamily="34" charset="0"/>
+                      </a:endParaRPr>
                     </a:p>
                   </a:txBody>
                   <a:tcPr marL="91425" marR="91425" marT="91425" marB="91425"/>
@@ -14276,6 +14961,66 @@
           </a:graphicData>
         </a:graphic>
       </p:graphicFrame>
+      <p:pic>
+        <p:nvPicPr>
+          <p:cNvPr id="3" name="Picture 2">
+            <a:extLst>
+              <a:ext uri="{FF2B5EF4-FFF2-40B4-BE49-F238E27FC236}">
+                <a16:creationId xmlns:a16="http://schemas.microsoft.com/office/drawing/2014/main" id="{96D42F30-FC74-471E-BF44-DB20B32C0463}"/>
+              </a:ext>
+            </a:extLst>
+          </p:cNvPr>
+          <p:cNvPicPr>
+            <a:picLocks noChangeAspect="1"/>
+          </p:cNvPicPr>
+          <p:nvPr/>
+        </p:nvPicPr>
+        <p:blipFill>
+          <a:blip r:embed="rId4"/>
+          <a:stretch>
+            <a:fillRect/>
+          </a:stretch>
+        </p:blipFill>
+        <p:spPr>
+          <a:xfrm>
+            <a:off x="311700" y="1081740"/>
+            <a:ext cx="4563112" cy="2162477"/>
+          </a:xfrm>
+          <a:prstGeom prst="rect">
+            <a:avLst/>
+          </a:prstGeom>
+        </p:spPr>
+      </p:pic>
+      <p:pic>
+        <p:nvPicPr>
+          <p:cNvPr id="8" name="Picture 7">
+            <a:extLst>
+              <a:ext uri="{FF2B5EF4-FFF2-40B4-BE49-F238E27FC236}">
+                <a16:creationId xmlns:a16="http://schemas.microsoft.com/office/drawing/2014/main" id="{D2797270-CC33-45E8-8021-5F45347D4FF7}"/>
+              </a:ext>
+            </a:extLst>
+          </p:cNvPr>
+          <p:cNvPicPr>
+            <a:picLocks noChangeAspect="1"/>
+          </p:cNvPicPr>
+          <p:nvPr/>
+        </p:nvPicPr>
+        <p:blipFill>
+          <a:blip r:embed="rId5"/>
+          <a:stretch>
+            <a:fillRect/>
+          </a:stretch>
+        </p:blipFill>
+        <p:spPr>
+          <a:xfrm>
+            <a:off x="5491312" y="1081739"/>
+            <a:ext cx="3230030" cy="2162477"/>
+          </a:xfrm>
+          <a:prstGeom prst="rect">
+            <a:avLst/>
+          </a:prstGeom>
+        </p:spPr>
+      </p:pic>
     </p:spTree>
     <p:extLst>
       <p:ext uri="{BB962C8B-B14F-4D97-AF65-F5344CB8AC3E}">
@@ -14515,6 +15260,461 @@
           <a:chExt cx="0" cy="0"/>
         </a:xfrm>
       </p:grpSpPr>
+      <p:pic>
+        <p:nvPicPr>
+          <p:cNvPr id="3" name="Picture 2">
+            <a:extLst>
+              <a:ext uri="{FF2B5EF4-FFF2-40B4-BE49-F238E27FC236}">
+                <a16:creationId xmlns:a16="http://schemas.microsoft.com/office/drawing/2014/main" id="{56BED5EB-EF3D-4AC9-8995-621CB5CA184A}"/>
+              </a:ext>
+            </a:extLst>
+          </p:cNvPr>
+          <p:cNvPicPr>
+            <a:picLocks noChangeAspect="1"/>
+          </p:cNvPicPr>
+          <p:nvPr/>
+        </p:nvPicPr>
+        <p:blipFill>
+          <a:blip r:embed="rId3"/>
+          <a:stretch>
+            <a:fillRect/>
+          </a:stretch>
+        </p:blipFill>
+        <p:spPr>
+          <a:xfrm>
+            <a:off x="0" y="6680"/>
+            <a:ext cx="9144000" cy="5130140"/>
+          </a:xfrm>
+          <a:prstGeom prst="rect">
+            <a:avLst/>
+          </a:prstGeom>
+        </p:spPr>
+      </p:pic>
+      <p:sp>
+        <p:nvSpPr>
+          <p:cNvPr id="73" name="Google Shape;73;p16"/>
+          <p:cNvSpPr txBox="1">
+            <a:spLocks noGrp="1"/>
+          </p:cNvSpPr>
+          <p:nvPr>
+            <p:ph type="title"/>
+          </p:nvPr>
+        </p:nvSpPr>
+        <p:spPr>
+          <a:xfrm>
+            <a:off x="205020" y="231665"/>
+            <a:ext cx="8520600" cy="572700"/>
+          </a:xfrm>
+          <a:prstGeom prst="rect">
+            <a:avLst/>
+          </a:prstGeom>
+        </p:spPr>
+        <p:txBody>
+          <a:bodyPr spcFirstLastPara="1" wrap="square" lIns="91425" tIns="91425" rIns="91425" bIns="91425" anchor="t" anchorCtr="0">
+            <a:noAutofit/>
+          </a:bodyPr>
+          <a:lstStyle/>
+          <a:p>
+            <a:pPr marL="0" lvl="0" indent="0" rtl="0">
+              <a:spcBef>
+                <a:spcPts val="0"/>
+              </a:spcBef>
+              <a:spcAft>
+                <a:spcPts val="0"/>
+              </a:spcAft>
+              <a:buNone/>
+            </a:pPr>
+            <a:r>
+              <a:rPr lang="en" b="1" dirty="0">
+                <a:latin typeface="Avenir Next LT Pro" panose="020B0504020202020204" pitchFamily="34" charset="0"/>
+              </a:rPr>
+              <a:t>Component 3 Version 2 (Trello screenshot)</a:t>
+            </a:r>
+            <a:endParaRPr b="1" dirty="0">
+              <a:latin typeface="Avenir Next LT Pro" panose="020B0504020202020204" pitchFamily="34" charset="0"/>
+            </a:endParaRPr>
+          </a:p>
+        </p:txBody>
+      </p:sp>
+    </p:spTree>
+    <p:extLst>
+      <p:ext uri="{BB962C8B-B14F-4D97-AF65-F5344CB8AC3E}">
+        <p14:creationId xmlns:p14="http://schemas.microsoft.com/office/powerpoint/2010/main" val="2668271614"/>
+      </p:ext>
+    </p:extLst>
+  </p:cSld>
+  <p:clrMapOvr>
+    <a:masterClrMapping/>
+  </p:clrMapOvr>
+</p:sld>
+</file>
+
+<file path=ppt/slides/slide31.xml><?xml version="1.0" encoding="utf-8"?>
+<p:sld xmlns:a="http://schemas.openxmlformats.org/drawingml/2006/main" xmlns:r="http://schemas.openxmlformats.org/officeDocument/2006/relationships" xmlns:p="http://schemas.openxmlformats.org/presentationml/2006/main">
+  <p:cSld>
+    <p:spTree>
+      <p:nvGrpSpPr>
+        <p:cNvPr id="1" name="Shape 77"/>
+        <p:cNvGrpSpPr/>
+        <p:nvPr/>
+      </p:nvGrpSpPr>
+      <p:grpSpPr>
+        <a:xfrm>
+          <a:off x="0" y="0"/>
+          <a:ext cx="0" cy="0"/>
+          <a:chOff x="0" y="0"/>
+          <a:chExt cx="0" cy="0"/>
+        </a:xfrm>
+      </p:grpSpPr>
+      <p:pic>
+        <p:nvPicPr>
+          <p:cNvPr id="4" name="Picture 3">
+            <a:extLst>
+              <a:ext uri="{FF2B5EF4-FFF2-40B4-BE49-F238E27FC236}">
+                <a16:creationId xmlns:a16="http://schemas.microsoft.com/office/drawing/2014/main" id="{446BBD1D-F3F0-49A6-9D34-8F3222CF8E18}"/>
+              </a:ext>
+            </a:extLst>
+          </p:cNvPr>
+          <p:cNvPicPr>
+            <a:picLocks noChangeAspect="1"/>
+          </p:cNvPicPr>
+          <p:nvPr/>
+        </p:nvPicPr>
+        <p:blipFill>
+          <a:blip r:embed="rId3"/>
+          <a:stretch>
+            <a:fillRect/>
+          </a:stretch>
+        </p:blipFill>
+        <p:spPr>
+          <a:xfrm>
+            <a:off x="0" y="5710"/>
+            <a:ext cx="9144000" cy="5132080"/>
+          </a:xfrm>
+          <a:prstGeom prst="rect">
+            <a:avLst/>
+          </a:prstGeom>
+        </p:spPr>
+      </p:pic>
+      <p:sp>
+        <p:nvSpPr>
+          <p:cNvPr id="78" name="Google Shape;78;p17"/>
+          <p:cNvSpPr txBox="1">
+            <a:spLocks noGrp="1"/>
+          </p:cNvSpPr>
+          <p:nvPr>
+            <p:ph type="title"/>
+          </p:nvPr>
+        </p:nvSpPr>
+        <p:spPr>
+          <a:xfrm>
+            <a:off x="311700" y="445025"/>
+            <a:ext cx="8520600" cy="572700"/>
+          </a:xfrm>
+          <a:prstGeom prst="rect">
+            <a:avLst/>
+          </a:prstGeom>
+        </p:spPr>
+        <p:txBody>
+          <a:bodyPr spcFirstLastPara="1" wrap="square" lIns="91425" tIns="91425" rIns="91425" bIns="91425" anchor="t" anchorCtr="0">
+            <a:noAutofit/>
+          </a:bodyPr>
+          <a:lstStyle/>
+          <a:p>
+            <a:pPr marL="0" lvl="0" indent="0" algn="l" rtl="0">
+              <a:spcBef>
+                <a:spcPts val="0"/>
+              </a:spcBef>
+              <a:spcAft>
+                <a:spcPts val="0"/>
+              </a:spcAft>
+              <a:buNone/>
+            </a:pPr>
+            <a:r>
+              <a:rPr lang="en" b="1" dirty="0">
+                <a:latin typeface="Avenir Next LT Pro" panose="020B0504020202020204" pitchFamily="34" charset="0"/>
+              </a:rPr>
+              <a:t>Component 3 Version 2 - Test Plan</a:t>
+            </a:r>
+            <a:endParaRPr b="1" dirty="0">
+              <a:latin typeface="Avenir Next LT Pro" panose="020B0504020202020204" pitchFamily="34" charset="0"/>
+            </a:endParaRPr>
+          </a:p>
+        </p:txBody>
+      </p:sp>
+      <p:graphicFrame>
+        <p:nvGraphicFramePr>
+          <p:cNvPr id="79" name="Google Shape;79;p17"/>
+          <p:cNvGraphicFramePr/>
+          <p:nvPr/>
+        </p:nvGraphicFramePr>
+        <p:xfrm>
+          <a:off x="311700" y="3459513"/>
+          <a:ext cx="8520600" cy="1462980"/>
+        </p:xfrm>
+        <a:graphic>
+          <a:graphicData uri="http://schemas.openxmlformats.org/drawingml/2006/table">
+            <a:tbl>
+              <a:tblPr>
+                <a:noFill/>
+                <a:tableStyleId>{E1099E06-0E6B-448D-9D27-60429F06E6F4}</a:tableStyleId>
+              </a:tblPr>
+              <a:tblGrid>
+                <a:gridCol w="4260300">
+                  <a:extLst>
+                    <a:ext uri="{9D8B030D-6E8A-4147-A177-3AD203B41FA5}">
+                      <a16:colId xmlns:a16="http://schemas.microsoft.com/office/drawing/2014/main" val="20000"/>
+                    </a:ext>
+                  </a:extLst>
+                </a:gridCol>
+                <a:gridCol w="4260300">
+                  <a:extLst>
+                    <a:ext uri="{9D8B030D-6E8A-4147-A177-3AD203B41FA5}">
+                      <a16:colId xmlns:a16="http://schemas.microsoft.com/office/drawing/2014/main" val="20001"/>
+                    </a:ext>
+                  </a:extLst>
+                </a:gridCol>
+              </a:tblGrid>
+              <a:tr h="381000">
+                <a:tc>
+                  <a:txBody>
+                    <a:bodyPr/>
+                    <a:lstStyle/>
+                    <a:p>
+                      <a:pPr marL="0" lvl="0" indent="0" algn="l" rtl="0">
+                        <a:spcBef>
+                          <a:spcPts val="0"/>
+                        </a:spcBef>
+                        <a:spcAft>
+                          <a:spcPts val="0"/>
+                        </a:spcAft>
+                        <a:buNone/>
+                      </a:pPr>
+                      <a:r>
+                        <a:rPr lang="en" sz="1800" b="1" dirty="0">
+                          <a:latin typeface="Avenir Next LT Pro" panose="020B0504020202020204" pitchFamily="34" charset="0"/>
+                        </a:rPr>
+                        <a:t>Test Case</a:t>
+                      </a:r>
+                      <a:endParaRPr sz="1800" b="1" dirty="0">
+                        <a:latin typeface="Avenir Next LT Pro" panose="020B0504020202020204" pitchFamily="34" charset="0"/>
+                      </a:endParaRPr>
+                    </a:p>
+                  </a:txBody>
+                  <a:tcPr marL="91425" marR="91425" marT="91425" marB="91425">
+                    <a:solidFill>
+                      <a:srgbClr val="CCCCCC"/>
+                    </a:solidFill>
+                  </a:tcPr>
+                </a:tc>
+                <a:tc>
+                  <a:txBody>
+                    <a:bodyPr/>
+                    <a:lstStyle/>
+                    <a:p>
+                      <a:pPr marL="0" lvl="0" indent="0" algn="l" rtl="0">
+                        <a:spcBef>
+                          <a:spcPts val="0"/>
+                        </a:spcBef>
+                        <a:spcAft>
+                          <a:spcPts val="0"/>
+                        </a:spcAft>
+                        <a:buNone/>
+                      </a:pPr>
+                      <a:r>
+                        <a:rPr lang="en" sz="1800" b="1" dirty="0">
+                          <a:latin typeface="Avenir Next LT Pro" panose="020B0504020202020204" pitchFamily="34" charset="0"/>
+                        </a:rPr>
+                        <a:t>Expected Values</a:t>
+                      </a:r>
+                      <a:endParaRPr sz="1800" b="1" dirty="0">
+                        <a:latin typeface="Avenir Next LT Pro" panose="020B0504020202020204" pitchFamily="34" charset="0"/>
+                      </a:endParaRPr>
+                    </a:p>
+                  </a:txBody>
+                  <a:tcPr marL="91425" marR="91425" marT="91425" marB="91425">
+                    <a:solidFill>
+                      <a:srgbClr val="CCCCCC"/>
+                    </a:solidFill>
+                  </a:tcPr>
+                </a:tc>
+                <a:extLst>
+                  <a:ext uri="{0D108BD9-81ED-4DB2-BD59-A6C34878D82A}">
+                    <a16:rowId xmlns:a16="http://schemas.microsoft.com/office/drawing/2014/main" val="10000"/>
+                  </a:ext>
+                </a:extLst>
+              </a:tr>
+              <a:tr h="396200">
+                <a:tc>
+                  <a:txBody>
+                    <a:bodyPr/>
+                    <a:lstStyle/>
+                    <a:p>
+                      <a:pPr marL="0" lvl="0" indent="0" algn="l" rtl="0">
+                        <a:spcBef>
+                          <a:spcPts val="0"/>
+                        </a:spcBef>
+                        <a:spcAft>
+                          <a:spcPts val="0"/>
+                        </a:spcAft>
+                        <a:buNone/>
+                      </a:pPr>
+                      <a:r>
+                        <a:rPr lang="en-NZ" sz="1800" dirty="0">
+                          <a:latin typeface="Avenir Next LT Pro" panose="020B0504020202020204" pitchFamily="34" charset="0"/>
+                        </a:rPr>
+                        <a:t>Input name</a:t>
+                      </a:r>
+                    </a:p>
+                    <a:p>
+                      <a:pPr marL="0" lvl="0" indent="0" algn="l" rtl="0">
+                        <a:spcBef>
+                          <a:spcPts val="0"/>
+                        </a:spcBef>
+                        <a:spcAft>
+                          <a:spcPts val="0"/>
+                        </a:spcAft>
+                        <a:buNone/>
+                      </a:pPr>
+                      <a:r>
+                        <a:rPr lang="en-NZ" sz="1800" dirty="0">
+                          <a:latin typeface="Avenir Next LT Pro" panose="020B0504020202020204" pitchFamily="34" charset="0"/>
+                        </a:rPr>
+                        <a:t>Input phone number</a:t>
+                      </a:r>
+                    </a:p>
+                    <a:p>
+                      <a:pPr marL="0" lvl="0" indent="0" algn="l" rtl="0">
+                        <a:spcBef>
+                          <a:spcPts val="0"/>
+                        </a:spcBef>
+                        <a:spcAft>
+                          <a:spcPts val="0"/>
+                        </a:spcAft>
+                        <a:buNone/>
+                      </a:pPr>
+                      <a:r>
+                        <a:rPr lang="en-NZ" sz="1800" dirty="0">
+                          <a:latin typeface="Avenir Next LT Pro" panose="020B0504020202020204" pitchFamily="34" charset="0"/>
+                        </a:rPr>
+                        <a:t>Left input blank</a:t>
+                      </a:r>
+                      <a:endParaRPr sz="1800" dirty="0">
+                        <a:latin typeface="Avenir Next LT Pro" panose="020B0504020202020204" pitchFamily="34" charset="0"/>
+                      </a:endParaRPr>
+                    </a:p>
+                  </a:txBody>
+                  <a:tcPr marL="91425" marR="91425" marT="91425" marB="91425"/>
+                </a:tc>
+                <a:tc>
+                  <a:txBody>
+                    <a:bodyPr/>
+                    <a:lstStyle/>
+                    <a:p>
+                      <a:pPr marL="0" lvl="0" indent="0" algn="l" rtl="0">
+                        <a:spcBef>
+                          <a:spcPts val="0"/>
+                        </a:spcBef>
+                        <a:spcAft>
+                          <a:spcPts val="0"/>
+                        </a:spcAft>
+                        <a:buNone/>
+                      </a:pPr>
+                      <a:r>
+                        <a:rPr lang="en-NZ" sz="1800" dirty="0">
+                          <a:latin typeface="Avenir Next LT Pro" panose="020B0504020202020204" pitchFamily="34" charset="0"/>
+                        </a:rPr>
+                        <a:t>Printed name correctly</a:t>
+                      </a:r>
+                    </a:p>
+                    <a:p>
+                      <a:pPr marL="0" lvl="0" indent="0" algn="l" rtl="0">
+                        <a:spcBef>
+                          <a:spcPts val="0"/>
+                        </a:spcBef>
+                        <a:spcAft>
+                          <a:spcPts val="0"/>
+                        </a:spcAft>
+                        <a:buNone/>
+                      </a:pPr>
+                      <a:r>
+                        <a:rPr lang="en-NZ" sz="1800" dirty="0">
+                          <a:latin typeface="Avenir Next LT Pro" panose="020B0504020202020204" pitchFamily="34" charset="0"/>
+                        </a:rPr>
+                        <a:t>Printed phone number correctly </a:t>
+                      </a:r>
+                    </a:p>
+                    <a:p>
+                      <a:pPr marL="0" lvl="0" indent="0" algn="l" rtl="0">
+                        <a:spcBef>
+                          <a:spcPts val="0"/>
+                        </a:spcBef>
+                        <a:spcAft>
+                          <a:spcPts val="0"/>
+                        </a:spcAft>
+                        <a:buNone/>
+                      </a:pPr>
+                      <a:r>
+                        <a:rPr lang="en-NZ" sz="1800" dirty="0">
+                          <a:latin typeface="Avenir Next LT Pro" panose="020B0504020202020204" pitchFamily="34" charset="0"/>
+                        </a:rPr>
+                        <a:t>Accept blank and printed blank input</a:t>
+                      </a:r>
+                      <a:endParaRPr sz="1800" dirty="0">
+                        <a:latin typeface="Avenir Next LT Pro" panose="020B0504020202020204" pitchFamily="34" charset="0"/>
+                      </a:endParaRPr>
+                    </a:p>
+                  </a:txBody>
+                  <a:tcPr marL="91425" marR="91425" marT="91425" marB="91425"/>
+                </a:tc>
+                <a:extLst>
+                  <a:ext uri="{0D108BD9-81ED-4DB2-BD59-A6C34878D82A}">
+                    <a16:rowId xmlns:a16="http://schemas.microsoft.com/office/drawing/2014/main" val="10001"/>
+                  </a:ext>
+                </a:extLst>
+              </a:tr>
+            </a:tbl>
+          </a:graphicData>
+        </a:graphic>
+      </p:graphicFrame>
+    </p:spTree>
+    <p:extLst>
+      <p:ext uri="{BB962C8B-B14F-4D97-AF65-F5344CB8AC3E}">
+        <p14:creationId xmlns:p14="http://schemas.microsoft.com/office/powerpoint/2010/main" val="3510681486"/>
+      </p:ext>
+    </p:extLst>
+  </p:cSld>
+  <p:clrMapOvr>
+    <a:masterClrMapping/>
+  </p:clrMapOvr>
+</p:sld>
+</file>
+
+<file path=ppt/slides/slide32.xml><?xml version="1.0" encoding="utf-8"?>
+<p:sld xmlns:a="http://schemas.openxmlformats.org/drawingml/2006/main" xmlns:r="http://schemas.openxmlformats.org/officeDocument/2006/relationships" xmlns:p="http://schemas.openxmlformats.org/presentationml/2006/main">
+  <p:cSld>
+    <p:bg>
+      <p:bgPr>
+        <a:solidFill>
+          <a:srgbClr val="D9EAD3"/>
+        </a:solidFill>
+        <a:effectLst/>
+      </p:bgPr>
+    </p:bg>
+    <p:spTree>
+      <p:nvGrpSpPr>
+        <p:cNvPr id="1" name="Shape 72"/>
+        <p:cNvGrpSpPr/>
+        <p:nvPr/>
+      </p:nvGrpSpPr>
+      <p:grpSpPr>
+        <a:xfrm>
+          <a:off x="0" y="0"/>
+          <a:ext cx="0" cy="0"/>
+          <a:chOff x="0" y="0"/>
+          <a:chExt cx="0" cy="0"/>
+        </a:xfrm>
+      </p:grpSpPr>
       <p:sp>
         <p:nvSpPr>
           <p:cNvPr id="73" name="Google Shape;73;p16"/>
@@ -14570,7 +15770,7 @@
 </p:sld>
 </file>
 
-<file path=ppt/slides/slide31.xml><?xml version="1.0" encoding="utf-8"?>
+<file path=ppt/slides/slide33.xml><?xml version="1.0" encoding="utf-8"?>
 <p:sld xmlns:a="http://schemas.openxmlformats.org/drawingml/2006/main" xmlns:r="http://schemas.openxmlformats.org/officeDocument/2006/relationships" xmlns:p="http://schemas.openxmlformats.org/presentationml/2006/main">
   <p:cSld>
     <p:spTree>
@@ -14785,7 +15985,7 @@
 </p:sld>
 </file>
 
-<file path=ppt/slides/slide32.xml><?xml version="1.0" encoding="utf-8"?>
+<file path=ppt/slides/slide34.xml><?xml version="1.0" encoding="utf-8"?>
 <p:sld xmlns:a="http://schemas.openxmlformats.org/drawingml/2006/main" xmlns:r="http://schemas.openxmlformats.org/officeDocument/2006/relationships" xmlns:p="http://schemas.openxmlformats.org/presentationml/2006/main">
   <p:cSld>
     <p:bg>
@@ -14865,7 +16065,7 @@
 </p:sld>
 </file>
 
-<file path=ppt/slides/slide33.xml><?xml version="1.0" encoding="utf-8"?>
+<file path=ppt/slides/slide35.xml><?xml version="1.0" encoding="utf-8"?>
 <p:sld xmlns:a="http://schemas.openxmlformats.org/drawingml/2006/main" xmlns:r="http://schemas.openxmlformats.org/officeDocument/2006/relationships" xmlns:p="http://schemas.openxmlformats.org/presentationml/2006/main">
   <p:cSld>
     <p:spTree>
@@ -15080,7 +16280,7 @@
 </p:sld>
 </file>
 
-<file path=ppt/slides/slide34.xml><?xml version="1.0" encoding="utf-8"?>
+<file path=ppt/slides/slide36.xml><?xml version="1.0" encoding="utf-8"?>
 <p:sld xmlns:a="http://schemas.openxmlformats.org/drawingml/2006/main" xmlns:r="http://schemas.openxmlformats.org/officeDocument/2006/relationships" xmlns:p="http://schemas.openxmlformats.org/presentationml/2006/main">
   <p:cSld>
     <p:bg>
@@ -15160,7 +16360,7 @@
 </p:sld>
 </file>
 
-<file path=ppt/slides/slide35.xml><?xml version="1.0" encoding="utf-8"?>
+<file path=ppt/slides/slide37.xml><?xml version="1.0" encoding="utf-8"?>
 <p:sld xmlns:a="http://schemas.openxmlformats.org/drawingml/2006/main" xmlns:r="http://schemas.openxmlformats.org/officeDocument/2006/relationships" xmlns:p="http://schemas.openxmlformats.org/presentationml/2006/main">
   <p:cSld>
     <p:spTree>
@@ -15375,7 +16575,7 @@
 </p:sld>
 </file>
 
-<file path=ppt/slides/slide36.xml><?xml version="1.0" encoding="utf-8"?>
+<file path=ppt/slides/slide38.xml><?xml version="1.0" encoding="utf-8"?>
 <p:sld xmlns:a="http://schemas.openxmlformats.org/drawingml/2006/main" xmlns:r="http://schemas.openxmlformats.org/officeDocument/2006/relationships" xmlns:p="http://schemas.openxmlformats.org/presentationml/2006/main">
   <p:cSld>
     <p:bg>
@@ -15477,147 +16677,6 @@
 </p:sld>
 </file>
 
-<file path=ppt/slides/slide37.xml><?xml version="1.0" encoding="utf-8"?>
-<p:sld xmlns:a="http://schemas.openxmlformats.org/drawingml/2006/main" xmlns:r="http://schemas.openxmlformats.org/officeDocument/2006/relationships" xmlns:p="http://schemas.openxmlformats.org/presentationml/2006/main">
-  <p:cSld>
-    <p:bg>
-      <p:bgPr>
-        <a:solidFill>
-          <a:srgbClr val="D9EAD3"/>
-        </a:solidFill>
-        <a:effectLst/>
-      </p:bgPr>
-    </p:bg>
-    <p:spTree>
-      <p:nvGrpSpPr>
-        <p:cNvPr id="1" name="Shape 72"/>
-        <p:cNvGrpSpPr/>
-        <p:nvPr/>
-      </p:nvGrpSpPr>
-      <p:grpSpPr>
-        <a:xfrm>
-          <a:off x="0" y="0"/>
-          <a:ext cx="0" cy="0"/>
-          <a:chOff x="0" y="0"/>
-          <a:chExt cx="0" cy="0"/>
-        </a:xfrm>
-      </p:grpSpPr>
-      <p:sp>
-        <p:nvSpPr>
-          <p:cNvPr id="73" name="Google Shape;73;p16"/>
-          <p:cNvSpPr txBox="1">
-            <a:spLocks noGrp="1"/>
-          </p:cNvSpPr>
-          <p:nvPr>
-            <p:ph type="title"/>
-          </p:nvPr>
-        </p:nvSpPr>
-        <p:spPr>
-          <a:xfrm>
-            <a:off x="311700" y="445025"/>
-            <a:ext cx="8520600" cy="1098739"/>
-          </a:xfrm>
-          <a:prstGeom prst="rect">
-            <a:avLst/>
-          </a:prstGeom>
-        </p:spPr>
-        <p:txBody>
-          <a:bodyPr spcFirstLastPara="1" wrap="square" lIns="91425" tIns="91425" rIns="91425" bIns="91425" anchor="t" anchorCtr="0">
-            <a:noAutofit/>
-          </a:bodyPr>
-          <a:lstStyle/>
-          <a:p>
-            <a:r>
-              <a:rPr lang="en" dirty="0"/>
-              <a:t>Functional Testing (Screenshot and explain how you tested your program – use the testing template)</a:t>
-            </a:r>
-            <a:endParaRPr dirty="0"/>
-          </a:p>
-        </p:txBody>
-      </p:sp>
-    </p:spTree>
-    <p:extLst>
-      <p:ext uri="{BB962C8B-B14F-4D97-AF65-F5344CB8AC3E}">
-        <p14:creationId xmlns:p14="http://schemas.microsoft.com/office/powerpoint/2010/main" val="1781413307"/>
-      </p:ext>
-    </p:extLst>
-  </p:cSld>
-  <p:clrMapOvr>
-    <a:masterClrMapping/>
-  </p:clrMapOvr>
-</p:sld>
-</file>
-
-<file path=ppt/slides/slide38.xml><?xml version="1.0" encoding="utf-8"?>
-<p:sld xmlns:a="http://schemas.openxmlformats.org/drawingml/2006/main" xmlns:r="http://schemas.openxmlformats.org/officeDocument/2006/relationships" xmlns:p="http://schemas.openxmlformats.org/presentationml/2006/main">
-  <p:cSld>
-    <p:bg>
-      <p:bgPr>
-        <a:solidFill>
-          <a:srgbClr val="D9EAD3"/>
-        </a:solidFill>
-        <a:effectLst/>
-      </p:bgPr>
-    </p:bg>
-    <p:spTree>
-      <p:nvGrpSpPr>
-        <p:cNvPr id="1" name="Shape 72"/>
-        <p:cNvGrpSpPr/>
-        <p:nvPr/>
-      </p:nvGrpSpPr>
-      <p:grpSpPr>
-        <a:xfrm>
-          <a:off x="0" y="0"/>
-          <a:ext cx="0" cy="0"/>
-          <a:chOff x="0" y="0"/>
-          <a:chExt cx="0" cy="0"/>
-        </a:xfrm>
-      </p:grpSpPr>
-      <p:sp>
-        <p:nvSpPr>
-          <p:cNvPr id="73" name="Google Shape;73;p16"/>
-          <p:cNvSpPr txBox="1">
-            <a:spLocks noGrp="1"/>
-          </p:cNvSpPr>
-          <p:nvPr>
-            <p:ph type="title"/>
-          </p:nvPr>
-        </p:nvSpPr>
-        <p:spPr>
-          <a:xfrm>
-            <a:off x="311700" y="445025"/>
-            <a:ext cx="8520600" cy="1098739"/>
-          </a:xfrm>
-          <a:prstGeom prst="rect">
-            <a:avLst/>
-          </a:prstGeom>
-        </p:spPr>
-        <p:txBody>
-          <a:bodyPr spcFirstLastPara="1" wrap="square" lIns="91425" tIns="91425" rIns="91425" bIns="91425" anchor="t" anchorCtr="0">
-            <a:noAutofit/>
-          </a:bodyPr>
-          <a:lstStyle/>
-          <a:p>
-            <a:r>
-              <a:rPr lang="en" dirty="0"/>
-              <a:t>Using evidence of testing show how you refined your program (duplicate slides)</a:t>
-            </a:r>
-          </a:p>
-        </p:txBody>
-      </p:sp>
-    </p:spTree>
-    <p:extLst>
-      <p:ext uri="{BB962C8B-B14F-4D97-AF65-F5344CB8AC3E}">
-        <p14:creationId xmlns:p14="http://schemas.microsoft.com/office/powerpoint/2010/main" val="3394932069"/>
-      </p:ext>
-    </p:extLst>
-  </p:cSld>
-  <p:clrMapOvr>
-    <a:masterClrMapping/>
-  </p:clrMapOvr>
-</p:sld>
-</file>
-
 <file path=ppt/slides/slide39.xml><?xml version="1.0" encoding="utf-8"?>
 <p:sld xmlns:a="http://schemas.openxmlformats.org/drawingml/2006/main" xmlns:r="http://schemas.openxmlformats.org/officeDocument/2006/relationships" xmlns:p="http://schemas.openxmlformats.org/presentationml/2006/main">
   <p:cSld>
@@ -15670,7 +16729,7 @@
           <a:p>
             <a:r>
               <a:rPr lang="en" dirty="0"/>
-              <a:t>User Testing (Screenshot and show feedback from a range of users/testers)</a:t>
+              <a:t>Functional Testing (Screenshot and explain how you tested your program – use the testing template)</a:t>
             </a:r>
             <a:endParaRPr dirty="0"/>
           </a:p>
@@ -15679,7 +16738,7 @@
     </p:spTree>
     <p:extLst>
       <p:ext uri="{BB962C8B-B14F-4D97-AF65-F5344CB8AC3E}">
-        <p14:creationId xmlns:p14="http://schemas.microsoft.com/office/powerpoint/2010/main" val="2712176924"/>
+        <p14:creationId xmlns:p14="http://schemas.microsoft.com/office/powerpoint/2010/main" val="1781413307"/>
       </p:ext>
     </p:extLst>
   </p:cSld>
@@ -16174,6 +17233,147 @@
           <a:p>
             <a:r>
               <a:rPr lang="en" dirty="0"/>
+              <a:t>Using evidence of testing show how you refined your program (duplicate slides)</a:t>
+            </a:r>
+          </a:p>
+        </p:txBody>
+      </p:sp>
+    </p:spTree>
+    <p:extLst>
+      <p:ext uri="{BB962C8B-B14F-4D97-AF65-F5344CB8AC3E}">
+        <p14:creationId xmlns:p14="http://schemas.microsoft.com/office/powerpoint/2010/main" val="3394932069"/>
+      </p:ext>
+    </p:extLst>
+  </p:cSld>
+  <p:clrMapOvr>
+    <a:masterClrMapping/>
+  </p:clrMapOvr>
+</p:sld>
+</file>
+
+<file path=ppt/slides/slide41.xml><?xml version="1.0" encoding="utf-8"?>
+<p:sld xmlns:a="http://schemas.openxmlformats.org/drawingml/2006/main" xmlns:r="http://schemas.openxmlformats.org/officeDocument/2006/relationships" xmlns:p="http://schemas.openxmlformats.org/presentationml/2006/main">
+  <p:cSld>
+    <p:bg>
+      <p:bgPr>
+        <a:solidFill>
+          <a:srgbClr val="D9EAD3"/>
+        </a:solidFill>
+        <a:effectLst/>
+      </p:bgPr>
+    </p:bg>
+    <p:spTree>
+      <p:nvGrpSpPr>
+        <p:cNvPr id="1" name="Shape 72"/>
+        <p:cNvGrpSpPr/>
+        <p:nvPr/>
+      </p:nvGrpSpPr>
+      <p:grpSpPr>
+        <a:xfrm>
+          <a:off x="0" y="0"/>
+          <a:ext cx="0" cy="0"/>
+          <a:chOff x="0" y="0"/>
+          <a:chExt cx="0" cy="0"/>
+        </a:xfrm>
+      </p:grpSpPr>
+      <p:sp>
+        <p:nvSpPr>
+          <p:cNvPr id="73" name="Google Shape;73;p16"/>
+          <p:cNvSpPr txBox="1">
+            <a:spLocks noGrp="1"/>
+          </p:cNvSpPr>
+          <p:nvPr>
+            <p:ph type="title"/>
+          </p:nvPr>
+        </p:nvSpPr>
+        <p:spPr>
+          <a:xfrm>
+            <a:off x="311700" y="445025"/>
+            <a:ext cx="8520600" cy="1098739"/>
+          </a:xfrm>
+          <a:prstGeom prst="rect">
+            <a:avLst/>
+          </a:prstGeom>
+        </p:spPr>
+        <p:txBody>
+          <a:bodyPr spcFirstLastPara="1" wrap="square" lIns="91425" tIns="91425" rIns="91425" bIns="91425" anchor="t" anchorCtr="0">
+            <a:noAutofit/>
+          </a:bodyPr>
+          <a:lstStyle/>
+          <a:p>
+            <a:r>
+              <a:rPr lang="en" dirty="0"/>
+              <a:t>User Testing (Screenshot and show feedback from a range of users/testers)</a:t>
+            </a:r>
+            <a:endParaRPr dirty="0"/>
+          </a:p>
+        </p:txBody>
+      </p:sp>
+    </p:spTree>
+    <p:extLst>
+      <p:ext uri="{BB962C8B-B14F-4D97-AF65-F5344CB8AC3E}">
+        <p14:creationId xmlns:p14="http://schemas.microsoft.com/office/powerpoint/2010/main" val="2712176924"/>
+      </p:ext>
+    </p:extLst>
+  </p:cSld>
+  <p:clrMapOvr>
+    <a:masterClrMapping/>
+  </p:clrMapOvr>
+</p:sld>
+</file>
+
+<file path=ppt/slides/slide42.xml><?xml version="1.0" encoding="utf-8"?>
+<p:sld xmlns:a="http://schemas.openxmlformats.org/drawingml/2006/main" xmlns:r="http://schemas.openxmlformats.org/officeDocument/2006/relationships" xmlns:p="http://schemas.openxmlformats.org/presentationml/2006/main">
+  <p:cSld>
+    <p:bg>
+      <p:bgPr>
+        <a:solidFill>
+          <a:srgbClr val="D9EAD3"/>
+        </a:solidFill>
+        <a:effectLst/>
+      </p:bgPr>
+    </p:bg>
+    <p:spTree>
+      <p:nvGrpSpPr>
+        <p:cNvPr id="1" name="Shape 72"/>
+        <p:cNvGrpSpPr/>
+        <p:nvPr/>
+      </p:nvGrpSpPr>
+      <p:grpSpPr>
+        <a:xfrm>
+          <a:off x="0" y="0"/>
+          <a:ext cx="0" cy="0"/>
+          <a:chOff x="0" y="0"/>
+          <a:chExt cx="0" cy="0"/>
+        </a:xfrm>
+      </p:grpSpPr>
+      <p:sp>
+        <p:nvSpPr>
+          <p:cNvPr id="73" name="Google Shape;73;p16"/>
+          <p:cNvSpPr txBox="1">
+            <a:spLocks noGrp="1"/>
+          </p:cNvSpPr>
+          <p:nvPr>
+            <p:ph type="title"/>
+          </p:nvPr>
+        </p:nvSpPr>
+        <p:spPr>
+          <a:xfrm>
+            <a:off x="311700" y="445025"/>
+            <a:ext cx="8520600" cy="1098739"/>
+          </a:xfrm>
+          <a:prstGeom prst="rect">
+            <a:avLst/>
+          </a:prstGeom>
+        </p:spPr>
+        <p:txBody>
+          <a:bodyPr spcFirstLastPara="1" wrap="square" lIns="91425" tIns="91425" rIns="91425" bIns="91425" anchor="t" anchorCtr="0">
+            <a:noAutofit/>
+          </a:bodyPr>
+          <a:lstStyle/>
+          <a:p>
+            <a:r>
+              <a:rPr lang="en" dirty="0"/>
               <a:t>Using evidence of user feedback show how you refined your program (duplicate slides)</a:t>
             </a:r>
           </a:p>
@@ -16192,7 +17392,7 @@
 </p:sld>
 </file>
 
-<file path=ppt/slides/slide41.xml><?xml version="1.0" encoding="utf-8"?>
+<file path=ppt/slides/slide43.xml><?xml version="1.0" encoding="utf-8"?>
 <p:sld xmlns:a="http://schemas.openxmlformats.org/drawingml/2006/main" xmlns:r="http://schemas.openxmlformats.org/officeDocument/2006/relationships" xmlns:p="http://schemas.openxmlformats.org/presentationml/2006/main">
   <p:cSld>
     <p:bg>
@@ -16294,7 +17494,7 @@
 </p:sld>
 </file>
 
-<file path=ppt/slides/slide42.xml><?xml version="1.0" encoding="utf-8"?>
+<file path=ppt/slides/slide44.xml><?xml version="1.0" encoding="utf-8"?>
 <p:sld xmlns:a="http://schemas.openxmlformats.org/drawingml/2006/main" xmlns:r="http://schemas.openxmlformats.org/officeDocument/2006/relationships" xmlns:p="http://schemas.openxmlformats.org/presentationml/2006/main">
   <p:cSld>
     <p:bg>
@@ -16411,7 +17611,7 @@
 </p:sld>
 </file>
 
-<file path=ppt/slides/slide43.xml><?xml version="1.0" encoding="utf-8"?>
+<file path=ppt/slides/slide45.xml><?xml version="1.0" encoding="utf-8"?>
 <p:sld xmlns:a="http://schemas.openxmlformats.org/drawingml/2006/main" xmlns:r="http://schemas.openxmlformats.org/officeDocument/2006/relationships" xmlns:p="http://schemas.openxmlformats.org/presentationml/2006/main">
   <p:cSld>
     <p:bg>
@@ -16517,7 +17717,7 @@
 </p:sld>
 </file>
 
-<file path=ppt/slides/slide44.xml><?xml version="1.0" encoding="utf-8"?>
+<file path=ppt/slides/slide46.xml><?xml version="1.0" encoding="utf-8"?>
 <p:sld xmlns:a="http://schemas.openxmlformats.org/drawingml/2006/main" xmlns:r="http://schemas.openxmlformats.org/officeDocument/2006/relationships" xmlns:p="http://schemas.openxmlformats.org/presentationml/2006/main">
   <p:cSld>
     <p:bg>
@@ -16639,7 +17839,7 @@
 </p:sld>
 </file>
 
-<file path=ppt/slides/slide45.xml><?xml version="1.0" encoding="utf-8"?>
+<file path=ppt/slides/slide47.xml><?xml version="1.0" encoding="utf-8"?>
 <p:sld xmlns:a="http://schemas.openxmlformats.org/drawingml/2006/main" xmlns:r="http://schemas.openxmlformats.org/officeDocument/2006/relationships" xmlns:p="http://schemas.openxmlformats.org/presentationml/2006/main">
   <p:cSld>
     <p:bg>
@@ -16761,7 +17961,7 @@
 </p:sld>
 </file>
 
-<file path=ppt/slides/slide46.xml><?xml version="1.0" encoding="utf-8"?>
+<file path=ppt/slides/slide48.xml><?xml version="1.0" encoding="utf-8"?>
 <p:sld xmlns:a="http://schemas.openxmlformats.org/drawingml/2006/main" xmlns:r="http://schemas.openxmlformats.org/officeDocument/2006/relationships" xmlns:p="http://schemas.openxmlformats.org/presentationml/2006/main">
   <p:cSld>
     <p:bg>

</xml_diff>

<commit_message>
Click and collect version 4
Created a function for not_blank and used it to validate name and phone.
</commit_message>
<xml_diff>
--- a/Danett Pepito - 000_91896 _ 91897 Documentation - 2150400 (Git).pptx
+++ b/Danett Pepito - 000_91896 _ 91897 Documentation - 2150400 (Git).pptx
@@ -5,7 +5,7 @@
     <p:sldMasterId id="2147483659" r:id="rId1"/>
   </p:sldMasterIdLst>
   <p:notesMasterIdLst>
-    <p:notesMasterId r:id="rId50"/>
+    <p:notesMasterId r:id="rId54"/>
   </p:notesMasterIdLst>
   <p:sldIdLst>
     <p:sldId id="256" r:id="rId2"/>
@@ -39,23 +39,27 @@
     <p:sldId id="275" r:id="rId30"/>
     <p:sldId id="305" r:id="rId31"/>
     <p:sldId id="306" r:id="rId32"/>
-    <p:sldId id="276" r:id="rId33"/>
-    <p:sldId id="277" r:id="rId34"/>
-    <p:sldId id="278" r:id="rId35"/>
-    <p:sldId id="279" r:id="rId36"/>
-    <p:sldId id="280" r:id="rId37"/>
-    <p:sldId id="281" r:id="rId38"/>
-    <p:sldId id="282" r:id="rId39"/>
-    <p:sldId id="288" r:id="rId40"/>
-    <p:sldId id="290" r:id="rId41"/>
-    <p:sldId id="292" r:id="rId42"/>
-    <p:sldId id="291" r:id="rId43"/>
-    <p:sldId id="285" r:id="rId44"/>
-    <p:sldId id="261" r:id="rId45"/>
-    <p:sldId id="284" r:id="rId46"/>
-    <p:sldId id="286" r:id="rId47"/>
-    <p:sldId id="287" r:id="rId48"/>
-    <p:sldId id="262" r:id="rId49"/>
+    <p:sldId id="307" r:id="rId33"/>
+    <p:sldId id="308" r:id="rId34"/>
+    <p:sldId id="309" r:id="rId35"/>
+    <p:sldId id="310" r:id="rId36"/>
+    <p:sldId id="276" r:id="rId37"/>
+    <p:sldId id="277" r:id="rId38"/>
+    <p:sldId id="278" r:id="rId39"/>
+    <p:sldId id="279" r:id="rId40"/>
+    <p:sldId id="280" r:id="rId41"/>
+    <p:sldId id="281" r:id="rId42"/>
+    <p:sldId id="282" r:id="rId43"/>
+    <p:sldId id="288" r:id="rId44"/>
+    <p:sldId id="290" r:id="rId45"/>
+    <p:sldId id="292" r:id="rId46"/>
+    <p:sldId id="291" r:id="rId47"/>
+    <p:sldId id="285" r:id="rId48"/>
+    <p:sldId id="261" r:id="rId49"/>
+    <p:sldId id="284" r:id="rId50"/>
+    <p:sldId id="286" r:id="rId51"/>
+    <p:sldId id="287" r:id="rId52"/>
+    <p:sldId id="262" r:id="rId53"/>
   </p:sldIdLst>
   <p:sldSz cx="9144000" cy="5143500" type="screen16x9"/>
   <p:notesSz cx="6858000" cy="9144000"/>
@@ -310,7 +314,7 @@
 <file path=ppt/revisionInfo.xml><?xml version="1.0" encoding="utf-8"?>
 <p1510:revInfo xmlns:a="http://schemas.openxmlformats.org/drawingml/2006/main" xmlns:r="http://schemas.openxmlformats.org/officeDocument/2006/relationships" xmlns:p1510="http://schemas.microsoft.com/office/powerpoint/2015/10/main">
   <p1510:revLst>
-    <p1510:client id="{B2185394-3AFD-42B2-9285-3B672C598A56}" v="9" dt="2022-03-18T04:13:53.836"/>
+    <p1510:client id="{B2185394-3AFD-42B2-9285-3B672C598A56}" v="10" dt="2022-03-18T04:40:17.719"/>
   </p1510:revLst>
 </p1510:revInfo>
 </file>
@@ -320,7 +324,7 @@
   <pc:docChgLst>
     <pc:chgData name="Danett Pepito" userId="ddef1e2176689e9a" providerId="LiveId" clId="{B2185394-3AFD-42B2-9285-3B672C598A56}"/>
     <pc:docChg chg="undo custSel addSld delSld modSld sldOrd">
-      <pc:chgData name="Danett Pepito" userId="ddef1e2176689e9a" providerId="LiveId" clId="{B2185394-3AFD-42B2-9285-3B672C598A56}" dt="2022-03-18T04:15:37.123" v="762" actId="1076"/>
+      <pc:chgData name="Danett Pepito" userId="ddef1e2176689e9a" providerId="LiveId" clId="{B2185394-3AFD-42B2-9285-3B672C598A56}" dt="2022-03-18T04:44:32.555" v="814" actId="1076"/>
       <pc:docMkLst>
         <pc:docMk/>
       </pc:docMkLst>
@@ -1080,6 +1084,178 @@
           </ac:picMkLst>
         </pc:picChg>
       </pc:sldChg>
+      <pc:sldChg chg="addSp delSp modSp add mod">
+        <pc:chgData name="Danett Pepito" userId="ddef1e2176689e9a" providerId="LiveId" clId="{B2185394-3AFD-42B2-9285-3B672C598A56}" dt="2022-03-18T04:22:25.206" v="771" actId="1076"/>
+        <pc:sldMkLst>
+          <pc:docMk/>
+          <pc:sldMk cId="2649941256" sldId="307"/>
+        </pc:sldMkLst>
+        <pc:spChg chg="mod">
+          <ac:chgData name="Danett Pepito" userId="ddef1e2176689e9a" providerId="LiveId" clId="{B2185394-3AFD-42B2-9285-3B672C598A56}" dt="2022-03-18T04:21:03.907" v="765" actId="20577"/>
+          <ac:spMkLst>
+            <pc:docMk/>
+            <pc:sldMk cId="2649941256" sldId="307"/>
+            <ac:spMk id="73" creationId="{00000000-0000-0000-0000-000000000000}"/>
+          </ac:spMkLst>
+        </pc:spChg>
+        <pc:picChg chg="del">
+          <ac:chgData name="Danett Pepito" userId="ddef1e2176689e9a" providerId="LiveId" clId="{B2185394-3AFD-42B2-9285-3B672C598A56}" dt="2022-03-18T04:22:20.837" v="768" actId="478"/>
+          <ac:picMkLst>
+            <pc:docMk/>
+            <pc:sldMk cId="2649941256" sldId="307"/>
+            <ac:picMk id="4" creationId="{03CC9DFC-78C5-4A10-8A1A-BFC21C9CD134}"/>
+          </ac:picMkLst>
+        </pc:picChg>
+        <pc:picChg chg="add mod">
+          <ac:chgData name="Danett Pepito" userId="ddef1e2176689e9a" providerId="LiveId" clId="{B2185394-3AFD-42B2-9285-3B672C598A56}" dt="2022-03-18T04:22:25.206" v="771" actId="1076"/>
+          <ac:picMkLst>
+            <pc:docMk/>
+            <pc:sldMk cId="2649941256" sldId="307"/>
+            <ac:picMk id="5" creationId="{86475CA7-CB4E-4997-B9B7-7635E7D1F6DD}"/>
+          </ac:picMkLst>
+        </pc:picChg>
+      </pc:sldChg>
+      <pc:sldChg chg="addSp delSp modSp add mod replId">
+        <pc:chgData name="Danett Pepito" userId="ddef1e2176689e9a" providerId="LiveId" clId="{B2185394-3AFD-42B2-9285-3B672C598A56}" dt="2022-03-18T04:25:42.539" v="783" actId="1076"/>
+        <pc:sldMkLst>
+          <pc:docMk/>
+          <pc:sldMk cId="1238541858" sldId="308"/>
+        </pc:sldMkLst>
+        <pc:spChg chg="mod">
+          <ac:chgData name="Danett Pepito" userId="ddef1e2176689e9a" providerId="LiveId" clId="{B2185394-3AFD-42B2-9285-3B672C598A56}" dt="2022-03-18T04:21:07.719" v="767" actId="20577"/>
+          <ac:spMkLst>
+            <pc:docMk/>
+            <pc:sldMk cId="1238541858" sldId="308"/>
+            <ac:spMk id="78" creationId="{00000000-0000-0000-0000-000000000000}"/>
+          </ac:spMkLst>
+        </pc:spChg>
+        <pc:picChg chg="del">
+          <ac:chgData name="Danett Pepito" userId="ddef1e2176689e9a" providerId="LiveId" clId="{B2185394-3AFD-42B2-9285-3B672C598A56}" dt="2022-03-18T04:22:31.822" v="772" actId="478"/>
+          <ac:picMkLst>
+            <pc:docMk/>
+            <pc:sldMk cId="1238541858" sldId="308"/>
+            <ac:picMk id="3" creationId="{8B607EA9-DAF1-4D10-A879-932FF3389E95}"/>
+          </ac:picMkLst>
+        </pc:picChg>
+        <pc:picChg chg="add mod">
+          <ac:chgData name="Danett Pepito" userId="ddef1e2176689e9a" providerId="LiveId" clId="{B2185394-3AFD-42B2-9285-3B672C598A56}" dt="2022-03-18T04:23:50.698" v="778" actId="1076"/>
+          <ac:picMkLst>
+            <pc:docMk/>
+            <pc:sldMk cId="1238541858" sldId="308"/>
+            <ac:picMk id="5" creationId="{E202F360-6A3B-4185-BBAD-D1C35923C743}"/>
+          </ac:picMkLst>
+        </pc:picChg>
+        <pc:picChg chg="del">
+          <ac:chgData name="Danett Pepito" userId="ddef1e2176689e9a" providerId="LiveId" clId="{B2185394-3AFD-42B2-9285-3B672C598A56}" dt="2022-03-18T04:22:32.659" v="773" actId="478"/>
+          <ac:picMkLst>
+            <pc:docMk/>
+            <pc:sldMk cId="1238541858" sldId="308"/>
+            <ac:picMk id="6" creationId="{073C5819-9E56-46C6-BAAB-007023BBC652}"/>
+          </ac:picMkLst>
+        </pc:picChg>
+        <pc:picChg chg="add mod">
+          <ac:chgData name="Danett Pepito" userId="ddef1e2176689e9a" providerId="LiveId" clId="{B2185394-3AFD-42B2-9285-3B672C598A56}" dt="2022-03-18T04:25:42.539" v="783" actId="1076"/>
+          <ac:picMkLst>
+            <pc:docMk/>
+            <pc:sldMk cId="1238541858" sldId="308"/>
+            <ac:picMk id="8" creationId="{E054E55D-F167-4A16-8A70-9C96FDC7566B}"/>
+          </ac:picMkLst>
+        </pc:picChg>
+      </pc:sldChg>
+      <pc:sldChg chg="addSp delSp modSp add mod">
+        <pc:chgData name="Danett Pepito" userId="ddef1e2176689e9a" providerId="LiveId" clId="{B2185394-3AFD-42B2-9285-3B672C598A56}" dt="2022-03-18T04:39:40.274" v="800" actId="1076"/>
+        <pc:sldMkLst>
+          <pc:docMk/>
+          <pc:sldMk cId="2496680009" sldId="309"/>
+        </pc:sldMkLst>
+        <pc:spChg chg="mod">
+          <ac:chgData name="Danett Pepito" userId="ddef1e2176689e9a" providerId="LiveId" clId="{B2185394-3AFD-42B2-9285-3B672C598A56}" dt="2022-03-18T04:30:13.849" v="794" actId="20577"/>
+          <ac:spMkLst>
+            <pc:docMk/>
+            <pc:sldMk cId="2496680009" sldId="309"/>
+            <ac:spMk id="73" creationId="{00000000-0000-0000-0000-000000000000}"/>
+          </ac:spMkLst>
+        </pc:spChg>
+        <pc:picChg chg="add mod">
+          <ac:chgData name="Danett Pepito" userId="ddef1e2176689e9a" providerId="LiveId" clId="{B2185394-3AFD-42B2-9285-3B672C598A56}" dt="2022-03-18T04:39:40.274" v="800" actId="1076"/>
+          <ac:picMkLst>
+            <pc:docMk/>
+            <pc:sldMk cId="2496680009" sldId="309"/>
+            <ac:picMk id="4" creationId="{D2DF2D7B-5223-4665-B861-66F652CE367B}"/>
+          </ac:picMkLst>
+        </pc:picChg>
+        <pc:picChg chg="del">
+          <ac:chgData name="Danett Pepito" userId="ddef1e2176689e9a" providerId="LiveId" clId="{B2185394-3AFD-42B2-9285-3B672C598A56}" dt="2022-03-18T04:26:04.042" v="785" actId="478"/>
+          <ac:picMkLst>
+            <pc:docMk/>
+            <pc:sldMk cId="2496680009" sldId="309"/>
+            <ac:picMk id="5" creationId="{86475CA7-CB4E-4997-B9B7-7635E7D1F6DD}"/>
+          </ac:picMkLst>
+        </pc:picChg>
+      </pc:sldChg>
+      <pc:sldChg chg="addSp delSp modSp add mod replId">
+        <pc:chgData name="Danett Pepito" userId="ddef1e2176689e9a" providerId="LiveId" clId="{B2185394-3AFD-42B2-9285-3B672C598A56}" dt="2022-03-18T04:44:32.555" v="814" actId="1076"/>
+        <pc:sldMkLst>
+          <pc:docMk/>
+          <pc:sldMk cId="640402831" sldId="310"/>
+        </pc:sldMkLst>
+        <pc:spChg chg="mod">
+          <ac:chgData name="Danett Pepito" userId="ddef1e2176689e9a" providerId="LiveId" clId="{B2185394-3AFD-42B2-9285-3B672C598A56}" dt="2022-03-18T04:30:16.456" v="796" actId="20577"/>
+          <ac:spMkLst>
+            <pc:docMk/>
+            <pc:sldMk cId="640402831" sldId="310"/>
+            <ac:spMk id="78" creationId="{00000000-0000-0000-0000-000000000000}"/>
+          </ac:spMkLst>
+        </pc:spChg>
+        <pc:graphicFrameChg chg="mod modGraphic">
+          <ac:chgData name="Danett Pepito" userId="ddef1e2176689e9a" providerId="LiveId" clId="{B2185394-3AFD-42B2-9285-3B672C598A56}" dt="2022-03-18T04:40:20.255" v="802" actId="2711"/>
+          <ac:graphicFrameMkLst>
+            <pc:docMk/>
+            <pc:sldMk cId="640402831" sldId="310"/>
+            <ac:graphicFrameMk id="79" creationId="{00000000-0000-0000-0000-000000000000}"/>
+          </ac:graphicFrameMkLst>
+        </pc:graphicFrameChg>
+        <pc:picChg chg="add mod">
+          <ac:chgData name="Danett Pepito" userId="ddef1e2176689e9a" providerId="LiveId" clId="{B2185394-3AFD-42B2-9285-3B672C598A56}" dt="2022-03-18T04:44:32.555" v="814" actId="1076"/>
+          <ac:picMkLst>
+            <pc:docMk/>
+            <pc:sldMk cId="640402831" sldId="310"/>
+            <ac:picMk id="3" creationId="{93444810-A5E9-47CF-A86E-AEB3E19BD18F}"/>
+          </ac:picMkLst>
+        </pc:picChg>
+        <pc:picChg chg="add del mod">
+          <ac:chgData name="Danett Pepito" userId="ddef1e2176689e9a" providerId="LiveId" clId="{B2185394-3AFD-42B2-9285-3B672C598A56}" dt="2022-03-18T04:31:21.253" v="797" actId="478"/>
+          <ac:picMkLst>
+            <pc:docMk/>
+            <pc:sldMk cId="640402831" sldId="310"/>
+            <ac:picMk id="3" creationId="{B6BEBB64-40F3-4738-A38E-E7C9FB054187}"/>
+          </ac:picMkLst>
+        </pc:picChg>
+        <pc:picChg chg="del">
+          <ac:chgData name="Danett Pepito" userId="ddef1e2176689e9a" providerId="LiveId" clId="{B2185394-3AFD-42B2-9285-3B672C598A56}" dt="2022-03-18T04:26:06.058" v="786" actId="478"/>
+          <ac:picMkLst>
+            <pc:docMk/>
+            <pc:sldMk cId="640402831" sldId="310"/>
+            <ac:picMk id="5" creationId="{E202F360-6A3B-4185-BBAD-D1C35923C743}"/>
+          </ac:picMkLst>
+        </pc:picChg>
+        <pc:picChg chg="add mod">
+          <ac:chgData name="Danett Pepito" userId="ddef1e2176689e9a" providerId="LiveId" clId="{B2185394-3AFD-42B2-9285-3B672C598A56}" dt="2022-03-18T04:44:28.496" v="812" actId="1076"/>
+          <ac:picMkLst>
+            <pc:docMk/>
+            <pc:sldMk cId="640402831" sldId="310"/>
+            <ac:picMk id="6" creationId="{F8B9E961-B803-434E-B8DD-A98ABD2ABB3C}"/>
+          </ac:picMkLst>
+        </pc:picChg>
+        <pc:picChg chg="del">
+          <ac:chgData name="Danett Pepito" userId="ddef1e2176689e9a" providerId="LiveId" clId="{B2185394-3AFD-42B2-9285-3B672C598A56}" dt="2022-03-18T04:26:07.017" v="787" actId="478"/>
+          <ac:picMkLst>
+            <pc:docMk/>
+            <pc:sldMk cId="640402831" sldId="310"/>
+            <ac:picMk id="8" creationId="{E054E55D-F167-4A16-8A70-9C96FDC7566B}"/>
+          </ac:picMkLst>
+        </pc:picChg>
+      </pc:sldChg>
     </pc:docChg>
   </pc:docChgLst>
 </pc:chgInfo>
@@ -3146,7 +3322,7 @@
     </p:spTree>
     <p:extLst>
       <p:ext uri="{BB962C8B-B14F-4D97-AF65-F5344CB8AC3E}">
-        <p14:creationId xmlns:p14="http://schemas.microsoft.com/office/powerpoint/2010/main" val="3253485423"/>
+        <p14:creationId xmlns:p14="http://schemas.microsoft.com/office/powerpoint/2010/main" val="4112266755"/>
       </p:ext>
     </p:extLst>
   </p:cSld>
@@ -3255,7 +3431,7 @@
     </p:spTree>
     <p:extLst>
       <p:ext uri="{BB962C8B-B14F-4D97-AF65-F5344CB8AC3E}">
-        <p14:creationId xmlns:p14="http://schemas.microsoft.com/office/powerpoint/2010/main" val="1209413496"/>
+        <p14:creationId xmlns:p14="http://schemas.microsoft.com/office/powerpoint/2010/main" val="1113816682"/>
       </p:ext>
     </p:extLst>
   </p:cSld>
@@ -3364,7 +3540,7 @@
     </p:spTree>
     <p:extLst>
       <p:ext uri="{BB962C8B-B14F-4D97-AF65-F5344CB8AC3E}">
-        <p14:creationId xmlns:p14="http://schemas.microsoft.com/office/powerpoint/2010/main" val="698637762"/>
+        <p14:creationId xmlns:p14="http://schemas.microsoft.com/office/powerpoint/2010/main" val="4046389309"/>
       </p:ext>
     </p:extLst>
   </p:cSld>
@@ -3473,7 +3649,7 @@
     </p:spTree>
     <p:extLst>
       <p:ext uri="{BB962C8B-B14F-4D97-AF65-F5344CB8AC3E}">
-        <p14:creationId xmlns:p14="http://schemas.microsoft.com/office/powerpoint/2010/main" val="3726156782"/>
+        <p14:creationId xmlns:p14="http://schemas.microsoft.com/office/powerpoint/2010/main" val="1407639253"/>
       </p:ext>
     </p:extLst>
   </p:cSld>
@@ -3582,7 +3758,7 @@
     </p:spTree>
     <p:extLst>
       <p:ext uri="{BB962C8B-B14F-4D97-AF65-F5344CB8AC3E}">
-        <p14:creationId xmlns:p14="http://schemas.microsoft.com/office/powerpoint/2010/main" val="784738588"/>
+        <p14:creationId xmlns:p14="http://schemas.microsoft.com/office/powerpoint/2010/main" val="3253485423"/>
       </p:ext>
     </p:extLst>
   </p:cSld>
@@ -3691,7 +3867,7 @@
     </p:spTree>
     <p:extLst>
       <p:ext uri="{BB962C8B-B14F-4D97-AF65-F5344CB8AC3E}">
-        <p14:creationId xmlns:p14="http://schemas.microsoft.com/office/powerpoint/2010/main" val="3494323208"/>
+        <p14:creationId xmlns:p14="http://schemas.microsoft.com/office/powerpoint/2010/main" val="1209413496"/>
       </p:ext>
     </p:extLst>
   </p:cSld>
@@ -3800,7 +3976,7 @@
     </p:spTree>
     <p:extLst>
       <p:ext uri="{BB962C8B-B14F-4D97-AF65-F5344CB8AC3E}">
-        <p14:creationId xmlns:p14="http://schemas.microsoft.com/office/powerpoint/2010/main" val="3006313543"/>
+        <p14:creationId xmlns:p14="http://schemas.microsoft.com/office/powerpoint/2010/main" val="698637762"/>
       </p:ext>
     </p:extLst>
   </p:cSld>
@@ -3815,7 +3991,7 @@
   <p:cSld>
     <p:spTree>
       <p:nvGrpSpPr>
-        <p:cNvPr id="1" name="Shape 69"/>
+        <p:cNvPr id="1" name="Shape 74"/>
         <p:cNvGrpSpPr/>
         <p:nvPr/>
       </p:nvGrpSpPr>
@@ -3829,7 +4005,7 @@
       </p:grpSpPr>
       <p:sp>
         <p:nvSpPr>
-          <p:cNvPr id="70" name="Google Shape;70;gac10fef634_0_16:notes"/>
+          <p:cNvPr id="75" name="Google Shape;75;gac10fef634_0_20:notes"/>
           <p:cNvSpPr>
             <a:spLocks noGrp="1" noRot="1" noChangeAspect="1"/>
           </p:cNvSpPr>
@@ -3870,7 +4046,7 @@
       </p:sp>
       <p:sp>
         <p:nvSpPr>
-          <p:cNvPr id="71" name="Google Shape;71;gac10fef634_0_16:notes"/>
+          <p:cNvPr id="76" name="Google Shape;76;gac10fef634_0_20:notes"/>
           <p:cNvSpPr txBox="1">
             <a:spLocks noGrp="1"/>
           </p:cNvSpPr>
@@ -3909,7 +4085,7 @@
     </p:spTree>
     <p:extLst>
       <p:ext uri="{BB962C8B-B14F-4D97-AF65-F5344CB8AC3E}">
-        <p14:creationId xmlns:p14="http://schemas.microsoft.com/office/powerpoint/2010/main" val="2149026663"/>
+        <p14:creationId xmlns:p14="http://schemas.microsoft.com/office/powerpoint/2010/main" val="3726156782"/>
       </p:ext>
     </p:extLst>
   </p:cSld>
@@ -4143,7 +4319,7 @@
     </p:spTree>
     <p:extLst>
       <p:ext uri="{BB962C8B-B14F-4D97-AF65-F5344CB8AC3E}">
-        <p14:creationId xmlns:p14="http://schemas.microsoft.com/office/powerpoint/2010/main" val="3194274356"/>
+        <p14:creationId xmlns:p14="http://schemas.microsoft.com/office/powerpoint/2010/main" val="784738588"/>
       </p:ext>
     </p:extLst>
   </p:cSld>
@@ -4154,6 +4330,115 @@
 </file>
 
 <file path=ppt/notesSlides/notesSlide31.xml><?xml version="1.0" encoding="utf-8"?>
+<p:notes xmlns:a="http://schemas.openxmlformats.org/drawingml/2006/main" xmlns:r="http://schemas.openxmlformats.org/officeDocument/2006/relationships" xmlns:p="http://schemas.openxmlformats.org/presentationml/2006/main" showMasterSp="0" showMasterPhAnim="0">
+  <p:cSld>
+    <p:spTree>
+      <p:nvGrpSpPr>
+        <p:cNvPr id="1" name="Shape 74"/>
+        <p:cNvGrpSpPr/>
+        <p:nvPr/>
+      </p:nvGrpSpPr>
+      <p:grpSpPr>
+        <a:xfrm>
+          <a:off x="0" y="0"/>
+          <a:ext cx="0" cy="0"/>
+          <a:chOff x="0" y="0"/>
+          <a:chExt cx="0" cy="0"/>
+        </a:xfrm>
+      </p:grpSpPr>
+      <p:sp>
+        <p:nvSpPr>
+          <p:cNvPr id="75" name="Google Shape;75;gac10fef634_0_20:notes"/>
+          <p:cNvSpPr>
+            <a:spLocks noGrp="1" noRot="1" noChangeAspect="1"/>
+          </p:cNvSpPr>
+          <p:nvPr>
+            <p:ph type="sldImg" idx="2"/>
+          </p:nvPr>
+        </p:nvSpPr>
+        <p:spPr>
+          <a:xfrm>
+            <a:off x="381000" y="685800"/>
+            <a:ext cx="6096000" cy="3429000"/>
+          </a:xfrm>
+          <a:custGeom>
+            <a:avLst/>
+            <a:gdLst/>
+            <a:ahLst/>
+            <a:cxnLst/>
+            <a:rect l="l" t="t" r="r" b="b"/>
+            <a:pathLst>
+              <a:path w="120000" h="120000" extrusionOk="0">
+                <a:moveTo>
+                  <a:pt x="0" y="0"/>
+                </a:moveTo>
+                <a:lnTo>
+                  <a:pt x="120000" y="0"/>
+                </a:lnTo>
+                <a:lnTo>
+                  <a:pt x="120000" y="120000"/>
+                </a:lnTo>
+                <a:lnTo>
+                  <a:pt x="0" y="120000"/>
+                </a:lnTo>
+                <a:close/>
+              </a:path>
+            </a:pathLst>
+          </a:custGeom>
+        </p:spPr>
+      </p:sp>
+      <p:sp>
+        <p:nvSpPr>
+          <p:cNvPr id="76" name="Google Shape;76;gac10fef634_0_20:notes"/>
+          <p:cNvSpPr txBox="1">
+            <a:spLocks noGrp="1"/>
+          </p:cNvSpPr>
+          <p:nvPr>
+            <p:ph type="body" idx="1"/>
+          </p:nvPr>
+        </p:nvSpPr>
+        <p:spPr>
+          <a:xfrm>
+            <a:off x="685800" y="4343400"/>
+            <a:ext cx="5486400" cy="4114800"/>
+          </a:xfrm>
+          <a:prstGeom prst="rect">
+            <a:avLst/>
+          </a:prstGeom>
+        </p:spPr>
+        <p:txBody>
+          <a:bodyPr spcFirstLastPara="1" wrap="square" lIns="91425" tIns="91425" rIns="91425" bIns="91425" anchor="t" anchorCtr="0">
+            <a:noAutofit/>
+          </a:bodyPr>
+          <a:lstStyle/>
+          <a:p>
+            <a:pPr marL="0" lvl="0" indent="0" algn="l" rtl="0">
+              <a:spcBef>
+                <a:spcPts val="0"/>
+              </a:spcBef>
+              <a:spcAft>
+                <a:spcPts val="0"/>
+              </a:spcAft>
+              <a:buNone/>
+            </a:pPr>
+            <a:endParaRPr/>
+          </a:p>
+        </p:txBody>
+      </p:sp>
+    </p:spTree>
+    <p:extLst>
+      <p:ext uri="{BB962C8B-B14F-4D97-AF65-F5344CB8AC3E}">
+        <p14:creationId xmlns:p14="http://schemas.microsoft.com/office/powerpoint/2010/main" val="3494323208"/>
+      </p:ext>
+    </p:extLst>
+  </p:cSld>
+  <p:clrMapOvr>
+    <a:masterClrMapping/>
+  </p:clrMapOvr>
+</p:notes>
+</file>
+
+<file path=ppt/notesSlides/notesSlide32.xml><?xml version="1.0" encoding="utf-8"?>
 <p:notes xmlns:a="http://schemas.openxmlformats.org/drawingml/2006/main" xmlns:r="http://schemas.openxmlformats.org/officeDocument/2006/relationships" xmlns:p="http://schemas.openxmlformats.org/presentationml/2006/main" showMasterSp="0" showMasterPhAnim="0">
   <p:cSld>
     <p:spTree>
@@ -4252,6 +4537,333 @@
     </p:spTree>
     <p:extLst>
       <p:ext uri="{BB962C8B-B14F-4D97-AF65-F5344CB8AC3E}">
+        <p14:creationId xmlns:p14="http://schemas.microsoft.com/office/powerpoint/2010/main" val="3006313543"/>
+      </p:ext>
+    </p:extLst>
+  </p:cSld>
+  <p:clrMapOvr>
+    <a:masterClrMapping/>
+  </p:clrMapOvr>
+</p:notes>
+</file>
+
+<file path=ppt/notesSlides/notesSlide33.xml><?xml version="1.0" encoding="utf-8"?>
+<p:notes xmlns:a="http://schemas.openxmlformats.org/drawingml/2006/main" xmlns:r="http://schemas.openxmlformats.org/officeDocument/2006/relationships" xmlns:p="http://schemas.openxmlformats.org/presentationml/2006/main" showMasterSp="0" showMasterPhAnim="0">
+  <p:cSld>
+    <p:spTree>
+      <p:nvGrpSpPr>
+        <p:cNvPr id="1" name="Shape 69"/>
+        <p:cNvGrpSpPr/>
+        <p:nvPr/>
+      </p:nvGrpSpPr>
+      <p:grpSpPr>
+        <a:xfrm>
+          <a:off x="0" y="0"/>
+          <a:ext cx="0" cy="0"/>
+          <a:chOff x="0" y="0"/>
+          <a:chExt cx="0" cy="0"/>
+        </a:xfrm>
+      </p:grpSpPr>
+      <p:sp>
+        <p:nvSpPr>
+          <p:cNvPr id="70" name="Google Shape;70;gac10fef634_0_16:notes"/>
+          <p:cNvSpPr>
+            <a:spLocks noGrp="1" noRot="1" noChangeAspect="1"/>
+          </p:cNvSpPr>
+          <p:nvPr>
+            <p:ph type="sldImg" idx="2"/>
+          </p:nvPr>
+        </p:nvSpPr>
+        <p:spPr>
+          <a:xfrm>
+            <a:off x="381000" y="685800"/>
+            <a:ext cx="6096000" cy="3429000"/>
+          </a:xfrm>
+          <a:custGeom>
+            <a:avLst/>
+            <a:gdLst/>
+            <a:ahLst/>
+            <a:cxnLst/>
+            <a:rect l="l" t="t" r="r" b="b"/>
+            <a:pathLst>
+              <a:path w="120000" h="120000" extrusionOk="0">
+                <a:moveTo>
+                  <a:pt x="0" y="0"/>
+                </a:moveTo>
+                <a:lnTo>
+                  <a:pt x="120000" y="0"/>
+                </a:lnTo>
+                <a:lnTo>
+                  <a:pt x="120000" y="120000"/>
+                </a:lnTo>
+                <a:lnTo>
+                  <a:pt x="0" y="120000"/>
+                </a:lnTo>
+                <a:close/>
+              </a:path>
+            </a:pathLst>
+          </a:custGeom>
+        </p:spPr>
+      </p:sp>
+      <p:sp>
+        <p:nvSpPr>
+          <p:cNvPr id="71" name="Google Shape;71;gac10fef634_0_16:notes"/>
+          <p:cNvSpPr txBox="1">
+            <a:spLocks noGrp="1"/>
+          </p:cNvSpPr>
+          <p:nvPr>
+            <p:ph type="body" idx="1"/>
+          </p:nvPr>
+        </p:nvSpPr>
+        <p:spPr>
+          <a:xfrm>
+            <a:off x="685800" y="4343400"/>
+            <a:ext cx="5486400" cy="4114800"/>
+          </a:xfrm>
+          <a:prstGeom prst="rect">
+            <a:avLst/>
+          </a:prstGeom>
+        </p:spPr>
+        <p:txBody>
+          <a:bodyPr spcFirstLastPara="1" wrap="square" lIns="91425" tIns="91425" rIns="91425" bIns="91425" anchor="t" anchorCtr="0">
+            <a:noAutofit/>
+          </a:bodyPr>
+          <a:lstStyle/>
+          <a:p>
+            <a:pPr marL="0" lvl="0" indent="0" algn="l" rtl="0">
+              <a:spcBef>
+                <a:spcPts val="0"/>
+              </a:spcBef>
+              <a:spcAft>
+                <a:spcPts val="0"/>
+              </a:spcAft>
+              <a:buNone/>
+            </a:pPr>
+            <a:endParaRPr/>
+          </a:p>
+        </p:txBody>
+      </p:sp>
+    </p:spTree>
+    <p:extLst>
+      <p:ext uri="{BB962C8B-B14F-4D97-AF65-F5344CB8AC3E}">
+        <p14:creationId xmlns:p14="http://schemas.microsoft.com/office/powerpoint/2010/main" val="2149026663"/>
+      </p:ext>
+    </p:extLst>
+  </p:cSld>
+  <p:clrMapOvr>
+    <a:masterClrMapping/>
+  </p:clrMapOvr>
+</p:notes>
+</file>
+
+<file path=ppt/notesSlides/notesSlide34.xml><?xml version="1.0" encoding="utf-8"?>
+<p:notes xmlns:a="http://schemas.openxmlformats.org/drawingml/2006/main" xmlns:r="http://schemas.openxmlformats.org/officeDocument/2006/relationships" xmlns:p="http://schemas.openxmlformats.org/presentationml/2006/main" showMasterSp="0" showMasterPhAnim="0">
+  <p:cSld>
+    <p:spTree>
+      <p:nvGrpSpPr>
+        <p:cNvPr id="1" name="Shape 69"/>
+        <p:cNvGrpSpPr/>
+        <p:nvPr/>
+      </p:nvGrpSpPr>
+      <p:grpSpPr>
+        <a:xfrm>
+          <a:off x="0" y="0"/>
+          <a:ext cx="0" cy="0"/>
+          <a:chOff x="0" y="0"/>
+          <a:chExt cx="0" cy="0"/>
+        </a:xfrm>
+      </p:grpSpPr>
+      <p:sp>
+        <p:nvSpPr>
+          <p:cNvPr id="70" name="Google Shape;70;gac10fef634_0_16:notes"/>
+          <p:cNvSpPr>
+            <a:spLocks noGrp="1" noRot="1" noChangeAspect="1"/>
+          </p:cNvSpPr>
+          <p:nvPr>
+            <p:ph type="sldImg" idx="2"/>
+          </p:nvPr>
+        </p:nvSpPr>
+        <p:spPr>
+          <a:xfrm>
+            <a:off x="381000" y="685800"/>
+            <a:ext cx="6096000" cy="3429000"/>
+          </a:xfrm>
+          <a:custGeom>
+            <a:avLst/>
+            <a:gdLst/>
+            <a:ahLst/>
+            <a:cxnLst/>
+            <a:rect l="l" t="t" r="r" b="b"/>
+            <a:pathLst>
+              <a:path w="120000" h="120000" extrusionOk="0">
+                <a:moveTo>
+                  <a:pt x="0" y="0"/>
+                </a:moveTo>
+                <a:lnTo>
+                  <a:pt x="120000" y="0"/>
+                </a:lnTo>
+                <a:lnTo>
+                  <a:pt x="120000" y="120000"/>
+                </a:lnTo>
+                <a:lnTo>
+                  <a:pt x="0" y="120000"/>
+                </a:lnTo>
+                <a:close/>
+              </a:path>
+            </a:pathLst>
+          </a:custGeom>
+        </p:spPr>
+      </p:sp>
+      <p:sp>
+        <p:nvSpPr>
+          <p:cNvPr id="71" name="Google Shape;71;gac10fef634_0_16:notes"/>
+          <p:cNvSpPr txBox="1">
+            <a:spLocks noGrp="1"/>
+          </p:cNvSpPr>
+          <p:nvPr>
+            <p:ph type="body" idx="1"/>
+          </p:nvPr>
+        </p:nvSpPr>
+        <p:spPr>
+          <a:xfrm>
+            <a:off x="685800" y="4343400"/>
+            <a:ext cx="5486400" cy="4114800"/>
+          </a:xfrm>
+          <a:prstGeom prst="rect">
+            <a:avLst/>
+          </a:prstGeom>
+        </p:spPr>
+        <p:txBody>
+          <a:bodyPr spcFirstLastPara="1" wrap="square" lIns="91425" tIns="91425" rIns="91425" bIns="91425" anchor="t" anchorCtr="0">
+            <a:noAutofit/>
+          </a:bodyPr>
+          <a:lstStyle/>
+          <a:p>
+            <a:pPr marL="0" lvl="0" indent="0" algn="l" rtl="0">
+              <a:spcBef>
+                <a:spcPts val="0"/>
+              </a:spcBef>
+              <a:spcAft>
+                <a:spcPts val="0"/>
+              </a:spcAft>
+              <a:buNone/>
+            </a:pPr>
+            <a:endParaRPr/>
+          </a:p>
+        </p:txBody>
+      </p:sp>
+    </p:spTree>
+    <p:extLst>
+      <p:ext uri="{BB962C8B-B14F-4D97-AF65-F5344CB8AC3E}">
+        <p14:creationId xmlns:p14="http://schemas.microsoft.com/office/powerpoint/2010/main" val="3194274356"/>
+      </p:ext>
+    </p:extLst>
+  </p:cSld>
+  <p:clrMapOvr>
+    <a:masterClrMapping/>
+  </p:clrMapOvr>
+</p:notes>
+</file>
+
+<file path=ppt/notesSlides/notesSlide35.xml><?xml version="1.0" encoding="utf-8"?>
+<p:notes xmlns:a="http://schemas.openxmlformats.org/drawingml/2006/main" xmlns:r="http://schemas.openxmlformats.org/officeDocument/2006/relationships" xmlns:p="http://schemas.openxmlformats.org/presentationml/2006/main" showMasterSp="0" showMasterPhAnim="0">
+  <p:cSld>
+    <p:spTree>
+      <p:nvGrpSpPr>
+        <p:cNvPr id="1" name="Shape 69"/>
+        <p:cNvGrpSpPr/>
+        <p:nvPr/>
+      </p:nvGrpSpPr>
+      <p:grpSpPr>
+        <a:xfrm>
+          <a:off x="0" y="0"/>
+          <a:ext cx="0" cy="0"/>
+          <a:chOff x="0" y="0"/>
+          <a:chExt cx="0" cy="0"/>
+        </a:xfrm>
+      </p:grpSpPr>
+      <p:sp>
+        <p:nvSpPr>
+          <p:cNvPr id="70" name="Google Shape;70;gac10fef634_0_16:notes"/>
+          <p:cNvSpPr>
+            <a:spLocks noGrp="1" noRot="1" noChangeAspect="1"/>
+          </p:cNvSpPr>
+          <p:nvPr>
+            <p:ph type="sldImg" idx="2"/>
+          </p:nvPr>
+        </p:nvSpPr>
+        <p:spPr>
+          <a:xfrm>
+            <a:off x="381000" y="685800"/>
+            <a:ext cx="6096000" cy="3429000"/>
+          </a:xfrm>
+          <a:custGeom>
+            <a:avLst/>
+            <a:gdLst/>
+            <a:ahLst/>
+            <a:cxnLst/>
+            <a:rect l="l" t="t" r="r" b="b"/>
+            <a:pathLst>
+              <a:path w="120000" h="120000" extrusionOk="0">
+                <a:moveTo>
+                  <a:pt x="0" y="0"/>
+                </a:moveTo>
+                <a:lnTo>
+                  <a:pt x="120000" y="0"/>
+                </a:lnTo>
+                <a:lnTo>
+                  <a:pt x="120000" y="120000"/>
+                </a:lnTo>
+                <a:lnTo>
+                  <a:pt x="0" y="120000"/>
+                </a:lnTo>
+                <a:close/>
+              </a:path>
+            </a:pathLst>
+          </a:custGeom>
+        </p:spPr>
+      </p:sp>
+      <p:sp>
+        <p:nvSpPr>
+          <p:cNvPr id="71" name="Google Shape;71;gac10fef634_0_16:notes"/>
+          <p:cNvSpPr txBox="1">
+            <a:spLocks noGrp="1"/>
+          </p:cNvSpPr>
+          <p:nvPr>
+            <p:ph type="body" idx="1"/>
+          </p:nvPr>
+        </p:nvSpPr>
+        <p:spPr>
+          <a:xfrm>
+            <a:off x="685800" y="4343400"/>
+            <a:ext cx="5486400" cy="4114800"/>
+          </a:xfrm>
+          <a:prstGeom prst="rect">
+            <a:avLst/>
+          </a:prstGeom>
+        </p:spPr>
+        <p:txBody>
+          <a:bodyPr spcFirstLastPara="1" wrap="square" lIns="91425" tIns="91425" rIns="91425" bIns="91425" anchor="t" anchorCtr="0">
+            <a:noAutofit/>
+          </a:bodyPr>
+          <a:lstStyle/>
+          <a:p>
+            <a:pPr marL="0" lvl="0" indent="0" algn="l" rtl="0">
+              <a:spcBef>
+                <a:spcPts val="0"/>
+              </a:spcBef>
+              <a:spcAft>
+                <a:spcPts val="0"/>
+              </a:spcAft>
+              <a:buNone/>
+            </a:pPr>
+            <a:endParaRPr/>
+          </a:p>
+        </p:txBody>
+      </p:sp>
+    </p:spTree>
+    <p:extLst>
+      <p:ext uri="{BB962C8B-B14F-4D97-AF65-F5344CB8AC3E}">
         <p14:creationId xmlns:p14="http://schemas.microsoft.com/office/powerpoint/2010/main" val="3014292639"/>
       </p:ext>
     </p:extLst>
@@ -4262,7 +4874,7 @@
 </p:notes>
 </file>
 
-<file path=ppt/notesSlides/notesSlide32.xml><?xml version="1.0" encoding="utf-8"?>
+<file path=ppt/notesSlides/notesSlide36.xml><?xml version="1.0" encoding="utf-8"?>
 <p:notes xmlns:a="http://schemas.openxmlformats.org/drawingml/2006/main" xmlns:r="http://schemas.openxmlformats.org/officeDocument/2006/relationships" xmlns:p="http://schemas.openxmlformats.org/presentationml/2006/main" showMasterSp="0" showMasterPhAnim="0">
   <p:cSld>
     <p:spTree>
@@ -4387,7 +4999,7 @@
 </p:notes>
 </file>
 
-<file path=ppt/notesSlides/notesSlide33.xml><?xml version="1.0" encoding="utf-8"?>
+<file path=ppt/notesSlides/notesSlide37.xml><?xml version="1.0" encoding="utf-8"?>
 <p:notes xmlns:a="http://schemas.openxmlformats.org/drawingml/2006/main" xmlns:r="http://schemas.openxmlformats.org/officeDocument/2006/relationships" xmlns:p="http://schemas.openxmlformats.org/presentationml/2006/main" showMasterSp="0" showMasterPhAnim="0">
   <p:cSld>
     <p:spTree>
@@ -4517,7 +5129,7 @@
 </p:notes>
 </file>
 
-<file path=ppt/notesSlides/notesSlide34.xml><?xml version="1.0" encoding="utf-8"?>
+<file path=ppt/notesSlides/notesSlide38.xml><?xml version="1.0" encoding="utf-8"?>
 <p:notes xmlns:a="http://schemas.openxmlformats.org/drawingml/2006/main" xmlns:r="http://schemas.openxmlformats.org/officeDocument/2006/relationships" xmlns:p="http://schemas.openxmlformats.org/presentationml/2006/main" showMasterSp="0" showMasterPhAnim="0">
   <p:cSld>
     <p:spTree>
@@ -4647,7 +5259,7 @@
 </p:notes>
 </file>
 
-<file path=ppt/notesSlides/notesSlide35.xml><?xml version="1.0" encoding="utf-8"?>
+<file path=ppt/notesSlides/notesSlide39.xml><?xml version="1.0" encoding="utf-8"?>
 <p:notes xmlns:a="http://schemas.openxmlformats.org/drawingml/2006/main" xmlns:r="http://schemas.openxmlformats.org/officeDocument/2006/relationships" xmlns:p="http://schemas.openxmlformats.org/presentationml/2006/main" showMasterSp="0" showMasterPhAnim="0">
   <p:cSld>
     <p:spTree>
@@ -15848,6 +16460,1099 @@
           <a:chExt cx="0" cy="0"/>
         </a:xfrm>
       </p:grpSpPr>
+      <p:pic>
+        <p:nvPicPr>
+          <p:cNvPr id="3" name="Picture 2">
+            <a:extLst>
+              <a:ext uri="{FF2B5EF4-FFF2-40B4-BE49-F238E27FC236}">
+                <a16:creationId xmlns:a16="http://schemas.microsoft.com/office/drawing/2014/main" id="{56BED5EB-EF3D-4AC9-8995-621CB5CA184A}"/>
+              </a:ext>
+            </a:extLst>
+          </p:cNvPr>
+          <p:cNvPicPr>
+            <a:picLocks noChangeAspect="1"/>
+          </p:cNvPicPr>
+          <p:nvPr/>
+        </p:nvPicPr>
+        <p:blipFill>
+          <a:blip r:embed="rId3"/>
+          <a:stretch>
+            <a:fillRect/>
+          </a:stretch>
+        </p:blipFill>
+        <p:spPr>
+          <a:xfrm>
+            <a:off x="0" y="6680"/>
+            <a:ext cx="9144000" cy="5130140"/>
+          </a:xfrm>
+          <a:prstGeom prst="rect">
+            <a:avLst/>
+          </a:prstGeom>
+        </p:spPr>
+      </p:pic>
+      <p:sp>
+        <p:nvSpPr>
+          <p:cNvPr id="73" name="Google Shape;73;p16"/>
+          <p:cNvSpPr txBox="1">
+            <a:spLocks noGrp="1"/>
+          </p:cNvSpPr>
+          <p:nvPr>
+            <p:ph type="title"/>
+          </p:nvPr>
+        </p:nvSpPr>
+        <p:spPr>
+          <a:xfrm>
+            <a:off x="205020" y="231665"/>
+            <a:ext cx="8520600" cy="572700"/>
+          </a:xfrm>
+          <a:prstGeom prst="rect">
+            <a:avLst/>
+          </a:prstGeom>
+        </p:spPr>
+        <p:txBody>
+          <a:bodyPr spcFirstLastPara="1" wrap="square" lIns="91425" tIns="91425" rIns="91425" bIns="91425" anchor="t" anchorCtr="0">
+            <a:noAutofit/>
+          </a:bodyPr>
+          <a:lstStyle/>
+          <a:p>
+            <a:pPr marL="0" lvl="0" indent="0" rtl="0">
+              <a:spcBef>
+                <a:spcPts val="0"/>
+              </a:spcBef>
+              <a:spcAft>
+                <a:spcPts val="0"/>
+              </a:spcAft>
+              <a:buNone/>
+            </a:pPr>
+            <a:r>
+              <a:rPr lang="en" b="1" dirty="0">
+                <a:latin typeface="Avenir Next LT Pro" panose="020B0504020202020204" pitchFamily="34" charset="0"/>
+              </a:rPr>
+              <a:t>Component 3 Version 3 (Trello screenshot)</a:t>
+            </a:r>
+            <a:endParaRPr b="1" dirty="0">
+              <a:latin typeface="Avenir Next LT Pro" panose="020B0504020202020204" pitchFamily="34" charset="0"/>
+            </a:endParaRPr>
+          </a:p>
+        </p:txBody>
+      </p:sp>
+      <p:pic>
+        <p:nvPicPr>
+          <p:cNvPr id="5" name="Picture 4">
+            <a:extLst>
+              <a:ext uri="{FF2B5EF4-FFF2-40B4-BE49-F238E27FC236}">
+                <a16:creationId xmlns:a16="http://schemas.microsoft.com/office/drawing/2014/main" id="{86475CA7-CB4E-4997-B9B7-7635E7D1F6DD}"/>
+              </a:ext>
+            </a:extLst>
+          </p:cNvPr>
+          <p:cNvPicPr>
+            <a:picLocks noChangeAspect="1"/>
+          </p:cNvPicPr>
+          <p:nvPr/>
+        </p:nvPicPr>
+        <p:blipFill>
+          <a:blip r:embed="rId4"/>
+          <a:stretch>
+            <a:fillRect/>
+          </a:stretch>
+        </p:blipFill>
+        <p:spPr>
+          <a:xfrm>
+            <a:off x="313140" y="1029350"/>
+            <a:ext cx="8412480" cy="3406830"/>
+          </a:xfrm>
+          <a:prstGeom prst="rect">
+            <a:avLst/>
+          </a:prstGeom>
+        </p:spPr>
+      </p:pic>
+    </p:spTree>
+    <p:extLst>
+      <p:ext uri="{BB962C8B-B14F-4D97-AF65-F5344CB8AC3E}">
+        <p14:creationId xmlns:p14="http://schemas.microsoft.com/office/powerpoint/2010/main" val="2649941256"/>
+      </p:ext>
+    </p:extLst>
+  </p:cSld>
+  <p:clrMapOvr>
+    <a:masterClrMapping/>
+  </p:clrMapOvr>
+</p:sld>
+</file>
+
+<file path=ppt/slides/slide33.xml><?xml version="1.0" encoding="utf-8"?>
+<p:sld xmlns:a="http://schemas.openxmlformats.org/drawingml/2006/main" xmlns:r="http://schemas.openxmlformats.org/officeDocument/2006/relationships" xmlns:p="http://schemas.openxmlformats.org/presentationml/2006/main">
+  <p:cSld>
+    <p:spTree>
+      <p:nvGrpSpPr>
+        <p:cNvPr id="1" name="Shape 77"/>
+        <p:cNvGrpSpPr/>
+        <p:nvPr/>
+      </p:nvGrpSpPr>
+      <p:grpSpPr>
+        <a:xfrm>
+          <a:off x="0" y="0"/>
+          <a:ext cx="0" cy="0"/>
+          <a:chOff x="0" y="0"/>
+          <a:chExt cx="0" cy="0"/>
+        </a:xfrm>
+      </p:grpSpPr>
+      <p:pic>
+        <p:nvPicPr>
+          <p:cNvPr id="4" name="Picture 3">
+            <a:extLst>
+              <a:ext uri="{FF2B5EF4-FFF2-40B4-BE49-F238E27FC236}">
+                <a16:creationId xmlns:a16="http://schemas.microsoft.com/office/drawing/2014/main" id="{446BBD1D-F3F0-49A6-9D34-8F3222CF8E18}"/>
+              </a:ext>
+            </a:extLst>
+          </p:cNvPr>
+          <p:cNvPicPr>
+            <a:picLocks noChangeAspect="1"/>
+          </p:cNvPicPr>
+          <p:nvPr/>
+        </p:nvPicPr>
+        <p:blipFill>
+          <a:blip r:embed="rId3"/>
+          <a:stretch>
+            <a:fillRect/>
+          </a:stretch>
+        </p:blipFill>
+        <p:spPr>
+          <a:xfrm>
+            <a:off x="0" y="0"/>
+            <a:ext cx="9144000" cy="5132080"/>
+          </a:xfrm>
+          <a:prstGeom prst="rect">
+            <a:avLst/>
+          </a:prstGeom>
+        </p:spPr>
+      </p:pic>
+      <p:sp>
+        <p:nvSpPr>
+          <p:cNvPr id="78" name="Google Shape;78;p17"/>
+          <p:cNvSpPr txBox="1">
+            <a:spLocks noGrp="1"/>
+          </p:cNvSpPr>
+          <p:nvPr>
+            <p:ph type="title"/>
+          </p:nvPr>
+        </p:nvSpPr>
+        <p:spPr>
+          <a:xfrm>
+            <a:off x="311700" y="208805"/>
+            <a:ext cx="8520600" cy="572700"/>
+          </a:xfrm>
+          <a:prstGeom prst="rect">
+            <a:avLst/>
+          </a:prstGeom>
+        </p:spPr>
+        <p:txBody>
+          <a:bodyPr spcFirstLastPara="1" wrap="square" lIns="91425" tIns="91425" rIns="91425" bIns="91425" anchor="t" anchorCtr="0">
+            <a:noAutofit/>
+          </a:bodyPr>
+          <a:lstStyle/>
+          <a:p>
+            <a:pPr marL="0" lvl="0" indent="0" algn="l" rtl="0">
+              <a:spcBef>
+                <a:spcPts val="0"/>
+              </a:spcBef>
+              <a:spcAft>
+                <a:spcPts val="0"/>
+              </a:spcAft>
+              <a:buNone/>
+            </a:pPr>
+            <a:r>
+              <a:rPr lang="en" b="1" dirty="0">
+                <a:latin typeface="Avenir Next LT Pro" panose="020B0504020202020204" pitchFamily="34" charset="0"/>
+              </a:rPr>
+              <a:t>Component 3 Version 3 - Test Plan</a:t>
+            </a:r>
+            <a:endParaRPr b="1" dirty="0">
+              <a:latin typeface="Avenir Next LT Pro" panose="020B0504020202020204" pitchFamily="34" charset="0"/>
+            </a:endParaRPr>
+          </a:p>
+        </p:txBody>
+      </p:sp>
+      <p:graphicFrame>
+        <p:nvGraphicFramePr>
+          <p:cNvPr id="79" name="Google Shape;79;p17"/>
+          <p:cNvGraphicFramePr/>
+          <p:nvPr/>
+        </p:nvGraphicFramePr>
+        <p:xfrm>
+          <a:off x="311700" y="3459513"/>
+          <a:ext cx="8520600" cy="1584900"/>
+        </p:xfrm>
+        <a:graphic>
+          <a:graphicData uri="http://schemas.openxmlformats.org/drawingml/2006/table">
+            <a:tbl>
+              <a:tblPr>
+                <a:noFill/>
+                <a:tableStyleId>{E1099E06-0E6B-448D-9D27-60429F06E6F4}</a:tableStyleId>
+              </a:tblPr>
+              <a:tblGrid>
+                <a:gridCol w="4260300">
+                  <a:extLst>
+                    <a:ext uri="{9D8B030D-6E8A-4147-A177-3AD203B41FA5}">
+                      <a16:colId xmlns:a16="http://schemas.microsoft.com/office/drawing/2014/main" val="20000"/>
+                    </a:ext>
+                  </a:extLst>
+                </a:gridCol>
+                <a:gridCol w="4260300">
+                  <a:extLst>
+                    <a:ext uri="{9D8B030D-6E8A-4147-A177-3AD203B41FA5}">
+                      <a16:colId xmlns:a16="http://schemas.microsoft.com/office/drawing/2014/main" val="20001"/>
+                    </a:ext>
+                  </a:extLst>
+                </a:gridCol>
+              </a:tblGrid>
+              <a:tr h="381000">
+                <a:tc>
+                  <a:txBody>
+                    <a:bodyPr/>
+                    <a:lstStyle/>
+                    <a:p>
+                      <a:pPr marL="0" lvl="0" indent="0" algn="l" rtl="0">
+                        <a:spcBef>
+                          <a:spcPts val="0"/>
+                        </a:spcBef>
+                        <a:spcAft>
+                          <a:spcPts val="0"/>
+                        </a:spcAft>
+                        <a:buNone/>
+                      </a:pPr>
+                      <a:r>
+                        <a:rPr lang="en" sz="1600" b="1" dirty="0">
+                          <a:latin typeface="Avenir Next LT Pro" panose="020B0504020202020204" pitchFamily="34" charset="0"/>
+                        </a:rPr>
+                        <a:t>Test Case</a:t>
+                      </a:r>
+                      <a:endParaRPr sz="1600" b="1" dirty="0">
+                        <a:latin typeface="Avenir Next LT Pro" panose="020B0504020202020204" pitchFamily="34" charset="0"/>
+                      </a:endParaRPr>
+                    </a:p>
+                  </a:txBody>
+                  <a:tcPr marL="91425" marR="91425" marT="91425" marB="91425">
+                    <a:solidFill>
+                      <a:srgbClr val="CCCCCC"/>
+                    </a:solidFill>
+                  </a:tcPr>
+                </a:tc>
+                <a:tc>
+                  <a:txBody>
+                    <a:bodyPr/>
+                    <a:lstStyle/>
+                    <a:p>
+                      <a:pPr marL="0" lvl="0" indent="0" algn="l" rtl="0">
+                        <a:spcBef>
+                          <a:spcPts val="0"/>
+                        </a:spcBef>
+                        <a:spcAft>
+                          <a:spcPts val="0"/>
+                        </a:spcAft>
+                        <a:buNone/>
+                      </a:pPr>
+                      <a:r>
+                        <a:rPr lang="en" sz="1600" b="1" dirty="0">
+                          <a:latin typeface="Avenir Next LT Pro" panose="020B0504020202020204" pitchFamily="34" charset="0"/>
+                        </a:rPr>
+                        <a:t>Expected Values</a:t>
+                      </a:r>
+                      <a:endParaRPr sz="1600" b="1" dirty="0">
+                        <a:latin typeface="Avenir Next LT Pro" panose="020B0504020202020204" pitchFamily="34" charset="0"/>
+                      </a:endParaRPr>
+                    </a:p>
+                  </a:txBody>
+                  <a:tcPr marL="91425" marR="91425" marT="91425" marB="91425">
+                    <a:solidFill>
+                      <a:srgbClr val="CCCCCC"/>
+                    </a:solidFill>
+                  </a:tcPr>
+                </a:tc>
+                <a:extLst>
+                  <a:ext uri="{0D108BD9-81ED-4DB2-BD59-A6C34878D82A}">
+                    <a16:rowId xmlns:a16="http://schemas.microsoft.com/office/drawing/2014/main" val="10000"/>
+                  </a:ext>
+                </a:extLst>
+              </a:tr>
+              <a:tr h="396200">
+                <a:tc>
+                  <a:txBody>
+                    <a:bodyPr/>
+                    <a:lstStyle/>
+                    <a:p>
+                      <a:pPr marL="0" lvl="0" indent="0" algn="l" rtl="0">
+                        <a:spcBef>
+                          <a:spcPts val="0"/>
+                        </a:spcBef>
+                        <a:spcAft>
+                          <a:spcPts val="0"/>
+                        </a:spcAft>
+                        <a:buNone/>
+                      </a:pPr>
+                      <a:r>
+                        <a:rPr lang="en-NZ" sz="1600" dirty="0">
+                          <a:latin typeface="Avenir Next LT Pro" panose="020B0504020202020204" pitchFamily="34" charset="0"/>
+                        </a:rPr>
+                        <a:t>Input name</a:t>
+                      </a:r>
+                    </a:p>
+                    <a:p>
+                      <a:pPr marL="0" lvl="0" indent="0" algn="l" rtl="0">
+                        <a:spcBef>
+                          <a:spcPts val="0"/>
+                        </a:spcBef>
+                        <a:spcAft>
+                          <a:spcPts val="0"/>
+                        </a:spcAft>
+                        <a:buNone/>
+                      </a:pPr>
+                      <a:r>
+                        <a:rPr lang="en-NZ" sz="1600" dirty="0">
+                          <a:latin typeface="Avenir Next LT Pro" panose="020B0504020202020204" pitchFamily="34" charset="0"/>
+                        </a:rPr>
+                        <a:t>Input phone number</a:t>
+                      </a:r>
+                    </a:p>
+                    <a:p>
+                      <a:pPr marL="0" lvl="0" indent="0" algn="l" rtl="0">
+                        <a:spcBef>
+                          <a:spcPts val="0"/>
+                        </a:spcBef>
+                        <a:spcAft>
+                          <a:spcPts val="0"/>
+                        </a:spcAft>
+                        <a:buNone/>
+                      </a:pPr>
+                      <a:r>
+                        <a:rPr lang="en-NZ" sz="1600" dirty="0">
+                          <a:latin typeface="Avenir Next LT Pro" panose="020B0504020202020204" pitchFamily="34" charset="0"/>
+                        </a:rPr>
+                        <a:t>Left input blank</a:t>
+                      </a:r>
+                      <a:endParaRPr sz="1600" dirty="0">
+                        <a:latin typeface="Avenir Next LT Pro" panose="020B0504020202020204" pitchFamily="34" charset="0"/>
+                      </a:endParaRPr>
+                    </a:p>
+                  </a:txBody>
+                  <a:tcPr marL="91425" marR="91425" marT="91425" marB="91425"/>
+                </a:tc>
+                <a:tc>
+                  <a:txBody>
+                    <a:bodyPr/>
+                    <a:lstStyle/>
+                    <a:p>
+                      <a:pPr marL="0" lvl="0" indent="0" algn="l" rtl="0">
+                        <a:spcBef>
+                          <a:spcPts val="0"/>
+                        </a:spcBef>
+                        <a:spcAft>
+                          <a:spcPts val="0"/>
+                        </a:spcAft>
+                        <a:buNone/>
+                      </a:pPr>
+                      <a:r>
+                        <a:rPr lang="en-GB" sz="1600" dirty="0">
+                          <a:latin typeface="Avenir Next LT Pro" panose="020B0504020202020204" pitchFamily="34" charset="0"/>
+                        </a:rPr>
+                        <a:t>Printed name correctly</a:t>
+                      </a:r>
+                    </a:p>
+                    <a:p>
+                      <a:pPr marL="0" lvl="0" indent="0" algn="l" rtl="0">
+                        <a:spcBef>
+                          <a:spcPts val="0"/>
+                        </a:spcBef>
+                        <a:spcAft>
+                          <a:spcPts val="0"/>
+                        </a:spcAft>
+                        <a:buNone/>
+                      </a:pPr>
+                      <a:r>
+                        <a:rPr lang="en-GB" sz="1600" dirty="0">
+                          <a:latin typeface="Avenir Next LT Pro" panose="020B0504020202020204" pitchFamily="34" charset="0"/>
+                        </a:rPr>
+                        <a:t>Printed phone number correctly </a:t>
+                      </a:r>
+                    </a:p>
+                    <a:p>
+                      <a:pPr marL="0" lvl="0" indent="0" algn="l" rtl="0">
+                        <a:spcBef>
+                          <a:spcPts val="0"/>
+                        </a:spcBef>
+                        <a:spcAft>
+                          <a:spcPts val="0"/>
+                        </a:spcAft>
+                        <a:buNone/>
+                      </a:pPr>
+                      <a:r>
+                        <a:rPr lang="en-GB" sz="1600" dirty="0">
+                          <a:latin typeface="Avenir Next LT Pro" panose="020B0504020202020204" pitchFamily="34" charset="0"/>
+                        </a:rPr>
+                        <a:t>Prints “Sorry this cannot be blank” – goes back to input</a:t>
+                      </a:r>
+                    </a:p>
+                  </a:txBody>
+                  <a:tcPr marL="91425" marR="91425" marT="91425" marB="91425"/>
+                </a:tc>
+                <a:extLst>
+                  <a:ext uri="{0D108BD9-81ED-4DB2-BD59-A6C34878D82A}">
+                    <a16:rowId xmlns:a16="http://schemas.microsoft.com/office/drawing/2014/main" val="10001"/>
+                  </a:ext>
+                </a:extLst>
+              </a:tr>
+            </a:tbl>
+          </a:graphicData>
+        </a:graphic>
+      </p:graphicFrame>
+      <p:pic>
+        <p:nvPicPr>
+          <p:cNvPr id="5" name="Picture 4">
+            <a:extLst>
+              <a:ext uri="{FF2B5EF4-FFF2-40B4-BE49-F238E27FC236}">
+                <a16:creationId xmlns:a16="http://schemas.microsoft.com/office/drawing/2014/main" id="{E202F360-6A3B-4185-BBAD-D1C35923C743}"/>
+              </a:ext>
+            </a:extLst>
+          </p:cNvPr>
+          <p:cNvPicPr>
+            <a:picLocks noChangeAspect="1"/>
+          </p:cNvPicPr>
+          <p:nvPr/>
+        </p:nvPicPr>
+        <p:blipFill>
+          <a:blip r:embed="rId4"/>
+          <a:stretch>
+            <a:fillRect/>
+          </a:stretch>
+        </p:blipFill>
+        <p:spPr>
+          <a:xfrm>
+            <a:off x="967739" y="761509"/>
+            <a:ext cx="3116581" cy="2637890"/>
+          </a:xfrm>
+          <a:prstGeom prst="rect">
+            <a:avLst/>
+          </a:prstGeom>
+        </p:spPr>
+      </p:pic>
+      <p:pic>
+        <p:nvPicPr>
+          <p:cNvPr id="8" name="Picture 7">
+            <a:extLst>
+              <a:ext uri="{FF2B5EF4-FFF2-40B4-BE49-F238E27FC236}">
+                <a16:creationId xmlns:a16="http://schemas.microsoft.com/office/drawing/2014/main" id="{E054E55D-F167-4A16-8A70-9C96FDC7566B}"/>
+              </a:ext>
+            </a:extLst>
+          </p:cNvPr>
+          <p:cNvPicPr>
+            <a:picLocks noChangeAspect="1"/>
+          </p:cNvPicPr>
+          <p:nvPr/>
+        </p:nvPicPr>
+        <p:blipFill>
+          <a:blip r:embed="rId5"/>
+          <a:stretch>
+            <a:fillRect/>
+          </a:stretch>
+        </p:blipFill>
+        <p:spPr>
+          <a:xfrm>
+            <a:off x="5059682" y="882925"/>
+            <a:ext cx="2795952" cy="2415054"/>
+          </a:xfrm>
+          <a:prstGeom prst="rect">
+            <a:avLst/>
+          </a:prstGeom>
+        </p:spPr>
+      </p:pic>
+    </p:spTree>
+    <p:extLst>
+      <p:ext uri="{BB962C8B-B14F-4D97-AF65-F5344CB8AC3E}">
+        <p14:creationId xmlns:p14="http://schemas.microsoft.com/office/powerpoint/2010/main" val="1238541858"/>
+      </p:ext>
+    </p:extLst>
+  </p:cSld>
+  <p:clrMapOvr>
+    <a:masterClrMapping/>
+  </p:clrMapOvr>
+</p:sld>
+</file>
+
+<file path=ppt/slides/slide34.xml><?xml version="1.0" encoding="utf-8"?>
+<p:sld xmlns:a="http://schemas.openxmlformats.org/drawingml/2006/main" xmlns:r="http://schemas.openxmlformats.org/officeDocument/2006/relationships" xmlns:p="http://schemas.openxmlformats.org/presentationml/2006/main">
+  <p:cSld>
+    <p:bg>
+      <p:bgPr>
+        <a:solidFill>
+          <a:srgbClr val="D9EAD3"/>
+        </a:solidFill>
+        <a:effectLst/>
+      </p:bgPr>
+    </p:bg>
+    <p:spTree>
+      <p:nvGrpSpPr>
+        <p:cNvPr id="1" name="Shape 72"/>
+        <p:cNvGrpSpPr/>
+        <p:nvPr/>
+      </p:nvGrpSpPr>
+      <p:grpSpPr>
+        <a:xfrm>
+          <a:off x="0" y="0"/>
+          <a:ext cx="0" cy="0"/>
+          <a:chOff x="0" y="0"/>
+          <a:chExt cx="0" cy="0"/>
+        </a:xfrm>
+      </p:grpSpPr>
+      <p:pic>
+        <p:nvPicPr>
+          <p:cNvPr id="3" name="Picture 2">
+            <a:extLst>
+              <a:ext uri="{FF2B5EF4-FFF2-40B4-BE49-F238E27FC236}">
+                <a16:creationId xmlns:a16="http://schemas.microsoft.com/office/drawing/2014/main" id="{56BED5EB-EF3D-4AC9-8995-621CB5CA184A}"/>
+              </a:ext>
+            </a:extLst>
+          </p:cNvPr>
+          <p:cNvPicPr>
+            <a:picLocks noChangeAspect="1"/>
+          </p:cNvPicPr>
+          <p:nvPr/>
+        </p:nvPicPr>
+        <p:blipFill>
+          <a:blip r:embed="rId3"/>
+          <a:stretch>
+            <a:fillRect/>
+          </a:stretch>
+        </p:blipFill>
+        <p:spPr>
+          <a:xfrm>
+            <a:off x="0" y="6680"/>
+            <a:ext cx="9144000" cy="5130140"/>
+          </a:xfrm>
+          <a:prstGeom prst="rect">
+            <a:avLst/>
+          </a:prstGeom>
+        </p:spPr>
+      </p:pic>
+      <p:sp>
+        <p:nvSpPr>
+          <p:cNvPr id="73" name="Google Shape;73;p16"/>
+          <p:cNvSpPr txBox="1">
+            <a:spLocks noGrp="1"/>
+          </p:cNvSpPr>
+          <p:nvPr>
+            <p:ph type="title"/>
+          </p:nvPr>
+        </p:nvSpPr>
+        <p:spPr>
+          <a:xfrm>
+            <a:off x="205020" y="231665"/>
+            <a:ext cx="8520600" cy="572700"/>
+          </a:xfrm>
+          <a:prstGeom prst="rect">
+            <a:avLst/>
+          </a:prstGeom>
+        </p:spPr>
+        <p:txBody>
+          <a:bodyPr spcFirstLastPara="1" wrap="square" lIns="91425" tIns="91425" rIns="91425" bIns="91425" anchor="t" anchorCtr="0">
+            <a:noAutofit/>
+          </a:bodyPr>
+          <a:lstStyle/>
+          <a:p>
+            <a:pPr marL="0" lvl="0" indent="0" rtl="0">
+              <a:spcBef>
+                <a:spcPts val="0"/>
+              </a:spcBef>
+              <a:spcAft>
+                <a:spcPts val="0"/>
+              </a:spcAft>
+              <a:buNone/>
+            </a:pPr>
+            <a:r>
+              <a:rPr lang="en" b="1" dirty="0">
+                <a:latin typeface="Avenir Next LT Pro" panose="020B0504020202020204" pitchFamily="34" charset="0"/>
+              </a:rPr>
+              <a:t>Component 3 Version 4 (Trello screenshot)</a:t>
+            </a:r>
+            <a:endParaRPr b="1" dirty="0">
+              <a:latin typeface="Avenir Next LT Pro" panose="020B0504020202020204" pitchFamily="34" charset="0"/>
+            </a:endParaRPr>
+          </a:p>
+        </p:txBody>
+      </p:sp>
+      <p:pic>
+        <p:nvPicPr>
+          <p:cNvPr id="4" name="Picture 3">
+            <a:extLst>
+              <a:ext uri="{FF2B5EF4-FFF2-40B4-BE49-F238E27FC236}">
+                <a16:creationId xmlns:a16="http://schemas.microsoft.com/office/drawing/2014/main" id="{D2DF2D7B-5223-4665-B861-66F652CE367B}"/>
+              </a:ext>
+            </a:extLst>
+          </p:cNvPr>
+          <p:cNvPicPr>
+            <a:picLocks noChangeAspect="1"/>
+          </p:cNvPicPr>
+          <p:nvPr/>
+        </p:nvPicPr>
+        <p:blipFill>
+          <a:blip r:embed="rId4"/>
+          <a:stretch>
+            <a:fillRect/>
+          </a:stretch>
+        </p:blipFill>
+        <p:spPr>
+          <a:xfrm>
+            <a:off x="655320" y="1029350"/>
+            <a:ext cx="7620000" cy="3516398"/>
+          </a:xfrm>
+          <a:prstGeom prst="rect">
+            <a:avLst/>
+          </a:prstGeom>
+        </p:spPr>
+      </p:pic>
+    </p:spTree>
+    <p:extLst>
+      <p:ext uri="{BB962C8B-B14F-4D97-AF65-F5344CB8AC3E}">
+        <p14:creationId xmlns:p14="http://schemas.microsoft.com/office/powerpoint/2010/main" val="2496680009"/>
+      </p:ext>
+    </p:extLst>
+  </p:cSld>
+  <p:clrMapOvr>
+    <a:masterClrMapping/>
+  </p:clrMapOvr>
+</p:sld>
+</file>
+
+<file path=ppt/slides/slide35.xml><?xml version="1.0" encoding="utf-8"?>
+<p:sld xmlns:a="http://schemas.openxmlformats.org/drawingml/2006/main" xmlns:r="http://schemas.openxmlformats.org/officeDocument/2006/relationships" xmlns:p="http://schemas.openxmlformats.org/presentationml/2006/main">
+  <p:cSld>
+    <p:spTree>
+      <p:nvGrpSpPr>
+        <p:cNvPr id="1" name="Shape 77"/>
+        <p:cNvGrpSpPr/>
+        <p:nvPr/>
+      </p:nvGrpSpPr>
+      <p:grpSpPr>
+        <a:xfrm>
+          <a:off x="0" y="0"/>
+          <a:ext cx="0" cy="0"/>
+          <a:chOff x="0" y="0"/>
+          <a:chExt cx="0" cy="0"/>
+        </a:xfrm>
+      </p:grpSpPr>
+      <p:pic>
+        <p:nvPicPr>
+          <p:cNvPr id="4" name="Picture 3">
+            <a:extLst>
+              <a:ext uri="{FF2B5EF4-FFF2-40B4-BE49-F238E27FC236}">
+                <a16:creationId xmlns:a16="http://schemas.microsoft.com/office/drawing/2014/main" id="{446BBD1D-F3F0-49A6-9D34-8F3222CF8E18}"/>
+              </a:ext>
+            </a:extLst>
+          </p:cNvPr>
+          <p:cNvPicPr>
+            <a:picLocks noChangeAspect="1"/>
+          </p:cNvPicPr>
+          <p:nvPr/>
+        </p:nvPicPr>
+        <p:blipFill>
+          <a:blip r:embed="rId3"/>
+          <a:stretch>
+            <a:fillRect/>
+          </a:stretch>
+        </p:blipFill>
+        <p:spPr>
+          <a:xfrm>
+            <a:off x="0" y="0"/>
+            <a:ext cx="9144000" cy="5132080"/>
+          </a:xfrm>
+          <a:prstGeom prst="rect">
+            <a:avLst/>
+          </a:prstGeom>
+        </p:spPr>
+      </p:pic>
+      <p:sp>
+        <p:nvSpPr>
+          <p:cNvPr id="78" name="Google Shape;78;p17"/>
+          <p:cNvSpPr txBox="1">
+            <a:spLocks noGrp="1"/>
+          </p:cNvSpPr>
+          <p:nvPr>
+            <p:ph type="title"/>
+          </p:nvPr>
+        </p:nvSpPr>
+        <p:spPr>
+          <a:xfrm>
+            <a:off x="311700" y="208805"/>
+            <a:ext cx="8520600" cy="572700"/>
+          </a:xfrm>
+          <a:prstGeom prst="rect">
+            <a:avLst/>
+          </a:prstGeom>
+        </p:spPr>
+        <p:txBody>
+          <a:bodyPr spcFirstLastPara="1" wrap="square" lIns="91425" tIns="91425" rIns="91425" bIns="91425" anchor="t" anchorCtr="0">
+            <a:noAutofit/>
+          </a:bodyPr>
+          <a:lstStyle/>
+          <a:p>
+            <a:pPr marL="0" lvl="0" indent="0" algn="l" rtl="0">
+              <a:spcBef>
+                <a:spcPts val="0"/>
+              </a:spcBef>
+              <a:spcAft>
+                <a:spcPts val="0"/>
+              </a:spcAft>
+              <a:buNone/>
+            </a:pPr>
+            <a:r>
+              <a:rPr lang="en" b="1" dirty="0">
+                <a:latin typeface="Avenir Next LT Pro" panose="020B0504020202020204" pitchFamily="34" charset="0"/>
+              </a:rPr>
+              <a:t>Component 3 Version 4 - Test Plan</a:t>
+            </a:r>
+            <a:endParaRPr b="1" dirty="0">
+              <a:latin typeface="Avenir Next LT Pro" panose="020B0504020202020204" pitchFamily="34" charset="0"/>
+            </a:endParaRPr>
+          </a:p>
+        </p:txBody>
+      </p:sp>
+      <p:graphicFrame>
+        <p:nvGraphicFramePr>
+          <p:cNvPr id="79" name="Google Shape;79;p17"/>
+          <p:cNvGraphicFramePr/>
+          <p:nvPr>
+            <p:extLst>
+              <p:ext uri="{D42A27DB-BD31-4B8C-83A1-F6EECF244321}">
+                <p14:modId xmlns:p14="http://schemas.microsoft.com/office/powerpoint/2010/main" val="3673167819"/>
+              </p:ext>
+            </p:extLst>
+          </p:nvPr>
+        </p:nvGraphicFramePr>
+        <p:xfrm>
+          <a:off x="311700" y="3459513"/>
+          <a:ext cx="8520600" cy="1462980"/>
+        </p:xfrm>
+        <a:graphic>
+          <a:graphicData uri="http://schemas.openxmlformats.org/drawingml/2006/table">
+            <a:tbl>
+              <a:tblPr>
+                <a:noFill/>
+                <a:tableStyleId>{E1099E06-0E6B-448D-9D27-60429F06E6F4}</a:tableStyleId>
+              </a:tblPr>
+              <a:tblGrid>
+                <a:gridCol w="4260300">
+                  <a:extLst>
+                    <a:ext uri="{9D8B030D-6E8A-4147-A177-3AD203B41FA5}">
+                      <a16:colId xmlns:a16="http://schemas.microsoft.com/office/drawing/2014/main" val="20000"/>
+                    </a:ext>
+                  </a:extLst>
+                </a:gridCol>
+                <a:gridCol w="4260300">
+                  <a:extLst>
+                    <a:ext uri="{9D8B030D-6E8A-4147-A177-3AD203B41FA5}">
+                      <a16:colId xmlns:a16="http://schemas.microsoft.com/office/drawing/2014/main" val="20001"/>
+                    </a:ext>
+                  </a:extLst>
+                </a:gridCol>
+              </a:tblGrid>
+              <a:tr h="381000">
+                <a:tc>
+                  <a:txBody>
+                    <a:bodyPr/>
+                    <a:lstStyle/>
+                    <a:p>
+                      <a:pPr marL="0" lvl="0" indent="0" algn="l" rtl="0">
+                        <a:spcBef>
+                          <a:spcPts val="0"/>
+                        </a:spcBef>
+                        <a:spcAft>
+                          <a:spcPts val="0"/>
+                        </a:spcAft>
+                        <a:buNone/>
+                      </a:pPr>
+                      <a:r>
+                        <a:rPr lang="en" sz="1600" b="1" dirty="0">
+                          <a:latin typeface="Avenir Next LT Pro" panose="020B0504020202020204" pitchFamily="34" charset="0"/>
+                        </a:rPr>
+                        <a:t>Test Case</a:t>
+                      </a:r>
+                      <a:endParaRPr sz="1600" b="1" dirty="0">
+                        <a:latin typeface="Avenir Next LT Pro" panose="020B0504020202020204" pitchFamily="34" charset="0"/>
+                      </a:endParaRPr>
+                    </a:p>
+                  </a:txBody>
+                  <a:tcPr marL="91425" marR="91425" marT="91425" marB="91425">
+                    <a:solidFill>
+                      <a:srgbClr val="CCCCCC"/>
+                    </a:solidFill>
+                  </a:tcPr>
+                </a:tc>
+                <a:tc>
+                  <a:txBody>
+                    <a:bodyPr/>
+                    <a:lstStyle/>
+                    <a:p>
+                      <a:pPr marL="0" lvl="0" indent="0" algn="l" rtl="0">
+                        <a:spcBef>
+                          <a:spcPts val="0"/>
+                        </a:spcBef>
+                        <a:spcAft>
+                          <a:spcPts val="0"/>
+                        </a:spcAft>
+                        <a:buNone/>
+                      </a:pPr>
+                      <a:r>
+                        <a:rPr lang="en" sz="1600" b="1" dirty="0">
+                          <a:latin typeface="Avenir Next LT Pro" panose="020B0504020202020204" pitchFamily="34" charset="0"/>
+                        </a:rPr>
+                        <a:t>Expected Values</a:t>
+                      </a:r>
+                      <a:endParaRPr sz="1600" b="1" dirty="0">
+                        <a:latin typeface="Avenir Next LT Pro" panose="020B0504020202020204" pitchFamily="34" charset="0"/>
+                      </a:endParaRPr>
+                    </a:p>
+                  </a:txBody>
+                  <a:tcPr marL="91425" marR="91425" marT="91425" marB="91425">
+                    <a:solidFill>
+                      <a:srgbClr val="CCCCCC"/>
+                    </a:solidFill>
+                  </a:tcPr>
+                </a:tc>
+                <a:extLst>
+                  <a:ext uri="{0D108BD9-81ED-4DB2-BD59-A6C34878D82A}">
+                    <a16:rowId xmlns:a16="http://schemas.microsoft.com/office/drawing/2014/main" val="10000"/>
+                  </a:ext>
+                </a:extLst>
+              </a:tr>
+              <a:tr h="396200">
+                <a:tc>
+                  <a:txBody>
+                    <a:bodyPr/>
+                    <a:lstStyle/>
+                    <a:p>
+                      <a:pPr marL="0" lvl="0" indent="0" algn="l" rtl="0">
+                        <a:spcBef>
+                          <a:spcPts val="0"/>
+                        </a:spcBef>
+                        <a:spcAft>
+                          <a:spcPts val="0"/>
+                        </a:spcAft>
+                        <a:buNone/>
+                      </a:pPr>
+                      <a:r>
+                        <a:rPr lang="en-NZ" sz="1800" dirty="0">
+                          <a:latin typeface="Avenir Next LT Pro" panose="020B0504020202020204" pitchFamily="34" charset="0"/>
+                        </a:rPr>
+                        <a:t>Input name</a:t>
+                      </a:r>
+                    </a:p>
+                    <a:p>
+                      <a:pPr marL="0" lvl="0" indent="0" algn="l" rtl="0">
+                        <a:spcBef>
+                          <a:spcPts val="0"/>
+                        </a:spcBef>
+                        <a:spcAft>
+                          <a:spcPts val="0"/>
+                        </a:spcAft>
+                        <a:buNone/>
+                      </a:pPr>
+                      <a:r>
+                        <a:rPr lang="en-NZ" sz="1800" dirty="0">
+                          <a:latin typeface="Avenir Next LT Pro" panose="020B0504020202020204" pitchFamily="34" charset="0"/>
+                        </a:rPr>
+                        <a:t>Input phone number</a:t>
+                      </a:r>
+                    </a:p>
+                    <a:p>
+                      <a:pPr marL="0" lvl="0" indent="0" algn="l" rtl="0">
+                        <a:spcBef>
+                          <a:spcPts val="0"/>
+                        </a:spcBef>
+                        <a:spcAft>
+                          <a:spcPts val="0"/>
+                        </a:spcAft>
+                        <a:buNone/>
+                      </a:pPr>
+                      <a:r>
+                        <a:rPr lang="en-NZ" sz="1800" dirty="0">
+                          <a:latin typeface="Avenir Next LT Pro" panose="020B0504020202020204" pitchFamily="34" charset="0"/>
+                        </a:rPr>
+                        <a:t>Left input blank</a:t>
+                      </a:r>
+                      <a:endParaRPr sz="1800" dirty="0">
+                        <a:latin typeface="Avenir Next LT Pro" panose="020B0504020202020204" pitchFamily="34" charset="0"/>
+                      </a:endParaRPr>
+                    </a:p>
+                  </a:txBody>
+                  <a:tcPr marL="91425" marR="91425" marT="91425" marB="91425"/>
+                </a:tc>
+                <a:tc>
+                  <a:txBody>
+                    <a:bodyPr/>
+                    <a:lstStyle/>
+                    <a:p>
+                      <a:pPr marL="0" lvl="0" indent="0" algn="l" rtl="0">
+                        <a:spcBef>
+                          <a:spcPts val="0"/>
+                        </a:spcBef>
+                        <a:spcAft>
+                          <a:spcPts val="0"/>
+                        </a:spcAft>
+                        <a:buNone/>
+                      </a:pPr>
+                      <a:r>
+                        <a:rPr lang="en-NZ" sz="1400" dirty="0">
+                          <a:latin typeface="Avenir Next LT Pro" panose="020B0504020202020204" pitchFamily="34" charset="0"/>
+                        </a:rPr>
+                        <a:t>Printed name correctly</a:t>
+                      </a:r>
+                    </a:p>
+                    <a:p>
+                      <a:pPr marL="0" lvl="0" indent="0" algn="l" rtl="0">
+                        <a:spcBef>
+                          <a:spcPts val="0"/>
+                        </a:spcBef>
+                        <a:spcAft>
+                          <a:spcPts val="0"/>
+                        </a:spcAft>
+                        <a:buNone/>
+                      </a:pPr>
+                      <a:r>
+                        <a:rPr lang="en-NZ" sz="1400" dirty="0">
+                          <a:latin typeface="Avenir Next LT Pro" panose="020B0504020202020204" pitchFamily="34" charset="0"/>
+                        </a:rPr>
+                        <a:t>Printed phone number correctly </a:t>
+                      </a:r>
+                    </a:p>
+                    <a:p>
+                      <a:pPr marL="0" lvl="0" indent="0" algn="l" rtl="0">
+                        <a:spcBef>
+                          <a:spcPts val="0"/>
+                        </a:spcBef>
+                        <a:spcAft>
+                          <a:spcPts val="0"/>
+                        </a:spcAft>
+                        <a:buNone/>
+                      </a:pPr>
+                      <a:r>
+                        <a:rPr lang="en-NZ" sz="1400" dirty="0">
+                          <a:latin typeface="Avenir Next LT Pro" panose="020B0504020202020204" pitchFamily="34" charset="0"/>
+                        </a:rPr>
+                        <a:t>Prints “Sorry this cannot be blank” – goes back to input</a:t>
+                      </a:r>
+                      <a:endParaRPr sz="1400" dirty="0">
+                        <a:latin typeface="Avenir Next LT Pro" panose="020B0504020202020204" pitchFamily="34" charset="0"/>
+                      </a:endParaRPr>
+                    </a:p>
+                  </a:txBody>
+                  <a:tcPr marL="91425" marR="91425" marT="91425" marB="91425"/>
+                </a:tc>
+                <a:extLst>
+                  <a:ext uri="{0D108BD9-81ED-4DB2-BD59-A6C34878D82A}">
+                    <a16:rowId xmlns:a16="http://schemas.microsoft.com/office/drawing/2014/main" val="10001"/>
+                  </a:ext>
+                </a:extLst>
+              </a:tr>
+            </a:tbl>
+          </a:graphicData>
+        </a:graphic>
+      </p:graphicFrame>
+      <p:pic>
+        <p:nvPicPr>
+          <p:cNvPr id="3" name="Picture 2">
+            <a:extLst>
+              <a:ext uri="{FF2B5EF4-FFF2-40B4-BE49-F238E27FC236}">
+                <a16:creationId xmlns:a16="http://schemas.microsoft.com/office/drawing/2014/main" id="{93444810-A5E9-47CF-A86E-AEB3E19BD18F}"/>
+              </a:ext>
+            </a:extLst>
+          </p:cNvPr>
+          <p:cNvPicPr>
+            <a:picLocks noChangeAspect="1"/>
+          </p:cNvPicPr>
+          <p:nvPr/>
+        </p:nvPicPr>
+        <p:blipFill>
+          <a:blip r:embed="rId4"/>
+          <a:stretch>
+            <a:fillRect/>
+          </a:stretch>
+        </p:blipFill>
+        <p:spPr>
+          <a:xfrm>
+            <a:off x="1439472" y="781505"/>
+            <a:ext cx="2435664" cy="2609226"/>
+          </a:xfrm>
+          <a:prstGeom prst="rect">
+            <a:avLst/>
+          </a:prstGeom>
+        </p:spPr>
+      </p:pic>
+      <p:pic>
+        <p:nvPicPr>
+          <p:cNvPr id="6" name="Picture 5">
+            <a:extLst>
+              <a:ext uri="{FF2B5EF4-FFF2-40B4-BE49-F238E27FC236}">
+                <a16:creationId xmlns:a16="http://schemas.microsoft.com/office/drawing/2014/main" id="{F8B9E961-B803-434E-B8DD-A98ABD2ABB3C}"/>
+              </a:ext>
+            </a:extLst>
+          </p:cNvPr>
+          <p:cNvPicPr>
+            <a:picLocks noChangeAspect="1"/>
+          </p:cNvPicPr>
+          <p:nvPr/>
+        </p:nvPicPr>
+        <p:blipFill>
+          <a:blip r:embed="rId5"/>
+          <a:stretch>
+            <a:fillRect/>
+          </a:stretch>
+        </p:blipFill>
+        <p:spPr>
+          <a:xfrm>
+            <a:off x="4186836" y="1530282"/>
+            <a:ext cx="3610431" cy="1225972"/>
+          </a:xfrm>
+          <a:prstGeom prst="rect">
+            <a:avLst/>
+          </a:prstGeom>
+        </p:spPr>
+      </p:pic>
+    </p:spTree>
+    <p:extLst>
+      <p:ext uri="{BB962C8B-B14F-4D97-AF65-F5344CB8AC3E}">
+        <p14:creationId xmlns:p14="http://schemas.microsoft.com/office/powerpoint/2010/main" val="640402831"/>
+      </p:ext>
+    </p:extLst>
+  </p:cSld>
+  <p:clrMapOvr>
+    <a:masterClrMapping/>
+  </p:clrMapOvr>
+</p:sld>
+</file>
+
+<file path=ppt/slides/slide36.xml><?xml version="1.0" encoding="utf-8"?>
+<p:sld xmlns:a="http://schemas.openxmlformats.org/drawingml/2006/main" xmlns:r="http://schemas.openxmlformats.org/officeDocument/2006/relationships" xmlns:p="http://schemas.openxmlformats.org/presentationml/2006/main">
+  <p:cSld>
+    <p:bg>
+      <p:bgPr>
+        <a:solidFill>
+          <a:srgbClr val="D9EAD3"/>
+        </a:solidFill>
+        <a:effectLst/>
+      </p:bgPr>
+    </p:bg>
+    <p:spTree>
+      <p:nvGrpSpPr>
+        <p:cNvPr id="1" name="Shape 72"/>
+        <p:cNvGrpSpPr/>
+        <p:nvPr/>
+      </p:nvGrpSpPr>
+      <p:grpSpPr>
+        <a:xfrm>
+          <a:off x="0" y="0"/>
+          <a:ext cx="0" cy="0"/>
+          <a:chOff x="0" y="0"/>
+          <a:chExt cx="0" cy="0"/>
+        </a:xfrm>
+      </p:grpSpPr>
       <p:sp>
         <p:nvSpPr>
           <p:cNvPr id="73" name="Google Shape;73;p16"/>
@@ -15903,7 +17608,7 @@
 </p:sld>
 </file>
 
-<file path=ppt/slides/slide33.xml><?xml version="1.0" encoding="utf-8"?>
+<file path=ppt/slides/slide37.xml><?xml version="1.0" encoding="utf-8"?>
 <p:sld xmlns:a="http://schemas.openxmlformats.org/drawingml/2006/main" xmlns:r="http://schemas.openxmlformats.org/officeDocument/2006/relationships" xmlns:p="http://schemas.openxmlformats.org/presentationml/2006/main">
   <p:cSld>
     <p:spTree>
@@ -16118,7 +17823,7 @@
 </p:sld>
 </file>
 
-<file path=ppt/slides/slide34.xml><?xml version="1.0" encoding="utf-8"?>
+<file path=ppt/slides/slide38.xml><?xml version="1.0" encoding="utf-8"?>
 <p:sld xmlns:a="http://schemas.openxmlformats.org/drawingml/2006/main" xmlns:r="http://schemas.openxmlformats.org/officeDocument/2006/relationships" xmlns:p="http://schemas.openxmlformats.org/presentationml/2006/main">
   <p:cSld>
     <p:bg>
@@ -16198,7 +17903,7 @@
 </p:sld>
 </file>
 
-<file path=ppt/slides/slide35.xml><?xml version="1.0" encoding="utf-8"?>
+<file path=ppt/slides/slide39.xml><?xml version="1.0" encoding="utf-8"?>
 <p:sld xmlns:a="http://schemas.openxmlformats.org/drawingml/2006/main" xmlns:r="http://schemas.openxmlformats.org/officeDocument/2006/relationships" xmlns:p="http://schemas.openxmlformats.org/presentationml/2006/main">
   <p:cSld>
     <p:spTree>
@@ -16413,7 +18118,440 @@
 </p:sld>
 </file>
 
-<file path=ppt/slides/slide36.xml><?xml version="1.0" encoding="utf-8"?>
+<file path=ppt/slides/slide4.xml><?xml version="1.0" encoding="utf-8"?>
+<p:sld xmlns:a="http://schemas.openxmlformats.org/drawingml/2006/main" xmlns:r="http://schemas.openxmlformats.org/officeDocument/2006/relationships" xmlns:p="http://schemas.openxmlformats.org/presentationml/2006/main">
+  <p:cSld>
+    <p:bg>
+      <p:bgPr>
+        <a:solidFill>
+          <a:srgbClr val="FFCC66"/>
+        </a:solidFill>
+        <a:effectLst/>
+      </p:bgPr>
+    </p:bg>
+    <p:spTree>
+      <p:nvGrpSpPr>
+        <p:cNvPr id="1" name=""/>
+        <p:cNvGrpSpPr/>
+        <p:nvPr/>
+      </p:nvGrpSpPr>
+      <p:grpSpPr>
+        <a:xfrm>
+          <a:off x="0" y="0"/>
+          <a:ext cx="0" cy="0"/>
+          <a:chOff x="0" y="0"/>
+          <a:chExt cx="0" cy="0"/>
+        </a:xfrm>
+      </p:grpSpPr>
+      <p:pic>
+        <p:nvPicPr>
+          <p:cNvPr id="5" name="Picture 4">
+            <a:extLst>
+              <a:ext uri="{FF2B5EF4-FFF2-40B4-BE49-F238E27FC236}">
+                <a16:creationId xmlns:a16="http://schemas.microsoft.com/office/drawing/2014/main" id="{EF76006E-0344-432C-AA65-FCECC8B8622C}"/>
+              </a:ext>
+            </a:extLst>
+          </p:cNvPr>
+          <p:cNvPicPr>
+            <a:picLocks noChangeAspect="1"/>
+          </p:cNvPicPr>
+          <p:nvPr/>
+        </p:nvPicPr>
+        <p:blipFill>
+          <a:blip r:embed="rId2"/>
+          <a:stretch>
+            <a:fillRect/>
+          </a:stretch>
+        </p:blipFill>
+        <p:spPr>
+          <a:xfrm>
+            <a:off x="0" y="10161"/>
+            <a:ext cx="9144000" cy="5123178"/>
+          </a:xfrm>
+          <a:prstGeom prst="rect">
+            <a:avLst/>
+          </a:prstGeom>
+        </p:spPr>
+      </p:pic>
+      <p:sp>
+        <p:nvSpPr>
+          <p:cNvPr id="3" name="Text Placeholder 2">
+            <a:extLst>
+              <a:ext uri="{FF2B5EF4-FFF2-40B4-BE49-F238E27FC236}">
+                <a16:creationId xmlns:a16="http://schemas.microsoft.com/office/drawing/2014/main" id="{1EB42CE1-67BF-466B-8C2C-7F21A8892B1E}"/>
+              </a:ext>
+            </a:extLst>
+          </p:cNvPr>
+          <p:cNvSpPr>
+            <a:spLocks noGrp="1"/>
+          </p:cNvSpPr>
+          <p:nvPr>
+            <p:ph type="body" idx="1"/>
+          </p:nvPr>
+        </p:nvSpPr>
+        <p:spPr/>
+        <p:txBody>
+          <a:bodyPr/>
+          <a:lstStyle/>
+          <a:p>
+            <a:pPr marL="114300" indent="0">
+              <a:buNone/>
+            </a:pPr>
+            <a:r>
+              <a:rPr lang="en-US" u="sng" dirty="0">
+                <a:solidFill>
+                  <a:schemeClr val="tx1"/>
+                </a:solidFill>
+                <a:latin typeface="Avenir Next LT Pro" panose="020B0504020202020204" pitchFamily="34" charset="0"/>
+              </a:rPr>
+              <a:t>Explain why it needs to be considered:</a:t>
+            </a:r>
+          </a:p>
+          <a:p>
+            <a:pPr marL="114300" indent="0">
+              <a:buNone/>
+            </a:pPr>
+            <a:r>
+              <a:rPr lang="en-US" dirty="0">
+                <a:solidFill>
+                  <a:schemeClr val="tx1"/>
+                </a:solidFill>
+                <a:latin typeface="Avenir Next LT Pro" panose="020B0504020202020204" pitchFamily="34" charset="0"/>
+              </a:rPr>
+              <a:t>This implication needs to be considered because many people wouldn’t want others to have access to their personal information. It is important that consumers feel safe when giving their information so they can protect their identity from risks of theft. </a:t>
+            </a:r>
+          </a:p>
+          <a:p>
+            <a:pPr marL="114300" indent="0">
+              <a:buNone/>
+            </a:pPr>
+            <a:endParaRPr lang="en-US" dirty="0">
+              <a:latin typeface="Avenir Next LT Pro" panose="020B0504020202020204" pitchFamily="34" charset="0"/>
+            </a:endParaRPr>
+          </a:p>
+          <a:p>
+            <a:pPr marL="114300" indent="0">
+              <a:buNone/>
+            </a:pPr>
+            <a:endParaRPr lang="en-US" dirty="0">
+              <a:latin typeface="Avenir Next LT Pro" panose="020B0504020202020204" pitchFamily="34" charset="0"/>
+            </a:endParaRPr>
+          </a:p>
+          <a:p>
+            <a:pPr marL="114300" indent="0">
+              <a:buNone/>
+            </a:pPr>
+            <a:endParaRPr lang="en-NZ" dirty="0">
+              <a:latin typeface="Avenir Next LT Pro" panose="020B0504020202020204" pitchFamily="34" charset="0"/>
+            </a:endParaRPr>
+          </a:p>
+        </p:txBody>
+      </p:sp>
+      <p:sp>
+        <p:nvSpPr>
+          <p:cNvPr id="4" name="Title 1">
+            <a:extLst>
+              <a:ext uri="{FF2B5EF4-FFF2-40B4-BE49-F238E27FC236}">
+                <a16:creationId xmlns:a16="http://schemas.microsoft.com/office/drawing/2014/main" id="{4709D978-E5AD-4FAA-ADB4-C7CBB736D3B1}"/>
+              </a:ext>
+            </a:extLst>
+          </p:cNvPr>
+          <p:cNvSpPr txBox="1">
+            <a:spLocks/>
+          </p:cNvSpPr>
+          <p:nvPr/>
+        </p:nvSpPr>
+        <p:spPr>
+          <a:xfrm>
+            <a:off x="433620" y="467885"/>
+            <a:ext cx="4260300" cy="572700"/>
+          </a:xfrm>
+          <a:prstGeom prst="rect">
+            <a:avLst/>
+          </a:prstGeom>
+          <a:noFill/>
+          <a:ln>
+            <a:noFill/>
+          </a:ln>
+        </p:spPr>
+        <p:txBody>
+          <a:bodyPr spcFirstLastPara="1" wrap="square" lIns="91425" tIns="91425" rIns="91425" bIns="91425" anchor="t" anchorCtr="0">
+            <a:noAutofit/>
+          </a:bodyPr>
+          <a:lstStyle>
+            <a:defPPr marR="0" lvl="0" algn="l" rtl="0">
+              <a:lnSpc>
+                <a:spcPct val="100000"/>
+              </a:lnSpc>
+              <a:spcBef>
+                <a:spcPts val="0"/>
+              </a:spcBef>
+              <a:spcAft>
+                <a:spcPts val="0"/>
+              </a:spcAft>
+            </a:defPPr>
+            <a:lvl1pPr marR="0" lvl="0" algn="l" rtl="0">
+              <a:lnSpc>
+                <a:spcPct val="100000"/>
+              </a:lnSpc>
+              <a:spcBef>
+                <a:spcPts val="0"/>
+              </a:spcBef>
+              <a:spcAft>
+                <a:spcPts val="0"/>
+              </a:spcAft>
+              <a:buClr>
+                <a:schemeClr val="dk1"/>
+              </a:buClr>
+              <a:buSzPts val="2800"/>
+              <a:buFont typeface="Arial"/>
+              <a:buNone/>
+              <a:defRPr sz="2800" b="0" i="0" u="none" strike="noStrike" cap="none">
+                <a:solidFill>
+                  <a:schemeClr val="dk1"/>
+                </a:solidFill>
+                <a:latin typeface="Arial"/>
+                <a:ea typeface="Arial"/>
+                <a:cs typeface="Arial"/>
+                <a:sym typeface="Arial"/>
+              </a:defRPr>
+            </a:lvl1pPr>
+            <a:lvl2pPr marR="0" lvl="1" algn="l" rtl="0">
+              <a:lnSpc>
+                <a:spcPct val="100000"/>
+              </a:lnSpc>
+              <a:spcBef>
+                <a:spcPts val="0"/>
+              </a:spcBef>
+              <a:spcAft>
+                <a:spcPts val="0"/>
+              </a:spcAft>
+              <a:buClr>
+                <a:schemeClr val="dk1"/>
+              </a:buClr>
+              <a:buSzPts val="2800"/>
+              <a:buFont typeface="Arial"/>
+              <a:buNone/>
+              <a:defRPr sz="2800" b="0" i="0" u="none" strike="noStrike" cap="none">
+                <a:solidFill>
+                  <a:schemeClr val="dk1"/>
+                </a:solidFill>
+                <a:latin typeface="Arial"/>
+                <a:ea typeface="Arial"/>
+                <a:cs typeface="Arial"/>
+                <a:sym typeface="Arial"/>
+              </a:defRPr>
+            </a:lvl2pPr>
+            <a:lvl3pPr marR="0" lvl="2" algn="l" rtl="0">
+              <a:lnSpc>
+                <a:spcPct val="100000"/>
+              </a:lnSpc>
+              <a:spcBef>
+                <a:spcPts val="0"/>
+              </a:spcBef>
+              <a:spcAft>
+                <a:spcPts val="0"/>
+              </a:spcAft>
+              <a:buClr>
+                <a:schemeClr val="dk1"/>
+              </a:buClr>
+              <a:buSzPts val="2800"/>
+              <a:buFont typeface="Arial"/>
+              <a:buNone/>
+              <a:defRPr sz="2800" b="0" i="0" u="none" strike="noStrike" cap="none">
+                <a:solidFill>
+                  <a:schemeClr val="dk1"/>
+                </a:solidFill>
+                <a:latin typeface="Arial"/>
+                <a:ea typeface="Arial"/>
+                <a:cs typeface="Arial"/>
+                <a:sym typeface="Arial"/>
+              </a:defRPr>
+            </a:lvl3pPr>
+            <a:lvl4pPr marR="0" lvl="3" algn="l" rtl="0">
+              <a:lnSpc>
+                <a:spcPct val="100000"/>
+              </a:lnSpc>
+              <a:spcBef>
+                <a:spcPts val="0"/>
+              </a:spcBef>
+              <a:spcAft>
+                <a:spcPts val="0"/>
+              </a:spcAft>
+              <a:buClr>
+                <a:schemeClr val="dk1"/>
+              </a:buClr>
+              <a:buSzPts val="2800"/>
+              <a:buFont typeface="Arial"/>
+              <a:buNone/>
+              <a:defRPr sz="2800" b="0" i="0" u="none" strike="noStrike" cap="none">
+                <a:solidFill>
+                  <a:schemeClr val="dk1"/>
+                </a:solidFill>
+                <a:latin typeface="Arial"/>
+                <a:ea typeface="Arial"/>
+                <a:cs typeface="Arial"/>
+                <a:sym typeface="Arial"/>
+              </a:defRPr>
+            </a:lvl4pPr>
+            <a:lvl5pPr marR="0" lvl="4" algn="l" rtl="0">
+              <a:lnSpc>
+                <a:spcPct val="100000"/>
+              </a:lnSpc>
+              <a:spcBef>
+                <a:spcPts val="0"/>
+              </a:spcBef>
+              <a:spcAft>
+                <a:spcPts val="0"/>
+              </a:spcAft>
+              <a:buClr>
+                <a:schemeClr val="dk1"/>
+              </a:buClr>
+              <a:buSzPts val="2800"/>
+              <a:buFont typeface="Arial"/>
+              <a:buNone/>
+              <a:defRPr sz="2800" b="0" i="0" u="none" strike="noStrike" cap="none">
+                <a:solidFill>
+                  <a:schemeClr val="dk1"/>
+                </a:solidFill>
+                <a:latin typeface="Arial"/>
+                <a:ea typeface="Arial"/>
+                <a:cs typeface="Arial"/>
+                <a:sym typeface="Arial"/>
+              </a:defRPr>
+            </a:lvl5pPr>
+            <a:lvl6pPr marR="0" lvl="5" algn="l" rtl="0">
+              <a:lnSpc>
+                <a:spcPct val="100000"/>
+              </a:lnSpc>
+              <a:spcBef>
+                <a:spcPts val="0"/>
+              </a:spcBef>
+              <a:spcAft>
+                <a:spcPts val="0"/>
+              </a:spcAft>
+              <a:buClr>
+                <a:schemeClr val="dk1"/>
+              </a:buClr>
+              <a:buSzPts val="2800"/>
+              <a:buFont typeface="Arial"/>
+              <a:buNone/>
+              <a:defRPr sz="2800" b="0" i="0" u="none" strike="noStrike" cap="none">
+                <a:solidFill>
+                  <a:schemeClr val="dk1"/>
+                </a:solidFill>
+                <a:latin typeface="Arial"/>
+                <a:ea typeface="Arial"/>
+                <a:cs typeface="Arial"/>
+                <a:sym typeface="Arial"/>
+              </a:defRPr>
+            </a:lvl6pPr>
+            <a:lvl7pPr marR="0" lvl="6" algn="l" rtl="0">
+              <a:lnSpc>
+                <a:spcPct val="100000"/>
+              </a:lnSpc>
+              <a:spcBef>
+                <a:spcPts val="0"/>
+              </a:spcBef>
+              <a:spcAft>
+                <a:spcPts val="0"/>
+              </a:spcAft>
+              <a:buClr>
+                <a:schemeClr val="dk1"/>
+              </a:buClr>
+              <a:buSzPts val="2800"/>
+              <a:buFont typeface="Arial"/>
+              <a:buNone/>
+              <a:defRPr sz="2800" b="0" i="0" u="none" strike="noStrike" cap="none">
+                <a:solidFill>
+                  <a:schemeClr val="dk1"/>
+                </a:solidFill>
+                <a:latin typeface="Arial"/>
+                <a:ea typeface="Arial"/>
+                <a:cs typeface="Arial"/>
+                <a:sym typeface="Arial"/>
+              </a:defRPr>
+            </a:lvl7pPr>
+            <a:lvl8pPr marR="0" lvl="7" algn="l" rtl="0">
+              <a:lnSpc>
+                <a:spcPct val="100000"/>
+              </a:lnSpc>
+              <a:spcBef>
+                <a:spcPts val="0"/>
+              </a:spcBef>
+              <a:spcAft>
+                <a:spcPts val="0"/>
+              </a:spcAft>
+              <a:buClr>
+                <a:schemeClr val="dk1"/>
+              </a:buClr>
+              <a:buSzPts val="2800"/>
+              <a:buFont typeface="Arial"/>
+              <a:buNone/>
+              <a:defRPr sz="2800" b="0" i="0" u="none" strike="noStrike" cap="none">
+                <a:solidFill>
+                  <a:schemeClr val="dk1"/>
+                </a:solidFill>
+                <a:latin typeface="Arial"/>
+                <a:ea typeface="Arial"/>
+                <a:cs typeface="Arial"/>
+                <a:sym typeface="Arial"/>
+              </a:defRPr>
+            </a:lvl8pPr>
+            <a:lvl9pPr marR="0" lvl="8" algn="l" rtl="0">
+              <a:lnSpc>
+                <a:spcPct val="100000"/>
+              </a:lnSpc>
+              <a:spcBef>
+                <a:spcPts val="0"/>
+              </a:spcBef>
+              <a:spcAft>
+                <a:spcPts val="0"/>
+              </a:spcAft>
+              <a:buClr>
+                <a:schemeClr val="dk1"/>
+              </a:buClr>
+              <a:buSzPts val="2800"/>
+              <a:buFont typeface="Arial"/>
+              <a:buNone/>
+              <a:defRPr sz="2800" b="0" i="0" u="none" strike="noStrike" cap="none">
+                <a:solidFill>
+                  <a:schemeClr val="dk1"/>
+                </a:solidFill>
+                <a:latin typeface="Arial"/>
+                <a:ea typeface="Arial"/>
+                <a:cs typeface="Arial"/>
+                <a:sym typeface="Arial"/>
+              </a:defRPr>
+            </a:lvl9pPr>
+          </a:lstStyle>
+          <a:p>
+            <a:r>
+              <a:rPr lang="en-US" b="1" dirty="0">
+                <a:latin typeface="Avenir Next LT Pro" panose="020B0504020202020204" pitchFamily="34" charset="0"/>
+              </a:rPr>
+              <a:t>Implication 1 - Privacy</a:t>
+            </a:r>
+            <a:endParaRPr lang="en-NZ" b="1" dirty="0">
+              <a:latin typeface="Avenir Next LT Pro" panose="020B0504020202020204" pitchFamily="34" charset="0"/>
+            </a:endParaRPr>
+          </a:p>
+        </p:txBody>
+      </p:sp>
+    </p:spTree>
+    <p:extLst>
+      <p:ext uri="{BB962C8B-B14F-4D97-AF65-F5344CB8AC3E}">
+        <p14:creationId xmlns:p14="http://schemas.microsoft.com/office/powerpoint/2010/main" val="2682424228"/>
+      </p:ext>
+    </p:extLst>
+  </p:cSld>
+  <p:clrMapOvr>
+    <a:masterClrMapping/>
+  </p:clrMapOvr>
+</p:sld>
+</file>
+
+<file path=ppt/slides/slide40.xml><?xml version="1.0" encoding="utf-8"?>
 <p:sld xmlns:a="http://schemas.openxmlformats.org/drawingml/2006/main" xmlns:r="http://schemas.openxmlformats.org/officeDocument/2006/relationships" xmlns:p="http://schemas.openxmlformats.org/presentationml/2006/main">
   <p:cSld>
     <p:bg>
@@ -16493,7 +18631,7 @@
 </p:sld>
 </file>
 
-<file path=ppt/slides/slide37.xml><?xml version="1.0" encoding="utf-8"?>
+<file path=ppt/slides/slide41.xml><?xml version="1.0" encoding="utf-8"?>
 <p:sld xmlns:a="http://schemas.openxmlformats.org/drawingml/2006/main" xmlns:r="http://schemas.openxmlformats.org/officeDocument/2006/relationships" xmlns:p="http://schemas.openxmlformats.org/presentationml/2006/main">
   <p:cSld>
     <p:spTree>
@@ -16708,7 +18846,7 @@
 </p:sld>
 </file>
 
-<file path=ppt/slides/slide38.xml><?xml version="1.0" encoding="utf-8"?>
+<file path=ppt/slides/slide42.xml><?xml version="1.0" encoding="utf-8"?>
 <p:sld xmlns:a="http://schemas.openxmlformats.org/drawingml/2006/main" xmlns:r="http://schemas.openxmlformats.org/officeDocument/2006/relationships" xmlns:p="http://schemas.openxmlformats.org/presentationml/2006/main">
   <p:cSld>
     <p:bg>
@@ -16810,7 +18948,7 @@
 </p:sld>
 </file>
 
-<file path=ppt/slides/slide39.xml><?xml version="1.0" encoding="utf-8"?>
+<file path=ppt/slides/slide43.xml><?xml version="1.0" encoding="utf-8"?>
 <p:sld xmlns:a="http://schemas.openxmlformats.org/drawingml/2006/main" xmlns:r="http://schemas.openxmlformats.org/officeDocument/2006/relationships" xmlns:p="http://schemas.openxmlformats.org/presentationml/2006/main">
   <p:cSld>
     <p:bg>
@@ -16881,440 +19019,7 @@
 </p:sld>
 </file>
 
-<file path=ppt/slides/slide4.xml><?xml version="1.0" encoding="utf-8"?>
-<p:sld xmlns:a="http://schemas.openxmlformats.org/drawingml/2006/main" xmlns:r="http://schemas.openxmlformats.org/officeDocument/2006/relationships" xmlns:p="http://schemas.openxmlformats.org/presentationml/2006/main">
-  <p:cSld>
-    <p:bg>
-      <p:bgPr>
-        <a:solidFill>
-          <a:srgbClr val="FFCC66"/>
-        </a:solidFill>
-        <a:effectLst/>
-      </p:bgPr>
-    </p:bg>
-    <p:spTree>
-      <p:nvGrpSpPr>
-        <p:cNvPr id="1" name=""/>
-        <p:cNvGrpSpPr/>
-        <p:nvPr/>
-      </p:nvGrpSpPr>
-      <p:grpSpPr>
-        <a:xfrm>
-          <a:off x="0" y="0"/>
-          <a:ext cx="0" cy="0"/>
-          <a:chOff x="0" y="0"/>
-          <a:chExt cx="0" cy="0"/>
-        </a:xfrm>
-      </p:grpSpPr>
-      <p:pic>
-        <p:nvPicPr>
-          <p:cNvPr id="5" name="Picture 4">
-            <a:extLst>
-              <a:ext uri="{FF2B5EF4-FFF2-40B4-BE49-F238E27FC236}">
-                <a16:creationId xmlns:a16="http://schemas.microsoft.com/office/drawing/2014/main" id="{EF76006E-0344-432C-AA65-FCECC8B8622C}"/>
-              </a:ext>
-            </a:extLst>
-          </p:cNvPr>
-          <p:cNvPicPr>
-            <a:picLocks noChangeAspect="1"/>
-          </p:cNvPicPr>
-          <p:nvPr/>
-        </p:nvPicPr>
-        <p:blipFill>
-          <a:blip r:embed="rId2"/>
-          <a:stretch>
-            <a:fillRect/>
-          </a:stretch>
-        </p:blipFill>
-        <p:spPr>
-          <a:xfrm>
-            <a:off x="0" y="10161"/>
-            <a:ext cx="9144000" cy="5123178"/>
-          </a:xfrm>
-          <a:prstGeom prst="rect">
-            <a:avLst/>
-          </a:prstGeom>
-        </p:spPr>
-      </p:pic>
-      <p:sp>
-        <p:nvSpPr>
-          <p:cNvPr id="3" name="Text Placeholder 2">
-            <a:extLst>
-              <a:ext uri="{FF2B5EF4-FFF2-40B4-BE49-F238E27FC236}">
-                <a16:creationId xmlns:a16="http://schemas.microsoft.com/office/drawing/2014/main" id="{1EB42CE1-67BF-466B-8C2C-7F21A8892B1E}"/>
-              </a:ext>
-            </a:extLst>
-          </p:cNvPr>
-          <p:cNvSpPr>
-            <a:spLocks noGrp="1"/>
-          </p:cNvSpPr>
-          <p:nvPr>
-            <p:ph type="body" idx="1"/>
-          </p:nvPr>
-        </p:nvSpPr>
-        <p:spPr/>
-        <p:txBody>
-          <a:bodyPr/>
-          <a:lstStyle/>
-          <a:p>
-            <a:pPr marL="114300" indent="0">
-              <a:buNone/>
-            </a:pPr>
-            <a:r>
-              <a:rPr lang="en-US" u="sng" dirty="0">
-                <a:solidFill>
-                  <a:schemeClr val="tx1"/>
-                </a:solidFill>
-                <a:latin typeface="Avenir Next LT Pro" panose="020B0504020202020204" pitchFamily="34" charset="0"/>
-              </a:rPr>
-              <a:t>Explain why it needs to be considered:</a:t>
-            </a:r>
-          </a:p>
-          <a:p>
-            <a:pPr marL="114300" indent="0">
-              <a:buNone/>
-            </a:pPr>
-            <a:r>
-              <a:rPr lang="en-US" dirty="0">
-                <a:solidFill>
-                  <a:schemeClr val="tx1"/>
-                </a:solidFill>
-                <a:latin typeface="Avenir Next LT Pro" panose="020B0504020202020204" pitchFamily="34" charset="0"/>
-              </a:rPr>
-              <a:t>This implication needs to be considered because many people wouldn’t want others to have access to their personal information. It is important that consumers feel safe when giving their information so they can protect their identity from risks of theft. </a:t>
-            </a:r>
-          </a:p>
-          <a:p>
-            <a:pPr marL="114300" indent="0">
-              <a:buNone/>
-            </a:pPr>
-            <a:endParaRPr lang="en-US" dirty="0">
-              <a:latin typeface="Avenir Next LT Pro" panose="020B0504020202020204" pitchFamily="34" charset="0"/>
-            </a:endParaRPr>
-          </a:p>
-          <a:p>
-            <a:pPr marL="114300" indent="0">
-              <a:buNone/>
-            </a:pPr>
-            <a:endParaRPr lang="en-US" dirty="0">
-              <a:latin typeface="Avenir Next LT Pro" panose="020B0504020202020204" pitchFamily="34" charset="0"/>
-            </a:endParaRPr>
-          </a:p>
-          <a:p>
-            <a:pPr marL="114300" indent="0">
-              <a:buNone/>
-            </a:pPr>
-            <a:endParaRPr lang="en-NZ" dirty="0">
-              <a:latin typeface="Avenir Next LT Pro" panose="020B0504020202020204" pitchFamily="34" charset="0"/>
-            </a:endParaRPr>
-          </a:p>
-        </p:txBody>
-      </p:sp>
-      <p:sp>
-        <p:nvSpPr>
-          <p:cNvPr id="4" name="Title 1">
-            <a:extLst>
-              <a:ext uri="{FF2B5EF4-FFF2-40B4-BE49-F238E27FC236}">
-                <a16:creationId xmlns:a16="http://schemas.microsoft.com/office/drawing/2014/main" id="{4709D978-E5AD-4FAA-ADB4-C7CBB736D3B1}"/>
-              </a:ext>
-            </a:extLst>
-          </p:cNvPr>
-          <p:cNvSpPr txBox="1">
-            <a:spLocks/>
-          </p:cNvSpPr>
-          <p:nvPr/>
-        </p:nvSpPr>
-        <p:spPr>
-          <a:xfrm>
-            <a:off x="433620" y="467885"/>
-            <a:ext cx="4260300" cy="572700"/>
-          </a:xfrm>
-          <a:prstGeom prst="rect">
-            <a:avLst/>
-          </a:prstGeom>
-          <a:noFill/>
-          <a:ln>
-            <a:noFill/>
-          </a:ln>
-        </p:spPr>
-        <p:txBody>
-          <a:bodyPr spcFirstLastPara="1" wrap="square" lIns="91425" tIns="91425" rIns="91425" bIns="91425" anchor="t" anchorCtr="0">
-            <a:noAutofit/>
-          </a:bodyPr>
-          <a:lstStyle>
-            <a:defPPr marR="0" lvl="0" algn="l" rtl="0">
-              <a:lnSpc>
-                <a:spcPct val="100000"/>
-              </a:lnSpc>
-              <a:spcBef>
-                <a:spcPts val="0"/>
-              </a:spcBef>
-              <a:spcAft>
-                <a:spcPts val="0"/>
-              </a:spcAft>
-            </a:defPPr>
-            <a:lvl1pPr marR="0" lvl="0" algn="l" rtl="0">
-              <a:lnSpc>
-                <a:spcPct val="100000"/>
-              </a:lnSpc>
-              <a:spcBef>
-                <a:spcPts val="0"/>
-              </a:spcBef>
-              <a:spcAft>
-                <a:spcPts val="0"/>
-              </a:spcAft>
-              <a:buClr>
-                <a:schemeClr val="dk1"/>
-              </a:buClr>
-              <a:buSzPts val="2800"/>
-              <a:buFont typeface="Arial"/>
-              <a:buNone/>
-              <a:defRPr sz="2800" b="0" i="0" u="none" strike="noStrike" cap="none">
-                <a:solidFill>
-                  <a:schemeClr val="dk1"/>
-                </a:solidFill>
-                <a:latin typeface="Arial"/>
-                <a:ea typeface="Arial"/>
-                <a:cs typeface="Arial"/>
-                <a:sym typeface="Arial"/>
-              </a:defRPr>
-            </a:lvl1pPr>
-            <a:lvl2pPr marR="0" lvl="1" algn="l" rtl="0">
-              <a:lnSpc>
-                <a:spcPct val="100000"/>
-              </a:lnSpc>
-              <a:spcBef>
-                <a:spcPts val="0"/>
-              </a:spcBef>
-              <a:spcAft>
-                <a:spcPts val="0"/>
-              </a:spcAft>
-              <a:buClr>
-                <a:schemeClr val="dk1"/>
-              </a:buClr>
-              <a:buSzPts val="2800"/>
-              <a:buFont typeface="Arial"/>
-              <a:buNone/>
-              <a:defRPr sz="2800" b="0" i="0" u="none" strike="noStrike" cap="none">
-                <a:solidFill>
-                  <a:schemeClr val="dk1"/>
-                </a:solidFill>
-                <a:latin typeface="Arial"/>
-                <a:ea typeface="Arial"/>
-                <a:cs typeface="Arial"/>
-                <a:sym typeface="Arial"/>
-              </a:defRPr>
-            </a:lvl2pPr>
-            <a:lvl3pPr marR="0" lvl="2" algn="l" rtl="0">
-              <a:lnSpc>
-                <a:spcPct val="100000"/>
-              </a:lnSpc>
-              <a:spcBef>
-                <a:spcPts val="0"/>
-              </a:spcBef>
-              <a:spcAft>
-                <a:spcPts val="0"/>
-              </a:spcAft>
-              <a:buClr>
-                <a:schemeClr val="dk1"/>
-              </a:buClr>
-              <a:buSzPts val="2800"/>
-              <a:buFont typeface="Arial"/>
-              <a:buNone/>
-              <a:defRPr sz="2800" b="0" i="0" u="none" strike="noStrike" cap="none">
-                <a:solidFill>
-                  <a:schemeClr val="dk1"/>
-                </a:solidFill>
-                <a:latin typeface="Arial"/>
-                <a:ea typeface="Arial"/>
-                <a:cs typeface="Arial"/>
-                <a:sym typeface="Arial"/>
-              </a:defRPr>
-            </a:lvl3pPr>
-            <a:lvl4pPr marR="0" lvl="3" algn="l" rtl="0">
-              <a:lnSpc>
-                <a:spcPct val="100000"/>
-              </a:lnSpc>
-              <a:spcBef>
-                <a:spcPts val="0"/>
-              </a:spcBef>
-              <a:spcAft>
-                <a:spcPts val="0"/>
-              </a:spcAft>
-              <a:buClr>
-                <a:schemeClr val="dk1"/>
-              </a:buClr>
-              <a:buSzPts val="2800"/>
-              <a:buFont typeface="Arial"/>
-              <a:buNone/>
-              <a:defRPr sz="2800" b="0" i="0" u="none" strike="noStrike" cap="none">
-                <a:solidFill>
-                  <a:schemeClr val="dk1"/>
-                </a:solidFill>
-                <a:latin typeface="Arial"/>
-                <a:ea typeface="Arial"/>
-                <a:cs typeface="Arial"/>
-                <a:sym typeface="Arial"/>
-              </a:defRPr>
-            </a:lvl4pPr>
-            <a:lvl5pPr marR="0" lvl="4" algn="l" rtl="0">
-              <a:lnSpc>
-                <a:spcPct val="100000"/>
-              </a:lnSpc>
-              <a:spcBef>
-                <a:spcPts val="0"/>
-              </a:spcBef>
-              <a:spcAft>
-                <a:spcPts val="0"/>
-              </a:spcAft>
-              <a:buClr>
-                <a:schemeClr val="dk1"/>
-              </a:buClr>
-              <a:buSzPts val="2800"/>
-              <a:buFont typeface="Arial"/>
-              <a:buNone/>
-              <a:defRPr sz="2800" b="0" i="0" u="none" strike="noStrike" cap="none">
-                <a:solidFill>
-                  <a:schemeClr val="dk1"/>
-                </a:solidFill>
-                <a:latin typeface="Arial"/>
-                <a:ea typeface="Arial"/>
-                <a:cs typeface="Arial"/>
-                <a:sym typeface="Arial"/>
-              </a:defRPr>
-            </a:lvl5pPr>
-            <a:lvl6pPr marR="0" lvl="5" algn="l" rtl="0">
-              <a:lnSpc>
-                <a:spcPct val="100000"/>
-              </a:lnSpc>
-              <a:spcBef>
-                <a:spcPts val="0"/>
-              </a:spcBef>
-              <a:spcAft>
-                <a:spcPts val="0"/>
-              </a:spcAft>
-              <a:buClr>
-                <a:schemeClr val="dk1"/>
-              </a:buClr>
-              <a:buSzPts val="2800"/>
-              <a:buFont typeface="Arial"/>
-              <a:buNone/>
-              <a:defRPr sz="2800" b="0" i="0" u="none" strike="noStrike" cap="none">
-                <a:solidFill>
-                  <a:schemeClr val="dk1"/>
-                </a:solidFill>
-                <a:latin typeface="Arial"/>
-                <a:ea typeface="Arial"/>
-                <a:cs typeface="Arial"/>
-                <a:sym typeface="Arial"/>
-              </a:defRPr>
-            </a:lvl6pPr>
-            <a:lvl7pPr marR="0" lvl="6" algn="l" rtl="0">
-              <a:lnSpc>
-                <a:spcPct val="100000"/>
-              </a:lnSpc>
-              <a:spcBef>
-                <a:spcPts val="0"/>
-              </a:spcBef>
-              <a:spcAft>
-                <a:spcPts val="0"/>
-              </a:spcAft>
-              <a:buClr>
-                <a:schemeClr val="dk1"/>
-              </a:buClr>
-              <a:buSzPts val="2800"/>
-              <a:buFont typeface="Arial"/>
-              <a:buNone/>
-              <a:defRPr sz="2800" b="0" i="0" u="none" strike="noStrike" cap="none">
-                <a:solidFill>
-                  <a:schemeClr val="dk1"/>
-                </a:solidFill>
-                <a:latin typeface="Arial"/>
-                <a:ea typeface="Arial"/>
-                <a:cs typeface="Arial"/>
-                <a:sym typeface="Arial"/>
-              </a:defRPr>
-            </a:lvl7pPr>
-            <a:lvl8pPr marR="0" lvl="7" algn="l" rtl="0">
-              <a:lnSpc>
-                <a:spcPct val="100000"/>
-              </a:lnSpc>
-              <a:spcBef>
-                <a:spcPts val="0"/>
-              </a:spcBef>
-              <a:spcAft>
-                <a:spcPts val="0"/>
-              </a:spcAft>
-              <a:buClr>
-                <a:schemeClr val="dk1"/>
-              </a:buClr>
-              <a:buSzPts val="2800"/>
-              <a:buFont typeface="Arial"/>
-              <a:buNone/>
-              <a:defRPr sz="2800" b="0" i="0" u="none" strike="noStrike" cap="none">
-                <a:solidFill>
-                  <a:schemeClr val="dk1"/>
-                </a:solidFill>
-                <a:latin typeface="Arial"/>
-                <a:ea typeface="Arial"/>
-                <a:cs typeface="Arial"/>
-                <a:sym typeface="Arial"/>
-              </a:defRPr>
-            </a:lvl8pPr>
-            <a:lvl9pPr marR="0" lvl="8" algn="l" rtl="0">
-              <a:lnSpc>
-                <a:spcPct val="100000"/>
-              </a:lnSpc>
-              <a:spcBef>
-                <a:spcPts val="0"/>
-              </a:spcBef>
-              <a:spcAft>
-                <a:spcPts val="0"/>
-              </a:spcAft>
-              <a:buClr>
-                <a:schemeClr val="dk1"/>
-              </a:buClr>
-              <a:buSzPts val="2800"/>
-              <a:buFont typeface="Arial"/>
-              <a:buNone/>
-              <a:defRPr sz="2800" b="0" i="0" u="none" strike="noStrike" cap="none">
-                <a:solidFill>
-                  <a:schemeClr val="dk1"/>
-                </a:solidFill>
-                <a:latin typeface="Arial"/>
-                <a:ea typeface="Arial"/>
-                <a:cs typeface="Arial"/>
-                <a:sym typeface="Arial"/>
-              </a:defRPr>
-            </a:lvl9pPr>
-          </a:lstStyle>
-          <a:p>
-            <a:r>
-              <a:rPr lang="en-US" b="1" dirty="0">
-                <a:latin typeface="Avenir Next LT Pro" panose="020B0504020202020204" pitchFamily="34" charset="0"/>
-              </a:rPr>
-              <a:t>Implication 1 - Privacy</a:t>
-            </a:r>
-            <a:endParaRPr lang="en-NZ" b="1" dirty="0">
-              <a:latin typeface="Avenir Next LT Pro" panose="020B0504020202020204" pitchFamily="34" charset="0"/>
-            </a:endParaRPr>
-          </a:p>
-        </p:txBody>
-      </p:sp>
-    </p:spTree>
-    <p:extLst>
-      <p:ext uri="{BB962C8B-B14F-4D97-AF65-F5344CB8AC3E}">
-        <p14:creationId xmlns:p14="http://schemas.microsoft.com/office/powerpoint/2010/main" val="2682424228"/>
-      </p:ext>
-    </p:extLst>
-  </p:cSld>
-  <p:clrMapOvr>
-    <a:masterClrMapping/>
-  </p:clrMapOvr>
-</p:sld>
-</file>
-
-<file path=ppt/slides/slide40.xml><?xml version="1.0" encoding="utf-8"?>
+<file path=ppt/slides/slide44.xml><?xml version="1.0" encoding="utf-8"?>
 <p:sld xmlns:a="http://schemas.openxmlformats.org/drawingml/2006/main" xmlns:r="http://schemas.openxmlformats.org/officeDocument/2006/relationships" xmlns:p="http://schemas.openxmlformats.org/presentationml/2006/main">
   <p:cSld>
     <p:bg>
@@ -17384,7 +19089,7 @@
 </p:sld>
 </file>
 
-<file path=ppt/slides/slide41.xml><?xml version="1.0" encoding="utf-8"?>
+<file path=ppt/slides/slide45.xml><?xml version="1.0" encoding="utf-8"?>
 <p:sld xmlns:a="http://schemas.openxmlformats.org/drawingml/2006/main" xmlns:r="http://schemas.openxmlformats.org/officeDocument/2006/relationships" xmlns:p="http://schemas.openxmlformats.org/presentationml/2006/main">
   <p:cSld>
     <p:bg>
@@ -17455,7 +19160,7 @@
 </p:sld>
 </file>
 
-<file path=ppt/slides/slide42.xml><?xml version="1.0" encoding="utf-8"?>
+<file path=ppt/slides/slide46.xml><?xml version="1.0" encoding="utf-8"?>
 <p:sld xmlns:a="http://schemas.openxmlformats.org/drawingml/2006/main" xmlns:r="http://schemas.openxmlformats.org/officeDocument/2006/relationships" xmlns:p="http://schemas.openxmlformats.org/presentationml/2006/main">
   <p:cSld>
     <p:bg>
@@ -17525,7 +19230,7 @@
 </p:sld>
 </file>
 
-<file path=ppt/slides/slide43.xml><?xml version="1.0" encoding="utf-8"?>
+<file path=ppt/slides/slide47.xml><?xml version="1.0" encoding="utf-8"?>
 <p:sld xmlns:a="http://schemas.openxmlformats.org/drawingml/2006/main" xmlns:r="http://schemas.openxmlformats.org/officeDocument/2006/relationships" xmlns:p="http://schemas.openxmlformats.org/presentationml/2006/main">
   <p:cSld>
     <p:bg>
@@ -17627,7 +19332,7 @@
 </p:sld>
 </file>
 
-<file path=ppt/slides/slide44.xml><?xml version="1.0" encoding="utf-8"?>
+<file path=ppt/slides/slide48.xml><?xml version="1.0" encoding="utf-8"?>
 <p:sld xmlns:a="http://schemas.openxmlformats.org/drawingml/2006/main" xmlns:r="http://schemas.openxmlformats.org/officeDocument/2006/relationships" xmlns:p="http://schemas.openxmlformats.org/presentationml/2006/main">
   <p:cSld>
     <p:bg>
@@ -17744,7 +19449,7 @@
 </p:sld>
 </file>
 
-<file path=ppt/slides/slide45.xml><?xml version="1.0" encoding="utf-8"?>
+<file path=ppt/slides/slide49.xml><?xml version="1.0" encoding="utf-8"?>
 <p:sld xmlns:a="http://schemas.openxmlformats.org/drawingml/2006/main" xmlns:r="http://schemas.openxmlformats.org/officeDocument/2006/relationships" xmlns:p="http://schemas.openxmlformats.org/presentationml/2006/main">
   <p:cSld>
     <p:bg>
@@ -17850,329 +19555,6 @@
 </p:sld>
 </file>
 
-<file path=ppt/slides/slide46.xml><?xml version="1.0" encoding="utf-8"?>
-<p:sld xmlns:a="http://schemas.openxmlformats.org/drawingml/2006/main" xmlns:r="http://schemas.openxmlformats.org/officeDocument/2006/relationships" xmlns:p="http://schemas.openxmlformats.org/presentationml/2006/main">
-  <p:cSld>
-    <p:bg>
-      <p:bgPr>
-        <a:solidFill>
-          <a:srgbClr val="D9EAD3"/>
-        </a:solidFill>
-        <a:effectLst/>
-      </p:bgPr>
-    </p:bg>
-    <p:spTree>
-      <p:nvGrpSpPr>
-        <p:cNvPr id="1" name="Shape 83"/>
-        <p:cNvGrpSpPr/>
-        <p:nvPr/>
-      </p:nvGrpSpPr>
-      <p:grpSpPr>
-        <a:xfrm>
-          <a:off x="0" y="0"/>
-          <a:ext cx="0" cy="0"/>
-          <a:chOff x="0" y="0"/>
-          <a:chExt cx="0" cy="0"/>
-        </a:xfrm>
-      </p:grpSpPr>
-      <p:sp>
-        <p:nvSpPr>
-          <p:cNvPr id="84" name="Google Shape;84;p18"/>
-          <p:cNvSpPr txBox="1">
-            <a:spLocks noGrp="1"/>
-          </p:cNvSpPr>
-          <p:nvPr>
-            <p:ph type="title"/>
-          </p:nvPr>
-        </p:nvSpPr>
-        <p:spPr>
-          <a:xfrm>
-            <a:off x="311700" y="445025"/>
-            <a:ext cx="8520600" cy="572700"/>
-          </a:xfrm>
-          <a:prstGeom prst="rect">
-            <a:avLst/>
-          </a:prstGeom>
-        </p:spPr>
-        <p:txBody>
-          <a:bodyPr spcFirstLastPara="1" wrap="square" lIns="91425" tIns="91425" rIns="91425" bIns="91425" anchor="t" anchorCtr="0">
-            <a:noAutofit/>
-          </a:bodyPr>
-          <a:lstStyle/>
-          <a:p>
-            <a:pPr marL="0" lvl="0" indent="0" algn="l" rtl="0">
-              <a:spcBef>
-                <a:spcPts val="0"/>
-              </a:spcBef>
-              <a:spcAft>
-                <a:spcPts val="0"/>
-              </a:spcAft>
-              <a:buNone/>
-            </a:pPr>
-            <a:r>
-              <a:rPr lang="en-NZ" dirty="0"/>
-              <a:t>Python convention testing (PEP8)</a:t>
-            </a:r>
-            <a:endParaRPr dirty="0"/>
-          </a:p>
-        </p:txBody>
-      </p:sp>
-      <p:sp>
-        <p:nvSpPr>
-          <p:cNvPr id="85" name="Google Shape;85;p18"/>
-          <p:cNvSpPr txBox="1">
-            <a:spLocks noGrp="1"/>
-          </p:cNvSpPr>
-          <p:nvPr>
-            <p:ph type="body" idx="1"/>
-          </p:nvPr>
-        </p:nvSpPr>
-        <p:spPr>
-          <a:xfrm>
-            <a:off x="311700" y="1152475"/>
-            <a:ext cx="8464200" cy="3739200"/>
-          </a:xfrm>
-          <a:prstGeom prst="rect">
-            <a:avLst/>
-          </a:prstGeom>
-        </p:spPr>
-        <p:txBody>
-          <a:bodyPr spcFirstLastPara="1" wrap="square" lIns="91425" tIns="91425" rIns="91425" bIns="91425" anchor="t" anchorCtr="0">
-            <a:noAutofit/>
-          </a:bodyPr>
-          <a:lstStyle/>
-          <a:p>
-            <a:pPr marL="0" lvl="0" indent="0" algn="l" rtl="0">
-              <a:spcBef>
-                <a:spcPts val="0"/>
-              </a:spcBef>
-              <a:spcAft>
-                <a:spcPts val="1600"/>
-              </a:spcAft>
-              <a:buNone/>
-            </a:pPr>
-            <a:r>
-              <a:rPr lang="en-NZ" i="1" dirty="0"/>
-              <a:t>Screenshot of errors</a:t>
-            </a:r>
-            <a:endParaRPr i="1" dirty="0"/>
-          </a:p>
-        </p:txBody>
-      </p:sp>
-    </p:spTree>
-    <p:extLst>
-      <p:ext uri="{BB962C8B-B14F-4D97-AF65-F5344CB8AC3E}">
-        <p14:creationId xmlns:p14="http://schemas.microsoft.com/office/powerpoint/2010/main" val="2203232476"/>
-      </p:ext>
-    </p:extLst>
-  </p:cSld>
-  <p:clrMapOvr>
-    <a:masterClrMapping/>
-  </p:clrMapOvr>
-</p:sld>
-</file>
-
-<file path=ppt/slides/slide47.xml><?xml version="1.0" encoding="utf-8"?>
-<p:sld xmlns:a="http://schemas.openxmlformats.org/drawingml/2006/main" xmlns:r="http://schemas.openxmlformats.org/officeDocument/2006/relationships" xmlns:p="http://schemas.openxmlformats.org/presentationml/2006/main">
-  <p:cSld>
-    <p:bg>
-      <p:bgPr>
-        <a:solidFill>
-          <a:srgbClr val="D9EAD3"/>
-        </a:solidFill>
-        <a:effectLst/>
-      </p:bgPr>
-    </p:bg>
-    <p:spTree>
-      <p:nvGrpSpPr>
-        <p:cNvPr id="1" name="Shape 83"/>
-        <p:cNvGrpSpPr/>
-        <p:nvPr/>
-      </p:nvGrpSpPr>
-      <p:grpSpPr>
-        <a:xfrm>
-          <a:off x="0" y="0"/>
-          <a:ext cx="0" cy="0"/>
-          <a:chOff x="0" y="0"/>
-          <a:chExt cx="0" cy="0"/>
-        </a:xfrm>
-      </p:grpSpPr>
-      <p:sp>
-        <p:nvSpPr>
-          <p:cNvPr id="84" name="Google Shape;84;p18"/>
-          <p:cNvSpPr txBox="1">
-            <a:spLocks noGrp="1"/>
-          </p:cNvSpPr>
-          <p:nvPr>
-            <p:ph type="title"/>
-          </p:nvPr>
-        </p:nvSpPr>
-        <p:spPr>
-          <a:xfrm>
-            <a:off x="311700" y="445025"/>
-            <a:ext cx="8520600" cy="572700"/>
-          </a:xfrm>
-          <a:prstGeom prst="rect">
-            <a:avLst/>
-          </a:prstGeom>
-        </p:spPr>
-        <p:txBody>
-          <a:bodyPr spcFirstLastPara="1" wrap="square" lIns="91425" tIns="91425" rIns="91425" bIns="91425" anchor="t" anchorCtr="0">
-            <a:noAutofit/>
-          </a:bodyPr>
-          <a:lstStyle/>
-          <a:p>
-            <a:pPr marL="0" lvl="0" indent="0" algn="l" rtl="0">
-              <a:spcBef>
-                <a:spcPts val="0"/>
-              </a:spcBef>
-              <a:spcAft>
-                <a:spcPts val="0"/>
-              </a:spcAft>
-              <a:buNone/>
-            </a:pPr>
-            <a:r>
-              <a:rPr lang="en-NZ" dirty="0"/>
-              <a:t>Python convention testing (PEP8)</a:t>
-            </a:r>
-            <a:endParaRPr dirty="0"/>
-          </a:p>
-        </p:txBody>
-      </p:sp>
-      <p:sp>
-        <p:nvSpPr>
-          <p:cNvPr id="85" name="Google Shape;85;p18"/>
-          <p:cNvSpPr txBox="1">
-            <a:spLocks noGrp="1"/>
-          </p:cNvSpPr>
-          <p:nvPr>
-            <p:ph type="body" idx="1"/>
-          </p:nvPr>
-        </p:nvSpPr>
-        <p:spPr>
-          <a:xfrm>
-            <a:off x="311700" y="1152475"/>
-            <a:ext cx="8464200" cy="3739200"/>
-          </a:xfrm>
-          <a:prstGeom prst="rect">
-            <a:avLst/>
-          </a:prstGeom>
-        </p:spPr>
-        <p:txBody>
-          <a:bodyPr spcFirstLastPara="1" wrap="square" lIns="91425" tIns="91425" rIns="91425" bIns="91425" anchor="t" anchorCtr="0">
-            <a:noAutofit/>
-          </a:bodyPr>
-          <a:lstStyle/>
-          <a:p>
-            <a:pPr marL="0" lvl="0" indent="0" algn="l" rtl="0">
-              <a:spcBef>
-                <a:spcPts val="0"/>
-              </a:spcBef>
-              <a:spcAft>
-                <a:spcPts val="1600"/>
-              </a:spcAft>
-              <a:buNone/>
-            </a:pPr>
-            <a:r>
-              <a:rPr lang="en-NZ" i="1" dirty="0"/>
-              <a:t>Screenshot after errors fixed</a:t>
-            </a:r>
-            <a:endParaRPr i="1" dirty="0"/>
-          </a:p>
-        </p:txBody>
-      </p:sp>
-    </p:spTree>
-    <p:extLst>
-      <p:ext uri="{BB962C8B-B14F-4D97-AF65-F5344CB8AC3E}">
-        <p14:creationId xmlns:p14="http://schemas.microsoft.com/office/powerpoint/2010/main" val="2422592500"/>
-      </p:ext>
-    </p:extLst>
-  </p:cSld>
-  <p:clrMapOvr>
-    <a:masterClrMapping/>
-  </p:clrMapOvr>
-</p:sld>
-</file>
-
-<file path=ppt/slides/slide48.xml><?xml version="1.0" encoding="utf-8"?>
-<p:sld xmlns:a="http://schemas.openxmlformats.org/drawingml/2006/main" xmlns:r="http://schemas.openxmlformats.org/officeDocument/2006/relationships" xmlns:p="http://schemas.openxmlformats.org/presentationml/2006/main">
-  <p:cSld>
-    <p:bg>
-      <p:bgPr>
-        <a:solidFill>
-          <a:srgbClr val="FFE599"/>
-        </a:solidFill>
-        <a:effectLst/>
-      </p:bgPr>
-    </p:bg>
-    <p:spTree>
-      <p:nvGrpSpPr>
-        <p:cNvPr id="1" name="Shape 89"/>
-        <p:cNvGrpSpPr/>
-        <p:nvPr/>
-      </p:nvGrpSpPr>
-      <p:grpSpPr>
-        <a:xfrm>
-          <a:off x="0" y="0"/>
-          <a:ext cx="0" cy="0"/>
-          <a:chOff x="0" y="0"/>
-          <a:chExt cx="0" cy="0"/>
-        </a:xfrm>
-      </p:grpSpPr>
-      <p:sp>
-        <p:nvSpPr>
-          <p:cNvPr id="90" name="Google Shape;90;p19"/>
-          <p:cNvSpPr txBox="1">
-            <a:spLocks noGrp="1"/>
-          </p:cNvSpPr>
-          <p:nvPr>
-            <p:ph type="body" idx="1"/>
-          </p:nvPr>
-        </p:nvSpPr>
-        <p:spPr>
-          <a:xfrm>
-            <a:off x="311700" y="397700"/>
-            <a:ext cx="8520600" cy="4171200"/>
-          </a:xfrm>
-          <a:prstGeom prst="rect">
-            <a:avLst/>
-          </a:prstGeom>
-        </p:spPr>
-        <p:txBody>
-          <a:bodyPr spcFirstLastPara="1" wrap="square" lIns="91425" tIns="91425" rIns="91425" bIns="91425" anchor="t" anchorCtr="0">
-            <a:noAutofit/>
-          </a:bodyPr>
-          <a:lstStyle/>
-          <a:p>
-            <a:pPr marL="0" lvl="0" indent="0" algn="l" rtl="0">
-              <a:spcBef>
-                <a:spcPts val="0"/>
-              </a:spcBef>
-              <a:spcAft>
-                <a:spcPts val="1600"/>
-              </a:spcAft>
-              <a:buNone/>
-            </a:pPr>
-            <a:r>
-              <a:rPr lang="en" b="1" i="1">
-                <a:solidFill>
-                  <a:srgbClr val="595959"/>
-                </a:solidFill>
-              </a:rPr>
-              <a:t>Discusses how the information from planning, testing and trialling of components assisted in the development of a high-quality outcome</a:t>
-            </a:r>
-            <a:endParaRPr/>
-          </a:p>
-        </p:txBody>
-      </p:sp>
-    </p:spTree>
-  </p:cSld>
-  <p:clrMapOvr>
-    <a:masterClrMapping/>
-  </p:clrMapOvr>
-</p:sld>
-</file>
-
 <file path=ppt/slides/slide5.xml><?xml version="1.0" encoding="utf-8"?>
 <p:sld xmlns:a="http://schemas.openxmlformats.org/drawingml/2006/main" xmlns:r="http://schemas.openxmlformats.org/officeDocument/2006/relationships" xmlns:p="http://schemas.openxmlformats.org/presentationml/2006/main">
   <p:cSld>
@@ -18339,6 +19721,329 @@
         <p14:creationId xmlns:p14="http://schemas.microsoft.com/office/powerpoint/2010/main" val="1674096743"/>
       </p:ext>
     </p:extLst>
+  </p:cSld>
+  <p:clrMapOvr>
+    <a:masterClrMapping/>
+  </p:clrMapOvr>
+</p:sld>
+</file>
+
+<file path=ppt/slides/slide50.xml><?xml version="1.0" encoding="utf-8"?>
+<p:sld xmlns:a="http://schemas.openxmlformats.org/drawingml/2006/main" xmlns:r="http://schemas.openxmlformats.org/officeDocument/2006/relationships" xmlns:p="http://schemas.openxmlformats.org/presentationml/2006/main">
+  <p:cSld>
+    <p:bg>
+      <p:bgPr>
+        <a:solidFill>
+          <a:srgbClr val="D9EAD3"/>
+        </a:solidFill>
+        <a:effectLst/>
+      </p:bgPr>
+    </p:bg>
+    <p:spTree>
+      <p:nvGrpSpPr>
+        <p:cNvPr id="1" name="Shape 83"/>
+        <p:cNvGrpSpPr/>
+        <p:nvPr/>
+      </p:nvGrpSpPr>
+      <p:grpSpPr>
+        <a:xfrm>
+          <a:off x="0" y="0"/>
+          <a:ext cx="0" cy="0"/>
+          <a:chOff x="0" y="0"/>
+          <a:chExt cx="0" cy="0"/>
+        </a:xfrm>
+      </p:grpSpPr>
+      <p:sp>
+        <p:nvSpPr>
+          <p:cNvPr id="84" name="Google Shape;84;p18"/>
+          <p:cNvSpPr txBox="1">
+            <a:spLocks noGrp="1"/>
+          </p:cNvSpPr>
+          <p:nvPr>
+            <p:ph type="title"/>
+          </p:nvPr>
+        </p:nvSpPr>
+        <p:spPr>
+          <a:xfrm>
+            <a:off x="311700" y="445025"/>
+            <a:ext cx="8520600" cy="572700"/>
+          </a:xfrm>
+          <a:prstGeom prst="rect">
+            <a:avLst/>
+          </a:prstGeom>
+        </p:spPr>
+        <p:txBody>
+          <a:bodyPr spcFirstLastPara="1" wrap="square" lIns="91425" tIns="91425" rIns="91425" bIns="91425" anchor="t" anchorCtr="0">
+            <a:noAutofit/>
+          </a:bodyPr>
+          <a:lstStyle/>
+          <a:p>
+            <a:pPr marL="0" lvl="0" indent="0" algn="l" rtl="0">
+              <a:spcBef>
+                <a:spcPts val="0"/>
+              </a:spcBef>
+              <a:spcAft>
+                <a:spcPts val="0"/>
+              </a:spcAft>
+              <a:buNone/>
+            </a:pPr>
+            <a:r>
+              <a:rPr lang="en-NZ" dirty="0"/>
+              <a:t>Python convention testing (PEP8)</a:t>
+            </a:r>
+            <a:endParaRPr dirty="0"/>
+          </a:p>
+        </p:txBody>
+      </p:sp>
+      <p:sp>
+        <p:nvSpPr>
+          <p:cNvPr id="85" name="Google Shape;85;p18"/>
+          <p:cNvSpPr txBox="1">
+            <a:spLocks noGrp="1"/>
+          </p:cNvSpPr>
+          <p:nvPr>
+            <p:ph type="body" idx="1"/>
+          </p:nvPr>
+        </p:nvSpPr>
+        <p:spPr>
+          <a:xfrm>
+            <a:off x="311700" y="1152475"/>
+            <a:ext cx="8464200" cy="3739200"/>
+          </a:xfrm>
+          <a:prstGeom prst="rect">
+            <a:avLst/>
+          </a:prstGeom>
+        </p:spPr>
+        <p:txBody>
+          <a:bodyPr spcFirstLastPara="1" wrap="square" lIns="91425" tIns="91425" rIns="91425" bIns="91425" anchor="t" anchorCtr="0">
+            <a:noAutofit/>
+          </a:bodyPr>
+          <a:lstStyle/>
+          <a:p>
+            <a:pPr marL="0" lvl="0" indent="0" algn="l" rtl="0">
+              <a:spcBef>
+                <a:spcPts val="0"/>
+              </a:spcBef>
+              <a:spcAft>
+                <a:spcPts val="1600"/>
+              </a:spcAft>
+              <a:buNone/>
+            </a:pPr>
+            <a:r>
+              <a:rPr lang="en-NZ" i="1" dirty="0"/>
+              <a:t>Screenshot of errors</a:t>
+            </a:r>
+            <a:endParaRPr i="1" dirty="0"/>
+          </a:p>
+        </p:txBody>
+      </p:sp>
+    </p:spTree>
+    <p:extLst>
+      <p:ext uri="{BB962C8B-B14F-4D97-AF65-F5344CB8AC3E}">
+        <p14:creationId xmlns:p14="http://schemas.microsoft.com/office/powerpoint/2010/main" val="2203232476"/>
+      </p:ext>
+    </p:extLst>
+  </p:cSld>
+  <p:clrMapOvr>
+    <a:masterClrMapping/>
+  </p:clrMapOvr>
+</p:sld>
+</file>
+
+<file path=ppt/slides/slide51.xml><?xml version="1.0" encoding="utf-8"?>
+<p:sld xmlns:a="http://schemas.openxmlformats.org/drawingml/2006/main" xmlns:r="http://schemas.openxmlformats.org/officeDocument/2006/relationships" xmlns:p="http://schemas.openxmlformats.org/presentationml/2006/main">
+  <p:cSld>
+    <p:bg>
+      <p:bgPr>
+        <a:solidFill>
+          <a:srgbClr val="D9EAD3"/>
+        </a:solidFill>
+        <a:effectLst/>
+      </p:bgPr>
+    </p:bg>
+    <p:spTree>
+      <p:nvGrpSpPr>
+        <p:cNvPr id="1" name="Shape 83"/>
+        <p:cNvGrpSpPr/>
+        <p:nvPr/>
+      </p:nvGrpSpPr>
+      <p:grpSpPr>
+        <a:xfrm>
+          <a:off x="0" y="0"/>
+          <a:ext cx="0" cy="0"/>
+          <a:chOff x="0" y="0"/>
+          <a:chExt cx="0" cy="0"/>
+        </a:xfrm>
+      </p:grpSpPr>
+      <p:sp>
+        <p:nvSpPr>
+          <p:cNvPr id="84" name="Google Shape;84;p18"/>
+          <p:cNvSpPr txBox="1">
+            <a:spLocks noGrp="1"/>
+          </p:cNvSpPr>
+          <p:nvPr>
+            <p:ph type="title"/>
+          </p:nvPr>
+        </p:nvSpPr>
+        <p:spPr>
+          <a:xfrm>
+            <a:off x="311700" y="445025"/>
+            <a:ext cx="8520600" cy="572700"/>
+          </a:xfrm>
+          <a:prstGeom prst="rect">
+            <a:avLst/>
+          </a:prstGeom>
+        </p:spPr>
+        <p:txBody>
+          <a:bodyPr spcFirstLastPara="1" wrap="square" lIns="91425" tIns="91425" rIns="91425" bIns="91425" anchor="t" anchorCtr="0">
+            <a:noAutofit/>
+          </a:bodyPr>
+          <a:lstStyle/>
+          <a:p>
+            <a:pPr marL="0" lvl="0" indent="0" algn="l" rtl="0">
+              <a:spcBef>
+                <a:spcPts val="0"/>
+              </a:spcBef>
+              <a:spcAft>
+                <a:spcPts val="0"/>
+              </a:spcAft>
+              <a:buNone/>
+            </a:pPr>
+            <a:r>
+              <a:rPr lang="en-NZ" dirty="0"/>
+              <a:t>Python convention testing (PEP8)</a:t>
+            </a:r>
+            <a:endParaRPr dirty="0"/>
+          </a:p>
+        </p:txBody>
+      </p:sp>
+      <p:sp>
+        <p:nvSpPr>
+          <p:cNvPr id="85" name="Google Shape;85;p18"/>
+          <p:cNvSpPr txBox="1">
+            <a:spLocks noGrp="1"/>
+          </p:cNvSpPr>
+          <p:nvPr>
+            <p:ph type="body" idx="1"/>
+          </p:nvPr>
+        </p:nvSpPr>
+        <p:spPr>
+          <a:xfrm>
+            <a:off x="311700" y="1152475"/>
+            <a:ext cx="8464200" cy="3739200"/>
+          </a:xfrm>
+          <a:prstGeom prst="rect">
+            <a:avLst/>
+          </a:prstGeom>
+        </p:spPr>
+        <p:txBody>
+          <a:bodyPr spcFirstLastPara="1" wrap="square" lIns="91425" tIns="91425" rIns="91425" bIns="91425" anchor="t" anchorCtr="0">
+            <a:noAutofit/>
+          </a:bodyPr>
+          <a:lstStyle/>
+          <a:p>
+            <a:pPr marL="0" lvl="0" indent="0" algn="l" rtl="0">
+              <a:spcBef>
+                <a:spcPts val="0"/>
+              </a:spcBef>
+              <a:spcAft>
+                <a:spcPts val="1600"/>
+              </a:spcAft>
+              <a:buNone/>
+            </a:pPr>
+            <a:r>
+              <a:rPr lang="en-NZ" i="1" dirty="0"/>
+              <a:t>Screenshot after errors fixed</a:t>
+            </a:r>
+            <a:endParaRPr i="1" dirty="0"/>
+          </a:p>
+        </p:txBody>
+      </p:sp>
+    </p:spTree>
+    <p:extLst>
+      <p:ext uri="{BB962C8B-B14F-4D97-AF65-F5344CB8AC3E}">
+        <p14:creationId xmlns:p14="http://schemas.microsoft.com/office/powerpoint/2010/main" val="2422592500"/>
+      </p:ext>
+    </p:extLst>
+  </p:cSld>
+  <p:clrMapOvr>
+    <a:masterClrMapping/>
+  </p:clrMapOvr>
+</p:sld>
+</file>
+
+<file path=ppt/slides/slide52.xml><?xml version="1.0" encoding="utf-8"?>
+<p:sld xmlns:a="http://schemas.openxmlformats.org/drawingml/2006/main" xmlns:r="http://schemas.openxmlformats.org/officeDocument/2006/relationships" xmlns:p="http://schemas.openxmlformats.org/presentationml/2006/main">
+  <p:cSld>
+    <p:bg>
+      <p:bgPr>
+        <a:solidFill>
+          <a:srgbClr val="FFE599"/>
+        </a:solidFill>
+        <a:effectLst/>
+      </p:bgPr>
+    </p:bg>
+    <p:spTree>
+      <p:nvGrpSpPr>
+        <p:cNvPr id="1" name="Shape 89"/>
+        <p:cNvGrpSpPr/>
+        <p:nvPr/>
+      </p:nvGrpSpPr>
+      <p:grpSpPr>
+        <a:xfrm>
+          <a:off x="0" y="0"/>
+          <a:ext cx="0" cy="0"/>
+          <a:chOff x="0" y="0"/>
+          <a:chExt cx="0" cy="0"/>
+        </a:xfrm>
+      </p:grpSpPr>
+      <p:sp>
+        <p:nvSpPr>
+          <p:cNvPr id="90" name="Google Shape;90;p19"/>
+          <p:cNvSpPr txBox="1">
+            <a:spLocks noGrp="1"/>
+          </p:cNvSpPr>
+          <p:nvPr>
+            <p:ph type="body" idx="1"/>
+          </p:nvPr>
+        </p:nvSpPr>
+        <p:spPr>
+          <a:xfrm>
+            <a:off x="311700" y="397700"/>
+            <a:ext cx="8520600" cy="4171200"/>
+          </a:xfrm>
+          <a:prstGeom prst="rect">
+            <a:avLst/>
+          </a:prstGeom>
+        </p:spPr>
+        <p:txBody>
+          <a:bodyPr spcFirstLastPara="1" wrap="square" lIns="91425" tIns="91425" rIns="91425" bIns="91425" anchor="t" anchorCtr="0">
+            <a:noAutofit/>
+          </a:bodyPr>
+          <a:lstStyle/>
+          <a:p>
+            <a:pPr marL="0" lvl="0" indent="0" algn="l" rtl="0">
+              <a:spcBef>
+                <a:spcPts val="0"/>
+              </a:spcBef>
+              <a:spcAft>
+                <a:spcPts val="1600"/>
+              </a:spcAft>
+              <a:buNone/>
+            </a:pPr>
+            <a:r>
+              <a:rPr lang="en" b="1" i="1">
+                <a:solidFill>
+                  <a:srgbClr val="595959"/>
+                </a:solidFill>
+              </a:rPr>
+              <a:t>Discusses how the information from planning, testing and trialling of components assisted in the development of a high-quality outcome</a:t>
+            </a:r>
+            <a:endParaRPr/>
+          </a:p>
+        </p:txBody>
+      </p:sp>
+    </p:spTree>
   </p:cSld>
   <p:clrMapOvr>
     <a:masterClrMapping/>

</xml_diff>

<commit_message>
Integrated delivery v2.py to main app
Created delivery version 2 and integrated delivery info into main app.
</commit_message>
<xml_diff>
--- a/Danett Pepito - 000_91896 _ 91897 Documentation - 2150400 (Git).pptx
+++ b/Danett Pepito - 000_91896 _ 91897 Documentation - 2150400 (Git).pptx
@@ -5,7 +5,7 @@
     <p:sldMasterId id="2147483659" r:id="rId1"/>
   </p:sldMasterIdLst>
   <p:notesMasterIdLst>
-    <p:notesMasterId r:id="rId56"/>
+    <p:notesMasterId r:id="rId58"/>
   </p:notesMasterIdLst>
   <p:sldIdLst>
     <p:sldId id="256" r:id="rId2"/>
@@ -47,21 +47,23 @@
     <p:sldId id="277" r:id="rId38"/>
     <p:sldId id="311" r:id="rId39"/>
     <p:sldId id="312" r:id="rId40"/>
-    <p:sldId id="278" r:id="rId41"/>
-    <p:sldId id="279" r:id="rId42"/>
-    <p:sldId id="280" r:id="rId43"/>
-    <p:sldId id="281" r:id="rId44"/>
-    <p:sldId id="282" r:id="rId45"/>
-    <p:sldId id="288" r:id="rId46"/>
-    <p:sldId id="290" r:id="rId47"/>
-    <p:sldId id="292" r:id="rId48"/>
-    <p:sldId id="291" r:id="rId49"/>
-    <p:sldId id="285" r:id="rId50"/>
-    <p:sldId id="261" r:id="rId51"/>
-    <p:sldId id="284" r:id="rId52"/>
-    <p:sldId id="286" r:id="rId53"/>
-    <p:sldId id="287" r:id="rId54"/>
-    <p:sldId id="262" r:id="rId55"/>
+    <p:sldId id="313" r:id="rId41"/>
+    <p:sldId id="314" r:id="rId42"/>
+    <p:sldId id="278" r:id="rId43"/>
+    <p:sldId id="279" r:id="rId44"/>
+    <p:sldId id="280" r:id="rId45"/>
+    <p:sldId id="281" r:id="rId46"/>
+    <p:sldId id="282" r:id="rId47"/>
+    <p:sldId id="288" r:id="rId48"/>
+    <p:sldId id="290" r:id="rId49"/>
+    <p:sldId id="292" r:id="rId50"/>
+    <p:sldId id="291" r:id="rId51"/>
+    <p:sldId id="285" r:id="rId52"/>
+    <p:sldId id="261" r:id="rId53"/>
+    <p:sldId id="284" r:id="rId54"/>
+    <p:sldId id="286" r:id="rId55"/>
+    <p:sldId id="287" r:id="rId56"/>
+    <p:sldId id="262" r:id="rId57"/>
   </p:sldIdLst>
   <p:sldSz cx="9144000" cy="5143500" type="screen16x9"/>
   <p:notesSz cx="6858000" cy="9144000"/>
@@ -316,7 +318,7 @@
 <file path=ppt/revisionInfo.xml><?xml version="1.0" encoding="utf-8"?>
 <p1510:revInfo xmlns:a="http://schemas.openxmlformats.org/drawingml/2006/main" xmlns:r="http://schemas.openxmlformats.org/officeDocument/2006/relationships" xmlns:p1510="http://schemas.microsoft.com/office/powerpoint/2015/10/main">
   <p1510:revLst>
-    <p1510:client id="{B2185394-3AFD-42B2-9285-3B672C598A56}" v="12" dt="2022-03-21T05:52:06.063"/>
+    <p1510:client id="{B2185394-3AFD-42B2-9285-3B672C598A56}" v="14" dt="2022-03-21T06:07:11.845"/>
   </p1510:revLst>
 </p1510:revInfo>
 </file>
@@ -326,7 +328,7 @@
   <pc:docChgLst>
     <pc:chgData name="Danett Pepito" userId="ddef1e2176689e9a" providerId="LiveId" clId="{B2185394-3AFD-42B2-9285-3B672C598A56}"/>
     <pc:docChg chg="undo custSel addSld delSld modSld sldOrd">
-      <pc:chgData name="Danett Pepito" userId="ddef1e2176689e9a" providerId="LiveId" clId="{B2185394-3AFD-42B2-9285-3B672C598A56}" dt="2022-03-21T05:52:55.592" v="898" actId="20577"/>
+      <pc:chgData name="Danett Pepito" userId="ddef1e2176689e9a" providerId="LiveId" clId="{B2185394-3AFD-42B2-9285-3B672C598A56}" dt="2022-03-21T06:29:46.681" v="1018" actId="20577"/>
       <pc:docMkLst>
         <pc:docMk/>
       </pc:docMkLst>
@@ -596,7 +598,7 @@
         </pc:picChg>
       </pc:sldChg>
       <pc:sldChg chg="addSp modSp mod">
-        <pc:chgData name="Danett Pepito" userId="ddef1e2176689e9a" providerId="LiveId" clId="{B2185394-3AFD-42B2-9285-3B672C598A56}" dt="2022-03-21T05:52:52.850" v="896" actId="20577"/>
+        <pc:chgData name="Danett Pepito" userId="ddef1e2176689e9a" providerId="LiveId" clId="{B2185394-3AFD-42B2-9285-3B672C598A56}" dt="2022-03-21T06:05:24.220" v="936" actId="1076"/>
         <pc:sldMkLst>
           <pc:docMk/>
           <pc:sldMk cId="1404000423" sldId="277"/>
@@ -610,7 +612,7 @@
           </ac:spMkLst>
         </pc:spChg>
         <pc:graphicFrameChg chg="mod modGraphic">
-          <ac:chgData name="Danett Pepito" userId="ddef1e2176689e9a" providerId="LiveId" clId="{B2185394-3AFD-42B2-9285-3B672C598A56}" dt="2022-03-21T05:52:32.077" v="884" actId="14734"/>
+          <ac:chgData name="Danett Pepito" userId="ddef1e2176689e9a" providerId="LiveId" clId="{B2185394-3AFD-42B2-9285-3B672C598A56}" dt="2022-03-21T06:05:24.220" v="936" actId="1076"/>
           <ac:graphicFrameMkLst>
             <pc:docMk/>
             <pc:sldMk cId="1404000423" sldId="277"/>
@@ -1336,8 +1338,8 @@
           </ac:picMkLst>
         </pc:picChg>
       </pc:sldChg>
-      <pc:sldChg chg="delSp modSp add mod">
-        <pc:chgData name="Danett Pepito" userId="ddef1e2176689e9a" providerId="LiveId" clId="{B2185394-3AFD-42B2-9285-3B672C598A56}" dt="2022-03-21T05:52:55.592" v="898" actId="20577"/>
+      <pc:sldChg chg="addSp delSp modSp add mod">
+        <pc:chgData name="Danett Pepito" userId="ddef1e2176689e9a" providerId="LiveId" clId="{B2185394-3AFD-42B2-9285-3B672C598A56}" dt="2022-03-21T05:56:26.696" v="901" actId="1076"/>
         <pc:sldMkLst>
           <pc:docMk/>
           <pc:sldMk cId="3730808626" sldId="311"/>
@@ -1358,9 +1360,17 @@
             <ac:picMk id="3" creationId="{12BC0CF6-5495-4249-B6A4-3779259330E7}"/>
           </ac:picMkLst>
         </pc:picChg>
+        <pc:picChg chg="add mod">
+          <ac:chgData name="Danett Pepito" userId="ddef1e2176689e9a" providerId="LiveId" clId="{B2185394-3AFD-42B2-9285-3B672C598A56}" dt="2022-03-21T05:56:26.696" v="901" actId="1076"/>
+          <ac:picMkLst>
+            <pc:docMk/>
+            <pc:sldMk cId="3730808626" sldId="311"/>
+            <ac:picMk id="3" creationId="{B3C142D6-9D85-4BE9-B51A-923F69DDFD63}"/>
+          </ac:picMkLst>
+        </pc:picChg>
       </pc:sldChg>
-      <pc:sldChg chg="delSp modSp add del mod replId">
-        <pc:chgData name="Danett Pepito" userId="ddef1e2176689e9a" providerId="LiveId" clId="{B2185394-3AFD-42B2-9285-3B672C598A56}" dt="2022-03-21T05:52:46.942" v="892" actId="20577"/>
+      <pc:sldChg chg="addSp delSp modSp add del mod replId">
+        <pc:chgData name="Danett Pepito" userId="ddef1e2176689e9a" providerId="LiveId" clId="{B2185394-3AFD-42B2-9285-3B672C598A56}" dt="2022-03-21T06:05:07.932" v="916" actId="255"/>
         <pc:sldMkLst>
           <pc:docMk/>
           <pc:sldMk cId="1330650754" sldId="312"/>
@@ -1373,6 +1383,14 @@
             <ac:spMk id="78" creationId="{00000000-0000-0000-0000-000000000000}"/>
           </ac:spMkLst>
         </pc:spChg>
+        <pc:graphicFrameChg chg="mod modGraphic">
+          <ac:chgData name="Danett Pepito" userId="ddef1e2176689e9a" providerId="LiveId" clId="{B2185394-3AFD-42B2-9285-3B672C598A56}" dt="2022-03-21T06:05:07.932" v="916" actId="255"/>
+          <ac:graphicFrameMkLst>
+            <pc:docMk/>
+            <pc:sldMk cId="1330650754" sldId="312"/>
+            <ac:graphicFrameMk id="79" creationId="{00000000-0000-0000-0000-000000000000}"/>
+          </ac:graphicFrameMkLst>
+        </pc:graphicFrameChg>
         <pc:picChg chg="del">
           <ac:chgData name="Danett Pepito" userId="ddef1e2176689e9a" providerId="LiveId" clId="{B2185394-3AFD-42B2-9285-3B672C598A56}" dt="2022-03-21T05:52:44.062" v="889" actId="478"/>
           <ac:picMkLst>
@@ -1381,12 +1399,130 @@
             <ac:picMk id="4" creationId="{463C1742-A708-41CF-9ECC-241D0A961BE3}"/>
           </ac:picMkLst>
         </pc:picChg>
+        <pc:picChg chg="add mod">
+          <ac:chgData name="Danett Pepito" userId="ddef1e2176689e9a" providerId="LiveId" clId="{B2185394-3AFD-42B2-9285-3B672C598A56}" dt="2022-03-21T06:02:48.150" v="906" actId="1076"/>
+          <ac:picMkLst>
+            <pc:docMk/>
+            <pc:sldMk cId="1330650754" sldId="312"/>
+            <ac:picMk id="4" creationId="{AC69039C-5354-42EA-95BB-F62430D6870E}"/>
+          </ac:picMkLst>
+        </pc:picChg>
         <pc:picChg chg="del">
           <ac:chgData name="Danett Pepito" userId="ddef1e2176689e9a" providerId="LiveId" clId="{B2185394-3AFD-42B2-9285-3B672C598A56}" dt="2022-03-21T05:52:45.283" v="890" actId="478"/>
           <ac:picMkLst>
             <pc:docMk/>
             <pc:sldMk cId="1330650754" sldId="312"/>
             <ac:picMk id="6" creationId="{242499B0-BCEA-4632-B876-887D6A7F5B6E}"/>
+          </ac:picMkLst>
+        </pc:picChg>
+        <pc:picChg chg="add del mod">
+          <ac:chgData name="Danett Pepito" userId="ddef1e2176689e9a" providerId="LiveId" clId="{B2185394-3AFD-42B2-9285-3B672C598A56}" dt="2022-03-21T06:03:33.300" v="911" actId="478"/>
+          <ac:picMkLst>
+            <pc:docMk/>
+            <pc:sldMk cId="1330650754" sldId="312"/>
+            <ac:picMk id="6" creationId="{99C216D6-9F35-424A-AD5E-959732D3FC1D}"/>
+          </ac:picMkLst>
+        </pc:picChg>
+        <pc:picChg chg="add mod">
+          <ac:chgData name="Danett Pepito" userId="ddef1e2176689e9a" providerId="LiveId" clId="{B2185394-3AFD-42B2-9285-3B672C598A56}" dt="2022-03-21T06:04:53.347" v="913" actId="1076"/>
+          <ac:picMkLst>
+            <pc:docMk/>
+            <pc:sldMk cId="1330650754" sldId="312"/>
+            <ac:picMk id="8" creationId="{452EB439-AC1C-4D13-AD5D-6E8768CA3DB1}"/>
+          </ac:picMkLst>
+        </pc:picChg>
+      </pc:sldChg>
+      <pc:sldChg chg="addSp delSp modSp add mod">
+        <pc:chgData name="Danett Pepito" userId="ddef1e2176689e9a" providerId="LiveId" clId="{B2185394-3AFD-42B2-9285-3B672C598A56}" dt="2022-03-21T06:06:58.376" v="1000" actId="1076"/>
+        <pc:sldMkLst>
+          <pc:docMk/>
+          <pc:sldMk cId="58051393" sldId="313"/>
+        </pc:sldMkLst>
+        <pc:spChg chg="mod">
+          <ac:chgData name="Danett Pepito" userId="ddef1e2176689e9a" providerId="LiveId" clId="{B2185394-3AFD-42B2-9285-3B672C598A56}" dt="2022-03-21T06:06:58.376" v="1000" actId="1076"/>
+          <ac:spMkLst>
+            <pc:docMk/>
+            <pc:sldMk cId="58051393" sldId="313"/>
+            <ac:spMk id="73" creationId="{00000000-0000-0000-0000-000000000000}"/>
+          </ac:spMkLst>
+        </pc:spChg>
+        <pc:picChg chg="del">
+          <ac:chgData name="Danett Pepito" userId="ddef1e2176689e9a" providerId="LiveId" clId="{B2185394-3AFD-42B2-9285-3B672C598A56}" dt="2022-03-21T06:05:46.841" v="938" actId="478"/>
+          <ac:picMkLst>
+            <pc:docMk/>
+            <pc:sldMk cId="58051393" sldId="313"/>
+            <ac:picMk id="3" creationId="{B3C142D6-9D85-4BE9-B51A-923F69DDFD63}"/>
+          </ac:picMkLst>
+        </pc:picChg>
+        <pc:picChg chg="add mod">
+          <ac:chgData name="Danett Pepito" userId="ddef1e2176689e9a" providerId="LiveId" clId="{B2185394-3AFD-42B2-9285-3B672C598A56}" dt="2022-03-21T06:06:28.393" v="943" actId="1076"/>
+          <ac:picMkLst>
+            <pc:docMk/>
+            <pc:sldMk cId="58051393" sldId="313"/>
+            <ac:picMk id="4" creationId="{2CF17A88-2D73-46FD-86D5-494D8EEC2FE3}"/>
+          </ac:picMkLst>
+        </pc:picChg>
+        <pc:picChg chg="mod">
+          <ac:chgData name="Danett Pepito" userId="ddef1e2176689e9a" providerId="LiveId" clId="{B2185394-3AFD-42B2-9285-3B672C598A56}" dt="2022-03-21T06:06:32.134" v="945" actId="1076"/>
+          <ac:picMkLst>
+            <pc:docMk/>
+            <pc:sldMk cId="58051393" sldId="313"/>
+            <ac:picMk id="5" creationId="{8EE7B4AD-6335-4B18-BA5E-8FD1B5D6A4FC}"/>
+          </ac:picMkLst>
+        </pc:picChg>
+      </pc:sldChg>
+      <pc:sldChg chg="addSp delSp modSp add mod replId">
+        <pc:chgData name="Danett Pepito" userId="ddef1e2176689e9a" providerId="LiveId" clId="{B2185394-3AFD-42B2-9285-3B672C598A56}" dt="2022-03-21T06:29:46.681" v="1018" actId="20577"/>
+        <pc:sldMkLst>
+          <pc:docMk/>
+          <pc:sldMk cId="2389219004" sldId="314"/>
+        </pc:sldMkLst>
+        <pc:spChg chg="mod">
+          <ac:chgData name="Danett Pepito" userId="ddef1e2176689e9a" providerId="LiveId" clId="{B2185394-3AFD-42B2-9285-3B672C598A56}" dt="2022-03-21T06:29:46.681" v="1018" actId="20577"/>
+          <ac:spMkLst>
+            <pc:docMk/>
+            <pc:sldMk cId="2389219004" sldId="314"/>
+            <ac:spMk id="78" creationId="{00000000-0000-0000-0000-000000000000}"/>
+          </ac:spMkLst>
+        </pc:spChg>
+        <pc:graphicFrameChg chg="mod modGraphic">
+          <ac:chgData name="Danett Pepito" userId="ddef1e2176689e9a" providerId="LiveId" clId="{B2185394-3AFD-42B2-9285-3B672C598A56}" dt="2022-03-21T06:07:20.326" v="1004" actId="1076"/>
+          <ac:graphicFrameMkLst>
+            <pc:docMk/>
+            <pc:sldMk cId="2389219004" sldId="314"/>
+            <ac:graphicFrameMk id="79" creationId="{00000000-0000-0000-0000-000000000000}"/>
+          </ac:graphicFrameMkLst>
+        </pc:graphicFrameChg>
+        <pc:picChg chg="del">
+          <ac:chgData name="Danett Pepito" userId="ddef1e2176689e9a" providerId="LiveId" clId="{B2185394-3AFD-42B2-9285-3B672C598A56}" dt="2022-03-21T06:05:48.710" v="939" actId="478"/>
+          <ac:picMkLst>
+            <pc:docMk/>
+            <pc:sldMk cId="2389219004" sldId="314"/>
+            <ac:picMk id="4" creationId="{AC69039C-5354-42EA-95BB-F62430D6870E}"/>
+          </ac:picMkLst>
+        </pc:picChg>
+        <pc:picChg chg="add mod">
+          <ac:chgData name="Danett Pepito" userId="ddef1e2176689e9a" providerId="LiveId" clId="{B2185394-3AFD-42B2-9285-3B672C598A56}" dt="2022-03-21T06:13:42.795" v="1016" actId="1076"/>
+          <ac:picMkLst>
+            <pc:docMk/>
+            <pc:sldMk cId="2389219004" sldId="314"/>
+            <ac:picMk id="5" creationId="{D94F3457-D588-42BA-8C34-E0E46FA3BA16}"/>
+          </ac:picMkLst>
+        </pc:picChg>
+        <pc:picChg chg="add mod">
+          <ac:chgData name="Danett Pepito" userId="ddef1e2176689e9a" providerId="LiveId" clId="{B2185394-3AFD-42B2-9285-3B672C598A56}" dt="2022-03-21T06:13:40.439" v="1015" actId="1076"/>
+          <ac:picMkLst>
+            <pc:docMk/>
+            <pc:sldMk cId="2389219004" sldId="314"/>
+            <ac:picMk id="7" creationId="{C701F46C-1C5D-4EED-8568-DE766FEC4A99}"/>
+          </ac:picMkLst>
+        </pc:picChg>
+        <pc:picChg chg="del">
+          <ac:chgData name="Danett Pepito" userId="ddef1e2176689e9a" providerId="LiveId" clId="{B2185394-3AFD-42B2-9285-3B672C598A56}" dt="2022-03-21T06:05:49.800" v="940" actId="478"/>
+          <ac:picMkLst>
+            <pc:docMk/>
+            <pc:sldMk cId="2389219004" sldId="314"/>
+            <ac:picMk id="8" creationId="{452EB439-AC1C-4D13-AD5D-6E8768CA3DB1}"/>
           </ac:picMkLst>
         </pc:picChg>
       </pc:sldChg>
@@ -4212,7 +4348,7 @@
               </a:spcAft>
               <a:buNone/>
             </a:pPr>
-            <a:endParaRPr/>
+            <a:endParaRPr dirty="0"/>
           </a:p>
         </p:txBody>
       </p:sp>
@@ -4453,7 +4589,7 @@
     </p:spTree>
     <p:extLst>
       <p:ext uri="{BB962C8B-B14F-4D97-AF65-F5344CB8AC3E}">
-        <p14:creationId xmlns:p14="http://schemas.microsoft.com/office/powerpoint/2010/main" val="698637762"/>
+        <p14:creationId xmlns:p14="http://schemas.microsoft.com/office/powerpoint/2010/main" val="3546823351"/>
       </p:ext>
     </p:extLst>
   </p:cSld>
@@ -4555,14 +4691,14 @@
               </a:spcAft>
               <a:buNone/>
             </a:pPr>
-            <a:endParaRPr/>
+            <a:endParaRPr dirty="0"/>
           </a:p>
         </p:txBody>
       </p:sp>
     </p:spTree>
     <p:extLst>
       <p:ext uri="{BB962C8B-B14F-4D97-AF65-F5344CB8AC3E}">
-        <p14:creationId xmlns:p14="http://schemas.microsoft.com/office/powerpoint/2010/main" val="3726156782"/>
+        <p14:creationId xmlns:p14="http://schemas.microsoft.com/office/powerpoint/2010/main" val="163697452"/>
       </p:ext>
     </p:extLst>
   </p:cSld>
@@ -4671,7 +4807,7 @@
     </p:spTree>
     <p:extLst>
       <p:ext uri="{BB962C8B-B14F-4D97-AF65-F5344CB8AC3E}">
-        <p14:creationId xmlns:p14="http://schemas.microsoft.com/office/powerpoint/2010/main" val="784738588"/>
+        <p14:creationId xmlns:p14="http://schemas.microsoft.com/office/powerpoint/2010/main" val="698637762"/>
       </p:ext>
     </p:extLst>
   </p:cSld>
@@ -4780,7 +4916,7 @@
     </p:spTree>
     <p:extLst>
       <p:ext uri="{BB962C8B-B14F-4D97-AF65-F5344CB8AC3E}">
-        <p14:creationId xmlns:p14="http://schemas.microsoft.com/office/powerpoint/2010/main" val="3494323208"/>
+        <p14:creationId xmlns:p14="http://schemas.microsoft.com/office/powerpoint/2010/main" val="3726156782"/>
       </p:ext>
     </p:extLst>
   </p:cSld>
@@ -4889,7 +5025,7 @@
     </p:spTree>
     <p:extLst>
       <p:ext uri="{BB962C8B-B14F-4D97-AF65-F5344CB8AC3E}">
-        <p14:creationId xmlns:p14="http://schemas.microsoft.com/office/powerpoint/2010/main" val="3006313543"/>
+        <p14:creationId xmlns:p14="http://schemas.microsoft.com/office/powerpoint/2010/main" val="784738588"/>
       </p:ext>
     </p:extLst>
   </p:cSld>
@@ -4904,7 +5040,7 @@
   <p:cSld>
     <p:spTree>
       <p:nvGrpSpPr>
-        <p:cNvPr id="1" name="Shape 69"/>
+        <p:cNvPr id="1" name="Shape 74"/>
         <p:cNvGrpSpPr/>
         <p:nvPr/>
       </p:nvGrpSpPr>
@@ -4918,7 +5054,7 @@
       </p:grpSpPr>
       <p:sp>
         <p:nvSpPr>
-          <p:cNvPr id="70" name="Google Shape;70;gac10fef634_0_16:notes"/>
+          <p:cNvPr id="75" name="Google Shape;75;gac10fef634_0_20:notes"/>
           <p:cNvSpPr>
             <a:spLocks noGrp="1" noRot="1" noChangeAspect="1"/>
           </p:cNvSpPr>
@@ -4959,7 +5095,7 @@
       </p:sp>
       <p:sp>
         <p:nvSpPr>
-          <p:cNvPr id="71" name="Google Shape;71;gac10fef634_0_16:notes"/>
+          <p:cNvPr id="76" name="Google Shape;76;gac10fef634_0_20:notes"/>
           <p:cNvSpPr txBox="1">
             <a:spLocks noGrp="1"/>
           </p:cNvSpPr>
@@ -4998,7 +5134,7 @@
     </p:spTree>
     <p:extLst>
       <p:ext uri="{BB962C8B-B14F-4D97-AF65-F5344CB8AC3E}">
-        <p14:creationId xmlns:p14="http://schemas.microsoft.com/office/powerpoint/2010/main" val="2149026663"/>
+        <p14:creationId xmlns:p14="http://schemas.microsoft.com/office/powerpoint/2010/main" val="3494323208"/>
       </p:ext>
     </p:extLst>
   </p:cSld>
@@ -5107,7 +5243,7 @@
     </p:spTree>
     <p:extLst>
       <p:ext uri="{BB962C8B-B14F-4D97-AF65-F5344CB8AC3E}">
-        <p14:creationId xmlns:p14="http://schemas.microsoft.com/office/powerpoint/2010/main" val="3194274356"/>
+        <p14:creationId xmlns:p14="http://schemas.microsoft.com/office/powerpoint/2010/main" val="3006313543"/>
       </p:ext>
     </p:extLst>
   </p:cSld>
@@ -5216,7 +5352,7 @@
     </p:spTree>
     <p:extLst>
       <p:ext uri="{BB962C8B-B14F-4D97-AF65-F5344CB8AC3E}">
-        <p14:creationId xmlns:p14="http://schemas.microsoft.com/office/powerpoint/2010/main" val="3014292639"/>
+        <p14:creationId xmlns:p14="http://schemas.microsoft.com/office/powerpoint/2010/main" val="2149026663"/>
       </p:ext>
     </p:extLst>
   </p:cSld>
@@ -5231,7 +5367,7 @@
   <p:cSld>
     <p:spTree>
       <p:nvGrpSpPr>
-        <p:cNvPr id="1" name="Shape 80"/>
+        <p:cNvPr id="1" name="Shape 69"/>
         <p:cNvGrpSpPr/>
         <p:nvPr/>
       </p:nvGrpSpPr>
@@ -5245,7 +5381,7 @@
       </p:grpSpPr>
       <p:sp>
         <p:nvSpPr>
-          <p:cNvPr id="81" name="Google Shape;81;gac10fef634_0_25:notes"/>
+          <p:cNvPr id="70" name="Google Shape;70;gac10fef634_0_16:notes"/>
           <p:cNvSpPr>
             <a:spLocks noGrp="1" noRot="1" noChangeAspect="1"/>
           </p:cNvSpPr>
@@ -5286,7 +5422,7 @@
       </p:sp>
       <p:sp>
         <p:nvSpPr>
-          <p:cNvPr id="82" name="Google Shape;82;gac10fef634_0_25:notes"/>
+          <p:cNvPr id="71" name="Google Shape;71;gac10fef634_0_16:notes"/>
           <p:cNvSpPr txBox="1">
             <a:spLocks noGrp="1"/>
           </p:cNvSpPr>
@@ -5316,27 +5452,6 @@
               <a:spcAft>
                 <a:spcPts val="0"/>
               </a:spcAft>
-              <a:buClr>
-                <a:schemeClr val="dk1"/>
-              </a:buClr>
-              <a:buSzPts val="1100"/>
-              <a:buFont typeface="Arial"/>
-              <a:buNone/>
-            </a:pPr>
-            <a:r>
-              <a:rPr lang="en"/>
-              <a:t>Your version control evidence should go here.  This could be in the form of annotated screenshots which show you you managed this process or you could make a brief screencast explaining how you implemented version control.</a:t>
-            </a:r>
-            <a:endParaRPr/>
-          </a:p>
-          <a:p>
-            <a:pPr marL="0" lvl="0" indent="0" algn="l" rtl="0">
-              <a:spcBef>
-                <a:spcPts val="0"/>
-              </a:spcBef>
-              <a:spcAft>
-                <a:spcPts val="0"/>
-              </a:spcAft>
               <a:buNone/>
             </a:pPr>
             <a:endParaRPr/>
@@ -5344,6 +5459,11 @@
         </p:txBody>
       </p:sp>
     </p:spTree>
+    <p:extLst>
+      <p:ext uri="{BB962C8B-B14F-4D97-AF65-F5344CB8AC3E}">
+        <p14:creationId xmlns:p14="http://schemas.microsoft.com/office/powerpoint/2010/main" val="3194274356"/>
+      </p:ext>
+    </p:extLst>
   </p:cSld>
   <p:clrMapOvr>
     <a:masterClrMapping/>
@@ -5356,7 +5476,7 @@
   <p:cSld>
     <p:spTree>
       <p:nvGrpSpPr>
-        <p:cNvPr id="1" name="Shape 80"/>
+        <p:cNvPr id="1" name="Shape 69"/>
         <p:cNvGrpSpPr/>
         <p:nvPr/>
       </p:nvGrpSpPr>
@@ -5370,7 +5490,7 @@
       </p:grpSpPr>
       <p:sp>
         <p:nvSpPr>
-          <p:cNvPr id="81" name="Google Shape;81;gac10fef634_0_25:notes"/>
+          <p:cNvPr id="70" name="Google Shape;70;gac10fef634_0_16:notes"/>
           <p:cNvSpPr>
             <a:spLocks noGrp="1" noRot="1" noChangeAspect="1"/>
           </p:cNvSpPr>
@@ -5411,7 +5531,7 @@
       </p:sp>
       <p:sp>
         <p:nvSpPr>
-          <p:cNvPr id="82" name="Google Shape;82;gac10fef634_0_25:notes"/>
+          <p:cNvPr id="71" name="Google Shape;71;gac10fef634_0_16:notes"/>
           <p:cNvSpPr txBox="1">
             <a:spLocks noGrp="1"/>
           </p:cNvSpPr>
@@ -5433,27 +5553,6 @@
             <a:noAutofit/>
           </a:bodyPr>
           <a:lstStyle/>
-          <a:p>
-            <a:pPr marL="0" lvl="0" indent="0" algn="l" rtl="0">
-              <a:spcBef>
-                <a:spcPts val="0"/>
-              </a:spcBef>
-              <a:spcAft>
-                <a:spcPts val="0"/>
-              </a:spcAft>
-              <a:buClr>
-                <a:schemeClr val="dk1"/>
-              </a:buClr>
-              <a:buSzPts val="1100"/>
-              <a:buFont typeface="Arial"/>
-              <a:buNone/>
-            </a:pPr>
-            <a:r>
-              <a:rPr lang="en"/>
-              <a:t>Your version control evidence should go here.  This could be in the form of annotated screenshots which show you you managed this process or you could make a brief screencast explaining how you implemented version control.</a:t>
-            </a:r>
-            <a:endParaRPr/>
-          </a:p>
           <a:p>
             <a:pPr marL="0" lvl="0" indent="0" algn="l" rtl="0">
               <a:spcBef>
@@ -5471,7 +5570,7 @@
     </p:spTree>
     <p:extLst>
       <p:ext uri="{BB962C8B-B14F-4D97-AF65-F5344CB8AC3E}">
-        <p14:creationId xmlns:p14="http://schemas.microsoft.com/office/powerpoint/2010/main" val="511959585"/>
+        <p14:creationId xmlns:p14="http://schemas.microsoft.com/office/powerpoint/2010/main" val="3014292639"/>
       </p:ext>
     </p:extLst>
   </p:cSld>
@@ -5703,6 +5802,261 @@
         </p:txBody>
       </p:sp>
     </p:spTree>
+  </p:cSld>
+  <p:clrMapOvr>
+    <a:masterClrMapping/>
+  </p:clrMapOvr>
+</p:notes>
+</file>
+
+<file path=ppt/notesSlides/notesSlide41.xml><?xml version="1.0" encoding="utf-8"?>
+<p:notes xmlns:a="http://schemas.openxmlformats.org/drawingml/2006/main" xmlns:r="http://schemas.openxmlformats.org/officeDocument/2006/relationships" xmlns:p="http://schemas.openxmlformats.org/presentationml/2006/main" showMasterSp="0" showMasterPhAnim="0">
+  <p:cSld>
+    <p:spTree>
+      <p:nvGrpSpPr>
+        <p:cNvPr id="1" name="Shape 80"/>
+        <p:cNvGrpSpPr/>
+        <p:nvPr/>
+      </p:nvGrpSpPr>
+      <p:grpSpPr>
+        <a:xfrm>
+          <a:off x="0" y="0"/>
+          <a:ext cx="0" cy="0"/>
+          <a:chOff x="0" y="0"/>
+          <a:chExt cx="0" cy="0"/>
+        </a:xfrm>
+      </p:grpSpPr>
+      <p:sp>
+        <p:nvSpPr>
+          <p:cNvPr id="81" name="Google Shape;81;gac10fef634_0_25:notes"/>
+          <p:cNvSpPr>
+            <a:spLocks noGrp="1" noRot="1" noChangeAspect="1"/>
+          </p:cNvSpPr>
+          <p:nvPr>
+            <p:ph type="sldImg" idx="2"/>
+          </p:nvPr>
+        </p:nvSpPr>
+        <p:spPr>
+          <a:xfrm>
+            <a:off x="381000" y="685800"/>
+            <a:ext cx="6096000" cy="3429000"/>
+          </a:xfrm>
+          <a:custGeom>
+            <a:avLst/>
+            <a:gdLst/>
+            <a:ahLst/>
+            <a:cxnLst/>
+            <a:rect l="l" t="t" r="r" b="b"/>
+            <a:pathLst>
+              <a:path w="120000" h="120000" extrusionOk="0">
+                <a:moveTo>
+                  <a:pt x="0" y="0"/>
+                </a:moveTo>
+                <a:lnTo>
+                  <a:pt x="120000" y="0"/>
+                </a:lnTo>
+                <a:lnTo>
+                  <a:pt x="120000" y="120000"/>
+                </a:lnTo>
+                <a:lnTo>
+                  <a:pt x="0" y="120000"/>
+                </a:lnTo>
+                <a:close/>
+              </a:path>
+            </a:pathLst>
+          </a:custGeom>
+        </p:spPr>
+      </p:sp>
+      <p:sp>
+        <p:nvSpPr>
+          <p:cNvPr id="82" name="Google Shape;82;gac10fef634_0_25:notes"/>
+          <p:cNvSpPr txBox="1">
+            <a:spLocks noGrp="1"/>
+          </p:cNvSpPr>
+          <p:nvPr>
+            <p:ph type="body" idx="1"/>
+          </p:nvPr>
+        </p:nvSpPr>
+        <p:spPr>
+          <a:xfrm>
+            <a:off x="685800" y="4343400"/>
+            <a:ext cx="5486400" cy="4114800"/>
+          </a:xfrm>
+          <a:prstGeom prst="rect">
+            <a:avLst/>
+          </a:prstGeom>
+        </p:spPr>
+        <p:txBody>
+          <a:bodyPr spcFirstLastPara="1" wrap="square" lIns="91425" tIns="91425" rIns="91425" bIns="91425" anchor="t" anchorCtr="0">
+            <a:noAutofit/>
+          </a:bodyPr>
+          <a:lstStyle/>
+          <a:p>
+            <a:pPr marL="0" lvl="0" indent="0" algn="l" rtl="0">
+              <a:spcBef>
+                <a:spcPts val="0"/>
+              </a:spcBef>
+              <a:spcAft>
+                <a:spcPts val="0"/>
+              </a:spcAft>
+              <a:buClr>
+                <a:schemeClr val="dk1"/>
+              </a:buClr>
+              <a:buSzPts val="1100"/>
+              <a:buFont typeface="Arial"/>
+              <a:buNone/>
+            </a:pPr>
+            <a:r>
+              <a:rPr lang="en"/>
+              <a:t>Your version control evidence should go here.  This could be in the form of annotated screenshots which show you you managed this process or you could make a brief screencast explaining how you implemented version control.</a:t>
+            </a:r>
+            <a:endParaRPr/>
+          </a:p>
+          <a:p>
+            <a:pPr marL="0" lvl="0" indent="0" algn="l" rtl="0">
+              <a:spcBef>
+                <a:spcPts val="0"/>
+              </a:spcBef>
+              <a:spcAft>
+                <a:spcPts val="0"/>
+              </a:spcAft>
+              <a:buNone/>
+            </a:pPr>
+            <a:endParaRPr/>
+          </a:p>
+        </p:txBody>
+      </p:sp>
+    </p:spTree>
+    <p:extLst>
+      <p:ext uri="{BB962C8B-B14F-4D97-AF65-F5344CB8AC3E}">
+        <p14:creationId xmlns:p14="http://schemas.microsoft.com/office/powerpoint/2010/main" val="511959585"/>
+      </p:ext>
+    </p:extLst>
+  </p:cSld>
+  <p:clrMapOvr>
+    <a:masterClrMapping/>
+  </p:clrMapOvr>
+</p:notes>
+</file>
+
+<file path=ppt/notesSlides/notesSlide42.xml><?xml version="1.0" encoding="utf-8"?>
+<p:notes xmlns:a="http://schemas.openxmlformats.org/drawingml/2006/main" xmlns:r="http://schemas.openxmlformats.org/officeDocument/2006/relationships" xmlns:p="http://schemas.openxmlformats.org/presentationml/2006/main" showMasterSp="0" showMasterPhAnim="0">
+  <p:cSld>
+    <p:spTree>
+      <p:nvGrpSpPr>
+        <p:cNvPr id="1" name="Shape 80"/>
+        <p:cNvGrpSpPr/>
+        <p:nvPr/>
+      </p:nvGrpSpPr>
+      <p:grpSpPr>
+        <a:xfrm>
+          <a:off x="0" y="0"/>
+          <a:ext cx="0" cy="0"/>
+          <a:chOff x="0" y="0"/>
+          <a:chExt cx="0" cy="0"/>
+        </a:xfrm>
+      </p:grpSpPr>
+      <p:sp>
+        <p:nvSpPr>
+          <p:cNvPr id="81" name="Google Shape;81;gac10fef634_0_25:notes"/>
+          <p:cNvSpPr>
+            <a:spLocks noGrp="1" noRot="1" noChangeAspect="1"/>
+          </p:cNvSpPr>
+          <p:nvPr>
+            <p:ph type="sldImg" idx="2"/>
+          </p:nvPr>
+        </p:nvSpPr>
+        <p:spPr>
+          <a:xfrm>
+            <a:off x="381000" y="685800"/>
+            <a:ext cx="6096000" cy="3429000"/>
+          </a:xfrm>
+          <a:custGeom>
+            <a:avLst/>
+            <a:gdLst/>
+            <a:ahLst/>
+            <a:cxnLst/>
+            <a:rect l="l" t="t" r="r" b="b"/>
+            <a:pathLst>
+              <a:path w="120000" h="120000" extrusionOk="0">
+                <a:moveTo>
+                  <a:pt x="0" y="0"/>
+                </a:moveTo>
+                <a:lnTo>
+                  <a:pt x="120000" y="0"/>
+                </a:lnTo>
+                <a:lnTo>
+                  <a:pt x="120000" y="120000"/>
+                </a:lnTo>
+                <a:lnTo>
+                  <a:pt x="0" y="120000"/>
+                </a:lnTo>
+                <a:close/>
+              </a:path>
+            </a:pathLst>
+          </a:custGeom>
+        </p:spPr>
+      </p:sp>
+      <p:sp>
+        <p:nvSpPr>
+          <p:cNvPr id="82" name="Google Shape;82;gac10fef634_0_25:notes"/>
+          <p:cNvSpPr txBox="1">
+            <a:spLocks noGrp="1"/>
+          </p:cNvSpPr>
+          <p:nvPr>
+            <p:ph type="body" idx="1"/>
+          </p:nvPr>
+        </p:nvSpPr>
+        <p:spPr>
+          <a:xfrm>
+            <a:off x="685800" y="4343400"/>
+            <a:ext cx="5486400" cy="4114800"/>
+          </a:xfrm>
+          <a:prstGeom prst="rect">
+            <a:avLst/>
+          </a:prstGeom>
+        </p:spPr>
+        <p:txBody>
+          <a:bodyPr spcFirstLastPara="1" wrap="square" lIns="91425" tIns="91425" rIns="91425" bIns="91425" anchor="t" anchorCtr="0">
+            <a:noAutofit/>
+          </a:bodyPr>
+          <a:lstStyle/>
+          <a:p>
+            <a:pPr marL="0" lvl="0" indent="0" algn="l" rtl="0">
+              <a:spcBef>
+                <a:spcPts val="0"/>
+              </a:spcBef>
+              <a:spcAft>
+                <a:spcPts val="0"/>
+              </a:spcAft>
+              <a:buClr>
+                <a:schemeClr val="dk1"/>
+              </a:buClr>
+              <a:buSzPts val="1100"/>
+              <a:buFont typeface="Arial"/>
+              <a:buNone/>
+            </a:pPr>
+            <a:r>
+              <a:rPr lang="en"/>
+              <a:t>Your version control evidence should go here.  This could be in the form of annotated screenshots which show you you managed this process or you could make a brief screencast explaining how you implemented version control.</a:t>
+            </a:r>
+            <a:endParaRPr/>
+          </a:p>
+          <a:p>
+            <a:pPr marL="0" lvl="0" indent="0" algn="l" rtl="0">
+              <a:spcBef>
+                <a:spcPts val="0"/>
+              </a:spcBef>
+              <a:spcAft>
+                <a:spcPts val="0"/>
+              </a:spcAft>
+              <a:buNone/>
+            </a:pPr>
+            <a:endParaRPr/>
+          </a:p>
+        </p:txBody>
+      </p:sp>
+    </p:spTree>
     <p:extLst>
       <p:ext uri="{BB962C8B-B14F-4D97-AF65-F5344CB8AC3E}">
         <p14:creationId xmlns:p14="http://schemas.microsoft.com/office/powerpoint/2010/main" val="3815843750"/>
@@ -5715,7 +6069,7 @@
 </p:notes>
 </file>
 
-<file path=ppt/notesSlides/notesSlide41.xml><?xml version="1.0" encoding="utf-8"?>
+<file path=ppt/notesSlides/notesSlide43.xml><?xml version="1.0" encoding="utf-8"?>
 <p:notes xmlns:a="http://schemas.openxmlformats.org/drawingml/2006/main" xmlns:r="http://schemas.openxmlformats.org/officeDocument/2006/relationships" xmlns:p="http://schemas.openxmlformats.org/presentationml/2006/main" showMasterSp="0" showMasterPhAnim="0">
   <p:cSld>
     <p:spTree>
@@ -18124,14 +18478,14 @@
           <p:nvPr>
             <p:extLst>
               <p:ext uri="{D42A27DB-BD31-4B8C-83A1-F6EECF244321}">
-                <p14:modId xmlns:p14="http://schemas.microsoft.com/office/powerpoint/2010/main" val="3111777294"/>
+                <p14:modId xmlns:p14="http://schemas.microsoft.com/office/powerpoint/2010/main" val="4026637034"/>
               </p:ext>
             </p:extLst>
           </p:nvPr>
         </p:nvGraphicFramePr>
         <p:xfrm>
-          <a:off x="395520" y="3599415"/>
-          <a:ext cx="8520600" cy="1478250"/>
+          <a:off x="395520" y="3698475"/>
+          <a:ext cx="8520600" cy="1325850"/>
         </p:xfrm>
         <a:graphic>
           <a:graphicData uri="http://schemas.openxmlformats.org/drawingml/2006/table">
@@ -18315,26 +18669,6 @@
                         <a:t>Suburb name</a:t>
                       </a:r>
                     </a:p>
-                    <a:p>
-                      <a:pPr marL="0" lvl="0" indent="0" algn="l" rtl="0">
-                        <a:spcBef>
-                          <a:spcPts val="0"/>
-                        </a:spcBef>
-                        <a:spcAft>
-                          <a:spcPts val="0"/>
-                        </a:spcAft>
-                        <a:buNone/>
-                      </a:pPr>
-                      <a:r>
-                        <a:rPr lang="en-NZ" sz="1000" dirty="0">
-                          <a:latin typeface="Avenir Next LT Pro" panose="020B0504020202020204" pitchFamily="34" charset="0"/>
-                        </a:rPr>
-                        <a:t>Left input blank</a:t>
-                      </a:r>
-                      <a:endParaRPr sz="1000" dirty="0">
-                        <a:latin typeface="Avenir Next LT Pro" panose="020B0504020202020204" pitchFamily="34" charset="0"/>
-                      </a:endParaRPr>
-                    </a:p>
                   </a:txBody>
                   <a:tcPr marL="91425" marR="91425" marT="91425" marB="91425"/>
                 </a:tc>
@@ -18424,24 +18758,7 @@
                         <a:rPr lang="en-NZ" sz="1000" dirty="0">
                           <a:latin typeface="Avenir Next LT Pro" panose="020B0504020202020204" pitchFamily="34" charset="0"/>
                         </a:rPr>
-                        <a:t>Printed suburb name</a:t>
-                      </a:r>
-                    </a:p>
-                    <a:p>
-                      <a:pPr marL="0" lvl="0" indent="0" algn="l" rtl="0">
-                        <a:spcBef>
-                          <a:spcPts val="0"/>
-                        </a:spcBef>
-                        <a:spcAft>
-                          <a:spcPts val="0"/>
-                        </a:spcAft>
-                        <a:buNone/>
-                      </a:pPr>
-                      <a:r>
-                        <a:rPr lang="en-NZ" sz="1000" dirty="0">
-                          <a:latin typeface="Avenir Next LT Pro" panose="020B0504020202020204" pitchFamily="34" charset="0"/>
-                        </a:rPr>
-                        <a:t>Asked for input again	</a:t>
+                        <a:t>Printed suburb name	</a:t>
                       </a:r>
                       <a:endParaRPr sz="1000" dirty="0">
                         <a:latin typeface="Avenir Next LT Pro" panose="020B0504020202020204" pitchFamily="34" charset="0"/>
@@ -18646,6 +18963,36 @@
           </a:p>
         </p:txBody>
       </p:sp>
+      <p:pic>
+        <p:nvPicPr>
+          <p:cNvPr id="3" name="Picture 2">
+            <a:extLst>
+              <a:ext uri="{FF2B5EF4-FFF2-40B4-BE49-F238E27FC236}">
+                <a16:creationId xmlns:a16="http://schemas.microsoft.com/office/drawing/2014/main" id="{B3C142D6-9D85-4BE9-B51A-923F69DDFD63}"/>
+              </a:ext>
+            </a:extLst>
+          </p:cNvPr>
+          <p:cNvPicPr>
+            <a:picLocks noChangeAspect="1"/>
+          </p:cNvPicPr>
+          <p:nvPr/>
+        </p:nvPicPr>
+        <p:blipFill>
+          <a:blip r:embed="rId4"/>
+          <a:stretch>
+            <a:fillRect/>
+          </a:stretch>
+        </p:blipFill>
+        <p:spPr>
+          <a:xfrm>
+            <a:off x="754077" y="1017725"/>
+            <a:ext cx="7635846" cy="3712718"/>
+          </a:xfrm>
+          <a:prstGeom prst="rect">
+            <a:avLst/>
+          </a:prstGeom>
+        </p:spPr>
+      </p:pic>
     </p:spTree>
     <p:extLst>
       <p:ext uri="{BB962C8B-B14F-4D97-AF65-F5344CB8AC3E}">
@@ -18756,7 +19103,13 @@
         <p:nvGraphicFramePr>
           <p:cNvPr id="79" name="Google Shape;79;p17"/>
           <p:cNvGraphicFramePr/>
-          <p:nvPr/>
+          <p:nvPr>
+            <p:extLst>
+              <p:ext uri="{D42A27DB-BD31-4B8C-83A1-F6EECF244321}">
+                <p14:modId xmlns:p14="http://schemas.microsoft.com/office/powerpoint/2010/main" val="3341314454"/>
+              </p:ext>
+            </p:extLst>
+          </p:nvPr>
         </p:nvGraphicFramePr>
         <p:xfrm>
           <a:off x="395520" y="3599415"/>
@@ -19019,7 +19372,7 @@
                         <a:rPr lang="en-NZ" sz="1000" dirty="0">
                           <a:latin typeface="Avenir Next LT Pro" panose="020B0504020202020204" pitchFamily="34" charset="0"/>
                         </a:rPr>
-                        <a:t>Accept blank and printed blank input</a:t>
+                        <a:t>Printed house number</a:t>
                       </a:r>
                     </a:p>
                     <a:p>
@@ -19089,6 +19442,66 @@
           </a:graphicData>
         </a:graphic>
       </p:graphicFrame>
+      <p:pic>
+        <p:nvPicPr>
+          <p:cNvPr id="4" name="Picture 3">
+            <a:extLst>
+              <a:ext uri="{FF2B5EF4-FFF2-40B4-BE49-F238E27FC236}">
+                <a16:creationId xmlns:a16="http://schemas.microsoft.com/office/drawing/2014/main" id="{AC69039C-5354-42EA-95BB-F62430D6870E}"/>
+              </a:ext>
+            </a:extLst>
+          </p:cNvPr>
+          <p:cNvPicPr>
+            <a:picLocks noChangeAspect="1"/>
+          </p:cNvPicPr>
+          <p:nvPr/>
+        </p:nvPicPr>
+        <p:blipFill>
+          <a:blip r:embed="rId4"/>
+          <a:stretch>
+            <a:fillRect/>
+          </a:stretch>
+        </p:blipFill>
+        <p:spPr>
+          <a:xfrm>
+            <a:off x="756542" y="693732"/>
+            <a:ext cx="3137277" cy="2814999"/>
+          </a:xfrm>
+          <a:prstGeom prst="rect">
+            <a:avLst/>
+          </a:prstGeom>
+        </p:spPr>
+      </p:pic>
+      <p:pic>
+        <p:nvPicPr>
+          <p:cNvPr id="8" name="Picture 7">
+            <a:extLst>
+              <a:ext uri="{FF2B5EF4-FFF2-40B4-BE49-F238E27FC236}">
+                <a16:creationId xmlns:a16="http://schemas.microsoft.com/office/drawing/2014/main" id="{452EB439-AC1C-4D13-AD5D-6E8768CA3DB1}"/>
+              </a:ext>
+            </a:extLst>
+          </p:cNvPr>
+          <p:cNvPicPr>
+            <a:picLocks noChangeAspect="1"/>
+          </p:cNvPicPr>
+          <p:nvPr/>
+        </p:nvPicPr>
+        <p:blipFill>
+          <a:blip r:embed="rId5"/>
+          <a:stretch>
+            <a:fillRect/>
+          </a:stretch>
+        </p:blipFill>
+        <p:spPr>
+          <a:xfrm>
+            <a:off x="4717528" y="805650"/>
+            <a:ext cx="2924583" cy="2591162"/>
+          </a:xfrm>
+          <a:prstGeom prst="rect">
+            <a:avLst/>
+          </a:prstGeom>
+        </p:spPr>
+      </p:pic>
     </p:spTree>
     <p:extLst>
       <p:ext uri="{BB962C8B-B14F-4D97-AF65-F5344CB8AC3E}">
@@ -19560,6 +19973,671 @@
           <a:chExt cx="0" cy="0"/>
         </a:xfrm>
       </p:grpSpPr>
+      <p:pic>
+        <p:nvPicPr>
+          <p:cNvPr id="5" name="Picture 4">
+            <a:extLst>
+              <a:ext uri="{FF2B5EF4-FFF2-40B4-BE49-F238E27FC236}">
+                <a16:creationId xmlns:a16="http://schemas.microsoft.com/office/drawing/2014/main" id="{8EE7B4AD-6335-4B18-BA5E-8FD1B5D6A4FC}"/>
+              </a:ext>
+            </a:extLst>
+          </p:cNvPr>
+          <p:cNvPicPr>
+            <a:picLocks noChangeAspect="1"/>
+          </p:cNvPicPr>
+          <p:nvPr/>
+        </p:nvPicPr>
+        <p:blipFill>
+          <a:blip r:embed="rId3"/>
+          <a:stretch>
+            <a:fillRect/>
+          </a:stretch>
+        </p:blipFill>
+        <p:spPr>
+          <a:xfrm>
+            <a:off x="9217" y="0"/>
+            <a:ext cx="9125566" cy="5143500"/>
+          </a:xfrm>
+          <a:prstGeom prst="rect">
+            <a:avLst/>
+          </a:prstGeom>
+        </p:spPr>
+      </p:pic>
+      <p:sp>
+        <p:nvSpPr>
+          <p:cNvPr id="73" name="Google Shape;73;p16"/>
+          <p:cNvSpPr txBox="1">
+            <a:spLocks noGrp="1"/>
+          </p:cNvSpPr>
+          <p:nvPr>
+            <p:ph type="title"/>
+          </p:nvPr>
+        </p:nvSpPr>
+        <p:spPr>
+          <a:xfrm>
+            <a:off x="245437" y="0"/>
+            <a:ext cx="8520600" cy="572700"/>
+          </a:xfrm>
+          <a:prstGeom prst="rect">
+            <a:avLst/>
+          </a:prstGeom>
+        </p:spPr>
+        <p:txBody>
+          <a:bodyPr spcFirstLastPara="1" wrap="square" lIns="91425" tIns="91425" rIns="91425" bIns="91425" anchor="t" anchorCtr="0">
+            <a:noAutofit/>
+          </a:bodyPr>
+          <a:lstStyle/>
+          <a:p>
+            <a:pPr marL="0" lvl="0" indent="0" algn="l" rtl="0">
+              <a:spcBef>
+                <a:spcPts val="0"/>
+              </a:spcBef>
+              <a:spcAft>
+                <a:spcPts val="0"/>
+              </a:spcAft>
+              <a:buNone/>
+            </a:pPr>
+            <a:r>
+              <a:rPr lang="en" b="1" dirty="0">
+                <a:latin typeface="Avenir Next LT Pro" panose="020B0504020202020204" pitchFamily="34" charset="0"/>
+              </a:rPr>
+              <a:t>Component 4 Version 2 (Trello screenshot – integrated into main)</a:t>
+            </a:r>
+            <a:endParaRPr b="1" dirty="0">
+              <a:latin typeface="Avenir Next LT Pro" panose="020B0504020202020204" pitchFamily="34" charset="0"/>
+            </a:endParaRPr>
+          </a:p>
+        </p:txBody>
+      </p:sp>
+      <p:pic>
+        <p:nvPicPr>
+          <p:cNvPr id="4" name="Picture 3">
+            <a:extLst>
+              <a:ext uri="{FF2B5EF4-FFF2-40B4-BE49-F238E27FC236}">
+                <a16:creationId xmlns:a16="http://schemas.microsoft.com/office/drawing/2014/main" id="{2CF17A88-2D73-46FD-86D5-494D8EEC2FE3}"/>
+              </a:ext>
+            </a:extLst>
+          </p:cNvPr>
+          <p:cNvPicPr>
+            <a:picLocks noChangeAspect="1"/>
+          </p:cNvPicPr>
+          <p:nvPr/>
+        </p:nvPicPr>
+        <p:blipFill>
+          <a:blip r:embed="rId4"/>
+          <a:stretch>
+            <a:fillRect/>
+          </a:stretch>
+        </p:blipFill>
+        <p:spPr>
+          <a:xfrm>
+            <a:off x="771007" y="1082040"/>
+            <a:ext cx="7601986" cy="3756677"/>
+          </a:xfrm>
+          <a:prstGeom prst="rect">
+            <a:avLst/>
+          </a:prstGeom>
+        </p:spPr>
+      </p:pic>
+    </p:spTree>
+    <p:extLst>
+      <p:ext uri="{BB962C8B-B14F-4D97-AF65-F5344CB8AC3E}">
+        <p14:creationId xmlns:p14="http://schemas.microsoft.com/office/powerpoint/2010/main" val="58051393"/>
+      </p:ext>
+    </p:extLst>
+  </p:cSld>
+  <p:clrMapOvr>
+    <a:masterClrMapping/>
+  </p:clrMapOvr>
+</p:sld>
+</file>
+
+<file path=ppt/slides/slide41.xml><?xml version="1.0" encoding="utf-8"?>
+<p:sld xmlns:a="http://schemas.openxmlformats.org/drawingml/2006/main" xmlns:r="http://schemas.openxmlformats.org/officeDocument/2006/relationships" xmlns:p="http://schemas.openxmlformats.org/presentationml/2006/main">
+  <p:cSld>
+    <p:spTree>
+      <p:nvGrpSpPr>
+        <p:cNvPr id="1" name="Shape 77"/>
+        <p:cNvGrpSpPr/>
+        <p:nvPr/>
+      </p:nvGrpSpPr>
+      <p:grpSpPr>
+        <a:xfrm>
+          <a:off x="0" y="0"/>
+          <a:ext cx="0" cy="0"/>
+          <a:chOff x="0" y="0"/>
+          <a:chExt cx="0" cy="0"/>
+        </a:xfrm>
+      </p:grpSpPr>
+      <p:pic>
+        <p:nvPicPr>
+          <p:cNvPr id="3" name="Picture 2">
+            <a:extLst>
+              <a:ext uri="{FF2B5EF4-FFF2-40B4-BE49-F238E27FC236}">
+                <a16:creationId xmlns:a16="http://schemas.microsoft.com/office/drawing/2014/main" id="{EFC1080B-085B-408B-A3FE-9A35E538D220}"/>
+              </a:ext>
+            </a:extLst>
+          </p:cNvPr>
+          <p:cNvPicPr>
+            <a:picLocks noChangeAspect="1"/>
+          </p:cNvPicPr>
+          <p:nvPr/>
+        </p:nvPicPr>
+        <p:blipFill>
+          <a:blip r:embed="rId3"/>
+          <a:stretch>
+            <a:fillRect/>
+          </a:stretch>
+        </p:blipFill>
+        <p:spPr>
+          <a:xfrm>
+            <a:off x="0" y="10638"/>
+            <a:ext cx="9144000" cy="5122223"/>
+          </a:xfrm>
+          <a:prstGeom prst="rect">
+            <a:avLst/>
+          </a:prstGeom>
+        </p:spPr>
+      </p:pic>
+      <p:sp>
+        <p:nvSpPr>
+          <p:cNvPr id="78" name="Google Shape;78;p17"/>
+          <p:cNvSpPr txBox="1">
+            <a:spLocks noGrp="1"/>
+          </p:cNvSpPr>
+          <p:nvPr>
+            <p:ph type="title"/>
+          </p:nvPr>
+        </p:nvSpPr>
+        <p:spPr>
+          <a:xfrm>
+            <a:off x="182160" y="65835"/>
+            <a:ext cx="8520600" cy="572700"/>
+          </a:xfrm>
+          <a:prstGeom prst="rect">
+            <a:avLst/>
+          </a:prstGeom>
+        </p:spPr>
+        <p:txBody>
+          <a:bodyPr spcFirstLastPara="1" wrap="square" lIns="91425" tIns="91425" rIns="91425" bIns="91425" anchor="t" anchorCtr="0">
+            <a:noAutofit/>
+          </a:bodyPr>
+          <a:lstStyle/>
+          <a:p>
+            <a:pPr marL="0" lvl="0" indent="0" algn="l" rtl="0">
+              <a:spcBef>
+                <a:spcPts val="0"/>
+              </a:spcBef>
+              <a:spcAft>
+                <a:spcPts val="0"/>
+              </a:spcAft>
+              <a:buNone/>
+            </a:pPr>
+            <a:r>
+              <a:rPr lang="en" b="1" dirty="0">
+                <a:latin typeface="Avenir Next LT Pro" panose="020B0504020202020204" pitchFamily="34" charset="0"/>
+              </a:rPr>
+              <a:t>Component 4 Version 2 - Test </a:t>
+            </a:r>
+            <a:r>
+              <a:rPr lang="en" b="1">
+                <a:latin typeface="Avenir Next LT Pro" panose="020B0504020202020204" pitchFamily="34" charset="0"/>
+              </a:rPr>
+              <a:t>Plan (integrated </a:t>
+            </a:r>
+            <a:r>
+              <a:rPr lang="en" b="1" dirty="0">
+                <a:latin typeface="Avenir Next LT Pro" panose="020B0504020202020204" pitchFamily="34" charset="0"/>
+              </a:rPr>
+              <a:t>into main)</a:t>
+            </a:r>
+            <a:endParaRPr b="1" dirty="0">
+              <a:latin typeface="Avenir Next LT Pro" panose="020B0504020202020204" pitchFamily="34" charset="0"/>
+            </a:endParaRPr>
+          </a:p>
+        </p:txBody>
+      </p:sp>
+      <p:graphicFrame>
+        <p:nvGraphicFramePr>
+          <p:cNvPr id="79" name="Google Shape;79;p17"/>
+          <p:cNvGraphicFramePr/>
+          <p:nvPr>
+            <p:extLst>
+              <p:ext uri="{D42A27DB-BD31-4B8C-83A1-F6EECF244321}">
+                <p14:modId xmlns:p14="http://schemas.microsoft.com/office/powerpoint/2010/main" val="4040836461"/>
+              </p:ext>
+            </p:extLst>
+          </p:nvPr>
+        </p:nvGraphicFramePr>
+        <p:xfrm>
+          <a:off x="365040" y="3507975"/>
+          <a:ext cx="8520600" cy="1569690"/>
+        </p:xfrm>
+        <a:graphic>
+          <a:graphicData uri="http://schemas.openxmlformats.org/drawingml/2006/table">
+            <a:tbl>
+              <a:tblPr>
+                <a:noFill/>
+                <a:tableStyleId>{E1099E06-0E6B-448D-9D27-60429F06E6F4}</a:tableStyleId>
+              </a:tblPr>
+              <a:tblGrid>
+                <a:gridCol w="4062180">
+                  <a:extLst>
+                    <a:ext uri="{9D8B030D-6E8A-4147-A177-3AD203B41FA5}">
+                      <a16:colId xmlns:a16="http://schemas.microsoft.com/office/drawing/2014/main" val="20000"/>
+                    </a:ext>
+                  </a:extLst>
+                </a:gridCol>
+                <a:gridCol w="4458420">
+                  <a:extLst>
+                    <a:ext uri="{9D8B030D-6E8A-4147-A177-3AD203B41FA5}">
+                      <a16:colId xmlns:a16="http://schemas.microsoft.com/office/drawing/2014/main" val="20001"/>
+                    </a:ext>
+                  </a:extLst>
+                </a:gridCol>
+              </a:tblGrid>
+              <a:tr h="381000">
+                <a:tc>
+                  <a:txBody>
+                    <a:bodyPr/>
+                    <a:lstStyle/>
+                    <a:p>
+                      <a:pPr marL="0" lvl="0" indent="0" algn="l" rtl="0">
+                        <a:spcBef>
+                          <a:spcPts val="0"/>
+                        </a:spcBef>
+                        <a:spcAft>
+                          <a:spcPts val="0"/>
+                        </a:spcAft>
+                        <a:buNone/>
+                      </a:pPr>
+                      <a:r>
+                        <a:rPr lang="en" sz="1100" b="1" dirty="0">
+                          <a:latin typeface="Avenir Next LT Pro" panose="020B0504020202020204" pitchFamily="34" charset="0"/>
+                        </a:rPr>
+                        <a:t>Test Case</a:t>
+                      </a:r>
+                      <a:endParaRPr sz="1100" b="1" dirty="0">
+                        <a:latin typeface="Avenir Next LT Pro" panose="020B0504020202020204" pitchFamily="34" charset="0"/>
+                      </a:endParaRPr>
+                    </a:p>
+                  </a:txBody>
+                  <a:tcPr marL="91425" marR="91425" marT="91425" marB="91425">
+                    <a:solidFill>
+                      <a:srgbClr val="CCCCCC"/>
+                    </a:solidFill>
+                  </a:tcPr>
+                </a:tc>
+                <a:tc>
+                  <a:txBody>
+                    <a:bodyPr/>
+                    <a:lstStyle/>
+                    <a:p>
+                      <a:pPr marL="0" lvl="0" indent="0" algn="l" rtl="0">
+                        <a:spcBef>
+                          <a:spcPts val="0"/>
+                        </a:spcBef>
+                        <a:spcAft>
+                          <a:spcPts val="0"/>
+                        </a:spcAft>
+                        <a:buNone/>
+                      </a:pPr>
+                      <a:r>
+                        <a:rPr lang="en" sz="1100" b="1">
+                          <a:latin typeface="Avenir Next LT Pro" panose="020B0504020202020204" pitchFamily="34" charset="0"/>
+                        </a:rPr>
+                        <a:t>Expected Values</a:t>
+                      </a:r>
+                      <a:endParaRPr sz="1100" b="1">
+                        <a:latin typeface="Avenir Next LT Pro" panose="020B0504020202020204" pitchFamily="34" charset="0"/>
+                      </a:endParaRPr>
+                    </a:p>
+                  </a:txBody>
+                  <a:tcPr marL="91425" marR="91425" marT="91425" marB="91425">
+                    <a:solidFill>
+                      <a:srgbClr val="CCCCCC"/>
+                    </a:solidFill>
+                  </a:tcPr>
+                </a:tc>
+                <a:extLst>
+                  <a:ext uri="{0D108BD9-81ED-4DB2-BD59-A6C34878D82A}">
+                    <a16:rowId xmlns:a16="http://schemas.microsoft.com/office/drawing/2014/main" val="10000"/>
+                  </a:ext>
+                </a:extLst>
+              </a:tr>
+              <a:tr h="396200">
+                <a:tc>
+                  <a:txBody>
+                    <a:bodyPr/>
+                    <a:lstStyle/>
+                    <a:p>
+                      <a:pPr marL="0" lvl="0" indent="0" algn="l" rtl="0">
+                        <a:spcBef>
+                          <a:spcPts val="0"/>
+                        </a:spcBef>
+                        <a:spcAft>
+                          <a:spcPts val="0"/>
+                        </a:spcAft>
+                        <a:buNone/>
+                      </a:pPr>
+                      <a:r>
+                        <a:rPr lang="en-NZ" sz="1100" dirty="0">
+                          <a:latin typeface="Avenir Next LT Pro" panose="020B0504020202020204" pitchFamily="34" charset="0"/>
+                        </a:rPr>
+                        <a:t>Input name</a:t>
+                      </a:r>
+                    </a:p>
+                    <a:p>
+                      <a:pPr marL="0" lvl="0" indent="0" algn="l" rtl="0">
+                        <a:spcBef>
+                          <a:spcPts val="0"/>
+                        </a:spcBef>
+                        <a:spcAft>
+                          <a:spcPts val="0"/>
+                        </a:spcAft>
+                        <a:buNone/>
+                      </a:pPr>
+                      <a:r>
+                        <a:rPr lang="en-NZ" sz="1100" dirty="0">
+                          <a:latin typeface="Avenir Next LT Pro" panose="020B0504020202020204" pitchFamily="34" charset="0"/>
+                        </a:rPr>
+                        <a:t>Input phone number</a:t>
+                      </a:r>
+                    </a:p>
+                    <a:p>
+                      <a:pPr marL="0" lvl="0" indent="0" algn="l" rtl="0">
+                        <a:spcBef>
+                          <a:spcPts val="0"/>
+                        </a:spcBef>
+                        <a:spcAft>
+                          <a:spcPts val="0"/>
+                        </a:spcAft>
+                        <a:buNone/>
+                      </a:pPr>
+                      <a:r>
+                        <a:rPr lang="en-NZ" sz="1100" dirty="0">
+                          <a:latin typeface="Avenir Next LT Pro" panose="020B0504020202020204" pitchFamily="34" charset="0"/>
+                        </a:rPr>
+                        <a:t>Input house number</a:t>
+                      </a:r>
+                    </a:p>
+                    <a:p>
+                      <a:pPr marL="0" lvl="0" indent="0" algn="l" rtl="0">
+                        <a:spcBef>
+                          <a:spcPts val="0"/>
+                        </a:spcBef>
+                        <a:spcAft>
+                          <a:spcPts val="0"/>
+                        </a:spcAft>
+                        <a:buNone/>
+                      </a:pPr>
+                      <a:r>
+                        <a:rPr lang="en-NZ" sz="1100" dirty="0">
+                          <a:latin typeface="Avenir Next LT Pro" panose="020B0504020202020204" pitchFamily="34" charset="0"/>
+                        </a:rPr>
+                        <a:t>Street name</a:t>
+                      </a:r>
+                    </a:p>
+                    <a:p>
+                      <a:pPr marL="0" lvl="0" indent="0" algn="l" rtl="0">
+                        <a:spcBef>
+                          <a:spcPts val="0"/>
+                        </a:spcBef>
+                        <a:spcAft>
+                          <a:spcPts val="0"/>
+                        </a:spcAft>
+                        <a:buNone/>
+                      </a:pPr>
+                      <a:r>
+                        <a:rPr lang="en-NZ" sz="1100" dirty="0">
+                          <a:latin typeface="Avenir Next LT Pro" panose="020B0504020202020204" pitchFamily="34" charset="0"/>
+                        </a:rPr>
+                        <a:t>Suburb name</a:t>
+                      </a:r>
+                    </a:p>
+                    <a:p>
+                      <a:pPr marL="0" lvl="0" indent="0" algn="l" rtl="0">
+                        <a:spcBef>
+                          <a:spcPts val="0"/>
+                        </a:spcBef>
+                        <a:spcAft>
+                          <a:spcPts val="0"/>
+                        </a:spcAft>
+                        <a:buNone/>
+                      </a:pPr>
+                      <a:r>
+                        <a:rPr lang="en-NZ" sz="1100" dirty="0">
+                          <a:latin typeface="Avenir Next LT Pro" panose="020B0504020202020204" pitchFamily="34" charset="0"/>
+                        </a:rPr>
+                        <a:t>Left input blank</a:t>
+                      </a:r>
+                      <a:endParaRPr sz="1100" dirty="0">
+                        <a:latin typeface="Avenir Next LT Pro" panose="020B0504020202020204" pitchFamily="34" charset="0"/>
+                      </a:endParaRPr>
+                    </a:p>
+                  </a:txBody>
+                  <a:tcPr marL="91425" marR="91425" marT="91425" marB="91425"/>
+                </a:tc>
+                <a:tc>
+                  <a:txBody>
+                    <a:bodyPr/>
+                    <a:lstStyle/>
+                    <a:p>
+                      <a:pPr marL="0" lvl="0" indent="0" algn="l" rtl="0">
+                        <a:spcBef>
+                          <a:spcPts val="0"/>
+                        </a:spcBef>
+                        <a:spcAft>
+                          <a:spcPts val="0"/>
+                        </a:spcAft>
+                        <a:buNone/>
+                      </a:pPr>
+                      <a:r>
+                        <a:rPr lang="en-NZ" sz="1100" dirty="0">
+                          <a:latin typeface="Avenir Next LT Pro" panose="020B0504020202020204" pitchFamily="34" charset="0"/>
+                        </a:rPr>
+                        <a:t>Printed name correctly</a:t>
+                      </a:r>
+                    </a:p>
+                    <a:p>
+                      <a:pPr marL="0" lvl="0" indent="0" algn="l" rtl="0">
+                        <a:spcBef>
+                          <a:spcPts val="0"/>
+                        </a:spcBef>
+                        <a:spcAft>
+                          <a:spcPts val="0"/>
+                        </a:spcAft>
+                        <a:buNone/>
+                      </a:pPr>
+                      <a:r>
+                        <a:rPr lang="en-NZ" sz="1100" dirty="0">
+                          <a:latin typeface="Avenir Next LT Pro" panose="020B0504020202020204" pitchFamily="34" charset="0"/>
+                        </a:rPr>
+                        <a:t>Printed phone number correctly </a:t>
+                      </a:r>
+                    </a:p>
+                    <a:p>
+                      <a:pPr marL="0" lvl="0" indent="0" algn="l" rtl="0">
+                        <a:spcBef>
+                          <a:spcPts val="0"/>
+                        </a:spcBef>
+                        <a:spcAft>
+                          <a:spcPts val="0"/>
+                        </a:spcAft>
+                        <a:buNone/>
+                      </a:pPr>
+                      <a:r>
+                        <a:rPr lang="en-NZ" sz="1100" dirty="0">
+                          <a:latin typeface="Avenir Next LT Pro" panose="020B0504020202020204" pitchFamily="34" charset="0"/>
+                        </a:rPr>
+                        <a:t>Printed house number</a:t>
+                      </a:r>
+                    </a:p>
+                    <a:p>
+                      <a:pPr marL="0" lvl="0" indent="0" algn="l" rtl="0">
+                        <a:spcBef>
+                          <a:spcPts val="0"/>
+                        </a:spcBef>
+                        <a:spcAft>
+                          <a:spcPts val="0"/>
+                        </a:spcAft>
+                        <a:buNone/>
+                      </a:pPr>
+                      <a:r>
+                        <a:rPr lang="en-NZ" sz="1100" dirty="0">
+                          <a:latin typeface="Avenir Next LT Pro" panose="020B0504020202020204" pitchFamily="34" charset="0"/>
+                        </a:rPr>
+                        <a:t>Printed street name</a:t>
+                      </a:r>
+                    </a:p>
+                    <a:p>
+                      <a:pPr marL="0" lvl="0" indent="0" algn="l" rtl="0">
+                        <a:spcBef>
+                          <a:spcPts val="0"/>
+                        </a:spcBef>
+                        <a:spcAft>
+                          <a:spcPts val="0"/>
+                        </a:spcAft>
+                        <a:buNone/>
+                      </a:pPr>
+                      <a:r>
+                        <a:rPr lang="en-NZ" sz="1100" dirty="0">
+                          <a:latin typeface="Avenir Next LT Pro" panose="020B0504020202020204" pitchFamily="34" charset="0"/>
+                        </a:rPr>
+                        <a:t>Printed suburb name</a:t>
+                      </a:r>
+                    </a:p>
+                    <a:p>
+                      <a:pPr marL="0" lvl="0" indent="0" algn="l" rtl="0">
+                        <a:spcBef>
+                          <a:spcPts val="0"/>
+                        </a:spcBef>
+                        <a:spcAft>
+                          <a:spcPts val="0"/>
+                        </a:spcAft>
+                        <a:buNone/>
+                      </a:pPr>
+                      <a:r>
+                        <a:rPr lang="en-NZ" sz="1100" dirty="0">
+                          <a:latin typeface="Avenir Next LT Pro" panose="020B0504020202020204" pitchFamily="34" charset="0"/>
+                        </a:rPr>
+                        <a:t>Asked for input again	</a:t>
+                      </a:r>
+                      <a:endParaRPr sz="1100" dirty="0">
+                        <a:latin typeface="Avenir Next LT Pro" panose="020B0504020202020204" pitchFamily="34" charset="0"/>
+                      </a:endParaRPr>
+                    </a:p>
+                  </a:txBody>
+                  <a:tcPr marL="91425" marR="91425" marT="91425" marB="91425"/>
+                </a:tc>
+                <a:extLst>
+                  <a:ext uri="{0D108BD9-81ED-4DB2-BD59-A6C34878D82A}">
+                    <a16:rowId xmlns:a16="http://schemas.microsoft.com/office/drawing/2014/main" val="10001"/>
+                  </a:ext>
+                </a:extLst>
+              </a:tr>
+            </a:tbl>
+          </a:graphicData>
+        </a:graphic>
+      </p:graphicFrame>
+      <p:pic>
+        <p:nvPicPr>
+          <p:cNvPr id="5" name="Picture 4">
+            <a:extLst>
+              <a:ext uri="{FF2B5EF4-FFF2-40B4-BE49-F238E27FC236}">
+                <a16:creationId xmlns:a16="http://schemas.microsoft.com/office/drawing/2014/main" id="{D94F3457-D588-42BA-8C34-E0E46FA3BA16}"/>
+              </a:ext>
+            </a:extLst>
+          </p:cNvPr>
+          <p:cNvPicPr>
+            <a:picLocks noChangeAspect="1"/>
+          </p:cNvPicPr>
+          <p:nvPr/>
+        </p:nvPicPr>
+        <p:blipFill>
+          <a:blip r:embed="rId4"/>
+          <a:stretch>
+            <a:fillRect/>
+          </a:stretch>
+        </p:blipFill>
+        <p:spPr>
+          <a:xfrm>
+            <a:off x="4366145" y="1041326"/>
+            <a:ext cx="4236949" cy="2249087"/>
+          </a:xfrm>
+          <a:prstGeom prst="rect">
+            <a:avLst/>
+          </a:prstGeom>
+        </p:spPr>
+      </p:pic>
+      <p:pic>
+        <p:nvPicPr>
+          <p:cNvPr id="7" name="Picture 6">
+            <a:extLst>
+              <a:ext uri="{FF2B5EF4-FFF2-40B4-BE49-F238E27FC236}">
+                <a16:creationId xmlns:a16="http://schemas.microsoft.com/office/drawing/2014/main" id="{C701F46C-1C5D-4EED-8568-DE766FEC4A99}"/>
+              </a:ext>
+            </a:extLst>
+          </p:cNvPr>
+          <p:cNvPicPr>
+            <a:picLocks noChangeAspect="1"/>
+          </p:cNvPicPr>
+          <p:nvPr/>
+        </p:nvPicPr>
+        <p:blipFill>
+          <a:blip r:embed="rId5"/>
+          <a:stretch>
+            <a:fillRect/>
+          </a:stretch>
+        </p:blipFill>
+        <p:spPr>
+          <a:xfrm>
+            <a:off x="1051502" y="1041326"/>
+            <a:ext cx="2773737" cy="2411453"/>
+          </a:xfrm>
+          <a:prstGeom prst="rect">
+            <a:avLst/>
+          </a:prstGeom>
+        </p:spPr>
+      </p:pic>
+    </p:spTree>
+    <p:extLst>
+      <p:ext uri="{BB962C8B-B14F-4D97-AF65-F5344CB8AC3E}">
+        <p14:creationId xmlns:p14="http://schemas.microsoft.com/office/powerpoint/2010/main" val="2389219004"/>
+      </p:ext>
+    </p:extLst>
+  </p:cSld>
+  <p:clrMapOvr>
+    <a:masterClrMapping/>
+  </p:clrMapOvr>
+</p:sld>
+</file>
+
+<file path=ppt/slides/slide42.xml><?xml version="1.0" encoding="utf-8"?>
+<p:sld xmlns:a="http://schemas.openxmlformats.org/drawingml/2006/main" xmlns:r="http://schemas.openxmlformats.org/officeDocument/2006/relationships" xmlns:p="http://schemas.openxmlformats.org/presentationml/2006/main">
+  <p:cSld>
+    <p:bg>
+      <p:bgPr>
+        <a:solidFill>
+          <a:srgbClr val="D9EAD3"/>
+        </a:solidFill>
+        <a:effectLst/>
+      </p:bgPr>
+    </p:bg>
+    <p:spTree>
+      <p:nvGrpSpPr>
+        <p:cNvPr id="1" name="Shape 72"/>
+        <p:cNvGrpSpPr/>
+        <p:nvPr/>
+      </p:nvGrpSpPr>
+      <p:grpSpPr>
+        <a:xfrm>
+          <a:off x="0" y="0"/>
+          <a:ext cx="0" cy="0"/>
+          <a:chOff x="0" y="0"/>
+          <a:chExt cx="0" cy="0"/>
+        </a:xfrm>
+      </p:grpSpPr>
       <p:sp>
         <p:nvSpPr>
           <p:cNvPr id="73" name="Google Shape;73;p16"/>
@@ -19615,7 +20693,7 @@
 </p:sld>
 </file>
 
-<file path=ppt/slides/slide41.xml><?xml version="1.0" encoding="utf-8"?>
+<file path=ppt/slides/slide43.xml><?xml version="1.0" encoding="utf-8"?>
 <p:sld xmlns:a="http://schemas.openxmlformats.org/drawingml/2006/main" xmlns:r="http://schemas.openxmlformats.org/officeDocument/2006/relationships" xmlns:p="http://schemas.openxmlformats.org/presentationml/2006/main">
   <p:cSld>
     <p:spTree>
@@ -19830,7 +20908,7 @@
 </p:sld>
 </file>
 
-<file path=ppt/slides/slide42.xml><?xml version="1.0" encoding="utf-8"?>
+<file path=ppt/slides/slide44.xml><?xml version="1.0" encoding="utf-8"?>
 <p:sld xmlns:a="http://schemas.openxmlformats.org/drawingml/2006/main" xmlns:r="http://schemas.openxmlformats.org/officeDocument/2006/relationships" xmlns:p="http://schemas.openxmlformats.org/presentationml/2006/main">
   <p:cSld>
     <p:bg>
@@ -19910,7 +20988,7 @@
 </p:sld>
 </file>
 
-<file path=ppt/slides/slide43.xml><?xml version="1.0" encoding="utf-8"?>
+<file path=ppt/slides/slide45.xml><?xml version="1.0" encoding="utf-8"?>
 <p:sld xmlns:a="http://schemas.openxmlformats.org/drawingml/2006/main" xmlns:r="http://schemas.openxmlformats.org/officeDocument/2006/relationships" xmlns:p="http://schemas.openxmlformats.org/presentationml/2006/main">
   <p:cSld>
     <p:spTree>
@@ -20125,7 +21203,7 @@
 </p:sld>
 </file>
 
-<file path=ppt/slides/slide44.xml><?xml version="1.0" encoding="utf-8"?>
+<file path=ppt/slides/slide46.xml><?xml version="1.0" encoding="utf-8"?>
 <p:sld xmlns:a="http://schemas.openxmlformats.org/drawingml/2006/main" xmlns:r="http://schemas.openxmlformats.org/officeDocument/2006/relationships" xmlns:p="http://schemas.openxmlformats.org/presentationml/2006/main">
   <p:cSld>
     <p:bg>
@@ -20227,147 +21305,6 @@
 </p:sld>
 </file>
 
-<file path=ppt/slides/slide45.xml><?xml version="1.0" encoding="utf-8"?>
-<p:sld xmlns:a="http://schemas.openxmlformats.org/drawingml/2006/main" xmlns:r="http://schemas.openxmlformats.org/officeDocument/2006/relationships" xmlns:p="http://schemas.openxmlformats.org/presentationml/2006/main">
-  <p:cSld>
-    <p:bg>
-      <p:bgPr>
-        <a:solidFill>
-          <a:srgbClr val="D9EAD3"/>
-        </a:solidFill>
-        <a:effectLst/>
-      </p:bgPr>
-    </p:bg>
-    <p:spTree>
-      <p:nvGrpSpPr>
-        <p:cNvPr id="1" name="Shape 72"/>
-        <p:cNvGrpSpPr/>
-        <p:nvPr/>
-      </p:nvGrpSpPr>
-      <p:grpSpPr>
-        <a:xfrm>
-          <a:off x="0" y="0"/>
-          <a:ext cx="0" cy="0"/>
-          <a:chOff x="0" y="0"/>
-          <a:chExt cx="0" cy="0"/>
-        </a:xfrm>
-      </p:grpSpPr>
-      <p:sp>
-        <p:nvSpPr>
-          <p:cNvPr id="73" name="Google Shape;73;p16"/>
-          <p:cNvSpPr txBox="1">
-            <a:spLocks noGrp="1"/>
-          </p:cNvSpPr>
-          <p:nvPr>
-            <p:ph type="title"/>
-          </p:nvPr>
-        </p:nvSpPr>
-        <p:spPr>
-          <a:xfrm>
-            <a:off x="311700" y="445025"/>
-            <a:ext cx="8520600" cy="1098739"/>
-          </a:xfrm>
-          <a:prstGeom prst="rect">
-            <a:avLst/>
-          </a:prstGeom>
-        </p:spPr>
-        <p:txBody>
-          <a:bodyPr spcFirstLastPara="1" wrap="square" lIns="91425" tIns="91425" rIns="91425" bIns="91425" anchor="t" anchorCtr="0">
-            <a:noAutofit/>
-          </a:bodyPr>
-          <a:lstStyle/>
-          <a:p>
-            <a:r>
-              <a:rPr lang="en" dirty="0"/>
-              <a:t>Functional Testing (Screenshot and explain how you tested your program – use the testing template)</a:t>
-            </a:r>
-            <a:endParaRPr dirty="0"/>
-          </a:p>
-        </p:txBody>
-      </p:sp>
-    </p:spTree>
-    <p:extLst>
-      <p:ext uri="{BB962C8B-B14F-4D97-AF65-F5344CB8AC3E}">
-        <p14:creationId xmlns:p14="http://schemas.microsoft.com/office/powerpoint/2010/main" val="1781413307"/>
-      </p:ext>
-    </p:extLst>
-  </p:cSld>
-  <p:clrMapOvr>
-    <a:masterClrMapping/>
-  </p:clrMapOvr>
-</p:sld>
-</file>
-
-<file path=ppt/slides/slide46.xml><?xml version="1.0" encoding="utf-8"?>
-<p:sld xmlns:a="http://schemas.openxmlformats.org/drawingml/2006/main" xmlns:r="http://schemas.openxmlformats.org/officeDocument/2006/relationships" xmlns:p="http://schemas.openxmlformats.org/presentationml/2006/main">
-  <p:cSld>
-    <p:bg>
-      <p:bgPr>
-        <a:solidFill>
-          <a:srgbClr val="D9EAD3"/>
-        </a:solidFill>
-        <a:effectLst/>
-      </p:bgPr>
-    </p:bg>
-    <p:spTree>
-      <p:nvGrpSpPr>
-        <p:cNvPr id="1" name="Shape 72"/>
-        <p:cNvGrpSpPr/>
-        <p:nvPr/>
-      </p:nvGrpSpPr>
-      <p:grpSpPr>
-        <a:xfrm>
-          <a:off x="0" y="0"/>
-          <a:ext cx="0" cy="0"/>
-          <a:chOff x="0" y="0"/>
-          <a:chExt cx="0" cy="0"/>
-        </a:xfrm>
-      </p:grpSpPr>
-      <p:sp>
-        <p:nvSpPr>
-          <p:cNvPr id="73" name="Google Shape;73;p16"/>
-          <p:cNvSpPr txBox="1">
-            <a:spLocks noGrp="1"/>
-          </p:cNvSpPr>
-          <p:nvPr>
-            <p:ph type="title"/>
-          </p:nvPr>
-        </p:nvSpPr>
-        <p:spPr>
-          <a:xfrm>
-            <a:off x="311700" y="445025"/>
-            <a:ext cx="8520600" cy="1098739"/>
-          </a:xfrm>
-          <a:prstGeom prst="rect">
-            <a:avLst/>
-          </a:prstGeom>
-        </p:spPr>
-        <p:txBody>
-          <a:bodyPr spcFirstLastPara="1" wrap="square" lIns="91425" tIns="91425" rIns="91425" bIns="91425" anchor="t" anchorCtr="0">
-            <a:noAutofit/>
-          </a:bodyPr>
-          <a:lstStyle/>
-          <a:p>
-            <a:r>
-              <a:rPr lang="en" dirty="0"/>
-              <a:t>Using evidence of testing show how you refined your program (duplicate slides)</a:t>
-            </a:r>
-          </a:p>
-        </p:txBody>
-      </p:sp>
-    </p:spTree>
-    <p:extLst>
-      <p:ext uri="{BB962C8B-B14F-4D97-AF65-F5344CB8AC3E}">
-        <p14:creationId xmlns:p14="http://schemas.microsoft.com/office/powerpoint/2010/main" val="3394932069"/>
-      </p:ext>
-    </p:extLst>
-  </p:cSld>
-  <p:clrMapOvr>
-    <a:masterClrMapping/>
-  </p:clrMapOvr>
-</p:sld>
-</file>
-
 <file path=ppt/slides/slide47.xml><?xml version="1.0" encoding="utf-8"?>
 <p:sld xmlns:a="http://schemas.openxmlformats.org/drawingml/2006/main" xmlns:r="http://schemas.openxmlformats.org/officeDocument/2006/relationships" xmlns:p="http://schemas.openxmlformats.org/presentationml/2006/main">
   <p:cSld>
@@ -20420,7 +21357,7 @@
           <a:p>
             <a:r>
               <a:rPr lang="en" dirty="0"/>
-              <a:t>User Testing (Screenshot and show feedback from a range of users/testers)</a:t>
+              <a:t>Functional Testing (Screenshot and explain how you tested your program – use the testing template)</a:t>
             </a:r>
             <a:endParaRPr dirty="0"/>
           </a:p>
@@ -20429,7 +21366,7 @@
     </p:spTree>
     <p:extLst>
       <p:ext uri="{BB962C8B-B14F-4D97-AF65-F5344CB8AC3E}">
-        <p14:creationId xmlns:p14="http://schemas.microsoft.com/office/powerpoint/2010/main" val="2712176924"/>
+        <p14:creationId xmlns:p14="http://schemas.microsoft.com/office/powerpoint/2010/main" val="1781413307"/>
       </p:ext>
     </p:extLst>
   </p:cSld>
@@ -20491,6 +21428,320 @@
           <a:p>
             <a:r>
               <a:rPr lang="en" dirty="0"/>
+              <a:t>Using evidence of testing show how you refined your program (duplicate slides)</a:t>
+            </a:r>
+          </a:p>
+        </p:txBody>
+      </p:sp>
+    </p:spTree>
+    <p:extLst>
+      <p:ext uri="{BB962C8B-B14F-4D97-AF65-F5344CB8AC3E}">
+        <p14:creationId xmlns:p14="http://schemas.microsoft.com/office/powerpoint/2010/main" val="3394932069"/>
+      </p:ext>
+    </p:extLst>
+  </p:cSld>
+  <p:clrMapOvr>
+    <a:masterClrMapping/>
+  </p:clrMapOvr>
+</p:sld>
+</file>
+
+<file path=ppt/slides/slide49.xml><?xml version="1.0" encoding="utf-8"?>
+<p:sld xmlns:a="http://schemas.openxmlformats.org/drawingml/2006/main" xmlns:r="http://schemas.openxmlformats.org/officeDocument/2006/relationships" xmlns:p="http://schemas.openxmlformats.org/presentationml/2006/main">
+  <p:cSld>
+    <p:bg>
+      <p:bgPr>
+        <a:solidFill>
+          <a:srgbClr val="D9EAD3"/>
+        </a:solidFill>
+        <a:effectLst/>
+      </p:bgPr>
+    </p:bg>
+    <p:spTree>
+      <p:nvGrpSpPr>
+        <p:cNvPr id="1" name="Shape 72"/>
+        <p:cNvGrpSpPr/>
+        <p:nvPr/>
+      </p:nvGrpSpPr>
+      <p:grpSpPr>
+        <a:xfrm>
+          <a:off x="0" y="0"/>
+          <a:ext cx="0" cy="0"/>
+          <a:chOff x="0" y="0"/>
+          <a:chExt cx="0" cy="0"/>
+        </a:xfrm>
+      </p:grpSpPr>
+      <p:sp>
+        <p:nvSpPr>
+          <p:cNvPr id="73" name="Google Shape;73;p16"/>
+          <p:cNvSpPr txBox="1">
+            <a:spLocks noGrp="1"/>
+          </p:cNvSpPr>
+          <p:nvPr>
+            <p:ph type="title"/>
+          </p:nvPr>
+        </p:nvSpPr>
+        <p:spPr>
+          <a:xfrm>
+            <a:off x="311700" y="445025"/>
+            <a:ext cx="8520600" cy="1098739"/>
+          </a:xfrm>
+          <a:prstGeom prst="rect">
+            <a:avLst/>
+          </a:prstGeom>
+        </p:spPr>
+        <p:txBody>
+          <a:bodyPr spcFirstLastPara="1" wrap="square" lIns="91425" tIns="91425" rIns="91425" bIns="91425" anchor="t" anchorCtr="0">
+            <a:noAutofit/>
+          </a:bodyPr>
+          <a:lstStyle/>
+          <a:p>
+            <a:r>
+              <a:rPr lang="en" dirty="0"/>
+              <a:t>User Testing (Screenshot and show feedback from a range of users/testers)</a:t>
+            </a:r>
+            <a:endParaRPr dirty="0"/>
+          </a:p>
+        </p:txBody>
+      </p:sp>
+    </p:spTree>
+    <p:extLst>
+      <p:ext uri="{BB962C8B-B14F-4D97-AF65-F5344CB8AC3E}">
+        <p14:creationId xmlns:p14="http://schemas.microsoft.com/office/powerpoint/2010/main" val="2712176924"/>
+      </p:ext>
+    </p:extLst>
+  </p:cSld>
+  <p:clrMapOvr>
+    <a:masterClrMapping/>
+  </p:clrMapOvr>
+</p:sld>
+</file>
+
+<file path=ppt/slides/slide5.xml><?xml version="1.0" encoding="utf-8"?>
+<p:sld xmlns:a="http://schemas.openxmlformats.org/drawingml/2006/main" xmlns:r="http://schemas.openxmlformats.org/officeDocument/2006/relationships" xmlns:p="http://schemas.openxmlformats.org/presentationml/2006/main">
+  <p:cSld>
+    <p:bg>
+      <p:bgPr>
+        <a:solidFill>
+          <a:srgbClr val="FFCC66"/>
+        </a:solidFill>
+        <a:effectLst/>
+      </p:bgPr>
+    </p:bg>
+    <p:spTree>
+      <p:nvGrpSpPr>
+        <p:cNvPr id="1" name=""/>
+        <p:cNvGrpSpPr/>
+        <p:nvPr/>
+      </p:nvGrpSpPr>
+      <p:grpSpPr>
+        <a:xfrm>
+          <a:off x="0" y="0"/>
+          <a:ext cx="0" cy="0"/>
+          <a:chOff x="0" y="0"/>
+          <a:chExt cx="0" cy="0"/>
+        </a:xfrm>
+      </p:grpSpPr>
+      <p:pic>
+        <p:nvPicPr>
+          <p:cNvPr id="5" name="Picture 4">
+            <a:extLst>
+              <a:ext uri="{FF2B5EF4-FFF2-40B4-BE49-F238E27FC236}">
+                <a16:creationId xmlns:a16="http://schemas.microsoft.com/office/drawing/2014/main" id="{D32D7A87-7111-49D0-A7EF-1FA83C820A1C}"/>
+              </a:ext>
+            </a:extLst>
+          </p:cNvPr>
+          <p:cNvPicPr>
+            <a:picLocks noChangeAspect="1"/>
+          </p:cNvPicPr>
+          <p:nvPr/>
+        </p:nvPicPr>
+        <p:blipFill>
+          <a:blip r:embed="rId2"/>
+          <a:stretch>
+            <a:fillRect/>
+          </a:stretch>
+        </p:blipFill>
+        <p:spPr>
+          <a:xfrm>
+            <a:off x="10111" y="0"/>
+            <a:ext cx="9123778" cy="5143500"/>
+          </a:xfrm>
+          <a:prstGeom prst="rect">
+            <a:avLst/>
+          </a:prstGeom>
+        </p:spPr>
+      </p:pic>
+      <p:sp>
+        <p:nvSpPr>
+          <p:cNvPr id="2" name="Title 1">
+            <a:extLst>
+              <a:ext uri="{FF2B5EF4-FFF2-40B4-BE49-F238E27FC236}">
+                <a16:creationId xmlns:a16="http://schemas.microsoft.com/office/drawing/2014/main" id="{5912979F-6922-40FD-B6E0-0506FA25714D}"/>
+              </a:ext>
+            </a:extLst>
+          </p:cNvPr>
+          <p:cNvSpPr>
+            <a:spLocks noGrp="1"/>
+          </p:cNvSpPr>
+          <p:nvPr>
+            <p:ph type="title"/>
+          </p:nvPr>
+        </p:nvSpPr>
+        <p:spPr>
+          <a:xfrm>
+            <a:off x="426000" y="452645"/>
+            <a:ext cx="8520600" cy="572700"/>
+          </a:xfrm>
+        </p:spPr>
+        <p:txBody>
+          <a:bodyPr/>
+          <a:lstStyle/>
+          <a:p>
+            <a:r>
+              <a:rPr lang="en-US" b="1" dirty="0">
+                <a:latin typeface="Avenir Next LT Pro" panose="020B0504020202020204" pitchFamily="34" charset="0"/>
+              </a:rPr>
+              <a:t>Implication 1 - Privacy</a:t>
+            </a:r>
+            <a:endParaRPr lang="en-NZ" b="1" dirty="0">
+              <a:latin typeface="Avenir Next LT Pro" panose="020B0504020202020204" pitchFamily="34" charset="0"/>
+            </a:endParaRPr>
+          </a:p>
+        </p:txBody>
+      </p:sp>
+      <p:sp>
+        <p:nvSpPr>
+          <p:cNvPr id="3" name="Text Placeholder 2">
+            <a:extLst>
+              <a:ext uri="{FF2B5EF4-FFF2-40B4-BE49-F238E27FC236}">
+                <a16:creationId xmlns:a16="http://schemas.microsoft.com/office/drawing/2014/main" id="{1EB42CE1-67BF-466B-8C2C-7F21A8892B1E}"/>
+              </a:ext>
+            </a:extLst>
+          </p:cNvPr>
+          <p:cNvSpPr>
+            <a:spLocks noGrp="1"/>
+          </p:cNvSpPr>
+          <p:nvPr>
+            <p:ph type="body" idx="1"/>
+          </p:nvPr>
+        </p:nvSpPr>
+        <p:spPr/>
+        <p:txBody>
+          <a:bodyPr/>
+          <a:lstStyle/>
+          <a:p>
+            <a:pPr marL="114300" indent="0">
+              <a:buNone/>
+            </a:pPr>
+            <a:r>
+              <a:rPr lang="en-US" u="sng" dirty="0">
+                <a:solidFill>
+                  <a:schemeClr val="tx1"/>
+                </a:solidFill>
+                <a:latin typeface="Avenir Next LT Pro" panose="020B0504020202020204" pitchFamily="34" charset="0"/>
+              </a:rPr>
+              <a:t>Explain how you plan to address the implication:</a:t>
+            </a:r>
+            <a:endParaRPr lang="en-US" dirty="0">
+              <a:solidFill>
+                <a:schemeClr val="tx1"/>
+              </a:solidFill>
+              <a:latin typeface="Avenir Next LT Pro" panose="020B0504020202020204" pitchFamily="34" charset="0"/>
+            </a:endParaRPr>
+          </a:p>
+          <a:p>
+            <a:pPr marL="114300" indent="0">
+              <a:buNone/>
+            </a:pPr>
+            <a:r>
+              <a:rPr lang="en-US" dirty="0">
+                <a:solidFill>
+                  <a:schemeClr val="tx1"/>
+                </a:solidFill>
+                <a:latin typeface="Avenir Next LT Pro" panose="020B0504020202020204" pitchFamily="34" charset="0"/>
+              </a:rPr>
+              <a:t>I plan to address this implication by making sure that, at the end of each order, I wipe out all the personal information that is given by the customer. This includes any phone numbers names, or home addresses. This way, no one will have any access to their personal information, and it keeps their identity safe.</a:t>
+            </a:r>
+          </a:p>
+          <a:p>
+            <a:pPr marL="114300" indent="0">
+              <a:buNone/>
+            </a:pPr>
+            <a:endParaRPr lang="en-NZ" u="sng" dirty="0">
+              <a:solidFill>
+                <a:schemeClr val="tx1"/>
+              </a:solidFill>
+              <a:latin typeface="Avenir Next LT Pro" panose="020B0504020202020204" pitchFamily="34" charset="0"/>
+            </a:endParaRPr>
+          </a:p>
+        </p:txBody>
+      </p:sp>
+    </p:spTree>
+    <p:extLst>
+      <p:ext uri="{BB962C8B-B14F-4D97-AF65-F5344CB8AC3E}">
+        <p14:creationId xmlns:p14="http://schemas.microsoft.com/office/powerpoint/2010/main" val="1674096743"/>
+      </p:ext>
+    </p:extLst>
+  </p:cSld>
+  <p:clrMapOvr>
+    <a:masterClrMapping/>
+  </p:clrMapOvr>
+</p:sld>
+</file>
+
+<file path=ppt/slides/slide50.xml><?xml version="1.0" encoding="utf-8"?>
+<p:sld xmlns:a="http://schemas.openxmlformats.org/drawingml/2006/main" xmlns:r="http://schemas.openxmlformats.org/officeDocument/2006/relationships" xmlns:p="http://schemas.openxmlformats.org/presentationml/2006/main">
+  <p:cSld>
+    <p:bg>
+      <p:bgPr>
+        <a:solidFill>
+          <a:srgbClr val="D9EAD3"/>
+        </a:solidFill>
+        <a:effectLst/>
+      </p:bgPr>
+    </p:bg>
+    <p:spTree>
+      <p:nvGrpSpPr>
+        <p:cNvPr id="1" name="Shape 72"/>
+        <p:cNvGrpSpPr/>
+        <p:nvPr/>
+      </p:nvGrpSpPr>
+      <p:grpSpPr>
+        <a:xfrm>
+          <a:off x="0" y="0"/>
+          <a:ext cx="0" cy="0"/>
+          <a:chOff x="0" y="0"/>
+          <a:chExt cx="0" cy="0"/>
+        </a:xfrm>
+      </p:grpSpPr>
+      <p:sp>
+        <p:nvSpPr>
+          <p:cNvPr id="73" name="Google Shape;73;p16"/>
+          <p:cNvSpPr txBox="1">
+            <a:spLocks noGrp="1"/>
+          </p:cNvSpPr>
+          <p:nvPr>
+            <p:ph type="title"/>
+          </p:nvPr>
+        </p:nvSpPr>
+        <p:spPr>
+          <a:xfrm>
+            <a:off x="311700" y="445025"/>
+            <a:ext cx="8520600" cy="1098739"/>
+          </a:xfrm>
+          <a:prstGeom prst="rect">
+            <a:avLst/>
+          </a:prstGeom>
+        </p:spPr>
+        <p:txBody>
+          <a:bodyPr spcFirstLastPara="1" wrap="square" lIns="91425" tIns="91425" rIns="91425" bIns="91425" anchor="t" anchorCtr="0">
+            <a:noAutofit/>
+          </a:bodyPr>
+          <a:lstStyle/>
+          <a:p>
+            <a:r>
+              <a:rPr lang="en" dirty="0"/>
               <a:t>Using evidence of user feedback show how you refined your program (duplicate slides)</a:t>
             </a:r>
           </a:p>
@@ -20509,7 +21760,7 @@
 </p:sld>
 </file>
 
-<file path=ppt/slides/slide49.xml><?xml version="1.0" encoding="utf-8"?>
+<file path=ppt/slides/slide51.xml><?xml version="1.0" encoding="utf-8"?>
 <p:sld xmlns:a="http://schemas.openxmlformats.org/drawingml/2006/main" xmlns:r="http://schemas.openxmlformats.org/officeDocument/2006/relationships" xmlns:p="http://schemas.openxmlformats.org/presentationml/2006/main">
   <p:cSld>
     <p:bg>
@@ -20611,180 +21862,7 @@
 </p:sld>
 </file>
 
-<file path=ppt/slides/slide5.xml><?xml version="1.0" encoding="utf-8"?>
-<p:sld xmlns:a="http://schemas.openxmlformats.org/drawingml/2006/main" xmlns:r="http://schemas.openxmlformats.org/officeDocument/2006/relationships" xmlns:p="http://schemas.openxmlformats.org/presentationml/2006/main">
-  <p:cSld>
-    <p:bg>
-      <p:bgPr>
-        <a:solidFill>
-          <a:srgbClr val="FFCC66"/>
-        </a:solidFill>
-        <a:effectLst/>
-      </p:bgPr>
-    </p:bg>
-    <p:spTree>
-      <p:nvGrpSpPr>
-        <p:cNvPr id="1" name=""/>
-        <p:cNvGrpSpPr/>
-        <p:nvPr/>
-      </p:nvGrpSpPr>
-      <p:grpSpPr>
-        <a:xfrm>
-          <a:off x="0" y="0"/>
-          <a:ext cx="0" cy="0"/>
-          <a:chOff x="0" y="0"/>
-          <a:chExt cx="0" cy="0"/>
-        </a:xfrm>
-      </p:grpSpPr>
-      <p:pic>
-        <p:nvPicPr>
-          <p:cNvPr id="5" name="Picture 4">
-            <a:extLst>
-              <a:ext uri="{FF2B5EF4-FFF2-40B4-BE49-F238E27FC236}">
-                <a16:creationId xmlns:a16="http://schemas.microsoft.com/office/drawing/2014/main" id="{D32D7A87-7111-49D0-A7EF-1FA83C820A1C}"/>
-              </a:ext>
-            </a:extLst>
-          </p:cNvPr>
-          <p:cNvPicPr>
-            <a:picLocks noChangeAspect="1"/>
-          </p:cNvPicPr>
-          <p:nvPr/>
-        </p:nvPicPr>
-        <p:blipFill>
-          <a:blip r:embed="rId2"/>
-          <a:stretch>
-            <a:fillRect/>
-          </a:stretch>
-        </p:blipFill>
-        <p:spPr>
-          <a:xfrm>
-            <a:off x="10111" y="0"/>
-            <a:ext cx="9123778" cy="5143500"/>
-          </a:xfrm>
-          <a:prstGeom prst="rect">
-            <a:avLst/>
-          </a:prstGeom>
-        </p:spPr>
-      </p:pic>
-      <p:sp>
-        <p:nvSpPr>
-          <p:cNvPr id="2" name="Title 1">
-            <a:extLst>
-              <a:ext uri="{FF2B5EF4-FFF2-40B4-BE49-F238E27FC236}">
-                <a16:creationId xmlns:a16="http://schemas.microsoft.com/office/drawing/2014/main" id="{5912979F-6922-40FD-B6E0-0506FA25714D}"/>
-              </a:ext>
-            </a:extLst>
-          </p:cNvPr>
-          <p:cNvSpPr>
-            <a:spLocks noGrp="1"/>
-          </p:cNvSpPr>
-          <p:nvPr>
-            <p:ph type="title"/>
-          </p:nvPr>
-        </p:nvSpPr>
-        <p:spPr>
-          <a:xfrm>
-            <a:off x="426000" y="452645"/>
-            <a:ext cx="8520600" cy="572700"/>
-          </a:xfrm>
-        </p:spPr>
-        <p:txBody>
-          <a:bodyPr/>
-          <a:lstStyle/>
-          <a:p>
-            <a:r>
-              <a:rPr lang="en-US" b="1" dirty="0">
-                <a:latin typeface="Avenir Next LT Pro" panose="020B0504020202020204" pitchFamily="34" charset="0"/>
-              </a:rPr>
-              <a:t>Implication 1 - Privacy</a:t>
-            </a:r>
-            <a:endParaRPr lang="en-NZ" b="1" dirty="0">
-              <a:latin typeface="Avenir Next LT Pro" panose="020B0504020202020204" pitchFamily="34" charset="0"/>
-            </a:endParaRPr>
-          </a:p>
-        </p:txBody>
-      </p:sp>
-      <p:sp>
-        <p:nvSpPr>
-          <p:cNvPr id="3" name="Text Placeholder 2">
-            <a:extLst>
-              <a:ext uri="{FF2B5EF4-FFF2-40B4-BE49-F238E27FC236}">
-                <a16:creationId xmlns:a16="http://schemas.microsoft.com/office/drawing/2014/main" id="{1EB42CE1-67BF-466B-8C2C-7F21A8892B1E}"/>
-              </a:ext>
-            </a:extLst>
-          </p:cNvPr>
-          <p:cNvSpPr>
-            <a:spLocks noGrp="1"/>
-          </p:cNvSpPr>
-          <p:nvPr>
-            <p:ph type="body" idx="1"/>
-          </p:nvPr>
-        </p:nvSpPr>
-        <p:spPr/>
-        <p:txBody>
-          <a:bodyPr/>
-          <a:lstStyle/>
-          <a:p>
-            <a:pPr marL="114300" indent="0">
-              <a:buNone/>
-            </a:pPr>
-            <a:r>
-              <a:rPr lang="en-US" u="sng" dirty="0">
-                <a:solidFill>
-                  <a:schemeClr val="tx1"/>
-                </a:solidFill>
-                <a:latin typeface="Avenir Next LT Pro" panose="020B0504020202020204" pitchFamily="34" charset="0"/>
-              </a:rPr>
-              <a:t>Explain how you plan to address the implication:</a:t>
-            </a:r>
-            <a:endParaRPr lang="en-US" dirty="0">
-              <a:solidFill>
-                <a:schemeClr val="tx1"/>
-              </a:solidFill>
-              <a:latin typeface="Avenir Next LT Pro" panose="020B0504020202020204" pitchFamily="34" charset="0"/>
-            </a:endParaRPr>
-          </a:p>
-          <a:p>
-            <a:pPr marL="114300" indent="0">
-              <a:buNone/>
-            </a:pPr>
-            <a:r>
-              <a:rPr lang="en-US" dirty="0">
-                <a:solidFill>
-                  <a:schemeClr val="tx1"/>
-                </a:solidFill>
-                <a:latin typeface="Avenir Next LT Pro" panose="020B0504020202020204" pitchFamily="34" charset="0"/>
-              </a:rPr>
-              <a:t>I plan to address this implication by making sure that, at the end of each order, I wipe out all the personal information that is given by the customer. This includes any phone numbers names, or home addresses. This way, no one will have any access to their personal information, and it keeps their identity safe.</a:t>
-            </a:r>
-          </a:p>
-          <a:p>
-            <a:pPr marL="114300" indent="0">
-              <a:buNone/>
-            </a:pPr>
-            <a:endParaRPr lang="en-NZ" u="sng" dirty="0">
-              <a:solidFill>
-                <a:schemeClr val="tx1"/>
-              </a:solidFill>
-              <a:latin typeface="Avenir Next LT Pro" panose="020B0504020202020204" pitchFamily="34" charset="0"/>
-            </a:endParaRPr>
-          </a:p>
-        </p:txBody>
-      </p:sp>
-    </p:spTree>
-    <p:extLst>
-      <p:ext uri="{BB962C8B-B14F-4D97-AF65-F5344CB8AC3E}">
-        <p14:creationId xmlns:p14="http://schemas.microsoft.com/office/powerpoint/2010/main" val="1674096743"/>
-      </p:ext>
-    </p:extLst>
-  </p:cSld>
-  <p:clrMapOvr>
-    <a:masterClrMapping/>
-  </p:clrMapOvr>
-</p:sld>
-</file>
-
-<file path=ppt/slides/slide50.xml><?xml version="1.0" encoding="utf-8"?>
+<file path=ppt/slides/slide52.xml><?xml version="1.0" encoding="utf-8"?>
 <p:sld xmlns:a="http://schemas.openxmlformats.org/drawingml/2006/main" xmlns:r="http://schemas.openxmlformats.org/officeDocument/2006/relationships" xmlns:p="http://schemas.openxmlformats.org/presentationml/2006/main">
   <p:cSld>
     <p:bg>
@@ -20901,7 +21979,7 @@
 </p:sld>
 </file>
 
-<file path=ppt/slides/slide51.xml><?xml version="1.0" encoding="utf-8"?>
+<file path=ppt/slides/slide53.xml><?xml version="1.0" encoding="utf-8"?>
 <p:sld xmlns:a="http://schemas.openxmlformats.org/drawingml/2006/main" xmlns:r="http://schemas.openxmlformats.org/officeDocument/2006/relationships" xmlns:p="http://schemas.openxmlformats.org/presentationml/2006/main">
   <p:cSld>
     <p:bg>
@@ -21007,7 +22085,7 @@
 </p:sld>
 </file>
 
-<file path=ppt/slides/slide52.xml><?xml version="1.0" encoding="utf-8"?>
+<file path=ppt/slides/slide54.xml><?xml version="1.0" encoding="utf-8"?>
 <p:sld xmlns:a="http://schemas.openxmlformats.org/drawingml/2006/main" xmlns:r="http://schemas.openxmlformats.org/officeDocument/2006/relationships" xmlns:p="http://schemas.openxmlformats.org/presentationml/2006/main">
   <p:cSld>
     <p:bg>
@@ -21129,7 +22207,7 @@
 </p:sld>
 </file>
 
-<file path=ppt/slides/slide53.xml><?xml version="1.0" encoding="utf-8"?>
+<file path=ppt/slides/slide55.xml><?xml version="1.0" encoding="utf-8"?>
 <p:sld xmlns:a="http://schemas.openxmlformats.org/drawingml/2006/main" xmlns:r="http://schemas.openxmlformats.org/officeDocument/2006/relationships" xmlns:p="http://schemas.openxmlformats.org/presentationml/2006/main">
   <p:cSld>
     <p:bg>
@@ -21251,7 +22329,7 @@
 </p:sld>
 </file>
 
-<file path=ppt/slides/slide54.xml><?xml version="1.0" encoding="utf-8"?>
+<file path=ppt/slides/slide56.xml><?xml version="1.0" encoding="utf-8"?>
 <p:sld xmlns:a="http://schemas.openxmlformats.org/drawingml/2006/main" xmlns:r="http://schemas.openxmlformats.org/officeDocument/2006/relationships" xmlns:p="http://schemas.openxmlformats.org/presentationml/2006/main">
   <p:cSld>
     <p:bg>

</xml_diff>

<commit_message>
Added version 1 and 2 nuts menu
Created 2 versions of basic nuts menu.
</commit_message>
<xml_diff>
--- a/Danett Pepito - 000_91896 _ 91897 Documentation - 2150400 (Git).pptx
+++ b/Danett Pepito - 000_91896 _ 91897 Documentation - 2150400 (Git).pptx
@@ -5,7 +5,7 @@
     <p:sldMasterId id="2147483659" r:id="rId1"/>
   </p:sldMasterIdLst>
   <p:notesMasterIdLst>
-    <p:notesMasterId r:id="rId58"/>
+    <p:notesMasterId r:id="rId60"/>
   </p:notesMasterIdLst>
   <p:sldIdLst>
     <p:sldId id="256" r:id="rId2"/>
@@ -51,19 +51,21 @@
     <p:sldId id="314" r:id="rId42"/>
     <p:sldId id="278" r:id="rId43"/>
     <p:sldId id="279" r:id="rId44"/>
-    <p:sldId id="280" r:id="rId45"/>
-    <p:sldId id="281" r:id="rId46"/>
-    <p:sldId id="282" r:id="rId47"/>
-    <p:sldId id="288" r:id="rId48"/>
-    <p:sldId id="290" r:id="rId49"/>
-    <p:sldId id="292" r:id="rId50"/>
-    <p:sldId id="291" r:id="rId51"/>
-    <p:sldId id="285" r:id="rId52"/>
-    <p:sldId id="261" r:id="rId53"/>
-    <p:sldId id="284" r:id="rId54"/>
-    <p:sldId id="286" r:id="rId55"/>
-    <p:sldId id="287" r:id="rId56"/>
-    <p:sldId id="262" r:id="rId57"/>
+    <p:sldId id="315" r:id="rId45"/>
+    <p:sldId id="316" r:id="rId46"/>
+    <p:sldId id="280" r:id="rId47"/>
+    <p:sldId id="281" r:id="rId48"/>
+    <p:sldId id="282" r:id="rId49"/>
+    <p:sldId id="288" r:id="rId50"/>
+    <p:sldId id="290" r:id="rId51"/>
+    <p:sldId id="292" r:id="rId52"/>
+    <p:sldId id="291" r:id="rId53"/>
+    <p:sldId id="285" r:id="rId54"/>
+    <p:sldId id="261" r:id="rId55"/>
+    <p:sldId id="284" r:id="rId56"/>
+    <p:sldId id="286" r:id="rId57"/>
+    <p:sldId id="287" r:id="rId58"/>
+    <p:sldId id="262" r:id="rId59"/>
   </p:sldIdLst>
   <p:sldSz cx="9144000" cy="5143500" type="screen16x9"/>
   <p:notesSz cx="6858000" cy="9144000"/>
@@ -318,7 +320,7 @@
 <file path=ppt/revisionInfo.xml><?xml version="1.0" encoding="utf-8"?>
 <p1510:revInfo xmlns:a="http://schemas.openxmlformats.org/drawingml/2006/main" xmlns:r="http://schemas.openxmlformats.org/officeDocument/2006/relationships" xmlns:p1510="http://schemas.microsoft.com/office/powerpoint/2015/10/main">
   <p1510:revLst>
-    <p1510:client id="{B2185394-3AFD-42B2-9285-3B672C598A56}" v="14" dt="2022-03-21T06:07:11.845"/>
+    <p1510:client id="{B2185394-3AFD-42B2-9285-3B672C598A56}" v="19" dt="2022-03-21T07:04:16.600"/>
   </p1510:revLst>
 </p1510:revInfo>
 </file>
@@ -328,7 +330,7 @@
   <pc:docChgLst>
     <pc:chgData name="Danett Pepito" userId="ddef1e2176689e9a" providerId="LiveId" clId="{B2185394-3AFD-42B2-9285-3B672C598A56}"/>
     <pc:docChg chg="undo custSel addSld delSld modSld sldOrd">
-      <pc:chgData name="Danett Pepito" userId="ddef1e2176689e9a" providerId="LiveId" clId="{B2185394-3AFD-42B2-9285-3B672C598A56}" dt="2022-03-21T06:29:46.681" v="1018" actId="20577"/>
+      <pc:chgData name="Danett Pepito" userId="ddef1e2176689e9a" providerId="LiveId" clId="{B2185394-3AFD-42B2-9285-3B672C598A56}" dt="2022-03-21T07:04:21.940" v="1196" actId="255"/>
       <pc:docMkLst>
         <pc:docMk/>
       </pc:docMkLst>
@@ -641,6 +643,108 @@
             <pc:docMk/>
             <pc:sldMk cId="1404000423" sldId="277"/>
             <ac:picMk id="6" creationId="{242499B0-BCEA-4632-B876-887D6A7F5B6E}"/>
+          </ac:picMkLst>
+        </pc:picChg>
+      </pc:sldChg>
+      <pc:sldChg chg="addSp delSp modSp mod">
+        <pc:chgData name="Danett Pepito" userId="ddef1e2176689e9a" providerId="LiveId" clId="{B2185394-3AFD-42B2-9285-3B672C598A56}" dt="2022-03-21T06:59:20.395" v="1167" actId="1076"/>
+        <pc:sldMkLst>
+          <pc:docMk/>
+          <pc:sldMk cId="1844760190" sldId="278"/>
+        </pc:sldMkLst>
+        <pc:spChg chg="mod">
+          <ac:chgData name="Danett Pepito" userId="ddef1e2176689e9a" providerId="LiveId" clId="{B2185394-3AFD-42B2-9285-3B672C598A56}" dt="2022-03-21T06:49:16.264" v="1085" actId="14100"/>
+          <ac:spMkLst>
+            <pc:docMk/>
+            <pc:sldMk cId="1844760190" sldId="278"/>
+            <ac:spMk id="73" creationId="{00000000-0000-0000-0000-000000000000}"/>
+          </ac:spMkLst>
+        </pc:spChg>
+        <pc:picChg chg="add ord">
+          <ac:chgData name="Danett Pepito" userId="ddef1e2176689e9a" providerId="LiveId" clId="{B2185394-3AFD-42B2-9285-3B672C598A56}" dt="2022-03-21T06:46:08.779" v="1020" actId="167"/>
+          <ac:picMkLst>
+            <pc:docMk/>
+            <pc:sldMk cId="1844760190" sldId="278"/>
+            <ac:picMk id="3" creationId="{815F84BD-1558-4642-B529-2FD7D4E62D2A}"/>
+          </ac:picMkLst>
+        </pc:picChg>
+        <pc:picChg chg="add del">
+          <ac:chgData name="Danett Pepito" userId="ddef1e2176689e9a" providerId="LiveId" clId="{B2185394-3AFD-42B2-9285-3B672C598A56}" dt="2022-03-21T06:48:36.239" v="1069" actId="478"/>
+          <ac:picMkLst>
+            <pc:docMk/>
+            <pc:sldMk cId="1844760190" sldId="278"/>
+            <ac:picMk id="5" creationId="{60AC39C2-9AF8-42BF-9040-EBDE782551A8}"/>
+          </ac:picMkLst>
+        </pc:picChg>
+        <pc:picChg chg="add del mod">
+          <ac:chgData name="Danett Pepito" userId="ddef1e2176689e9a" providerId="LiveId" clId="{B2185394-3AFD-42B2-9285-3B672C598A56}" dt="2022-03-21T06:59:16.991" v="1164" actId="478"/>
+          <ac:picMkLst>
+            <pc:docMk/>
+            <pc:sldMk cId="1844760190" sldId="278"/>
+            <ac:picMk id="7" creationId="{05D9C27F-A4FF-4881-91F1-5D90FE2E2663}"/>
+          </ac:picMkLst>
+        </pc:picChg>
+        <pc:picChg chg="add mod">
+          <ac:chgData name="Danett Pepito" userId="ddef1e2176689e9a" providerId="LiveId" clId="{B2185394-3AFD-42B2-9285-3B672C598A56}" dt="2022-03-21T06:59:20.395" v="1167" actId="1076"/>
+          <ac:picMkLst>
+            <pc:docMk/>
+            <pc:sldMk cId="1844760190" sldId="278"/>
+            <ac:picMk id="9" creationId="{6969D041-B257-4FCA-90F8-5EB95787177A}"/>
+          </ac:picMkLst>
+        </pc:picChg>
+      </pc:sldChg>
+      <pc:sldChg chg="addSp delSp modSp mod">
+        <pc:chgData name="Danett Pepito" userId="ddef1e2176689e9a" providerId="LiveId" clId="{B2185394-3AFD-42B2-9285-3B672C598A56}" dt="2022-03-21T06:59:42.314" v="1178" actId="20577"/>
+        <pc:sldMkLst>
+          <pc:docMk/>
+          <pc:sldMk cId="3724268218" sldId="279"/>
+        </pc:sldMkLst>
+        <pc:spChg chg="mod">
+          <ac:chgData name="Danett Pepito" userId="ddef1e2176689e9a" providerId="LiveId" clId="{B2185394-3AFD-42B2-9285-3B672C598A56}" dt="2022-03-21T06:59:42.314" v="1178" actId="20577"/>
+          <ac:spMkLst>
+            <pc:docMk/>
+            <pc:sldMk cId="3724268218" sldId="279"/>
+            <ac:spMk id="78" creationId="{00000000-0000-0000-0000-000000000000}"/>
+          </ac:spMkLst>
+        </pc:spChg>
+        <pc:graphicFrameChg chg="mod modGraphic">
+          <ac:chgData name="Danett Pepito" userId="ddef1e2176689e9a" providerId="LiveId" clId="{B2185394-3AFD-42B2-9285-3B672C598A56}" dt="2022-03-21T06:57:25.752" v="1154" actId="14734"/>
+          <ac:graphicFrameMkLst>
+            <pc:docMk/>
+            <pc:sldMk cId="3724268218" sldId="279"/>
+            <ac:graphicFrameMk id="79" creationId="{00000000-0000-0000-0000-000000000000}"/>
+          </ac:graphicFrameMkLst>
+        </pc:graphicFrameChg>
+        <pc:picChg chg="add ord">
+          <ac:chgData name="Danett Pepito" userId="ddef1e2176689e9a" providerId="LiveId" clId="{B2185394-3AFD-42B2-9285-3B672C598A56}" dt="2022-03-21T06:46:35.735" v="1022" actId="167"/>
+          <ac:picMkLst>
+            <pc:docMk/>
+            <pc:sldMk cId="3724268218" sldId="279"/>
+            <ac:picMk id="3" creationId="{EC04E06A-902D-4319-81DE-CAED577EA0C2}"/>
+          </ac:picMkLst>
+        </pc:picChg>
+        <pc:picChg chg="add del">
+          <ac:chgData name="Danett Pepito" userId="ddef1e2176689e9a" providerId="LiveId" clId="{B2185394-3AFD-42B2-9285-3B672C598A56}" dt="2022-03-21T06:48:33.138" v="1067" actId="478"/>
+          <ac:picMkLst>
+            <pc:docMk/>
+            <pc:sldMk cId="3724268218" sldId="279"/>
+            <ac:picMk id="5" creationId="{42CC0994-3C19-4E3C-9188-D3F27EFE4B8E}"/>
+          </ac:picMkLst>
+        </pc:picChg>
+        <pc:picChg chg="add mod">
+          <ac:chgData name="Danett Pepito" userId="ddef1e2176689e9a" providerId="LiveId" clId="{B2185394-3AFD-42B2-9285-3B672C598A56}" dt="2022-03-21T06:57:31.524" v="1156" actId="14100"/>
+          <ac:picMkLst>
+            <pc:docMk/>
+            <pc:sldMk cId="3724268218" sldId="279"/>
+            <ac:picMk id="7" creationId="{48C782DE-40F9-4F90-B1AA-87C6E9382980}"/>
+          </ac:picMkLst>
+        </pc:picChg>
+        <pc:picChg chg="add mod">
+          <ac:chgData name="Danett Pepito" userId="ddef1e2176689e9a" providerId="LiveId" clId="{B2185394-3AFD-42B2-9285-3B672C598A56}" dt="2022-03-21T06:57:37.361" v="1159" actId="1076"/>
+          <ac:picMkLst>
+            <pc:docMk/>
+            <pc:sldMk cId="3724268218" sldId="279"/>
+            <ac:picMk id="9" creationId="{09D939BA-4ED7-4FCD-B084-8EAD8B1EAEDE}"/>
           </ac:picMkLst>
         </pc:picChg>
       </pc:sldChg>
@@ -1526,6 +1630,92 @@
           </ac:picMkLst>
         </pc:picChg>
       </pc:sldChg>
+      <pc:sldChg chg="addSp delSp modSp add mod">
+        <pc:chgData name="Danett Pepito" userId="ddef1e2176689e9a" providerId="LiveId" clId="{B2185394-3AFD-42B2-9285-3B672C598A56}" dt="2022-03-21T07:00:29.641" v="1181" actId="1076"/>
+        <pc:sldMkLst>
+          <pc:docMk/>
+          <pc:sldMk cId="1422053013" sldId="315"/>
+        </pc:sldMkLst>
+        <pc:spChg chg="mod">
+          <ac:chgData name="Danett Pepito" userId="ddef1e2176689e9a" providerId="LiveId" clId="{B2185394-3AFD-42B2-9285-3B672C598A56}" dt="2022-03-21T06:59:34.086" v="1174" actId="14100"/>
+          <ac:spMkLst>
+            <pc:docMk/>
+            <pc:sldMk cId="1422053013" sldId="315"/>
+            <ac:spMk id="73" creationId="{00000000-0000-0000-0000-000000000000}"/>
+          </ac:spMkLst>
+        </pc:spChg>
+        <pc:picChg chg="add mod">
+          <ac:chgData name="Danett Pepito" userId="ddef1e2176689e9a" providerId="LiveId" clId="{B2185394-3AFD-42B2-9285-3B672C598A56}" dt="2022-03-21T07:00:29.641" v="1181" actId="1076"/>
+          <ac:picMkLst>
+            <pc:docMk/>
+            <pc:sldMk cId="1422053013" sldId="315"/>
+            <ac:picMk id="4" creationId="{F6DB018E-FF55-458E-B5D9-BCF249234148}"/>
+          </ac:picMkLst>
+        </pc:picChg>
+        <pc:picChg chg="del">
+          <ac:chgData name="Danett Pepito" userId="ddef1e2176689e9a" providerId="LiveId" clId="{B2185394-3AFD-42B2-9285-3B672C598A56}" dt="2022-03-21T06:57:42.688" v="1161" actId="478"/>
+          <ac:picMkLst>
+            <pc:docMk/>
+            <pc:sldMk cId="1422053013" sldId="315"/>
+            <ac:picMk id="7" creationId="{05D9C27F-A4FF-4881-91F1-5D90FE2E2663}"/>
+          </ac:picMkLst>
+        </pc:picChg>
+      </pc:sldChg>
+      <pc:sldChg chg="addSp delSp modSp add mod replId">
+        <pc:chgData name="Danett Pepito" userId="ddef1e2176689e9a" providerId="LiveId" clId="{B2185394-3AFD-42B2-9285-3B672C598A56}" dt="2022-03-21T07:04:21.940" v="1196" actId="255"/>
+        <pc:sldMkLst>
+          <pc:docMk/>
+          <pc:sldMk cId="1066590280" sldId="316"/>
+        </pc:sldMkLst>
+        <pc:spChg chg="mod">
+          <ac:chgData name="Danett Pepito" userId="ddef1e2176689e9a" providerId="LiveId" clId="{B2185394-3AFD-42B2-9285-3B672C598A56}" dt="2022-03-21T06:59:38.979" v="1177" actId="20577"/>
+          <ac:spMkLst>
+            <pc:docMk/>
+            <pc:sldMk cId="1066590280" sldId="316"/>
+            <ac:spMk id="78" creationId="{00000000-0000-0000-0000-000000000000}"/>
+          </ac:spMkLst>
+        </pc:spChg>
+        <pc:graphicFrameChg chg="mod modGraphic">
+          <ac:chgData name="Danett Pepito" userId="ddef1e2176689e9a" providerId="LiveId" clId="{B2185394-3AFD-42B2-9285-3B672C598A56}" dt="2022-03-21T07:04:21.940" v="1196" actId="255"/>
+          <ac:graphicFrameMkLst>
+            <pc:docMk/>
+            <pc:sldMk cId="1066590280" sldId="316"/>
+            <ac:graphicFrameMk id="79" creationId="{00000000-0000-0000-0000-000000000000}"/>
+          </ac:graphicFrameMkLst>
+        </pc:graphicFrameChg>
+        <pc:picChg chg="add mod">
+          <ac:chgData name="Danett Pepito" userId="ddef1e2176689e9a" providerId="LiveId" clId="{B2185394-3AFD-42B2-9285-3B672C598A56}" dt="2022-03-21T07:03:56.290" v="1191" actId="1076"/>
+          <ac:picMkLst>
+            <pc:docMk/>
+            <pc:sldMk cId="1066590280" sldId="316"/>
+            <ac:picMk id="4" creationId="{47FE16B3-9D3C-443D-AA9B-0529AA66A3FA}"/>
+          </ac:picMkLst>
+        </pc:picChg>
+        <pc:picChg chg="add mod">
+          <ac:chgData name="Danett Pepito" userId="ddef1e2176689e9a" providerId="LiveId" clId="{B2185394-3AFD-42B2-9285-3B672C598A56}" dt="2022-03-21T07:03:52.191" v="1189" actId="14100"/>
+          <ac:picMkLst>
+            <pc:docMk/>
+            <pc:sldMk cId="1066590280" sldId="316"/>
+            <ac:picMk id="6" creationId="{03AC1C3C-D597-41C3-9C9C-87DD19A35F73}"/>
+          </ac:picMkLst>
+        </pc:picChg>
+        <pc:picChg chg="del">
+          <ac:chgData name="Danett Pepito" userId="ddef1e2176689e9a" providerId="LiveId" clId="{B2185394-3AFD-42B2-9285-3B672C598A56}" dt="2022-03-21T06:57:44.271" v="1162" actId="478"/>
+          <ac:picMkLst>
+            <pc:docMk/>
+            <pc:sldMk cId="1066590280" sldId="316"/>
+            <ac:picMk id="7" creationId="{48C782DE-40F9-4F90-B1AA-87C6E9382980}"/>
+          </ac:picMkLst>
+        </pc:picChg>
+        <pc:picChg chg="del">
+          <ac:chgData name="Danett Pepito" userId="ddef1e2176689e9a" providerId="LiveId" clId="{B2185394-3AFD-42B2-9285-3B672C598A56}" dt="2022-03-21T06:57:45.391" v="1163" actId="478"/>
+          <ac:picMkLst>
+            <pc:docMk/>
+            <pc:sldMk cId="1066590280" sldId="316"/>
+            <ac:picMk id="9" creationId="{09D939BA-4ED7-4FCD-B084-8EAD8B1EAEDE}"/>
+          </ac:picMkLst>
+        </pc:picChg>
+      </pc:sldChg>
     </pc:docChg>
   </pc:docChgLst>
 </pc:chgInfo>
@@ -5025,7 +5215,7 @@
     </p:spTree>
     <p:extLst>
       <p:ext uri="{BB962C8B-B14F-4D97-AF65-F5344CB8AC3E}">
-        <p14:creationId xmlns:p14="http://schemas.microsoft.com/office/powerpoint/2010/main" val="784738588"/>
+        <p14:creationId xmlns:p14="http://schemas.microsoft.com/office/powerpoint/2010/main" val="2880024378"/>
       </p:ext>
     </p:extLst>
   </p:cSld>
@@ -5134,7 +5324,7 @@
     </p:spTree>
     <p:extLst>
       <p:ext uri="{BB962C8B-B14F-4D97-AF65-F5344CB8AC3E}">
-        <p14:creationId xmlns:p14="http://schemas.microsoft.com/office/powerpoint/2010/main" val="3494323208"/>
+        <p14:creationId xmlns:p14="http://schemas.microsoft.com/office/powerpoint/2010/main" val="4005623096"/>
       </p:ext>
     </p:extLst>
   </p:cSld>
@@ -5243,7 +5433,7 @@
     </p:spTree>
     <p:extLst>
       <p:ext uri="{BB962C8B-B14F-4D97-AF65-F5344CB8AC3E}">
-        <p14:creationId xmlns:p14="http://schemas.microsoft.com/office/powerpoint/2010/main" val="3006313543"/>
+        <p14:creationId xmlns:p14="http://schemas.microsoft.com/office/powerpoint/2010/main" val="784738588"/>
       </p:ext>
     </p:extLst>
   </p:cSld>
@@ -5258,7 +5448,7 @@
   <p:cSld>
     <p:spTree>
       <p:nvGrpSpPr>
-        <p:cNvPr id="1" name="Shape 69"/>
+        <p:cNvPr id="1" name="Shape 74"/>
         <p:cNvGrpSpPr/>
         <p:nvPr/>
       </p:nvGrpSpPr>
@@ -5272,7 +5462,7 @@
       </p:grpSpPr>
       <p:sp>
         <p:nvSpPr>
-          <p:cNvPr id="70" name="Google Shape;70;gac10fef634_0_16:notes"/>
+          <p:cNvPr id="75" name="Google Shape;75;gac10fef634_0_20:notes"/>
           <p:cNvSpPr>
             <a:spLocks noGrp="1" noRot="1" noChangeAspect="1"/>
           </p:cNvSpPr>
@@ -5313,7 +5503,7 @@
       </p:sp>
       <p:sp>
         <p:nvSpPr>
-          <p:cNvPr id="71" name="Google Shape;71;gac10fef634_0_16:notes"/>
+          <p:cNvPr id="76" name="Google Shape;76;gac10fef634_0_20:notes"/>
           <p:cNvSpPr txBox="1">
             <a:spLocks noGrp="1"/>
           </p:cNvSpPr>
@@ -5352,7 +5542,7 @@
     </p:spTree>
     <p:extLst>
       <p:ext uri="{BB962C8B-B14F-4D97-AF65-F5344CB8AC3E}">
-        <p14:creationId xmlns:p14="http://schemas.microsoft.com/office/powerpoint/2010/main" val="2149026663"/>
+        <p14:creationId xmlns:p14="http://schemas.microsoft.com/office/powerpoint/2010/main" val="3494323208"/>
       </p:ext>
     </p:extLst>
   </p:cSld>
@@ -5461,7 +5651,7 @@
     </p:spTree>
     <p:extLst>
       <p:ext uri="{BB962C8B-B14F-4D97-AF65-F5344CB8AC3E}">
-        <p14:creationId xmlns:p14="http://schemas.microsoft.com/office/powerpoint/2010/main" val="3194274356"/>
+        <p14:creationId xmlns:p14="http://schemas.microsoft.com/office/powerpoint/2010/main" val="3006313543"/>
       </p:ext>
     </p:extLst>
   </p:cSld>
@@ -5570,7 +5760,7 @@
     </p:spTree>
     <p:extLst>
       <p:ext uri="{BB962C8B-B14F-4D97-AF65-F5344CB8AC3E}">
-        <p14:creationId xmlns:p14="http://schemas.microsoft.com/office/powerpoint/2010/main" val="3014292639"/>
+        <p14:creationId xmlns:p14="http://schemas.microsoft.com/office/powerpoint/2010/main" val="2149026663"/>
       </p:ext>
     </p:extLst>
   </p:cSld>
@@ -5689,7 +5879,7 @@
   <p:cSld>
     <p:spTree>
       <p:nvGrpSpPr>
-        <p:cNvPr id="1" name="Shape 80"/>
+        <p:cNvPr id="1" name="Shape 69"/>
         <p:cNvGrpSpPr/>
         <p:nvPr/>
       </p:nvGrpSpPr>
@@ -5703,7 +5893,7 @@
       </p:grpSpPr>
       <p:sp>
         <p:nvSpPr>
-          <p:cNvPr id="81" name="Google Shape;81;gac10fef634_0_25:notes"/>
+          <p:cNvPr id="70" name="Google Shape;70;gac10fef634_0_16:notes"/>
           <p:cNvSpPr>
             <a:spLocks noGrp="1" noRot="1" noChangeAspect="1"/>
           </p:cNvSpPr>
@@ -5744,7 +5934,7 @@
       </p:sp>
       <p:sp>
         <p:nvSpPr>
-          <p:cNvPr id="82" name="Google Shape;82;gac10fef634_0_25:notes"/>
+          <p:cNvPr id="71" name="Google Shape;71;gac10fef634_0_16:notes"/>
           <p:cNvSpPr txBox="1">
             <a:spLocks noGrp="1"/>
           </p:cNvSpPr>
@@ -5774,27 +5964,6 @@
               <a:spcAft>
                 <a:spcPts val="0"/>
               </a:spcAft>
-              <a:buClr>
-                <a:schemeClr val="dk1"/>
-              </a:buClr>
-              <a:buSzPts val="1100"/>
-              <a:buFont typeface="Arial"/>
-              <a:buNone/>
-            </a:pPr>
-            <a:r>
-              <a:rPr lang="en"/>
-              <a:t>Your version control evidence should go here.  This could be in the form of annotated screenshots which show you you managed this process or you could make a brief screencast explaining how you implemented version control.</a:t>
-            </a:r>
-            <a:endParaRPr/>
-          </a:p>
-          <a:p>
-            <a:pPr marL="0" lvl="0" indent="0" algn="l" rtl="0">
-              <a:spcBef>
-                <a:spcPts val="0"/>
-              </a:spcBef>
-              <a:spcAft>
-                <a:spcPts val="0"/>
-              </a:spcAft>
               <a:buNone/>
             </a:pPr>
             <a:endParaRPr/>
@@ -5802,6 +5971,11 @@
         </p:txBody>
       </p:sp>
     </p:spTree>
+    <p:extLst>
+      <p:ext uri="{BB962C8B-B14F-4D97-AF65-F5344CB8AC3E}">
+        <p14:creationId xmlns:p14="http://schemas.microsoft.com/office/powerpoint/2010/main" val="3194274356"/>
+      </p:ext>
+    </p:extLst>
   </p:cSld>
   <p:clrMapOvr>
     <a:masterClrMapping/>
@@ -5814,7 +5988,7 @@
   <p:cSld>
     <p:spTree>
       <p:nvGrpSpPr>
-        <p:cNvPr id="1" name="Shape 80"/>
+        <p:cNvPr id="1" name="Shape 69"/>
         <p:cNvGrpSpPr/>
         <p:nvPr/>
       </p:nvGrpSpPr>
@@ -5828,7 +6002,7 @@
       </p:grpSpPr>
       <p:sp>
         <p:nvSpPr>
-          <p:cNvPr id="81" name="Google Shape;81;gac10fef634_0_25:notes"/>
+          <p:cNvPr id="70" name="Google Shape;70;gac10fef634_0_16:notes"/>
           <p:cNvSpPr>
             <a:spLocks noGrp="1" noRot="1" noChangeAspect="1"/>
           </p:cNvSpPr>
@@ -5869,7 +6043,7 @@
       </p:sp>
       <p:sp>
         <p:nvSpPr>
-          <p:cNvPr id="82" name="Google Shape;82;gac10fef634_0_25:notes"/>
+          <p:cNvPr id="71" name="Google Shape;71;gac10fef634_0_16:notes"/>
           <p:cNvSpPr txBox="1">
             <a:spLocks noGrp="1"/>
           </p:cNvSpPr>
@@ -5891,27 +6065,6 @@
             <a:noAutofit/>
           </a:bodyPr>
           <a:lstStyle/>
-          <a:p>
-            <a:pPr marL="0" lvl="0" indent="0" algn="l" rtl="0">
-              <a:spcBef>
-                <a:spcPts val="0"/>
-              </a:spcBef>
-              <a:spcAft>
-                <a:spcPts val="0"/>
-              </a:spcAft>
-              <a:buClr>
-                <a:schemeClr val="dk1"/>
-              </a:buClr>
-              <a:buSzPts val="1100"/>
-              <a:buFont typeface="Arial"/>
-              <a:buNone/>
-            </a:pPr>
-            <a:r>
-              <a:rPr lang="en"/>
-              <a:t>Your version control evidence should go here.  This could be in the form of annotated screenshots which show you you managed this process or you could make a brief screencast explaining how you implemented version control.</a:t>
-            </a:r>
-            <a:endParaRPr/>
-          </a:p>
           <a:p>
             <a:pPr marL="0" lvl="0" indent="0" algn="l" rtl="0">
               <a:spcBef>
@@ -5929,7 +6082,7 @@
     </p:spTree>
     <p:extLst>
       <p:ext uri="{BB962C8B-B14F-4D97-AF65-F5344CB8AC3E}">
-        <p14:creationId xmlns:p14="http://schemas.microsoft.com/office/powerpoint/2010/main" val="511959585"/>
+        <p14:creationId xmlns:p14="http://schemas.microsoft.com/office/powerpoint/2010/main" val="3014292639"/>
       </p:ext>
     </p:extLst>
   </p:cSld>
@@ -6057,6 +6210,261 @@
         </p:txBody>
       </p:sp>
     </p:spTree>
+  </p:cSld>
+  <p:clrMapOvr>
+    <a:masterClrMapping/>
+  </p:clrMapOvr>
+</p:notes>
+</file>
+
+<file path=ppt/notesSlides/notesSlide43.xml><?xml version="1.0" encoding="utf-8"?>
+<p:notes xmlns:a="http://schemas.openxmlformats.org/drawingml/2006/main" xmlns:r="http://schemas.openxmlformats.org/officeDocument/2006/relationships" xmlns:p="http://schemas.openxmlformats.org/presentationml/2006/main" showMasterSp="0" showMasterPhAnim="0">
+  <p:cSld>
+    <p:spTree>
+      <p:nvGrpSpPr>
+        <p:cNvPr id="1" name="Shape 80"/>
+        <p:cNvGrpSpPr/>
+        <p:nvPr/>
+      </p:nvGrpSpPr>
+      <p:grpSpPr>
+        <a:xfrm>
+          <a:off x="0" y="0"/>
+          <a:ext cx="0" cy="0"/>
+          <a:chOff x="0" y="0"/>
+          <a:chExt cx="0" cy="0"/>
+        </a:xfrm>
+      </p:grpSpPr>
+      <p:sp>
+        <p:nvSpPr>
+          <p:cNvPr id="81" name="Google Shape;81;gac10fef634_0_25:notes"/>
+          <p:cNvSpPr>
+            <a:spLocks noGrp="1" noRot="1" noChangeAspect="1"/>
+          </p:cNvSpPr>
+          <p:nvPr>
+            <p:ph type="sldImg" idx="2"/>
+          </p:nvPr>
+        </p:nvSpPr>
+        <p:spPr>
+          <a:xfrm>
+            <a:off x="381000" y="685800"/>
+            <a:ext cx="6096000" cy="3429000"/>
+          </a:xfrm>
+          <a:custGeom>
+            <a:avLst/>
+            <a:gdLst/>
+            <a:ahLst/>
+            <a:cxnLst/>
+            <a:rect l="l" t="t" r="r" b="b"/>
+            <a:pathLst>
+              <a:path w="120000" h="120000" extrusionOk="0">
+                <a:moveTo>
+                  <a:pt x="0" y="0"/>
+                </a:moveTo>
+                <a:lnTo>
+                  <a:pt x="120000" y="0"/>
+                </a:lnTo>
+                <a:lnTo>
+                  <a:pt x="120000" y="120000"/>
+                </a:lnTo>
+                <a:lnTo>
+                  <a:pt x="0" y="120000"/>
+                </a:lnTo>
+                <a:close/>
+              </a:path>
+            </a:pathLst>
+          </a:custGeom>
+        </p:spPr>
+      </p:sp>
+      <p:sp>
+        <p:nvSpPr>
+          <p:cNvPr id="82" name="Google Shape;82;gac10fef634_0_25:notes"/>
+          <p:cNvSpPr txBox="1">
+            <a:spLocks noGrp="1"/>
+          </p:cNvSpPr>
+          <p:nvPr>
+            <p:ph type="body" idx="1"/>
+          </p:nvPr>
+        </p:nvSpPr>
+        <p:spPr>
+          <a:xfrm>
+            <a:off x="685800" y="4343400"/>
+            <a:ext cx="5486400" cy="4114800"/>
+          </a:xfrm>
+          <a:prstGeom prst="rect">
+            <a:avLst/>
+          </a:prstGeom>
+        </p:spPr>
+        <p:txBody>
+          <a:bodyPr spcFirstLastPara="1" wrap="square" lIns="91425" tIns="91425" rIns="91425" bIns="91425" anchor="t" anchorCtr="0">
+            <a:noAutofit/>
+          </a:bodyPr>
+          <a:lstStyle/>
+          <a:p>
+            <a:pPr marL="0" lvl="0" indent="0" algn="l" rtl="0">
+              <a:spcBef>
+                <a:spcPts val="0"/>
+              </a:spcBef>
+              <a:spcAft>
+                <a:spcPts val="0"/>
+              </a:spcAft>
+              <a:buClr>
+                <a:schemeClr val="dk1"/>
+              </a:buClr>
+              <a:buSzPts val="1100"/>
+              <a:buFont typeface="Arial"/>
+              <a:buNone/>
+            </a:pPr>
+            <a:r>
+              <a:rPr lang="en"/>
+              <a:t>Your version control evidence should go here.  This could be in the form of annotated screenshots which show you you managed this process or you could make a brief screencast explaining how you implemented version control.</a:t>
+            </a:r>
+            <a:endParaRPr/>
+          </a:p>
+          <a:p>
+            <a:pPr marL="0" lvl="0" indent="0" algn="l" rtl="0">
+              <a:spcBef>
+                <a:spcPts val="0"/>
+              </a:spcBef>
+              <a:spcAft>
+                <a:spcPts val="0"/>
+              </a:spcAft>
+              <a:buNone/>
+            </a:pPr>
+            <a:endParaRPr/>
+          </a:p>
+        </p:txBody>
+      </p:sp>
+    </p:spTree>
+    <p:extLst>
+      <p:ext uri="{BB962C8B-B14F-4D97-AF65-F5344CB8AC3E}">
+        <p14:creationId xmlns:p14="http://schemas.microsoft.com/office/powerpoint/2010/main" val="511959585"/>
+      </p:ext>
+    </p:extLst>
+  </p:cSld>
+  <p:clrMapOvr>
+    <a:masterClrMapping/>
+  </p:clrMapOvr>
+</p:notes>
+</file>
+
+<file path=ppt/notesSlides/notesSlide44.xml><?xml version="1.0" encoding="utf-8"?>
+<p:notes xmlns:a="http://schemas.openxmlformats.org/drawingml/2006/main" xmlns:r="http://schemas.openxmlformats.org/officeDocument/2006/relationships" xmlns:p="http://schemas.openxmlformats.org/presentationml/2006/main" showMasterSp="0" showMasterPhAnim="0">
+  <p:cSld>
+    <p:spTree>
+      <p:nvGrpSpPr>
+        <p:cNvPr id="1" name="Shape 80"/>
+        <p:cNvGrpSpPr/>
+        <p:nvPr/>
+      </p:nvGrpSpPr>
+      <p:grpSpPr>
+        <a:xfrm>
+          <a:off x="0" y="0"/>
+          <a:ext cx="0" cy="0"/>
+          <a:chOff x="0" y="0"/>
+          <a:chExt cx="0" cy="0"/>
+        </a:xfrm>
+      </p:grpSpPr>
+      <p:sp>
+        <p:nvSpPr>
+          <p:cNvPr id="81" name="Google Shape;81;gac10fef634_0_25:notes"/>
+          <p:cNvSpPr>
+            <a:spLocks noGrp="1" noRot="1" noChangeAspect="1"/>
+          </p:cNvSpPr>
+          <p:nvPr>
+            <p:ph type="sldImg" idx="2"/>
+          </p:nvPr>
+        </p:nvSpPr>
+        <p:spPr>
+          <a:xfrm>
+            <a:off x="381000" y="685800"/>
+            <a:ext cx="6096000" cy="3429000"/>
+          </a:xfrm>
+          <a:custGeom>
+            <a:avLst/>
+            <a:gdLst/>
+            <a:ahLst/>
+            <a:cxnLst/>
+            <a:rect l="l" t="t" r="r" b="b"/>
+            <a:pathLst>
+              <a:path w="120000" h="120000" extrusionOk="0">
+                <a:moveTo>
+                  <a:pt x="0" y="0"/>
+                </a:moveTo>
+                <a:lnTo>
+                  <a:pt x="120000" y="0"/>
+                </a:lnTo>
+                <a:lnTo>
+                  <a:pt x="120000" y="120000"/>
+                </a:lnTo>
+                <a:lnTo>
+                  <a:pt x="0" y="120000"/>
+                </a:lnTo>
+                <a:close/>
+              </a:path>
+            </a:pathLst>
+          </a:custGeom>
+        </p:spPr>
+      </p:sp>
+      <p:sp>
+        <p:nvSpPr>
+          <p:cNvPr id="82" name="Google Shape;82;gac10fef634_0_25:notes"/>
+          <p:cNvSpPr txBox="1">
+            <a:spLocks noGrp="1"/>
+          </p:cNvSpPr>
+          <p:nvPr>
+            <p:ph type="body" idx="1"/>
+          </p:nvPr>
+        </p:nvSpPr>
+        <p:spPr>
+          <a:xfrm>
+            <a:off x="685800" y="4343400"/>
+            <a:ext cx="5486400" cy="4114800"/>
+          </a:xfrm>
+          <a:prstGeom prst="rect">
+            <a:avLst/>
+          </a:prstGeom>
+        </p:spPr>
+        <p:txBody>
+          <a:bodyPr spcFirstLastPara="1" wrap="square" lIns="91425" tIns="91425" rIns="91425" bIns="91425" anchor="t" anchorCtr="0">
+            <a:noAutofit/>
+          </a:bodyPr>
+          <a:lstStyle/>
+          <a:p>
+            <a:pPr marL="0" lvl="0" indent="0" algn="l" rtl="0">
+              <a:spcBef>
+                <a:spcPts val="0"/>
+              </a:spcBef>
+              <a:spcAft>
+                <a:spcPts val="0"/>
+              </a:spcAft>
+              <a:buClr>
+                <a:schemeClr val="dk1"/>
+              </a:buClr>
+              <a:buSzPts val="1100"/>
+              <a:buFont typeface="Arial"/>
+              <a:buNone/>
+            </a:pPr>
+            <a:r>
+              <a:rPr lang="en"/>
+              <a:t>Your version control evidence should go here.  This could be in the form of annotated screenshots which show you you managed this process or you could make a brief screencast explaining how you implemented version control.</a:t>
+            </a:r>
+            <a:endParaRPr/>
+          </a:p>
+          <a:p>
+            <a:pPr marL="0" lvl="0" indent="0" algn="l" rtl="0">
+              <a:spcBef>
+                <a:spcPts val="0"/>
+              </a:spcBef>
+              <a:spcAft>
+                <a:spcPts val="0"/>
+              </a:spcAft>
+              <a:buNone/>
+            </a:pPr>
+            <a:endParaRPr/>
+          </a:p>
+        </p:txBody>
+      </p:sp>
+    </p:spTree>
     <p:extLst>
       <p:ext uri="{BB962C8B-B14F-4D97-AF65-F5344CB8AC3E}">
         <p14:creationId xmlns:p14="http://schemas.microsoft.com/office/powerpoint/2010/main" val="3815843750"/>
@@ -6069,7 +6477,7 @@
 </p:notes>
 </file>
 
-<file path=ppt/notesSlides/notesSlide43.xml><?xml version="1.0" encoding="utf-8"?>
+<file path=ppt/notesSlides/notesSlide45.xml><?xml version="1.0" encoding="utf-8"?>
 <p:notes xmlns:a="http://schemas.openxmlformats.org/drawingml/2006/main" xmlns:r="http://schemas.openxmlformats.org/officeDocument/2006/relationships" xmlns:p="http://schemas.openxmlformats.org/presentationml/2006/main" showMasterSp="0" showMasterPhAnim="0">
   <p:cSld>
     <p:spTree>
@@ -20638,6 +21046,36 @@
           <a:chExt cx="0" cy="0"/>
         </a:xfrm>
       </p:grpSpPr>
+      <p:pic>
+        <p:nvPicPr>
+          <p:cNvPr id="3" name="Picture 2">
+            <a:extLst>
+              <a:ext uri="{FF2B5EF4-FFF2-40B4-BE49-F238E27FC236}">
+                <a16:creationId xmlns:a16="http://schemas.microsoft.com/office/drawing/2014/main" id="{815F84BD-1558-4642-B529-2FD7D4E62D2A}"/>
+              </a:ext>
+            </a:extLst>
+          </p:cNvPr>
+          <p:cNvPicPr>
+            <a:picLocks noChangeAspect="1"/>
+          </p:cNvPicPr>
+          <p:nvPr/>
+        </p:nvPicPr>
+        <p:blipFill>
+          <a:blip r:embed="rId3"/>
+          <a:stretch>
+            <a:fillRect/>
+          </a:stretch>
+        </p:blipFill>
+        <p:spPr>
+          <a:xfrm>
+            <a:off x="0" y="11114"/>
+            <a:ext cx="9144000" cy="5121272"/>
+          </a:xfrm>
+          <a:prstGeom prst="rect">
+            <a:avLst/>
+          </a:prstGeom>
+        </p:spPr>
+      </p:pic>
       <p:sp>
         <p:nvSpPr>
           <p:cNvPr id="73" name="Google Shape;73;p16"/>
@@ -20650,8 +21088,8 @@
         </p:nvSpPr>
         <p:spPr>
           <a:xfrm>
-            <a:off x="311700" y="445025"/>
-            <a:ext cx="8520600" cy="572700"/>
+            <a:off x="311700" y="285005"/>
+            <a:ext cx="8520600" cy="952838"/>
           </a:xfrm>
           <a:prstGeom prst="rect">
             <a:avLst/>
@@ -20663,7 +21101,7 @@
           </a:bodyPr>
           <a:lstStyle/>
           <a:p>
-            <a:pPr marL="0" lvl="0" indent="0" algn="l" rtl="0">
+            <a:pPr marL="0" lvl="0" indent="0" algn="ctr" rtl="0">
               <a:spcBef>
                 <a:spcPts val="0"/>
               </a:spcBef>
@@ -20673,13 +21111,47 @@
               <a:buNone/>
             </a:pPr>
             <a:r>
-              <a:rPr lang="en" dirty="0"/>
-              <a:t>Component 5 (Trello screenshot)</a:t>
+              <a:rPr lang="en" b="1" dirty="0">
+                <a:latin typeface="Avenir Next LT Pro" panose="020B0504020202020204" pitchFamily="34" charset="0"/>
+              </a:rPr>
+              <a:t>Component 5 Version 1 – Nuts Menu (Trello screenshot)</a:t>
             </a:r>
-            <a:endParaRPr dirty="0"/>
+            <a:endParaRPr b="1" dirty="0">
+              <a:latin typeface="Avenir Next LT Pro" panose="020B0504020202020204" pitchFamily="34" charset="0"/>
+            </a:endParaRPr>
           </a:p>
         </p:txBody>
       </p:sp>
+      <p:pic>
+        <p:nvPicPr>
+          <p:cNvPr id="9" name="Picture 8">
+            <a:extLst>
+              <a:ext uri="{FF2B5EF4-FFF2-40B4-BE49-F238E27FC236}">
+                <a16:creationId xmlns:a16="http://schemas.microsoft.com/office/drawing/2014/main" id="{6969D041-B257-4FCA-90F8-5EB95787177A}"/>
+              </a:ext>
+            </a:extLst>
+          </p:cNvPr>
+          <p:cNvPicPr>
+            <a:picLocks noChangeAspect="1"/>
+          </p:cNvPicPr>
+          <p:nvPr/>
+        </p:nvPicPr>
+        <p:blipFill>
+          <a:blip r:embed="rId4"/>
+          <a:stretch>
+            <a:fillRect/>
+          </a:stretch>
+        </p:blipFill>
+        <p:spPr>
+          <a:xfrm>
+            <a:off x="311700" y="1511734"/>
+            <a:ext cx="8520600" cy="2374842"/>
+          </a:xfrm>
+          <a:prstGeom prst="rect">
+            <a:avLst/>
+          </a:prstGeom>
+        </p:spPr>
+      </p:pic>
     </p:spTree>
     <p:extLst>
       <p:ext uri="{BB962C8B-B14F-4D97-AF65-F5344CB8AC3E}">
@@ -20710,6 +21182,36 @@
           <a:chExt cx="0" cy="0"/>
         </a:xfrm>
       </p:grpSpPr>
+      <p:pic>
+        <p:nvPicPr>
+          <p:cNvPr id="3" name="Picture 2">
+            <a:extLst>
+              <a:ext uri="{FF2B5EF4-FFF2-40B4-BE49-F238E27FC236}">
+                <a16:creationId xmlns:a16="http://schemas.microsoft.com/office/drawing/2014/main" id="{EC04E06A-902D-4319-81DE-CAED577EA0C2}"/>
+              </a:ext>
+            </a:extLst>
+          </p:cNvPr>
+          <p:cNvPicPr>
+            <a:picLocks noChangeAspect="1"/>
+          </p:cNvPicPr>
+          <p:nvPr/>
+        </p:nvPicPr>
+        <p:blipFill>
+          <a:blip r:embed="rId3"/>
+          <a:stretch>
+            <a:fillRect/>
+          </a:stretch>
+        </p:blipFill>
+        <p:spPr>
+          <a:xfrm>
+            <a:off x="0" y="19017"/>
+            <a:ext cx="9144000" cy="5105466"/>
+          </a:xfrm>
+          <a:prstGeom prst="rect">
+            <a:avLst/>
+          </a:prstGeom>
+        </p:spPr>
+      </p:pic>
       <p:sp>
         <p:nvSpPr>
           <p:cNvPr id="78" name="Google Shape;78;p17"/>
@@ -20722,7 +21224,7 @@
         </p:nvSpPr>
         <p:spPr>
           <a:xfrm>
-            <a:off x="311700" y="445025"/>
+            <a:off x="311700" y="345965"/>
             <a:ext cx="8520600" cy="572700"/>
           </a:xfrm>
           <a:prstGeom prst="rect">
@@ -20745,10 +21247,14 @@
               <a:buNone/>
             </a:pPr>
             <a:r>
-              <a:rPr lang="en" dirty="0"/>
-              <a:t>Component 5  - Test Plan (?and screenshot)</a:t>
+              <a:rPr lang="en" b="1" dirty="0">
+                <a:latin typeface="Avenir Next LT Pro" panose="020B0504020202020204" pitchFamily="34" charset="0"/>
+              </a:rPr>
+              <a:t>Component 5 Version 1 - Test Plan</a:t>
             </a:r>
-            <a:endParaRPr dirty="0"/>
+            <a:endParaRPr b="1" dirty="0">
+              <a:latin typeface="Avenir Next LT Pro" panose="020B0504020202020204" pitchFamily="34" charset="0"/>
+            </a:endParaRPr>
           </a:p>
         </p:txBody>
       </p:sp>
@@ -20756,10 +21262,16 @@
         <p:nvGraphicFramePr>
           <p:cNvPr id="79" name="Google Shape;79;p17"/>
           <p:cNvGraphicFramePr/>
-          <p:nvPr/>
+          <p:nvPr>
+            <p:extLst>
+              <p:ext uri="{D42A27DB-BD31-4B8C-83A1-F6EECF244321}">
+                <p14:modId xmlns:p14="http://schemas.microsoft.com/office/powerpoint/2010/main" val="2578445416"/>
+              </p:ext>
+            </p:extLst>
+          </p:nvPr>
         </p:nvGraphicFramePr>
         <p:xfrm>
-          <a:off x="382475" y="1267725"/>
+          <a:off x="311700" y="4132845"/>
           <a:ext cx="8520600" cy="914340"/>
         </p:xfrm>
         <a:graphic>
@@ -20770,14 +21282,14 @@
                 <a:tableStyleId>{E1099E06-0E6B-448D-9D27-60429F06E6F4}</a:tableStyleId>
               </a:tblPr>
               <a:tblGrid>
-                <a:gridCol w="4260300">
+                <a:gridCol w="2401020">
                   <a:extLst>
                     <a:ext uri="{9D8B030D-6E8A-4147-A177-3AD203B41FA5}">
                       <a16:colId xmlns:a16="http://schemas.microsoft.com/office/drawing/2014/main" val="20000"/>
                     </a:ext>
                   </a:extLst>
                 </a:gridCol>
-                <a:gridCol w="4260300">
+                <a:gridCol w="6119580">
                   <a:extLst>
                     <a:ext uri="{9D8B030D-6E8A-4147-A177-3AD203B41FA5}">
                       <a16:colId xmlns:a16="http://schemas.microsoft.com/office/drawing/2014/main" val="20001"/>
@@ -20801,10 +21313,14 @@
                         <a:buNone/>
                       </a:pPr>
                       <a:r>
-                        <a:rPr lang="en" sz="1800" b="1"/>
+                        <a:rPr lang="en" sz="1800" b="1" dirty="0">
+                          <a:latin typeface="Avenir Next LT Pro" panose="020B0504020202020204" pitchFamily="34" charset="0"/>
+                        </a:rPr>
                         <a:t>Test Case</a:t>
                       </a:r>
-                      <a:endParaRPr sz="1800" b="1"/>
+                      <a:endParaRPr sz="1800" b="1" dirty="0">
+                        <a:latin typeface="Avenir Next LT Pro" panose="020B0504020202020204" pitchFamily="34" charset="0"/>
+                      </a:endParaRPr>
                     </a:p>
                   </a:txBody>
                   <a:tcPr marL="91425" marR="91425" marT="91425" marB="91425">
@@ -20828,10 +21344,14 @@
                         <a:buNone/>
                       </a:pPr>
                       <a:r>
-                        <a:rPr lang="en" sz="1800" b="1"/>
+                        <a:rPr lang="en" sz="1800" b="1">
+                          <a:latin typeface="Avenir Next LT Pro" panose="020B0504020202020204" pitchFamily="34" charset="0"/>
+                        </a:rPr>
                         <a:t>Expected Values</a:t>
                       </a:r>
-                      <a:endParaRPr sz="1800" b="1"/>
+                      <a:endParaRPr sz="1800" b="1">
+                        <a:latin typeface="Avenir Next LT Pro" panose="020B0504020202020204" pitchFamily="34" charset="0"/>
+                      </a:endParaRPr>
                     </a:p>
                   </a:txBody>
                   <a:tcPr marL="91425" marR="91425" marT="91425" marB="91425">
@@ -20861,7 +21381,15 @@
                         </a:spcAft>
                         <a:buNone/>
                       </a:pPr>
-                      <a:endParaRPr sz="1800"/>
+                      <a:r>
+                        <a:rPr lang="en-NZ" sz="1800" dirty="0">
+                          <a:latin typeface="Avenir Next LT Pro" panose="020B0504020202020204" pitchFamily="34" charset="0"/>
+                        </a:rPr>
+                        <a:t>Run File</a:t>
+                      </a:r>
+                      <a:endParaRPr sz="1800" dirty="0">
+                        <a:latin typeface="Avenir Next LT Pro" panose="020B0504020202020204" pitchFamily="34" charset="0"/>
+                      </a:endParaRPr>
                     </a:p>
                   </a:txBody>
                   <a:tcPr marL="91425" marR="91425" marT="91425" marB="91425"/>
@@ -20880,7 +21408,15 @@
                         </a:spcAft>
                         <a:buNone/>
                       </a:pPr>
-                      <a:endParaRPr sz="1800"/>
+                      <a:r>
+                        <a:rPr lang="en-NZ" sz="1800" dirty="0">
+                          <a:latin typeface="Avenir Next LT Pro" panose="020B0504020202020204" pitchFamily="34" charset="0"/>
+                        </a:rPr>
+                        <a:t>Printed list with index number, nuts and prices</a:t>
+                      </a:r>
+                      <a:endParaRPr sz="1800" dirty="0">
+                        <a:latin typeface="Avenir Next LT Pro" panose="020B0504020202020204" pitchFamily="34" charset="0"/>
+                      </a:endParaRPr>
                     </a:p>
                   </a:txBody>
                   <a:tcPr marL="91425" marR="91425" marT="91425" marB="91425"/>
@@ -20895,6 +21431,66 @@
           </a:graphicData>
         </a:graphic>
       </p:graphicFrame>
+      <p:pic>
+        <p:nvPicPr>
+          <p:cNvPr id="7" name="Picture 6">
+            <a:extLst>
+              <a:ext uri="{FF2B5EF4-FFF2-40B4-BE49-F238E27FC236}">
+                <a16:creationId xmlns:a16="http://schemas.microsoft.com/office/drawing/2014/main" id="{48C782DE-40F9-4F90-B1AA-87C6E9382980}"/>
+              </a:ext>
+            </a:extLst>
+          </p:cNvPr>
+          <p:cNvPicPr>
+            <a:picLocks noChangeAspect="1"/>
+          </p:cNvPicPr>
+          <p:nvPr/>
+        </p:nvPicPr>
+        <p:blipFill>
+          <a:blip r:embed="rId4"/>
+          <a:stretch>
+            <a:fillRect/>
+          </a:stretch>
+        </p:blipFill>
+        <p:spPr>
+          <a:xfrm>
+            <a:off x="243839" y="1455989"/>
+            <a:ext cx="5890261" cy="1904268"/>
+          </a:xfrm>
+          <a:prstGeom prst="rect">
+            <a:avLst/>
+          </a:prstGeom>
+        </p:spPr>
+      </p:pic>
+      <p:pic>
+        <p:nvPicPr>
+          <p:cNvPr id="9" name="Picture 8">
+            <a:extLst>
+              <a:ext uri="{FF2B5EF4-FFF2-40B4-BE49-F238E27FC236}">
+                <a16:creationId xmlns:a16="http://schemas.microsoft.com/office/drawing/2014/main" id="{09D939BA-4ED7-4FCD-B084-8EAD8B1EAEDE}"/>
+              </a:ext>
+            </a:extLst>
+          </p:cNvPr>
+          <p:cNvPicPr>
+            <a:picLocks noChangeAspect="1"/>
+          </p:cNvPicPr>
+          <p:nvPr/>
+        </p:nvPicPr>
+        <p:blipFill>
+          <a:blip r:embed="rId5"/>
+          <a:stretch>
+            <a:fillRect/>
+          </a:stretch>
+        </p:blipFill>
+        <p:spPr>
+          <a:xfrm>
+            <a:off x="6606539" y="1143569"/>
+            <a:ext cx="1943101" cy="2643100"/>
+          </a:xfrm>
+          <a:prstGeom prst="rect">
+            <a:avLst/>
+          </a:prstGeom>
+        </p:spPr>
+      </p:pic>
     </p:spTree>
     <p:extLst>
       <p:ext uri="{BB962C8B-B14F-4D97-AF65-F5344CB8AC3E}">
@@ -20933,6 +21529,486 @@
           <a:chExt cx="0" cy="0"/>
         </a:xfrm>
       </p:grpSpPr>
+      <p:pic>
+        <p:nvPicPr>
+          <p:cNvPr id="3" name="Picture 2">
+            <a:extLst>
+              <a:ext uri="{FF2B5EF4-FFF2-40B4-BE49-F238E27FC236}">
+                <a16:creationId xmlns:a16="http://schemas.microsoft.com/office/drawing/2014/main" id="{815F84BD-1558-4642-B529-2FD7D4E62D2A}"/>
+              </a:ext>
+            </a:extLst>
+          </p:cNvPr>
+          <p:cNvPicPr>
+            <a:picLocks noChangeAspect="1"/>
+          </p:cNvPicPr>
+          <p:nvPr/>
+        </p:nvPicPr>
+        <p:blipFill>
+          <a:blip r:embed="rId3"/>
+          <a:stretch>
+            <a:fillRect/>
+          </a:stretch>
+        </p:blipFill>
+        <p:spPr>
+          <a:xfrm>
+            <a:off x="0" y="11114"/>
+            <a:ext cx="9144000" cy="5121272"/>
+          </a:xfrm>
+          <a:prstGeom prst="rect">
+            <a:avLst/>
+          </a:prstGeom>
+        </p:spPr>
+      </p:pic>
+      <p:sp>
+        <p:nvSpPr>
+          <p:cNvPr id="73" name="Google Shape;73;p16"/>
+          <p:cNvSpPr txBox="1">
+            <a:spLocks noGrp="1"/>
+          </p:cNvSpPr>
+          <p:nvPr>
+            <p:ph type="title"/>
+          </p:nvPr>
+        </p:nvSpPr>
+        <p:spPr>
+          <a:xfrm>
+            <a:off x="0" y="224045"/>
+            <a:ext cx="8520600" cy="644635"/>
+          </a:xfrm>
+          <a:prstGeom prst="rect">
+            <a:avLst/>
+          </a:prstGeom>
+        </p:spPr>
+        <p:txBody>
+          <a:bodyPr spcFirstLastPara="1" wrap="square" lIns="91425" tIns="91425" rIns="91425" bIns="91425" anchor="t" anchorCtr="0">
+            <a:noAutofit/>
+          </a:bodyPr>
+          <a:lstStyle/>
+          <a:p>
+            <a:pPr marL="0" lvl="0" indent="0" algn="ctr" rtl="0">
+              <a:spcBef>
+                <a:spcPts val="0"/>
+              </a:spcBef>
+              <a:spcAft>
+                <a:spcPts val="0"/>
+              </a:spcAft>
+              <a:buNone/>
+            </a:pPr>
+            <a:r>
+              <a:rPr lang="en" b="1" dirty="0">
+                <a:latin typeface="Avenir Next LT Pro" panose="020B0504020202020204" pitchFamily="34" charset="0"/>
+              </a:rPr>
+              <a:t>Component 5 Version 2 - (Trello screenshot)</a:t>
+            </a:r>
+            <a:endParaRPr b="1" dirty="0">
+              <a:latin typeface="Avenir Next LT Pro" panose="020B0504020202020204" pitchFamily="34" charset="0"/>
+            </a:endParaRPr>
+          </a:p>
+        </p:txBody>
+      </p:sp>
+      <p:pic>
+        <p:nvPicPr>
+          <p:cNvPr id="4" name="Picture 3">
+            <a:extLst>
+              <a:ext uri="{FF2B5EF4-FFF2-40B4-BE49-F238E27FC236}">
+                <a16:creationId xmlns:a16="http://schemas.microsoft.com/office/drawing/2014/main" id="{F6DB018E-FF55-458E-B5D9-BCF249234148}"/>
+              </a:ext>
+            </a:extLst>
+          </p:cNvPr>
+          <p:cNvPicPr>
+            <a:picLocks noChangeAspect="1"/>
+          </p:cNvPicPr>
+          <p:nvPr/>
+        </p:nvPicPr>
+        <p:blipFill>
+          <a:blip r:embed="rId4"/>
+          <a:stretch>
+            <a:fillRect/>
+          </a:stretch>
+        </p:blipFill>
+        <p:spPr>
+          <a:xfrm>
+            <a:off x="198120" y="1328195"/>
+            <a:ext cx="8747760" cy="2487109"/>
+          </a:xfrm>
+          <a:prstGeom prst="rect">
+            <a:avLst/>
+          </a:prstGeom>
+        </p:spPr>
+      </p:pic>
+    </p:spTree>
+    <p:extLst>
+      <p:ext uri="{BB962C8B-B14F-4D97-AF65-F5344CB8AC3E}">
+        <p14:creationId xmlns:p14="http://schemas.microsoft.com/office/powerpoint/2010/main" val="1422053013"/>
+      </p:ext>
+    </p:extLst>
+  </p:cSld>
+  <p:clrMapOvr>
+    <a:masterClrMapping/>
+  </p:clrMapOvr>
+</p:sld>
+</file>
+
+<file path=ppt/slides/slide45.xml><?xml version="1.0" encoding="utf-8"?>
+<p:sld xmlns:a="http://schemas.openxmlformats.org/drawingml/2006/main" xmlns:r="http://schemas.openxmlformats.org/officeDocument/2006/relationships" xmlns:p="http://schemas.openxmlformats.org/presentationml/2006/main">
+  <p:cSld>
+    <p:spTree>
+      <p:nvGrpSpPr>
+        <p:cNvPr id="1" name="Shape 77"/>
+        <p:cNvGrpSpPr/>
+        <p:nvPr/>
+      </p:nvGrpSpPr>
+      <p:grpSpPr>
+        <a:xfrm>
+          <a:off x="0" y="0"/>
+          <a:ext cx="0" cy="0"/>
+          <a:chOff x="0" y="0"/>
+          <a:chExt cx="0" cy="0"/>
+        </a:xfrm>
+      </p:grpSpPr>
+      <p:pic>
+        <p:nvPicPr>
+          <p:cNvPr id="3" name="Picture 2">
+            <a:extLst>
+              <a:ext uri="{FF2B5EF4-FFF2-40B4-BE49-F238E27FC236}">
+                <a16:creationId xmlns:a16="http://schemas.microsoft.com/office/drawing/2014/main" id="{EC04E06A-902D-4319-81DE-CAED577EA0C2}"/>
+              </a:ext>
+            </a:extLst>
+          </p:cNvPr>
+          <p:cNvPicPr>
+            <a:picLocks noChangeAspect="1"/>
+          </p:cNvPicPr>
+          <p:nvPr/>
+        </p:nvPicPr>
+        <p:blipFill>
+          <a:blip r:embed="rId3"/>
+          <a:stretch>
+            <a:fillRect/>
+          </a:stretch>
+        </p:blipFill>
+        <p:spPr>
+          <a:xfrm>
+            <a:off x="0" y="19017"/>
+            <a:ext cx="9144000" cy="5105466"/>
+          </a:xfrm>
+          <a:prstGeom prst="rect">
+            <a:avLst/>
+          </a:prstGeom>
+        </p:spPr>
+      </p:pic>
+      <p:sp>
+        <p:nvSpPr>
+          <p:cNvPr id="78" name="Google Shape;78;p17"/>
+          <p:cNvSpPr txBox="1">
+            <a:spLocks noGrp="1"/>
+          </p:cNvSpPr>
+          <p:nvPr>
+            <p:ph type="title"/>
+          </p:nvPr>
+        </p:nvSpPr>
+        <p:spPr>
+          <a:xfrm>
+            <a:off x="311700" y="345965"/>
+            <a:ext cx="8520600" cy="572700"/>
+          </a:xfrm>
+          <a:prstGeom prst="rect">
+            <a:avLst/>
+          </a:prstGeom>
+        </p:spPr>
+        <p:txBody>
+          <a:bodyPr spcFirstLastPara="1" wrap="square" lIns="91425" tIns="91425" rIns="91425" bIns="91425" anchor="t" anchorCtr="0">
+            <a:noAutofit/>
+          </a:bodyPr>
+          <a:lstStyle/>
+          <a:p>
+            <a:pPr marL="0" lvl="0" indent="0" algn="l" rtl="0">
+              <a:spcBef>
+                <a:spcPts val="0"/>
+              </a:spcBef>
+              <a:spcAft>
+                <a:spcPts val="0"/>
+              </a:spcAft>
+              <a:buNone/>
+            </a:pPr>
+            <a:r>
+              <a:rPr lang="en" b="1" dirty="0">
+                <a:latin typeface="Avenir Next LT Pro" panose="020B0504020202020204" pitchFamily="34" charset="0"/>
+              </a:rPr>
+              <a:t>Component 5 Version 2 - Test Plan</a:t>
+            </a:r>
+            <a:endParaRPr b="1" dirty="0">
+              <a:latin typeface="Avenir Next LT Pro" panose="020B0504020202020204" pitchFamily="34" charset="0"/>
+            </a:endParaRPr>
+          </a:p>
+        </p:txBody>
+      </p:sp>
+      <p:graphicFrame>
+        <p:nvGraphicFramePr>
+          <p:cNvPr id="79" name="Google Shape;79;p17"/>
+          <p:cNvGraphicFramePr/>
+          <p:nvPr>
+            <p:extLst>
+              <p:ext uri="{D42A27DB-BD31-4B8C-83A1-F6EECF244321}">
+                <p14:modId xmlns:p14="http://schemas.microsoft.com/office/powerpoint/2010/main" val="3068571482"/>
+              </p:ext>
+            </p:extLst>
+          </p:nvPr>
+        </p:nvGraphicFramePr>
+        <p:xfrm>
+          <a:off x="311700" y="4132845"/>
+          <a:ext cx="8520600" cy="960090"/>
+        </p:xfrm>
+        <a:graphic>
+          <a:graphicData uri="http://schemas.openxmlformats.org/drawingml/2006/table">
+            <a:tbl>
+              <a:tblPr>
+                <a:noFill/>
+                <a:tableStyleId>{E1099E06-0E6B-448D-9D27-60429F06E6F4}</a:tableStyleId>
+              </a:tblPr>
+              <a:tblGrid>
+                <a:gridCol w="2401020">
+                  <a:extLst>
+                    <a:ext uri="{9D8B030D-6E8A-4147-A177-3AD203B41FA5}">
+                      <a16:colId xmlns:a16="http://schemas.microsoft.com/office/drawing/2014/main" val="20000"/>
+                    </a:ext>
+                  </a:extLst>
+                </a:gridCol>
+                <a:gridCol w="6119580">
+                  <a:extLst>
+                    <a:ext uri="{9D8B030D-6E8A-4147-A177-3AD203B41FA5}">
+                      <a16:colId xmlns:a16="http://schemas.microsoft.com/office/drawing/2014/main" val="20001"/>
+                    </a:ext>
+                  </a:extLst>
+                </a:gridCol>
+              </a:tblGrid>
+              <a:tr h="381000">
+                <a:tc>
+                  <a:txBody>
+                    <a:bodyPr/>
+                    <a:lstStyle/>
+                    <a:p>
+                      <a:pPr marL="0" lvl="0" indent="0" algn="l" rtl="0">
+                        <a:spcBef>
+                          <a:spcPts val="0"/>
+                        </a:spcBef>
+                        <a:spcAft>
+                          <a:spcPts val="0"/>
+                        </a:spcAft>
+                        <a:buNone/>
+                      </a:pPr>
+                      <a:r>
+                        <a:rPr lang="en" sz="1300" b="1" dirty="0">
+                          <a:latin typeface="Avenir Next LT Pro" panose="020B0504020202020204" pitchFamily="34" charset="0"/>
+                        </a:rPr>
+                        <a:t>Test Case</a:t>
+                      </a:r>
+                      <a:endParaRPr sz="1300" b="1" dirty="0">
+                        <a:latin typeface="Avenir Next LT Pro" panose="020B0504020202020204" pitchFamily="34" charset="0"/>
+                      </a:endParaRPr>
+                    </a:p>
+                  </a:txBody>
+                  <a:tcPr marL="91425" marR="91425" marT="91425" marB="91425">
+                    <a:solidFill>
+                      <a:srgbClr val="CCCCCC"/>
+                    </a:solidFill>
+                  </a:tcPr>
+                </a:tc>
+                <a:tc>
+                  <a:txBody>
+                    <a:bodyPr/>
+                    <a:lstStyle/>
+                    <a:p>
+                      <a:pPr marL="0" lvl="0" indent="0" algn="l" rtl="0">
+                        <a:spcBef>
+                          <a:spcPts val="0"/>
+                        </a:spcBef>
+                        <a:spcAft>
+                          <a:spcPts val="0"/>
+                        </a:spcAft>
+                        <a:buNone/>
+                      </a:pPr>
+                      <a:r>
+                        <a:rPr lang="en" sz="1300" b="1">
+                          <a:latin typeface="Avenir Next LT Pro" panose="020B0504020202020204" pitchFamily="34" charset="0"/>
+                        </a:rPr>
+                        <a:t>Expected Values</a:t>
+                      </a:r>
+                      <a:endParaRPr sz="1300" b="1">
+                        <a:latin typeface="Avenir Next LT Pro" panose="020B0504020202020204" pitchFamily="34" charset="0"/>
+                      </a:endParaRPr>
+                    </a:p>
+                  </a:txBody>
+                  <a:tcPr marL="91425" marR="91425" marT="91425" marB="91425">
+                    <a:solidFill>
+                      <a:srgbClr val="CCCCCC"/>
+                    </a:solidFill>
+                  </a:tcPr>
+                </a:tc>
+                <a:extLst>
+                  <a:ext uri="{0D108BD9-81ED-4DB2-BD59-A6C34878D82A}">
+                    <a16:rowId xmlns:a16="http://schemas.microsoft.com/office/drawing/2014/main" val="10000"/>
+                  </a:ext>
+                </a:extLst>
+              </a:tr>
+              <a:tr h="396200">
+                <a:tc>
+                  <a:txBody>
+                    <a:bodyPr/>
+                    <a:lstStyle/>
+                    <a:p>
+                      <a:pPr marL="0" lvl="0" indent="0" algn="l" rtl="0">
+                        <a:spcBef>
+                          <a:spcPts val="0"/>
+                        </a:spcBef>
+                        <a:spcAft>
+                          <a:spcPts val="0"/>
+                        </a:spcAft>
+                        <a:buNone/>
+                      </a:pPr>
+                      <a:r>
+                        <a:rPr lang="en-NZ" sz="1300" dirty="0">
+                          <a:latin typeface="Avenir Next LT Pro" panose="020B0504020202020204" pitchFamily="34" charset="0"/>
+                        </a:rPr>
+                        <a:t>Run File</a:t>
+                      </a:r>
+                      <a:endParaRPr sz="1300" dirty="0">
+                        <a:latin typeface="Avenir Next LT Pro" panose="020B0504020202020204" pitchFamily="34" charset="0"/>
+                      </a:endParaRPr>
+                    </a:p>
+                  </a:txBody>
+                  <a:tcPr marL="91425" marR="91425" marT="91425" marB="91425"/>
+                </a:tc>
+                <a:tc>
+                  <a:txBody>
+                    <a:bodyPr/>
+                    <a:lstStyle/>
+                    <a:p>
+                      <a:pPr marL="0" lvl="0" indent="0" algn="l" rtl="0">
+                        <a:spcBef>
+                          <a:spcPts val="0"/>
+                        </a:spcBef>
+                        <a:spcAft>
+                          <a:spcPts val="0"/>
+                        </a:spcAft>
+                        <a:buNone/>
+                      </a:pPr>
+                      <a:r>
+                        <a:rPr lang="en-GB" sz="1300" dirty="0">
+                          <a:latin typeface="Avenir Next LT Pro" panose="020B0504020202020204" pitchFamily="34" charset="0"/>
+                        </a:rPr>
+                        <a:t>Printed a list with index number, pizzas and prices with price formatted to 2 decimal places and dollar sign. Menu starts at 1.</a:t>
+                      </a:r>
+                    </a:p>
+                  </a:txBody>
+                  <a:tcPr marL="91425" marR="91425" marT="91425" marB="91425"/>
+                </a:tc>
+                <a:extLst>
+                  <a:ext uri="{0D108BD9-81ED-4DB2-BD59-A6C34878D82A}">
+                    <a16:rowId xmlns:a16="http://schemas.microsoft.com/office/drawing/2014/main" val="10001"/>
+                  </a:ext>
+                </a:extLst>
+              </a:tr>
+            </a:tbl>
+          </a:graphicData>
+        </a:graphic>
+      </p:graphicFrame>
+      <p:pic>
+        <p:nvPicPr>
+          <p:cNvPr id="4" name="Picture 3">
+            <a:extLst>
+              <a:ext uri="{FF2B5EF4-FFF2-40B4-BE49-F238E27FC236}">
+                <a16:creationId xmlns:a16="http://schemas.microsoft.com/office/drawing/2014/main" id="{47FE16B3-9D3C-443D-AA9B-0529AA66A3FA}"/>
+              </a:ext>
+            </a:extLst>
+          </p:cNvPr>
+          <p:cNvPicPr>
+            <a:picLocks noChangeAspect="1"/>
+          </p:cNvPicPr>
+          <p:nvPr/>
+        </p:nvPicPr>
+        <p:blipFill>
+          <a:blip r:embed="rId4"/>
+          <a:stretch>
+            <a:fillRect/>
+          </a:stretch>
+        </p:blipFill>
+        <p:spPr>
+          <a:xfrm>
+            <a:off x="311700" y="1484700"/>
+            <a:ext cx="5439359" cy="1815185"/>
+          </a:xfrm>
+          <a:prstGeom prst="rect">
+            <a:avLst/>
+          </a:prstGeom>
+        </p:spPr>
+      </p:pic>
+      <p:pic>
+        <p:nvPicPr>
+          <p:cNvPr id="6" name="Picture 5">
+            <a:extLst>
+              <a:ext uri="{FF2B5EF4-FFF2-40B4-BE49-F238E27FC236}">
+                <a16:creationId xmlns:a16="http://schemas.microsoft.com/office/drawing/2014/main" id="{03AC1C3C-D597-41C3-9C9C-87DD19A35F73}"/>
+              </a:ext>
+            </a:extLst>
+          </p:cNvPr>
+          <p:cNvPicPr>
+            <a:picLocks noChangeAspect="1"/>
+          </p:cNvPicPr>
+          <p:nvPr/>
+        </p:nvPicPr>
+        <p:blipFill>
+          <a:blip r:embed="rId5"/>
+          <a:stretch>
+            <a:fillRect/>
+          </a:stretch>
+        </p:blipFill>
+        <p:spPr>
+          <a:xfrm>
+            <a:off x="5996822" y="1061723"/>
+            <a:ext cx="2263257" cy="2764774"/>
+          </a:xfrm>
+          <a:prstGeom prst="rect">
+            <a:avLst/>
+          </a:prstGeom>
+        </p:spPr>
+      </p:pic>
+    </p:spTree>
+    <p:extLst>
+      <p:ext uri="{BB962C8B-B14F-4D97-AF65-F5344CB8AC3E}">
+        <p14:creationId xmlns:p14="http://schemas.microsoft.com/office/powerpoint/2010/main" val="1066590280"/>
+      </p:ext>
+    </p:extLst>
+  </p:cSld>
+  <p:clrMapOvr>
+    <a:masterClrMapping/>
+  </p:clrMapOvr>
+</p:sld>
+</file>
+
+<file path=ppt/slides/slide46.xml><?xml version="1.0" encoding="utf-8"?>
+<p:sld xmlns:a="http://schemas.openxmlformats.org/drawingml/2006/main" xmlns:r="http://schemas.openxmlformats.org/officeDocument/2006/relationships" xmlns:p="http://schemas.openxmlformats.org/presentationml/2006/main">
+  <p:cSld>
+    <p:bg>
+      <p:bgPr>
+        <a:solidFill>
+          <a:srgbClr val="D9EAD3"/>
+        </a:solidFill>
+        <a:effectLst/>
+      </p:bgPr>
+    </p:bg>
+    <p:spTree>
+      <p:nvGrpSpPr>
+        <p:cNvPr id="1" name="Shape 72"/>
+        <p:cNvGrpSpPr/>
+        <p:nvPr/>
+      </p:nvGrpSpPr>
+      <p:grpSpPr>
+        <a:xfrm>
+          <a:off x="0" y="0"/>
+          <a:ext cx="0" cy="0"/>
+          <a:chOff x="0" y="0"/>
+          <a:chExt cx="0" cy="0"/>
+        </a:xfrm>
+      </p:grpSpPr>
       <p:sp>
         <p:nvSpPr>
           <p:cNvPr id="73" name="Google Shape;73;p16"/>
@@ -20988,7 +22064,7 @@
 </p:sld>
 </file>
 
-<file path=ppt/slides/slide45.xml><?xml version="1.0" encoding="utf-8"?>
+<file path=ppt/slides/slide47.xml><?xml version="1.0" encoding="utf-8"?>
 <p:sld xmlns:a="http://schemas.openxmlformats.org/drawingml/2006/main" xmlns:r="http://schemas.openxmlformats.org/officeDocument/2006/relationships" xmlns:p="http://schemas.openxmlformats.org/presentationml/2006/main">
   <p:cSld>
     <p:spTree>
@@ -21203,7 +22279,7 @@
 </p:sld>
 </file>
 
-<file path=ppt/slides/slide46.xml><?xml version="1.0" encoding="utf-8"?>
+<file path=ppt/slides/slide48.xml><?xml version="1.0" encoding="utf-8"?>
 <p:sld xmlns:a="http://schemas.openxmlformats.org/drawingml/2006/main" xmlns:r="http://schemas.openxmlformats.org/officeDocument/2006/relationships" xmlns:p="http://schemas.openxmlformats.org/presentationml/2006/main">
   <p:cSld>
     <p:bg>
@@ -21305,147 +22381,6 @@
 </p:sld>
 </file>
 
-<file path=ppt/slides/slide47.xml><?xml version="1.0" encoding="utf-8"?>
-<p:sld xmlns:a="http://schemas.openxmlformats.org/drawingml/2006/main" xmlns:r="http://schemas.openxmlformats.org/officeDocument/2006/relationships" xmlns:p="http://schemas.openxmlformats.org/presentationml/2006/main">
-  <p:cSld>
-    <p:bg>
-      <p:bgPr>
-        <a:solidFill>
-          <a:srgbClr val="D9EAD3"/>
-        </a:solidFill>
-        <a:effectLst/>
-      </p:bgPr>
-    </p:bg>
-    <p:spTree>
-      <p:nvGrpSpPr>
-        <p:cNvPr id="1" name="Shape 72"/>
-        <p:cNvGrpSpPr/>
-        <p:nvPr/>
-      </p:nvGrpSpPr>
-      <p:grpSpPr>
-        <a:xfrm>
-          <a:off x="0" y="0"/>
-          <a:ext cx="0" cy="0"/>
-          <a:chOff x="0" y="0"/>
-          <a:chExt cx="0" cy="0"/>
-        </a:xfrm>
-      </p:grpSpPr>
-      <p:sp>
-        <p:nvSpPr>
-          <p:cNvPr id="73" name="Google Shape;73;p16"/>
-          <p:cNvSpPr txBox="1">
-            <a:spLocks noGrp="1"/>
-          </p:cNvSpPr>
-          <p:nvPr>
-            <p:ph type="title"/>
-          </p:nvPr>
-        </p:nvSpPr>
-        <p:spPr>
-          <a:xfrm>
-            <a:off x="311700" y="445025"/>
-            <a:ext cx="8520600" cy="1098739"/>
-          </a:xfrm>
-          <a:prstGeom prst="rect">
-            <a:avLst/>
-          </a:prstGeom>
-        </p:spPr>
-        <p:txBody>
-          <a:bodyPr spcFirstLastPara="1" wrap="square" lIns="91425" tIns="91425" rIns="91425" bIns="91425" anchor="t" anchorCtr="0">
-            <a:noAutofit/>
-          </a:bodyPr>
-          <a:lstStyle/>
-          <a:p>
-            <a:r>
-              <a:rPr lang="en" dirty="0"/>
-              <a:t>Functional Testing (Screenshot and explain how you tested your program – use the testing template)</a:t>
-            </a:r>
-            <a:endParaRPr dirty="0"/>
-          </a:p>
-        </p:txBody>
-      </p:sp>
-    </p:spTree>
-    <p:extLst>
-      <p:ext uri="{BB962C8B-B14F-4D97-AF65-F5344CB8AC3E}">
-        <p14:creationId xmlns:p14="http://schemas.microsoft.com/office/powerpoint/2010/main" val="1781413307"/>
-      </p:ext>
-    </p:extLst>
-  </p:cSld>
-  <p:clrMapOvr>
-    <a:masterClrMapping/>
-  </p:clrMapOvr>
-</p:sld>
-</file>
-
-<file path=ppt/slides/slide48.xml><?xml version="1.0" encoding="utf-8"?>
-<p:sld xmlns:a="http://schemas.openxmlformats.org/drawingml/2006/main" xmlns:r="http://schemas.openxmlformats.org/officeDocument/2006/relationships" xmlns:p="http://schemas.openxmlformats.org/presentationml/2006/main">
-  <p:cSld>
-    <p:bg>
-      <p:bgPr>
-        <a:solidFill>
-          <a:srgbClr val="D9EAD3"/>
-        </a:solidFill>
-        <a:effectLst/>
-      </p:bgPr>
-    </p:bg>
-    <p:spTree>
-      <p:nvGrpSpPr>
-        <p:cNvPr id="1" name="Shape 72"/>
-        <p:cNvGrpSpPr/>
-        <p:nvPr/>
-      </p:nvGrpSpPr>
-      <p:grpSpPr>
-        <a:xfrm>
-          <a:off x="0" y="0"/>
-          <a:ext cx="0" cy="0"/>
-          <a:chOff x="0" y="0"/>
-          <a:chExt cx="0" cy="0"/>
-        </a:xfrm>
-      </p:grpSpPr>
-      <p:sp>
-        <p:nvSpPr>
-          <p:cNvPr id="73" name="Google Shape;73;p16"/>
-          <p:cNvSpPr txBox="1">
-            <a:spLocks noGrp="1"/>
-          </p:cNvSpPr>
-          <p:nvPr>
-            <p:ph type="title"/>
-          </p:nvPr>
-        </p:nvSpPr>
-        <p:spPr>
-          <a:xfrm>
-            <a:off x="311700" y="445025"/>
-            <a:ext cx="8520600" cy="1098739"/>
-          </a:xfrm>
-          <a:prstGeom prst="rect">
-            <a:avLst/>
-          </a:prstGeom>
-        </p:spPr>
-        <p:txBody>
-          <a:bodyPr spcFirstLastPara="1" wrap="square" lIns="91425" tIns="91425" rIns="91425" bIns="91425" anchor="t" anchorCtr="0">
-            <a:noAutofit/>
-          </a:bodyPr>
-          <a:lstStyle/>
-          <a:p>
-            <a:r>
-              <a:rPr lang="en" dirty="0"/>
-              <a:t>Using evidence of testing show how you refined your program (duplicate slides)</a:t>
-            </a:r>
-          </a:p>
-        </p:txBody>
-      </p:sp>
-    </p:spTree>
-    <p:extLst>
-      <p:ext uri="{BB962C8B-B14F-4D97-AF65-F5344CB8AC3E}">
-        <p14:creationId xmlns:p14="http://schemas.microsoft.com/office/powerpoint/2010/main" val="3394932069"/>
-      </p:ext>
-    </p:extLst>
-  </p:cSld>
-  <p:clrMapOvr>
-    <a:masterClrMapping/>
-  </p:clrMapOvr>
-</p:sld>
-</file>
-
 <file path=ppt/slides/slide49.xml><?xml version="1.0" encoding="utf-8"?>
 <p:sld xmlns:a="http://schemas.openxmlformats.org/drawingml/2006/main" xmlns:r="http://schemas.openxmlformats.org/officeDocument/2006/relationships" xmlns:p="http://schemas.openxmlformats.org/presentationml/2006/main">
   <p:cSld>
@@ -21498,7 +22433,7 @@
           <a:p>
             <a:r>
               <a:rPr lang="en" dirty="0"/>
-              <a:t>User Testing (Screenshot and show feedback from a range of users/testers)</a:t>
+              <a:t>Functional Testing (Screenshot and explain how you tested your program – use the testing template)</a:t>
             </a:r>
             <a:endParaRPr dirty="0"/>
           </a:p>
@@ -21507,7 +22442,7 @@
     </p:spTree>
     <p:extLst>
       <p:ext uri="{BB962C8B-B14F-4D97-AF65-F5344CB8AC3E}">
-        <p14:creationId xmlns:p14="http://schemas.microsoft.com/office/powerpoint/2010/main" val="2712176924"/>
+        <p14:creationId xmlns:p14="http://schemas.microsoft.com/office/powerpoint/2010/main" val="1781413307"/>
       </p:ext>
     </p:extLst>
   </p:cSld>
@@ -21742,6 +22677,147 @@
           <a:p>
             <a:r>
               <a:rPr lang="en" dirty="0"/>
+              <a:t>Using evidence of testing show how you refined your program (duplicate slides)</a:t>
+            </a:r>
+          </a:p>
+        </p:txBody>
+      </p:sp>
+    </p:spTree>
+    <p:extLst>
+      <p:ext uri="{BB962C8B-B14F-4D97-AF65-F5344CB8AC3E}">
+        <p14:creationId xmlns:p14="http://schemas.microsoft.com/office/powerpoint/2010/main" val="3394932069"/>
+      </p:ext>
+    </p:extLst>
+  </p:cSld>
+  <p:clrMapOvr>
+    <a:masterClrMapping/>
+  </p:clrMapOvr>
+</p:sld>
+</file>
+
+<file path=ppt/slides/slide51.xml><?xml version="1.0" encoding="utf-8"?>
+<p:sld xmlns:a="http://schemas.openxmlformats.org/drawingml/2006/main" xmlns:r="http://schemas.openxmlformats.org/officeDocument/2006/relationships" xmlns:p="http://schemas.openxmlformats.org/presentationml/2006/main">
+  <p:cSld>
+    <p:bg>
+      <p:bgPr>
+        <a:solidFill>
+          <a:srgbClr val="D9EAD3"/>
+        </a:solidFill>
+        <a:effectLst/>
+      </p:bgPr>
+    </p:bg>
+    <p:spTree>
+      <p:nvGrpSpPr>
+        <p:cNvPr id="1" name="Shape 72"/>
+        <p:cNvGrpSpPr/>
+        <p:nvPr/>
+      </p:nvGrpSpPr>
+      <p:grpSpPr>
+        <a:xfrm>
+          <a:off x="0" y="0"/>
+          <a:ext cx="0" cy="0"/>
+          <a:chOff x="0" y="0"/>
+          <a:chExt cx="0" cy="0"/>
+        </a:xfrm>
+      </p:grpSpPr>
+      <p:sp>
+        <p:nvSpPr>
+          <p:cNvPr id="73" name="Google Shape;73;p16"/>
+          <p:cNvSpPr txBox="1">
+            <a:spLocks noGrp="1"/>
+          </p:cNvSpPr>
+          <p:nvPr>
+            <p:ph type="title"/>
+          </p:nvPr>
+        </p:nvSpPr>
+        <p:spPr>
+          <a:xfrm>
+            <a:off x="311700" y="445025"/>
+            <a:ext cx="8520600" cy="1098739"/>
+          </a:xfrm>
+          <a:prstGeom prst="rect">
+            <a:avLst/>
+          </a:prstGeom>
+        </p:spPr>
+        <p:txBody>
+          <a:bodyPr spcFirstLastPara="1" wrap="square" lIns="91425" tIns="91425" rIns="91425" bIns="91425" anchor="t" anchorCtr="0">
+            <a:noAutofit/>
+          </a:bodyPr>
+          <a:lstStyle/>
+          <a:p>
+            <a:r>
+              <a:rPr lang="en" dirty="0"/>
+              <a:t>User Testing (Screenshot and show feedback from a range of users/testers)</a:t>
+            </a:r>
+            <a:endParaRPr dirty="0"/>
+          </a:p>
+        </p:txBody>
+      </p:sp>
+    </p:spTree>
+    <p:extLst>
+      <p:ext uri="{BB962C8B-B14F-4D97-AF65-F5344CB8AC3E}">
+        <p14:creationId xmlns:p14="http://schemas.microsoft.com/office/powerpoint/2010/main" val="2712176924"/>
+      </p:ext>
+    </p:extLst>
+  </p:cSld>
+  <p:clrMapOvr>
+    <a:masterClrMapping/>
+  </p:clrMapOvr>
+</p:sld>
+</file>
+
+<file path=ppt/slides/slide52.xml><?xml version="1.0" encoding="utf-8"?>
+<p:sld xmlns:a="http://schemas.openxmlformats.org/drawingml/2006/main" xmlns:r="http://schemas.openxmlformats.org/officeDocument/2006/relationships" xmlns:p="http://schemas.openxmlformats.org/presentationml/2006/main">
+  <p:cSld>
+    <p:bg>
+      <p:bgPr>
+        <a:solidFill>
+          <a:srgbClr val="D9EAD3"/>
+        </a:solidFill>
+        <a:effectLst/>
+      </p:bgPr>
+    </p:bg>
+    <p:spTree>
+      <p:nvGrpSpPr>
+        <p:cNvPr id="1" name="Shape 72"/>
+        <p:cNvGrpSpPr/>
+        <p:nvPr/>
+      </p:nvGrpSpPr>
+      <p:grpSpPr>
+        <a:xfrm>
+          <a:off x="0" y="0"/>
+          <a:ext cx="0" cy="0"/>
+          <a:chOff x="0" y="0"/>
+          <a:chExt cx="0" cy="0"/>
+        </a:xfrm>
+      </p:grpSpPr>
+      <p:sp>
+        <p:nvSpPr>
+          <p:cNvPr id="73" name="Google Shape;73;p16"/>
+          <p:cNvSpPr txBox="1">
+            <a:spLocks noGrp="1"/>
+          </p:cNvSpPr>
+          <p:nvPr>
+            <p:ph type="title"/>
+          </p:nvPr>
+        </p:nvSpPr>
+        <p:spPr>
+          <a:xfrm>
+            <a:off x="311700" y="445025"/>
+            <a:ext cx="8520600" cy="1098739"/>
+          </a:xfrm>
+          <a:prstGeom prst="rect">
+            <a:avLst/>
+          </a:prstGeom>
+        </p:spPr>
+        <p:txBody>
+          <a:bodyPr spcFirstLastPara="1" wrap="square" lIns="91425" tIns="91425" rIns="91425" bIns="91425" anchor="t" anchorCtr="0">
+            <a:noAutofit/>
+          </a:bodyPr>
+          <a:lstStyle/>
+          <a:p>
+            <a:r>
+              <a:rPr lang="en" dirty="0"/>
               <a:t>Using evidence of user feedback show how you refined your program (duplicate slides)</a:t>
             </a:r>
           </a:p>
@@ -21760,7 +22836,7 @@
 </p:sld>
 </file>
 
-<file path=ppt/slides/slide51.xml><?xml version="1.0" encoding="utf-8"?>
+<file path=ppt/slides/slide53.xml><?xml version="1.0" encoding="utf-8"?>
 <p:sld xmlns:a="http://schemas.openxmlformats.org/drawingml/2006/main" xmlns:r="http://schemas.openxmlformats.org/officeDocument/2006/relationships" xmlns:p="http://schemas.openxmlformats.org/presentationml/2006/main">
   <p:cSld>
     <p:bg>
@@ -21862,7 +22938,7 @@
 </p:sld>
 </file>
 
-<file path=ppt/slides/slide52.xml><?xml version="1.0" encoding="utf-8"?>
+<file path=ppt/slides/slide54.xml><?xml version="1.0" encoding="utf-8"?>
 <p:sld xmlns:a="http://schemas.openxmlformats.org/drawingml/2006/main" xmlns:r="http://schemas.openxmlformats.org/officeDocument/2006/relationships" xmlns:p="http://schemas.openxmlformats.org/presentationml/2006/main">
   <p:cSld>
     <p:bg>
@@ -21979,7 +23055,7 @@
 </p:sld>
 </file>
 
-<file path=ppt/slides/slide53.xml><?xml version="1.0" encoding="utf-8"?>
+<file path=ppt/slides/slide55.xml><?xml version="1.0" encoding="utf-8"?>
 <p:sld xmlns:a="http://schemas.openxmlformats.org/drawingml/2006/main" xmlns:r="http://schemas.openxmlformats.org/officeDocument/2006/relationships" xmlns:p="http://schemas.openxmlformats.org/presentationml/2006/main">
   <p:cSld>
     <p:bg>
@@ -22085,7 +23161,7 @@
 </p:sld>
 </file>
 
-<file path=ppt/slides/slide54.xml><?xml version="1.0" encoding="utf-8"?>
+<file path=ppt/slides/slide56.xml><?xml version="1.0" encoding="utf-8"?>
 <p:sld xmlns:a="http://schemas.openxmlformats.org/drawingml/2006/main" xmlns:r="http://schemas.openxmlformats.org/officeDocument/2006/relationships" xmlns:p="http://schemas.openxmlformats.org/presentationml/2006/main">
   <p:cSld>
     <p:bg>
@@ -22207,7 +23283,7 @@
 </p:sld>
 </file>
 
-<file path=ppt/slides/slide55.xml><?xml version="1.0" encoding="utf-8"?>
+<file path=ppt/slides/slide57.xml><?xml version="1.0" encoding="utf-8"?>
 <p:sld xmlns:a="http://schemas.openxmlformats.org/drawingml/2006/main" xmlns:r="http://schemas.openxmlformats.org/officeDocument/2006/relationships" xmlns:p="http://schemas.openxmlformats.org/presentationml/2006/main">
   <p:cSld>
     <p:bg>
@@ -22329,7 +23405,7 @@
 </p:sld>
 </file>
 
-<file path=ppt/slides/slide56.xml><?xml version="1.0" encoding="utf-8"?>
+<file path=ppt/slides/slide58.xml><?xml version="1.0" encoding="utf-8"?>
 <p:sld xmlns:a="http://schemas.openxmlformats.org/drawingml/2006/main" xmlns:r="http://schemas.openxmlformats.org/officeDocument/2006/relationships" xmlns:p="http://schemas.openxmlformats.org/presentationml/2006/main">
   <p:cSld>
     <p:bg>

</xml_diff>

<commit_message>
Added validation to number of nuts
Added validation to number of nuts entry to restrict number between 1 and 12 and only accept valid integer.
</commit_message>
<xml_diff>
--- a/Danett Pepito - 000_91896 _ 91897 Documentation - 2150400 (Git).pptx
+++ b/Danett Pepito - 000_91896 _ 91897 Documentation - 2150400 (Git).pptx
@@ -5,7 +5,7 @@
     <p:sldMasterId id="2147483659" r:id="rId1"/>
   </p:sldMasterIdLst>
   <p:notesMasterIdLst>
-    <p:notesMasterId r:id="rId64"/>
+    <p:notesMasterId r:id="rId68"/>
   </p:notesMasterIdLst>
   <p:sldIdLst>
     <p:sldId id="256" r:id="rId2"/>
@@ -59,17 +59,21 @@
     <p:sldId id="281" r:id="rId50"/>
     <p:sldId id="319" r:id="rId51"/>
     <p:sldId id="320" r:id="rId52"/>
-    <p:sldId id="282" r:id="rId53"/>
-    <p:sldId id="288" r:id="rId54"/>
-    <p:sldId id="290" r:id="rId55"/>
-    <p:sldId id="292" r:id="rId56"/>
-    <p:sldId id="291" r:id="rId57"/>
-    <p:sldId id="285" r:id="rId58"/>
-    <p:sldId id="261" r:id="rId59"/>
-    <p:sldId id="284" r:id="rId60"/>
-    <p:sldId id="286" r:id="rId61"/>
-    <p:sldId id="287" r:id="rId62"/>
-    <p:sldId id="262" r:id="rId63"/>
+    <p:sldId id="323" r:id="rId53"/>
+    <p:sldId id="324" r:id="rId54"/>
+    <p:sldId id="321" r:id="rId55"/>
+    <p:sldId id="322" r:id="rId56"/>
+    <p:sldId id="282" r:id="rId57"/>
+    <p:sldId id="288" r:id="rId58"/>
+    <p:sldId id="290" r:id="rId59"/>
+    <p:sldId id="292" r:id="rId60"/>
+    <p:sldId id="291" r:id="rId61"/>
+    <p:sldId id="285" r:id="rId62"/>
+    <p:sldId id="261" r:id="rId63"/>
+    <p:sldId id="284" r:id="rId64"/>
+    <p:sldId id="286" r:id="rId65"/>
+    <p:sldId id="287" r:id="rId66"/>
+    <p:sldId id="262" r:id="rId67"/>
   </p:sldIdLst>
   <p:sldSz cx="9144000" cy="5143500" type="screen16x9"/>
   <p:notesSz cx="6858000" cy="9144000"/>
@@ -324,7 +328,7 @@
 <file path=ppt/revisionInfo.xml><?xml version="1.0" encoding="utf-8"?>
 <p1510:revInfo xmlns:a="http://schemas.openxmlformats.org/drawingml/2006/main" xmlns:r="http://schemas.openxmlformats.org/officeDocument/2006/relationships" xmlns:p1510="http://schemas.microsoft.com/office/powerpoint/2015/10/main">
   <p1510:revLst>
-    <p1510:client id="{B2185394-3AFD-42B2-9285-3B672C598A56}" v="20" dt="2022-03-21T07:38:01.868"/>
+    <p1510:client id="{B2185394-3AFD-42B2-9285-3B672C598A56}" v="21" dt="2022-03-21T07:50:03.973"/>
   </p1510:revLst>
 </p1510:revInfo>
 </file>
@@ -334,7 +338,7 @@
   <pc:docChgLst>
     <pc:chgData name="Danett Pepito" userId="ddef1e2176689e9a" providerId="LiveId" clId="{B2185394-3AFD-42B2-9285-3B672C598A56}"/>
     <pc:docChg chg="undo custSel addSld delSld modSld sldOrd">
-      <pc:chgData name="Danett Pepito" userId="ddef1e2176689e9a" providerId="LiveId" clId="{B2185394-3AFD-42B2-9285-3B672C598A56}" dt="2022-03-21T07:39:12.253" v="1359" actId="20577"/>
+      <pc:chgData name="Danett Pepito" userId="ddef1e2176689e9a" providerId="LiveId" clId="{B2185394-3AFD-42B2-9285-3B672C598A56}" dt="2022-03-21T07:53:17.776" v="1486" actId="478"/>
       <pc:docMkLst>
         <pc:docMk/>
       </pc:docMkLst>
@@ -753,13 +757,13 @@
         </pc:picChg>
       </pc:sldChg>
       <pc:sldChg chg="addSp delSp modSp mod">
-        <pc:chgData name="Danett Pepito" userId="ddef1e2176689e9a" providerId="LiveId" clId="{B2185394-3AFD-42B2-9285-3B672C598A56}" dt="2022-03-21T07:26:35.366" v="1303" actId="1076"/>
+        <pc:chgData name="Danett Pepito" userId="ddef1e2176689e9a" providerId="LiveId" clId="{B2185394-3AFD-42B2-9285-3B672C598A56}" dt="2022-03-21T07:43:38.215" v="1369" actId="20577"/>
         <pc:sldMkLst>
           <pc:docMk/>
           <pc:sldMk cId="3240135051" sldId="280"/>
         </pc:sldMkLst>
         <pc:spChg chg="mod">
-          <ac:chgData name="Danett Pepito" userId="ddef1e2176689e9a" providerId="LiveId" clId="{B2185394-3AFD-42B2-9285-3B672C598A56}" dt="2022-03-21T07:22:10.287" v="1289" actId="113"/>
+          <ac:chgData name="Danett Pepito" userId="ddef1e2176689e9a" providerId="LiveId" clId="{B2185394-3AFD-42B2-9285-3B672C598A56}" dt="2022-03-21T07:43:38.215" v="1369" actId="20577"/>
           <ac:spMkLst>
             <pc:docMk/>
             <pc:sldMk cId="3240135051" sldId="280"/>
@@ -1892,8 +1896,8 @@
           </ac:picMkLst>
         </pc:picChg>
       </pc:sldChg>
-      <pc:sldChg chg="delSp modSp add mod">
-        <pc:chgData name="Danett Pepito" userId="ddef1e2176689e9a" providerId="LiveId" clId="{B2185394-3AFD-42B2-9285-3B672C598A56}" dt="2022-03-21T07:39:12.253" v="1359" actId="20577"/>
+      <pc:sldChg chg="addSp delSp modSp add mod">
+        <pc:chgData name="Danett Pepito" userId="ddef1e2176689e9a" providerId="LiveId" clId="{B2185394-3AFD-42B2-9285-3B672C598A56}" dt="2022-03-21T07:51:52.598" v="1423" actId="1076"/>
         <pc:sldMkLst>
           <pc:docMk/>
           <pc:sldMk cId="2005877267" sldId="319"/>
@@ -1906,6 +1910,22 @@
             <ac:spMk id="73" creationId="{00000000-0000-0000-0000-000000000000}"/>
           </ac:spMkLst>
         </pc:spChg>
+        <pc:picChg chg="add del mod">
+          <ac:chgData name="Danett Pepito" userId="ddef1e2176689e9a" providerId="LiveId" clId="{B2185394-3AFD-42B2-9285-3B672C598A56}" dt="2022-03-21T07:51:48.922" v="1420" actId="478"/>
+          <ac:picMkLst>
+            <pc:docMk/>
+            <pc:sldMk cId="2005877267" sldId="319"/>
+            <ac:picMk id="4" creationId="{55678487-D18D-46DB-BCCB-DA96E215B123}"/>
+          </ac:picMkLst>
+        </pc:picChg>
+        <pc:picChg chg="add mod">
+          <ac:chgData name="Danett Pepito" userId="ddef1e2176689e9a" providerId="LiveId" clId="{B2185394-3AFD-42B2-9285-3B672C598A56}" dt="2022-03-21T07:51:52.598" v="1423" actId="1076"/>
+          <ac:picMkLst>
+            <pc:docMk/>
+            <pc:sldMk cId="2005877267" sldId="319"/>
+            <ac:picMk id="6" creationId="{CFFBC03F-CAB0-4707-A576-156745020802}"/>
+          </ac:picMkLst>
+        </pc:picChg>
         <pc:picChg chg="del">
           <ac:chgData name="Danett Pepito" userId="ddef1e2176689e9a" providerId="LiveId" clId="{B2185394-3AFD-42B2-9285-3B672C598A56}" dt="2022-03-21T07:39:01.468" v="1341" actId="478"/>
           <ac:picMkLst>
@@ -1915,8 +1935,8 @@
           </ac:picMkLst>
         </pc:picChg>
       </pc:sldChg>
-      <pc:sldChg chg="delSp modSp add mod replId">
-        <pc:chgData name="Danett Pepito" userId="ddef1e2176689e9a" providerId="LiveId" clId="{B2185394-3AFD-42B2-9285-3B672C598A56}" dt="2022-03-21T07:39:07.544" v="1349" actId="20577"/>
+      <pc:sldChg chg="addSp delSp modSp add mod replId">
+        <pc:chgData name="Danett Pepito" userId="ddef1e2176689e9a" providerId="LiveId" clId="{B2185394-3AFD-42B2-9285-3B672C598A56}" dt="2022-03-21T07:50:34.263" v="1409" actId="20577"/>
         <pc:sldMkLst>
           <pc:docMk/>
           <pc:sldMk cId="1037488792" sldId="320"/>
@@ -1929,6 +1949,22 @@
             <ac:spMk id="78" creationId="{00000000-0000-0000-0000-000000000000}"/>
           </ac:spMkLst>
         </pc:spChg>
+        <pc:graphicFrameChg chg="mod modGraphic">
+          <ac:chgData name="Danett Pepito" userId="ddef1e2176689e9a" providerId="LiveId" clId="{B2185394-3AFD-42B2-9285-3B672C598A56}" dt="2022-03-21T07:50:34.263" v="1409" actId="20577"/>
+          <ac:graphicFrameMkLst>
+            <pc:docMk/>
+            <pc:sldMk cId="1037488792" sldId="320"/>
+            <ac:graphicFrameMk id="79" creationId="{00000000-0000-0000-0000-000000000000}"/>
+          </ac:graphicFrameMkLst>
+        </pc:graphicFrameChg>
+        <pc:picChg chg="add mod">
+          <ac:chgData name="Danett Pepito" userId="ddef1e2176689e9a" providerId="LiveId" clId="{B2185394-3AFD-42B2-9285-3B672C598A56}" dt="2022-03-21T07:50:13.815" v="1393" actId="1076"/>
+          <ac:picMkLst>
+            <pc:docMk/>
+            <pc:sldMk cId="1037488792" sldId="320"/>
+            <ac:picMk id="4" creationId="{FAEE16BB-0764-4D81-8DED-CF829B968F17}"/>
+          </ac:picMkLst>
+        </pc:picChg>
         <pc:picChg chg="del">
           <ac:chgData name="Danett Pepito" userId="ddef1e2176689e9a" providerId="LiveId" clId="{B2185394-3AFD-42B2-9285-3B672C598A56}" dt="2022-03-21T07:39:03.375" v="1342" actId="478"/>
           <ac:picMkLst>
@@ -1937,12 +1973,136 @@
             <ac:picMk id="5" creationId="{DA98A35A-FE9D-486F-B31D-549EC97F5CA6}"/>
           </ac:picMkLst>
         </pc:picChg>
+        <pc:picChg chg="add mod">
+          <ac:chgData name="Danett Pepito" userId="ddef1e2176689e9a" providerId="LiveId" clId="{B2185394-3AFD-42B2-9285-3B672C598A56}" dt="2022-03-21T07:50:15.211" v="1394" actId="1076"/>
+          <ac:picMkLst>
+            <pc:docMk/>
+            <pc:sldMk cId="1037488792" sldId="320"/>
+            <ac:picMk id="6" creationId="{A3692475-74D6-4797-8B19-BFAD5A38D3B9}"/>
+          </ac:picMkLst>
+        </pc:picChg>
         <pc:picChg chg="del">
           <ac:chgData name="Danett Pepito" userId="ddef1e2176689e9a" providerId="LiveId" clId="{B2185394-3AFD-42B2-9285-3B672C598A56}" dt="2022-03-21T07:39:04.236" v="1343" actId="478"/>
           <ac:picMkLst>
             <pc:docMk/>
             <pc:sldMk cId="1037488792" sldId="320"/>
             <ac:picMk id="7" creationId="{7AA149C8-945A-4CDA-96ED-7026E89EE9B9}"/>
+          </ac:picMkLst>
+        </pc:picChg>
+        <pc:picChg chg="del">
+          <ac:chgData name="Danett Pepito" userId="ddef1e2176689e9a" providerId="LiveId" clId="{B2185394-3AFD-42B2-9285-3B672C598A56}" dt="2022-03-21T07:50:01.676" v="1389" actId="478"/>
+          <ac:picMkLst>
+            <pc:docMk/>
+            <pc:sldMk cId="1037488792" sldId="320"/>
+            <ac:picMk id="9" creationId="{D6E43C6E-4179-4808-9D8A-E829823DB0B1}"/>
+          </ac:picMkLst>
+        </pc:picChg>
+      </pc:sldChg>
+      <pc:sldChg chg="delSp modSp add del mod">
+        <pc:chgData name="Danett Pepito" userId="ddef1e2176689e9a" providerId="LiveId" clId="{B2185394-3AFD-42B2-9285-3B672C598A56}" dt="2022-03-21T07:50:45.363" v="1417" actId="20577"/>
+        <pc:sldMkLst>
+          <pc:docMk/>
+          <pc:sldMk cId="3618029425" sldId="321"/>
+        </pc:sldMkLst>
+        <pc:spChg chg="mod">
+          <ac:chgData name="Danett Pepito" userId="ddef1e2176689e9a" providerId="LiveId" clId="{B2185394-3AFD-42B2-9285-3B672C598A56}" dt="2022-03-21T07:50:45.363" v="1417" actId="20577"/>
+          <ac:spMkLst>
+            <pc:docMk/>
+            <pc:sldMk cId="3618029425" sldId="321"/>
+            <ac:spMk id="73" creationId="{00000000-0000-0000-0000-000000000000}"/>
+          </ac:spMkLst>
+        </pc:spChg>
+        <pc:picChg chg="del">
+          <ac:chgData name="Danett Pepito" userId="ddef1e2176689e9a" providerId="LiveId" clId="{B2185394-3AFD-42B2-9285-3B672C598A56}" dt="2022-03-21T07:50:43.472" v="1415" actId="478"/>
+          <ac:picMkLst>
+            <pc:docMk/>
+            <pc:sldMk cId="3618029425" sldId="321"/>
+            <ac:picMk id="4" creationId="{55678487-D18D-46DB-BCCB-DA96E215B123}"/>
+          </ac:picMkLst>
+        </pc:picChg>
+      </pc:sldChg>
+      <pc:sldChg chg="delSp modSp add mod replId">
+        <pc:chgData name="Danett Pepito" userId="ddef1e2176689e9a" providerId="LiveId" clId="{B2185394-3AFD-42B2-9285-3B672C598A56}" dt="2022-03-21T07:50:48.563" v="1419" actId="20577"/>
+        <pc:sldMkLst>
+          <pc:docMk/>
+          <pc:sldMk cId="2870222884" sldId="322"/>
+        </pc:sldMkLst>
+        <pc:spChg chg="mod">
+          <ac:chgData name="Danett Pepito" userId="ddef1e2176689e9a" providerId="LiveId" clId="{B2185394-3AFD-42B2-9285-3B672C598A56}" dt="2022-03-21T07:50:48.563" v="1419" actId="20577"/>
+          <ac:spMkLst>
+            <pc:docMk/>
+            <pc:sldMk cId="2870222884" sldId="322"/>
+            <ac:spMk id="78" creationId="{00000000-0000-0000-0000-000000000000}"/>
+          </ac:spMkLst>
+        </pc:spChg>
+        <pc:picChg chg="del">
+          <ac:chgData name="Danett Pepito" userId="ddef1e2176689e9a" providerId="LiveId" clId="{B2185394-3AFD-42B2-9285-3B672C598A56}" dt="2022-03-21T07:50:39.189" v="1411" actId="478"/>
+          <ac:picMkLst>
+            <pc:docMk/>
+            <pc:sldMk cId="2870222884" sldId="322"/>
+            <ac:picMk id="4" creationId="{FAEE16BB-0764-4D81-8DED-CF829B968F17}"/>
+          </ac:picMkLst>
+        </pc:picChg>
+        <pc:picChg chg="del">
+          <ac:chgData name="Danett Pepito" userId="ddef1e2176689e9a" providerId="LiveId" clId="{B2185394-3AFD-42B2-9285-3B672C598A56}" dt="2022-03-21T07:50:40.033" v="1412" actId="478"/>
+          <ac:picMkLst>
+            <pc:docMk/>
+            <pc:sldMk cId="2870222884" sldId="322"/>
+            <ac:picMk id="6" creationId="{A3692475-74D6-4797-8B19-BFAD5A38D3B9}"/>
+          </ac:picMkLst>
+        </pc:picChg>
+      </pc:sldChg>
+      <pc:sldChg chg="delSp modSp add mod">
+        <pc:chgData name="Danett Pepito" userId="ddef1e2176689e9a" providerId="LiveId" clId="{B2185394-3AFD-42B2-9285-3B672C598A56}" dt="2022-03-21T07:53:17.776" v="1486" actId="478"/>
+        <pc:sldMkLst>
+          <pc:docMk/>
+          <pc:sldMk cId="2537653466" sldId="323"/>
+        </pc:sldMkLst>
+        <pc:spChg chg="mod">
+          <ac:chgData name="Danett Pepito" userId="ddef1e2176689e9a" providerId="LiveId" clId="{B2185394-3AFD-42B2-9285-3B672C598A56}" dt="2022-03-21T07:53:15.502" v="1485" actId="20577"/>
+          <ac:spMkLst>
+            <pc:docMk/>
+            <pc:sldMk cId="2537653466" sldId="323"/>
+            <ac:spMk id="73" creationId="{00000000-0000-0000-0000-000000000000}"/>
+          </ac:spMkLst>
+        </pc:spChg>
+        <pc:picChg chg="del">
+          <ac:chgData name="Danett Pepito" userId="ddef1e2176689e9a" providerId="LiveId" clId="{B2185394-3AFD-42B2-9285-3B672C598A56}" dt="2022-03-21T07:53:17.776" v="1486" actId="478"/>
+          <ac:picMkLst>
+            <pc:docMk/>
+            <pc:sldMk cId="2537653466" sldId="323"/>
+            <ac:picMk id="6" creationId="{CFFBC03F-CAB0-4707-A576-156745020802}"/>
+          </ac:picMkLst>
+        </pc:picChg>
+      </pc:sldChg>
+      <pc:sldChg chg="delSp modSp add mod replId">
+        <pc:chgData name="Danett Pepito" userId="ddef1e2176689e9a" providerId="LiveId" clId="{B2185394-3AFD-42B2-9285-3B672C598A56}" dt="2022-03-21T07:53:08.692" v="1457" actId="20577"/>
+        <pc:sldMkLst>
+          <pc:docMk/>
+          <pc:sldMk cId="3778727109" sldId="324"/>
+        </pc:sldMkLst>
+        <pc:spChg chg="mod">
+          <ac:chgData name="Danett Pepito" userId="ddef1e2176689e9a" providerId="LiveId" clId="{B2185394-3AFD-42B2-9285-3B672C598A56}" dt="2022-03-21T07:53:08.692" v="1457" actId="20577"/>
+          <ac:spMkLst>
+            <pc:docMk/>
+            <pc:sldMk cId="3778727109" sldId="324"/>
+            <ac:spMk id="78" creationId="{00000000-0000-0000-0000-000000000000}"/>
+          </ac:spMkLst>
+        </pc:spChg>
+        <pc:picChg chg="del">
+          <ac:chgData name="Danett Pepito" userId="ddef1e2176689e9a" providerId="LiveId" clId="{B2185394-3AFD-42B2-9285-3B672C598A56}" dt="2022-03-21T07:53:01.372" v="1434" actId="478"/>
+          <ac:picMkLst>
+            <pc:docMk/>
+            <pc:sldMk cId="3778727109" sldId="324"/>
+            <ac:picMk id="4" creationId="{FAEE16BB-0764-4D81-8DED-CF829B968F17}"/>
+          </ac:picMkLst>
+        </pc:picChg>
+        <pc:picChg chg="del">
+          <ac:chgData name="Danett Pepito" userId="ddef1e2176689e9a" providerId="LiveId" clId="{B2185394-3AFD-42B2-9285-3B672C598A56}" dt="2022-03-21T07:53:02.082" v="1435" actId="478"/>
+          <ac:picMkLst>
+            <pc:docMk/>
+            <pc:sldMk cId="3778727109" sldId="324"/>
+            <ac:picMk id="6" creationId="{A3692475-74D6-4797-8B19-BFAD5A38D3B9}"/>
           </ac:picMkLst>
         </pc:picChg>
       </pc:sldChg>
@@ -6421,7 +6581,7 @@
     </p:spTree>
     <p:extLst>
       <p:ext uri="{BB962C8B-B14F-4D97-AF65-F5344CB8AC3E}">
-        <p14:creationId xmlns:p14="http://schemas.microsoft.com/office/powerpoint/2010/main" val="3006313543"/>
+        <p14:creationId xmlns:p14="http://schemas.microsoft.com/office/powerpoint/2010/main" val="4146560975"/>
       </p:ext>
     </p:extLst>
   </p:cSld>
@@ -6436,7 +6596,7 @@
   <p:cSld>
     <p:spTree>
       <p:nvGrpSpPr>
-        <p:cNvPr id="1" name="Shape 69"/>
+        <p:cNvPr id="1" name="Shape 74"/>
         <p:cNvGrpSpPr/>
         <p:nvPr/>
       </p:nvGrpSpPr>
@@ -6450,7 +6610,7 @@
       </p:grpSpPr>
       <p:sp>
         <p:nvSpPr>
-          <p:cNvPr id="70" name="Google Shape;70;gac10fef634_0_16:notes"/>
+          <p:cNvPr id="75" name="Google Shape;75;gac10fef634_0_20:notes"/>
           <p:cNvSpPr>
             <a:spLocks noGrp="1" noRot="1" noChangeAspect="1"/>
           </p:cNvSpPr>
@@ -6491,7 +6651,7 @@
       </p:sp>
       <p:sp>
         <p:nvSpPr>
-          <p:cNvPr id="71" name="Google Shape;71;gac10fef634_0_16:notes"/>
+          <p:cNvPr id="76" name="Google Shape;76;gac10fef634_0_20:notes"/>
           <p:cNvSpPr txBox="1">
             <a:spLocks noGrp="1"/>
           </p:cNvSpPr>
@@ -6530,7 +6690,7 @@
     </p:spTree>
     <p:extLst>
       <p:ext uri="{BB962C8B-B14F-4D97-AF65-F5344CB8AC3E}">
-        <p14:creationId xmlns:p14="http://schemas.microsoft.com/office/powerpoint/2010/main" val="2149026663"/>
+        <p14:creationId xmlns:p14="http://schemas.microsoft.com/office/powerpoint/2010/main" val="2010489897"/>
       </p:ext>
     </p:extLst>
   </p:cSld>
@@ -6639,7 +6799,7 @@
     </p:spTree>
     <p:extLst>
       <p:ext uri="{BB962C8B-B14F-4D97-AF65-F5344CB8AC3E}">
-        <p14:creationId xmlns:p14="http://schemas.microsoft.com/office/powerpoint/2010/main" val="3194274356"/>
+        <p14:creationId xmlns:p14="http://schemas.microsoft.com/office/powerpoint/2010/main" val="3657335367"/>
       </p:ext>
     </p:extLst>
   </p:cSld>
@@ -6650,6 +6810,115 @@
 </file>
 
 <file path=ppt/notesSlides/notesSlide45.xml><?xml version="1.0" encoding="utf-8"?>
+<p:notes xmlns:a="http://schemas.openxmlformats.org/drawingml/2006/main" xmlns:r="http://schemas.openxmlformats.org/officeDocument/2006/relationships" xmlns:p="http://schemas.openxmlformats.org/presentationml/2006/main" showMasterSp="0" showMasterPhAnim="0">
+  <p:cSld>
+    <p:spTree>
+      <p:nvGrpSpPr>
+        <p:cNvPr id="1" name="Shape 74"/>
+        <p:cNvGrpSpPr/>
+        <p:nvPr/>
+      </p:nvGrpSpPr>
+      <p:grpSpPr>
+        <a:xfrm>
+          <a:off x="0" y="0"/>
+          <a:ext cx="0" cy="0"/>
+          <a:chOff x="0" y="0"/>
+          <a:chExt cx="0" cy="0"/>
+        </a:xfrm>
+      </p:grpSpPr>
+      <p:sp>
+        <p:nvSpPr>
+          <p:cNvPr id="75" name="Google Shape;75;gac10fef634_0_20:notes"/>
+          <p:cNvSpPr>
+            <a:spLocks noGrp="1" noRot="1" noChangeAspect="1"/>
+          </p:cNvSpPr>
+          <p:nvPr>
+            <p:ph type="sldImg" idx="2"/>
+          </p:nvPr>
+        </p:nvSpPr>
+        <p:spPr>
+          <a:xfrm>
+            <a:off x="381000" y="685800"/>
+            <a:ext cx="6096000" cy="3429000"/>
+          </a:xfrm>
+          <a:custGeom>
+            <a:avLst/>
+            <a:gdLst/>
+            <a:ahLst/>
+            <a:cxnLst/>
+            <a:rect l="l" t="t" r="r" b="b"/>
+            <a:pathLst>
+              <a:path w="120000" h="120000" extrusionOk="0">
+                <a:moveTo>
+                  <a:pt x="0" y="0"/>
+                </a:moveTo>
+                <a:lnTo>
+                  <a:pt x="120000" y="0"/>
+                </a:lnTo>
+                <a:lnTo>
+                  <a:pt x="120000" y="120000"/>
+                </a:lnTo>
+                <a:lnTo>
+                  <a:pt x="0" y="120000"/>
+                </a:lnTo>
+                <a:close/>
+              </a:path>
+            </a:pathLst>
+          </a:custGeom>
+        </p:spPr>
+      </p:sp>
+      <p:sp>
+        <p:nvSpPr>
+          <p:cNvPr id="76" name="Google Shape;76;gac10fef634_0_20:notes"/>
+          <p:cNvSpPr txBox="1">
+            <a:spLocks noGrp="1"/>
+          </p:cNvSpPr>
+          <p:nvPr>
+            <p:ph type="body" idx="1"/>
+          </p:nvPr>
+        </p:nvSpPr>
+        <p:spPr>
+          <a:xfrm>
+            <a:off x="685800" y="4343400"/>
+            <a:ext cx="5486400" cy="4114800"/>
+          </a:xfrm>
+          <a:prstGeom prst="rect">
+            <a:avLst/>
+          </a:prstGeom>
+        </p:spPr>
+        <p:txBody>
+          <a:bodyPr spcFirstLastPara="1" wrap="square" lIns="91425" tIns="91425" rIns="91425" bIns="91425" anchor="t" anchorCtr="0">
+            <a:noAutofit/>
+          </a:bodyPr>
+          <a:lstStyle/>
+          <a:p>
+            <a:pPr marL="0" lvl="0" indent="0" algn="l" rtl="0">
+              <a:spcBef>
+                <a:spcPts val="0"/>
+              </a:spcBef>
+              <a:spcAft>
+                <a:spcPts val="0"/>
+              </a:spcAft>
+              <a:buNone/>
+            </a:pPr>
+            <a:endParaRPr/>
+          </a:p>
+        </p:txBody>
+      </p:sp>
+    </p:spTree>
+    <p:extLst>
+      <p:ext uri="{BB962C8B-B14F-4D97-AF65-F5344CB8AC3E}">
+        <p14:creationId xmlns:p14="http://schemas.microsoft.com/office/powerpoint/2010/main" val="1859499214"/>
+      </p:ext>
+    </p:extLst>
+  </p:cSld>
+  <p:clrMapOvr>
+    <a:masterClrMapping/>
+  </p:clrMapOvr>
+</p:notes>
+</file>
+
+<file path=ppt/notesSlides/notesSlide46.xml><?xml version="1.0" encoding="utf-8"?>
 <p:notes xmlns:a="http://schemas.openxmlformats.org/drawingml/2006/main" xmlns:r="http://schemas.openxmlformats.org/officeDocument/2006/relationships" xmlns:p="http://schemas.openxmlformats.org/presentationml/2006/main" showMasterSp="0" showMasterPhAnim="0">
   <p:cSld>
     <p:spTree>
@@ -6748,7 +7017,7 @@
     </p:spTree>
     <p:extLst>
       <p:ext uri="{BB962C8B-B14F-4D97-AF65-F5344CB8AC3E}">
-        <p14:creationId xmlns:p14="http://schemas.microsoft.com/office/powerpoint/2010/main" val="3014292639"/>
+        <p14:creationId xmlns:p14="http://schemas.microsoft.com/office/powerpoint/2010/main" val="3006313543"/>
       </p:ext>
     </p:extLst>
   </p:cSld>
@@ -6758,12 +7027,12 @@
 </p:notes>
 </file>
 
-<file path=ppt/notesSlides/notesSlide46.xml><?xml version="1.0" encoding="utf-8"?>
+<file path=ppt/notesSlides/notesSlide47.xml><?xml version="1.0" encoding="utf-8"?>
 <p:notes xmlns:a="http://schemas.openxmlformats.org/drawingml/2006/main" xmlns:r="http://schemas.openxmlformats.org/officeDocument/2006/relationships" xmlns:p="http://schemas.openxmlformats.org/presentationml/2006/main" showMasterSp="0" showMasterPhAnim="0">
   <p:cSld>
     <p:spTree>
       <p:nvGrpSpPr>
-        <p:cNvPr id="1" name="Shape 80"/>
+        <p:cNvPr id="1" name="Shape 69"/>
         <p:cNvGrpSpPr/>
         <p:nvPr/>
       </p:nvGrpSpPr>
@@ -6777,7 +7046,7 @@
       </p:grpSpPr>
       <p:sp>
         <p:nvSpPr>
-          <p:cNvPr id="81" name="Google Shape;81;gac10fef634_0_25:notes"/>
+          <p:cNvPr id="70" name="Google Shape;70;gac10fef634_0_16:notes"/>
           <p:cNvSpPr>
             <a:spLocks noGrp="1" noRot="1" noChangeAspect="1"/>
           </p:cNvSpPr>
@@ -6818,7 +7087,7 @@
       </p:sp>
       <p:sp>
         <p:nvSpPr>
-          <p:cNvPr id="82" name="Google Shape;82;gac10fef634_0_25:notes"/>
+          <p:cNvPr id="71" name="Google Shape;71;gac10fef634_0_16:notes"/>
           <p:cNvSpPr txBox="1">
             <a:spLocks noGrp="1"/>
           </p:cNvSpPr>
@@ -6848,27 +7117,6 @@
               <a:spcAft>
                 <a:spcPts val="0"/>
               </a:spcAft>
-              <a:buClr>
-                <a:schemeClr val="dk1"/>
-              </a:buClr>
-              <a:buSzPts val="1100"/>
-              <a:buFont typeface="Arial"/>
-              <a:buNone/>
-            </a:pPr>
-            <a:r>
-              <a:rPr lang="en"/>
-              <a:t>Your version control evidence should go here.  This could be in the form of annotated screenshots which show you you managed this process or you could make a brief screencast explaining how you implemented version control.</a:t>
-            </a:r>
-            <a:endParaRPr/>
-          </a:p>
-          <a:p>
-            <a:pPr marL="0" lvl="0" indent="0" algn="l" rtl="0">
-              <a:spcBef>
-                <a:spcPts val="0"/>
-              </a:spcBef>
-              <a:spcAft>
-                <a:spcPts val="0"/>
-              </a:spcAft>
               <a:buNone/>
             </a:pPr>
             <a:endParaRPr/>
@@ -6876,6 +7124,11 @@
         </p:txBody>
       </p:sp>
     </p:spTree>
+    <p:extLst>
+      <p:ext uri="{BB962C8B-B14F-4D97-AF65-F5344CB8AC3E}">
+        <p14:creationId xmlns:p14="http://schemas.microsoft.com/office/powerpoint/2010/main" val="2149026663"/>
+      </p:ext>
+    </p:extLst>
   </p:cSld>
   <p:clrMapOvr>
     <a:masterClrMapping/>
@@ -6883,12 +7136,12 @@
 </p:notes>
 </file>
 
-<file path=ppt/notesSlides/notesSlide47.xml><?xml version="1.0" encoding="utf-8"?>
+<file path=ppt/notesSlides/notesSlide48.xml><?xml version="1.0" encoding="utf-8"?>
 <p:notes xmlns:a="http://schemas.openxmlformats.org/drawingml/2006/main" xmlns:r="http://schemas.openxmlformats.org/officeDocument/2006/relationships" xmlns:p="http://schemas.openxmlformats.org/presentationml/2006/main" showMasterSp="0" showMasterPhAnim="0">
   <p:cSld>
     <p:spTree>
       <p:nvGrpSpPr>
-        <p:cNvPr id="1" name="Shape 80"/>
+        <p:cNvPr id="1" name="Shape 69"/>
         <p:cNvGrpSpPr/>
         <p:nvPr/>
       </p:nvGrpSpPr>
@@ -6902,7 +7155,7 @@
       </p:grpSpPr>
       <p:sp>
         <p:nvSpPr>
-          <p:cNvPr id="81" name="Google Shape;81;gac10fef634_0_25:notes"/>
+          <p:cNvPr id="70" name="Google Shape;70;gac10fef634_0_16:notes"/>
           <p:cNvSpPr>
             <a:spLocks noGrp="1" noRot="1" noChangeAspect="1"/>
           </p:cNvSpPr>
@@ -6943,7 +7196,7 @@
       </p:sp>
       <p:sp>
         <p:nvSpPr>
-          <p:cNvPr id="82" name="Google Shape;82;gac10fef634_0_25:notes"/>
+          <p:cNvPr id="71" name="Google Shape;71;gac10fef634_0_16:notes"/>
           <p:cNvSpPr txBox="1">
             <a:spLocks noGrp="1"/>
           </p:cNvSpPr>
@@ -6965,27 +7218,6 @@
             <a:noAutofit/>
           </a:bodyPr>
           <a:lstStyle/>
-          <a:p>
-            <a:pPr marL="0" lvl="0" indent="0" algn="l" rtl="0">
-              <a:spcBef>
-                <a:spcPts val="0"/>
-              </a:spcBef>
-              <a:spcAft>
-                <a:spcPts val="0"/>
-              </a:spcAft>
-              <a:buClr>
-                <a:schemeClr val="dk1"/>
-              </a:buClr>
-              <a:buSzPts val="1100"/>
-              <a:buFont typeface="Arial"/>
-              <a:buNone/>
-            </a:pPr>
-            <a:r>
-              <a:rPr lang="en"/>
-              <a:t>Your version control evidence should go here.  This could be in the form of annotated screenshots which show you you managed this process or you could make a brief screencast explaining how you implemented version control.</a:t>
-            </a:r>
-            <a:endParaRPr/>
-          </a:p>
           <a:p>
             <a:pPr marL="0" lvl="0" indent="0" algn="l" rtl="0">
               <a:spcBef>
@@ -7003,7 +7235,7 @@
     </p:spTree>
     <p:extLst>
       <p:ext uri="{BB962C8B-B14F-4D97-AF65-F5344CB8AC3E}">
-        <p14:creationId xmlns:p14="http://schemas.microsoft.com/office/powerpoint/2010/main" val="511959585"/>
+        <p14:creationId xmlns:p14="http://schemas.microsoft.com/office/powerpoint/2010/main" val="3194274356"/>
       </p:ext>
     </p:extLst>
   </p:cSld>
@@ -7013,12 +7245,12 @@
 </p:notes>
 </file>
 
-<file path=ppt/notesSlides/notesSlide48.xml><?xml version="1.0" encoding="utf-8"?>
+<file path=ppt/notesSlides/notesSlide49.xml><?xml version="1.0" encoding="utf-8"?>
 <p:notes xmlns:a="http://schemas.openxmlformats.org/drawingml/2006/main" xmlns:r="http://schemas.openxmlformats.org/officeDocument/2006/relationships" xmlns:p="http://schemas.openxmlformats.org/presentationml/2006/main" showMasterSp="0" showMasterPhAnim="0">
   <p:cSld>
     <p:spTree>
       <p:nvGrpSpPr>
-        <p:cNvPr id="1" name="Shape 80"/>
+        <p:cNvPr id="1" name="Shape 69"/>
         <p:cNvGrpSpPr/>
         <p:nvPr/>
       </p:nvGrpSpPr>
@@ -7032,7 +7264,7 @@
       </p:grpSpPr>
       <p:sp>
         <p:nvSpPr>
-          <p:cNvPr id="81" name="Google Shape;81;gac10fef634_0_25:notes"/>
+          <p:cNvPr id="70" name="Google Shape;70;gac10fef634_0_16:notes"/>
           <p:cNvSpPr>
             <a:spLocks noGrp="1" noRot="1" noChangeAspect="1"/>
           </p:cNvSpPr>
@@ -7073,7 +7305,7 @@
       </p:sp>
       <p:sp>
         <p:nvSpPr>
-          <p:cNvPr id="82" name="Google Shape;82;gac10fef634_0_25:notes"/>
+          <p:cNvPr id="71" name="Google Shape;71;gac10fef634_0_16:notes"/>
           <p:cNvSpPr txBox="1">
             <a:spLocks noGrp="1"/>
           </p:cNvSpPr>
@@ -7095,27 +7327,6 @@
             <a:noAutofit/>
           </a:bodyPr>
           <a:lstStyle/>
-          <a:p>
-            <a:pPr marL="0" lvl="0" indent="0" algn="l" rtl="0">
-              <a:spcBef>
-                <a:spcPts val="0"/>
-              </a:spcBef>
-              <a:spcAft>
-                <a:spcPts val="0"/>
-              </a:spcAft>
-              <a:buClr>
-                <a:schemeClr val="dk1"/>
-              </a:buClr>
-              <a:buSzPts val="1100"/>
-              <a:buFont typeface="Arial"/>
-              <a:buNone/>
-            </a:pPr>
-            <a:r>
-              <a:rPr lang="en"/>
-              <a:t>Your version control evidence should go here.  This could be in the form of annotated screenshots which show you you managed this process or you could make a brief screencast explaining how you implemented version control.</a:t>
-            </a:r>
-            <a:endParaRPr/>
-          </a:p>
           <a:p>
             <a:pPr marL="0" lvl="0" indent="0" algn="l" rtl="0">
               <a:spcBef>
@@ -7133,117 +7344,9 @@
     </p:spTree>
     <p:extLst>
       <p:ext uri="{BB962C8B-B14F-4D97-AF65-F5344CB8AC3E}">
-        <p14:creationId xmlns:p14="http://schemas.microsoft.com/office/powerpoint/2010/main" val="3815843750"/>
+        <p14:creationId xmlns:p14="http://schemas.microsoft.com/office/powerpoint/2010/main" val="3014292639"/>
       </p:ext>
     </p:extLst>
-  </p:cSld>
-  <p:clrMapOvr>
-    <a:masterClrMapping/>
-  </p:clrMapOvr>
-</p:notes>
-</file>
-
-<file path=ppt/notesSlides/notesSlide49.xml><?xml version="1.0" encoding="utf-8"?>
-<p:notes xmlns:a="http://schemas.openxmlformats.org/drawingml/2006/main" xmlns:r="http://schemas.openxmlformats.org/officeDocument/2006/relationships" xmlns:p="http://schemas.openxmlformats.org/presentationml/2006/main" showMasterSp="0" showMasterPhAnim="0">
-  <p:cSld>
-    <p:spTree>
-      <p:nvGrpSpPr>
-        <p:cNvPr id="1" name="Shape 86"/>
-        <p:cNvGrpSpPr/>
-        <p:nvPr/>
-      </p:nvGrpSpPr>
-      <p:grpSpPr>
-        <a:xfrm>
-          <a:off x="0" y="0"/>
-          <a:ext cx="0" cy="0"/>
-          <a:chOff x="0" y="0"/>
-          <a:chExt cx="0" cy="0"/>
-        </a:xfrm>
-      </p:grpSpPr>
-      <p:sp>
-        <p:nvSpPr>
-          <p:cNvPr id="87" name="Google Shape;87;gac10fef634_0_30:notes"/>
-          <p:cNvSpPr>
-            <a:spLocks noGrp="1" noRot="1" noChangeAspect="1"/>
-          </p:cNvSpPr>
-          <p:nvPr>
-            <p:ph type="sldImg" idx="2"/>
-          </p:nvPr>
-        </p:nvSpPr>
-        <p:spPr>
-          <a:xfrm>
-            <a:off x="381000" y="685800"/>
-            <a:ext cx="6096000" cy="3429000"/>
-          </a:xfrm>
-          <a:custGeom>
-            <a:avLst/>
-            <a:gdLst/>
-            <a:ahLst/>
-            <a:cxnLst/>
-            <a:rect l="l" t="t" r="r" b="b"/>
-            <a:pathLst>
-              <a:path w="120000" h="120000" extrusionOk="0">
-                <a:moveTo>
-                  <a:pt x="0" y="0"/>
-                </a:moveTo>
-                <a:lnTo>
-                  <a:pt x="120000" y="0"/>
-                </a:lnTo>
-                <a:lnTo>
-                  <a:pt x="120000" y="120000"/>
-                </a:lnTo>
-                <a:lnTo>
-                  <a:pt x="0" y="120000"/>
-                </a:lnTo>
-                <a:close/>
-              </a:path>
-            </a:pathLst>
-          </a:custGeom>
-        </p:spPr>
-      </p:sp>
-      <p:sp>
-        <p:nvSpPr>
-          <p:cNvPr id="88" name="Google Shape;88;gac10fef634_0_30:notes"/>
-          <p:cNvSpPr txBox="1">
-            <a:spLocks noGrp="1"/>
-          </p:cNvSpPr>
-          <p:nvPr>
-            <p:ph type="body" idx="1"/>
-          </p:nvPr>
-        </p:nvSpPr>
-        <p:spPr>
-          <a:xfrm>
-            <a:off x="685800" y="4343400"/>
-            <a:ext cx="5486400" cy="4114800"/>
-          </a:xfrm>
-          <a:prstGeom prst="rect">
-            <a:avLst/>
-          </a:prstGeom>
-        </p:spPr>
-        <p:txBody>
-          <a:bodyPr spcFirstLastPara="1" wrap="square" lIns="91425" tIns="91425" rIns="91425" bIns="91425" anchor="t" anchorCtr="0">
-            <a:noAutofit/>
-          </a:bodyPr>
-          <a:lstStyle/>
-          <a:p>
-            <a:pPr marL="0" lvl="0" indent="0" algn="l" rtl="0">
-              <a:spcBef>
-                <a:spcPts val="0"/>
-              </a:spcBef>
-              <a:spcAft>
-                <a:spcPts val="0"/>
-              </a:spcAft>
-              <a:buNone/>
-            </a:pPr>
-            <a:r>
-              <a:rPr lang="en"/>
-              <a:t>Discusses how the information from planning, testing and trialling of components assisted in the development of a high-quality outcome</a:t>
-            </a:r>
-            <a:endParaRPr/>
-          </a:p>
-        </p:txBody>
-      </p:sp>
-    </p:spTree>
   </p:cSld>
   <p:clrMapOvr>
     <a:masterClrMapping/>
@@ -7343,6 +7446,499 @@
               </a:spcAft>
               <a:buNone/>
             </a:pPr>
+            <a:endParaRPr/>
+          </a:p>
+        </p:txBody>
+      </p:sp>
+    </p:spTree>
+  </p:cSld>
+  <p:clrMapOvr>
+    <a:masterClrMapping/>
+  </p:clrMapOvr>
+</p:notes>
+</file>
+
+<file path=ppt/notesSlides/notesSlide50.xml><?xml version="1.0" encoding="utf-8"?>
+<p:notes xmlns:a="http://schemas.openxmlformats.org/drawingml/2006/main" xmlns:r="http://schemas.openxmlformats.org/officeDocument/2006/relationships" xmlns:p="http://schemas.openxmlformats.org/presentationml/2006/main" showMasterSp="0" showMasterPhAnim="0">
+  <p:cSld>
+    <p:spTree>
+      <p:nvGrpSpPr>
+        <p:cNvPr id="1" name="Shape 80"/>
+        <p:cNvGrpSpPr/>
+        <p:nvPr/>
+      </p:nvGrpSpPr>
+      <p:grpSpPr>
+        <a:xfrm>
+          <a:off x="0" y="0"/>
+          <a:ext cx="0" cy="0"/>
+          <a:chOff x="0" y="0"/>
+          <a:chExt cx="0" cy="0"/>
+        </a:xfrm>
+      </p:grpSpPr>
+      <p:sp>
+        <p:nvSpPr>
+          <p:cNvPr id="81" name="Google Shape;81;gac10fef634_0_25:notes"/>
+          <p:cNvSpPr>
+            <a:spLocks noGrp="1" noRot="1" noChangeAspect="1"/>
+          </p:cNvSpPr>
+          <p:nvPr>
+            <p:ph type="sldImg" idx="2"/>
+          </p:nvPr>
+        </p:nvSpPr>
+        <p:spPr>
+          <a:xfrm>
+            <a:off x="381000" y="685800"/>
+            <a:ext cx="6096000" cy="3429000"/>
+          </a:xfrm>
+          <a:custGeom>
+            <a:avLst/>
+            <a:gdLst/>
+            <a:ahLst/>
+            <a:cxnLst/>
+            <a:rect l="l" t="t" r="r" b="b"/>
+            <a:pathLst>
+              <a:path w="120000" h="120000" extrusionOk="0">
+                <a:moveTo>
+                  <a:pt x="0" y="0"/>
+                </a:moveTo>
+                <a:lnTo>
+                  <a:pt x="120000" y="0"/>
+                </a:lnTo>
+                <a:lnTo>
+                  <a:pt x="120000" y="120000"/>
+                </a:lnTo>
+                <a:lnTo>
+                  <a:pt x="0" y="120000"/>
+                </a:lnTo>
+                <a:close/>
+              </a:path>
+            </a:pathLst>
+          </a:custGeom>
+        </p:spPr>
+      </p:sp>
+      <p:sp>
+        <p:nvSpPr>
+          <p:cNvPr id="82" name="Google Shape;82;gac10fef634_0_25:notes"/>
+          <p:cNvSpPr txBox="1">
+            <a:spLocks noGrp="1"/>
+          </p:cNvSpPr>
+          <p:nvPr>
+            <p:ph type="body" idx="1"/>
+          </p:nvPr>
+        </p:nvSpPr>
+        <p:spPr>
+          <a:xfrm>
+            <a:off x="685800" y="4343400"/>
+            <a:ext cx="5486400" cy="4114800"/>
+          </a:xfrm>
+          <a:prstGeom prst="rect">
+            <a:avLst/>
+          </a:prstGeom>
+        </p:spPr>
+        <p:txBody>
+          <a:bodyPr spcFirstLastPara="1" wrap="square" lIns="91425" tIns="91425" rIns="91425" bIns="91425" anchor="t" anchorCtr="0">
+            <a:noAutofit/>
+          </a:bodyPr>
+          <a:lstStyle/>
+          <a:p>
+            <a:pPr marL="0" lvl="0" indent="0" algn="l" rtl="0">
+              <a:spcBef>
+                <a:spcPts val="0"/>
+              </a:spcBef>
+              <a:spcAft>
+                <a:spcPts val="0"/>
+              </a:spcAft>
+              <a:buClr>
+                <a:schemeClr val="dk1"/>
+              </a:buClr>
+              <a:buSzPts val="1100"/>
+              <a:buFont typeface="Arial"/>
+              <a:buNone/>
+            </a:pPr>
+            <a:r>
+              <a:rPr lang="en"/>
+              <a:t>Your version control evidence should go here.  This could be in the form of annotated screenshots which show you you managed this process or you could make a brief screencast explaining how you implemented version control.</a:t>
+            </a:r>
+            <a:endParaRPr/>
+          </a:p>
+          <a:p>
+            <a:pPr marL="0" lvl="0" indent="0" algn="l" rtl="0">
+              <a:spcBef>
+                <a:spcPts val="0"/>
+              </a:spcBef>
+              <a:spcAft>
+                <a:spcPts val="0"/>
+              </a:spcAft>
+              <a:buNone/>
+            </a:pPr>
+            <a:endParaRPr/>
+          </a:p>
+        </p:txBody>
+      </p:sp>
+    </p:spTree>
+  </p:cSld>
+  <p:clrMapOvr>
+    <a:masterClrMapping/>
+  </p:clrMapOvr>
+</p:notes>
+</file>
+
+<file path=ppt/notesSlides/notesSlide51.xml><?xml version="1.0" encoding="utf-8"?>
+<p:notes xmlns:a="http://schemas.openxmlformats.org/drawingml/2006/main" xmlns:r="http://schemas.openxmlformats.org/officeDocument/2006/relationships" xmlns:p="http://schemas.openxmlformats.org/presentationml/2006/main" showMasterSp="0" showMasterPhAnim="0">
+  <p:cSld>
+    <p:spTree>
+      <p:nvGrpSpPr>
+        <p:cNvPr id="1" name="Shape 80"/>
+        <p:cNvGrpSpPr/>
+        <p:nvPr/>
+      </p:nvGrpSpPr>
+      <p:grpSpPr>
+        <a:xfrm>
+          <a:off x="0" y="0"/>
+          <a:ext cx="0" cy="0"/>
+          <a:chOff x="0" y="0"/>
+          <a:chExt cx="0" cy="0"/>
+        </a:xfrm>
+      </p:grpSpPr>
+      <p:sp>
+        <p:nvSpPr>
+          <p:cNvPr id="81" name="Google Shape;81;gac10fef634_0_25:notes"/>
+          <p:cNvSpPr>
+            <a:spLocks noGrp="1" noRot="1" noChangeAspect="1"/>
+          </p:cNvSpPr>
+          <p:nvPr>
+            <p:ph type="sldImg" idx="2"/>
+          </p:nvPr>
+        </p:nvSpPr>
+        <p:spPr>
+          <a:xfrm>
+            <a:off x="381000" y="685800"/>
+            <a:ext cx="6096000" cy="3429000"/>
+          </a:xfrm>
+          <a:custGeom>
+            <a:avLst/>
+            <a:gdLst/>
+            <a:ahLst/>
+            <a:cxnLst/>
+            <a:rect l="l" t="t" r="r" b="b"/>
+            <a:pathLst>
+              <a:path w="120000" h="120000" extrusionOk="0">
+                <a:moveTo>
+                  <a:pt x="0" y="0"/>
+                </a:moveTo>
+                <a:lnTo>
+                  <a:pt x="120000" y="0"/>
+                </a:lnTo>
+                <a:lnTo>
+                  <a:pt x="120000" y="120000"/>
+                </a:lnTo>
+                <a:lnTo>
+                  <a:pt x="0" y="120000"/>
+                </a:lnTo>
+                <a:close/>
+              </a:path>
+            </a:pathLst>
+          </a:custGeom>
+        </p:spPr>
+      </p:sp>
+      <p:sp>
+        <p:nvSpPr>
+          <p:cNvPr id="82" name="Google Shape;82;gac10fef634_0_25:notes"/>
+          <p:cNvSpPr txBox="1">
+            <a:spLocks noGrp="1"/>
+          </p:cNvSpPr>
+          <p:nvPr>
+            <p:ph type="body" idx="1"/>
+          </p:nvPr>
+        </p:nvSpPr>
+        <p:spPr>
+          <a:xfrm>
+            <a:off x="685800" y="4343400"/>
+            <a:ext cx="5486400" cy="4114800"/>
+          </a:xfrm>
+          <a:prstGeom prst="rect">
+            <a:avLst/>
+          </a:prstGeom>
+        </p:spPr>
+        <p:txBody>
+          <a:bodyPr spcFirstLastPara="1" wrap="square" lIns="91425" tIns="91425" rIns="91425" bIns="91425" anchor="t" anchorCtr="0">
+            <a:noAutofit/>
+          </a:bodyPr>
+          <a:lstStyle/>
+          <a:p>
+            <a:pPr marL="0" lvl="0" indent="0" algn="l" rtl="0">
+              <a:spcBef>
+                <a:spcPts val="0"/>
+              </a:spcBef>
+              <a:spcAft>
+                <a:spcPts val="0"/>
+              </a:spcAft>
+              <a:buClr>
+                <a:schemeClr val="dk1"/>
+              </a:buClr>
+              <a:buSzPts val="1100"/>
+              <a:buFont typeface="Arial"/>
+              <a:buNone/>
+            </a:pPr>
+            <a:r>
+              <a:rPr lang="en"/>
+              <a:t>Your version control evidence should go here.  This could be in the form of annotated screenshots which show you you managed this process or you could make a brief screencast explaining how you implemented version control.</a:t>
+            </a:r>
+            <a:endParaRPr/>
+          </a:p>
+          <a:p>
+            <a:pPr marL="0" lvl="0" indent="0" algn="l" rtl="0">
+              <a:spcBef>
+                <a:spcPts val="0"/>
+              </a:spcBef>
+              <a:spcAft>
+                <a:spcPts val="0"/>
+              </a:spcAft>
+              <a:buNone/>
+            </a:pPr>
+            <a:endParaRPr/>
+          </a:p>
+        </p:txBody>
+      </p:sp>
+    </p:spTree>
+    <p:extLst>
+      <p:ext uri="{BB962C8B-B14F-4D97-AF65-F5344CB8AC3E}">
+        <p14:creationId xmlns:p14="http://schemas.microsoft.com/office/powerpoint/2010/main" val="511959585"/>
+      </p:ext>
+    </p:extLst>
+  </p:cSld>
+  <p:clrMapOvr>
+    <a:masterClrMapping/>
+  </p:clrMapOvr>
+</p:notes>
+</file>
+
+<file path=ppt/notesSlides/notesSlide52.xml><?xml version="1.0" encoding="utf-8"?>
+<p:notes xmlns:a="http://schemas.openxmlformats.org/drawingml/2006/main" xmlns:r="http://schemas.openxmlformats.org/officeDocument/2006/relationships" xmlns:p="http://schemas.openxmlformats.org/presentationml/2006/main" showMasterSp="0" showMasterPhAnim="0">
+  <p:cSld>
+    <p:spTree>
+      <p:nvGrpSpPr>
+        <p:cNvPr id="1" name="Shape 80"/>
+        <p:cNvGrpSpPr/>
+        <p:nvPr/>
+      </p:nvGrpSpPr>
+      <p:grpSpPr>
+        <a:xfrm>
+          <a:off x="0" y="0"/>
+          <a:ext cx="0" cy="0"/>
+          <a:chOff x="0" y="0"/>
+          <a:chExt cx="0" cy="0"/>
+        </a:xfrm>
+      </p:grpSpPr>
+      <p:sp>
+        <p:nvSpPr>
+          <p:cNvPr id="81" name="Google Shape;81;gac10fef634_0_25:notes"/>
+          <p:cNvSpPr>
+            <a:spLocks noGrp="1" noRot="1" noChangeAspect="1"/>
+          </p:cNvSpPr>
+          <p:nvPr>
+            <p:ph type="sldImg" idx="2"/>
+          </p:nvPr>
+        </p:nvSpPr>
+        <p:spPr>
+          <a:xfrm>
+            <a:off x="381000" y="685800"/>
+            <a:ext cx="6096000" cy="3429000"/>
+          </a:xfrm>
+          <a:custGeom>
+            <a:avLst/>
+            <a:gdLst/>
+            <a:ahLst/>
+            <a:cxnLst/>
+            <a:rect l="l" t="t" r="r" b="b"/>
+            <a:pathLst>
+              <a:path w="120000" h="120000" extrusionOk="0">
+                <a:moveTo>
+                  <a:pt x="0" y="0"/>
+                </a:moveTo>
+                <a:lnTo>
+                  <a:pt x="120000" y="0"/>
+                </a:lnTo>
+                <a:lnTo>
+                  <a:pt x="120000" y="120000"/>
+                </a:lnTo>
+                <a:lnTo>
+                  <a:pt x="0" y="120000"/>
+                </a:lnTo>
+                <a:close/>
+              </a:path>
+            </a:pathLst>
+          </a:custGeom>
+        </p:spPr>
+      </p:sp>
+      <p:sp>
+        <p:nvSpPr>
+          <p:cNvPr id="82" name="Google Shape;82;gac10fef634_0_25:notes"/>
+          <p:cNvSpPr txBox="1">
+            <a:spLocks noGrp="1"/>
+          </p:cNvSpPr>
+          <p:nvPr>
+            <p:ph type="body" idx="1"/>
+          </p:nvPr>
+        </p:nvSpPr>
+        <p:spPr>
+          <a:xfrm>
+            <a:off x="685800" y="4343400"/>
+            <a:ext cx="5486400" cy="4114800"/>
+          </a:xfrm>
+          <a:prstGeom prst="rect">
+            <a:avLst/>
+          </a:prstGeom>
+        </p:spPr>
+        <p:txBody>
+          <a:bodyPr spcFirstLastPara="1" wrap="square" lIns="91425" tIns="91425" rIns="91425" bIns="91425" anchor="t" anchorCtr="0">
+            <a:noAutofit/>
+          </a:bodyPr>
+          <a:lstStyle/>
+          <a:p>
+            <a:pPr marL="0" lvl="0" indent="0" algn="l" rtl="0">
+              <a:spcBef>
+                <a:spcPts val="0"/>
+              </a:spcBef>
+              <a:spcAft>
+                <a:spcPts val="0"/>
+              </a:spcAft>
+              <a:buClr>
+                <a:schemeClr val="dk1"/>
+              </a:buClr>
+              <a:buSzPts val="1100"/>
+              <a:buFont typeface="Arial"/>
+              <a:buNone/>
+            </a:pPr>
+            <a:r>
+              <a:rPr lang="en"/>
+              <a:t>Your version control evidence should go here.  This could be in the form of annotated screenshots which show you you managed this process or you could make a brief screencast explaining how you implemented version control.</a:t>
+            </a:r>
+            <a:endParaRPr/>
+          </a:p>
+          <a:p>
+            <a:pPr marL="0" lvl="0" indent="0" algn="l" rtl="0">
+              <a:spcBef>
+                <a:spcPts val="0"/>
+              </a:spcBef>
+              <a:spcAft>
+                <a:spcPts val="0"/>
+              </a:spcAft>
+              <a:buNone/>
+            </a:pPr>
+            <a:endParaRPr/>
+          </a:p>
+        </p:txBody>
+      </p:sp>
+    </p:spTree>
+    <p:extLst>
+      <p:ext uri="{BB962C8B-B14F-4D97-AF65-F5344CB8AC3E}">
+        <p14:creationId xmlns:p14="http://schemas.microsoft.com/office/powerpoint/2010/main" val="3815843750"/>
+      </p:ext>
+    </p:extLst>
+  </p:cSld>
+  <p:clrMapOvr>
+    <a:masterClrMapping/>
+  </p:clrMapOvr>
+</p:notes>
+</file>
+
+<file path=ppt/notesSlides/notesSlide53.xml><?xml version="1.0" encoding="utf-8"?>
+<p:notes xmlns:a="http://schemas.openxmlformats.org/drawingml/2006/main" xmlns:r="http://schemas.openxmlformats.org/officeDocument/2006/relationships" xmlns:p="http://schemas.openxmlformats.org/presentationml/2006/main" showMasterSp="0" showMasterPhAnim="0">
+  <p:cSld>
+    <p:spTree>
+      <p:nvGrpSpPr>
+        <p:cNvPr id="1" name="Shape 86"/>
+        <p:cNvGrpSpPr/>
+        <p:nvPr/>
+      </p:nvGrpSpPr>
+      <p:grpSpPr>
+        <a:xfrm>
+          <a:off x="0" y="0"/>
+          <a:ext cx="0" cy="0"/>
+          <a:chOff x="0" y="0"/>
+          <a:chExt cx="0" cy="0"/>
+        </a:xfrm>
+      </p:grpSpPr>
+      <p:sp>
+        <p:nvSpPr>
+          <p:cNvPr id="87" name="Google Shape;87;gac10fef634_0_30:notes"/>
+          <p:cNvSpPr>
+            <a:spLocks noGrp="1" noRot="1" noChangeAspect="1"/>
+          </p:cNvSpPr>
+          <p:nvPr>
+            <p:ph type="sldImg" idx="2"/>
+          </p:nvPr>
+        </p:nvSpPr>
+        <p:spPr>
+          <a:xfrm>
+            <a:off x="381000" y="685800"/>
+            <a:ext cx="6096000" cy="3429000"/>
+          </a:xfrm>
+          <a:custGeom>
+            <a:avLst/>
+            <a:gdLst/>
+            <a:ahLst/>
+            <a:cxnLst/>
+            <a:rect l="l" t="t" r="r" b="b"/>
+            <a:pathLst>
+              <a:path w="120000" h="120000" extrusionOk="0">
+                <a:moveTo>
+                  <a:pt x="0" y="0"/>
+                </a:moveTo>
+                <a:lnTo>
+                  <a:pt x="120000" y="0"/>
+                </a:lnTo>
+                <a:lnTo>
+                  <a:pt x="120000" y="120000"/>
+                </a:lnTo>
+                <a:lnTo>
+                  <a:pt x="0" y="120000"/>
+                </a:lnTo>
+                <a:close/>
+              </a:path>
+            </a:pathLst>
+          </a:custGeom>
+        </p:spPr>
+      </p:sp>
+      <p:sp>
+        <p:nvSpPr>
+          <p:cNvPr id="88" name="Google Shape;88;gac10fef634_0_30:notes"/>
+          <p:cNvSpPr txBox="1">
+            <a:spLocks noGrp="1"/>
+          </p:cNvSpPr>
+          <p:nvPr>
+            <p:ph type="body" idx="1"/>
+          </p:nvPr>
+        </p:nvSpPr>
+        <p:spPr>
+          <a:xfrm>
+            <a:off x="685800" y="4343400"/>
+            <a:ext cx="5486400" cy="4114800"/>
+          </a:xfrm>
+          <a:prstGeom prst="rect">
+            <a:avLst/>
+          </a:prstGeom>
+        </p:spPr>
+        <p:txBody>
+          <a:bodyPr spcFirstLastPara="1" wrap="square" lIns="91425" tIns="91425" rIns="91425" bIns="91425" anchor="t" anchorCtr="0">
+            <a:noAutofit/>
+          </a:bodyPr>
+          <a:lstStyle/>
+          <a:p>
+            <a:pPr marL="0" lvl="0" indent="0" algn="l" rtl="0">
+              <a:spcBef>
+                <a:spcPts val="0"/>
+              </a:spcBef>
+              <a:spcAft>
+                <a:spcPts val="0"/>
+              </a:spcAft>
+              <a:buNone/>
+            </a:pPr>
+            <a:r>
+              <a:rPr lang="en"/>
+              <a:t>Discusses how the information from planning, testing and trialling of components assisted in the development of a high-quality outcome</a:t>
+            </a:r>
             <a:endParaRPr/>
           </a:p>
         </p:txBody>
@@ -23217,7 +23813,7 @@
               <a:rPr lang="en" b="1" dirty="0">
                 <a:latin typeface="Avenir Next LT Pro" panose="020B0504020202020204" pitchFamily="34" charset="0"/>
               </a:rPr>
-              <a:t>Component 6 (Trello screenshot)</a:t>
+              <a:t>Component 6 Version 1 (Trello screenshot)</a:t>
             </a:r>
             <a:endParaRPr b="1" dirty="0">
               <a:latin typeface="Avenir Next LT Pro" panose="020B0504020202020204" pitchFamily="34" charset="0"/>
@@ -23962,6 +24558,36 @@
           </a:p>
         </p:txBody>
       </p:sp>
+      <p:pic>
+        <p:nvPicPr>
+          <p:cNvPr id="6" name="Picture 5">
+            <a:extLst>
+              <a:ext uri="{FF2B5EF4-FFF2-40B4-BE49-F238E27FC236}">
+                <a16:creationId xmlns:a16="http://schemas.microsoft.com/office/drawing/2014/main" id="{CFFBC03F-CAB0-4707-A576-156745020802}"/>
+              </a:ext>
+            </a:extLst>
+          </p:cNvPr>
+          <p:cNvPicPr>
+            <a:picLocks noChangeAspect="1"/>
+          </p:cNvPicPr>
+          <p:nvPr/>
+        </p:nvPicPr>
+        <p:blipFill>
+          <a:blip r:embed="rId4"/>
+          <a:stretch>
+            <a:fillRect/>
+          </a:stretch>
+        </p:blipFill>
+        <p:spPr>
+          <a:xfrm>
+            <a:off x="354329" y="1318675"/>
+            <a:ext cx="8435340" cy="3068757"/>
+          </a:xfrm>
+          <a:prstGeom prst="rect">
+            <a:avLst/>
+          </a:prstGeom>
+        </p:spPr>
+      </p:pic>
     </p:spTree>
     <p:extLst>
       <p:ext uri="{BB962C8B-B14F-4D97-AF65-F5344CB8AC3E}">
@@ -24072,11 +24698,17 @@
         <p:nvGraphicFramePr>
           <p:cNvPr id="79" name="Google Shape;79;p17"/>
           <p:cNvGraphicFramePr/>
-          <p:nvPr/>
+          <p:nvPr>
+            <p:extLst>
+              <p:ext uri="{D42A27DB-BD31-4B8C-83A1-F6EECF244321}">
+                <p14:modId xmlns:p14="http://schemas.microsoft.com/office/powerpoint/2010/main" val="1973063369"/>
+              </p:ext>
+            </p:extLst>
+          </p:nvPr>
         </p:nvGraphicFramePr>
         <p:xfrm>
-          <a:off x="311700" y="3817125"/>
-          <a:ext cx="8520600" cy="1234380"/>
+          <a:off x="311700" y="3369338"/>
+          <a:ext cx="8520600" cy="1569690"/>
         </p:xfrm>
         <a:graphic>
           <a:graphicData uri="http://schemas.openxmlformats.org/drawingml/2006/table">
@@ -24117,12 +24749,12 @@
                         <a:buNone/>
                       </a:pPr>
                       <a:r>
-                        <a:rPr lang="en" sz="1800" b="1" dirty="0">
+                        <a:rPr lang="en" sz="1100" b="1" dirty="0">
                           <a:latin typeface="Avenir Next LT Pro" panose="020B0504020202020204" pitchFamily="34" charset="0"/>
                         </a:rPr>
                         <a:t>Test Case</a:t>
                       </a:r>
-                      <a:endParaRPr sz="1800" b="1" dirty="0">
+                      <a:endParaRPr sz="1100" b="1" dirty="0">
                         <a:latin typeface="Avenir Next LT Pro" panose="020B0504020202020204" pitchFamily="34" charset="0"/>
                       </a:endParaRPr>
                     </a:p>
@@ -24148,12 +24780,12 @@
                         <a:buNone/>
                       </a:pPr>
                       <a:r>
-                        <a:rPr lang="en" sz="1800" b="1">
+                        <a:rPr lang="en" sz="1100" b="1" dirty="0">
                           <a:latin typeface="Avenir Next LT Pro" panose="020B0504020202020204" pitchFamily="34" charset="0"/>
                         </a:rPr>
                         <a:t>Expected Values</a:t>
                       </a:r>
-                      <a:endParaRPr sz="1800" b="1">
+                      <a:endParaRPr sz="1100" b="1" dirty="0">
                         <a:latin typeface="Avenir Next LT Pro" panose="020B0504020202020204" pitchFamily="34" charset="0"/>
                       </a:endParaRPr>
                     </a:p>
@@ -24186,10 +24818,10 @@
                         <a:buNone/>
                       </a:pPr>
                       <a:r>
-                        <a:rPr lang="en-NZ" sz="1300" dirty="0">
+                        <a:rPr lang="en-NZ" sz="1100" dirty="0">
                           <a:latin typeface="Avenir Next LT Pro" panose="020B0504020202020204" pitchFamily="34" charset="0"/>
                         </a:rPr>
-                        <a:t>Enter 5 pizzas</a:t>
+                        <a:t>W</a:t>
                       </a:r>
                     </a:p>
                     <a:p>
@@ -24203,14 +24835,79 @@
                         <a:buNone/>
                       </a:pPr>
                       <a:r>
-                        <a:rPr lang="en-NZ" sz="1300" dirty="0">
+                        <a:rPr lang="en-NZ" sz="1100" dirty="0">
                           <a:latin typeface="Avenir Next LT Pro" panose="020B0504020202020204" pitchFamily="34" charset="0"/>
                         </a:rPr>
-                        <a:t>Entered ‘cat’</a:t>
+                        <a:t>%</a:t>
                       </a:r>
-                      <a:endParaRPr sz="1300" dirty="0">
-                        <a:latin typeface="Avenir Next LT Pro" panose="020B0504020202020204" pitchFamily="34" charset="0"/>
-                      </a:endParaRPr>
+                    </a:p>
+                    <a:p>
+                      <a:pPr marL="0" lvl="0" indent="0" algn="l" rtl="0">
+                        <a:spcBef>
+                          <a:spcPts val="0"/>
+                        </a:spcBef>
+                        <a:spcAft>
+                          <a:spcPts val="0"/>
+                        </a:spcAft>
+                        <a:buNone/>
+                      </a:pPr>
+                      <a:r>
+                        <a:rPr lang="en-NZ" sz="1100" dirty="0">
+                          <a:latin typeface="Avenir Next LT Pro" panose="020B0504020202020204" pitchFamily="34" charset="0"/>
+                        </a:rPr>
+                        <a:t>Space</a:t>
+                      </a:r>
+                    </a:p>
+                    <a:p>
+                      <a:pPr marL="0" lvl="0" indent="0" algn="l" rtl="0">
+                        <a:spcBef>
+                          <a:spcPts val="0"/>
+                        </a:spcBef>
+                        <a:spcAft>
+                          <a:spcPts val="0"/>
+                        </a:spcAft>
+                        <a:buNone/>
+                      </a:pPr>
+                      <a:r>
+                        <a:rPr lang="en-NZ" sz="1100" dirty="0">
+                          <a:latin typeface="Avenir Next LT Pro" panose="020B0504020202020204" pitchFamily="34" charset="0"/>
+                        </a:rPr>
+                        <a:t>0</a:t>
+                      </a:r>
+                    </a:p>
+                    <a:p>
+                      <a:pPr marL="0" lvl="0" indent="0" algn="l" rtl="0">
+                        <a:spcBef>
+                          <a:spcPts val="0"/>
+                        </a:spcBef>
+                        <a:spcAft>
+                          <a:spcPts val="0"/>
+                        </a:spcAft>
+                        <a:buNone/>
+                      </a:pPr>
+                      <a:r>
+                        <a:rPr lang="en-NZ" sz="1100" dirty="0">
+                          <a:latin typeface="Avenir Next LT Pro" panose="020B0504020202020204" pitchFamily="34" charset="0"/>
+                        </a:rPr>
+                        <a:t>13</a:t>
+                      </a:r>
+                    </a:p>
+                    <a:p>
+                      <a:pPr marL="0" lvl="0" indent="0" algn="l" rtl="0">
+                        <a:spcBef>
+                          <a:spcPts val="0"/>
+                        </a:spcBef>
+                        <a:spcAft>
+                          <a:spcPts val="0"/>
+                        </a:spcAft>
+                        <a:buNone/>
+                      </a:pPr>
+                      <a:r>
+                        <a:rPr lang="en-NZ" sz="1100" dirty="0">
+                          <a:latin typeface="Avenir Next LT Pro" panose="020B0504020202020204" pitchFamily="34" charset="0"/>
+                        </a:rPr>
+                        <a:t>12</a:t>
+                      </a:r>
                     </a:p>
                   </a:txBody>
                   <a:tcPr marL="91425" marR="91425" marT="91425" marB="91425"/>
@@ -24230,10 +24927,10 @@
                         <a:buNone/>
                       </a:pPr>
                       <a:r>
-                        <a:rPr lang="en-NZ" sz="1300" dirty="0">
+                        <a:rPr lang="en-NZ" sz="1100" dirty="0">
                           <a:latin typeface="Avenir Next LT Pro" panose="020B0504020202020204" pitchFamily="34" charset="0"/>
                         </a:rPr>
-                        <a:t>Stepped through the menu choice 5 times</a:t>
+                        <a:t>Not a valid number</a:t>
                       </a:r>
                     </a:p>
                     <a:p>
@@ -24247,10 +24944,10 @@
                         <a:buNone/>
                       </a:pPr>
                       <a:r>
-                        <a:rPr lang="en-NZ" sz="1300" dirty="0">
+                        <a:rPr lang="en-NZ" sz="1100" dirty="0">
                           <a:latin typeface="Avenir Next LT Pro" panose="020B0504020202020204" pitchFamily="34" charset="0"/>
                         </a:rPr>
-                        <a:t>Program broke</a:t>
+                        <a:t>Not a valid number</a:t>
                       </a:r>
                     </a:p>
                     <a:p>
@@ -24263,7 +24960,74 @@
                         </a:spcAft>
                         <a:buNone/>
                       </a:pPr>
-                      <a:endParaRPr lang="en-NZ" sz="1300" dirty="0">
+                      <a:r>
+                        <a:rPr lang="en-NZ" sz="1100" dirty="0">
+                          <a:latin typeface="Avenir Next LT Pro" panose="020B0504020202020204" pitchFamily="34" charset="0"/>
+                        </a:rPr>
+                        <a:t>Not a valid number</a:t>
+                      </a:r>
+                    </a:p>
+                    <a:p>
+                      <a:pPr marL="0" lvl="0" indent="0" algn="l" rtl="0">
+                        <a:spcBef>
+                          <a:spcPts val="0"/>
+                        </a:spcBef>
+                        <a:spcAft>
+                          <a:spcPts val="0"/>
+                        </a:spcAft>
+                        <a:buNone/>
+                      </a:pPr>
+                      <a:r>
+                        <a:rPr lang="en-NZ" sz="1100" dirty="0">
+                          <a:latin typeface="Avenir Next LT Pro" panose="020B0504020202020204" pitchFamily="34" charset="0"/>
+                        </a:rPr>
+                        <a:t>Must be between 1 and 12</a:t>
+                      </a:r>
+                    </a:p>
+                    <a:p>
+                      <a:pPr marL="0" marR="0" lvl="0" indent="0" algn="l" defTabSz="914400" rtl="0" eaLnBrk="1" fontAlgn="auto" latinLnBrk="0" hangingPunct="1">
+                        <a:lnSpc>
+                          <a:spcPct val="100000"/>
+                        </a:lnSpc>
+                        <a:spcBef>
+                          <a:spcPts val="0"/>
+                        </a:spcBef>
+                        <a:spcAft>
+                          <a:spcPts val="0"/>
+                        </a:spcAft>
+                        <a:buClr>
+                          <a:srgbClr val="000000"/>
+                        </a:buClr>
+                        <a:buSzTx/>
+                        <a:buFont typeface="Arial"/>
+                        <a:buNone/>
+                        <a:tabLst/>
+                        <a:defRPr/>
+                      </a:pPr>
+                      <a:r>
+                        <a:rPr lang="en-NZ" sz="1100" dirty="0">
+                          <a:latin typeface="Avenir Next LT Pro" panose="020B0504020202020204" pitchFamily="34" charset="0"/>
+                        </a:rPr>
+                        <a:t>Must be between 1 and 12</a:t>
+                      </a:r>
+                    </a:p>
+                    <a:p>
+                      <a:pPr marL="0" lvl="0" indent="0" algn="l" rtl="0">
+                        <a:spcBef>
+                          <a:spcPts val="0"/>
+                        </a:spcBef>
+                        <a:spcAft>
+                          <a:spcPts val="0"/>
+                        </a:spcAft>
+                        <a:buNone/>
+                      </a:pPr>
+                      <a:r>
+                        <a:rPr lang="en-NZ" sz="1100" dirty="0">
+                          <a:latin typeface="Avenir Next LT Pro" panose="020B0504020202020204" pitchFamily="34" charset="0"/>
+                        </a:rPr>
+                        <a:t>Accepted continues to order</a:t>
+                      </a:r>
+                      <a:endParaRPr sz="1100" dirty="0">
                         <a:latin typeface="Avenir Next LT Pro" panose="020B0504020202020204" pitchFamily="34" charset="0"/>
                       </a:endParaRPr>
                     </a:p>
@@ -24282,10 +25046,10 @@
       </p:graphicFrame>
       <p:pic>
         <p:nvPicPr>
-          <p:cNvPr id="9" name="Picture 8">
+          <p:cNvPr id="4" name="Picture 3">
             <a:extLst>
               <a:ext uri="{FF2B5EF4-FFF2-40B4-BE49-F238E27FC236}">
-                <a16:creationId xmlns:a16="http://schemas.microsoft.com/office/drawing/2014/main" id="{D6E43C6E-4179-4808-9D8A-E829823DB0B1}"/>
+                <a16:creationId xmlns:a16="http://schemas.microsoft.com/office/drawing/2014/main" id="{FAEE16BB-0764-4D81-8DED-CF829B968F17}"/>
               </a:ext>
             </a:extLst>
           </p:cNvPr>
@@ -24302,8 +25066,38 @@
         </p:blipFill>
         <p:spPr>
           <a:xfrm>
-            <a:off x="5851784" y="4654745"/>
-            <a:ext cx="2954538" cy="363635"/>
+            <a:off x="311700" y="1126500"/>
+            <a:ext cx="4853224" cy="1669838"/>
+          </a:xfrm>
+          <a:prstGeom prst="rect">
+            <a:avLst/>
+          </a:prstGeom>
+        </p:spPr>
+      </p:pic>
+      <p:pic>
+        <p:nvPicPr>
+          <p:cNvPr id="6" name="Picture 5">
+            <a:extLst>
+              <a:ext uri="{FF2B5EF4-FFF2-40B4-BE49-F238E27FC236}">
+                <a16:creationId xmlns:a16="http://schemas.microsoft.com/office/drawing/2014/main" id="{A3692475-74D6-4797-8B19-BFAD5A38D3B9}"/>
+              </a:ext>
+            </a:extLst>
+          </p:cNvPr>
+          <p:cNvPicPr>
+            <a:picLocks noChangeAspect="1"/>
+          </p:cNvPicPr>
+          <p:nvPr/>
+        </p:nvPicPr>
+        <p:blipFill>
+          <a:blip r:embed="rId5"/>
+          <a:stretch>
+            <a:fillRect/>
+          </a:stretch>
+        </p:blipFill>
+        <p:spPr>
+          <a:xfrm>
+            <a:off x="5395679" y="793931"/>
+            <a:ext cx="3436621" cy="2372906"/>
           </a:xfrm>
           <a:prstGeom prst="rect">
             <a:avLst/>
@@ -24324,6 +25118,1134 @@
 </file>
 
 <file path=ppt/slides/slide52.xml><?xml version="1.0" encoding="utf-8"?>
+<p:sld xmlns:a="http://schemas.openxmlformats.org/drawingml/2006/main" xmlns:r="http://schemas.openxmlformats.org/officeDocument/2006/relationships" xmlns:p="http://schemas.openxmlformats.org/presentationml/2006/main">
+  <p:cSld>
+    <p:bg>
+      <p:bgPr>
+        <a:solidFill>
+          <a:srgbClr val="D9EAD3"/>
+        </a:solidFill>
+        <a:effectLst/>
+      </p:bgPr>
+    </p:bg>
+    <p:spTree>
+      <p:nvGrpSpPr>
+        <p:cNvPr id="1" name="Shape 72"/>
+        <p:cNvGrpSpPr/>
+        <p:nvPr/>
+      </p:nvGrpSpPr>
+      <p:grpSpPr>
+        <a:xfrm>
+          <a:off x="0" y="0"/>
+          <a:ext cx="0" cy="0"/>
+          <a:chOff x="0" y="0"/>
+          <a:chExt cx="0" cy="0"/>
+        </a:xfrm>
+      </p:grpSpPr>
+      <p:pic>
+        <p:nvPicPr>
+          <p:cNvPr id="3" name="Picture 2">
+            <a:extLst>
+              <a:ext uri="{FF2B5EF4-FFF2-40B4-BE49-F238E27FC236}">
+                <a16:creationId xmlns:a16="http://schemas.microsoft.com/office/drawing/2014/main" id="{2839E1E3-811C-4040-AD92-96ACD0E132E3}"/>
+              </a:ext>
+            </a:extLst>
+          </p:cNvPr>
+          <p:cNvPicPr>
+            <a:picLocks noChangeAspect="1"/>
+          </p:cNvPicPr>
+          <p:nvPr/>
+        </p:nvPicPr>
+        <p:blipFill>
+          <a:blip r:embed="rId3"/>
+          <a:stretch>
+            <a:fillRect/>
+          </a:stretch>
+        </p:blipFill>
+        <p:spPr>
+          <a:xfrm>
+            <a:off x="3500" y="0"/>
+            <a:ext cx="9136999" cy="5143500"/>
+          </a:xfrm>
+          <a:prstGeom prst="rect">
+            <a:avLst/>
+          </a:prstGeom>
+        </p:spPr>
+      </p:pic>
+      <p:sp>
+        <p:nvSpPr>
+          <p:cNvPr id="73" name="Google Shape;73;p16"/>
+          <p:cNvSpPr txBox="1">
+            <a:spLocks noGrp="1"/>
+          </p:cNvSpPr>
+          <p:nvPr>
+            <p:ph type="title"/>
+          </p:nvPr>
+        </p:nvSpPr>
+        <p:spPr>
+          <a:xfrm>
+            <a:off x="311700" y="445025"/>
+            <a:ext cx="8520600" cy="572700"/>
+          </a:xfrm>
+          <a:prstGeom prst="rect">
+            <a:avLst/>
+          </a:prstGeom>
+        </p:spPr>
+        <p:txBody>
+          <a:bodyPr spcFirstLastPara="1" wrap="square" lIns="91425" tIns="91425" rIns="91425" bIns="91425" anchor="t" anchorCtr="0">
+            <a:noAutofit/>
+          </a:bodyPr>
+          <a:lstStyle/>
+          <a:p>
+            <a:pPr marL="0" lvl="0" indent="0" algn="l" rtl="0">
+              <a:spcBef>
+                <a:spcPts val="0"/>
+              </a:spcBef>
+              <a:spcAft>
+                <a:spcPts val="0"/>
+              </a:spcAft>
+              <a:buNone/>
+            </a:pPr>
+            <a:r>
+              <a:rPr lang="en" b="1" dirty="0">
+                <a:latin typeface="Avenir Next LT Pro" panose="020B0504020202020204" pitchFamily="34" charset="0"/>
+              </a:rPr>
+              <a:t>Component 6 Version 3 (Trello screenshot – integrated into main app)</a:t>
+            </a:r>
+            <a:endParaRPr b="1" dirty="0">
+              <a:latin typeface="Avenir Next LT Pro" panose="020B0504020202020204" pitchFamily="34" charset="0"/>
+            </a:endParaRPr>
+          </a:p>
+        </p:txBody>
+      </p:sp>
+    </p:spTree>
+    <p:extLst>
+      <p:ext uri="{BB962C8B-B14F-4D97-AF65-F5344CB8AC3E}">
+        <p14:creationId xmlns:p14="http://schemas.microsoft.com/office/powerpoint/2010/main" val="2537653466"/>
+      </p:ext>
+    </p:extLst>
+  </p:cSld>
+  <p:clrMapOvr>
+    <a:masterClrMapping/>
+  </p:clrMapOvr>
+</p:sld>
+</file>
+
+<file path=ppt/slides/slide53.xml><?xml version="1.0" encoding="utf-8"?>
+<p:sld xmlns:a="http://schemas.openxmlformats.org/drawingml/2006/main" xmlns:r="http://schemas.openxmlformats.org/officeDocument/2006/relationships" xmlns:p="http://schemas.openxmlformats.org/presentationml/2006/main">
+  <p:cSld>
+    <p:spTree>
+      <p:nvGrpSpPr>
+        <p:cNvPr id="1" name="Shape 77"/>
+        <p:cNvGrpSpPr/>
+        <p:nvPr/>
+      </p:nvGrpSpPr>
+      <p:grpSpPr>
+        <a:xfrm>
+          <a:off x="0" y="0"/>
+          <a:ext cx="0" cy="0"/>
+          <a:chOff x="0" y="0"/>
+          <a:chExt cx="0" cy="0"/>
+        </a:xfrm>
+      </p:grpSpPr>
+      <p:pic>
+        <p:nvPicPr>
+          <p:cNvPr id="3" name="Picture 2">
+            <a:extLst>
+              <a:ext uri="{FF2B5EF4-FFF2-40B4-BE49-F238E27FC236}">
+                <a16:creationId xmlns:a16="http://schemas.microsoft.com/office/drawing/2014/main" id="{E10C2034-E5C4-4ABB-8872-92315B5651AC}"/>
+              </a:ext>
+            </a:extLst>
+          </p:cNvPr>
+          <p:cNvPicPr>
+            <a:picLocks noChangeAspect="1"/>
+          </p:cNvPicPr>
+          <p:nvPr/>
+        </p:nvPicPr>
+        <p:blipFill>
+          <a:blip r:embed="rId3"/>
+          <a:stretch>
+            <a:fillRect/>
+          </a:stretch>
+        </p:blipFill>
+        <p:spPr>
+          <a:xfrm>
+            <a:off x="0" y="1970"/>
+            <a:ext cx="9144000" cy="5139559"/>
+          </a:xfrm>
+          <a:prstGeom prst="rect">
+            <a:avLst/>
+          </a:prstGeom>
+        </p:spPr>
+      </p:pic>
+      <p:sp>
+        <p:nvSpPr>
+          <p:cNvPr id="78" name="Google Shape;78;p17"/>
+          <p:cNvSpPr txBox="1">
+            <a:spLocks noGrp="1"/>
+          </p:cNvSpPr>
+          <p:nvPr>
+            <p:ph type="title"/>
+          </p:nvPr>
+        </p:nvSpPr>
+        <p:spPr>
+          <a:xfrm>
+            <a:off x="285722" y="181436"/>
+            <a:ext cx="8520600" cy="572700"/>
+          </a:xfrm>
+          <a:prstGeom prst="rect">
+            <a:avLst/>
+          </a:prstGeom>
+        </p:spPr>
+        <p:txBody>
+          <a:bodyPr spcFirstLastPara="1" wrap="square" lIns="91425" tIns="91425" rIns="91425" bIns="91425" anchor="t" anchorCtr="0">
+            <a:noAutofit/>
+          </a:bodyPr>
+          <a:lstStyle/>
+          <a:p>
+            <a:pPr marL="0" lvl="0" indent="0" algn="l" rtl="0">
+              <a:spcBef>
+                <a:spcPts val="0"/>
+              </a:spcBef>
+              <a:spcAft>
+                <a:spcPts val="0"/>
+              </a:spcAft>
+              <a:buNone/>
+            </a:pPr>
+            <a:r>
+              <a:rPr lang="en" b="1" dirty="0">
+                <a:latin typeface="Avenir Next LT Pro" panose="020B0504020202020204" pitchFamily="34" charset="0"/>
+              </a:rPr>
+              <a:t>Component 6 Version 3 - Test Plan (integrated into main app)</a:t>
+            </a:r>
+            <a:endParaRPr b="1" dirty="0">
+              <a:latin typeface="Avenir Next LT Pro" panose="020B0504020202020204" pitchFamily="34" charset="0"/>
+            </a:endParaRPr>
+          </a:p>
+        </p:txBody>
+      </p:sp>
+      <p:graphicFrame>
+        <p:nvGraphicFramePr>
+          <p:cNvPr id="79" name="Google Shape;79;p17"/>
+          <p:cNvGraphicFramePr/>
+          <p:nvPr/>
+        </p:nvGraphicFramePr>
+        <p:xfrm>
+          <a:off x="311700" y="3369338"/>
+          <a:ext cx="8520600" cy="1569690"/>
+        </p:xfrm>
+        <a:graphic>
+          <a:graphicData uri="http://schemas.openxmlformats.org/drawingml/2006/table">
+            <a:tbl>
+              <a:tblPr>
+                <a:noFill/>
+                <a:tableStyleId>{E1099E06-0E6B-448D-9D27-60429F06E6F4}</a:tableStyleId>
+              </a:tblPr>
+              <a:tblGrid>
+                <a:gridCol w="4260300">
+                  <a:extLst>
+                    <a:ext uri="{9D8B030D-6E8A-4147-A177-3AD203B41FA5}">
+                      <a16:colId xmlns:a16="http://schemas.microsoft.com/office/drawing/2014/main" val="20000"/>
+                    </a:ext>
+                  </a:extLst>
+                </a:gridCol>
+                <a:gridCol w="4260300">
+                  <a:extLst>
+                    <a:ext uri="{9D8B030D-6E8A-4147-A177-3AD203B41FA5}">
+                      <a16:colId xmlns:a16="http://schemas.microsoft.com/office/drawing/2014/main" val="20001"/>
+                    </a:ext>
+                  </a:extLst>
+                </a:gridCol>
+              </a:tblGrid>
+              <a:tr h="381000">
+                <a:tc>
+                  <a:txBody>
+                    <a:bodyPr/>
+                    <a:lstStyle/>
+                    <a:p>
+                      <a:pPr marL="0" lvl="0" indent="0" algn="l" rtl="0">
+                        <a:spcBef>
+                          <a:spcPts val="0"/>
+                        </a:spcBef>
+                        <a:spcAft>
+                          <a:spcPts val="0"/>
+                        </a:spcAft>
+                        <a:buNone/>
+                      </a:pPr>
+                      <a:r>
+                        <a:rPr lang="en" sz="1100" b="1" dirty="0">
+                          <a:latin typeface="Avenir Next LT Pro" panose="020B0504020202020204" pitchFamily="34" charset="0"/>
+                        </a:rPr>
+                        <a:t>Test Case</a:t>
+                      </a:r>
+                      <a:endParaRPr sz="1100" b="1" dirty="0">
+                        <a:latin typeface="Avenir Next LT Pro" panose="020B0504020202020204" pitchFamily="34" charset="0"/>
+                      </a:endParaRPr>
+                    </a:p>
+                  </a:txBody>
+                  <a:tcPr marL="91425" marR="91425" marT="91425" marB="91425">
+                    <a:solidFill>
+                      <a:srgbClr val="CCCCCC"/>
+                    </a:solidFill>
+                  </a:tcPr>
+                </a:tc>
+                <a:tc>
+                  <a:txBody>
+                    <a:bodyPr/>
+                    <a:lstStyle/>
+                    <a:p>
+                      <a:pPr marL="0" lvl="0" indent="0" algn="l" rtl="0">
+                        <a:spcBef>
+                          <a:spcPts val="0"/>
+                        </a:spcBef>
+                        <a:spcAft>
+                          <a:spcPts val="0"/>
+                        </a:spcAft>
+                        <a:buNone/>
+                      </a:pPr>
+                      <a:r>
+                        <a:rPr lang="en" sz="1100" b="1" dirty="0">
+                          <a:latin typeface="Avenir Next LT Pro" panose="020B0504020202020204" pitchFamily="34" charset="0"/>
+                        </a:rPr>
+                        <a:t>Expected Values</a:t>
+                      </a:r>
+                      <a:endParaRPr sz="1100" b="1" dirty="0">
+                        <a:latin typeface="Avenir Next LT Pro" panose="020B0504020202020204" pitchFamily="34" charset="0"/>
+                      </a:endParaRPr>
+                    </a:p>
+                  </a:txBody>
+                  <a:tcPr marL="91425" marR="91425" marT="91425" marB="91425">
+                    <a:solidFill>
+                      <a:srgbClr val="CCCCCC"/>
+                    </a:solidFill>
+                  </a:tcPr>
+                </a:tc>
+                <a:extLst>
+                  <a:ext uri="{0D108BD9-81ED-4DB2-BD59-A6C34878D82A}">
+                    <a16:rowId xmlns:a16="http://schemas.microsoft.com/office/drawing/2014/main" val="10000"/>
+                  </a:ext>
+                </a:extLst>
+              </a:tr>
+              <a:tr h="396200">
+                <a:tc>
+                  <a:txBody>
+                    <a:bodyPr/>
+                    <a:lstStyle/>
+                    <a:p>
+                      <a:pPr marL="0" lvl="0" indent="0" algn="l" rtl="0">
+                        <a:spcBef>
+                          <a:spcPts val="0"/>
+                        </a:spcBef>
+                        <a:spcAft>
+                          <a:spcPts val="0"/>
+                        </a:spcAft>
+                        <a:buNone/>
+                      </a:pPr>
+                      <a:r>
+                        <a:rPr lang="en-NZ" sz="1100" dirty="0">
+                          <a:latin typeface="Avenir Next LT Pro" panose="020B0504020202020204" pitchFamily="34" charset="0"/>
+                        </a:rPr>
+                        <a:t>W</a:t>
+                      </a:r>
+                    </a:p>
+                    <a:p>
+                      <a:pPr marL="0" lvl="0" indent="0" algn="l" rtl="0">
+                        <a:spcBef>
+                          <a:spcPts val="0"/>
+                        </a:spcBef>
+                        <a:spcAft>
+                          <a:spcPts val="0"/>
+                        </a:spcAft>
+                        <a:buNone/>
+                      </a:pPr>
+                      <a:r>
+                        <a:rPr lang="en-NZ" sz="1100" dirty="0">
+                          <a:latin typeface="Avenir Next LT Pro" panose="020B0504020202020204" pitchFamily="34" charset="0"/>
+                        </a:rPr>
+                        <a:t>%</a:t>
+                      </a:r>
+                    </a:p>
+                    <a:p>
+                      <a:pPr marL="0" lvl="0" indent="0" algn="l" rtl="0">
+                        <a:spcBef>
+                          <a:spcPts val="0"/>
+                        </a:spcBef>
+                        <a:spcAft>
+                          <a:spcPts val="0"/>
+                        </a:spcAft>
+                        <a:buNone/>
+                      </a:pPr>
+                      <a:r>
+                        <a:rPr lang="en-NZ" sz="1100" dirty="0">
+                          <a:latin typeface="Avenir Next LT Pro" panose="020B0504020202020204" pitchFamily="34" charset="0"/>
+                        </a:rPr>
+                        <a:t>Space</a:t>
+                      </a:r>
+                    </a:p>
+                    <a:p>
+                      <a:pPr marL="0" lvl="0" indent="0" algn="l" rtl="0">
+                        <a:spcBef>
+                          <a:spcPts val="0"/>
+                        </a:spcBef>
+                        <a:spcAft>
+                          <a:spcPts val="0"/>
+                        </a:spcAft>
+                        <a:buNone/>
+                      </a:pPr>
+                      <a:r>
+                        <a:rPr lang="en-NZ" sz="1100" dirty="0">
+                          <a:latin typeface="Avenir Next LT Pro" panose="020B0504020202020204" pitchFamily="34" charset="0"/>
+                        </a:rPr>
+                        <a:t>0</a:t>
+                      </a:r>
+                    </a:p>
+                    <a:p>
+                      <a:pPr marL="0" lvl="0" indent="0" algn="l" rtl="0">
+                        <a:spcBef>
+                          <a:spcPts val="0"/>
+                        </a:spcBef>
+                        <a:spcAft>
+                          <a:spcPts val="0"/>
+                        </a:spcAft>
+                        <a:buNone/>
+                      </a:pPr>
+                      <a:r>
+                        <a:rPr lang="en-NZ" sz="1100" dirty="0">
+                          <a:latin typeface="Avenir Next LT Pro" panose="020B0504020202020204" pitchFamily="34" charset="0"/>
+                        </a:rPr>
+                        <a:t>13</a:t>
+                      </a:r>
+                    </a:p>
+                    <a:p>
+                      <a:pPr marL="0" lvl="0" indent="0" algn="l" rtl="0">
+                        <a:spcBef>
+                          <a:spcPts val="0"/>
+                        </a:spcBef>
+                        <a:spcAft>
+                          <a:spcPts val="0"/>
+                        </a:spcAft>
+                        <a:buNone/>
+                      </a:pPr>
+                      <a:r>
+                        <a:rPr lang="en-NZ" sz="1100" dirty="0">
+                          <a:latin typeface="Avenir Next LT Pro" panose="020B0504020202020204" pitchFamily="34" charset="0"/>
+                        </a:rPr>
+                        <a:t>12</a:t>
+                      </a:r>
+                    </a:p>
+                  </a:txBody>
+                  <a:tcPr marL="91425" marR="91425" marT="91425" marB="91425"/>
+                </a:tc>
+                <a:tc>
+                  <a:txBody>
+                    <a:bodyPr/>
+                    <a:lstStyle/>
+                    <a:p>
+                      <a:pPr marL="0" lvl="0" indent="0" algn="l" rtl="0">
+                        <a:spcBef>
+                          <a:spcPts val="0"/>
+                        </a:spcBef>
+                        <a:spcAft>
+                          <a:spcPts val="0"/>
+                        </a:spcAft>
+                        <a:buNone/>
+                      </a:pPr>
+                      <a:r>
+                        <a:rPr lang="en-NZ" sz="1100" dirty="0">
+                          <a:latin typeface="Avenir Next LT Pro" panose="020B0504020202020204" pitchFamily="34" charset="0"/>
+                        </a:rPr>
+                        <a:t>Not a valid number</a:t>
+                      </a:r>
+                    </a:p>
+                    <a:p>
+                      <a:pPr marL="0" lvl="0" indent="0" algn="l" rtl="0">
+                        <a:spcBef>
+                          <a:spcPts val="0"/>
+                        </a:spcBef>
+                        <a:spcAft>
+                          <a:spcPts val="0"/>
+                        </a:spcAft>
+                        <a:buNone/>
+                      </a:pPr>
+                      <a:r>
+                        <a:rPr lang="en-NZ" sz="1100" dirty="0">
+                          <a:latin typeface="Avenir Next LT Pro" panose="020B0504020202020204" pitchFamily="34" charset="0"/>
+                        </a:rPr>
+                        <a:t>Not a valid number</a:t>
+                      </a:r>
+                    </a:p>
+                    <a:p>
+                      <a:pPr marL="0" lvl="0" indent="0" algn="l" rtl="0">
+                        <a:spcBef>
+                          <a:spcPts val="0"/>
+                        </a:spcBef>
+                        <a:spcAft>
+                          <a:spcPts val="0"/>
+                        </a:spcAft>
+                        <a:buNone/>
+                      </a:pPr>
+                      <a:r>
+                        <a:rPr lang="en-NZ" sz="1100" dirty="0">
+                          <a:latin typeface="Avenir Next LT Pro" panose="020B0504020202020204" pitchFamily="34" charset="0"/>
+                        </a:rPr>
+                        <a:t>Not a valid number</a:t>
+                      </a:r>
+                    </a:p>
+                    <a:p>
+                      <a:pPr marL="0" lvl="0" indent="0" algn="l" rtl="0">
+                        <a:spcBef>
+                          <a:spcPts val="0"/>
+                        </a:spcBef>
+                        <a:spcAft>
+                          <a:spcPts val="0"/>
+                        </a:spcAft>
+                        <a:buNone/>
+                      </a:pPr>
+                      <a:r>
+                        <a:rPr lang="en-NZ" sz="1100" dirty="0">
+                          <a:latin typeface="Avenir Next LT Pro" panose="020B0504020202020204" pitchFamily="34" charset="0"/>
+                        </a:rPr>
+                        <a:t>Must be between 1 and 12</a:t>
+                      </a:r>
+                    </a:p>
+                    <a:p>
+                      <a:pPr marL="0" marR="0" lvl="0" indent="0" algn="l" defTabSz="914400" rtl="0" eaLnBrk="1" fontAlgn="auto" latinLnBrk="0" hangingPunct="1">
+                        <a:lnSpc>
+                          <a:spcPct val="100000"/>
+                        </a:lnSpc>
+                        <a:spcBef>
+                          <a:spcPts val="0"/>
+                        </a:spcBef>
+                        <a:spcAft>
+                          <a:spcPts val="0"/>
+                        </a:spcAft>
+                        <a:buClr>
+                          <a:srgbClr val="000000"/>
+                        </a:buClr>
+                        <a:buSzTx/>
+                        <a:buFont typeface="Arial"/>
+                        <a:buNone/>
+                        <a:tabLst/>
+                        <a:defRPr/>
+                      </a:pPr>
+                      <a:r>
+                        <a:rPr lang="en-NZ" sz="1100" dirty="0">
+                          <a:latin typeface="Avenir Next LT Pro" panose="020B0504020202020204" pitchFamily="34" charset="0"/>
+                        </a:rPr>
+                        <a:t>Must be between 1 and 12</a:t>
+                      </a:r>
+                    </a:p>
+                    <a:p>
+                      <a:pPr marL="0" lvl="0" indent="0" algn="l" rtl="0">
+                        <a:spcBef>
+                          <a:spcPts val="0"/>
+                        </a:spcBef>
+                        <a:spcAft>
+                          <a:spcPts val="0"/>
+                        </a:spcAft>
+                        <a:buNone/>
+                      </a:pPr>
+                      <a:r>
+                        <a:rPr lang="en-NZ" sz="1100" dirty="0">
+                          <a:latin typeface="Avenir Next LT Pro" panose="020B0504020202020204" pitchFamily="34" charset="0"/>
+                        </a:rPr>
+                        <a:t>Accepted continues to order</a:t>
+                      </a:r>
+                      <a:endParaRPr sz="1100" dirty="0">
+                        <a:latin typeface="Avenir Next LT Pro" panose="020B0504020202020204" pitchFamily="34" charset="0"/>
+                      </a:endParaRPr>
+                    </a:p>
+                  </a:txBody>
+                  <a:tcPr marL="91425" marR="91425" marT="91425" marB="91425"/>
+                </a:tc>
+                <a:extLst>
+                  <a:ext uri="{0D108BD9-81ED-4DB2-BD59-A6C34878D82A}">
+                    <a16:rowId xmlns:a16="http://schemas.microsoft.com/office/drawing/2014/main" val="10001"/>
+                  </a:ext>
+                </a:extLst>
+              </a:tr>
+            </a:tbl>
+          </a:graphicData>
+        </a:graphic>
+      </p:graphicFrame>
+    </p:spTree>
+    <p:extLst>
+      <p:ext uri="{BB962C8B-B14F-4D97-AF65-F5344CB8AC3E}">
+        <p14:creationId xmlns:p14="http://schemas.microsoft.com/office/powerpoint/2010/main" val="3778727109"/>
+      </p:ext>
+    </p:extLst>
+  </p:cSld>
+  <p:clrMapOvr>
+    <a:masterClrMapping/>
+  </p:clrMapOvr>
+</p:sld>
+</file>
+
+<file path=ppt/slides/slide54.xml><?xml version="1.0" encoding="utf-8"?>
+<p:sld xmlns:a="http://schemas.openxmlformats.org/drawingml/2006/main" xmlns:r="http://schemas.openxmlformats.org/officeDocument/2006/relationships" xmlns:p="http://schemas.openxmlformats.org/presentationml/2006/main">
+  <p:cSld>
+    <p:bg>
+      <p:bgPr>
+        <a:solidFill>
+          <a:srgbClr val="D9EAD3"/>
+        </a:solidFill>
+        <a:effectLst/>
+      </p:bgPr>
+    </p:bg>
+    <p:spTree>
+      <p:nvGrpSpPr>
+        <p:cNvPr id="1" name="Shape 72"/>
+        <p:cNvGrpSpPr/>
+        <p:nvPr/>
+      </p:nvGrpSpPr>
+      <p:grpSpPr>
+        <a:xfrm>
+          <a:off x="0" y="0"/>
+          <a:ext cx="0" cy="0"/>
+          <a:chOff x="0" y="0"/>
+          <a:chExt cx="0" cy="0"/>
+        </a:xfrm>
+      </p:grpSpPr>
+      <p:pic>
+        <p:nvPicPr>
+          <p:cNvPr id="3" name="Picture 2">
+            <a:extLst>
+              <a:ext uri="{FF2B5EF4-FFF2-40B4-BE49-F238E27FC236}">
+                <a16:creationId xmlns:a16="http://schemas.microsoft.com/office/drawing/2014/main" id="{2839E1E3-811C-4040-AD92-96ACD0E132E3}"/>
+              </a:ext>
+            </a:extLst>
+          </p:cNvPr>
+          <p:cNvPicPr>
+            <a:picLocks noChangeAspect="1"/>
+          </p:cNvPicPr>
+          <p:nvPr/>
+        </p:nvPicPr>
+        <p:blipFill>
+          <a:blip r:embed="rId3"/>
+          <a:stretch>
+            <a:fillRect/>
+          </a:stretch>
+        </p:blipFill>
+        <p:spPr>
+          <a:xfrm>
+            <a:off x="3500" y="0"/>
+            <a:ext cx="9136999" cy="5143500"/>
+          </a:xfrm>
+          <a:prstGeom prst="rect">
+            <a:avLst/>
+          </a:prstGeom>
+        </p:spPr>
+      </p:pic>
+      <p:sp>
+        <p:nvSpPr>
+          <p:cNvPr id="73" name="Google Shape;73;p16"/>
+          <p:cNvSpPr txBox="1">
+            <a:spLocks noGrp="1"/>
+          </p:cNvSpPr>
+          <p:nvPr>
+            <p:ph type="title"/>
+          </p:nvPr>
+        </p:nvSpPr>
+        <p:spPr>
+          <a:xfrm>
+            <a:off x="311700" y="445025"/>
+            <a:ext cx="8520600" cy="572700"/>
+          </a:xfrm>
+          <a:prstGeom prst="rect">
+            <a:avLst/>
+          </a:prstGeom>
+        </p:spPr>
+        <p:txBody>
+          <a:bodyPr spcFirstLastPara="1" wrap="square" lIns="91425" tIns="91425" rIns="91425" bIns="91425" anchor="t" anchorCtr="0">
+            <a:noAutofit/>
+          </a:bodyPr>
+          <a:lstStyle/>
+          <a:p>
+            <a:pPr marL="0" lvl="0" indent="0" algn="l" rtl="0">
+              <a:spcBef>
+                <a:spcPts val="0"/>
+              </a:spcBef>
+              <a:spcAft>
+                <a:spcPts val="0"/>
+              </a:spcAft>
+              <a:buNone/>
+            </a:pPr>
+            <a:r>
+              <a:rPr lang="en" b="1" dirty="0">
+                <a:latin typeface="Avenir Next LT Pro" panose="020B0504020202020204" pitchFamily="34" charset="0"/>
+              </a:rPr>
+              <a:t>Component 6 Version 3 (Trello screenshot)</a:t>
+            </a:r>
+            <a:endParaRPr b="1" dirty="0">
+              <a:latin typeface="Avenir Next LT Pro" panose="020B0504020202020204" pitchFamily="34" charset="0"/>
+            </a:endParaRPr>
+          </a:p>
+        </p:txBody>
+      </p:sp>
+    </p:spTree>
+    <p:extLst>
+      <p:ext uri="{BB962C8B-B14F-4D97-AF65-F5344CB8AC3E}">
+        <p14:creationId xmlns:p14="http://schemas.microsoft.com/office/powerpoint/2010/main" val="3618029425"/>
+      </p:ext>
+    </p:extLst>
+  </p:cSld>
+  <p:clrMapOvr>
+    <a:masterClrMapping/>
+  </p:clrMapOvr>
+</p:sld>
+</file>
+
+<file path=ppt/slides/slide55.xml><?xml version="1.0" encoding="utf-8"?>
+<p:sld xmlns:a="http://schemas.openxmlformats.org/drawingml/2006/main" xmlns:r="http://schemas.openxmlformats.org/officeDocument/2006/relationships" xmlns:p="http://schemas.openxmlformats.org/presentationml/2006/main">
+  <p:cSld>
+    <p:spTree>
+      <p:nvGrpSpPr>
+        <p:cNvPr id="1" name="Shape 77"/>
+        <p:cNvGrpSpPr/>
+        <p:nvPr/>
+      </p:nvGrpSpPr>
+      <p:grpSpPr>
+        <a:xfrm>
+          <a:off x="0" y="0"/>
+          <a:ext cx="0" cy="0"/>
+          <a:chOff x="0" y="0"/>
+          <a:chExt cx="0" cy="0"/>
+        </a:xfrm>
+      </p:grpSpPr>
+      <p:pic>
+        <p:nvPicPr>
+          <p:cNvPr id="3" name="Picture 2">
+            <a:extLst>
+              <a:ext uri="{FF2B5EF4-FFF2-40B4-BE49-F238E27FC236}">
+                <a16:creationId xmlns:a16="http://schemas.microsoft.com/office/drawing/2014/main" id="{E10C2034-E5C4-4ABB-8872-92315B5651AC}"/>
+              </a:ext>
+            </a:extLst>
+          </p:cNvPr>
+          <p:cNvPicPr>
+            <a:picLocks noChangeAspect="1"/>
+          </p:cNvPicPr>
+          <p:nvPr/>
+        </p:nvPicPr>
+        <p:blipFill>
+          <a:blip r:embed="rId3"/>
+          <a:stretch>
+            <a:fillRect/>
+          </a:stretch>
+        </p:blipFill>
+        <p:spPr>
+          <a:xfrm>
+            <a:off x="0" y="1970"/>
+            <a:ext cx="9144000" cy="5139559"/>
+          </a:xfrm>
+          <a:prstGeom prst="rect">
+            <a:avLst/>
+          </a:prstGeom>
+        </p:spPr>
+      </p:pic>
+      <p:sp>
+        <p:nvSpPr>
+          <p:cNvPr id="78" name="Google Shape;78;p17"/>
+          <p:cNvSpPr txBox="1">
+            <a:spLocks noGrp="1"/>
+          </p:cNvSpPr>
+          <p:nvPr>
+            <p:ph type="title"/>
+          </p:nvPr>
+        </p:nvSpPr>
+        <p:spPr>
+          <a:xfrm>
+            <a:off x="285722" y="181436"/>
+            <a:ext cx="8520600" cy="572700"/>
+          </a:xfrm>
+          <a:prstGeom prst="rect">
+            <a:avLst/>
+          </a:prstGeom>
+        </p:spPr>
+        <p:txBody>
+          <a:bodyPr spcFirstLastPara="1" wrap="square" lIns="91425" tIns="91425" rIns="91425" bIns="91425" anchor="t" anchorCtr="0">
+            <a:noAutofit/>
+          </a:bodyPr>
+          <a:lstStyle/>
+          <a:p>
+            <a:pPr marL="0" lvl="0" indent="0" algn="l" rtl="0">
+              <a:spcBef>
+                <a:spcPts val="0"/>
+              </a:spcBef>
+              <a:spcAft>
+                <a:spcPts val="0"/>
+              </a:spcAft>
+              <a:buNone/>
+            </a:pPr>
+            <a:r>
+              <a:rPr lang="en" b="1" dirty="0">
+                <a:latin typeface="Avenir Next LT Pro" panose="020B0504020202020204" pitchFamily="34" charset="0"/>
+              </a:rPr>
+              <a:t>Component 6 Version 3 - Test Plan</a:t>
+            </a:r>
+            <a:endParaRPr b="1" dirty="0">
+              <a:latin typeface="Avenir Next LT Pro" panose="020B0504020202020204" pitchFamily="34" charset="0"/>
+            </a:endParaRPr>
+          </a:p>
+        </p:txBody>
+      </p:sp>
+      <p:graphicFrame>
+        <p:nvGraphicFramePr>
+          <p:cNvPr id="79" name="Google Shape;79;p17"/>
+          <p:cNvGraphicFramePr/>
+          <p:nvPr/>
+        </p:nvGraphicFramePr>
+        <p:xfrm>
+          <a:off x="311700" y="3369338"/>
+          <a:ext cx="8520600" cy="1569690"/>
+        </p:xfrm>
+        <a:graphic>
+          <a:graphicData uri="http://schemas.openxmlformats.org/drawingml/2006/table">
+            <a:tbl>
+              <a:tblPr>
+                <a:noFill/>
+                <a:tableStyleId>{E1099E06-0E6B-448D-9D27-60429F06E6F4}</a:tableStyleId>
+              </a:tblPr>
+              <a:tblGrid>
+                <a:gridCol w="4260300">
+                  <a:extLst>
+                    <a:ext uri="{9D8B030D-6E8A-4147-A177-3AD203B41FA5}">
+                      <a16:colId xmlns:a16="http://schemas.microsoft.com/office/drawing/2014/main" val="20000"/>
+                    </a:ext>
+                  </a:extLst>
+                </a:gridCol>
+                <a:gridCol w="4260300">
+                  <a:extLst>
+                    <a:ext uri="{9D8B030D-6E8A-4147-A177-3AD203B41FA5}">
+                      <a16:colId xmlns:a16="http://schemas.microsoft.com/office/drawing/2014/main" val="20001"/>
+                    </a:ext>
+                  </a:extLst>
+                </a:gridCol>
+              </a:tblGrid>
+              <a:tr h="381000">
+                <a:tc>
+                  <a:txBody>
+                    <a:bodyPr/>
+                    <a:lstStyle/>
+                    <a:p>
+                      <a:pPr marL="0" lvl="0" indent="0" algn="l" rtl="0">
+                        <a:spcBef>
+                          <a:spcPts val="0"/>
+                        </a:spcBef>
+                        <a:spcAft>
+                          <a:spcPts val="0"/>
+                        </a:spcAft>
+                        <a:buNone/>
+                      </a:pPr>
+                      <a:r>
+                        <a:rPr lang="en" sz="1100" b="1" dirty="0">
+                          <a:latin typeface="Avenir Next LT Pro" panose="020B0504020202020204" pitchFamily="34" charset="0"/>
+                        </a:rPr>
+                        <a:t>Test Case</a:t>
+                      </a:r>
+                      <a:endParaRPr sz="1100" b="1" dirty="0">
+                        <a:latin typeface="Avenir Next LT Pro" panose="020B0504020202020204" pitchFamily="34" charset="0"/>
+                      </a:endParaRPr>
+                    </a:p>
+                  </a:txBody>
+                  <a:tcPr marL="91425" marR="91425" marT="91425" marB="91425">
+                    <a:solidFill>
+                      <a:srgbClr val="CCCCCC"/>
+                    </a:solidFill>
+                  </a:tcPr>
+                </a:tc>
+                <a:tc>
+                  <a:txBody>
+                    <a:bodyPr/>
+                    <a:lstStyle/>
+                    <a:p>
+                      <a:pPr marL="0" lvl="0" indent="0" algn="l" rtl="0">
+                        <a:spcBef>
+                          <a:spcPts val="0"/>
+                        </a:spcBef>
+                        <a:spcAft>
+                          <a:spcPts val="0"/>
+                        </a:spcAft>
+                        <a:buNone/>
+                      </a:pPr>
+                      <a:r>
+                        <a:rPr lang="en" sz="1100" b="1" dirty="0">
+                          <a:latin typeface="Avenir Next LT Pro" panose="020B0504020202020204" pitchFamily="34" charset="0"/>
+                        </a:rPr>
+                        <a:t>Expected Values</a:t>
+                      </a:r>
+                      <a:endParaRPr sz="1100" b="1" dirty="0">
+                        <a:latin typeface="Avenir Next LT Pro" panose="020B0504020202020204" pitchFamily="34" charset="0"/>
+                      </a:endParaRPr>
+                    </a:p>
+                  </a:txBody>
+                  <a:tcPr marL="91425" marR="91425" marT="91425" marB="91425">
+                    <a:solidFill>
+                      <a:srgbClr val="CCCCCC"/>
+                    </a:solidFill>
+                  </a:tcPr>
+                </a:tc>
+                <a:extLst>
+                  <a:ext uri="{0D108BD9-81ED-4DB2-BD59-A6C34878D82A}">
+                    <a16:rowId xmlns:a16="http://schemas.microsoft.com/office/drawing/2014/main" val="10000"/>
+                  </a:ext>
+                </a:extLst>
+              </a:tr>
+              <a:tr h="396200">
+                <a:tc>
+                  <a:txBody>
+                    <a:bodyPr/>
+                    <a:lstStyle/>
+                    <a:p>
+                      <a:pPr marL="0" lvl="0" indent="0" algn="l" rtl="0">
+                        <a:spcBef>
+                          <a:spcPts val="0"/>
+                        </a:spcBef>
+                        <a:spcAft>
+                          <a:spcPts val="0"/>
+                        </a:spcAft>
+                        <a:buNone/>
+                      </a:pPr>
+                      <a:r>
+                        <a:rPr lang="en-NZ" sz="1100" dirty="0">
+                          <a:latin typeface="Avenir Next LT Pro" panose="020B0504020202020204" pitchFamily="34" charset="0"/>
+                        </a:rPr>
+                        <a:t>W</a:t>
+                      </a:r>
+                    </a:p>
+                    <a:p>
+                      <a:pPr marL="0" lvl="0" indent="0" algn="l" rtl="0">
+                        <a:spcBef>
+                          <a:spcPts val="0"/>
+                        </a:spcBef>
+                        <a:spcAft>
+                          <a:spcPts val="0"/>
+                        </a:spcAft>
+                        <a:buNone/>
+                      </a:pPr>
+                      <a:r>
+                        <a:rPr lang="en-NZ" sz="1100" dirty="0">
+                          <a:latin typeface="Avenir Next LT Pro" panose="020B0504020202020204" pitchFamily="34" charset="0"/>
+                        </a:rPr>
+                        <a:t>%</a:t>
+                      </a:r>
+                    </a:p>
+                    <a:p>
+                      <a:pPr marL="0" lvl="0" indent="0" algn="l" rtl="0">
+                        <a:spcBef>
+                          <a:spcPts val="0"/>
+                        </a:spcBef>
+                        <a:spcAft>
+                          <a:spcPts val="0"/>
+                        </a:spcAft>
+                        <a:buNone/>
+                      </a:pPr>
+                      <a:r>
+                        <a:rPr lang="en-NZ" sz="1100" dirty="0">
+                          <a:latin typeface="Avenir Next LT Pro" panose="020B0504020202020204" pitchFamily="34" charset="0"/>
+                        </a:rPr>
+                        <a:t>Space</a:t>
+                      </a:r>
+                    </a:p>
+                    <a:p>
+                      <a:pPr marL="0" lvl="0" indent="0" algn="l" rtl="0">
+                        <a:spcBef>
+                          <a:spcPts val="0"/>
+                        </a:spcBef>
+                        <a:spcAft>
+                          <a:spcPts val="0"/>
+                        </a:spcAft>
+                        <a:buNone/>
+                      </a:pPr>
+                      <a:r>
+                        <a:rPr lang="en-NZ" sz="1100" dirty="0">
+                          <a:latin typeface="Avenir Next LT Pro" panose="020B0504020202020204" pitchFamily="34" charset="0"/>
+                        </a:rPr>
+                        <a:t>0</a:t>
+                      </a:r>
+                    </a:p>
+                    <a:p>
+                      <a:pPr marL="0" lvl="0" indent="0" algn="l" rtl="0">
+                        <a:spcBef>
+                          <a:spcPts val="0"/>
+                        </a:spcBef>
+                        <a:spcAft>
+                          <a:spcPts val="0"/>
+                        </a:spcAft>
+                        <a:buNone/>
+                      </a:pPr>
+                      <a:r>
+                        <a:rPr lang="en-NZ" sz="1100" dirty="0">
+                          <a:latin typeface="Avenir Next LT Pro" panose="020B0504020202020204" pitchFamily="34" charset="0"/>
+                        </a:rPr>
+                        <a:t>13</a:t>
+                      </a:r>
+                    </a:p>
+                    <a:p>
+                      <a:pPr marL="0" lvl="0" indent="0" algn="l" rtl="0">
+                        <a:spcBef>
+                          <a:spcPts val="0"/>
+                        </a:spcBef>
+                        <a:spcAft>
+                          <a:spcPts val="0"/>
+                        </a:spcAft>
+                        <a:buNone/>
+                      </a:pPr>
+                      <a:r>
+                        <a:rPr lang="en-NZ" sz="1100" dirty="0">
+                          <a:latin typeface="Avenir Next LT Pro" panose="020B0504020202020204" pitchFamily="34" charset="0"/>
+                        </a:rPr>
+                        <a:t>12</a:t>
+                      </a:r>
+                    </a:p>
+                  </a:txBody>
+                  <a:tcPr marL="91425" marR="91425" marT="91425" marB="91425"/>
+                </a:tc>
+                <a:tc>
+                  <a:txBody>
+                    <a:bodyPr/>
+                    <a:lstStyle/>
+                    <a:p>
+                      <a:pPr marL="0" lvl="0" indent="0" algn="l" rtl="0">
+                        <a:spcBef>
+                          <a:spcPts val="0"/>
+                        </a:spcBef>
+                        <a:spcAft>
+                          <a:spcPts val="0"/>
+                        </a:spcAft>
+                        <a:buNone/>
+                      </a:pPr>
+                      <a:r>
+                        <a:rPr lang="en-NZ" sz="1100" dirty="0">
+                          <a:latin typeface="Avenir Next LT Pro" panose="020B0504020202020204" pitchFamily="34" charset="0"/>
+                        </a:rPr>
+                        <a:t>Not a valid number</a:t>
+                      </a:r>
+                    </a:p>
+                    <a:p>
+                      <a:pPr marL="0" lvl="0" indent="0" algn="l" rtl="0">
+                        <a:spcBef>
+                          <a:spcPts val="0"/>
+                        </a:spcBef>
+                        <a:spcAft>
+                          <a:spcPts val="0"/>
+                        </a:spcAft>
+                        <a:buNone/>
+                      </a:pPr>
+                      <a:r>
+                        <a:rPr lang="en-NZ" sz="1100" dirty="0">
+                          <a:latin typeface="Avenir Next LT Pro" panose="020B0504020202020204" pitchFamily="34" charset="0"/>
+                        </a:rPr>
+                        <a:t>Not a valid number</a:t>
+                      </a:r>
+                    </a:p>
+                    <a:p>
+                      <a:pPr marL="0" lvl="0" indent="0" algn="l" rtl="0">
+                        <a:spcBef>
+                          <a:spcPts val="0"/>
+                        </a:spcBef>
+                        <a:spcAft>
+                          <a:spcPts val="0"/>
+                        </a:spcAft>
+                        <a:buNone/>
+                      </a:pPr>
+                      <a:r>
+                        <a:rPr lang="en-NZ" sz="1100" dirty="0">
+                          <a:latin typeface="Avenir Next LT Pro" panose="020B0504020202020204" pitchFamily="34" charset="0"/>
+                        </a:rPr>
+                        <a:t>Not a valid number</a:t>
+                      </a:r>
+                    </a:p>
+                    <a:p>
+                      <a:pPr marL="0" lvl="0" indent="0" algn="l" rtl="0">
+                        <a:spcBef>
+                          <a:spcPts val="0"/>
+                        </a:spcBef>
+                        <a:spcAft>
+                          <a:spcPts val="0"/>
+                        </a:spcAft>
+                        <a:buNone/>
+                      </a:pPr>
+                      <a:r>
+                        <a:rPr lang="en-NZ" sz="1100" dirty="0">
+                          <a:latin typeface="Avenir Next LT Pro" panose="020B0504020202020204" pitchFamily="34" charset="0"/>
+                        </a:rPr>
+                        <a:t>Must be between 1 and 12</a:t>
+                      </a:r>
+                    </a:p>
+                    <a:p>
+                      <a:pPr marL="0" marR="0" lvl="0" indent="0" algn="l" defTabSz="914400" rtl="0" eaLnBrk="1" fontAlgn="auto" latinLnBrk="0" hangingPunct="1">
+                        <a:lnSpc>
+                          <a:spcPct val="100000"/>
+                        </a:lnSpc>
+                        <a:spcBef>
+                          <a:spcPts val="0"/>
+                        </a:spcBef>
+                        <a:spcAft>
+                          <a:spcPts val="0"/>
+                        </a:spcAft>
+                        <a:buClr>
+                          <a:srgbClr val="000000"/>
+                        </a:buClr>
+                        <a:buSzTx/>
+                        <a:buFont typeface="Arial"/>
+                        <a:buNone/>
+                        <a:tabLst/>
+                        <a:defRPr/>
+                      </a:pPr>
+                      <a:r>
+                        <a:rPr lang="en-NZ" sz="1100" dirty="0">
+                          <a:latin typeface="Avenir Next LT Pro" panose="020B0504020202020204" pitchFamily="34" charset="0"/>
+                        </a:rPr>
+                        <a:t>Must be between 1 and 12</a:t>
+                      </a:r>
+                    </a:p>
+                    <a:p>
+                      <a:pPr marL="0" lvl="0" indent="0" algn="l" rtl="0">
+                        <a:spcBef>
+                          <a:spcPts val="0"/>
+                        </a:spcBef>
+                        <a:spcAft>
+                          <a:spcPts val="0"/>
+                        </a:spcAft>
+                        <a:buNone/>
+                      </a:pPr>
+                      <a:r>
+                        <a:rPr lang="en-NZ" sz="1100" dirty="0">
+                          <a:latin typeface="Avenir Next LT Pro" panose="020B0504020202020204" pitchFamily="34" charset="0"/>
+                        </a:rPr>
+                        <a:t>Accepted continues to order</a:t>
+                      </a:r>
+                      <a:endParaRPr sz="1100" dirty="0">
+                        <a:latin typeface="Avenir Next LT Pro" panose="020B0504020202020204" pitchFamily="34" charset="0"/>
+                      </a:endParaRPr>
+                    </a:p>
+                  </a:txBody>
+                  <a:tcPr marL="91425" marR="91425" marT="91425" marB="91425"/>
+                </a:tc>
+                <a:extLst>
+                  <a:ext uri="{0D108BD9-81ED-4DB2-BD59-A6C34878D82A}">
+                    <a16:rowId xmlns:a16="http://schemas.microsoft.com/office/drawing/2014/main" val="10001"/>
+                  </a:ext>
+                </a:extLst>
+              </a:tr>
+            </a:tbl>
+          </a:graphicData>
+        </a:graphic>
+      </p:graphicFrame>
+    </p:spTree>
+    <p:extLst>
+      <p:ext uri="{BB962C8B-B14F-4D97-AF65-F5344CB8AC3E}">
+        <p14:creationId xmlns:p14="http://schemas.microsoft.com/office/powerpoint/2010/main" val="2870222884"/>
+      </p:ext>
+    </p:extLst>
+  </p:cSld>
+  <p:clrMapOvr>
+    <a:masterClrMapping/>
+  </p:clrMapOvr>
+</p:sld>
+</file>
+
+<file path=ppt/slides/slide56.xml><?xml version="1.0" encoding="utf-8"?>
 <p:sld xmlns:a="http://schemas.openxmlformats.org/drawingml/2006/main" xmlns:r="http://schemas.openxmlformats.org/officeDocument/2006/relationships" xmlns:p="http://schemas.openxmlformats.org/presentationml/2006/main">
   <p:cSld>
     <p:bg>
@@ -24425,7 +26347,7 @@
 </p:sld>
 </file>
 
-<file path=ppt/slides/slide53.xml><?xml version="1.0" encoding="utf-8"?>
+<file path=ppt/slides/slide57.xml><?xml version="1.0" encoding="utf-8"?>
 <p:sld xmlns:a="http://schemas.openxmlformats.org/drawingml/2006/main" xmlns:r="http://schemas.openxmlformats.org/officeDocument/2006/relationships" xmlns:p="http://schemas.openxmlformats.org/presentationml/2006/main">
   <p:cSld>
     <p:bg>
@@ -24496,7 +26418,7 @@
 </p:sld>
 </file>
 
-<file path=ppt/slides/slide54.xml><?xml version="1.0" encoding="utf-8"?>
+<file path=ppt/slides/slide58.xml><?xml version="1.0" encoding="utf-8"?>
 <p:sld xmlns:a="http://schemas.openxmlformats.org/drawingml/2006/main" xmlns:r="http://schemas.openxmlformats.org/officeDocument/2006/relationships" xmlns:p="http://schemas.openxmlformats.org/presentationml/2006/main">
   <p:cSld>
     <p:bg>
@@ -24566,7 +26488,7 @@
 </p:sld>
 </file>
 
-<file path=ppt/slides/slide55.xml><?xml version="1.0" encoding="utf-8"?>
+<file path=ppt/slides/slide59.xml><?xml version="1.0" encoding="utf-8"?>
 <p:sld xmlns:a="http://schemas.openxmlformats.org/drawingml/2006/main" xmlns:r="http://schemas.openxmlformats.org/officeDocument/2006/relationships" xmlns:p="http://schemas.openxmlformats.org/presentationml/2006/main">
   <p:cSld>
     <p:bg>
@@ -24637,7 +26559,199 @@
 </p:sld>
 </file>
 
-<file path=ppt/slides/slide56.xml><?xml version="1.0" encoding="utf-8"?>
+<file path=ppt/slides/slide6.xml><?xml version="1.0" encoding="utf-8"?>
+<p:sld xmlns:a="http://schemas.openxmlformats.org/drawingml/2006/main" xmlns:r="http://schemas.openxmlformats.org/officeDocument/2006/relationships" xmlns:p="http://schemas.openxmlformats.org/presentationml/2006/main">
+  <p:cSld>
+    <p:bg>
+      <p:bgPr>
+        <a:solidFill>
+          <a:srgbClr val="FFCC66"/>
+        </a:solidFill>
+        <a:effectLst/>
+      </p:bgPr>
+    </p:bg>
+    <p:spTree>
+      <p:nvGrpSpPr>
+        <p:cNvPr id="1" name=""/>
+        <p:cNvGrpSpPr/>
+        <p:nvPr/>
+      </p:nvGrpSpPr>
+      <p:grpSpPr>
+        <a:xfrm>
+          <a:off x="0" y="0"/>
+          <a:ext cx="0" cy="0"/>
+          <a:chOff x="0" y="0"/>
+          <a:chExt cx="0" cy="0"/>
+        </a:xfrm>
+      </p:grpSpPr>
+      <p:pic>
+        <p:nvPicPr>
+          <p:cNvPr id="5" name="Picture 4">
+            <a:extLst>
+              <a:ext uri="{FF2B5EF4-FFF2-40B4-BE49-F238E27FC236}">
+                <a16:creationId xmlns:a16="http://schemas.microsoft.com/office/drawing/2014/main" id="{92F2F667-2EEE-49B5-8CAE-B7EC0DDBABDD}"/>
+              </a:ext>
+            </a:extLst>
+          </p:cNvPr>
+          <p:cNvPicPr>
+            <a:picLocks noChangeAspect="1"/>
+          </p:cNvPicPr>
+          <p:nvPr/>
+        </p:nvPicPr>
+        <p:blipFill>
+          <a:blip r:embed="rId2"/>
+          <a:stretch>
+            <a:fillRect/>
+          </a:stretch>
+        </p:blipFill>
+        <p:spPr>
+          <a:xfrm>
+            <a:off x="0" y="7937"/>
+            <a:ext cx="9144000" cy="5127625"/>
+          </a:xfrm>
+          <a:prstGeom prst="rect">
+            <a:avLst/>
+          </a:prstGeom>
+        </p:spPr>
+      </p:pic>
+      <p:sp>
+        <p:nvSpPr>
+          <p:cNvPr id="2" name="Title 1">
+            <a:extLst>
+              <a:ext uri="{FF2B5EF4-FFF2-40B4-BE49-F238E27FC236}">
+                <a16:creationId xmlns:a16="http://schemas.microsoft.com/office/drawing/2014/main" id="{5912979F-6922-40FD-B6E0-0506FA25714D}"/>
+              </a:ext>
+            </a:extLst>
+          </p:cNvPr>
+          <p:cNvSpPr>
+            <a:spLocks noGrp="1"/>
+          </p:cNvSpPr>
+          <p:nvPr>
+            <p:ph type="title"/>
+          </p:nvPr>
+        </p:nvSpPr>
+        <p:spPr>
+          <a:xfrm>
+            <a:off x="433620" y="445025"/>
+            <a:ext cx="8520600" cy="572700"/>
+          </a:xfrm>
+        </p:spPr>
+        <p:txBody>
+          <a:bodyPr/>
+          <a:lstStyle/>
+          <a:p>
+            <a:r>
+              <a:rPr lang="en-US" b="1" dirty="0">
+                <a:latin typeface="Avenir Next LT Pro" panose="020B0504020202020204" pitchFamily="34" charset="0"/>
+              </a:rPr>
+              <a:t>Implication 2 – Usability (Error Recovery)</a:t>
+            </a:r>
+            <a:endParaRPr lang="en-NZ" b="1" dirty="0">
+              <a:latin typeface="Avenir Next LT Pro" panose="020B0504020202020204" pitchFamily="34" charset="0"/>
+            </a:endParaRPr>
+          </a:p>
+        </p:txBody>
+      </p:sp>
+      <p:sp>
+        <p:nvSpPr>
+          <p:cNvPr id="3" name="Text Placeholder 2">
+            <a:extLst>
+              <a:ext uri="{FF2B5EF4-FFF2-40B4-BE49-F238E27FC236}">
+                <a16:creationId xmlns:a16="http://schemas.microsoft.com/office/drawing/2014/main" id="{1EB42CE1-67BF-466B-8C2C-7F21A8892B1E}"/>
+              </a:ext>
+            </a:extLst>
+          </p:cNvPr>
+          <p:cNvSpPr>
+            <a:spLocks noGrp="1"/>
+          </p:cNvSpPr>
+          <p:nvPr>
+            <p:ph type="body" idx="1"/>
+          </p:nvPr>
+        </p:nvSpPr>
+        <p:spPr/>
+        <p:txBody>
+          <a:bodyPr/>
+          <a:lstStyle/>
+          <a:p>
+            <a:pPr marL="114300" indent="0">
+              <a:buNone/>
+            </a:pPr>
+            <a:r>
+              <a:rPr lang="en-US" u="sng" dirty="0">
+                <a:solidFill>
+                  <a:schemeClr val="tx1"/>
+                </a:solidFill>
+                <a:latin typeface="Avenir Next LT Pro" panose="020B0504020202020204" pitchFamily="34" charset="0"/>
+              </a:rPr>
+              <a:t>Describe the implication:</a:t>
+            </a:r>
+            <a:endParaRPr lang="en-US" dirty="0">
+              <a:solidFill>
+                <a:schemeClr val="tx1"/>
+              </a:solidFill>
+              <a:latin typeface="Avenir Next LT Pro" panose="020B0504020202020204" pitchFamily="34" charset="0"/>
+            </a:endParaRPr>
+          </a:p>
+          <a:p>
+            <a:pPr marL="114300" indent="0">
+              <a:buNone/>
+            </a:pPr>
+            <a:r>
+              <a:rPr lang="en-US" dirty="0">
+                <a:solidFill>
+                  <a:schemeClr val="tx1"/>
+                </a:solidFill>
+                <a:latin typeface="Avenir Next LT Pro" panose="020B0504020202020204" pitchFamily="34" charset="0"/>
+              </a:rPr>
+              <a:t>This implication (error recovery) is the ability of the compiler to resume parsing of a program after deleting such errors while the compilation. When any errors are entered into the program, it can easily recover when if the customer enters any invalid details. </a:t>
+            </a:r>
+          </a:p>
+          <a:p>
+            <a:pPr marL="114300" indent="0">
+              <a:buNone/>
+            </a:pPr>
+            <a:endParaRPr lang="en-US" dirty="0"/>
+          </a:p>
+          <a:p>
+            <a:pPr marL="114300" indent="0">
+              <a:buNone/>
+            </a:pPr>
+            <a:endParaRPr lang="en-US" dirty="0"/>
+          </a:p>
+          <a:p>
+            <a:pPr marL="114300" indent="0">
+              <a:buNone/>
+            </a:pPr>
+            <a:endParaRPr lang="en-US" dirty="0"/>
+          </a:p>
+          <a:p>
+            <a:pPr marL="114300" indent="0">
+              <a:buNone/>
+            </a:pPr>
+            <a:endParaRPr lang="en-US" dirty="0"/>
+          </a:p>
+          <a:p>
+            <a:pPr marL="114300" indent="0">
+              <a:buNone/>
+            </a:pPr>
+            <a:endParaRPr lang="en-NZ" dirty="0"/>
+          </a:p>
+        </p:txBody>
+      </p:sp>
+    </p:spTree>
+    <p:extLst>
+      <p:ext uri="{BB962C8B-B14F-4D97-AF65-F5344CB8AC3E}">
+        <p14:creationId xmlns:p14="http://schemas.microsoft.com/office/powerpoint/2010/main" val="1508299609"/>
+      </p:ext>
+    </p:extLst>
+  </p:cSld>
+  <p:clrMapOvr>
+    <a:masterClrMapping/>
+  </p:clrMapOvr>
+</p:sld>
+</file>
+
+<file path=ppt/slides/slide60.xml><?xml version="1.0" encoding="utf-8"?>
 <p:sld xmlns:a="http://schemas.openxmlformats.org/drawingml/2006/main" xmlns:r="http://schemas.openxmlformats.org/officeDocument/2006/relationships" xmlns:p="http://schemas.openxmlformats.org/presentationml/2006/main">
   <p:cSld>
     <p:bg>
@@ -24707,7 +26821,7 @@
 </p:sld>
 </file>
 
-<file path=ppt/slides/slide57.xml><?xml version="1.0" encoding="utf-8"?>
+<file path=ppt/slides/slide61.xml><?xml version="1.0" encoding="utf-8"?>
 <p:sld xmlns:a="http://schemas.openxmlformats.org/drawingml/2006/main" xmlns:r="http://schemas.openxmlformats.org/officeDocument/2006/relationships" xmlns:p="http://schemas.openxmlformats.org/presentationml/2006/main">
   <p:cSld>
     <p:bg>
@@ -24809,7 +26923,7 @@
 </p:sld>
 </file>
 
-<file path=ppt/slides/slide58.xml><?xml version="1.0" encoding="utf-8"?>
+<file path=ppt/slides/slide62.xml><?xml version="1.0" encoding="utf-8"?>
 <p:sld xmlns:a="http://schemas.openxmlformats.org/drawingml/2006/main" xmlns:r="http://schemas.openxmlformats.org/officeDocument/2006/relationships" xmlns:p="http://schemas.openxmlformats.org/presentationml/2006/main">
   <p:cSld>
     <p:bg>
@@ -24926,7 +27040,7 @@
 </p:sld>
 </file>
 
-<file path=ppt/slides/slide59.xml><?xml version="1.0" encoding="utf-8"?>
+<file path=ppt/slides/slide63.xml><?xml version="1.0" encoding="utf-8"?>
 <p:sld xmlns:a="http://schemas.openxmlformats.org/drawingml/2006/main" xmlns:r="http://schemas.openxmlformats.org/officeDocument/2006/relationships" xmlns:p="http://schemas.openxmlformats.org/presentationml/2006/main">
   <p:cSld>
     <p:bg>
@@ -25032,199 +27146,7 @@
 </p:sld>
 </file>
 
-<file path=ppt/slides/slide6.xml><?xml version="1.0" encoding="utf-8"?>
-<p:sld xmlns:a="http://schemas.openxmlformats.org/drawingml/2006/main" xmlns:r="http://schemas.openxmlformats.org/officeDocument/2006/relationships" xmlns:p="http://schemas.openxmlformats.org/presentationml/2006/main">
-  <p:cSld>
-    <p:bg>
-      <p:bgPr>
-        <a:solidFill>
-          <a:srgbClr val="FFCC66"/>
-        </a:solidFill>
-        <a:effectLst/>
-      </p:bgPr>
-    </p:bg>
-    <p:spTree>
-      <p:nvGrpSpPr>
-        <p:cNvPr id="1" name=""/>
-        <p:cNvGrpSpPr/>
-        <p:nvPr/>
-      </p:nvGrpSpPr>
-      <p:grpSpPr>
-        <a:xfrm>
-          <a:off x="0" y="0"/>
-          <a:ext cx="0" cy="0"/>
-          <a:chOff x="0" y="0"/>
-          <a:chExt cx="0" cy="0"/>
-        </a:xfrm>
-      </p:grpSpPr>
-      <p:pic>
-        <p:nvPicPr>
-          <p:cNvPr id="5" name="Picture 4">
-            <a:extLst>
-              <a:ext uri="{FF2B5EF4-FFF2-40B4-BE49-F238E27FC236}">
-                <a16:creationId xmlns:a16="http://schemas.microsoft.com/office/drawing/2014/main" id="{92F2F667-2EEE-49B5-8CAE-B7EC0DDBABDD}"/>
-              </a:ext>
-            </a:extLst>
-          </p:cNvPr>
-          <p:cNvPicPr>
-            <a:picLocks noChangeAspect="1"/>
-          </p:cNvPicPr>
-          <p:nvPr/>
-        </p:nvPicPr>
-        <p:blipFill>
-          <a:blip r:embed="rId2"/>
-          <a:stretch>
-            <a:fillRect/>
-          </a:stretch>
-        </p:blipFill>
-        <p:spPr>
-          <a:xfrm>
-            <a:off x="0" y="7937"/>
-            <a:ext cx="9144000" cy="5127625"/>
-          </a:xfrm>
-          <a:prstGeom prst="rect">
-            <a:avLst/>
-          </a:prstGeom>
-        </p:spPr>
-      </p:pic>
-      <p:sp>
-        <p:nvSpPr>
-          <p:cNvPr id="2" name="Title 1">
-            <a:extLst>
-              <a:ext uri="{FF2B5EF4-FFF2-40B4-BE49-F238E27FC236}">
-                <a16:creationId xmlns:a16="http://schemas.microsoft.com/office/drawing/2014/main" id="{5912979F-6922-40FD-B6E0-0506FA25714D}"/>
-              </a:ext>
-            </a:extLst>
-          </p:cNvPr>
-          <p:cNvSpPr>
-            <a:spLocks noGrp="1"/>
-          </p:cNvSpPr>
-          <p:nvPr>
-            <p:ph type="title"/>
-          </p:nvPr>
-        </p:nvSpPr>
-        <p:spPr>
-          <a:xfrm>
-            <a:off x="433620" y="445025"/>
-            <a:ext cx="8520600" cy="572700"/>
-          </a:xfrm>
-        </p:spPr>
-        <p:txBody>
-          <a:bodyPr/>
-          <a:lstStyle/>
-          <a:p>
-            <a:r>
-              <a:rPr lang="en-US" b="1" dirty="0">
-                <a:latin typeface="Avenir Next LT Pro" panose="020B0504020202020204" pitchFamily="34" charset="0"/>
-              </a:rPr>
-              <a:t>Implication 2 – Usability (Error Recovery)</a:t>
-            </a:r>
-            <a:endParaRPr lang="en-NZ" b="1" dirty="0">
-              <a:latin typeface="Avenir Next LT Pro" panose="020B0504020202020204" pitchFamily="34" charset="0"/>
-            </a:endParaRPr>
-          </a:p>
-        </p:txBody>
-      </p:sp>
-      <p:sp>
-        <p:nvSpPr>
-          <p:cNvPr id="3" name="Text Placeholder 2">
-            <a:extLst>
-              <a:ext uri="{FF2B5EF4-FFF2-40B4-BE49-F238E27FC236}">
-                <a16:creationId xmlns:a16="http://schemas.microsoft.com/office/drawing/2014/main" id="{1EB42CE1-67BF-466B-8C2C-7F21A8892B1E}"/>
-              </a:ext>
-            </a:extLst>
-          </p:cNvPr>
-          <p:cNvSpPr>
-            <a:spLocks noGrp="1"/>
-          </p:cNvSpPr>
-          <p:nvPr>
-            <p:ph type="body" idx="1"/>
-          </p:nvPr>
-        </p:nvSpPr>
-        <p:spPr/>
-        <p:txBody>
-          <a:bodyPr/>
-          <a:lstStyle/>
-          <a:p>
-            <a:pPr marL="114300" indent="0">
-              <a:buNone/>
-            </a:pPr>
-            <a:r>
-              <a:rPr lang="en-US" u="sng" dirty="0">
-                <a:solidFill>
-                  <a:schemeClr val="tx1"/>
-                </a:solidFill>
-                <a:latin typeface="Avenir Next LT Pro" panose="020B0504020202020204" pitchFamily="34" charset="0"/>
-              </a:rPr>
-              <a:t>Describe the implication:</a:t>
-            </a:r>
-            <a:endParaRPr lang="en-US" dirty="0">
-              <a:solidFill>
-                <a:schemeClr val="tx1"/>
-              </a:solidFill>
-              <a:latin typeface="Avenir Next LT Pro" panose="020B0504020202020204" pitchFamily="34" charset="0"/>
-            </a:endParaRPr>
-          </a:p>
-          <a:p>
-            <a:pPr marL="114300" indent="0">
-              <a:buNone/>
-            </a:pPr>
-            <a:r>
-              <a:rPr lang="en-US" dirty="0">
-                <a:solidFill>
-                  <a:schemeClr val="tx1"/>
-                </a:solidFill>
-                <a:latin typeface="Avenir Next LT Pro" panose="020B0504020202020204" pitchFamily="34" charset="0"/>
-              </a:rPr>
-              <a:t>This implication (error recovery) is the ability of the compiler to resume parsing of a program after deleting such errors while the compilation. When any errors are entered into the program, it can easily recover when if the customer enters any invalid details. </a:t>
-            </a:r>
-          </a:p>
-          <a:p>
-            <a:pPr marL="114300" indent="0">
-              <a:buNone/>
-            </a:pPr>
-            <a:endParaRPr lang="en-US" dirty="0"/>
-          </a:p>
-          <a:p>
-            <a:pPr marL="114300" indent="0">
-              <a:buNone/>
-            </a:pPr>
-            <a:endParaRPr lang="en-US" dirty="0"/>
-          </a:p>
-          <a:p>
-            <a:pPr marL="114300" indent="0">
-              <a:buNone/>
-            </a:pPr>
-            <a:endParaRPr lang="en-US" dirty="0"/>
-          </a:p>
-          <a:p>
-            <a:pPr marL="114300" indent="0">
-              <a:buNone/>
-            </a:pPr>
-            <a:endParaRPr lang="en-US" dirty="0"/>
-          </a:p>
-          <a:p>
-            <a:pPr marL="114300" indent="0">
-              <a:buNone/>
-            </a:pPr>
-            <a:endParaRPr lang="en-NZ" dirty="0"/>
-          </a:p>
-        </p:txBody>
-      </p:sp>
-    </p:spTree>
-    <p:extLst>
-      <p:ext uri="{BB962C8B-B14F-4D97-AF65-F5344CB8AC3E}">
-        <p14:creationId xmlns:p14="http://schemas.microsoft.com/office/powerpoint/2010/main" val="1508299609"/>
-      </p:ext>
-    </p:extLst>
-  </p:cSld>
-  <p:clrMapOvr>
-    <a:masterClrMapping/>
-  </p:clrMapOvr>
-</p:sld>
-</file>
-
-<file path=ppt/slides/slide60.xml><?xml version="1.0" encoding="utf-8"?>
+<file path=ppt/slides/slide64.xml><?xml version="1.0" encoding="utf-8"?>
 <p:sld xmlns:a="http://schemas.openxmlformats.org/drawingml/2006/main" xmlns:r="http://schemas.openxmlformats.org/officeDocument/2006/relationships" xmlns:p="http://schemas.openxmlformats.org/presentationml/2006/main">
   <p:cSld>
     <p:bg>
@@ -25346,7 +27268,7 @@
 </p:sld>
 </file>
 
-<file path=ppt/slides/slide61.xml><?xml version="1.0" encoding="utf-8"?>
+<file path=ppt/slides/slide65.xml><?xml version="1.0" encoding="utf-8"?>
 <p:sld xmlns:a="http://schemas.openxmlformats.org/drawingml/2006/main" xmlns:r="http://schemas.openxmlformats.org/officeDocument/2006/relationships" xmlns:p="http://schemas.openxmlformats.org/presentationml/2006/main">
   <p:cSld>
     <p:bg>
@@ -25468,7 +27390,7 @@
 </p:sld>
 </file>
 
-<file path=ppt/slides/slide62.xml><?xml version="1.0" encoding="utf-8"?>
+<file path=ppt/slides/slide66.xml><?xml version="1.0" encoding="utf-8"?>
 <p:sld xmlns:a="http://schemas.openxmlformats.org/drawingml/2006/main" xmlns:r="http://schemas.openxmlformats.org/officeDocument/2006/relationships" xmlns:p="http://schemas.openxmlformats.org/presentationml/2006/main">
   <p:cSld>
     <p:bg>

</xml_diff>

<commit_message>
Click and collect/Delivery integrated into function
print order function now accounts for differences of click and collect and delivery.
</commit_message>
<xml_diff>
--- a/Danett Pepito - 000_91896 _ 91897 Documentation - 2150400 (Git).pptx
+++ b/Danett Pepito - 000_91896 _ 91897 Documentation - 2150400 (Git).pptx
@@ -5,7 +5,7 @@
     <p:sldMasterId id="2147483659" r:id="rId1"/>
   </p:sldMasterIdLst>
   <p:notesMasterIdLst>
-    <p:notesMasterId r:id="rId74"/>
+    <p:notesMasterId r:id="rId76"/>
   </p:notesMasterIdLst>
   <p:sldIdLst>
     <p:sldId id="256" r:id="rId2"/>
@@ -69,17 +69,19 @@
     <p:sldId id="328" r:id="rId60"/>
     <p:sldId id="329" r:id="rId61"/>
     <p:sldId id="330" r:id="rId62"/>
-    <p:sldId id="282" r:id="rId63"/>
-    <p:sldId id="288" r:id="rId64"/>
-    <p:sldId id="290" r:id="rId65"/>
-    <p:sldId id="292" r:id="rId66"/>
-    <p:sldId id="291" r:id="rId67"/>
-    <p:sldId id="285" r:id="rId68"/>
-    <p:sldId id="261" r:id="rId69"/>
-    <p:sldId id="284" r:id="rId70"/>
-    <p:sldId id="286" r:id="rId71"/>
-    <p:sldId id="287" r:id="rId72"/>
-    <p:sldId id="262" r:id="rId73"/>
+    <p:sldId id="331" r:id="rId63"/>
+    <p:sldId id="332" r:id="rId64"/>
+    <p:sldId id="282" r:id="rId65"/>
+    <p:sldId id="288" r:id="rId66"/>
+    <p:sldId id="290" r:id="rId67"/>
+    <p:sldId id="292" r:id="rId68"/>
+    <p:sldId id="291" r:id="rId69"/>
+    <p:sldId id="285" r:id="rId70"/>
+    <p:sldId id="261" r:id="rId71"/>
+    <p:sldId id="284" r:id="rId72"/>
+    <p:sldId id="286" r:id="rId73"/>
+    <p:sldId id="287" r:id="rId74"/>
+    <p:sldId id="262" r:id="rId75"/>
   </p:sldIdLst>
   <p:sldSz cx="9144000" cy="5143500" type="screen16x9"/>
   <p:notesSz cx="6858000" cy="9144000"/>
@@ -344,7 +346,7 @@
   <pc:docChgLst>
     <pc:chgData name="Danett Pepito" userId="ddef1e2176689e9a" providerId="LiveId" clId="{B2185394-3AFD-42B2-9285-3B672C598A56}"/>
     <pc:docChg chg="undo custSel addSld delSld modSld sldOrd">
-      <pc:chgData name="Danett Pepito" userId="ddef1e2176689e9a" providerId="LiveId" clId="{B2185394-3AFD-42B2-9285-3B672C598A56}" dt="2022-03-21T23:04:08.774" v="1889" actId="20577"/>
+      <pc:chgData name="Danett Pepito" userId="ddef1e2176689e9a" providerId="LiveId" clId="{B2185394-3AFD-42B2-9285-3B672C598A56}" dt="2022-03-22T05:45:13.315" v="2233" actId="20577"/>
       <pc:docMkLst>
         <pc:docMk/>
       </pc:docMkLst>
@@ -2473,6 +2475,108 @@
           </ac:picMkLst>
         </pc:picChg>
       </pc:sldChg>
+      <pc:sldChg chg="addSp delSp modSp add mod">
+        <pc:chgData name="Danett Pepito" userId="ddef1e2176689e9a" providerId="LiveId" clId="{B2185394-3AFD-42B2-9285-3B672C598A56}" dt="2022-03-22T05:45:13.315" v="2233" actId="20577"/>
+        <pc:sldMkLst>
+          <pc:docMk/>
+          <pc:sldMk cId="2476371492" sldId="331"/>
+        </pc:sldMkLst>
+        <pc:spChg chg="mod">
+          <ac:chgData name="Danett Pepito" userId="ddef1e2176689e9a" providerId="LiveId" clId="{B2185394-3AFD-42B2-9285-3B672C598A56}" dt="2022-03-22T05:45:13.315" v="2233" actId="20577"/>
+          <ac:spMkLst>
+            <pc:docMk/>
+            <pc:sldMk cId="2476371492" sldId="331"/>
+            <ac:spMk id="73" creationId="{00000000-0000-0000-0000-000000000000}"/>
+          </ac:spMkLst>
+        </pc:spChg>
+        <pc:picChg chg="del">
+          <ac:chgData name="Danett Pepito" userId="ddef1e2176689e9a" providerId="LiveId" clId="{B2185394-3AFD-42B2-9285-3B672C598A56}" dt="2022-03-21T23:06:44.745" v="1895" actId="478"/>
+          <ac:picMkLst>
+            <pc:docMk/>
+            <pc:sldMk cId="2476371492" sldId="331"/>
+            <ac:picMk id="4" creationId="{8DD54BB7-2D0F-44A6-929C-25FCBAFC6DB1}"/>
+          </ac:picMkLst>
+        </pc:picChg>
+        <pc:picChg chg="add mod">
+          <ac:chgData name="Danett Pepito" userId="ddef1e2176689e9a" providerId="LiveId" clId="{B2185394-3AFD-42B2-9285-3B672C598A56}" dt="2022-03-21T23:08:10.870" v="1958" actId="1076"/>
+          <ac:picMkLst>
+            <pc:docMk/>
+            <pc:sldMk cId="2476371492" sldId="331"/>
+            <ac:picMk id="5" creationId="{925B60CA-1A8B-4087-AF44-F414AF1F99D8}"/>
+          </ac:picMkLst>
+        </pc:picChg>
+      </pc:sldChg>
+      <pc:sldChg chg="addSp delSp modSp add mod replId">
+        <pc:chgData name="Danett Pepito" userId="ddef1e2176689e9a" providerId="LiveId" clId="{B2185394-3AFD-42B2-9285-3B672C598A56}" dt="2022-03-22T05:44:58.337" v="2225" actId="20577"/>
+        <pc:sldMkLst>
+          <pc:docMk/>
+          <pc:sldMk cId="4029085213" sldId="332"/>
+        </pc:sldMkLst>
+        <pc:spChg chg="mod">
+          <ac:chgData name="Danett Pepito" userId="ddef1e2176689e9a" providerId="LiveId" clId="{B2185394-3AFD-42B2-9285-3B672C598A56}" dt="2022-03-22T05:44:58.337" v="2225" actId="20577"/>
+          <ac:spMkLst>
+            <pc:docMk/>
+            <pc:sldMk cId="4029085213" sldId="332"/>
+            <ac:spMk id="78" creationId="{00000000-0000-0000-0000-000000000000}"/>
+          </ac:spMkLst>
+        </pc:spChg>
+        <pc:graphicFrameChg chg="mod modGraphic">
+          <ac:chgData name="Danett Pepito" userId="ddef1e2176689e9a" providerId="LiveId" clId="{B2185394-3AFD-42B2-9285-3B672C598A56}" dt="2022-03-22T05:43:29.470" v="2224" actId="255"/>
+          <ac:graphicFrameMkLst>
+            <pc:docMk/>
+            <pc:sldMk cId="4029085213" sldId="332"/>
+            <ac:graphicFrameMk id="79" creationId="{00000000-0000-0000-0000-000000000000}"/>
+          </ac:graphicFrameMkLst>
+        </pc:graphicFrameChg>
+        <pc:picChg chg="del">
+          <ac:chgData name="Danett Pepito" userId="ddef1e2176689e9a" providerId="LiveId" clId="{B2185394-3AFD-42B2-9285-3B672C598A56}" dt="2022-03-21T23:06:41.842" v="1893" actId="478"/>
+          <ac:picMkLst>
+            <pc:docMk/>
+            <pc:sldMk cId="4029085213" sldId="332"/>
+            <ac:picMk id="4" creationId="{B98BF2CF-9E91-4D5C-A4B7-0078ABC3B26E}"/>
+          </ac:picMkLst>
+        </pc:picChg>
+        <pc:picChg chg="add del mod modCrop">
+          <ac:chgData name="Danett Pepito" userId="ddef1e2176689e9a" providerId="LiveId" clId="{B2185394-3AFD-42B2-9285-3B672C598A56}" dt="2022-03-22T05:39:21.401" v="1970" actId="478"/>
+          <ac:picMkLst>
+            <pc:docMk/>
+            <pc:sldMk cId="4029085213" sldId="332"/>
+            <ac:picMk id="5" creationId="{2E2A1BA1-9679-4362-A3EA-9D379BE091E3}"/>
+          </ac:picMkLst>
+        </pc:picChg>
+        <pc:picChg chg="del">
+          <ac:chgData name="Danett Pepito" userId="ddef1e2176689e9a" providerId="LiveId" clId="{B2185394-3AFD-42B2-9285-3B672C598A56}" dt="2022-03-21T23:06:42.692" v="1894" actId="478"/>
+          <ac:picMkLst>
+            <pc:docMk/>
+            <pc:sldMk cId="4029085213" sldId="332"/>
+            <ac:picMk id="6" creationId="{4E71B2F0-0B11-4536-A756-E236F85016A1}"/>
+          </ac:picMkLst>
+        </pc:picChg>
+        <pc:picChg chg="add mod">
+          <ac:chgData name="Danett Pepito" userId="ddef1e2176689e9a" providerId="LiveId" clId="{B2185394-3AFD-42B2-9285-3B672C598A56}" dt="2022-03-22T05:40:15.749" v="1983" actId="1076"/>
+          <ac:picMkLst>
+            <pc:docMk/>
+            <pc:sldMk cId="4029085213" sldId="332"/>
+            <ac:picMk id="8" creationId="{9D9C50E4-281C-4FBC-8EC1-A69F772498BD}"/>
+          </ac:picMkLst>
+        </pc:picChg>
+        <pc:picChg chg="add mod">
+          <ac:chgData name="Danett Pepito" userId="ddef1e2176689e9a" providerId="LiveId" clId="{B2185394-3AFD-42B2-9285-3B672C598A56}" dt="2022-03-22T05:40:14.481" v="1982" actId="1076"/>
+          <ac:picMkLst>
+            <pc:docMk/>
+            <pc:sldMk cId="4029085213" sldId="332"/>
+            <ac:picMk id="10" creationId="{98ED3790-9AD4-4927-9531-130FD32BD0EB}"/>
+          </ac:picMkLst>
+        </pc:picChg>
+        <pc:picChg chg="add mod">
+          <ac:chgData name="Danett Pepito" userId="ddef1e2176689e9a" providerId="LiveId" clId="{B2185394-3AFD-42B2-9285-3B672C598A56}" dt="2022-03-22T05:42:14.205" v="1990" actId="14100"/>
+          <ac:picMkLst>
+            <pc:docMk/>
+            <pc:sldMk cId="4029085213" sldId="332"/>
+            <ac:picMk id="12" creationId="{2D52FDB9-EFBB-41BA-9E17-1AB5B18EC319}"/>
+          </ac:picMkLst>
+        </pc:picChg>
+      </pc:sldChg>
     </pc:docChg>
   </pc:docChgLst>
 </pc:chgInfo>
@@ -8142,7 +8246,7 @@
     </p:spTree>
     <p:extLst>
       <p:ext uri="{BB962C8B-B14F-4D97-AF65-F5344CB8AC3E}">
-        <p14:creationId xmlns:p14="http://schemas.microsoft.com/office/powerpoint/2010/main" val="3006313543"/>
+        <p14:creationId xmlns:p14="http://schemas.microsoft.com/office/powerpoint/2010/main" val="2558064590"/>
       </p:ext>
     </p:extLst>
   </p:cSld>
@@ -8157,7 +8261,7 @@
   <p:cSld>
     <p:spTree>
       <p:nvGrpSpPr>
-        <p:cNvPr id="1" name="Shape 69"/>
+        <p:cNvPr id="1" name="Shape 74"/>
         <p:cNvGrpSpPr/>
         <p:nvPr/>
       </p:nvGrpSpPr>
@@ -8171,7 +8275,7 @@
       </p:grpSpPr>
       <p:sp>
         <p:nvSpPr>
-          <p:cNvPr id="70" name="Google Shape;70;gac10fef634_0_16:notes"/>
+          <p:cNvPr id="75" name="Google Shape;75;gac10fef634_0_20:notes"/>
           <p:cNvSpPr>
             <a:spLocks noGrp="1" noRot="1" noChangeAspect="1"/>
           </p:cNvSpPr>
@@ -8212,7 +8316,7 @@
       </p:sp>
       <p:sp>
         <p:nvSpPr>
-          <p:cNvPr id="71" name="Google Shape;71;gac10fef634_0_16:notes"/>
+          <p:cNvPr id="76" name="Google Shape;76;gac10fef634_0_20:notes"/>
           <p:cNvSpPr txBox="1">
             <a:spLocks noGrp="1"/>
           </p:cNvSpPr>
@@ -8251,7 +8355,7 @@
     </p:spTree>
     <p:extLst>
       <p:ext uri="{BB962C8B-B14F-4D97-AF65-F5344CB8AC3E}">
-        <p14:creationId xmlns:p14="http://schemas.microsoft.com/office/powerpoint/2010/main" val="2149026663"/>
+        <p14:creationId xmlns:p14="http://schemas.microsoft.com/office/powerpoint/2010/main" val="518993114"/>
       </p:ext>
     </p:extLst>
   </p:cSld>
@@ -8360,7 +8464,7 @@
     </p:spTree>
     <p:extLst>
       <p:ext uri="{BB962C8B-B14F-4D97-AF65-F5344CB8AC3E}">
-        <p14:creationId xmlns:p14="http://schemas.microsoft.com/office/powerpoint/2010/main" val="3194274356"/>
+        <p14:creationId xmlns:p14="http://schemas.microsoft.com/office/powerpoint/2010/main" val="3006313543"/>
       </p:ext>
     </p:extLst>
   </p:cSld>
@@ -8469,7 +8573,7 @@
     </p:spTree>
     <p:extLst>
       <p:ext uri="{BB962C8B-B14F-4D97-AF65-F5344CB8AC3E}">
-        <p14:creationId xmlns:p14="http://schemas.microsoft.com/office/powerpoint/2010/main" val="3014292639"/>
+        <p14:creationId xmlns:p14="http://schemas.microsoft.com/office/powerpoint/2010/main" val="2149026663"/>
       </p:ext>
     </p:extLst>
   </p:cSld>
@@ -8484,7 +8588,7 @@
   <p:cSld>
     <p:spTree>
       <p:nvGrpSpPr>
-        <p:cNvPr id="1" name="Shape 80"/>
+        <p:cNvPr id="1" name="Shape 69"/>
         <p:cNvGrpSpPr/>
         <p:nvPr/>
       </p:nvGrpSpPr>
@@ -8498,7 +8602,7 @@
       </p:grpSpPr>
       <p:sp>
         <p:nvSpPr>
-          <p:cNvPr id="81" name="Google Shape;81;gac10fef634_0_25:notes"/>
+          <p:cNvPr id="70" name="Google Shape;70;gac10fef634_0_16:notes"/>
           <p:cNvSpPr>
             <a:spLocks noGrp="1" noRot="1" noChangeAspect="1"/>
           </p:cNvSpPr>
@@ -8539,7 +8643,7 @@
       </p:sp>
       <p:sp>
         <p:nvSpPr>
-          <p:cNvPr id="82" name="Google Shape;82;gac10fef634_0_25:notes"/>
+          <p:cNvPr id="71" name="Google Shape;71;gac10fef634_0_16:notes"/>
           <p:cNvSpPr txBox="1">
             <a:spLocks noGrp="1"/>
           </p:cNvSpPr>
@@ -8569,27 +8673,6 @@
               <a:spcAft>
                 <a:spcPts val="0"/>
               </a:spcAft>
-              <a:buClr>
-                <a:schemeClr val="dk1"/>
-              </a:buClr>
-              <a:buSzPts val="1100"/>
-              <a:buFont typeface="Arial"/>
-              <a:buNone/>
-            </a:pPr>
-            <a:r>
-              <a:rPr lang="en"/>
-              <a:t>Your version control evidence should go here.  This could be in the form of annotated screenshots which show you you managed this process or you could make a brief screencast explaining how you implemented version control.</a:t>
-            </a:r>
-            <a:endParaRPr/>
-          </a:p>
-          <a:p>
-            <a:pPr marL="0" lvl="0" indent="0" algn="l" rtl="0">
-              <a:spcBef>
-                <a:spcPts val="0"/>
-              </a:spcBef>
-              <a:spcAft>
-                <a:spcPts val="0"/>
-              </a:spcAft>
               <a:buNone/>
             </a:pPr>
             <a:endParaRPr/>
@@ -8597,6 +8680,11 @@
         </p:txBody>
       </p:sp>
     </p:spTree>
+    <p:extLst>
+      <p:ext uri="{BB962C8B-B14F-4D97-AF65-F5344CB8AC3E}">
+        <p14:creationId xmlns:p14="http://schemas.microsoft.com/office/powerpoint/2010/main" val="3194274356"/>
+      </p:ext>
+    </p:extLst>
   </p:cSld>
   <p:clrMapOvr>
     <a:masterClrMapping/>
@@ -8609,7 +8697,7 @@
   <p:cSld>
     <p:spTree>
       <p:nvGrpSpPr>
-        <p:cNvPr id="1" name="Shape 80"/>
+        <p:cNvPr id="1" name="Shape 69"/>
         <p:cNvGrpSpPr/>
         <p:nvPr/>
       </p:nvGrpSpPr>
@@ -8623,7 +8711,7 @@
       </p:grpSpPr>
       <p:sp>
         <p:nvSpPr>
-          <p:cNvPr id="81" name="Google Shape;81;gac10fef634_0_25:notes"/>
+          <p:cNvPr id="70" name="Google Shape;70;gac10fef634_0_16:notes"/>
           <p:cNvSpPr>
             <a:spLocks noGrp="1" noRot="1" noChangeAspect="1"/>
           </p:cNvSpPr>
@@ -8664,7 +8752,7 @@
       </p:sp>
       <p:sp>
         <p:nvSpPr>
-          <p:cNvPr id="82" name="Google Shape;82;gac10fef634_0_25:notes"/>
+          <p:cNvPr id="71" name="Google Shape;71;gac10fef634_0_16:notes"/>
           <p:cNvSpPr txBox="1">
             <a:spLocks noGrp="1"/>
           </p:cNvSpPr>
@@ -8694,27 +8782,6 @@
               <a:spcAft>
                 <a:spcPts val="0"/>
               </a:spcAft>
-              <a:buClr>
-                <a:schemeClr val="dk1"/>
-              </a:buClr>
-              <a:buSzPts val="1100"/>
-              <a:buFont typeface="Arial"/>
-              <a:buNone/>
-            </a:pPr>
-            <a:r>
-              <a:rPr lang="en"/>
-              <a:t>Your version control evidence should go here.  This could be in the form of annotated screenshots which show you you managed this process or you could make a brief screencast explaining how you implemented version control.</a:t>
-            </a:r>
-            <a:endParaRPr/>
-          </a:p>
-          <a:p>
-            <a:pPr marL="0" lvl="0" indent="0" algn="l" rtl="0">
-              <a:spcBef>
-                <a:spcPts val="0"/>
-              </a:spcBef>
-              <a:spcAft>
-                <a:spcPts val="0"/>
-              </a:spcAft>
               <a:buNone/>
             </a:pPr>
             <a:endParaRPr/>
@@ -8724,7 +8791,7 @@
     </p:spTree>
     <p:extLst>
       <p:ext uri="{BB962C8B-B14F-4D97-AF65-F5344CB8AC3E}">
-        <p14:creationId xmlns:p14="http://schemas.microsoft.com/office/powerpoint/2010/main" val="511959585"/>
+        <p14:creationId xmlns:p14="http://schemas.microsoft.com/office/powerpoint/2010/main" val="3014292639"/>
       </p:ext>
     </p:extLst>
   </p:cSld>
@@ -8852,11 +8919,6 @@
         </p:txBody>
       </p:sp>
     </p:spTree>
-    <p:extLst>
-      <p:ext uri="{BB962C8B-B14F-4D97-AF65-F5344CB8AC3E}">
-        <p14:creationId xmlns:p14="http://schemas.microsoft.com/office/powerpoint/2010/main" val="3815843750"/>
-      </p:ext>
-    </p:extLst>
   </p:cSld>
   <p:clrMapOvr>
     <a:masterClrMapping/>
@@ -8869,7 +8931,7 @@
   <p:cSld>
     <p:spTree>
       <p:nvGrpSpPr>
-        <p:cNvPr id="1" name="Shape 86"/>
+        <p:cNvPr id="1" name="Shape 80"/>
         <p:cNvGrpSpPr/>
         <p:nvPr/>
       </p:nvGrpSpPr>
@@ -8883,7 +8945,7 @@
       </p:grpSpPr>
       <p:sp>
         <p:nvSpPr>
-          <p:cNvPr id="87" name="Google Shape;87;gac10fef634_0_30:notes"/>
+          <p:cNvPr id="81" name="Google Shape;81;gac10fef634_0_25:notes"/>
           <p:cNvSpPr>
             <a:spLocks noGrp="1" noRot="1" noChangeAspect="1"/>
           </p:cNvSpPr>
@@ -8924,7 +8986,7 @@
       </p:sp>
       <p:sp>
         <p:nvSpPr>
-          <p:cNvPr id="88" name="Google Shape;88;gac10fef634_0_30:notes"/>
+          <p:cNvPr id="82" name="Google Shape;82;gac10fef634_0_25:notes"/>
           <p:cNvSpPr txBox="1">
             <a:spLocks noGrp="1"/>
           </p:cNvSpPr>
@@ -8954,17 +9016,39 @@
               <a:spcAft>
                 <a:spcPts val="0"/>
               </a:spcAft>
+              <a:buClr>
+                <a:schemeClr val="dk1"/>
+              </a:buClr>
+              <a:buSzPts val="1100"/>
+              <a:buFont typeface="Arial"/>
               <a:buNone/>
             </a:pPr>
             <a:r>
               <a:rPr lang="en"/>
-              <a:t>Discusses how the information from planning, testing and trialling of components assisted in the development of a high-quality outcome</a:t>
+              <a:t>Your version control evidence should go here.  This could be in the form of annotated screenshots which show you you managed this process or you could make a brief screencast explaining how you implemented version control.</a:t>
             </a:r>
+            <a:endParaRPr/>
+          </a:p>
+          <a:p>
+            <a:pPr marL="0" lvl="0" indent="0" algn="l" rtl="0">
+              <a:spcBef>
+                <a:spcPts val="0"/>
+              </a:spcBef>
+              <a:spcAft>
+                <a:spcPts val="0"/>
+              </a:spcAft>
+              <a:buNone/>
+            </a:pPr>
             <a:endParaRPr/>
           </a:p>
         </p:txBody>
       </p:sp>
     </p:spTree>
+    <p:extLst>
+      <p:ext uri="{BB962C8B-B14F-4D97-AF65-F5344CB8AC3E}">
+        <p14:creationId xmlns:p14="http://schemas.microsoft.com/office/powerpoint/2010/main" val="511959585"/>
+      </p:ext>
+    </p:extLst>
   </p:cSld>
   <p:clrMapOvr>
     <a:masterClrMapping/>
@@ -9074,6 +9158,244 @@
         <p14:creationId xmlns:p14="http://schemas.microsoft.com/office/powerpoint/2010/main" val="3178048879"/>
       </p:ext>
     </p:extLst>
+  </p:cSld>
+  <p:clrMapOvr>
+    <a:masterClrMapping/>
+  </p:clrMapOvr>
+</p:notes>
+</file>
+
+<file path=ppt/notesSlides/notesSlide60.xml><?xml version="1.0" encoding="utf-8"?>
+<p:notes xmlns:a="http://schemas.openxmlformats.org/drawingml/2006/main" xmlns:r="http://schemas.openxmlformats.org/officeDocument/2006/relationships" xmlns:p="http://schemas.openxmlformats.org/presentationml/2006/main" showMasterSp="0" showMasterPhAnim="0">
+  <p:cSld>
+    <p:spTree>
+      <p:nvGrpSpPr>
+        <p:cNvPr id="1" name="Shape 80"/>
+        <p:cNvGrpSpPr/>
+        <p:nvPr/>
+      </p:nvGrpSpPr>
+      <p:grpSpPr>
+        <a:xfrm>
+          <a:off x="0" y="0"/>
+          <a:ext cx="0" cy="0"/>
+          <a:chOff x="0" y="0"/>
+          <a:chExt cx="0" cy="0"/>
+        </a:xfrm>
+      </p:grpSpPr>
+      <p:sp>
+        <p:nvSpPr>
+          <p:cNvPr id="81" name="Google Shape;81;gac10fef634_0_25:notes"/>
+          <p:cNvSpPr>
+            <a:spLocks noGrp="1" noRot="1" noChangeAspect="1"/>
+          </p:cNvSpPr>
+          <p:nvPr>
+            <p:ph type="sldImg" idx="2"/>
+          </p:nvPr>
+        </p:nvSpPr>
+        <p:spPr>
+          <a:xfrm>
+            <a:off x="381000" y="685800"/>
+            <a:ext cx="6096000" cy="3429000"/>
+          </a:xfrm>
+          <a:custGeom>
+            <a:avLst/>
+            <a:gdLst/>
+            <a:ahLst/>
+            <a:cxnLst/>
+            <a:rect l="l" t="t" r="r" b="b"/>
+            <a:pathLst>
+              <a:path w="120000" h="120000" extrusionOk="0">
+                <a:moveTo>
+                  <a:pt x="0" y="0"/>
+                </a:moveTo>
+                <a:lnTo>
+                  <a:pt x="120000" y="0"/>
+                </a:lnTo>
+                <a:lnTo>
+                  <a:pt x="120000" y="120000"/>
+                </a:lnTo>
+                <a:lnTo>
+                  <a:pt x="0" y="120000"/>
+                </a:lnTo>
+                <a:close/>
+              </a:path>
+            </a:pathLst>
+          </a:custGeom>
+        </p:spPr>
+      </p:sp>
+      <p:sp>
+        <p:nvSpPr>
+          <p:cNvPr id="82" name="Google Shape;82;gac10fef634_0_25:notes"/>
+          <p:cNvSpPr txBox="1">
+            <a:spLocks noGrp="1"/>
+          </p:cNvSpPr>
+          <p:nvPr>
+            <p:ph type="body" idx="1"/>
+          </p:nvPr>
+        </p:nvSpPr>
+        <p:spPr>
+          <a:xfrm>
+            <a:off x="685800" y="4343400"/>
+            <a:ext cx="5486400" cy="4114800"/>
+          </a:xfrm>
+          <a:prstGeom prst="rect">
+            <a:avLst/>
+          </a:prstGeom>
+        </p:spPr>
+        <p:txBody>
+          <a:bodyPr spcFirstLastPara="1" wrap="square" lIns="91425" tIns="91425" rIns="91425" bIns="91425" anchor="t" anchorCtr="0">
+            <a:noAutofit/>
+          </a:bodyPr>
+          <a:lstStyle/>
+          <a:p>
+            <a:pPr marL="0" lvl="0" indent="0" algn="l" rtl="0">
+              <a:spcBef>
+                <a:spcPts val="0"/>
+              </a:spcBef>
+              <a:spcAft>
+                <a:spcPts val="0"/>
+              </a:spcAft>
+              <a:buClr>
+                <a:schemeClr val="dk1"/>
+              </a:buClr>
+              <a:buSzPts val="1100"/>
+              <a:buFont typeface="Arial"/>
+              <a:buNone/>
+            </a:pPr>
+            <a:r>
+              <a:rPr lang="en"/>
+              <a:t>Your version control evidence should go here.  This could be in the form of annotated screenshots which show you you managed this process or you could make a brief screencast explaining how you implemented version control.</a:t>
+            </a:r>
+            <a:endParaRPr/>
+          </a:p>
+          <a:p>
+            <a:pPr marL="0" lvl="0" indent="0" algn="l" rtl="0">
+              <a:spcBef>
+                <a:spcPts val="0"/>
+              </a:spcBef>
+              <a:spcAft>
+                <a:spcPts val="0"/>
+              </a:spcAft>
+              <a:buNone/>
+            </a:pPr>
+            <a:endParaRPr/>
+          </a:p>
+        </p:txBody>
+      </p:sp>
+    </p:spTree>
+    <p:extLst>
+      <p:ext uri="{BB962C8B-B14F-4D97-AF65-F5344CB8AC3E}">
+        <p14:creationId xmlns:p14="http://schemas.microsoft.com/office/powerpoint/2010/main" val="3815843750"/>
+      </p:ext>
+    </p:extLst>
+  </p:cSld>
+  <p:clrMapOvr>
+    <a:masterClrMapping/>
+  </p:clrMapOvr>
+</p:notes>
+</file>
+
+<file path=ppt/notesSlides/notesSlide61.xml><?xml version="1.0" encoding="utf-8"?>
+<p:notes xmlns:a="http://schemas.openxmlformats.org/drawingml/2006/main" xmlns:r="http://schemas.openxmlformats.org/officeDocument/2006/relationships" xmlns:p="http://schemas.openxmlformats.org/presentationml/2006/main" showMasterSp="0" showMasterPhAnim="0">
+  <p:cSld>
+    <p:spTree>
+      <p:nvGrpSpPr>
+        <p:cNvPr id="1" name="Shape 86"/>
+        <p:cNvGrpSpPr/>
+        <p:nvPr/>
+      </p:nvGrpSpPr>
+      <p:grpSpPr>
+        <a:xfrm>
+          <a:off x="0" y="0"/>
+          <a:ext cx="0" cy="0"/>
+          <a:chOff x="0" y="0"/>
+          <a:chExt cx="0" cy="0"/>
+        </a:xfrm>
+      </p:grpSpPr>
+      <p:sp>
+        <p:nvSpPr>
+          <p:cNvPr id="87" name="Google Shape;87;gac10fef634_0_30:notes"/>
+          <p:cNvSpPr>
+            <a:spLocks noGrp="1" noRot="1" noChangeAspect="1"/>
+          </p:cNvSpPr>
+          <p:nvPr>
+            <p:ph type="sldImg" idx="2"/>
+          </p:nvPr>
+        </p:nvSpPr>
+        <p:spPr>
+          <a:xfrm>
+            <a:off x="381000" y="685800"/>
+            <a:ext cx="6096000" cy="3429000"/>
+          </a:xfrm>
+          <a:custGeom>
+            <a:avLst/>
+            <a:gdLst/>
+            <a:ahLst/>
+            <a:cxnLst/>
+            <a:rect l="l" t="t" r="r" b="b"/>
+            <a:pathLst>
+              <a:path w="120000" h="120000" extrusionOk="0">
+                <a:moveTo>
+                  <a:pt x="0" y="0"/>
+                </a:moveTo>
+                <a:lnTo>
+                  <a:pt x="120000" y="0"/>
+                </a:lnTo>
+                <a:lnTo>
+                  <a:pt x="120000" y="120000"/>
+                </a:lnTo>
+                <a:lnTo>
+                  <a:pt x="0" y="120000"/>
+                </a:lnTo>
+                <a:close/>
+              </a:path>
+            </a:pathLst>
+          </a:custGeom>
+        </p:spPr>
+      </p:sp>
+      <p:sp>
+        <p:nvSpPr>
+          <p:cNvPr id="88" name="Google Shape;88;gac10fef634_0_30:notes"/>
+          <p:cNvSpPr txBox="1">
+            <a:spLocks noGrp="1"/>
+          </p:cNvSpPr>
+          <p:nvPr>
+            <p:ph type="body" idx="1"/>
+          </p:nvPr>
+        </p:nvSpPr>
+        <p:spPr>
+          <a:xfrm>
+            <a:off x="685800" y="4343400"/>
+            <a:ext cx="5486400" cy="4114800"/>
+          </a:xfrm>
+          <a:prstGeom prst="rect">
+            <a:avLst/>
+          </a:prstGeom>
+        </p:spPr>
+        <p:txBody>
+          <a:bodyPr spcFirstLastPara="1" wrap="square" lIns="91425" tIns="91425" rIns="91425" bIns="91425" anchor="t" anchorCtr="0">
+            <a:noAutofit/>
+          </a:bodyPr>
+          <a:lstStyle/>
+          <a:p>
+            <a:pPr marL="0" lvl="0" indent="0" algn="l" rtl="0">
+              <a:spcBef>
+                <a:spcPts val="0"/>
+              </a:spcBef>
+              <a:spcAft>
+                <a:spcPts val="0"/>
+              </a:spcAft>
+              <a:buNone/>
+            </a:pPr>
+            <a:r>
+              <a:rPr lang="en"/>
+              <a:t>Discusses how the information from planning, testing and trialling of components assisted in the development of a high-quality outcome</a:t>
+            </a:r>
+            <a:endParaRPr/>
+          </a:p>
+        </p:txBody>
+      </p:sp>
+    </p:spTree>
   </p:cSld>
   <p:clrMapOvr>
     <a:masterClrMapping/>
@@ -28955,6 +29277,567 @@
     <p:bg>
       <p:bgPr>
         <a:solidFill>
+          <a:srgbClr val="D9EAD3"/>
+        </a:solidFill>
+        <a:effectLst/>
+      </p:bgPr>
+    </p:bg>
+    <p:spTree>
+      <p:nvGrpSpPr>
+        <p:cNvPr id="1" name="Shape 72"/>
+        <p:cNvGrpSpPr/>
+        <p:nvPr/>
+      </p:nvGrpSpPr>
+      <p:grpSpPr>
+        <a:xfrm>
+          <a:off x="0" y="0"/>
+          <a:ext cx="0" cy="0"/>
+          <a:chOff x="0" y="0"/>
+          <a:chExt cx="0" cy="0"/>
+        </a:xfrm>
+      </p:grpSpPr>
+      <p:pic>
+        <p:nvPicPr>
+          <p:cNvPr id="3" name="Picture 2">
+            <a:extLst>
+              <a:ext uri="{FF2B5EF4-FFF2-40B4-BE49-F238E27FC236}">
+                <a16:creationId xmlns:a16="http://schemas.microsoft.com/office/drawing/2014/main" id="{2839E1E3-811C-4040-AD92-96ACD0E132E3}"/>
+              </a:ext>
+            </a:extLst>
+          </p:cNvPr>
+          <p:cNvPicPr>
+            <a:picLocks noChangeAspect="1"/>
+          </p:cNvPicPr>
+          <p:nvPr/>
+        </p:nvPicPr>
+        <p:blipFill>
+          <a:blip r:embed="rId3"/>
+          <a:stretch>
+            <a:fillRect/>
+          </a:stretch>
+        </p:blipFill>
+        <p:spPr>
+          <a:xfrm>
+            <a:off x="3500" y="0"/>
+            <a:ext cx="9136999" cy="5143500"/>
+          </a:xfrm>
+          <a:prstGeom prst="rect">
+            <a:avLst/>
+          </a:prstGeom>
+        </p:spPr>
+      </p:pic>
+      <p:sp>
+        <p:nvSpPr>
+          <p:cNvPr id="73" name="Google Shape;73;p16"/>
+          <p:cNvSpPr txBox="1">
+            <a:spLocks noGrp="1"/>
+          </p:cNvSpPr>
+          <p:nvPr>
+            <p:ph type="title"/>
+          </p:nvPr>
+        </p:nvSpPr>
+        <p:spPr>
+          <a:xfrm>
+            <a:off x="311699" y="315485"/>
+            <a:ext cx="8520600" cy="572700"/>
+          </a:xfrm>
+          <a:prstGeom prst="rect">
+            <a:avLst/>
+          </a:prstGeom>
+        </p:spPr>
+        <p:txBody>
+          <a:bodyPr spcFirstLastPara="1" wrap="square" lIns="91425" tIns="91425" rIns="91425" bIns="91425" anchor="t" anchorCtr="0">
+            <a:noAutofit/>
+          </a:bodyPr>
+          <a:lstStyle/>
+          <a:p>
+            <a:pPr marL="0" lvl="0" indent="0" algn="l" rtl="0">
+              <a:spcBef>
+                <a:spcPts val="0"/>
+              </a:spcBef>
+              <a:spcAft>
+                <a:spcPts val="0"/>
+              </a:spcAft>
+              <a:buNone/>
+            </a:pPr>
+            <a:r>
+              <a:rPr lang="en" b="1" dirty="0">
+                <a:latin typeface="Avenir Next LT Pro" panose="020B0504020202020204" pitchFamily="34" charset="0"/>
+              </a:rPr>
+              <a:t>Component 7 Version 5 (Trello screenshot)</a:t>
+            </a:r>
+            <a:endParaRPr b="1" dirty="0">
+              <a:latin typeface="Avenir Next LT Pro" panose="020B0504020202020204" pitchFamily="34" charset="0"/>
+            </a:endParaRPr>
+          </a:p>
+        </p:txBody>
+      </p:sp>
+      <p:pic>
+        <p:nvPicPr>
+          <p:cNvPr id="5" name="Picture 4">
+            <a:extLst>
+              <a:ext uri="{FF2B5EF4-FFF2-40B4-BE49-F238E27FC236}">
+                <a16:creationId xmlns:a16="http://schemas.microsoft.com/office/drawing/2014/main" id="{925B60CA-1A8B-4087-AF44-F414AF1F99D8}"/>
+              </a:ext>
+            </a:extLst>
+          </p:cNvPr>
+          <p:cNvPicPr>
+            <a:picLocks noChangeAspect="1"/>
+          </p:cNvPicPr>
+          <p:nvPr/>
+        </p:nvPicPr>
+        <p:blipFill>
+          <a:blip r:embed="rId4"/>
+          <a:stretch>
+            <a:fillRect/>
+          </a:stretch>
+        </p:blipFill>
+        <p:spPr>
+          <a:xfrm>
+            <a:off x="432859" y="1690597"/>
+            <a:ext cx="8399440" cy="2650490"/>
+          </a:xfrm>
+          <a:prstGeom prst="rect">
+            <a:avLst/>
+          </a:prstGeom>
+        </p:spPr>
+      </p:pic>
+    </p:spTree>
+    <p:extLst>
+      <p:ext uri="{BB962C8B-B14F-4D97-AF65-F5344CB8AC3E}">
+        <p14:creationId xmlns:p14="http://schemas.microsoft.com/office/powerpoint/2010/main" val="2476371492"/>
+      </p:ext>
+    </p:extLst>
+  </p:cSld>
+  <p:clrMapOvr>
+    <a:masterClrMapping/>
+  </p:clrMapOvr>
+</p:sld>
+</file>
+
+<file path=ppt/slides/slide63.xml><?xml version="1.0" encoding="utf-8"?>
+<p:sld xmlns:a="http://schemas.openxmlformats.org/drawingml/2006/main" xmlns:r="http://schemas.openxmlformats.org/officeDocument/2006/relationships" xmlns:p="http://schemas.openxmlformats.org/presentationml/2006/main">
+  <p:cSld>
+    <p:spTree>
+      <p:nvGrpSpPr>
+        <p:cNvPr id="1" name="Shape 77"/>
+        <p:cNvGrpSpPr/>
+        <p:nvPr/>
+      </p:nvGrpSpPr>
+      <p:grpSpPr>
+        <a:xfrm>
+          <a:off x="0" y="0"/>
+          <a:ext cx="0" cy="0"/>
+          <a:chOff x="0" y="0"/>
+          <a:chExt cx="0" cy="0"/>
+        </a:xfrm>
+      </p:grpSpPr>
+      <p:pic>
+        <p:nvPicPr>
+          <p:cNvPr id="3" name="Picture 2">
+            <a:extLst>
+              <a:ext uri="{FF2B5EF4-FFF2-40B4-BE49-F238E27FC236}">
+                <a16:creationId xmlns:a16="http://schemas.microsoft.com/office/drawing/2014/main" id="{E10C2034-E5C4-4ABB-8872-92315B5651AC}"/>
+              </a:ext>
+            </a:extLst>
+          </p:cNvPr>
+          <p:cNvPicPr>
+            <a:picLocks noChangeAspect="1"/>
+          </p:cNvPicPr>
+          <p:nvPr/>
+        </p:nvPicPr>
+        <p:blipFill>
+          <a:blip r:embed="rId3"/>
+          <a:stretch>
+            <a:fillRect/>
+          </a:stretch>
+        </p:blipFill>
+        <p:spPr>
+          <a:xfrm>
+            <a:off x="0" y="1970"/>
+            <a:ext cx="9144000" cy="5139559"/>
+          </a:xfrm>
+          <a:prstGeom prst="rect">
+            <a:avLst/>
+          </a:prstGeom>
+        </p:spPr>
+      </p:pic>
+      <p:sp>
+        <p:nvSpPr>
+          <p:cNvPr id="78" name="Google Shape;78;p17"/>
+          <p:cNvSpPr txBox="1">
+            <a:spLocks noGrp="1"/>
+          </p:cNvSpPr>
+          <p:nvPr>
+            <p:ph type="title"/>
+          </p:nvPr>
+        </p:nvSpPr>
+        <p:spPr>
+          <a:xfrm>
+            <a:off x="285722" y="105412"/>
+            <a:ext cx="8520600" cy="572700"/>
+          </a:xfrm>
+          <a:prstGeom prst="rect">
+            <a:avLst/>
+          </a:prstGeom>
+        </p:spPr>
+        <p:txBody>
+          <a:bodyPr spcFirstLastPara="1" wrap="square" lIns="91425" tIns="91425" rIns="91425" bIns="91425" anchor="t" anchorCtr="0">
+            <a:noAutofit/>
+          </a:bodyPr>
+          <a:lstStyle/>
+          <a:p>
+            <a:pPr marL="0" lvl="0" indent="0" algn="l" rtl="0">
+              <a:spcBef>
+                <a:spcPts val="0"/>
+              </a:spcBef>
+              <a:spcAft>
+                <a:spcPts val="0"/>
+              </a:spcAft>
+              <a:buNone/>
+            </a:pPr>
+            <a:r>
+              <a:rPr lang="en" b="1" dirty="0">
+                <a:latin typeface="Avenir Next LT Pro" panose="020B0504020202020204" pitchFamily="34" charset="0"/>
+              </a:rPr>
+              <a:t>Component 7 Version 5 - Test Plan</a:t>
+            </a:r>
+            <a:endParaRPr b="1" dirty="0">
+              <a:latin typeface="Avenir Next LT Pro" panose="020B0504020202020204" pitchFamily="34" charset="0"/>
+            </a:endParaRPr>
+          </a:p>
+        </p:txBody>
+      </p:sp>
+      <p:graphicFrame>
+        <p:nvGraphicFramePr>
+          <p:cNvPr id="79" name="Google Shape;79;p17"/>
+          <p:cNvGraphicFramePr/>
+          <p:nvPr>
+            <p:extLst>
+              <p:ext uri="{D42A27DB-BD31-4B8C-83A1-F6EECF244321}">
+                <p14:modId xmlns:p14="http://schemas.microsoft.com/office/powerpoint/2010/main" val="3180034552"/>
+              </p:ext>
+            </p:extLst>
+          </p:nvPr>
+        </p:nvGraphicFramePr>
+        <p:xfrm>
+          <a:off x="285722" y="4077998"/>
+          <a:ext cx="8520600" cy="1021050"/>
+        </p:xfrm>
+        <a:graphic>
+          <a:graphicData uri="http://schemas.openxmlformats.org/drawingml/2006/table">
+            <a:tbl>
+              <a:tblPr>
+                <a:noFill/>
+                <a:tableStyleId>{E1099E06-0E6B-448D-9D27-60429F06E6F4}</a:tableStyleId>
+              </a:tblPr>
+              <a:tblGrid>
+                <a:gridCol w="3653818">
+                  <a:extLst>
+                    <a:ext uri="{9D8B030D-6E8A-4147-A177-3AD203B41FA5}">
+                      <a16:colId xmlns:a16="http://schemas.microsoft.com/office/drawing/2014/main" val="20000"/>
+                    </a:ext>
+                  </a:extLst>
+                </a:gridCol>
+                <a:gridCol w="4866782">
+                  <a:extLst>
+                    <a:ext uri="{9D8B030D-6E8A-4147-A177-3AD203B41FA5}">
+                      <a16:colId xmlns:a16="http://schemas.microsoft.com/office/drawing/2014/main" val="20001"/>
+                    </a:ext>
+                  </a:extLst>
+                </a:gridCol>
+              </a:tblGrid>
+              <a:tr h="381000">
+                <a:tc>
+                  <a:txBody>
+                    <a:bodyPr/>
+                    <a:lstStyle/>
+                    <a:p>
+                      <a:pPr marL="0" lvl="0" indent="0" algn="l" rtl="0">
+                        <a:spcBef>
+                          <a:spcPts val="0"/>
+                        </a:spcBef>
+                        <a:spcAft>
+                          <a:spcPts val="0"/>
+                        </a:spcAft>
+                        <a:buNone/>
+                      </a:pPr>
+                      <a:r>
+                        <a:rPr lang="en" sz="1000" b="1" dirty="0">
+                          <a:latin typeface="Avenir Next LT Pro" panose="020B0504020202020204" pitchFamily="34" charset="0"/>
+                        </a:rPr>
+                        <a:t>Test Case</a:t>
+                      </a:r>
+                      <a:endParaRPr sz="1000" b="1" dirty="0">
+                        <a:latin typeface="Avenir Next LT Pro" panose="020B0504020202020204" pitchFamily="34" charset="0"/>
+                      </a:endParaRPr>
+                    </a:p>
+                  </a:txBody>
+                  <a:tcPr marL="91425" marR="91425" marT="91425" marB="91425">
+                    <a:solidFill>
+                      <a:srgbClr val="CCCCCC"/>
+                    </a:solidFill>
+                  </a:tcPr>
+                </a:tc>
+                <a:tc>
+                  <a:txBody>
+                    <a:bodyPr/>
+                    <a:lstStyle/>
+                    <a:p>
+                      <a:pPr marL="0" lvl="0" indent="0" algn="l" rtl="0">
+                        <a:spcBef>
+                          <a:spcPts val="0"/>
+                        </a:spcBef>
+                        <a:spcAft>
+                          <a:spcPts val="0"/>
+                        </a:spcAft>
+                        <a:buNone/>
+                      </a:pPr>
+                      <a:r>
+                        <a:rPr lang="en" sz="1000" b="1" dirty="0">
+                          <a:latin typeface="Avenir Next LT Pro" panose="020B0504020202020204" pitchFamily="34" charset="0"/>
+                        </a:rPr>
+                        <a:t>Expected Values</a:t>
+                      </a:r>
+                      <a:endParaRPr sz="1000" b="1" dirty="0">
+                        <a:latin typeface="Avenir Next LT Pro" panose="020B0504020202020204" pitchFamily="34" charset="0"/>
+                      </a:endParaRPr>
+                    </a:p>
+                  </a:txBody>
+                  <a:tcPr marL="91425" marR="91425" marT="91425" marB="91425">
+                    <a:solidFill>
+                      <a:srgbClr val="CCCCCC"/>
+                    </a:solidFill>
+                  </a:tcPr>
+                </a:tc>
+                <a:extLst>
+                  <a:ext uri="{0D108BD9-81ED-4DB2-BD59-A6C34878D82A}">
+                    <a16:rowId xmlns:a16="http://schemas.microsoft.com/office/drawing/2014/main" val="10000"/>
+                  </a:ext>
+                </a:extLst>
+              </a:tr>
+              <a:tr h="396200">
+                <a:tc>
+                  <a:txBody>
+                    <a:bodyPr/>
+                    <a:lstStyle/>
+                    <a:p>
+                      <a:pPr marL="0" lvl="0" indent="0" algn="l" rtl="0">
+                        <a:spcBef>
+                          <a:spcPts val="0"/>
+                        </a:spcBef>
+                        <a:spcAft>
+                          <a:spcPts val="0"/>
+                        </a:spcAft>
+                        <a:buNone/>
+                      </a:pPr>
+                      <a:r>
+                        <a:rPr lang="en-NZ" sz="1000" dirty="0">
+                          <a:latin typeface="Avenir Next LT Pro" panose="020B0504020202020204" pitchFamily="34" charset="0"/>
+                        </a:rPr>
+                        <a:t>Choose Click and Collect</a:t>
+                      </a:r>
+                    </a:p>
+                    <a:p>
+                      <a:pPr marL="0" lvl="0" indent="0" algn="l" rtl="0">
+                        <a:spcBef>
+                          <a:spcPts val="0"/>
+                        </a:spcBef>
+                        <a:spcAft>
+                          <a:spcPts val="0"/>
+                        </a:spcAft>
+                        <a:buNone/>
+                      </a:pPr>
+                      <a:r>
+                        <a:rPr lang="en-NZ" sz="1000" dirty="0">
+                          <a:latin typeface="Avenir Next LT Pro" panose="020B0504020202020204" pitchFamily="34" charset="0"/>
+                        </a:rPr>
+                        <a:t>Choose Delivery</a:t>
+                      </a:r>
+                    </a:p>
+                    <a:p>
+                      <a:pPr marL="0" lvl="0" indent="0" algn="l" rtl="0">
+                        <a:spcBef>
+                          <a:spcPts val="0"/>
+                        </a:spcBef>
+                        <a:spcAft>
+                          <a:spcPts val="0"/>
+                        </a:spcAft>
+                        <a:buNone/>
+                      </a:pPr>
+                      <a:r>
+                        <a:rPr lang="en-NZ" sz="1000" dirty="0">
+                          <a:latin typeface="Avenir Next LT Pro" panose="020B0504020202020204" pitchFamily="34" charset="0"/>
+                        </a:rPr>
+                        <a:t>***Delivery charge (less than 5) not applied</a:t>
+                      </a:r>
+                    </a:p>
+                  </a:txBody>
+                  <a:tcPr marL="91425" marR="91425" marT="91425" marB="91425"/>
+                </a:tc>
+                <a:tc>
+                  <a:txBody>
+                    <a:bodyPr/>
+                    <a:lstStyle/>
+                    <a:p>
+                      <a:pPr marL="0" lvl="0" indent="0" algn="l" rtl="0">
+                        <a:spcBef>
+                          <a:spcPts val="0"/>
+                        </a:spcBef>
+                        <a:spcAft>
+                          <a:spcPts val="0"/>
+                        </a:spcAft>
+                        <a:buNone/>
+                      </a:pPr>
+                      <a:r>
+                        <a:rPr lang="en-NZ" sz="1000" dirty="0">
+                          <a:latin typeface="Avenir Next LT Pro" panose="020B0504020202020204" pitchFamily="34" charset="0"/>
+                        </a:rPr>
+                        <a:t>Click and collect worked – printed name and phone</a:t>
+                      </a:r>
+                    </a:p>
+                    <a:p>
+                      <a:pPr marL="0" lvl="0" indent="0" algn="l" rtl="0">
+                        <a:spcBef>
+                          <a:spcPts val="0"/>
+                        </a:spcBef>
+                        <a:spcAft>
+                          <a:spcPts val="0"/>
+                        </a:spcAft>
+                        <a:buNone/>
+                      </a:pPr>
+                      <a:r>
+                        <a:rPr lang="en-NZ" sz="1000" dirty="0">
+                          <a:latin typeface="Avenir Next LT Pro" panose="020B0504020202020204" pitchFamily="34" charset="0"/>
+                        </a:rPr>
+                        <a:t>Delivery worked – printed name, phone and address</a:t>
+                      </a:r>
+                      <a:endParaRPr sz="1000" dirty="0">
+                        <a:latin typeface="Avenir Next LT Pro" panose="020B0504020202020204" pitchFamily="34" charset="0"/>
+                      </a:endParaRPr>
+                    </a:p>
+                  </a:txBody>
+                  <a:tcPr marL="91425" marR="91425" marT="91425" marB="91425"/>
+                </a:tc>
+                <a:extLst>
+                  <a:ext uri="{0D108BD9-81ED-4DB2-BD59-A6C34878D82A}">
+                    <a16:rowId xmlns:a16="http://schemas.microsoft.com/office/drawing/2014/main" val="10001"/>
+                  </a:ext>
+                </a:extLst>
+              </a:tr>
+            </a:tbl>
+          </a:graphicData>
+        </a:graphic>
+      </p:graphicFrame>
+      <p:pic>
+        <p:nvPicPr>
+          <p:cNvPr id="8" name="Picture 7">
+            <a:extLst>
+              <a:ext uri="{FF2B5EF4-FFF2-40B4-BE49-F238E27FC236}">
+                <a16:creationId xmlns:a16="http://schemas.microsoft.com/office/drawing/2014/main" id="{9D9C50E4-281C-4FBC-8EC1-A69F772498BD}"/>
+              </a:ext>
+            </a:extLst>
+          </p:cNvPr>
+          <p:cNvPicPr>
+            <a:picLocks noChangeAspect="1"/>
+          </p:cNvPicPr>
+          <p:nvPr/>
+        </p:nvPicPr>
+        <p:blipFill>
+          <a:blip r:embed="rId4"/>
+          <a:stretch>
+            <a:fillRect/>
+          </a:stretch>
+        </p:blipFill>
+        <p:spPr>
+          <a:xfrm>
+            <a:off x="6164790" y="659186"/>
+            <a:ext cx="2031125" cy="1555302"/>
+          </a:xfrm>
+          <a:prstGeom prst="rect">
+            <a:avLst/>
+          </a:prstGeom>
+        </p:spPr>
+      </p:pic>
+      <p:pic>
+        <p:nvPicPr>
+          <p:cNvPr id="10" name="Picture 9">
+            <a:extLst>
+              <a:ext uri="{FF2B5EF4-FFF2-40B4-BE49-F238E27FC236}">
+                <a16:creationId xmlns:a16="http://schemas.microsoft.com/office/drawing/2014/main" id="{98ED3790-9AD4-4927-9531-130FD32BD0EB}"/>
+              </a:ext>
+            </a:extLst>
+          </p:cNvPr>
+          <p:cNvPicPr>
+            <a:picLocks noChangeAspect="1"/>
+          </p:cNvPicPr>
+          <p:nvPr/>
+        </p:nvPicPr>
+        <p:blipFill>
+          <a:blip r:embed="rId5"/>
+          <a:stretch>
+            <a:fillRect/>
+          </a:stretch>
+        </p:blipFill>
+        <p:spPr>
+          <a:xfrm>
+            <a:off x="6164790" y="2266208"/>
+            <a:ext cx="2031125" cy="1708349"/>
+          </a:xfrm>
+          <a:prstGeom prst="rect">
+            <a:avLst/>
+          </a:prstGeom>
+        </p:spPr>
+      </p:pic>
+      <p:pic>
+        <p:nvPicPr>
+          <p:cNvPr id="12" name="Picture 11">
+            <a:extLst>
+              <a:ext uri="{FF2B5EF4-FFF2-40B4-BE49-F238E27FC236}">
+                <a16:creationId xmlns:a16="http://schemas.microsoft.com/office/drawing/2014/main" id="{2D52FDB9-EFBB-41BA-9E17-1AB5B18EC319}"/>
+              </a:ext>
+            </a:extLst>
+          </p:cNvPr>
+          <p:cNvPicPr>
+            <a:picLocks noChangeAspect="1"/>
+          </p:cNvPicPr>
+          <p:nvPr/>
+        </p:nvPicPr>
+        <p:blipFill>
+          <a:blip r:embed="rId6"/>
+          <a:stretch>
+            <a:fillRect/>
+          </a:stretch>
+        </p:blipFill>
+        <p:spPr>
+          <a:xfrm>
+            <a:off x="285721" y="1223694"/>
+            <a:ext cx="5752383" cy="2304366"/>
+          </a:xfrm>
+          <a:prstGeom prst="rect">
+            <a:avLst/>
+          </a:prstGeom>
+        </p:spPr>
+      </p:pic>
+    </p:spTree>
+    <p:extLst>
+      <p:ext uri="{BB962C8B-B14F-4D97-AF65-F5344CB8AC3E}">
+        <p14:creationId xmlns:p14="http://schemas.microsoft.com/office/powerpoint/2010/main" val="4029085213"/>
+      </p:ext>
+    </p:extLst>
+  </p:cSld>
+  <p:clrMapOvr>
+    <a:masterClrMapping/>
+  </p:clrMapOvr>
+</p:sld>
+</file>
+
+<file path=ppt/slides/slide64.xml><?xml version="1.0" encoding="utf-8"?>
+<p:sld xmlns:a="http://schemas.openxmlformats.org/drawingml/2006/main" xmlns:r="http://schemas.openxmlformats.org/officeDocument/2006/relationships" xmlns:p="http://schemas.openxmlformats.org/presentationml/2006/main">
+  <p:cSld>
+    <p:bg>
+      <p:bgPr>
+        <a:solidFill>
           <a:schemeClr val="accent1">
             <a:lumMod val="40000"/>
             <a:lumOff val="60000"/>
@@ -29051,147 +29934,6 @@
 </p:sld>
 </file>
 
-<file path=ppt/slides/slide63.xml><?xml version="1.0" encoding="utf-8"?>
-<p:sld xmlns:a="http://schemas.openxmlformats.org/drawingml/2006/main" xmlns:r="http://schemas.openxmlformats.org/officeDocument/2006/relationships" xmlns:p="http://schemas.openxmlformats.org/presentationml/2006/main">
-  <p:cSld>
-    <p:bg>
-      <p:bgPr>
-        <a:solidFill>
-          <a:srgbClr val="D9EAD3"/>
-        </a:solidFill>
-        <a:effectLst/>
-      </p:bgPr>
-    </p:bg>
-    <p:spTree>
-      <p:nvGrpSpPr>
-        <p:cNvPr id="1" name="Shape 72"/>
-        <p:cNvGrpSpPr/>
-        <p:nvPr/>
-      </p:nvGrpSpPr>
-      <p:grpSpPr>
-        <a:xfrm>
-          <a:off x="0" y="0"/>
-          <a:ext cx="0" cy="0"/>
-          <a:chOff x="0" y="0"/>
-          <a:chExt cx="0" cy="0"/>
-        </a:xfrm>
-      </p:grpSpPr>
-      <p:sp>
-        <p:nvSpPr>
-          <p:cNvPr id="73" name="Google Shape;73;p16"/>
-          <p:cNvSpPr txBox="1">
-            <a:spLocks noGrp="1"/>
-          </p:cNvSpPr>
-          <p:nvPr>
-            <p:ph type="title"/>
-          </p:nvPr>
-        </p:nvSpPr>
-        <p:spPr>
-          <a:xfrm>
-            <a:off x="311700" y="445025"/>
-            <a:ext cx="8520600" cy="1098739"/>
-          </a:xfrm>
-          <a:prstGeom prst="rect">
-            <a:avLst/>
-          </a:prstGeom>
-        </p:spPr>
-        <p:txBody>
-          <a:bodyPr spcFirstLastPara="1" wrap="square" lIns="91425" tIns="91425" rIns="91425" bIns="91425" anchor="t" anchorCtr="0">
-            <a:noAutofit/>
-          </a:bodyPr>
-          <a:lstStyle/>
-          <a:p>
-            <a:r>
-              <a:rPr lang="en" dirty="0"/>
-              <a:t>Functional Testing (Screenshot and explain how you tested your program – use the testing template)</a:t>
-            </a:r>
-            <a:endParaRPr dirty="0"/>
-          </a:p>
-        </p:txBody>
-      </p:sp>
-    </p:spTree>
-    <p:extLst>
-      <p:ext uri="{BB962C8B-B14F-4D97-AF65-F5344CB8AC3E}">
-        <p14:creationId xmlns:p14="http://schemas.microsoft.com/office/powerpoint/2010/main" val="1781413307"/>
-      </p:ext>
-    </p:extLst>
-  </p:cSld>
-  <p:clrMapOvr>
-    <a:masterClrMapping/>
-  </p:clrMapOvr>
-</p:sld>
-</file>
-
-<file path=ppt/slides/slide64.xml><?xml version="1.0" encoding="utf-8"?>
-<p:sld xmlns:a="http://schemas.openxmlformats.org/drawingml/2006/main" xmlns:r="http://schemas.openxmlformats.org/officeDocument/2006/relationships" xmlns:p="http://schemas.openxmlformats.org/presentationml/2006/main">
-  <p:cSld>
-    <p:bg>
-      <p:bgPr>
-        <a:solidFill>
-          <a:srgbClr val="D9EAD3"/>
-        </a:solidFill>
-        <a:effectLst/>
-      </p:bgPr>
-    </p:bg>
-    <p:spTree>
-      <p:nvGrpSpPr>
-        <p:cNvPr id="1" name="Shape 72"/>
-        <p:cNvGrpSpPr/>
-        <p:nvPr/>
-      </p:nvGrpSpPr>
-      <p:grpSpPr>
-        <a:xfrm>
-          <a:off x="0" y="0"/>
-          <a:ext cx="0" cy="0"/>
-          <a:chOff x="0" y="0"/>
-          <a:chExt cx="0" cy="0"/>
-        </a:xfrm>
-      </p:grpSpPr>
-      <p:sp>
-        <p:nvSpPr>
-          <p:cNvPr id="73" name="Google Shape;73;p16"/>
-          <p:cNvSpPr txBox="1">
-            <a:spLocks noGrp="1"/>
-          </p:cNvSpPr>
-          <p:nvPr>
-            <p:ph type="title"/>
-          </p:nvPr>
-        </p:nvSpPr>
-        <p:spPr>
-          <a:xfrm>
-            <a:off x="311700" y="445025"/>
-            <a:ext cx="8520600" cy="1098739"/>
-          </a:xfrm>
-          <a:prstGeom prst="rect">
-            <a:avLst/>
-          </a:prstGeom>
-        </p:spPr>
-        <p:txBody>
-          <a:bodyPr spcFirstLastPara="1" wrap="square" lIns="91425" tIns="91425" rIns="91425" bIns="91425" anchor="t" anchorCtr="0">
-            <a:noAutofit/>
-          </a:bodyPr>
-          <a:lstStyle/>
-          <a:p>
-            <a:r>
-              <a:rPr lang="en" dirty="0"/>
-              <a:t>Using evidence of testing show how you refined your program (duplicate slides)</a:t>
-            </a:r>
-          </a:p>
-        </p:txBody>
-      </p:sp>
-    </p:spTree>
-    <p:extLst>
-      <p:ext uri="{BB962C8B-B14F-4D97-AF65-F5344CB8AC3E}">
-        <p14:creationId xmlns:p14="http://schemas.microsoft.com/office/powerpoint/2010/main" val="3394932069"/>
-      </p:ext>
-    </p:extLst>
-  </p:cSld>
-  <p:clrMapOvr>
-    <a:masterClrMapping/>
-  </p:clrMapOvr>
-</p:sld>
-</file>
-
 <file path=ppt/slides/slide65.xml><?xml version="1.0" encoding="utf-8"?>
 <p:sld xmlns:a="http://schemas.openxmlformats.org/drawingml/2006/main" xmlns:r="http://schemas.openxmlformats.org/officeDocument/2006/relationships" xmlns:p="http://schemas.openxmlformats.org/presentationml/2006/main">
   <p:cSld>
@@ -29244,7 +29986,7 @@
           <a:p>
             <a:r>
               <a:rPr lang="en" dirty="0"/>
-              <a:t>User Testing (Screenshot and show feedback from a range of users/testers)</a:t>
+              <a:t>Functional Testing (Screenshot and explain how you tested your program – use the testing template)</a:t>
             </a:r>
             <a:endParaRPr dirty="0"/>
           </a:p>
@@ -29253,7 +29995,7 @@
     </p:spTree>
     <p:extLst>
       <p:ext uri="{BB962C8B-B14F-4D97-AF65-F5344CB8AC3E}">
-        <p14:creationId xmlns:p14="http://schemas.microsoft.com/office/powerpoint/2010/main" val="2712176924"/>
+        <p14:creationId xmlns:p14="http://schemas.microsoft.com/office/powerpoint/2010/main" val="1781413307"/>
       </p:ext>
     </p:extLst>
   </p:cSld>
@@ -29315,6 +30057,147 @@
           <a:p>
             <a:r>
               <a:rPr lang="en" dirty="0"/>
+              <a:t>Using evidence of testing show how you refined your program (duplicate slides)</a:t>
+            </a:r>
+          </a:p>
+        </p:txBody>
+      </p:sp>
+    </p:spTree>
+    <p:extLst>
+      <p:ext uri="{BB962C8B-B14F-4D97-AF65-F5344CB8AC3E}">
+        <p14:creationId xmlns:p14="http://schemas.microsoft.com/office/powerpoint/2010/main" val="3394932069"/>
+      </p:ext>
+    </p:extLst>
+  </p:cSld>
+  <p:clrMapOvr>
+    <a:masterClrMapping/>
+  </p:clrMapOvr>
+</p:sld>
+</file>
+
+<file path=ppt/slides/slide67.xml><?xml version="1.0" encoding="utf-8"?>
+<p:sld xmlns:a="http://schemas.openxmlformats.org/drawingml/2006/main" xmlns:r="http://schemas.openxmlformats.org/officeDocument/2006/relationships" xmlns:p="http://schemas.openxmlformats.org/presentationml/2006/main">
+  <p:cSld>
+    <p:bg>
+      <p:bgPr>
+        <a:solidFill>
+          <a:srgbClr val="D9EAD3"/>
+        </a:solidFill>
+        <a:effectLst/>
+      </p:bgPr>
+    </p:bg>
+    <p:spTree>
+      <p:nvGrpSpPr>
+        <p:cNvPr id="1" name="Shape 72"/>
+        <p:cNvGrpSpPr/>
+        <p:nvPr/>
+      </p:nvGrpSpPr>
+      <p:grpSpPr>
+        <a:xfrm>
+          <a:off x="0" y="0"/>
+          <a:ext cx="0" cy="0"/>
+          <a:chOff x="0" y="0"/>
+          <a:chExt cx="0" cy="0"/>
+        </a:xfrm>
+      </p:grpSpPr>
+      <p:sp>
+        <p:nvSpPr>
+          <p:cNvPr id="73" name="Google Shape;73;p16"/>
+          <p:cNvSpPr txBox="1">
+            <a:spLocks noGrp="1"/>
+          </p:cNvSpPr>
+          <p:nvPr>
+            <p:ph type="title"/>
+          </p:nvPr>
+        </p:nvSpPr>
+        <p:spPr>
+          <a:xfrm>
+            <a:off x="311700" y="445025"/>
+            <a:ext cx="8520600" cy="1098739"/>
+          </a:xfrm>
+          <a:prstGeom prst="rect">
+            <a:avLst/>
+          </a:prstGeom>
+        </p:spPr>
+        <p:txBody>
+          <a:bodyPr spcFirstLastPara="1" wrap="square" lIns="91425" tIns="91425" rIns="91425" bIns="91425" anchor="t" anchorCtr="0">
+            <a:noAutofit/>
+          </a:bodyPr>
+          <a:lstStyle/>
+          <a:p>
+            <a:r>
+              <a:rPr lang="en" dirty="0"/>
+              <a:t>User Testing (Screenshot and show feedback from a range of users/testers)</a:t>
+            </a:r>
+            <a:endParaRPr dirty="0"/>
+          </a:p>
+        </p:txBody>
+      </p:sp>
+    </p:spTree>
+    <p:extLst>
+      <p:ext uri="{BB962C8B-B14F-4D97-AF65-F5344CB8AC3E}">
+        <p14:creationId xmlns:p14="http://schemas.microsoft.com/office/powerpoint/2010/main" val="2712176924"/>
+      </p:ext>
+    </p:extLst>
+  </p:cSld>
+  <p:clrMapOvr>
+    <a:masterClrMapping/>
+  </p:clrMapOvr>
+</p:sld>
+</file>
+
+<file path=ppt/slides/slide68.xml><?xml version="1.0" encoding="utf-8"?>
+<p:sld xmlns:a="http://schemas.openxmlformats.org/drawingml/2006/main" xmlns:r="http://schemas.openxmlformats.org/officeDocument/2006/relationships" xmlns:p="http://schemas.openxmlformats.org/presentationml/2006/main">
+  <p:cSld>
+    <p:bg>
+      <p:bgPr>
+        <a:solidFill>
+          <a:srgbClr val="D9EAD3"/>
+        </a:solidFill>
+        <a:effectLst/>
+      </p:bgPr>
+    </p:bg>
+    <p:spTree>
+      <p:nvGrpSpPr>
+        <p:cNvPr id="1" name="Shape 72"/>
+        <p:cNvGrpSpPr/>
+        <p:nvPr/>
+      </p:nvGrpSpPr>
+      <p:grpSpPr>
+        <a:xfrm>
+          <a:off x="0" y="0"/>
+          <a:ext cx="0" cy="0"/>
+          <a:chOff x="0" y="0"/>
+          <a:chExt cx="0" cy="0"/>
+        </a:xfrm>
+      </p:grpSpPr>
+      <p:sp>
+        <p:nvSpPr>
+          <p:cNvPr id="73" name="Google Shape;73;p16"/>
+          <p:cNvSpPr txBox="1">
+            <a:spLocks noGrp="1"/>
+          </p:cNvSpPr>
+          <p:nvPr>
+            <p:ph type="title"/>
+          </p:nvPr>
+        </p:nvSpPr>
+        <p:spPr>
+          <a:xfrm>
+            <a:off x="311700" y="445025"/>
+            <a:ext cx="8520600" cy="1098739"/>
+          </a:xfrm>
+          <a:prstGeom prst="rect">
+            <a:avLst/>
+          </a:prstGeom>
+        </p:spPr>
+        <p:txBody>
+          <a:bodyPr spcFirstLastPara="1" wrap="square" lIns="91425" tIns="91425" rIns="91425" bIns="91425" anchor="t" anchorCtr="0">
+            <a:noAutofit/>
+          </a:bodyPr>
+          <a:lstStyle/>
+          <a:p>
+            <a:r>
+              <a:rPr lang="en" dirty="0"/>
               <a:t>Using evidence of user feedback show how you refined your program (duplicate slides)</a:t>
             </a:r>
           </a:p>
@@ -29333,7 +30216,7 @@
 </p:sld>
 </file>
 
-<file path=ppt/slides/slide67.xml><?xml version="1.0" encoding="utf-8"?>
+<file path=ppt/slides/slide69.xml><?xml version="1.0" encoding="utf-8"?>
 <p:sld xmlns:a="http://schemas.openxmlformats.org/drawingml/2006/main" xmlns:r="http://schemas.openxmlformats.org/officeDocument/2006/relationships" xmlns:p="http://schemas.openxmlformats.org/presentationml/2006/main">
   <p:cSld>
     <p:bg>
@@ -29435,7 +30318,187 @@
 </p:sld>
 </file>
 
-<file path=ppt/slides/slide68.xml><?xml version="1.0" encoding="utf-8"?>
+<file path=ppt/slides/slide7.xml><?xml version="1.0" encoding="utf-8"?>
+<p:sld xmlns:a="http://schemas.openxmlformats.org/drawingml/2006/main" xmlns:r="http://schemas.openxmlformats.org/officeDocument/2006/relationships" xmlns:p="http://schemas.openxmlformats.org/presentationml/2006/main">
+  <p:cSld>
+    <p:bg>
+      <p:bgPr>
+        <a:solidFill>
+          <a:srgbClr val="FFCC66"/>
+        </a:solidFill>
+        <a:effectLst/>
+      </p:bgPr>
+    </p:bg>
+    <p:spTree>
+      <p:nvGrpSpPr>
+        <p:cNvPr id="1" name=""/>
+        <p:cNvGrpSpPr/>
+        <p:nvPr/>
+      </p:nvGrpSpPr>
+      <p:grpSpPr>
+        <a:xfrm>
+          <a:off x="0" y="0"/>
+          <a:ext cx="0" cy="0"/>
+          <a:chOff x="0" y="0"/>
+          <a:chExt cx="0" cy="0"/>
+        </a:xfrm>
+      </p:grpSpPr>
+      <p:pic>
+        <p:nvPicPr>
+          <p:cNvPr id="5" name="Picture 4">
+            <a:extLst>
+              <a:ext uri="{FF2B5EF4-FFF2-40B4-BE49-F238E27FC236}">
+                <a16:creationId xmlns:a16="http://schemas.microsoft.com/office/drawing/2014/main" id="{F55164D2-1D02-401E-AAD4-5D59D0238303}"/>
+              </a:ext>
+            </a:extLst>
+          </p:cNvPr>
+          <p:cNvPicPr>
+            <a:picLocks noChangeAspect="1"/>
+          </p:cNvPicPr>
+          <p:nvPr/>
+        </p:nvPicPr>
+        <p:blipFill>
+          <a:blip r:embed="rId2"/>
+          <a:stretch>
+            <a:fillRect/>
+          </a:stretch>
+        </p:blipFill>
+        <p:spPr>
+          <a:xfrm>
+            <a:off x="0" y="13181"/>
+            <a:ext cx="9144000" cy="5117138"/>
+          </a:xfrm>
+          <a:prstGeom prst="rect">
+            <a:avLst/>
+          </a:prstGeom>
+        </p:spPr>
+      </p:pic>
+      <p:sp>
+        <p:nvSpPr>
+          <p:cNvPr id="2" name="Title 1">
+            <a:extLst>
+              <a:ext uri="{FF2B5EF4-FFF2-40B4-BE49-F238E27FC236}">
+                <a16:creationId xmlns:a16="http://schemas.microsoft.com/office/drawing/2014/main" id="{5912979F-6922-40FD-B6E0-0506FA25714D}"/>
+              </a:ext>
+            </a:extLst>
+          </p:cNvPr>
+          <p:cNvSpPr>
+            <a:spLocks noGrp="1"/>
+          </p:cNvSpPr>
+          <p:nvPr>
+            <p:ph type="title"/>
+          </p:nvPr>
+        </p:nvSpPr>
+        <p:spPr>
+          <a:xfrm>
+            <a:off x="433620" y="445025"/>
+            <a:ext cx="8520600" cy="572700"/>
+          </a:xfrm>
+        </p:spPr>
+        <p:txBody>
+          <a:bodyPr/>
+          <a:lstStyle/>
+          <a:p>
+            <a:r>
+              <a:rPr lang="en-US" b="1" dirty="0">
+                <a:latin typeface="Avenir Next LT Pro" panose="020B0504020202020204" pitchFamily="34" charset="0"/>
+              </a:rPr>
+              <a:t>Implication 2 – Usability (Error Recovery)</a:t>
+            </a:r>
+            <a:endParaRPr lang="en-NZ" b="1" dirty="0">
+              <a:latin typeface="Avenir Next LT Pro" panose="020B0504020202020204" pitchFamily="34" charset="0"/>
+            </a:endParaRPr>
+          </a:p>
+        </p:txBody>
+      </p:sp>
+      <p:sp>
+        <p:nvSpPr>
+          <p:cNvPr id="3" name="Text Placeholder 2">
+            <a:extLst>
+              <a:ext uri="{FF2B5EF4-FFF2-40B4-BE49-F238E27FC236}">
+                <a16:creationId xmlns:a16="http://schemas.microsoft.com/office/drawing/2014/main" id="{1EB42CE1-67BF-466B-8C2C-7F21A8892B1E}"/>
+              </a:ext>
+            </a:extLst>
+          </p:cNvPr>
+          <p:cNvSpPr>
+            <a:spLocks noGrp="1"/>
+          </p:cNvSpPr>
+          <p:nvPr>
+            <p:ph type="body" idx="1"/>
+          </p:nvPr>
+        </p:nvSpPr>
+        <p:spPr/>
+        <p:txBody>
+          <a:bodyPr/>
+          <a:lstStyle/>
+          <a:p>
+            <a:pPr marL="114300" indent="0">
+              <a:buNone/>
+            </a:pPr>
+            <a:r>
+              <a:rPr lang="en-US" u="sng" dirty="0">
+                <a:solidFill>
+                  <a:schemeClr val="tx1"/>
+                </a:solidFill>
+                <a:latin typeface="Avenir Next LT Pro" panose="020B0504020202020204" pitchFamily="34" charset="0"/>
+              </a:rPr>
+              <a:t>Explain why it needs to be considered:</a:t>
+            </a:r>
+          </a:p>
+          <a:p>
+            <a:pPr marL="114300" indent="0">
+              <a:buNone/>
+            </a:pPr>
+            <a:r>
+              <a:rPr lang="en-US" dirty="0">
+                <a:solidFill>
+                  <a:schemeClr val="tx1"/>
+                </a:solidFill>
+                <a:latin typeface="Avenir Next LT Pro" panose="020B0504020202020204" pitchFamily="34" charset="0"/>
+              </a:rPr>
+              <a:t>This implication needs to be considered to make sure that the customer can move on to the next stage if they make an error; whether it was accidental or a mistake. Customers will know that something has gone wrong and, thus, will prevent any problems in the future if they make an error in their responses/answers. Otherwise, the program could lead to failure and stop responding, making the user frustrated.</a:t>
+            </a:r>
+          </a:p>
+          <a:p>
+            <a:pPr marL="114300" indent="0">
+              <a:buNone/>
+            </a:pPr>
+            <a:endParaRPr lang="en-US" dirty="0">
+              <a:latin typeface="Avenir Next LT Pro" panose="020B0504020202020204" pitchFamily="34" charset="0"/>
+            </a:endParaRPr>
+          </a:p>
+          <a:p>
+            <a:pPr marL="114300" indent="0">
+              <a:buNone/>
+            </a:pPr>
+            <a:endParaRPr lang="en-US" dirty="0">
+              <a:latin typeface="Avenir Next LT Pro" panose="020B0504020202020204" pitchFamily="34" charset="0"/>
+            </a:endParaRPr>
+          </a:p>
+          <a:p>
+            <a:pPr marL="114300" indent="0">
+              <a:buNone/>
+            </a:pPr>
+            <a:endParaRPr lang="en-NZ" dirty="0">
+              <a:latin typeface="Avenir Next LT Pro" panose="020B0504020202020204" pitchFamily="34" charset="0"/>
+            </a:endParaRPr>
+          </a:p>
+        </p:txBody>
+      </p:sp>
+    </p:spTree>
+    <p:extLst>
+      <p:ext uri="{BB962C8B-B14F-4D97-AF65-F5344CB8AC3E}">
+        <p14:creationId xmlns:p14="http://schemas.microsoft.com/office/powerpoint/2010/main" val="3102438580"/>
+      </p:ext>
+    </p:extLst>
+  </p:cSld>
+  <p:clrMapOvr>
+    <a:masterClrMapping/>
+  </p:clrMapOvr>
+</p:sld>
+</file>
+
+<file path=ppt/slides/slide70.xml><?xml version="1.0" encoding="utf-8"?>
 <p:sld xmlns:a="http://schemas.openxmlformats.org/drawingml/2006/main" xmlns:r="http://schemas.openxmlformats.org/officeDocument/2006/relationships" xmlns:p="http://schemas.openxmlformats.org/presentationml/2006/main">
   <p:cSld>
     <p:bg>
@@ -29552,7 +30615,7 @@
 </p:sld>
 </file>
 
-<file path=ppt/slides/slide69.xml><?xml version="1.0" encoding="utf-8"?>
+<file path=ppt/slides/slide71.xml><?xml version="1.0" encoding="utf-8"?>
 <p:sld xmlns:a="http://schemas.openxmlformats.org/drawingml/2006/main" xmlns:r="http://schemas.openxmlformats.org/officeDocument/2006/relationships" xmlns:p="http://schemas.openxmlformats.org/presentationml/2006/main">
   <p:cSld>
     <p:bg>
@@ -29658,187 +30721,7 @@
 </p:sld>
 </file>
 
-<file path=ppt/slides/slide7.xml><?xml version="1.0" encoding="utf-8"?>
-<p:sld xmlns:a="http://schemas.openxmlformats.org/drawingml/2006/main" xmlns:r="http://schemas.openxmlformats.org/officeDocument/2006/relationships" xmlns:p="http://schemas.openxmlformats.org/presentationml/2006/main">
-  <p:cSld>
-    <p:bg>
-      <p:bgPr>
-        <a:solidFill>
-          <a:srgbClr val="FFCC66"/>
-        </a:solidFill>
-        <a:effectLst/>
-      </p:bgPr>
-    </p:bg>
-    <p:spTree>
-      <p:nvGrpSpPr>
-        <p:cNvPr id="1" name=""/>
-        <p:cNvGrpSpPr/>
-        <p:nvPr/>
-      </p:nvGrpSpPr>
-      <p:grpSpPr>
-        <a:xfrm>
-          <a:off x="0" y="0"/>
-          <a:ext cx="0" cy="0"/>
-          <a:chOff x="0" y="0"/>
-          <a:chExt cx="0" cy="0"/>
-        </a:xfrm>
-      </p:grpSpPr>
-      <p:pic>
-        <p:nvPicPr>
-          <p:cNvPr id="5" name="Picture 4">
-            <a:extLst>
-              <a:ext uri="{FF2B5EF4-FFF2-40B4-BE49-F238E27FC236}">
-                <a16:creationId xmlns:a16="http://schemas.microsoft.com/office/drawing/2014/main" id="{F55164D2-1D02-401E-AAD4-5D59D0238303}"/>
-              </a:ext>
-            </a:extLst>
-          </p:cNvPr>
-          <p:cNvPicPr>
-            <a:picLocks noChangeAspect="1"/>
-          </p:cNvPicPr>
-          <p:nvPr/>
-        </p:nvPicPr>
-        <p:blipFill>
-          <a:blip r:embed="rId2"/>
-          <a:stretch>
-            <a:fillRect/>
-          </a:stretch>
-        </p:blipFill>
-        <p:spPr>
-          <a:xfrm>
-            <a:off x="0" y="13181"/>
-            <a:ext cx="9144000" cy="5117138"/>
-          </a:xfrm>
-          <a:prstGeom prst="rect">
-            <a:avLst/>
-          </a:prstGeom>
-        </p:spPr>
-      </p:pic>
-      <p:sp>
-        <p:nvSpPr>
-          <p:cNvPr id="2" name="Title 1">
-            <a:extLst>
-              <a:ext uri="{FF2B5EF4-FFF2-40B4-BE49-F238E27FC236}">
-                <a16:creationId xmlns:a16="http://schemas.microsoft.com/office/drawing/2014/main" id="{5912979F-6922-40FD-B6E0-0506FA25714D}"/>
-              </a:ext>
-            </a:extLst>
-          </p:cNvPr>
-          <p:cNvSpPr>
-            <a:spLocks noGrp="1"/>
-          </p:cNvSpPr>
-          <p:nvPr>
-            <p:ph type="title"/>
-          </p:nvPr>
-        </p:nvSpPr>
-        <p:spPr>
-          <a:xfrm>
-            <a:off x="433620" y="445025"/>
-            <a:ext cx="8520600" cy="572700"/>
-          </a:xfrm>
-        </p:spPr>
-        <p:txBody>
-          <a:bodyPr/>
-          <a:lstStyle/>
-          <a:p>
-            <a:r>
-              <a:rPr lang="en-US" b="1" dirty="0">
-                <a:latin typeface="Avenir Next LT Pro" panose="020B0504020202020204" pitchFamily="34" charset="0"/>
-              </a:rPr>
-              <a:t>Implication 2 – Usability (Error Recovery)</a:t>
-            </a:r>
-            <a:endParaRPr lang="en-NZ" b="1" dirty="0">
-              <a:latin typeface="Avenir Next LT Pro" panose="020B0504020202020204" pitchFamily="34" charset="0"/>
-            </a:endParaRPr>
-          </a:p>
-        </p:txBody>
-      </p:sp>
-      <p:sp>
-        <p:nvSpPr>
-          <p:cNvPr id="3" name="Text Placeholder 2">
-            <a:extLst>
-              <a:ext uri="{FF2B5EF4-FFF2-40B4-BE49-F238E27FC236}">
-                <a16:creationId xmlns:a16="http://schemas.microsoft.com/office/drawing/2014/main" id="{1EB42CE1-67BF-466B-8C2C-7F21A8892B1E}"/>
-              </a:ext>
-            </a:extLst>
-          </p:cNvPr>
-          <p:cNvSpPr>
-            <a:spLocks noGrp="1"/>
-          </p:cNvSpPr>
-          <p:nvPr>
-            <p:ph type="body" idx="1"/>
-          </p:nvPr>
-        </p:nvSpPr>
-        <p:spPr/>
-        <p:txBody>
-          <a:bodyPr/>
-          <a:lstStyle/>
-          <a:p>
-            <a:pPr marL="114300" indent="0">
-              <a:buNone/>
-            </a:pPr>
-            <a:r>
-              <a:rPr lang="en-US" u="sng" dirty="0">
-                <a:solidFill>
-                  <a:schemeClr val="tx1"/>
-                </a:solidFill>
-                <a:latin typeface="Avenir Next LT Pro" panose="020B0504020202020204" pitchFamily="34" charset="0"/>
-              </a:rPr>
-              <a:t>Explain why it needs to be considered:</a:t>
-            </a:r>
-          </a:p>
-          <a:p>
-            <a:pPr marL="114300" indent="0">
-              <a:buNone/>
-            </a:pPr>
-            <a:r>
-              <a:rPr lang="en-US" dirty="0">
-                <a:solidFill>
-                  <a:schemeClr val="tx1"/>
-                </a:solidFill>
-                <a:latin typeface="Avenir Next LT Pro" panose="020B0504020202020204" pitchFamily="34" charset="0"/>
-              </a:rPr>
-              <a:t>This implication needs to be considered to make sure that the customer can move on to the next stage if they make an error; whether it was accidental or a mistake. Customers will know that something has gone wrong and, thus, will prevent any problems in the future if they make an error in their responses/answers. Otherwise, the program could lead to failure and stop responding, making the user frustrated.</a:t>
-            </a:r>
-          </a:p>
-          <a:p>
-            <a:pPr marL="114300" indent="0">
-              <a:buNone/>
-            </a:pPr>
-            <a:endParaRPr lang="en-US" dirty="0">
-              <a:latin typeface="Avenir Next LT Pro" panose="020B0504020202020204" pitchFamily="34" charset="0"/>
-            </a:endParaRPr>
-          </a:p>
-          <a:p>
-            <a:pPr marL="114300" indent="0">
-              <a:buNone/>
-            </a:pPr>
-            <a:endParaRPr lang="en-US" dirty="0">
-              <a:latin typeface="Avenir Next LT Pro" panose="020B0504020202020204" pitchFamily="34" charset="0"/>
-            </a:endParaRPr>
-          </a:p>
-          <a:p>
-            <a:pPr marL="114300" indent="0">
-              <a:buNone/>
-            </a:pPr>
-            <a:endParaRPr lang="en-NZ" dirty="0">
-              <a:latin typeface="Avenir Next LT Pro" panose="020B0504020202020204" pitchFamily="34" charset="0"/>
-            </a:endParaRPr>
-          </a:p>
-        </p:txBody>
-      </p:sp>
-    </p:spTree>
-    <p:extLst>
-      <p:ext uri="{BB962C8B-B14F-4D97-AF65-F5344CB8AC3E}">
-        <p14:creationId xmlns:p14="http://schemas.microsoft.com/office/powerpoint/2010/main" val="3102438580"/>
-      </p:ext>
-    </p:extLst>
-  </p:cSld>
-  <p:clrMapOvr>
-    <a:masterClrMapping/>
-  </p:clrMapOvr>
-</p:sld>
-</file>
-
-<file path=ppt/slides/slide70.xml><?xml version="1.0" encoding="utf-8"?>
+<file path=ppt/slides/slide72.xml><?xml version="1.0" encoding="utf-8"?>
 <p:sld xmlns:a="http://schemas.openxmlformats.org/drawingml/2006/main" xmlns:r="http://schemas.openxmlformats.org/officeDocument/2006/relationships" xmlns:p="http://schemas.openxmlformats.org/presentationml/2006/main">
   <p:cSld>
     <p:bg>
@@ -29960,7 +30843,7 @@
 </p:sld>
 </file>
 
-<file path=ppt/slides/slide71.xml><?xml version="1.0" encoding="utf-8"?>
+<file path=ppt/slides/slide73.xml><?xml version="1.0" encoding="utf-8"?>
 <p:sld xmlns:a="http://schemas.openxmlformats.org/drawingml/2006/main" xmlns:r="http://schemas.openxmlformats.org/officeDocument/2006/relationships" xmlns:p="http://schemas.openxmlformats.org/presentationml/2006/main">
   <p:cSld>
     <p:bg>
@@ -30082,7 +30965,7 @@
 </p:sld>
 </file>
 
-<file path=ppt/slides/slide72.xml><?xml version="1.0" encoding="utf-8"?>
+<file path=ppt/slides/slide74.xml><?xml version="1.0" encoding="utf-8"?>
 <p:sld xmlns:a="http://schemas.openxmlformats.org/drawingml/2006/main" xmlns:r="http://schemas.openxmlformats.org/officeDocument/2006/relationships" xmlns:p="http://schemas.openxmlformats.org/presentationml/2006/main">
   <p:cSld>
     <p:bg>

</xml_diff>

<commit_message>
Created Confirm/Cancel order option
Created version 1 for confirm/cancel order option.
</commit_message>
<xml_diff>
--- a/Danett Pepito - 000_91896 _ 91897 Documentation - 2150400 (Git).pptx
+++ b/Danett Pepito - 000_91896 _ 91897 Documentation - 2150400 (Git).pptx
@@ -5,7 +5,7 @@
     <p:sldMasterId id="2147483659" r:id="rId1"/>
   </p:sldMasterIdLst>
   <p:notesMasterIdLst>
-    <p:notesMasterId r:id="rId76"/>
+    <p:notesMasterId r:id="rId82"/>
   </p:notesMasterIdLst>
   <p:sldIdLst>
     <p:sldId id="256" r:id="rId2"/>
@@ -71,17 +71,23 @@
     <p:sldId id="330" r:id="rId62"/>
     <p:sldId id="331" r:id="rId63"/>
     <p:sldId id="332" r:id="rId64"/>
-    <p:sldId id="282" r:id="rId65"/>
-    <p:sldId id="288" r:id="rId66"/>
-    <p:sldId id="290" r:id="rId67"/>
-    <p:sldId id="292" r:id="rId68"/>
-    <p:sldId id="291" r:id="rId69"/>
-    <p:sldId id="285" r:id="rId70"/>
-    <p:sldId id="261" r:id="rId71"/>
-    <p:sldId id="284" r:id="rId72"/>
-    <p:sldId id="286" r:id="rId73"/>
-    <p:sldId id="287" r:id="rId74"/>
-    <p:sldId id="262" r:id="rId75"/>
+    <p:sldId id="333" r:id="rId65"/>
+    <p:sldId id="334" r:id="rId66"/>
+    <p:sldId id="335" r:id="rId67"/>
+    <p:sldId id="336" r:id="rId68"/>
+    <p:sldId id="337" r:id="rId69"/>
+    <p:sldId id="340" r:id="rId70"/>
+    <p:sldId id="282" r:id="rId71"/>
+    <p:sldId id="288" r:id="rId72"/>
+    <p:sldId id="290" r:id="rId73"/>
+    <p:sldId id="292" r:id="rId74"/>
+    <p:sldId id="291" r:id="rId75"/>
+    <p:sldId id="285" r:id="rId76"/>
+    <p:sldId id="261" r:id="rId77"/>
+    <p:sldId id="284" r:id="rId78"/>
+    <p:sldId id="286" r:id="rId79"/>
+    <p:sldId id="287" r:id="rId80"/>
+    <p:sldId id="262" r:id="rId81"/>
   </p:sldIdLst>
   <p:sldSz cx="9144000" cy="5143500" type="screen16x9"/>
   <p:notesSz cx="6858000" cy="9144000"/>
@@ -336,7 +342,7 @@
 <file path=ppt/revisionInfo.xml><?xml version="1.0" encoding="utf-8"?>
 <p1510:revInfo xmlns:a="http://schemas.openxmlformats.org/drawingml/2006/main" xmlns:r="http://schemas.openxmlformats.org/officeDocument/2006/relationships" xmlns:p1510="http://schemas.microsoft.com/office/powerpoint/2015/10/main">
   <p1510:revLst>
-    <p1510:client id="{B2185394-3AFD-42B2-9285-3B672C598A56}" v="23" dt="2022-03-21T22:59:15.945"/>
+    <p1510:client id="{B2185394-3AFD-42B2-9285-3B672C598A56}" v="24" dt="2022-03-22T06:25:17.501"/>
   </p1510:revLst>
 </p1510:revInfo>
 </file>
@@ -346,7 +352,7 @@
   <pc:docChgLst>
     <pc:chgData name="Danett Pepito" userId="ddef1e2176689e9a" providerId="LiveId" clId="{B2185394-3AFD-42B2-9285-3B672C598A56}"/>
     <pc:docChg chg="undo custSel addSld delSld modSld sldOrd">
-      <pc:chgData name="Danett Pepito" userId="ddef1e2176689e9a" providerId="LiveId" clId="{B2185394-3AFD-42B2-9285-3B672C598A56}" dt="2022-03-22T05:45:13.315" v="2233" actId="20577"/>
+      <pc:chgData name="Danett Pepito" userId="ddef1e2176689e9a" providerId="LiveId" clId="{B2185394-3AFD-42B2-9285-3B672C598A56}" dt="2022-03-22T06:45:05.842" v="2676" actId="20577"/>
       <pc:docMkLst>
         <pc:docMk/>
       </pc:docMkLst>
@@ -2577,6 +2583,254 @@
           </ac:picMkLst>
         </pc:picChg>
       </pc:sldChg>
+      <pc:sldChg chg="addSp delSp modSp add mod">
+        <pc:chgData name="Danett Pepito" userId="ddef1e2176689e9a" providerId="LiveId" clId="{B2185394-3AFD-42B2-9285-3B672C598A56}" dt="2022-03-22T05:47:58.742" v="2245" actId="1076"/>
+        <pc:sldMkLst>
+          <pc:docMk/>
+          <pc:sldMk cId="371033933" sldId="333"/>
+        </pc:sldMkLst>
+        <pc:spChg chg="mod">
+          <ac:chgData name="Danett Pepito" userId="ddef1e2176689e9a" providerId="LiveId" clId="{B2185394-3AFD-42B2-9285-3B672C598A56}" dt="2022-03-22T05:47:30.986" v="2238" actId="20577"/>
+          <ac:spMkLst>
+            <pc:docMk/>
+            <pc:sldMk cId="371033933" sldId="333"/>
+            <ac:spMk id="73" creationId="{00000000-0000-0000-0000-000000000000}"/>
+          </ac:spMkLst>
+        </pc:spChg>
+        <pc:picChg chg="add mod">
+          <ac:chgData name="Danett Pepito" userId="ddef1e2176689e9a" providerId="LiveId" clId="{B2185394-3AFD-42B2-9285-3B672C598A56}" dt="2022-03-22T05:47:58.742" v="2245" actId="1076"/>
+          <ac:picMkLst>
+            <pc:docMk/>
+            <pc:sldMk cId="371033933" sldId="333"/>
+            <ac:picMk id="4" creationId="{43CD6E65-610D-49F1-BA44-3A9926944D7B}"/>
+          </ac:picMkLst>
+        </pc:picChg>
+        <pc:picChg chg="del">
+          <ac:chgData name="Danett Pepito" userId="ddef1e2176689e9a" providerId="LiveId" clId="{B2185394-3AFD-42B2-9285-3B672C598A56}" dt="2022-03-22T05:47:32.235" v="2239" actId="478"/>
+          <ac:picMkLst>
+            <pc:docMk/>
+            <pc:sldMk cId="371033933" sldId="333"/>
+            <ac:picMk id="5" creationId="{925B60CA-1A8B-4087-AF44-F414AF1F99D8}"/>
+          </ac:picMkLst>
+        </pc:picChg>
+      </pc:sldChg>
+      <pc:sldChg chg="addSp delSp modSp add mod replId">
+        <pc:chgData name="Danett Pepito" userId="ddef1e2176689e9a" providerId="LiveId" clId="{B2185394-3AFD-42B2-9285-3B672C598A56}" dt="2022-03-22T06:25:26.630" v="2422" actId="255"/>
+        <pc:sldMkLst>
+          <pc:docMk/>
+          <pc:sldMk cId="962056596" sldId="334"/>
+        </pc:sldMkLst>
+        <pc:spChg chg="add mod">
+          <ac:chgData name="Danett Pepito" userId="ddef1e2176689e9a" providerId="LiveId" clId="{B2185394-3AFD-42B2-9285-3B672C598A56}" dt="2022-03-22T06:25:26.630" v="2422" actId="255"/>
+          <ac:spMkLst>
+            <pc:docMk/>
+            <pc:sldMk cId="962056596" sldId="334"/>
+            <ac:spMk id="2" creationId="{309AF9B9-2ECD-4E6B-A7E1-A9D791C28D3B}"/>
+          </ac:spMkLst>
+        </pc:spChg>
+        <pc:spChg chg="mod">
+          <ac:chgData name="Danett Pepito" userId="ddef1e2176689e9a" providerId="LiveId" clId="{B2185394-3AFD-42B2-9285-3B672C598A56}" dt="2022-03-22T05:47:27.255" v="2236" actId="20577"/>
+          <ac:spMkLst>
+            <pc:docMk/>
+            <pc:sldMk cId="962056596" sldId="334"/>
+            <ac:spMk id="78" creationId="{00000000-0000-0000-0000-000000000000}"/>
+          </ac:spMkLst>
+        </pc:spChg>
+        <pc:graphicFrameChg chg="modGraphic">
+          <ac:chgData name="Danett Pepito" userId="ddef1e2176689e9a" providerId="LiveId" clId="{B2185394-3AFD-42B2-9285-3B672C598A56}" dt="2022-03-22T06:23:42.884" v="2391" actId="20577"/>
+          <ac:graphicFrameMkLst>
+            <pc:docMk/>
+            <pc:sldMk cId="962056596" sldId="334"/>
+            <ac:graphicFrameMk id="79" creationId="{00000000-0000-0000-0000-000000000000}"/>
+          </ac:graphicFrameMkLst>
+        </pc:graphicFrameChg>
+        <pc:picChg chg="del">
+          <ac:chgData name="Danett Pepito" userId="ddef1e2176689e9a" providerId="LiveId" clId="{B2185394-3AFD-42B2-9285-3B672C598A56}" dt="2022-03-22T05:47:34.978" v="2241" actId="478"/>
+          <ac:picMkLst>
+            <pc:docMk/>
+            <pc:sldMk cId="962056596" sldId="334"/>
+            <ac:picMk id="8" creationId="{9D9C50E4-281C-4FBC-8EC1-A69F772498BD}"/>
+          </ac:picMkLst>
+        </pc:picChg>
+        <pc:picChg chg="del">
+          <ac:chgData name="Danett Pepito" userId="ddef1e2176689e9a" providerId="LiveId" clId="{B2185394-3AFD-42B2-9285-3B672C598A56}" dt="2022-03-22T05:47:35.822" v="2242" actId="478"/>
+          <ac:picMkLst>
+            <pc:docMk/>
+            <pc:sldMk cId="962056596" sldId="334"/>
+            <ac:picMk id="10" creationId="{98ED3790-9AD4-4927-9531-130FD32BD0EB}"/>
+          </ac:picMkLst>
+        </pc:picChg>
+        <pc:picChg chg="del">
+          <ac:chgData name="Danett Pepito" userId="ddef1e2176689e9a" providerId="LiveId" clId="{B2185394-3AFD-42B2-9285-3B672C598A56}" dt="2022-03-22T05:47:34.008" v="2240" actId="478"/>
+          <ac:picMkLst>
+            <pc:docMk/>
+            <pc:sldMk cId="962056596" sldId="334"/>
+            <ac:picMk id="12" creationId="{2D52FDB9-EFBB-41BA-9E17-1AB5B18EC319}"/>
+          </ac:picMkLst>
+        </pc:picChg>
+      </pc:sldChg>
+      <pc:sldChg chg="addSp delSp modSp add mod">
+        <pc:chgData name="Danett Pepito" userId="ddef1e2176689e9a" providerId="LiveId" clId="{B2185394-3AFD-42B2-9285-3B672C598A56}" dt="2022-03-22T06:28:28.128" v="2426" actId="1076"/>
+        <pc:sldMkLst>
+          <pc:docMk/>
+          <pc:sldMk cId="188973074" sldId="335"/>
+        </pc:sldMkLst>
+        <pc:spChg chg="mod">
+          <ac:chgData name="Danett Pepito" userId="ddef1e2176689e9a" providerId="LiveId" clId="{B2185394-3AFD-42B2-9285-3B672C598A56}" dt="2022-03-22T06:25:02.110" v="2396" actId="20577"/>
+          <ac:spMkLst>
+            <pc:docMk/>
+            <pc:sldMk cId="188973074" sldId="335"/>
+            <ac:spMk id="73" creationId="{00000000-0000-0000-0000-000000000000}"/>
+          </ac:spMkLst>
+        </pc:spChg>
+        <pc:picChg chg="del">
+          <ac:chgData name="Danett Pepito" userId="ddef1e2176689e9a" providerId="LiveId" clId="{B2185394-3AFD-42B2-9285-3B672C598A56}" dt="2022-03-22T06:28:23.121" v="2423" actId="478"/>
+          <ac:picMkLst>
+            <pc:docMk/>
+            <pc:sldMk cId="188973074" sldId="335"/>
+            <ac:picMk id="4" creationId="{43CD6E65-610D-49F1-BA44-3A9926944D7B}"/>
+          </ac:picMkLst>
+        </pc:picChg>
+        <pc:picChg chg="add mod">
+          <ac:chgData name="Danett Pepito" userId="ddef1e2176689e9a" providerId="LiveId" clId="{B2185394-3AFD-42B2-9285-3B672C598A56}" dt="2022-03-22T06:28:28.128" v="2426" actId="1076"/>
+          <ac:picMkLst>
+            <pc:docMk/>
+            <pc:sldMk cId="188973074" sldId="335"/>
+            <ac:picMk id="5" creationId="{611C9B7B-37F4-452A-82B3-8A7F77CCDBF4}"/>
+          </ac:picMkLst>
+        </pc:picChg>
+      </pc:sldChg>
+      <pc:sldChg chg="addSp modSp add mod replId">
+        <pc:chgData name="Danett Pepito" userId="ddef1e2176689e9a" providerId="LiveId" clId="{B2185394-3AFD-42B2-9285-3B672C598A56}" dt="2022-03-22T06:40:03.417" v="2653" actId="1076"/>
+        <pc:sldMkLst>
+          <pc:docMk/>
+          <pc:sldMk cId="389038179" sldId="336"/>
+        </pc:sldMkLst>
+        <pc:spChg chg="mod">
+          <ac:chgData name="Danett Pepito" userId="ddef1e2176689e9a" providerId="LiveId" clId="{B2185394-3AFD-42B2-9285-3B672C598A56}" dt="2022-03-22T06:25:07.399" v="2400" actId="20577"/>
+          <ac:spMkLst>
+            <pc:docMk/>
+            <pc:sldMk cId="389038179" sldId="336"/>
+            <ac:spMk id="78" creationId="{00000000-0000-0000-0000-000000000000}"/>
+          </ac:spMkLst>
+        </pc:spChg>
+        <pc:graphicFrameChg chg="mod modGraphic">
+          <ac:chgData name="Danett Pepito" userId="ddef1e2176689e9a" providerId="LiveId" clId="{B2185394-3AFD-42B2-9285-3B672C598A56}" dt="2022-03-22T06:30:14.393" v="2648" actId="313"/>
+          <ac:graphicFrameMkLst>
+            <pc:docMk/>
+            <pc:sldMk cId="389038179" sldId="336"/>
+            <ac:graphicFrameMk id="79" creationId="{00000000-0000-0000-0000-000000000000}"/>
+          </ac:graphicFrameMkLst>
+        </pc:graphicFrameChg>
+        <pc:picChg chg="add mod">
+          <ac:chgData name="Danett Pepito" userId="ddef1e2176689e9a" providerId="LiveId" clId="{B2185394-3AFD-42B2-9285-3B672C598A56}" dt="2022-03-22T06:39:25.612" v="2651" actId="1076"/>
+          <ac:picMkLst>
+            <pc:docMk/>
+            <pc:sldMk cId="389038179" sldId="336"/>
+            <ac:picMk id="4" creationId="{4B5C1DD5-E373-4EB8-8281-8A5CD523DCA1}"/>
+          </ac:picMkLst>
+        </pc:picChg>
+        <pc:picChg chg="add mod">
+          <ac:chgData name="Danett Pepito" userId="ddef1e2176689e9a" providerId="LiveId" clId="{B2185394-3AFD-42B2-9285-3B672C598A56}" dt="2022-03-22T06:40:03.417" v="2653" actId="1076"/>
+          <ac:picMkLst>
+            <pc:docMk/>
+            <pc:sldMk cId="389038179" sldId="336"/>
+            <ac:picMk id="6" creationId="{6476CB8F-7A1D-435E-92D3-F7A2572F01F7}"/>
+          </ac:picMkLst>
+        </pc:picChg>
+      </pc:sldChg>
+      <pc:sldChg chg="addSp delSp modSp add mod">
+        <pc:chgData name="Danett Pepito" userId="ddef1e2176689e9a" providerId="LiveId" clId="{B2185394-3AFD-42B2-9285-3B672C598A56}" dt="2022-03-22T06:43:29.297" v="2664" actId="1076"/>
+        <pc:sldMkLst>
+          <pc:docMk/>
+          <pc:sldMk cId="963759518" sldId="337"/>
+        </pc:sldMkLst>
+        <pc:spChg chg="mod">
+          <ac:chgData name="Danett Pepito" userId="ddef1e2176689e9a" providerId="LiveId" clId="{B2185394-3AFD-42B2-9285-3B672C598A56}" dt="2022-03-22T06:40:21.778" v="2661" actId="20577"/>
+          <ac:spMkLst>
+            <pc:docMk/>
+            <pc:sldMk cId="963759518" sldId="337"/>
+            <ac:spMk id="73" creationId="{00000000-0000-0000-0000-000000000000}"/>
+          </ac:spMkLst>
+        </pc:spChg>
+        <pc:picChg chg="add mod">
+          <ac:chgData name="Danett Pepito" userId="ddef1e2176689e9a" providerId="LiveId" clId="{B2185394-3AFD-42B2-9285-3B672C598A56}" dt="2022-03-22T06:43:29.297" v="2664" actId="1076"/>
+          <ac:picMkLst>
+            <pc:docMk/>
+            <pc:sldMk cId="963759518" sldId="337"/>
+            <ac:picMk id="4" creationId="{1EE274FE-E52B-4AA7-99CA-A8DA4DEFC9B2}"/>
+          </ac:picMkLst>
+        </pc:picChg>
+        <pc:picChg chg="del">
+          <ac:chgData name="Danett Pepito" userId="ddef1e2176689e9a" providerId="LiveId" clId="{B2185394-3AFD-42B2-9285-3B672C598A56}" dt="2022-03-22T06:40:14.692" v="2655" actId="478"/>
+          <ac:picMkLst>
+            <pc:docMk/>
+            <pc:sldMk cId="963759518" sldId="337"/>
+            <ac:picMk id="5" creationId="{611C9B7B-37F4-452A-82B3-8A7F77CCDBF4}"/>
+          </ac:picMkLst>
+        </pc:picChg>
+      </pc:sldChg>
+      <pc:sldChg chg="delSp modSp add del mod replId">
+        <pc:chgData name="Danett Pepito" userId="ddef1e2176689e9a" providerId="LiveId" clId="{B2185394-3AFD-42B2-9285-3B672C598A56}" dt="2022-03-22T06:44:45.591" v="2666" actId="47"/>
+        <pc:sldMkLst>
+          <pc:docMk/>
+          <pc:sldMk cId="1100548520" sldId="338"/>
+        </pc:sldMkLst>
+        <pc:spChg chg="mod">
+          <ac:chgData name="Danett Pepito" userId="ddef1e2176689e9a" providerId="LiveId" clId="{B2185394-3AFD-42B2-9285-3B672C598A56}" dt="2022-03-22T06:40:18.800" v="2659" actId="20577"/>
+          <ac:spMkLst>
+            <pc:docMk/>
+            <pc:sldMk cId="1100548520" sldId="338"/>
+            <ac:spMk id="78" creationId="{00000000-0000-0000-0000-000000000000}"/>
+          </ac:spMkLst>
+        </pc:spChg>
+        <pc:picChg chg="del">
+          <ac:chgData name="Danett Pepito" userId="ddef1e2176689e9a" providerId="LiveId" clId="{B2185394-3AFD-42B2-9285-3B672C598A56}" dt="2022-03-22T06:40:16.305" v="2656" actId="478"/>
+          <ac:picMkLst>
+            <pc:docMk/>
+            <pc:sldMk cId="1100548520" sldId="338"/>
+            <ac:picMk id="4" creationId="{4B5C1DD5-E373-4EB8-8281-8A5CD523DCA1}"/>
+          </ac:picMkLst>
+        </pc:picChg>
+        <pc:picChg chg="del">
+          <ac:chgData name="Danett Pepito" userId="ddef1e2176689e9a" providerId="LiveId" clId="{B2185394-3AFD-42B2-9285-3B672C598A56}" dt="2022-03-22T06:40:17.215" v="2657" actId="478"/>
+          <ac:picMkLst>
+            <pc:docMk/>
+            <pc:sldMk cId="1100548520" sldId="338"/>
+            <ac:picMk id="6" creationId="{6476CB8F-7A1D-435E-92D3-F7A2572F01F7}"/>
+          </ac:picMkLst>
+        </pc:picChg>
+      </pc:sldChg>
+      <pc:sldChg chg="modSp add del mod">
+        <pc:chgData name="Danett Pepito" userId="ddef1e2176689e9a" providerId="LiveId" clId="{B2185394-3AFD-42B2-9285-3B672C598A56}" dt="2022-03-22T06:45:01.455" v="2672" actId="47"/>
+        <pc:sldMkLst>
+          <pc:docMk/>
+          <pc:sldMk cId="2571214232" sldId="339"/>
+        </pc:sldMkLst>
+        <pc:spChg chg="mod">
+          <ac:chgData name="Danett Pepito" userId="ddef1e2176689e9a" providerId="LiveId" clId="{B2185394-3AFD-42B2-9285-3B672C598A56}" dt="2022-03-22T06:44:59.918" v="2671" actId="20577"/>
+          <ac:spMkLst>
+            <pc:docMk/>
+            <pc:sldMk cId="2571214232" sldId="339"/>
+            <ac:spMk id="73" creationId="{00000000-0000-0000-0000-000000000000}"/>
+          </ac:spMkLst>
+        </pc:spChg>
+      </pc:sldChg>
+      <pc:sldChg chg="modSp add mod replId">
+        <pc:chgData name="Danett Pepito" userId="ddef1e2176689e9a" providerId="LiveId" clId="{B2185394-3AFD-42B2-9285-3B672C598A56}" dt="2022-03-22T06:45:05.842" v="2676" actId="20577"/>
+        <pc:sldMkLst>
+          <pc:docMk/>
+          <pc:sldMk cId="744605713" sldId="340"/>
+        </pc:sldMkLst>
+        <pc:spChg chg="mod">
+          <ac:chgData name="Danett Pepito" userId="ddef1e2176689e9a" providerId="LiveId" clId="{B2185394-3AFD-42B2-9285-3B672C598A56}" dt="2022-03-22T06:45:05.842" v="2676" actId="20577"/>
+          <ac:spMkLst>
+            <pc:docMk/>
+            <pc:sldMk cId="744605713" sldId="340"/>
+            <ac:spMk id="78" creationId="{00000000-0000-0000-0000-000000000000}"/>
+          </ac:spMkLst>
+        </pc:spChg>
+      </pc:sldChg>
     </pc:docChg>
   </pc:docChgLst>
 </pc:chgInfo>
@@ -8464,7 +8718,7 @@
     </p:spTree>
     <p:extLst>
       <p:ext uri="{BB962C8B-B14F-4D97-AF65-F5344CB8AC3E}">
-        <p14:creationId xmlns:p14="http://schemas.microsoft.com/office/powerpoint/2010/main" val="3006313543"/>
+        <p14:creationId xmlns:p14="http://schemas.microsoft.com/office/powerpoint/2010/main" val="3415371240"/>
       </p:ext>
     </p:extLst>
   </p:cSld>
@@ -8479,7 +8733,7 @@
   <p:cSld>
     <p:spTree>
       <p:nvGrpSpPr>
-        <p:cNvPr id="1" name="Shape 69"/>
+        <p:cNvPr id="1" name="Shape 74"/>
         <p:cNvGrpSpPr/>
         <p:nvPr/>
       </p:nvGrpSpPr>
@@ -8493,7 +8747,7 @@
       </p:grpSpPr>
       <p:sp>
         <p:nvSpPr>
-          <p:cNvPr id="70" name="Google Shape;70;gac10fef634_0_16:notes"/>
+          <p:cNvPr id="75" name="Google Shape;75;gac10fef634_0_20:notes"/>
           <p:cNvSpPr>
             <a:spLocks noGrp="1" noRot="1" noChangeAspect="1"/>
           </p:cNvSpPr>
@@ -8534,7 +8788,7 @@
       </p:sp>
       <p:sp>
         <p:nvSpPr>
-          <p:cNvPr id="71" name="Google Shape;71;gac10fef634_0_16:notes"/>
+          <p:cNvPr id="76" name="Google Shape;76;gac10fef634_0_20:notes"/>
           <p:cNvSpPr txBox="1">
             <a:spLocks noGrp="1"/>
           </p:cNvSpPr>
@@ -8573,7 +8827,7 @@
     </p:spTree>
     <p:extLst>
       <p:ext uri="{BB962C8B-B14F-4D97-AF65-F5344CB8AC3E}">
-        <p14:creationId xmlns:p14="http://schemas.microsoft.com/office/powerpoint/2010/main" val="2149026663"/>
+        <p14:creationId xmlns:p14="http://schemas.microsoft.com/office/powerpoint/2010/main" val="2336816298"/>
       </p:ext>
     </p:extLst>
   </p:cSld>
@@ -8682,7 +8936,7 @@
     </p:spTree>
     <p:extLst>
       <p:ext uri="{BB962C8B-B14F-4D97-AF65-F5344CB8AC3E}">
-        <p14:creationId xmlns:p14="http://schemas.microsoft.com/office/powerpoint/2010/main" val="3194274356"/>
+        <p14:creationId xmlns:p14="http://schemas.microsoft.com/office/powerpoint/2010/main" val="2342916811"/>
       </p:ext>
     </p:extLst>
   </p:cSld>
@@ -8693,6 +8947,115 @@
 </file>
 
 <file path=ppt/notesSlides/notesSlide57.xml><?xml version="1.0" encoding="utf-8"?>
+<p:notes xmlns:a="http://schemas.openxmlformats.org/drawingml/2006/main" xmlns:r="http://schemas.openxmlformats.org/officeDocument/2006/relationships" xmlns:p="http://schemas.openxmlformats.org/presentationml/2006/main" showMasterSp="0" showMasterPhAnim="0">
+  <p:cSld>
+    <p:spTree>
+      <p:nvGrpSpPr>
+        <p:cNvPr id="1" name="Shape 74"/>
+        <p:cNvGrpSpPr/>
+        <p:nvPr/>
+      </p:nvGrpSpPr>
+      <p:grpSpPr>
+        <a:xfrm>
+          <a:off x="0" y="0"/>
+          <a:ext cx="0" cy="0"/>
+          <a:chOff x="0" y="0"/>
+          <a:chExt cx="0" cy="0"/>
+        </a:xfrm>
+      </p:grpSpPr>
+      <p:sp>
+        <p:nvSpPr>
+          <p:cNvPr id="75" name="Google Shape;75;gac10fef634_0_20:notes"/>
+          <p:cNvSpPr>
+            <a:spLocks noGrp="1" noRot="1" noChangeAspect="1"/>
+          </p:cNvSpPr>
+          <p:nvPr>
+            <p:ph type="sldImg" idx="2"/>
+          </p:nvPr>
+        </p:nvSpPr>
+        <p:spPr>
+          <a:xfrm>
+            <a:off x="381000" y="685800"/>
+            <a:ext cx="6096000" cy="3429000"/>
+          </a:xfrm>
+          <a:custGeom>
+            <a:avLst/>
+            <a:gdLst/>
+            <a:ahLst/>
+            <a:cxnLst/>
+            <a:rect l="l" t="t" r="r" b="b"/>
+            <a:pathLst>
+              <a:path w="120000" h="120000" extrusionOk="0">
+                <a:moveTo>
+                  <a:pt x="0" y="0"/>
+                </a:moveTo>
+                <a:lnTo>
+                  <a:pt x="120000" y="0"/>
+                </a:lnTo>
+                <a:lnTo>
+                  <a:pt x="120000" y="120000"/>
+                </a:lnTo>
+                <a:lnTo>
+                  <a:pt x="0" y="120000"/>
+                </a:lnTo>
+                <a:close/>
+              </a:path>
+            </a:pathLst>
+          </a:custGeom>
+        </p:spPr>
+      </p:sp>
+      <p:sp>
+        <p:nvSpPr>
+          <p:cNvPr id="76" name="Google Shape;76;gac10fef634_0_20:notes"/>
+          <p:cNvSpPr txBox="1">
+            <a:spLocks noGrp="1"/>
+          </p:cNvSpPr>
+          <p:nvPr>
+            <p:ph type="body" idx="1"/>
+          </p:nvPr>
+        </p:nvSpPr>
+        <p:spPr>
+          <a:xfrm>
+            <a:off x="685800" y="4343400"/>
+            <a:ext cx="5486400" cy="4114800"/>
+          </a:xfrm>
+          <a:prstGeom prst="rect">
+            <a:avLst/>
+          </a:prstGeom>
+        </p:spPr>
+        <p:txBody>
+          <a:bodyPr spcFirstLastPara="1" wrap="square" lIns="91425" tIns="91425" rIns="91425" bIns="91425" anchor="t" anchorCtr="0">
+            <a:noAutofit/>
+          </a:bodyPr>
+          <a:lstStyle/>
+          <a:p>
+            <a:pPr marL="0" lvl="0" indent="0" algn="l" rtl="0">
+              <a:spcBef>
+                <a:spcPts val="0"/>
+              </a:spcBef>
+              <a:spcAft>
+                <a:spcPts val="0"/>
+              </a:spcAft>
+              <a:buNone/>
+            </a:pPr>
+            <a:endParaRPr/>
+          </a:p>
+        </p:txBody>
+      </p:sp>
+    </p:spTree>
+    <p:extLst>
+      <p:ext uri="{BB962C8B-B14F-4D97-AF65-F5344CB8AC3E}">
+        <p14:creationId xmlns:p14="http://schemas.microsoft.com/office/powerpoint/2010/main" val="358127104"/>
+      </p:ext>
+    </p:extLst>
+  </p:cSld>
+  <p:clrMapOvr>
+    <a:masterClrMapping/>
+  </p:clrMapOvr>
+</p:notes>
+</file>
+
+<file path=ppt/notesSlides/notesSlide58.xml><?xml version="1.0" encoding="utf-8"?>
 <p:notes xmlns:a="http://schemas.openxmlformats.org/drawingml/2006/main" xmlns:r="http://schemas.openxmlformats.org/officeDocument/2006/relationships" xmlns:p="http://schemas.openxmlformats.org/presentationml/2006/main" showMasterSp="0" showMasterPhAnim="0">
   <p:cSld>
     <p:spTree>
@@ -8791,7 +9154,7 @@
     </p:spTree>
     <p:extLst>
       <p:ext uri="{BB962C8B-B14F-4D97-AF65-F5344CB8AC3E}">
-        <p14:creationId xmlns:p14="http://schemas.microsoft.com/office/powerpoint/2010/main" val="3014292639"/>
+        <p14:creationId xmlns:p14="http://schemas.microsoft.com/office/powerpoint/2010/main" val="3055099913"/>
       </p:ext>
     </p:extLst>
   </p:cSld>
@@ -8801,12 +9164,12 @@
 </p:notes>
 </file>
 
-<file path=ppt/notesSlides/notesSlide58.xml><?xml version="1.0" encoding="utf-8"?>
+<file path=ppt/notesSlides/notesSlide59.xml><?xml version="1.0" encoding="utf-8"?>
 <p:notes xmlns:a="http://schemas.openxmlformats.org/drawingml/2006/main" xmlns:r="http://schemas.openxmlformats.org/officeDocument/2006/relationships" xmlns:p="http://schemas.openxmlformats.org/presentationml/2006/main" showMasterSp="0" showMasterPhAnim="0">
   <p:cSld>
     <p:spTree>
       <p:nvGrpSpPr>
-        <p:cNvPr id="1" name="Shape 80"/>
+        <p:cNvPr id="1" name="Shape 74"/>
         <p:cNvGrpSpPr/>
         <p:nvPr/>
       </p:nvGrpSpPr>
@@ -8820,7 +9183,7 @@
       </p:grpSpPr>
       <p:sp>
         <p:nvSpPr>
-          <p:cNvPr id="81" name="Google Shape;81;gac10fef634_0_25:notes"/>
+          <p:cNvPr id="75" name="Google Shape;75;gac10fef634_0_20:notes"/>
           <p:cNvSpPr>
             <a:spLocks noGrp="1" noRot="1" noChangeAspect="1"/>
           </p:cNvSpPr>
@@ -8861,7 +9224,7 @@
       </p:sp>
       <p:sp>
         <p:nvSpPr>
-          <p:cNvPr id="82" name="Google Shape;82;gac10fef634_0_25:notes"/>
+          <p:cNvPr id="76" name="Google Shape;76;gac10fef634_0_20:notes"/>
           <p:cNvSpPr txBox="1">
             <a:spLocks noGrp="1"/>
           </p:cNvSpPr>
@@ -8891,152 +9254,6 @@
               <a:spcAft>
                 <a:spcPts val="0"/>
               </a:spcAft>
-              <a:buClr>
-                <a:schemeClr val="dk1"/>
-              </a:buClr>
-              <a:buSzPts val="1100"/>
-              <a:buFont typeface="Arial"/>
-              <a:buNone/>
-            </a:pPr>
-            <a:r>
-              <a:rPr lang="en"/>
-              <a:t>Your version control evidence should go here.  This could be in the form of annotated screenshots which show you you managed this process or you could make a brief screencast explaining how you implemented version control.</a:t>
-            </a:r>
-            <a:endParaRPr/>
-          </a:p>
-          <a:p>
-            <a:pPr marL="0" lvl="0" indent="0" algn="l" rtl="0">
-              <a:spcBef>
-                <a:spcPts val="0"/>
-              </a:spcBef>
-              <a:spcAft>
-                <a:spcPts val="0"/>
-              </a:spcAft>
-              <a:buNone/>
-            </a:pPr>
-            <a:endParaRPr/>
-          </a:p>
-        </p:txBody>
-      </p:sp>
-    </p:spTree>
-  </p:cSld>
-  <p:clrMapOvr>
-    <a:masterClrMapping/>
-  </p:clrMapOvr>
-</p:notes>
-</file>
-
-<file path=ppt/notesSlides/notesSlide59.xml><?xml version="1.0" encoding="utf-8"?>
-<p:notes xmlns:a="http://schemas.openxmlformats.org/drawingml/2006/main" xmlns:r="http://schemas.openxmlformats.org/officeDocument/2006/relationships" xmlns:p="http://schemas.openxmlformats.org/presentationml/2006/main" showMasterSp="0" showMasterPhAnim="0">
-  <p:cSld>
-    <p:spTree>
-      <p:nvGrpSpPr>
-        <p:cNvPr id="1" name="Shape 80"/>
-        <p:cNvGrpSpPr/>
-        <p:nvPr/>
-      </p:nvGrpSpPr>
-      <p:grpSpPr>
-        <a:xfrm>
-          <a:off x="0" y="0"/>
-          <a:ext cx="0" cy="0"/>
-          <a:chOff x="0" y="0"/>
-          <a:chExt cx="0" cy="0"/>
-        </a:xfrm>
-      </p:grpSpPr>
-      <p:sp>
-        <p:nvSpPr>
-          <p:cNvPr id="81" name="Google Shape;81;gac10fef634_0_25:notes"/>
-          <p:cNvSpPr>
-            <a:spLocks noGrp="1" noRot="1" noChangeAspect="1"/>
-          </p:cNvSpPr>
-          <p:nvPr>
-            <p:ph type="sldImg" idx="2"/>
-          </p:nvPr>
-        </p:nvSpPr>
-        <p:spPr>
-          <a:xfrm>
-            <a:off x="381000" y="685800"/>
-            <a:ext cx="6096000" cy="3429000"/>
-          </a:xfrm>
-          <a:custGeom>
-            <a:avLst/>
-            <a:gdLst/>
-            <a:ahLst/>
-            <a:cxnLst/>
-            <a:rect l="l" t="t" r="r" b="b"/>
-            <a:pathLst>
-              <a:path w="120000" h="120000" extrusionOk="0">
-                <a:moveTo>
-                  <a:pt x="0" y="0"/>
-                </a:moveTo>
-                <a:lnTo>
-                  <a:pt x="120000" y="0"/>
-                </a:lnTo>
-                <a:lnTo>
-                  <a:pt x="120000" y="120000"/>
-                </a:lnTo>
-                <a:lnTo>
-                  <a:pt x="0" y="120000"/>
-                </a:lnTo>
-                <a:close/>
-              </a:path>
-            </a:pathLst>
-          </a:custGeom>
-        </p:spPr>
-      </p:sp>
-      <p:sp>
-        <p:nvSpPr>
-          <p:cNvPr id="82" name="Google Shape;82;gac10fef634_0_25:notes"/>
-          <p:cNvSpPr txBox="1">
-            <a:spLocks noGrp="1"/>
-          </p:cNvSpPr>
-          <p:nvPr>
-            <p:ph type="body" idx="1"/>
-          </p:nvPr>
-        </p:nvSpPr>
-        <p:spPr>
-          <a:xfrm>
-            <a:off x="685800" y="4343400"/>
-            <a:ext cx="5486400" cy="4114800"/>
-          </a:xfrm>
-          <a:prstGeom prst="rect">
-            <a:avLst/>
-          </a:prstGeom>
-        </p:spPr>
-        <p:txBody>
-          <a:bodyPr spcFirstLastPara="1" wrap="square" lIns="91425" tIns="91425" rIns="91425" bIns="91425" anchor="t" anchorCtr="0">
-            <a:noAutofit/>
-          </a:bodyPr>
-          <a:lstStyle/>
-          <a:p>
-            <a:pPr marL="0" lvl="0" indent="0" algn="l" rtl="0">
-              <a:spcBef>
-                <a:spcPts val="0"/>
-              </a:spcBef>
-              <a:spcAft>
-                <a:spcPts val="0"/>
-              </a:spcAft>
-              <a:buClr>
-                <a:schemeClr val="dk1"/>
-              </a:buClr>
-              <a:buSzPts val="1100"/>
-              <a:buFont typeface="Arial"/>
-              <a:buNone/>
-            </a:pPr>
-            <a:r>
-              <a:rPr lang="en"/>
-              <a:t>Your version control evidence should go here.  This could be in the form of annotated screenshots which show you you managed this process or you could make a brief screencast explaining how you implemented version control.</a:t>
-            </a:r>
-            <a:endParaRPr/>
-          </a:p>
-          <a:p>
-            <a:pPr marL="0" lvl="0" indent="0" algn="l" rtl="0">
-              <a:spcBef>
-                <a:spcPts val="0"/>
-              </a:spcBef>
-              <a:spcAft>
-                <a:spcPts val="0"/>
-              </a:spcAft>
               <a:buNone/>
             </a:pPr>
             <a:endParaRPr/>
@@ -9046,7 +9263,7 @@
     </p:spTree>
     <p:extLst>
       <p:ext uri="{BB962C8B-B14F-4D97-AF65-F5344CB8AC3E}">
-        <p14:creationId xmlns:p14="http://schemas.microsoft.com/office/powerpoint/2010/main" val="511959585"/>
+        <p14:creationId xmlns:p14="http://schemas.microsoft.com/office/powerpoint/2010/main" val="2769025122"/>
       </p:ext>
     </p:extLst>
   </p:cSld>
@@ -9170,6 +9387,442 @@
   <p:cSld>
     <p:spTree>
       <p:nvGrpSpPr>
+        <p:cNvPr id="1" name="Shape 69"/>
+        <p:cNvGrpSpPr/>
+        <p:nvPr/>
+      </p:nvGrpSpPr>
+      <p:grpSpPr>
+        <a:xfrm>
+          <a:off x="0" y="0"/>
+          <a:ext cx="0" cy="0"/>
+          <a:chOff x="0" y="0"/>
+          <a:chExt cx="0" cy="0"/>
+        </a:xfrm>
+      </p:grpSpPr>
+      <p:sp>
+        <p:nvSpPr>
+          <p:cNvPr id="70" name="Google Shape;70;gac10fef634_0_16:notes"/>
+          <p:cNvSpPr>
+            <a:spLocks noGrp="1" noRot="1" noChangeAspect="1"/>
+          </p:cNvSpPr>
+          <p:nvPr>
+            <p:ph type="sldImg" idx="2"/>
+          </p:nvPr>
+        </p:nvSpPr>
+        <p:spPr>
+          <a:xfrm>
+            <a:off x="381000" y="685800"/>
+            <a:ext cx="6096000" cy="3429000"/>
+          </a:xfrm>
+          <a:custGeom>
+            <a:avLst/>
+            <a:gdLst/>
+            <a:ahLst/>
+            <a:cxnLst/>
+            <a:rect l="l" t="t" r="r" b="b"/>
+            <a:pathLst>
+              <a:path w="120000" h="120000" extrusionOk="0">
+                <a:moveTo>
+                  <a:pt x="0" y="0"/>
+                </a:moveTo>
+                <a:lnTo>
+                  <a:pt x="120000" y="0"/>
+                </a:lnTo>
+                <a:lnTo>
+                  <a:pt x="120000" y="120000"/>
+                </a:lnTo>
+                <a:lnTo>
+                  <a:pt x="0" y="120000"/>
+                </a:lnTo>
+                <a:close/>
+              </a:path>
+            </a:pathLst>
+          </a:custGeom>
+        </p:spPr>
+      </p:sp>
+      <p:sp>
+        <p:nvSpPr>
+          <p:cNvPr id="71" name="Google Shape;71;gac10fef634_0_16:notes"/>
+          <p:cNvSpPr txBox="1">
+            <a:spLocks noGrp="1"/>
+          </p:cNvSpPr>
+          <p:nvPr>
+            <p:ph type="body" idx="1"/>
+          </p:nvPr>
+        </p:nvSpPr>
+        <p:spPr>
+          <a:xfrm>
+            <a:off x="685800" y="4343400"/>
+            <a:ext cx="5486400" cy="4114800"/>
+          </a:xfrm>
+          <a:prstGeom prst="rect">
+            <a:avLst/>
+          </a:prstGeom>
+        </p:spPr>
+        <p:txBody>
+          <a:bodyPr spcFirstLastPara="1" wrap="square" lIns="91425" tIns="91425" rIns="91425" bIns="91425" anchor="t" anchorCtr="0">
+            <a:noAutofit/>
+          </a:bodyPr>
+          <a:lstStyle/>
+          <a:p>
+            <a:pPr marL="0" lvl="0" indent="0" algn="l" rtl="0">
+              <a:spcBef>
+                <a:spcPts val="0"/>
+              </a:spcBef>
+              <a:spcAft>
+                <a:spcPts val="0"/>
+              </a:spcAft>
+              <a:buNone/>
+            </a:pPr>
+            <a:endParaRPr/>
+          </a:p>
+        </p:txBody>
+      </p:sp>
+    </p:spTree>
+    <p:extLst>
+      <p:ext uri="{BB962C8B-B14F-4D97-AF65-F5344CB8AC3E}">
+        <p14:creationId xmlns:p14="http://schemas.microsoft.com/office/powerpoint/2010/main" val="3006313543"/>
+      </p:ext>
+    </p:extLst>
+  </p:cSld>
+  <p:clrMapOvr>
+    <a:masterClrMapping/>
+  </p:clrMapOvr>
+</p:notes>
+</file>
+
+<file path=ppt/notesSlides/notesSlide61.xml><?xml version="1.0" encoding="utf-8"?>
+<p:notes xmlns:a="http://schemas.openxmlformats.org/drawingml/2006/main" xmlns:r="http://schemas.openxmlformats.org/officeDocument/2006/relationships" xmlns:p="http://schemas.openxmlformats.org/presentationml/2006/main" showMasterSp="0" showMasterPhAnim="0">
+  <p:cSld>
+    <p:spTree>
+      <p:nvGrpSpPr>
+        <p:cNvPr id="1" name="Shape 69"/>
+        <p:cNvGrpSpPr/>
+        <p:nvPr/>
+      </p:nvGrpSpPr>
+      <p:grpSpPr>
+        <a:xfrm>
+          <a:off x="0" y="0"/>
+          <a:ext cx="0" cy="0"/>
+          <a:chOff x="0" y="0"/>
+          <a:chExt cx="0" cy="0"/>
+        </a:xfrm>
+      </p:grpSpPr>
+      <p:sp>
+        <p:nvSpPr>
+          <p:cNvPr id="70" name="Google Shape;70;gac10fef634_0_16:notes"/>
+          <p:cNvSpPr>
+            <a:spLocks noGrp="1" noRot="1" noChangeAspect="1"/>
+          </p:cNvSpPr>
+          <p:nvPr>
+            <p:ph type="sldImg" idx="2"/>
+          </p:nvPr>
+        </p:nvSpPr>
+        <p:spPr>
+          <a:xfrm>
+            <a:off x="381000" y="685800"/>
+            <a:ext cx="6096000" cy="3429000"/>
+          </a:xfrm>
+          <a:custGeom>
+            <a:avLst/>
+            <a:gdLst/>
+            <a:ahLst/>
+            <a:cxnLst/>
+            <a:rect l="l" t="t" r="r" b="b"/>
+            <a:pathLst>
+              <a:path w="120000" h="120000" extrusionOk="0">
+                <a:moveTo>
+                  <a:pt x="0" y="0"/>
+                </a:moveTo>
+                <a:lnTo>
+                  <a:pt x="120000" y="0"/>
+                </a:lnTo>
+                <a:lnTo>
+                  <a:pt x="120000" y="120000"/>
+                </a:lnTo>
+                <a:lnTo>
+                  <a:pt x="0" y="120000"/>
+                </a:lnTo>
+                <a:close/>
+              </a:path>
+            </a:pathLst>
+          </a:custGeom>
+        </p:spPr>
+      </p:sp>
+      <p:sp>
+        <p:nvSpPr>
+          <p:cNvPr id="71" name="Google Shape;71;gac10fef634_0_16:notes"/>
+          <p:cNvSpPr txBox="1">
+            <a:spLocks noGrp="1"/>
+          </p:cNvSpPr>
+          <p:nvPr>
+            <p:ph type="body" idx="1"/>
+          </p:nvPr>
+        </p:nvSpPr>
+        <p:spPr>
+          <a:xfrm>
+            <a:off x="685800" y="4343400"/>
+            <a:ext cx="5486400" cy="4114800"/>
+          </a:xfrm>
+          <a:prstGeom prst="rect">
+            <a:avLst/>
+          </a:prstGeom>
+        </p:spPr>
+        <p:txBody>
+          <a:bodyPr spcFirstLastPara="1" wrap="square" lIns="91425" tIns="91425" rIns="91425" bIns="91425" anchor="t" anchorCtr="0">
+            <a:noAutofit/>
+          </a:bodyPr>
+          <a:lstStyle/>
+          <a:p>
+            <a:pPr marL="0" lvl="0" indent="0" algn="l" rtl="0">
+              <a:spcBef>
+                <a:spcPts val="0"/>
+              </a:spcBef>
+              <a:spcAft>
+                <a:spcPts val="0"/>
+              </a:spcAft>
+              <a:buNone/>
+            </a:pPr>
+            <a:endParaRPr/>
+          </a:p>
+        </p:txBody>
+      </p:sp>
+    </p:spTree>
+    <p:extLst>
+      <p:ext uri="{BB962C8B-B14F-4D97-AF65-F5344CB8AC3E}">
+        <p14:creationId xmlns:p14="http://schemas.microsoft.com/office/powerpoint/2010/main" val="2149026663"/>
+      </p:ext>
+    </p:extLst>
+  </p:cSld>
+  <p:clrMapOvr>
+    <a:masterClrMapping/>
+  </p:clrMapOvr>
+</p:notes>
+</file>
+
+<file path=ppt/notesSlides/notesSlide62.xml><?xml version="1.0" encoding="utf-8"?>
+<p:notes xmlns:a="http://schemas.openxmlformats.org/drawingml/2006/main" xmlns:r="http://schemas.openxmlformats.org/officeDocument/2006/relationships" xmlns:p="http://schemas.openxmlformats.org/presentationml/2006/main" showMasterSp="0" showMasterPhAnim="0">
+  <p:cSld>
+    <p:spTree>
+      <p:nvGrpSpPr>
+        <p:cNvPr id="1" name="Shape 69"/>
+        <p:cNvGrpSpPr/>
+        <p:nvPr/>
+      </p:nvGrpSpPr>
+      <p:grpSpPr>
+        <a:xfrm>
+          <a:off x="0" y="0"/>
+          <a:ext cx="0" cy="0"/>
+          <a:chOff x="0" y="0"/>
+          <a:chExt cx="0" cy="0"/>
+        </a:xfrm>
+      </p:grpSpPr>
+      <p:sp>
+        <p:nvSpPr>
+          <p:cNvPr id="70" name="Google Shape;70;gac10fef634_0_16:notes"/>
+          <p:cNvSpPr>
+            <a:spLocks noGrp="1" noRot="1" noChangeAspect="1"/>
+          </p:cNvSpPr>
+          <p:nvPr>
+            <p:ph type="sldImg" idx="2"/>
+          </p:nvPr>
+        </p:nvSpPr>
+        <p:spPr>
+          <a:xfrm>
+            <a:off x="381000" y="685800"/>
+            <a:ext cx="6096000" cy="3429000"/>
+          </a:xfrm>
+          <a:custGeom>
+            <a:avLst/>
+            <a:gdLst/>
+            <a:ahLst/>
+            <a:cxnLst/>
+            <a:rect l="l" t="t" r="r" b="b"/>
+            <a:pathLst>
+              <a:path w="120000" h="120000" extrusionOk="0">
+                <a:moveTo>
+                  <a:pt x="0" y="0"/>
+                </a:moveTo>
+                <a:lnTo>
+                  <a:pt x="120000" y="0"/>
+                </a:lnTo>
+                <a:lnTo>
+                  <a:pt x="120000" y="120000"/>
+                </a:lnTo>
+                <a:lnTo>
+                  <a:pt x="0" y="120000"/>
+                </a:lnTo>
+                <a:close/>
+              </a:path>
+            </a:pathLst>
+          </a:custGeom>
+        </p:spPr>
+      </p:sp>
+      <p:sp>
+        <p:nvSpPr>
+          <p:cNvPr id="71" name="Google Shape;71;gac10fef634_0_16:notes"/>
+          <p:cNvSpPr txBox="1">
+            <a:spLocks noGrp="1"/>
+          </p:cNvSpPr>
+          <p:nvPr>
+            <p:ph type="body" idx="1"/>
+          </p:nvPr>
+        </p:nvSpPr>
+        <p:spPr>
+          <a:xfrm>
+            <a:off x="685800" y="4343400"/>
+            <a:ext cx="5486400" cy="4114800"/>
+          </a:xfrm>
+          <a:prstGeom prst="rect">
+            <a:avLst/>
+          </a:prstGeom>
+        </p:spPr>
+        <p:txBody>
+          <a:bodyPr spcFirstLastPara="1" wrap="square" lIns="91425" tIns="91425" rIns="91425" bIns="91425" anchor="t" anchorCtr="0">
+            <a:noAutofit/>
+          </a:bodyPr>
+          <a:lstStyle/>
+          <a:p>
+            <a:pPr marL="0" lvl="0" indent="0" algn="l" rtl="0">
+              <a:spcBef>
+                <a:spcPts val="0"/>
+              </a:spcBef>
+              <a:spcAft>
+                <a:spcPts val="0"/>
+              </a:spcAft>
+              <a:buNone/>
+            </a:pPr>
+            <a:endParaRPr/>
+          </a:p>
+        </p:txBody>
+      </p:sp>
+    </p:spTree>
+    <p:extLst>
+      <p:ext uri="{BB962C8B-B14F-4D97-AF65-F5344CB8AC3E}">
+        <p14:creationId xmlns:p14="http://schemas.microsoft.com/office/powerpoint/2010/main" val="3194274356"/>
+      </p:ext>
+    </p:extLst>
+  </p:cSld>
+  <p:clrMapOvr>
+    <a:masterClrMapping/>
+  </p:clrMapOvr>
+</p:notes>
+</file>
+
+<file path=ppt/notesSlides/notesSlide63.xml><?xml version="1.0" encoding="utf-8"?>
+<p:notes xmlns:a="http://schemas.openxmlformats.org/drawingml/2006/main" xmlns:r="http://schemas.openxmlformats.org/officeDocument/2006/relationships" xmlns:p="http://schemas.openxmlformats.org/presentationml/2006/main" showMasterSp="0" showMasterPhAnim="0">
+  <p:cSld>
+    <p:spTree>
+      <p:nvGrpSpPr>
+        <p:cNvPr id="1" name="Shape 69"/>
+        <p:cNvGrpSpPr/>
+        <p:nvPr/>
+      </p:nvGrpSpPr>
+      <p:grpSpPr>
+        <a:xfrm>
+          <a:off x="0" y="0"/>
+          <a:ext cx="0" cy="0"/>
+          <a:chOff x="0" y="0"/>
+          <a:chExt cx="0" cy="0"/>
+        </a:xfrm>
+      </p:grpSpPr>
+      <p:sp>
+        <p:nvSpPr>
+          <p:cNvPr id="70" name="Google Shape;70;gac10fef634_0_16:notes"/>
+          <p:cNvSpPr>
+            <a:spLocks noGrp="1" noRot="1" noChangeAspect="1"/>
+          </p:cNvSpPr>
+          <p:nvPr>
+            <p:ph type="sldImg" idx="2"/>
+          </p:nvPr>
+        </p:nvSpPr>
+        <p:spPr>
+          <a:xfrm>
+            <a:off x="381000" y="685800"/>
+            <a:ext cx="6096000" cy="3429000"/>
+          </a:xfrm>
+          <a:custGeom>
+            <a:avLst/>
+            <a:gdLst/>
+            <a:ahLst/>
+            <a:cxnLst/>
+            <a:rect l="l" t="t" r="r" b="b"/>
+            <a:pathLst>
+              <a:path w="120000" h="120000" extrusionOk="0">
+                <a:moveTo>
+                  <a:pt x="0" y="0"/>
+                </a:moveTo>
+                <a:lnTo>
+                  <a:pt x="120000" y="0"/>
+                </a:lnTo>
+                <a:lnTo>
+                  <a:pt x="120000" y="120000"/>
+                </a:lnTo>
+                <a:lnTo>
+                  <a:pt x="0" y="120000"/>
+                </a:lnTo>
+                <a:close/>
+              </a:path>
+            </a:pathLst>
+          </a:custGeom>
+        </p:spPr>
+      </p:sp>
+      <p:sp>
+        <p:nvSpPr>
+          <p:cNvPr id="71" name="Google Shape;71;gac10fef634_0_16:notes"/>
+          <p:cNvSpPr txBox="1">
+            <a:spLocks noGrp="1"/>
+          </p:cNvSpPr>
+          <p:nvPr>
+            <p:ph type="body" idx="1"/>
+          </p:nvPr>
+        </p:nvSpPr>
+        <p:spPr>
+          <a:xfrm>
+            <a:off x="685800" y="4343400"/>
+            <a:ext cx="5486400" cy="4114800"/>
+          </a:xfrm>
+          <a:prstGeom prst="rect">
+            <a:avLst/>
+          </a:prstGeom>
+        </p:spPr>
+        <p:txBody>
+          <a:bodyPr spcFirstLastPara="1" wrap="square" lIns="91425" tIns="91425" rIns="91425" bIns="91425" anchor="t" anchorCtr="0">
+            <a:noAutofit/>
+          </a:bodyPr>
+          <a:lstStyle/>
+          <a:p>
+            <a:pPr marL="0" lvl="0" indent="0" algn="l" rtl="0">
+              <a:spcBef>
+                <a:spcPts val="0"/>
+              </a:spcBef>
+              <a:spcAft>
+                <a:spcPts val="0"/>
+              </a:spcAft>
+              <a:buNone/>
+            </a:pPr>
+            <a:endParaRPr/>
+          </a:p>
+        </p:txBody>
+      </p:sp>
+    </p:spTree>
+    <p:extLst>
+      <p:ext uri="{BB962C8B-B14F-4D97-AF65-F5344CB8AC3E}">
+        <p14:creationId xmlns:p14="http://schemas.microsoft.com/office/powerpoint/2010/main" val="3014292639"/>
+      </p:ext>
+    </p:extLst>
+  </p:cSld>
+  <p:clrMapOvr>
+    <a:masterClrMapping/>
+  </p:clrMapOvr>
+</p:notes>
+</file>
+
+<file path=ppt/notesSlides/notesSlide64.xml><?xml version="1.0" encoding="utf-8"?>
+<p:notes xmlns:a="http://schemas.openxmlformats.org/drawingml/2006/main" xmlns:r="http://schemas.openxmlformats.org/officeDocument/2006/relationships" xmlns:p="http://schemas.openxmlformats.org/presentationml/2006/main" showMasterSp="0" showMasterPhAnim="0">
+  <p:cSld>
+    <p:spTree>
+      <p:nvGrpSpPr>
         <p:cNvPr id="1" name="Shape 80"/>
         <p:cNvGrpSpPr/>
         <p:nvPr/>
@@ -9283,6 +9936,261 @@
         </p:txBody>
       </p:sp>
     </p:spTree>
+  </p:cSld>
+  <p:clrMapOvr>
+    <a:masterClrMapping/>
+  </p:clrMapOvr>
+</p:notes>
+</file>
+
+<file path=ppt/notesSlides/notesSlide65.xml><?xml version="1.0" encoding="utf-8"?>
+<p:notes xmlns:a="http://schemas.openxmlformats.org/drawingml/2006/main" xmlns:r="http://schemas.openxmlformats.org/officeDocument/2006/relationships" xmlns:p="http://schemas.openxmlformats.org/presentationml/2006/main" showMasterSp="0" showMasterPhAnim="0">
+  <p:cSld>
+    <p:spTree>
+      <p:nvGrpSpPr>
+        <p:cNvPr id="1" name="Shape 80"/>
+        <p:cNvGrpSpPr/>
+        <p:nvPr/>
+      </p:nvGrpSpPr>
+      <p:grpSpPr>
+        <a:xfrm>
+          <a:off x="0" y="0"/>
+          <a:ext cx="0" cy="0"/>
+          <a:chOff x="0" y="0"/>
+          <a:chExt cx="0" cy="0"/>
+        </a:xfrm>
+      </p:grpSpPr>
+      <p:sp>
+        <p:nvSpPr>
+          <p:cNvPr id="81" name="Google Shape;81;gac10fef634_0_25:notes"/>
+          <p:cNvSpPr>
+            <a:spLocks noGrp="1" noRot="1" noChangeAspect="1"/>
+          </p:cNvSpPr>
+          <p:nvPr>
+            <p:ph type="sldImg" idx="2"/>
+          </p:nvPr>
+        </p:nvSpPr>
+        <p:spPr>
+          <a:xfrm>
+            <a:off x="381000" y="685800"/>
+            <a:ext cx="6096000" cy="3429000"/>
+          </a:xfrm>
+          <a:custGeom>
+            <a:avLst/>
+            <a:gdLst/>
+            <a:ahLst/>
+            <a:cxnLst/>
+            <a:rect l="l" t="t" r="r" b="b"/>
+            <a:pathLst>
+              <a:path w="120000" h="120000" extrusionOk="0">
+                <a:moveTo>
+                  <a:pt x="0" y="0"/>
+                </a:moveTo>
+                <a:lnTo>
+                  <a:pt x="120000" y="0"/>
+                </a:lnTo>
+                <a:lnTo>
+                  <a:pt x="120000" y="120000"/>
+                </a:lnTo>
+                <a:lnTo>
+                  <a:pt x="0" y="120000"/>
+                </a:lnTo>
+                <a:close/>
+              </a:path>
+            </a:pathLst>
+          </a:custGeom>
+        </p:spPr>
+      </p:sp>
+      <p:sp>
+        <p:nvSpPr>
+          <p:cNvPr id="82" name="Google Shape;82;gac10fef634_0_25:notes"/>
+          <p:cNvSpPr txBox="1">
+            <a:spLocks noGrp="1"/>
+          </p:cNvSpPr>
+          <p:nvPr>
+            <p:ph type="body" idx="1"/>
+          </p:nvPr>
+        </p:nvSpPr>
+        <p:spPr>
+          <a:xfrm>
+            <a:off x="685800" y="4343400"/>
+            <a:ext cx="5486400" cy="4114800"/>
+          </a:xfrm>
+          <a:prstGeom prst="rect">
+            <a:avLst/>
+          </a:prstGeom>
+        </p:spPr>
+        <p:txBody>
+          <a:bodyPr spcFirstLastPara="1" wrap="square" lIns="91425" tIns="91425" rIns="91425" bIns="91425" anchor="t" anchorCtr="0">
+            <a:noAutofit/>
+          </a:bodyPr>
+          <a:lstStyle/>
+          <a:p>
+            <a:pPr marL="0" lvl="0" indent="0" algn="l" rtl="0">
+              <a:spcBef>
+                <a:spcPts val="0"/>
+              </a:spcBef>
+              <a:spcAft>
+                <a:spcPts val="0"/>
+              </a:spcAft>
+              <a:buClr>
+                <a:schemeClr val="dk1"/>
+              </a:buClr>
+              <a:buSzPts val="1100"/>
+              <a:buFont typeface="Arial"/>
+              <a:buNone/>
+            </a:pPr>
+            <a:r>
+              <a:rPr lang="en"/>
+              <a:t>Your version control evidence should go here.  This could be in the form of annotated screenshots which show you you managed this process or you could make a brief screencast explaining how you implemented version control.</a:t>
+            </a:r>
+            <a:endParaRPr/>
+          </a:p>
+          <a:p>
+            <a:pPr marL="0" lvl="0" indent="0" algn="l" rtl="0">
+              <a:spcBef>
+                <a:spcPts val="0"/>
+              </a:spcBef>
+              <a:spcAft>
+                <a:spcPts val="0"/>
+              </a:spcAft>
+              <a:buNone/>
+            </a:pPr>
+            <a:endParaRPr/>
+          </a:p>
+        </p:txBody>
+      </p:sp>
+    </p:spTree>
+    <p:extLst>
+      <p:ext uri="{BB962C8B-B14F-4D97-AF65-F5344CB8AC3E}">
+        <p14:creationId xmlns:p14="http://schemas.microsoft.com/office/powerpoint/2010/main" val="511959585"/>
+      </p:ext>
+    </p:extLst>
+  </p:cSld>
+  <p:clrMapOvr>
+    <a:masterClrMapping/>
+  </p:clrMapOvr>
+</p:notes>
+</file>
+
+<file path=ppt/notesSlides/notesSlide66.xml><?xml version="1.0" encoding="utf-8"?>
+<p:notes xmlns:a="http://schemas.openxmlformats.org/drawingml/2006/main" xmlns:r="http://schemas.openxmlformats.org/officeDocument/2006/relationships" xmlns:p="http://schemas.openxmlformats.org/presentationml/2006/main" showMasterSp="0" showMasterPhAnim="0">
+  <p:cSld>
+    <p:spTree>
+      <p:nvGrpSpPr>
+        <p:cNvPr id="1" name="Shape 80"/>
+        <p:cNvGrpSpPr/>
+        <p:nvPr/>
+      </p:nvGrpSpPr>
+      <p:grpSpPr>
+        <a:xfrm>
+          <a:off x="0" y="0"/>
+          <a:ext cx="0" cy="0"/>
+          <a:chOff x="0" y="0"/>
+          <a:chExt cx="0" cy="0"/>
+        </a:xfrm>
+      </p:grpSpPr>
+      <p:sp>
+        <p:nvSpPr>
+          <p:cNvPr id="81" name="Google Shape;81;gac10fef634_0_25:notes"/>
+          <p:cNvSpPr>
+            <a:spLocks noGrp="1" noRot="1" noChangeAspect="1"/>
+          </p:cNvSpPr>
+          <p:nvPr>
+            <p:ph type="sldImg" idx="2"/>
+          </p:nvPr>
+        </p:nvSpPr>
+        <p:spPr>
+          <a:xfrm>
+            <a:off x="381000" y="685800"/>
+            <a:ext cx="6096000" cy="3429000"/>
+          </a:xfrm>
+          <a:custGeom>
+            <a:avLst/>
+            <a:gdLst/>
+            <a:ahLst/>
+            <a:cxnLst/>
+            <a:rect l="l" t="t" r="r" b="b"/>
+            <a:pathLst>
+              <a:path w="120000" h="120000" extrusionOk="0">
+                <a:moveTo>
+                  <a:pt x="0" y="0"/>
+                </a:moveTo>
+                <a:lnTo>
+                  <a:pt x="120000" y="0"/>
+                </a:lnTo>
+                <a:lnTo>
+                  <a:pt x="120000" y="120000"/>
+                </a:lnTo>
+                <a:lnTo>
+                  <a:pt x="0" y="120000"/>
+                </a:lnTo>
+                <a:close/>
+              </a:path>
+            </a:pathLst>
+          </a:custGeom>
+        </p:spPr>
+      </p:sp>
+      <p:sp>
+        <p:nvSpPr>
+          <p:cNvPr id="82" name="Google Shape;82;gac10fef634_0_25:notes"/>
+          <p:cNvSpPr txBox="1">
+            <a:spLocks noGrp="1"/>
+          </p:cNvSpPr>
+          <p:nvPr>
+            <p:ph type="body" idx="1"/>
+          </p:nvPr>
+        </p:nvSpPr>
+        <p:spPr>
+          <a:xfrm>
+            <a:off x="685800" y="4343400"/>
+            <a:ext cx="5486400" cy="4114800"/>
+          </a:xfrm>
+          <a:prstGeom prst="rect">
+            <a:avLst/>
+          </a:prstGeom>
+        </p:spPr>
+        <p:txBody>
+          <a:bodyPr spcFirstLastPara="1" wrap="square" lIns="91425" tIns="91425" rIns="91425" bIns="91425" anchor="t" anchorCtr="0">
+            <a:noAutofit/>
+          </a:bodyPr>
+          <a:lstStyle/>
+          <a:p>
+            <a:pPr marL="0" lvl="0" indent="0" algn="l" rtl="0">
+              <a:spcBef>
+                <a:spcPts val="0"/>
+              </a:spcBef>
+              <a:spcAft>
+                <a:spcPts val="0"/>
+              </a:spcAft>
+              <a:buClr>
+                <a:schemeClr val="dk1"/>
+              </a:buClr>
+              <a:buSzPts val="1100"/>
+              <a:buFont typeface="Arial"/>
+              <a:buNone/>
+            </a:pPr>
+            <a:r>
+              <a:rPr lang="en"/>
+              <a:t>Your version control evidence should go here.  This could be in the form of annotated screenshots which show you you managed this process or you could make a brief screencast explaining how you implemented version control.</a:t>
+            </a:r>
+            <a:endParaRPr/>
+          </a:p>
+          <a:p>
+            <a:pPr marL="0" lvl="0" indent="0" algn="l" rtl="0">
+              <a:spcBef>
+                <a:spcPts val="0"/>
+              </a:spcBef>
+              <a:spcAft>
+                <a:spcPts val="0"/>
+              </a:spcAft>
+              <a:buNone/>
+            </a:pPr>
+            <a:endParaRPr/>
+          </a:p>
+        </p:txBody>
+      </p:sp>
+    </p:spTree>
     <p:extLst>
       <p:ext uri="{BB962C8B-B14F-4D97-AF65-F5344CB8AC3E}">
         <p14:creationId xmlns:p14="http://schemas.microsoft.com/office/powerpoint/2010/main" val="3815843750"/>
@@ -9295,7 +10203,7 @@
 </p:notes>
 </file>
 
-<file path=ppt/notesSlides/notesSlide61.xml><?xml version="1.0" encoding="utf-8"?>
+<file path=ppt/notesSlides/notesSlide67.xml><?xml version="1.0" encoding="utf-8"?>
 <p:notes xmlns:a="http://schemas.openxmlformats.org/drawingml/2006/main" xmlns:r="http://schemas.openxmlformats.org/officeDocument/2006/relationships" xmlns:p="http://schemas.openxmlformats.org/presentationml/2006/main" showMasterSp="0" showMasterPhAnim="0">
   <p:cSld>
     <p:spTree>
@@ -29838,6 +30746,1779 @@
     <p:bg>
       <p:bgPr>
         <a:solidFill>
+          <a:srgbClr val="D9EAD3"/>
+        </a:solidFill>
+        <a:effectLst/>
+      </p:bgPr>
+    </p:bg>
+    <p:spTree>
+      <p:nvGrpSpPr>
+        <p:cNvPr id="1" name="Shape 72"/>
+        <p:cNvGrpSpPr/>
+        <p:nvPr/>
+      </p:nvGrpSpPr>
+      <p:grpSpPr>
+        <a:xfrm>
+          <a:off x="0" y="0"/>
+          <a:ext cx="0" cy="0"/>
+          <a:chOff x="0" y="0"/>
+          <a:chExt cx="0" cy="0"/>
+        </a:xfrm>
+      </p:grpSpPr>
+      <p:pic>
+        <p:nvPicPr>
+          <p:cNvPr id="3" name="Picture 2">
+            <a:extLst>
+              <a:ext uri="{FF2B5EF4-FFF2-40B4-BE49-F238E27FC236}">
+                <a16:creationId xmlns:a16="http://schemas.microsoft.com/office/drawing/2014/main" id="{2839E1E3-811C-4040-AD92-96ACD0E132E3}"/>
+              </a:ext>
+            </a:extLst>
+          </p:cNvPr>
+          <p:cNvPicPr>
+            <a:picLocks noChangeAspect="1"/>
+          </p:cNvPicPr>
+          <p:nvPr/>
+        </p:nvPicPr>
+        <p:blipFill>
+          <a:blip r:embed="rId3"/>
+          <a:stretch>
+            <a:fillRect/>
+          </a:stretch>
+        </p:blipFill>
+        <p:spPr>
+          <a:xfrm>
+            <a:off x="3500" y="0"/>
+            <a:ext cx="9136999" cy="5143500"/>
+          </a:xfrm>
+          <a:prstGeom prst="rect">
+            <a:avLst/>
+          </a:prstGeom>
+        </p:spPr>
+      </p:pic>
+      <p:sp>
+        <p:nvSpPr>
+          <p:cNvPr id="73" name="Google Shape;73;p16"/>
+          <p:cNvSpPr txBox="1">
+            <a:spLocks noGrp="1"/>
+          </p:cNvSpPr>
+          <p:nvPr>
+            <p:ph type="title"/>
+          </p:nvPr>
+        </p:nvSpPr>
+        <p:spPr>
+          <a:xfrm>
+            <a:off x="311699" y="315485"/>
+            <a:ext cx="8520600" cy="572700"/>
+          </a:xfrm>
+          <a:prstGeom prst="rect">
+            <a:avLst/>
+          </a:prstGeom>
+        </p:spPr>
+        <p:txBody>
+          <a:bodyPr spcFirstLastPara="1" wrap="square" lIns="91425" tIns="91425" rIns="91425" bIns="91425" anchor="t" anchorCtr="0">
+            <a:noAutofit/>
+          </a:bodyPr>
+          <a:lstStyle/>
+          <a:p>
+            <a:pPr marL="0" lvl="0" indent="0" algn="l" rtl="0">
+              <a:spcBef>
+                <a:spcPts val="0"/>
+              </a:spcBef>
+              <a:spcAft>
+                <a:spcPts val="0"/>
+              </a:spcAft>
+              <a:buNone/>
+            </a:pPr>
+            <a:r>
+              <a:rPr lang="en" b="1" dirty="0">
+                <a:latin typeface="Avenir Next LT Pro" panose="020B0504020202020204" pitchFamily="34" charset="0"/>
+              </a:rPr>
+              <a:t>Component 7 Version 6 (Trello screenshot)</a:t>
+            </a:r>
+            <a:endParaRPr b="1" dirty="0">
+              <a:latin typeface="Avenir Next LT Pro" panose="020B0504020202020204" pitchFamily="34" charset="0"/>
+            </a:endParaRPr>
+          </a:p>
+        </p:txBody>
+      </p:sp>
+      <p:pic>
+        <p:nvPicPr>
+          <p:cNvPr id="4" name="Picture 3">
+            <a:extLst>
+              <a:ext uri="{FF2B5EF4-FFF2-40B4-BE49-F238E27FC236}">
+                <a16:creationId xmlns:a16="http://schemas.microsoft.com/office/drawing/2014/main" id="{43CD6E65-610D-49F1-BA44-3A9926944D7B}"/>
+              </a:ext>
+            </a:extLst>
+          </p:cNvPr>
+          <p:cNvPicPr>
+            <a:picLocks noChangeAspect="1"/>
+          </p:cNvPicPr>
+          <p:nvPr/>
+        </p:nvPicPr>
+        <p:blipFill>
+          <a:blip r:embed="rId4"/>
+          <a:stretch>
+            <a:fillRect/>
+          </a:stretch>
+        </p:blipFill>
+        <p:spPr>
+          <a:xfrm>
+            <a:off x="407669" y="1289672"/>
+            <a:ext cx="8328660" cy="2926886"/>
+          </a:xfrm>
+          <a:prstGeom prst="rect">
+            <a:avLst/>
+          </a:prstGeom>
+        </p:spPr>
+      </p:pic>
+    </p:spTree>
+    <p:extLst>
+      <p:ext uri="{BB962C8B-B14F-4D97-AF65-F5344CB8AC3E}">
+        <p14:creationId xmlns:p14="http://schemas.microsoft.com/office/powerpoint/2010/main" val="371033933"/>
+      </p:ext>
+    </p:extLst>
+  </p:cSld>
+  <p:clrMapOvr>
+    <a:masterClrMapping/>
+  </p:clrMapOvr>
+</p:sld>
+</file>
+
+<file path=ppt/slides/slide65.xml><?xml version="1.0" encoding="utf-8"?>
+<p:sld xmlns:a="http://schemas.openxmlformats.org/drawingml/2006/main" xmlns:r="http://schemas.openxmlformats.org/officeDocument/2006/relationships" xmlns:p="http://schemas.openxmlformats.org/presentationml/2006/main">
+  <p:cSld>
+    <p:spTree>
+      <p:nvGrpSpPr>
+        <p:cNvPr id="1" name="Shape 77"/>
+        <p:cNvGrpSpPr/>
+        <p:nvPr/>
+      </p:nvGrpSpPr>
+      <p:grpSpPr>
+        <a:xfrm>
+          <a:off x="0" y="0"/>
+          <a:ext cx="0" cy="0"/>
+          <a:chOff x="0" y="0"/>
+          <a:chExt cx="0" cy="0"/>
+        </a:xfrm>
+      </p:grpSpPr>
+      <p:pic>
+        <p:nvPicPr>
+          <p:cNvPr id="3" name="Picture 2">
+            <a:extLst>
+              <a:ext uri="{FF2B5EF4-FFF2-40B4-BE49-F238E27FC236}">
+                <a16:creationId xmlns:a16="http://schemas.microsoft.com/office/drawing/2014/main" id="{E10C2034-E5C4-4ABB-8872-92315B5651AC}"/>
+              </a:ext>
+            </a:extLst>
+          </p:cNvPr>
+          <p:cNvPicPr>
+            <a:picLocks noChangeAspect="1"/>
+          </p:cNvPicPr>
+          <p:nvPr/>
+        </p:nvPicPr>
+        <p:blipFill>
+          <a:blip r:embed="rId3"/>
+          <a:stretch>
+            <a:fillRect/>
+          </a:stretch>
+        </p:blipFill>
+        <p:spPr>
+          <a:xfrm>
+            <a:off x="0" y="1970"/>
+            <a:ext cx="9144000" cy="5139559"/>
+          </a:xfrm>
+          <a:prstGeom prst="rect">
+            <a:avLst/>
+          </a:prstGeom>
+        </p:spPr>
+      </p:pic>
+      <p:sp>
+        <p:nvSpPr>
+          <p:cNvPr id="78" name="Google Shape;78;p17"/>
+          <p:cNvSpPr txBox="1">
+            <a:spLocks noGrp="1"/>
+          </p:cNvSpPr>
+          <p:nvPr>
+            <p:ph type="title"/>
+          </p:nvPr>
+        </p:nvSpPr>
+        <p:spPr>
+          <a:xfrm>
+            <a:off x="285722" y="105412"/>
+            <a:ext cx="8520600" cy="572700"/>
+          </a:xfrm>
+          <a:prstGeom prst="rect">
+            <a:avLst/>
+          </a:prstGeom>
+        </p:spPr>
+        <p:txBody>
+          <a:bodyPr spcFirstLastPara="1" wrap="square" lIns="91425" tIns="91425" rIns="91425" bIns="91425" anchor="t" anchorCtr="0">
+            <a:noAutofit/>
+          </a:bodyPr>
+          <a:lstStyle/>
+          <a:p>
+            <a:pPr marL="0" lvl="0" indent="0" algn="l" rtl="0">
+              <a:spcBef>
+                <a:spcPts val="0"/>
+              </a:spcBef>
+              <a:spcAft>
+                <a:spcPts val="0"/>
+              </a:spcAft>
+              <a:buNone/>
+            </a:pPr>
+            <a:r>
+              <a:rPr lang="en" b="1" dirty="0">
+                <a:latin typeface="Avenir Next LT Pro" panose="020B0504020202020204" pitchFamily="34" charset="0"/>
+              </a:rPr>
+              <a:t>Component 7 Version 6 - Test Plan</a:t>
+            </a:r>
+            <a:endParaRPr b="1" dirty="0">
+              <a:latin typeface="Avenir Next LT Pro" panose="020B0504020202020204" pitchFamily="34" charset="0"/>
+            </a:endParaRPr>
+          </a:p>
+        </p:txBody>
+      </p:sp>
+      <p:graphicFrame>
+        <p:nvGraphicFramePr>
+          <p:cNvPr id="79" name="Google Shape;79;p17"/>
+          <p:cNvGraphicFramePr/>
+          <p:nvPr>
+            <p:extLst>
+              <p:ext uri="{D42A27DB-BD31-4B8C-83A1-F6EECF244321}">
+                <p14:modId xmlns:p14="http://schemas.microsoft.com/office/powerpoint/2010/main" val="3468376442"/>
+              </p:ext>
+            </p:extLst>
+          </p:nvPr>
+        </p:nvGraphicFramePr>
+        <p:xfrm>
+          <a:off x="285722" y="4077998"/>
+          <a:ext cx="8520600" cy="1021050"/>
+        </p:xfrm>
+        <a:graphic>
+          <a:graphicData uri="http://schemas.openxmlformats.org/drawingml/2006/table">
+            <a:tbl>
+              <a:tblPr>
+                <a:noFill/>
+                <a:tableStyleId>{E1099E06-0E6B-448D-9D27-60429F06E6F4}</a:tableStyleId>
+              </a:tblPr>
+              <a:tblGrid>
+                <a:gridCol w="3653818">
+                  <a:extLst>
+                    <a:ext uri="{9D8B030D-6E8A-4147-A177-3AD203B41FA5}">
+                      <a16:colId xmlns:a16="http://schemas.microsoft.com/office/drawing/2014/main" val="20000"/>
+                    </a:ext>
+                  </a:extLst>
+                </a:gridCol>
+                <a:gridCol w="4866782">
+                  <a:extLst>
+                    <a:ext uri="{9D8B030D-6E8A-4147-A177-3AD203B41FA5}">
+                      <a16:colId xmlns:a16="http://schemas.microsoft.com/office/drawing/2014/main" val="20001"/>
+                    </a:ext>
+                  </a:extLst>
+                </a:gridCol>
+              </a:tblGrid>
+              <a:tr h="381000">
+                <a:tc>
+                  <a:txBody>
+                    <a:bodyPr/>
+                    <a:lstStyle/>
+                    <a:p>
+                      <a:pPr marL="0" lvl="0" indent="0" algn="l" rtl="0">
+                        <a:spcBef>
+                          <a:spcPts val="0"/>
+                        </a:spcBef>
+                        <a:spcAft>
+                          <a:spcPts val="0"/>
+                        </a:spcAft>
+                        <a:buNone/>
+                      </a:pPr>
+                      <a:r>
+                        <a:rPr lang="en" sz="1000" b="1" dirty="0">
+                          <a:latin typeface="Avenir Next LT Pro" panose="020B0504020202020204" pitchFamily="34" charset="0"/>
+                        </a:rPr>
+                        <a:t>Test Case</a:t>
+                      </a:r>
+                      <a:endParaRPr sz="1000" b="1" dirty="0">
+                        <a:latin typeface="Avenir Next LT Pro" panose="020B0504020202020204" pitchFamily="34" charset="0"/>
+                      </a:endParaRPr>
+                    </a:p>
+                  </a:txBody>
+                  <a:tcPr marL="91425" marR="91425" marT="91425" marB="91425">
+                    <a:solidFill>
+                      <a:srgbClr val="CCCCCC"/>
+                    </a:solidFill>
+                  </a:tcPr>
+                </a:tc>
+                <a:tc>
+                  <a:txBody>
+                    <a:bodyPr/>
+                    <a:lstStyle/>
+                    <a:p>
+                      <a:pPr marL="0" lvl="0" indent="0" algn="l" rtl="0">
+                        <a:spcBef>
+                          <a:spcPts val="0"/>
+                        </a:spcBef>
+                        <a:spcAft>
+                          <a:spcPts val="0"/>
+                        </a:spcAft>
+                        <a:buNone/>
+                      </a:pPr>
+                      <a:r>
+                        <a:rPr lang="en" sz="1000" b="1" dirty="0">
+                          <a:latin typeface="Avenir Next LT Pro" panose="020B0504020202020204" pitchFamily="34" charset="0"/>
+                        </a:rPr>
+                        <a:t>Expected Values</a:t>
+                      </a:r>
+                      <a:endParaRPr sz="1000" b="1" dirty="0">
+                        <a:latin typeface="Avenir Next LT Pro" panose="020B0504020202020204" pitchFamily="34" charset="0"/>
+                      </a:endParaRPr>
+                    </a:p>
+                  </a:txBody>
+                  <a:tcPr marL="91425" marR="91425" marT="91425" marB="91425">
+                    <a:solidFill>
+                      <a:srgbClr val="CCCCCC"/>
+                    </a:solidFill>
+                  </a:tcPr>
+                </a:tc>
+                <a:extLst>
+                  <a:ext uri="{0D108BD9-81ED-4DB2-BD59-A6C34878D82A}">
+                    <a16:rowId xmlns:a16="http://schemas.microsoft.com/office/drawing/2014/main" val="10000"/>
+                  </a:ext>
+                </a:extLst>
+              </a:tr>
+              <a:tr h="396200">
+                <a:tc>
+                  <a:txBody>
+                    <a:bodyPr/>
+                    <a:lstStyle/>
+                    <a:p>
+                      <a:pPr marL="0" lvl="0" indent="0" algn="l" rtl="0">
+                        <a:spcBef>
+                          <a:spcPts val="0"/>
+                        </a:spcBef>
+                        <a:spcAft>
+                          <a:spcPts val="0"/>
+                        </a:spcAft>
+                        <a:buNone/>
+                      </a:pPr>
+                      <a:r>
+                        <a:rPr lang="en-NZ" sz="1000" dirty="0">
+                          <a:latin typeface="Avenir Next LT Pro" panose="020B0504020202020204" pitchFamily="34" charset="0"/>
+                        </a:rPr>
+                        <a:t>Choose Click and Collect</a:t>
+                      </a:r>
+                    </a:p>
+                    <a:p>
+                      <a:pPr marL="0" lvl="0" indent="0" algn="l" rtl="0">
+                        <a:spcBef>
+                          <a:spcPts val="0"/>
+                        </a:spcBef>
+                        <a:spcAft>
+                          <a:spcPts val="0"/>
+                        </a:spcAft>
+                        <a:buNone/>
+                      </a:pPr>
+                      <a:r>
+                        <a:rPr lang="en-NZ" sz="1000" dirty="0">
+                          <a:latin typeface="Avenir Next LT Pro" panose="020B0504020202020204" pitchFamily="34" charset="0"/>
+                        </a:rPr>
+                        <a:t>Choose Delivery</a:t>
+                      </a:r>
+                    </a:p>
+                  </a:txBody>
+                  <a:tcPr marL="91425" marR="91425" marT="91425" marB="91425"/>
+                </a:tc>
+                <a:tc>
+                  <a:txBody>
+                    <a:bodyPr/>
+                    <a:lstStyle/>
+                    <a:p>
+                      <a:pPr marL="0" lvl="0" indent="0" algn="l" rtl="0">
+                        <a:spcBef>
+                          <a:spcPts val="0"/>
+                        </a:spcBef>
+                        <a:spcAft>
+                          <a:spcPts val="0"/>
+                        </a:spcAft>
+                        <a:buNone/>
+                      </a:pPr>
+                      <a:r>
+                        <a:rPr lang="en-NZ" sz="1000" dirty="0">
+                          <a:latin typeface="Avenir Next LT Pro" panose="020B0504020202020204" pitchFamily="34" charset="0"/>
+                        </a:rPr>
+                        <a:t>Click and collect worked – printed name and phone</a:t>
+                      </a:r>
+                    </a:p>
+                    <a:p>
+                      <a:pPr marL="0" lvl="0" indent="0" algn="l" rtl="0">
+                        <a:spcBef>
+                          <a:spcPts val="0"/>
+                        </a:spcBef>
+                        <a:spcAft>
+                          <a:spcPts val="0"/>
+                        </a:spcAft>
+                        <a:buNone/>
+                      </a:pPr>
+                      <a:r>
+                        <a:rPr lang="en-NZ" sz="1000" dirty="0">
+                          <a:latin typeface="Avenir Next LT Pro" panose="020B0504020202020204" pitchFamily="34" charset="0"/>
+                        </a:rPr>
+                        <a:t>Delivery worked – printed name, phone, added $9 delivery charge to less than 5 items, but free if 5 or more items ordered.</a:t>
+                      </a:r>
+                      <a:endParaRPr sz="1000" dirty="0">
+                        <a:latin typeface="Avenir Next LT Pro" panose="020B0504020202020204" pitchFamily="34" charset="0"/>
+                      </a:endParaRPr>
+                    </a:p>
+                  </a:txBody>
+                  <a:tcPr marL="91425" marR="91425" marT="91425" marB="91425"/>
+                </a:tc>
+                <a:extLst>
+                  <a:ext uri="{0D108BD9-81ED-4DB2-BD59-A6C34878D82A}">
+                    <a16:rowId xmlns:a16="http://schemas.microsoft.com/office/drawing/2014/main" val="10001"/>
+                  </a:ext>
+                </a:extLst>
+              </a:tr>
+            </a:tbl>
+          </a:graphicData>
+        </a:graphic>
+      </p:graphicFrame>
+      <p:sp>
+        <p:nvSpPr>
+          <p:cNvPr id="2" name="TextBox 1">
+            <a:extLst>
+              <a:ext uri="{FF2B5EF4-FFF2-40B4-BE49-F238E27FC236}">
+                <a16:creationId xmlns:a16="http://schemas.microsoft.com/office/drawing/2014/main" id="{309AF9B9-2ECD-4E6B-A7E1-A9D791C28D3B}"/>
+              </a:ext>
+            </a:extLst>
+          </p:cNvPr>
+          <p:cNvSpPr txBox="1"/>
+          <p:nvPr/>
+        </p:nvSpPr>
+        <p:spPr>
+          <a:xfrm>
+            <a:off x="1463040" y="1463040"/>
+            <a:ext cx="3375660" cy="1015663"/>
+          </a:xfrm>
+          <a:prstGeom prst="rect">
+            <a:avLst/>
+          </a:prstGeom>
+          <a:noFill/>
+        </p:spPr>
+        <p:txBody>
+          <a:bodyPr wrap="square" rtlCol="0">
+            <a:spAutoFit/>
+          </a:bodyPr>
+          <a:lstStyle/>
+          <a:p>
+            <a:r>
+              <a:rPr lang="en-NZ" sz="3000" b="1" dirty="0"/>
+              <a:t>ADD DELIVERY CHARGE</a:t>
+            </a:r>
+          </a:p>
+        </p:txBody>
+      </p:sp>
+    </p:spTree>
+    <p:extLst>
+      <p:ext uri="{BB962C8B-B14F-4D97-AF65-F5344CB8AC3E}">
+        <p14:creationId xmlns:p14="http://schemas.microsoft.com/office/powerpoint/2010/main" val="962056596"/>
+      </p:ext>
+    </p:extLst>
+  </p:cSld>
+  <p:clrMapOvr>
+    <a:masterClrMapping/>
+  </p:clrMapOvr>
+</p:sld>
+</file>
+
+<file path=ppt/slides/slide66.xml><?xml version="1.0" encoding="utf-8"?>
+<p:sld xmlns:a="http://schemas.openxmlformats.org/drawingml/2006/main" xmlns:r="http://schemas.openxmlformats.org/officeDocument/2006/relationships" xmlns:p="http://schemas.openxmlformats.org/presentationml/2006/main">
+  <p:cSld>
+    <p:bg>
+      <p:bgPr>
+        <a:solidFill>
+          <a:srgbClr val="D9EAD3"/>
+        </a:solidFill>
+        <a:effectLst/>
+      </p:bgPr>
+    </p:bg>
+    <p:spTree>
+      <p:nvGrpSpPr>
+        <p:cNvPr id="1" name="Shape 72"/>
+        <p:cNvGrpSpPr/>
+        <p:nvPr/>
+      </p:nvGrpSpPr>
+      <p:grpSpPr>
+        <a:xfrm>
+          <a:off x="0" y="0"/>
+          <a:ext cx="0" cy="0"/>
+          <a:chOff x="0" y="0"/>
+          <a:chExt cx="0" cy="0"/>
+        </a:xfrm>
+      </p:grpSpPr>
+      <p:pic>
+        <p:nvPicPr>
+          <p:cNvPr id="3" name="Picture 2">
+            <a:extLst>
+              <a:ext uri="{FF2B5EF4-FFF2-40B4-BE49-F238E27FC236}">
+                <a16:creationId xmlns:a16="http://schemas.microsoft.com/office/drawing/2014/main" id="{2839E1E3-811C-4040-AD92-96ACD0E132E3}"/>
+              </a:ext>
+            </a:extLst>
+          </p:cNvPr>
+          <p:cNvPicPr>
+            <a:picLocks noChangeAspect="1"/>
+          </p:cNvPicPr>
+          <p:nvPr/>
+        </p:nvPicPr>
+        <p:blipFill>
+          <a:blip r:embed="rId3"/>
+          <a:stretch>
+            <a:fillRect/>
+          </a:stretch>
+        </p:blipFill>
+        <p:spPr>
+          <a:xfrm>
+            <a:off x="3500" y="0"/>
+            <a:ext cx="9136999" cy="5143500"/>
+          </a:xfrm>
+          <a:prstGeom prst="rect">
+            <a:avLst/>
+          </a:prstGeom>
+        </p:spPr>
+      </p:pic>
+      <p:sp>
+        <p:nvSpPr>
+          <p:cNvPr id="73" name="Google Shape;73;p16"/>
+          <p:cNvSpPr txBox="1">
+            <a:spLocks noGrp="1"/>
+          </p:cNvSpPr>
+          <p:nvPr>
+            <p:ph type="title"/>
+          </p:nvPr>
+        </p:nvSpPr>
+        <p:spPr>
+          <a:xfrm>
+            <a:off x="311699" y="315485"/>
+            <a:ext cx="8520600" cy="572700"/>
+          </a:xfrm>
+          <a:prstGeom prst="rect">
+            <a:avLst/>
+          </a:prstGeom>
+        </p:spPr>
+        <p:txBody>
+          <a:bodyPr spcFirstLastPara="1" wrap="square" lIns="91425" tIns="91425" rIns="91425" bIns="91425" anchor="t" anchorCtr="0">
+            <a:noAutofit/>
+          </a:bodyPr>
+          <a:lstStyle/>
+          <a:p>
+            <a:pPr marL="0" lvl="0" indent="0" algn="l" rtl="0">
+              <a:spcBef>
+                <a:spcPts val="0"/>
+              </a:spcBef>
+              <a:spcAft>
+                <a:spcPts val="0"/>
+              </a:spcAft>
+              <a:buNone/>
+            </a:pPr>
+            <a:r>
+              <a:rPr lang="en" b="1" dirty="0">
+                <a:latin typeface="Avenir Next LT Pro" panose="020B0504020202020204" pitchFamily="34" charset="0"/>
+              </a:rPr>
+              <a:t>Component 8 Version 1 (Trello screenshot)</a:t>
+            </a:r>
+            <a:endParaRPr b="1" dirty="0">
+              <a:latin typeface="Avenir Next LT Pro" panose="020B0504020202020204" pitchFamily="34" charset="0"/>
+            </a:endParaRPr>
+          </a:p>
+        </p:txBody>
+      </p:sp>
+      <p:pic>
+        <p:nvPicPr>
+          <p:cNvPr id="5" name="Picture 4">
+            <a:extLst>
+              <a:ext uri="{FF2B5EF4-FFF2-40B4-BE49-F238E27FC236}">
+                <a16:creationId xmlns:a16="http://schemas.microsoft.com/office/drawing/2014/main" id="{611C9B7B-37F4-452A-82B3-8A7F77CCDBF4}"/>
+              </a:ext>
+            </a:extLst>
+          </p:cNvPr>
+          <p:cNvPicPr>
+            <a:picLocks noChangeAspect="1"/>
+          </p:cNvPicPr>
+          <p:nvPr/>
+        </p:nvPicPr>
+        <p:blipFill>
+          <a:blip r:embed="rId4"/>
+          <a:stretch>
+            <a:fillRect/>
+          </a:stretch>
+        </p:blipFill>
+        <p:spPr>
+          <a:xfrm>
+            <a:off x="311699" y="1486167"/>
+            <a:ext cx="8520601" cy="2408328"/>
+          </a:xfrm>
+          <a:prstGeom prst="rect">
+            <a:avLst/>
+          </a:prstGeom>
+        </p:spPr>
+      </p:pic>
+    </p:spTree>
+    <p:extLst>
+      <p:ext uri="{BB962C8B-B14F-4D97-AF65-F5344CB8AC3E}">
+        <p14:creationId xmlns:p14="http://schemas.microsoft.com/office/powerpoint/2010/main" val="188973074"/>
+      </p:ext>
+    </p:extLst>
+  </p:cSld>
+  <p:clrMapOvr>
+    <a:masterClrMapping/>
+  </p:clrMapOvr>
+</p:sld>
+</file>
+
+<file path=ppt/slides/slide67.xml><?xml version="1.0" encoding="utf-8"?>
+<p:sld xmlns:a="http://schemas.openxmlformats.org/drawingml/2006/main" xmlns:r="http://schemas.openxmlformats.org/officeDocument/2006/relationships" xmlns:p="http://schemas.openxmlformats.org/presentationml/2006/main">
+  <p:cSld>
+    <p:spTree>
+      <p:nvGrpSpPr>
+        <p:cNvPr id="1" name="Shape 77"/>
+        <p:cNvGrpSpPr/>
+        <p:nvPr/>
+      </p:nvGrpSpPr>
+      <p:grpSpPr>
+        <a:xfrm>
+          <a:off x="0" y="0"/>
+          <a:ext cx="0" cy="0"/>
+          <a:chOff x="0" y="0"/>
+          <a:chExt cx="0" cy="0"/>
+        </a:xfrm>
+      </p:grpSpPr>
+      <p:pic>
+        <p:nvPicPr>
+          <p:cNvPr id="3" name="Picture 2">
+            <a:extLst>
+              <a:ext uri="{FF2B5EF4-FFF2-40B4-BE49-F238E27FC236}">
+                <a16:creationId xmlns:a16="http://schemas.microsoft.com/office/drawing/2014/main" id="{E10C2034-E5C4-4ABB-8872-92315B5651AC}"/>
+              </a:ext>
+            </a:extLst>
+          </p:cNvPr>
+          <p:cNvPicPr>
+            <a:picLocks noChangeAspect="1"/>
+          </p:cNvPicPr>
+          <p:nvPr/>
+        </p:nvPicPr>
+        <p:blipFill>
+          <a:blip r:embed="rId3"/>
+          <a:stretch>
+            <a:fillRect/>
+          </a:stretch>
+        </p:blipFill>
+        <p:spPr>
+          <a:xfrm>
+            <a:off x="0" y="1970"/>
+            <a:ext cx="9144000" cy="5139559"/>
+          </a:xfrm>
+          <a:prstGeom prst="rect">
+            <a:avLst/>
+          </a:prstGeom>
+        </p:spPr>
+      </p:pic>
+      <p:sp>
+        <p:nvSpPr>
+          <p:cNvPr id="78" name="Google Shape;78;p17"/>
+          <p:cNvSpPr txBox="1">
+            <a:spLocks noGrp="1"/>
+          </p:cNvSpPr>
+          <p:nvPr>
+            <p:ph type="title"/>
+          </p:nvPr>
+        </p:nvSpPr>
+        <p:spPr>
+          <a:xfrm>
+            <a:off x="285722" y="105412"/>
+            <a:ext cx="8520600" cy="572700"/>
+          </a:xfrm>
+          <a:prstGeom prst="rect">
+            <a:avLst/>
+          </a:prstGeom>
+        </p:spPr>
+        <p:txBody>
+          <a:bodyPr spcFirstLastPara="1" wrap="square" lIns="91425" tIns="91425" rIns="91425" bIns="91425" anchor="t" anchorCtr="0">
+            <a:noAutofit/>
+          </a:bodyPr>
+          <a:lstStyle/>
+          <a:p>
+            <a:pPr marL="0" lvl="0" indent="0" algn="l" rtl="0">
+              <a:spcBef>
+                <a:spcPts val="0"/>
+              </a:spcBef>
+              <a:spcAft>
+                <a:spcPts val="0"/>
+              </a:spcAft>
+              <a:buNone/>
+            </a:pPr>
+            <a:r>
+              <a:rPr lang="en" b="1" dirty="0">
+                <a:latin typeface="Avenir Next LT Pro" panose="020B0504020202020204" pitchFamily="34" charset="0"/>
+              </a:rPr>
+              <a:t>Component 8 Version 1 - Test Plan</a:t>
+            </a:r>
+            <a:endParaRPr b="1" dirty="0">
+              <a:latin typeface="Avenir Next LT Pro" panose="020B0504020202020204" pitchFamily="34" charset="0"/>
+            </a:endParaRPr>
+          </a:p>
+        </p:txBody>
+      </p:sp>
+      <p:graphicFrame>
+        <p:nvGraphicFramePr>
+          <p:cNvPr id="79" name="Google Shape;79;p17"/>
+          <p:cNvGraphicFramePr/>
+          <p:nvPr>
+            <p:extLst>
+              <p:ext uri="{D42A27DB-BD31-4B8C-83A1-F6EECF244321}">
+                <p14:modId xmlns:p14="http://schemas.microsoft.com/office/powerpoint/2010/main" val="2182463493"/>
+              </p:ext>
+            </p:extLst>
+          </p:nvPr>
+        </p:nvGraphicFramePr>
+        <p:xfrm>
+          <a:off x="201902" y="3864638"/>
+          <a:ext cx="8520600" cy="1173450"/>
+        </p:xfrm>
+        <a:graphic>
+          <a:graphicData uri="http://schemas.openxmlformats.org/drawingml/2006/table">
+            <a:tbl>
+              <a:tblPr>
+                <a:noFill/>
+                <a:tableStyleId>{E1099E06-0E6B-448D-9D27-60429F06E6F4}</a:tableStyleId>
+              </a:tblPr>
+              <a:tblGrid>
+                <a:gridCol w="3653818">
+                  <a:extLst>
+                    <a:ext uri="{9D8B030D-6E8A-4147-A177-3AD203B41FA5}">
+                      <a16:colId xmlns:a16="http://schemas.microsoft.com/office/drawing/2014/main" val="20000"/>
+                    </a:ext>
+                  </a:extLst>
+                </a:gridCol>
+                <a:gridCol w="4866782">
+                  <a:extLst>
+                    <a:ext uri="{9D8B030D-6E8A-4147-A177-3AD203B41FA5}">
+                      <a16:colId xmlns:a16="http://schemas.microsoft.com/office/drawing/2014/main" val="20001"/>
+                    </a:ext>
+                  </a:extLst>
+                </a:gridCol>
+              </a:tblGrid>
+              <a:tr h="381000">
+                <a:tc>
+                  <a:txBody>
+                    <a:bodyPr/>
+                    <a:lstStyle/>
+                    <a:p>
+                      <a:pPr marL="0" lvl="0" indent="0" algn="l" rtl="0">
+                        <a:spcBef>
+                          <a:spcPts val="0"/>
+                        </a:spcBef>
+                        <a:spcAft>
+                          <a:spcPts val="0"/>
+                        </a:spcAft>
+                        <a:buNone/>
+                      </a:pPr>
+                      <a:r>
+                        <a:rPr lang="en" sz="1000" b="1" dirty="0">
+                          <a:latin typeface="Avenir Next LT Pro" panose="020B0504020202020204" pitchFamily="34" charset="0"/>
+                        </a:rPr>
+                        <a:t>Test Case</a:t>
+                      </a:r>
+                      <a:endParaRPr sz="1000" b="1" dirty="0">
+                        <a:latin typeface="Avenir Next LT Pro" panose="020B0504020202020204" pitchFamily="34" charset="0"/>
+                      </a:endParaRPr>
+                    </a:p>
+                  </a:txBody>
+                  <a:tcPr marL="91425" marR="91425" marT="91425" marB="91425">
+                    <a:solidFill>
+                      <a:srgbClr val="CCCCCC"/>
+                    </a:solidFill>
+                  </a:tcPr>
+                </a:tc>
+                <a:tc>
+                  <a:txBody>
+                    <a:bodyPr/>
+                    <a:lstStyle/>
+                    <a:p>
+                      <a:pPr marL="0" lvl="0" indent="0" algn="l" rtl="0">
+                        <a:spcBef>
+                          <a:spcPts val="0"/>
+                        </a:spcBef>
+                        <a:spcAft>
+                          <a:spcPts val="0"/>
+                        </a:spcAft>
+                        <a:buNone/>
+                      </a:pPr>
+                      <a:r>
+                        <a:rPr lang="en" sz="1000" b="1" dirty="0">
+                          <a:latin typeface="Avenir Next LT Pro" panose="020B0504020202020204" pitchFamily="34" charset="0"/>
+                        </a:rPr>
+                        <a:t>Expected Values</a:t>
+                      </a:r>
+                      <a:endParaRPr sz="1000" b="1" dirty="0">
+                        <a:latin typeface="Avenir Next LT Pro" panose="020B0504020202020204" pitchFamily="34" charset="0"/>
+                      </a:endParaRPr>
+                    </a:p>
+                  </a:txBody>
+                  <a:tcPr marL="91425" marR="91425" marT="91425" marB="91425">
+                    <a:solidFill>
+                      <a:srgbClr val="CCCCCC"/>
+                    </a:solidFill>
+                  </a:tcPr>
+                </a:tc>
+                <a:extLst>
+                  <a:ext uri="{0D108BD9-81ED-4DB2-BD59-A6C34878D82A}">
+                    <a16:rowId xmlns:a16="http://schemas.microsoft.com/office/drawing/2014/main" val="10000"/>
+                  </a:ext>
+                </a:extLst>
+              </a:tr>
+              <a:tr h="396200">
+                <a:tc>
+                  <a:txBody>
+                    <a:bodyPr/>
+                    <a:lstStyle/>
+                    <a:p>
+                      <a:pPr marL="0" lvl="0" indent="0" algn="l" rtl="0">
+                        <a:spcBef>
+                          <a:spcPts val="0"/>
+                        </a:spcBef>
+                        <a:spcAft>
+                          <a:spcPts val="0"/>
+                        </a:spcAft>
+                        <a:buNone/>
+                      </a:pPr>
+                      <a:r>
+                        <a:rPr lang="en-NZ" sz="1000" dirty="0">
+                          <a:latin typeface="Avenir Next LT Pro" panose="020B0504020202020204" pitchFamily="34" charset="0"/>
+                        </a:rPr>
+                        <a:t>Entered 1 Choose Confirm</a:t>
+                      </a:r>
+                    </a:p>
+                    <a:p>
+                      <a:pPr marL="0" lvl="0" indent="0" algn="l" rtl="0">
+                        <a:spcBef>
+                          <a:spcPts val="0"/>
+                        </a:spcBef>
+                        <a:spcAft>
+                          <a:spcPts val="0"/>
+                        </a:spcAft>
+                        <a:buNone/>
+                      </a:pPr>
+                      <a:r>
+                        <a:rPr lang="en-NZ" sz="1000" dirty="0">
+                          <a:latin typeface="Avenir Next LT Pro" panose="020B0504020202020204" pitchFamily="34" charset="0"/>
+                        </a:rPr>
+                        <a:t>Entered 2 Choose Cancel</a:t>
+                      </a:r>
+                    </a:p>
+                    <a:p>
+                      <a:pPr marL="0" lvl="0" indent="0" algn="l" rtl="0">
+                        <a:spcBef>
+                          <a:spcPts val="0"/>
+                        </a:spcBef>
+                        <a:spcAft>
+                          <a:spcPts val="0"/>
+                        </a:spcAft>
+                        <a:buNone/>
+                      </a:pPr>
+                      <a:r>
+                        <a:rPr lang="en-NZ" sz="1000" dirty="0">
+                          <a:latin typeface="Avenir Next LT Pro" panose="020B0504020202020204" pitchFamily="34" charset="0"/>
+                        </a:rPr>
+                        <a:t>Entered 4 </a:t>
+                      </a:r>
+                    </a:p>
+                    <a:p>
+                      <a:pPr marL="0" lvl="0" indent="0" algn="l" rtl="0">
+                        <a:spcBef>
+                          <a:spcPts val="0"/>
+                        </a:spcBef>
+                        <a:spcAft>
+                          <a:spcPts val="0"/>
+                        </a:spcAft>
+                        <a:buNone/>
+                      </a:pPr>
+                      <a:r>
+                        <a:rPr lang="en-NZ" sz="1000" dirty="0">
+                          <a:latin typeface="Avenir Next LT Pro" panose="020B0504020202020204" pitchFamily="34" charset="0"/>
+                        </a:rPr>
+                        <a:t>Entered s</a:t>
+                      </a:r>
+                    </a:p>
+                  </a:txBody>
+                  <a:tcPr marL="91425" marR="91425" marT="91425" marB="91425"/>
+                </a:tc>
+                <a:tc>
+                  <a:txBody>
+                    <a:bodyPr/>
+                    <a:lstStyle/>
+                    <a:p>
+                      <a:pPr marL="0" lvl="0" indent="0" algn="l" rtl="0">
+                        <a:spcBef>
+                          <a:spcPts val="0"/>
+                        </a:spcBef>
+                        <a:spcAft>
+                          <a:spcPts val="0"/>
+                        </a:spcAft>
+                        <a:buNone/>
+                      </a:pPr>
+                      <a:r>
+                        <a:rPr lang="en-NZ" sz="1000" dirty="0">
+                          <a:latin typeface="Avenir Next LT Pro" panose="020B0504020202020204" pitchFamily="34" charset="0"/>
+                        </a:rPr>
+                        <a:t>Confirm worked – printed “confirm”</a:t>
+                      </a:r>
+                    </a:p>
+                    <a:p>
+                      <a:pPr marL="0" lvl="0" indent="0" algn="l" rtl="0">
+                        <a:spcBef>
+                          <a:spcPts val="0"/>
+                        </a:spcBef>
+                        <a:spcAft>
+                          <a:spcPts val="0"/>
+                        </a:spcAft>
+                        <a:buNone/>
+                      </a:pPr>
+                      <a:r>
+                        <a:rPr lang="en-NZ" sz="1000" dirty="0">
+                          <a:latin typeface="Avenir Next LT Pro" panose="020B0504020202020204" pitchFamily="34" charset="0"/>
+                        </a:rPr>
+                        <a:t>Cancel worked – printed “cancel”</a:t>
+                      </a:r>
+                    </a:p>
+                    <a:p>
+                      <a:pPr marL="0" lvl="0" indent="0" algn="l" rtl="0">
+                        <a:spcBef>
+                          <a:spcPts val="0"/>
+                        </a:spcBef>
+                        <a:spcAft>
+                          <a:spcPts val="0"/>
+                        </a:spcAft>
+                        <a:buNone/>
+                      </a:pPr>
+                      <a:r>
+                        <a:rPr lang="en-NZ" sz="1000" dirty="0">
+                          <a:latin typeface="Avenir Next LT Pro" panose="020B0504020202020204" pitchFamily="34" charset="0"/>
+                        </a:rPr>
+                        <a:t>Printed “Please enter 1 or 2”</a:t>
+                      </a:r>
+                    </a:p>
+                    <a:p>
+                      <a:pPr marL="0" lvl="0" indent="0" algn="l" rtl="0">
+                        <a:spcBef>
+                          <a:spcPts val="0"/>
+                        </a:spcBef>
+                        <a:spcAft>
+                          <a:spcPts val="0"/>
+                        </a:spcAft>
+                        <a:buNone/>
+                      </a:pPr>
+                      <a:r>
+                        <a:rPr lang="en-NZ" sz="1000" dirty="0">
+                          <a:latin typeface="Avenir Next LT Pro" panose="020B0504020202020204" pitchFamily="34" charset="0"/>
+                        </a:rPr>
+                        <a:t>Printed “please enter a valid number”</a:t>
+                      </a:r>
+                      <a:endParaRPr sz="1000" dirty="0">
+                        <a:latin typeface="Avenir Next LT Pro" panose="020B0504020202020204" pitchFamily="34" charset="0"/>
+                      </a:endParaRPr>
+                    </a:p>
+                  </a:txBody>
+                  <a:tcPr marL="91425" marR="91425" marT="91425" marB="91425"/>
+                </a:tc>
+                <a:extLst>
+                  <a:ext uri="{0D108BD9-81ED-4DB2-BD59-A6C34878D82A}">
+                    <a16:rowId xmlns:a16="http://schemas.microsoft.com/office/drawing/2014/main" val="10001"/>
+                  </a:ext>
+                </a:extLst>
+              </a:tr>
+            </a:tbl>
+          </a:graphicData>
+        </a:graphic>
+      </p:graphicFrame>
+      <p:pic>
+        <p:nvPicPr>
+          <p:cNvPr id="4" name="Picture 3">
+            <a:extLst>
+              <a:ext uri="{FF2B5EF4-FFF2-40B4-BE49-F238E27FC236}">
+                <a16:creationId xmlns:a16="http://schemas.microsoft.com/office/drawing/2014/main" id="{4B5C1DD5-E373-4EB8-8281-8A5CD523DCA1}"/>
+              </a:ext>
+            </a:extLst>
+          </p:cNvPr>
+          <p:cNvPicPr>
+            <a:picLocks noChangeAspect="1"/>
+          </p:cNvPicPr>
+          <p:nvPr/>
+        </p:nvPicPr>
+        <p:blipFill>
+          <a:blip r:embed="rId4"/>
+          <a:stretch>
+            <a:fillRect/>
+          </a:stretch>
+        </p:blipFill>
+        <p:spPr>
+          <a:xfrm>
+            <a:off x="285722" y="915786"/>
+            <a:ext cx="4342875" cy="2782682"/>
+          </a:xfrm>
+          <a:prstGeom prst="rect">
+            <a:avLst/>
+          </a:prstGeom>
+        </p:spPr>
+      </p:pic>
+      <p:pic>
+        <p:nvPicPr>
+          <p:cNvPr id="6" name="Picture 5">
+            <a:extLst>
+              <a:ext uri="{FF2B5EF4-FFF2-40B4-BE49-F238E27FC236}">
+                <a16:creationId xmlns:a16="http://schemas.microsoft.com/office/drawing/2014/main" id="{6476CB8F-7A1D-435E-92D3-F7A2572F01F7}"/>
+              </a:ext>
+            </a:extLst>
+          </p:cNvPr>
+          <p:cNvPicPr>
+            <a:picLocks noChangeAspect="1"/>
+          </p:cNvPicPr>
+          <p:nvPr/>
+        </p:nvPicPr>
+        <p:blipFill>
+          <a:blip r:embed="rId5"/>
+          <a:stretch>
+            <a:fillRect/>
+          </a:stretch>
+        </p:blipFill>
+        <p:spPr>
+          <a:xfrm>
+            <a:off x="4914319" y="1218108"/>
+            <a:ext cx="3600953" cy="1991003"/>
+          </a:xfrm>
+          <a:prstGeom prst="rect">
+            <a:avLst/>
+          </a:prstGeom>
+        </p:spPr>
+      </p:pic>
+    </p:spTree>
+    <p:extLst>
+      <p:ext uri="{BB962C8B-B14F-4D97-AF65-F5344CB8AC3E}">
+        <p14:creationId xmlns:p14="http://schemas.microsoft.com/office/powerpoint/2010/main" val="389038179"/>
+      </p:ext>
+    </p:extLst>
+  </p:cSld>
+  <p:clrMapOvr>
+    <a:masterClrMapping/>
+  </p:clrMapOvr>
+</p:sld>
+</file>
+
+<file path=ppt/slides/slide68.xml><?xml version="1.0" encoding="utf-8"?>
+<p:sld xmlns:a="http://schemas.openxmlformats.org/drawingml/2006/main" xmlns:r="http://schemas.openxmlformats.org/officeDocument/2006/relationships" xmlns:p="http://schemas.openxmlformats.org/presentationml/2006/main">
+  <p:cSld>
+    <p:bg>
+      <p:bgPr>
+        <a:solidFill>
+          <a:srgbClr val="D9EAD3"/>
+        </a:solidFill>
+        <a:effectLst/>
+      </p:bgPr>
+    </p:bg>
+    <p:spTree>
+      <p:nvGrpSpPr>
+        <p:cNvPr id="1" name="Shape 72"/>
+        <p:cNvGrpSpPr/>
+        <p:nvPr/>
+      </p:nvGrpSpPr>
+      <p:grpSpPr>
+        <a:xfrm>
+          <a:off x="0" y="0"/>
+          <a:ext cx="0" cy="0"/>
+          <a:chOff x="0" y="0"/>
+          <a:chExt cx="0" cy="0"/>
+        </a:xfrm>
+      </p:grpSpPr>
+      <p:pic>
+        <p:nvPicPr>
+          <p:cNvPr id="3" name="Picture 2">
+            <a:extLst>
+              <a:ext uri="{FF2B5EF4-FFF2-40B4-BE49-F238E27FC236}">
+                <a16:creationId xmlns:a16="http://schemas.microsoft.com/office/drawing/2014/main" id="{2839E1E3-811C-4040-AD92-96ACD0E132E3}"/>
+              </a:ext>
+            </a:extLst>
+          </p:cNvPr>
+          <p:cNvPicPr>
+            <a:picLocks noChangeAspect="1"/>
+          </p:cNvPicPr>
+          <p:nvPr/>
+        </p:nvPicPr>
+        <p:blipFill>
+          <a:blip r:embed="rId3"/>
+          <a:stretch>
+            <a:fillRect/>
+          </a:stretch>
+        </p:blipFill>
+        <p:spPr>
+          <a:xfrm>
+            <a:off x="3500" y="0"/>
+            <a:ext cx="9136999" cy="5143500"/>
+          </a:xfrm>
+          <a:prstGeom prst="rect">
+            <a:avLst/>
+          </a:prstGeom>
+        </p:spPr>
+      </p:pic>
+      <p:sp>
+        <p:nvSpPr>
+          <p:cNvPr id="73" name="Google Shape;73;p16"/>
+          <p:cNvSpPr txBox="1">
+            <a:spLocks noGrp="1"/>
+          </p:cNvSpPr>
+          <p:nvPr>
+            <p:ph type="title"/>
+          </p:nvPr>
+        </p:nvSpPr>
+        <p:spPr>
+          <a:xfrm>
+            <a:off x="311699" y="315485"/>
+            <a:ext cx="8520600" cy="572700"/>
+          </a:xfrm>
+          <a:prstGeom prst="rect">
+            <a:avLst/>
+          </a:prstGeom>
+        </p:spPr>
+        <p:txBody>
+          <a:bodyPr spcFirstLastPara="1" wrap="square" lIns="91425" tIns="91425" rIns="91425" bIns="91425" anchor="t" anchorCtr="0">
+            <a:noAutofit/>
+          </a:bodyPr>
+          <a:lstStyle/>
+          <a:p>
+            <a:pPr marL="0" lvl="0" indent="0" algn="l" rtl="0">
+              <a:spcBef>
+                <a:spcPts val="0"/>
+              </a:spcBef>
+              <a:spcAft>
+                <a:spcPts val="0"/>
+              </a:spcAft>
+              <a:buNone/>
+            </a:pPr>
+            <a:r>
+              <a:rPr lang="en" b="1" dirty="0">
+                <a:latin typeface="Avenir Next LT Pro" panose="020B0504020202020204" pitchFamily="34" charset="0"/>
+              </a:rPr>
+              <a:t>Component 8 Version 2 (Trello screenshot)</a:t>
+            </a:r>
+            <a:endParaRPr b="1" dirty="0">
+              <a:latin typeface="Avenir Next LT Pro" panose="020B0504020202020204" pitchFamily="34" charset="0"/>
+            </a:endParaRPr>
+          </a:p>
+        </p:txBody>
+      </p:sp>
+      <p:pic>
+        <p:nvPicPr>
+          <p:cNvPr id="4" name="Picture 3">
+            <a:extLst>
+              <a:ext uri="{FF2B5EF4-FFF2-40B4-BE49-F238E27FC236}">
+                <a16:creationId xmlns:a16="http://schemas.microsoft.com/office/drawing/2014/main" id="{1EE274FE-E52B-4AA7-99CA-A8DA4DEFC9B2}"/>
+              </a:ext>
+            </a:extLst>
+          </p:cNvPr>
+          <p:cNvPicPr>
+            <a:picLocks noChangeAspect="1"/>
+          </p:cNvPicPr>
+          <p:nvPr/>
+        </p:nvPicPr>
+        <p:blipFill>
+          <a:blip r:embed="rId4"/>
+          <a:stretch>
+            <a:fillRect/>
+          </a:stretch>
+        </p:blipFill>
+        <p:spPr>
+          <a:xfrm>
+            <a:off x="104414" y="1303868"/>
+            <a:ext cx="8935170" cy="2535764"/>
+          </a:xfrm>
+          <a:prstGeom prst="rect">
+            <a:avLst/>
+          </a:prstGeom>
+        </p:spPr>
+      </p:pic>
+    </p:spTree>
+    <p:extLst>
+      <p:ext uri="{BB962C8B-B14F-4D97-AF65-F5344CB8AC3E}">
+        <p14:creationId xmlns:p14="http://schemas.microsoft.com/office/powerpoint/2010/main" val="963759518"/>
+      </p:ext>
+    </p:extLst>
+  </p:cSld>
+  <p:clrMapOvr>
+    <a:masterClrMapping/>
+  </p:clrMapOvr>
+</p:sld>
+</file>
+
+<file path=ppt/slides/slide69.xml><?xml version="1.0" encoding="utf-8"?>
+<p:sld xmlns:a="http://schemas.openxmlformats.org/drawingml/2006/main" xmlns:r="http://schemas.openxmlformats.org/officeDocument/2006/relationships" xmlns:p="http://schemas.openxmlformats.org/presentationml/2006/main">
+  <p:cSld>
+    <p:spTree>
+      <p:nvGrpSpPr>
+        <p:cNvPr id="1" name="Shape 77"/>
+        <p:cNvGrpSpPr/>
+        <p:nvPr/>
+      </p:nvGrpSpPr>
+      <p:grpSpPr>
+        <a:xfrm>
+          <a:off x="0" y="0"/>
+          <a:ext cx="0" cy="0"/>
+          <a:chOff x="0" y="0"/>
+          <a:chExt cx="0" cy="0"/>
+        </a:xfrm>
+      </p:grpSpPr>
+      <p:pic>
+        <p:nvPicPr>
+          <p:cNvPr id="3" name="Picture 2">
+            <a:extLst>
+              <a:ext uri="{FF2B5EF4-FFF2-40B4-BE49-F238E27FC236}">
+                <a16:creationId xmlns:a16="http://schemas.microsoft.com/office/drawing/2014/main" id="{E10C2034-E5C4-4ABB-8872-92315B5651AC}"/>
+              </a:ext>
+            </a:extLst>
+          </p:cNvPr>
+          <p:cNvPicPr>
+            <a:picLocks noChangeAspect="1"/>
+          </p:cNvPicPr>
+          <p:nvPr/>
+        </p:nvPicPr>
+        <p:blipFill>
+          <a:blip r:embed="rId3"/>
+          <a:stretch>
+            <a:fillRect/>
+          </a:stretch>
+        </p:blipFill>
+        <p:spPr>
+          <a:xfrm>
+            <a:off x="0" y="1970"/>
+            <a:ext cx="9144000" cy="5139559"/>
+          </a:xfrm>
+          <a:prstGeom prst="rect">
+            <a:avLst/>
+          </a:prstGeom>
+        </p:spPr>
+      </p:pic>
+      <p:sp>
+        <p:nvSpPr>
+          <p:cNvPr id="78" name="Google Shape;78;p17"/>
+          <p:cNvSpPr txBox="1">
+            <a:spLocks noGrp="1"/>
+          </p:cNvSpPr>
+          <p:nvPr>
+            <p:ph type="title"/>
+          </p:nvPr>
+        </p:nvSpPr>
+        <p:spPr>
+          <a:xfrm>
+            <a:off x="285722" y="105412"/>
+            <a:ext cx="8520600" cy="572700"/>
+          </a:xfrm>
+          <a:prstGeom prst="rect">
+            <a:avLst/>
+          </a:prstGeom>
+        </p:spPr>
+        <p:txBody>
+          <a:bodyPr spcFirstLastPara="1" wrap="square" lIns="91425" tIns="91425" rIns="91425" bIns="91425" anchor="t" anchorCtr="0">
+            <a:noAutofit/>
+          </a:bodyPr>
+          <a:lstStyle/>
+          <a:p>
+            <a:pPr marL="0" lvl="0" indent="0" algn="l" rtl="0">
+              <a:spcBef>
+                <a:spcPts val="0"/>
+              </a:spcBef>
+              <a:spcAft>
+                <a:spcPts val="0"/>
+              </a:spcAft>
+              <a:buNone/>
+            </a:pPr>
+            <a:r>
+              <a:rPr lang="en" b="1">
+                <a:latin typeface="Avenir Next LT Pro" panose="020B0504020202020204" pitchFamily="34" charset="0"/>
+              </a:rPr>
+              <a:t>Component 9 Version 1 </a:t>
+            </a:r>
+            <a:r>
+              <a:rPr lang="en" b="1" dirty="0">
+                <a:latin typeface="Avenir Next LT Pro" panose="020B0504020202020204" pitchFamily="34" charset="0"/>
+              </a:rPr>
+              <a:t>- Test Plan</a:t>
+            </a:r>
+            <a:endParaRPr b="1" dirty="0">
+              <a:latin typeface="Avenir Next LT Pro" panose="020B0504020202020204" pitchFamily="34" charset="0"/>
+            </a:endParaRPr>
+          </a:p>
+        </p:txBody>
+      </p:sp>
+      <p:graphicFrame>
+        <p:nvGraphicFramePr>
+          <p:cNvPr id="79" name="Google Shape;79;p17"/>
+          <p:cNvGraphicFramePr/>
+          <p:nvPr/>
+        </p:nvGraphicFramePr>
+        <p:xfrm>
+          <a:off x="201902" y="3864638"/>
+          <a:ext cx="8520600" cy="1173450"/>
+        </p:xfrm>
+        <a:graphic>
+          <a:graphicData uri="http://schemas.openxmlformats.org/drawingml/2006/table">
+            <a:tbl>
+              <a:tblPr>
+                <a:noFill/>
+                <a:tableStyleId>{E1099E06-0E6B-448D-9D27-60429F06E6F4}</a:tableStyleId>
+              </a:tblPr>
+              <a:tblGrid>
+                <a:gridCol w="3653818">
+                  <a:extLst>
+                    <a:ext uri="{9D8B030D-6E8A-4147-A177-3AD203B41FA5}">
+                      <a16:colId xmlns:a16="http://schemas.microsoft.com/office/drawing/2014/main" val="20000"/>
+                    </a:ext>
+                  </a:extLst>
+                </a:gridCol>
+                <a:gridCol w="4866782">
+                  <a:extLst>
+                    <a:ext uri="{9D8B030D-6E8A-4147-A177-3AD203B41FA5}">
+                      <a16:colId xmlns:a16="http://schemas.microsoft.com/office/drawing/2014/main" val="20001"/>
+                    </a:ext>
+                  </a:extLst>
+                </a:gridCol>
+              </a:tblGrid>
+              <a:tr h="381000">
+                <a:tc>
+                  <a:txBody>
+                    <a:bodyPr/>
+                    <a:lstStyle/>
+                    <a:p>
+                      <a:pPr marL="0" lvl="0" indent="0" algn="l" rtl="0">
+                        <a:spcBef>
+                          <a:spcPts val="0"/>
+                        </a:spcBef>
+                        <a:spcAft>
+                          <a:spcPts val="0"/>
+                        </a:spcAft>
+                        <a:buNone/>
+                      </a:pPr>
+                      <a:r>
+                        <a:rPr lang="en" sz="1000" b="1" dirty="0">
+                          <a:latin typeface="Avenir Next LT Pro" panose="020B0504020202020204" pitchFamily="34" charset="0"/>
+                        </a:rPr>
+                        <a:t>Test Case</a:t>
+                      </a:r>
+                      <a:endParaRPr sz="1000" b="1" dirty="0">
+                        <a:latin typeface="Avenir Next LT Pro" panose="020B0504020202020204" pitchFamily="34" charset="0"/>
+                      </a:endParaRPr>
+                    </a:p>
+                  </a:txBody>
+                  <a:tcPr marL="91425" marR="91425" marT="91425" marB="91425">
+                    <a:solidFill>
+                      <a:srgbClr val="CCCCCC"/>
+                    </a:solidFill>
+                  </a:tcPr>
+                </a:tc>
+                <a:tc>
+                  <a:txBody>
+                    <a:bodyPr/>
+                    <a:lstStyle/>
+                    <a:p>
+                      <a:pPr marL="0" lvl="0" indent="0" algn="l" rtl="0">
+                        <a:spcBef>
+                          <a:spcPts val="0"/>
+                        </a:spcBef>
+                        <a:spcAft>
+                          <a:spcPts val="0"/>
+                        </a:spcAft>
+                        <a:buNone/>
+                      </a:pPr>
+                      <a:r>
+                        <a:rPr lang="en" sz="1000" b="1" dirty="0">
+                          <a:latin typeface="Avenir Next LT Pro" panose="020B0504020202020204" pitchFamily="34" charset="0"/>
+                        </a:rPr>
+                        <a:t>Expected Values</a:t>
+                      </a:r>
+                      <a:endParaRPr sz="1000" b="1" dirty="0">
+                        <a:latin typeface="Avenir Next LT Pro" panose="020B0504020202020204" pitchFamily="34" charset="0"/>
+                      </a:endParaRPr>
+                    </a:p>
+                  </a:txBody>
+                  <a:tcPr marL="91425" marR="91425" marT="91425" marB="91425">
+                    <a:solidFill>
+                      <a:srgbClr val="CCCCCC"/>
+                    </a:solidFill>
+                  </a:tcPr>
+                </a:tc>
+                <a:extLst>
+                  <a:ext uri="{0D108BD9-81ED-4DB2-BD59-A6C34878D82A}">
+                    <a16:rowId xmlns:a16="http://schemas.microsoft.com/office/drawing/2014/main" val="10000"/>
+                  </a:ext>
+                </a:extLst>
+              </a:tr>
+              <a:tr h="396200">
+                <a:tc>
+                  <a:txBody>
+                    <a:bodyPr/>
+                    <a:lstStyle/>
+                    <a:p>
+                      <a:pPr marL="0" lvl="0" indent="0" algn="l" rtl="0">
+                        <a:spcBef>
+                          <a:spcPts val="0"/>
+                        </a:spcBef>
+                        <a:spcAft>
+                          <a:spcPts val="0"/>
+                        </a:spcAft>
+                        <a:buNone/>
+                      </a:pPr>
+                      <a:r>
+                        <a:rPr lang="en-NZ" sz="1000" dirty="0">
+                          <a:latin typeface="Avenir Next LT Pro" panose="020B0504020202020204" pitchFamily="34" charset="0"/>
+                        </a:rPr>
+                        <a:t>Entered 1 Choose Confirm</a:t>
+                      </a:r>
+                    </a:p>
+                    <a:p>
+                      <a:pPr marL="0" lvl="0" indent="0" algn="l" rtl="0">
+                        <a:spcBef>
+                          <a:spcPts val="0"/>
+                        </a:spcBef>
+                        <a:spcAft>
+                          <a:spcPts val="0"/>
+                        </a:spcAft>
+                        <a:buNone/>
+                      </a:pPr>
+                      <a:r>
+                        <a:rPr lang="en-NZ" sz="1000" dirty="0">
+                          <a:latin typeface="Avenir Next LT Pro" panose="020B0504020202020204" pitchFamily="34" charset="0"/>
+                        </a:rPr>
+                        <a:t>Entered 2 Choose Cancel</a:t>
+                      </a:r>
+                    </a:p>
+                    <a:p>
+                      <a:pPr marL="0" lvl="0" indent="0" algn="l" rtl="0">
+                        <a:spcBef>
+                          <a:spcPts val="0"/>
+                        </a:spcBef>
+                        <a:spcAft>
+                          <a:spcPts val="0"/>
+                        </a:spcAft>
+                        <a:buNone/>
+                      </a:pPr>
+                      <a:r>
+                        <a:rPr lang="en-NZ" sz="1000" dirty="0">
+                          <a:latin typeface="Avenir Next LT Pro" panose="020B0504020202020204" pitchFamily="34" charset="0"/>
+                        </a:rPr>
+                        <a:t>Entered 4 </a:t>
+                      </a:r>
+                    </a:p>
+                    <a:p>
+                      <a:pPr marL="0" lvl="0" indent="0" algn="l" rtl="0">
+                        <a:spcBef>
+                          <a:spcPts val="0"/>
+                        </a:spcBef>
+                        <a:spcAft>
+                          <a:spcPts val="0"/>
+                        </a:spcAft>
+                        <a:buNone/>
+                      </a:pPr>
+                      <a:r>
+                        <a:rPr lang="en-NZ" sz="1000" dirty="0">
+                          <a:latin typeface="Avenir Next LT Pro" panose="020B0504020202020204" pitchFamily="34" charset="0"/>
+                        </a:rPr>
+                        <a:t>Entered s</a:t>
+                      </a:r>
+                    </a:p>
+                  </a:txBody>
+                  <a:tcPr marL="91425" marR="91425" marT="91425" marB="91425"/>
+                </a:tc>
+                <a:tc>
+                  <a:txBody>
+                    <a:bodyPr/>
+                    <a:lstStyle/>
+                    <a:p>
+                      <a:pPr marL="0" lvl="0" indent="0" algn="l" rtl="0">
+                        <a:spcBef>
+                          <a:spcPts val="0"/>
+                        </a:spcBef>
+                        <a:spcAft>
+                          <a:spcPts val="0"/>
+                        </a:spcAft>
+                        <a:buNone/>
+                      </a:pPr>
+                      <a:r>
+                        <a:rPr lang="en-NZ" sz="1000" dirty="0">
+                          <a:latin typeface="Avenir Next LT Pro" panose="020B0504020202020204" pitchFamily="34" charset="0"/>
+                        </a:rPr>
+                        <a:t>Confirm worked – printed “confirm”</a:t>
+                      </a:r>
+                    </a:p>
+                    <a:p>
+                      <a:pPr marL="0" lvl="0" indent="0" algn="l" rtl="0">
+                        <a:spcBef>
+                          <a:spcPts val="0"/>
+                        </a:spcBef>
+                        <a:spcAft>
+                          <a:spcPts val="0"/>
+                        </a:spcAft>
+                        <a:buNone/>
+                      </a:pPr>
+                      <a:r>
+                        <a:rPr lang="en-NZ" sz="1000" dirty="0">
+                          <a:latin typeface="Avenir Next LT Pro" panose="020B0504020202020204" pitchFamily="34" charset="0"/>
+                        </a:rPr>
+                        <a:t>Cancel worked – printed “cancel”</a:t>
+                      </a:r>
+                    </a:p>
+                    <a:p>
+                      <a:pPr marL="0" lvl="0" indent="0" algn="l" rtl="0">
+                        <a:spcBef>
+                          <a:spcPts val="0"/>
+                        </a:spcBef>
+                        <a:spcAft>
+                          <a:spcPts val="0"/>
+                        </a:spcAft>
+                        <a:buNone/>
+                      </a:pPr>
+                      <a:r>
+                        <a:rPr lang="en-NZ" sz="1000" dirty="0">
+                          <a:latin typeface="Avenir Next LT Pro" panose="020B0504020202020204" pitchFamily="34" charset="0"/>
+                        </a:rPr>
+                        <a:t>Printed “Please enter 1 or 2”</a:t>
+                      </a:r>
+                    </a:p>
+                    <a:p>
+                      <a:pPr marL="0" lvl="0" indent="0" algn="l" rtl="0">
+                        <a:spcBef>
+                          <a:spcPts val="0"/>
+                        </a:spcBef>
+                        <a:spcAft>
+                          <a:spcPts val="0"/>
+                        </a:spcAft>
+                        <a:buNone/>
+                      </a:pPr>
+                      <a:r>
+                        <a:rPr lang="en-NZ" sz="1000" dirty="0">
+                          <a:latin typeface="Avenir Next LT Pro" panose="020B0504020202020204" pitchFamily="34" charset="0"/>
+                        </a:rPr>
+                        <a:t>Printed “please enter a valid number”</a:t>
+                      </a:r>
+                      <a:endParaRPr sz="1000" dirty="0">
+                        <a:latin typeface="Avenir Next LT Pro" panose="020B0504020202020204" pitchFamily="34" charset="0"/>
+                      </a:endParaRPr>
+                    </a:p>
+                  </a:txBody>
+                  <a:tcPr marL="91425" marR="91425" marT="91425" marB="91425"/>
+                </a:tc>
+                <a:extLst>
+                  <a:ext uri="{0D108BD9-81ED-4DB2-BD59-A6C34878D82A}">
+                    <a16:rowId xmlns:a16="http://schemas.microsoft.com/office/drawing/2014/main" val="10001"/>
+                  </a:ext>
+                </a:extLst>
+              </a:tr>
+            </a:tbl>
+          </a:graphicData>
+        </a:graphic>
+      </p:graphicFrame>
+    </p:spTree>
+    <p:extLst>
+      <p:ext uri="{BB962C8B-B14F-4D97-AF65-F5344CB8AC3E}">
+        <p14:creationId xmlns:p14="http://schemas.microsoft.com/office/powerpoint/2010/main" val="744605713"/>
+      </p:ext>
+    </p:extLst>
+  </p:cSld>
+  <p:clrMapOvr>
+    <a:masterClrMapping/>
+  </p:clrMapOvr>
+</p:sld>
+</file>
+
+<file path=ppt/slides/slide7.xml><?xml version="1.0" encoding="utf-8"?>
+<p:sld xmlns:a="http://schemas.openxmlformats.org/drawingml/2006/main" xmlns:r="http://schemas.openxmlformats.org/officeDocument/2006/relationships" xmlns:p="http://schemas.openxmlformats.org/presentationml/2006/main">
+  <p:cSld>
+    <p:bg>
+      <p:bgPr>
+        <a:solidFill>
+          <a:srgbClr val="FFCC66"/>
+        </a:solidFill>
+        <a:effectLst/>
+      </p:bgPr>
+    </p:bg>
+    <p:spTree>
+      <p:nvGrpSpPr>
+        <p:cNvPr id="1" name=""/>
+        <p:cNvGrpSpPr/>
+        <p:nvPr/>
+      </p:nvGrpSpPr>
+      <p:grpSpPr>
+        <a:xfrm>
+          <a:off x="0" y="0"/>
+          <a:ext cx="0" cy="0"/>
+          <a:chOff x="0" y="0"/>
+          <a:chExt cx="0" cy="0"/>
+        </a:xfrm>
+      </p:grpSpPr>
+      <p:pic>
+        <p:nvPicPr>
+          <p:cNvPr id="5" name="Picture 4">
+            <a:extLst>
+              <a:ext uri="{FF2B5EF4-FFF2-40B4-BE49-F238E27FC236}">
+                <a16:creationId xmlns:a16="http://schemas.microsoft.com/office/drawing/2014/main" id="{F55164D2-1D02-401E-AAD4-5D59D0238303}"/>
+              </a:ext>
+            </a:extLst>
+          </p:cNvPr>
+          <p:cNvPicPr>
+            <a:picLocks noChangeAspect="1"/>
+          </p:cNvPicPr>
+          <p:nvPr/>
+        </p:nvPicPr>
+        <p:blipFill>
+          <a:blip r:embed="rId2"/>
+          <a:stretch>
+            <a:fillRect/>
+          </a:stretch>
+        </p:blipFill>
+        <p:spPr>
+          <a:xfrm>
+            <a:off x="0" y="13181"/>
+            <a:ext cx="9144000" cy="5117138"/>
+          </a:xfrm>
+          <a:prstGeom prst="rect">
+            <a:avLst/>
+          </a:prstGeom>
+        </p:spPr>
+      </p:pic>
+      <p:sp>
+        <p:nvSpPr>
+          <p:cNvPr id="2" name="Title 1">
+            <a:extLst>
+              <a:ext uri="{FF2B5EF4-FFF2-40B4-BE49-F238E27FC236}">
+                <a16:creationId xmlns:a16="http://schemas.microsoft.com/office/drawing/2014/main" id="{5912979F-6922-40FD-B6E0-0506FA25714D}"/>
+              </a:ext>
+            </a:extLst>
+          </p:cNvPr>
+          <p:cNvSpPr>
+            <a:spLocks noGrp="1"/>
+          </p:cNvSpPr>
+          <p:nvPr>
+            <p:ph type="title"/>
+          </p:nvPr>
+        </p:nvSpPr>
+        <p:spPr>
+          <a:xfrm>
+            <a:off x="433620" y="445025"/>
+            <a:ext cx="8520600" cy="572700"/>
+          </a:xfrm>
+        </p:spPr>
+        <p:txBody>
+          <a:bodyPr/>
+          <a:lstStyle/>
+          <a:p>
+            <a:r>
+              <a:rPr lang="en-US" b="1" dirty="0">
+                <a:latin typeface="Avenir Next LT Pro" panose="020B0504020202020204" pitchFamily="34" charset="0"/>
+              </a:rPr>
+              <a:t>Implication 2 – Usability (Error Recovery)</a:t>
+            </a:r>
+            <a:endParaRPr lang="en-NZ" b="1" dirty="0">
+              <a:latin typeface="Avenir Next LT Pro" panose="020B0504020202020204" pitchFamily="34" charset="0"/>
+            </a:endParaRPr>
+          </a:p>
+        </p:txBody>
+      </p:sp>
+      <p:sp>
+        <p:nvSpPr>
+          <p:cNvPr id="3" name="Text Placeholder 2">
+            <a:extLst>
+              <a:ext uri="{FF2B5EF4-FFF2-40B4-BE49-F238E27FC236}">
+                <a16:creationId xmlns:a16="http://schemas.microsoft.com/office/drawing/2014/main" id="{1EB42CE1-67BF-466B-8C2C-7F21A8892B1E}"/>
+              </a:ext>
+            </a:extLst>
+          </p:cNvPr>
+          <p:cNvSpPr>
+            <a:spLocks noGrp="1"/>
+          </p:cNvSpPr>
+          <p:nvPr>
+            <p:ph type="body" idx="1"/>
+          </p:nvPr>
+        </p:nvSpPr>
+        <p:spPr/>
+        <p:txBody>
+          <a:bodyPr/>
+          <a:lstStyle/>
+          <a:p>
+            <a:pPr marL="114300" indent="0">
+              <a:buNone/>
+            </a:pPr>
+            <a:r>
+              <a:rPr lang="en-US" u="sng" dirty="0">
+                <a:solidFill>
+                  <a:schemeClr val="tx1"/>
+                </a:solidFill>
+                <a:latin typeface="Avenir Next LT Pro" panose="020B0504020202020204" pitchFamily="34" charset="0"/>
+              </a:rPr>
+              <a:t>Explain why it needs to be considered:</a:t>
+            </a:r>
+          </a:p>
+          <a:p>
+            <a:pPr marL="114300" indent="0">
+              <a:buNone/>
+            </a:pPr>
+            <a:r>
+              <a:rPr lang="en-US" dirty="0">
+                <a:solidFill>
+                  <a:schemeClr val="tx1"/>
+                </a:solidFill>
+                <a:latin typeface="Avenir Next LT Pro" panose="020B0504020202020204" pitchFamily="34" charset="0"/>
+              </a:rPr>
+              <a:t>This implication needs to be considered to make sure that the customer can move on to the next stage if they make an error; whether it was accidental or a mistake. Customers will know that something has gone wrong and, thus, will prevent any problems in the future if they make an error in their responses/answers. Otherwise, the program could lead to failure and stop responding, making the user frustrated.</a:t>
+            </a:r>
+          </a:p>
+          <a:p>
+            <a:pPr marL="114300" indent="0">
+              <a:buNone/>
+            </a:pPr>
+            <a:endParaRPr lang="en-US" dirty="0">
+              <a:latin typeface="Avenir Next LT Pro" panose="020B0504020202020204" pitchFamily="34" charset="0"/>
+            </a:endParaRPr>
+          </a:p>
+          <a:p>
+            <a:pPr marL="114300" indent="0">
+              <a:buNone/>
+            </a:pPr>
+            <a:endParaRPr lang="en-US" dirty="0">
+              <a:latin typeface="Avenir Next LT Pro" panose="020B0504020202020204" pitchFamily="34" charset="0"/>
+            </a:endParaRPr>
+          </a:p>
+          <a:p>
+            <a:pPr marL="114300" indent="0">
+              <a:buNone/>
+            </a:pPr>
+            <a:endParaRPr lang="en-NZ" dirty="0">
+              <a:latin typeface="Avenir Next LT Pro" panose="020B0504020202020204" pitchFamily="34" charset="0"/>
+            </a:endParaRPr>
+          </a:p>
+        </p:txBody>
+      </p:sp>
+    </p:spTree>
+    <p:extLst>
+      <p:ext uri="{BB962C8B-B14F-4D97-AF65-F5344CB8AC3E}">
+        <p14:creationId xmlns:p14="http://schemas.microsoft.com/office/powerpoint/2010/main" val="3102438580"/>
+      </p:ext>
+    </p:extLst>
+  </p:cSld>
+  <p:clrMapOvr>
+    <a:masterClrMapping/>
+  </p:clrMapOvr>
+</p:sld>
+</file>
+
+<file path=ppt/slides/slide70.xml><?xml version="1.0" encoding="utf-8"?>
+<p:sld xmlns:a="http://schemas.openxmlformats.org/drawingml/2006/main" xmlns:r="http://schemas.openxmlformats.org/officeDocument/2006/relationships" xmlns:p="http://schemas.openxmlformats.org/presentationml/2006/main">
+  <p:cSld>
+    <p:bg>
+      <p:bgPr>
+        <a:solidFill>
           <a:schemeClr val="accent1">
             <a:lumMod val="40000"/>
             <a:lumOff val="60000"/>
@@ -29934,7 +32615,7 @@
 </p:sld>
 </file>
 
-<file path=ppt/slides/slide65.xml><?xml version="1.0" encoding="utf-8"?>
+<file path=ppt/slides/slide71.xml><?xml version="1.0" encoding="utf-8"?>
 <p:sld xmlns:a="http://schemas.openxmlformats.org/drawingml/2006/main" xmlns:r="http://schemas.openxmlformats.org/officeDocument/2006/relationships" xmlns:p="http://schemas.openxmlformats.org/presentationml/2006/main">
   <p:cSld>
     <p:bg>
@@ -30005,7 +32686,7 @@
 </p:sld>
 </file>
 
-<file path=ppt/slides/slide66.xml><?xml version="1.0" encoding="utf-8"?>
+<file path=ppt/slides/slide72.xml><?xml version="1.0" encoding="utf-8"?>
 <p:sld xmlns:a="http://schemas.openxmlformats.org/drawingml/2006/main" xmlns:r="http://schemas.openxmlformats.org/officeDocument/2006/relationships" xmlns:p="http://schemas.openxmlformats.org/presentationml/2006/main">
   <p:cSld>
     <p:bg>
@@ -30075,7 +32756,7 @@
 </p:sld>
 </file>
 
-<file path=ppt/slides/slide67.xml><?xml version="1.0" encoding="utf-8"?>
+<file path=ppt/slides/slide73.xml><?xml version="1.0" encoding="utf-8"?>
 <p:sld xmlns:a="http://schemas.openxmlformats.org/drawingml/2006/main" xmlns:r="http://schemas.openxmlformats.org/officeDocument/2006/relationships" xmlns:p="http://schemas.openxmlformats.org/presentationml/2006/main">
   <p:cSld>
     <p:bg>
@@ -30146,7 +32827,7 @@
 </p:sld>
 </file>
 
-<file path=ppt/slides/slide68.xml><?xml version="1.0" encoding="utf-8"?>
+<file path=ppt/slides/slide74.xml><?xml version="1.0" encoding="utf-8"?>
 <p:sld xmlns:a="http://schemas.openxmlformats.org/drawingml/2006/main" xmlns:r="http://schemas.openxmlformats.org/officeDocument/2006/relationships" xmlns:p="http://schemas.openxmlformats.org/presentationml/2006/main">
   <p:cSld>
     <p:bg>
@@ -30216,7 +32897,7 @@
 </p:sld>
 </file>
 
-<file path=ppt/slides/slide69.xml><?xml version="1.0" encoding="utf-8"?>
+<file path=ppt/slides/slide75.xml><?xml version="1.0" encoding="utf-8"?>
 <p:sld xmlns:a="http://schemas.openxmlformats.org/drawingml/2006/main" xmlns:r="http://schemas.openxmlformats.org/officeDocument/2006/relationships" xmlns:p="http://schemas.openxmlformats.org/presentationml/2006/main">
   <p:cSld>
     <p:bg>
@@ -30318,187 +32999,7 @@
 </p:sld>
 </file>
 
-<file path=ppt/slides/slide7.xml><?xml version="1.0" encoding="utf-8"?>
-<p:sld xmlns:a="http://schemas.openxmlformats.org/drawingml/2006/main" xmlns:r="http://schemas.openxmlformats.org/officeDocument/2006/relationships" xmlns:p="http://schemas.openxmlformats.org/presentationml/2006/main">
-  <p:cSld>
-    <p:bg>
-      <p:bgPr>
-        <a:solidFill>
-          <a:srgbClr val="FFCC66"/>
-        </a:solidFill>
-        <a:effectLst/>
-      </p:bgPr>
-    </p:bg>
-    <p:spTree>
-      <p:nvGrpSpPr>
-        <p:cNvPr id="1" name=""/>
-        <p:cNvGrpSpPr/>
-        <p:nvPr/>
-      </p:nvGrpSpPr>
-      <p:grpSpPr>
-        <a:xfrm>
-          <a:off x="0" y="0"/>
-          <a:ext cx="0" cy="0"/>
-          <a:chOff x="0" y="0"/>
-          <a:chExt cx="0" cy="0"/>
-        </a:xfrm>
-      </p:grpSpPr>
-      <p:pic>
-        <p:nvPicPr>
-          <p:cNvPr id="5" name="Picture 4">
-            <a:extLst>
-              <a:ext uri="{FF2B5EF4-FFF2-40B4-BE49-F238E27FC236}">
-                <a16:creationId xmlns:a16="http://schemas.microsoft.com/office/drawing/2014/main" id="{F55164D2-1D02-401E-AAD4-5D59D0238303}"/>
-              </a:ext>
-            </a:extLst>
-          </p:cNvPr>
-          <p:cNvPicPr>
-            <a:picLocks noChangeAspect="1"/>
-          </p:cNvPicPr>
-          <p:nvPr/>
-        </p:nvPicPr>
-        <p:blipFill>
-          <a:blip r:embed="rId2"/>
-          <a:stretch>
-            <a:fillRect/>
-          </a:stretch>
-        </p:blipFill>
-        <p:spPr>
-          <a:xfrm>
-            <a:off x="0" y="13181"/>
-            <a:ext cx="9144000" cy="5117138"/>
-          </a:xfrm>
-          <a:prstGeom prst="rect">
-            <a:avLst/>
-          </a:prstGeom>
-        </p:spPr>
-      </p:pic>
-      <p:sp>
-        <p:nvSpPr>
-          <p:cNvPr id="2" name="Title 1">
-            <a:extLst>
-              <a:ext uri="{FF2B5EF4-FFF2-40B4-BE49-F238E27FC236}">
-                <a16:creationId xmlns:a16="http://schemas.microsoft.com/office/drawing/2014/main" id="{5912979F-6922-40FD-B6E0-0506FA25714D}"/>
-              </a:ext>
-            </a:extLst>
-          </p:cNvPr>
-          <p:cNvSpPr>
-            <a:spLocks noGrp="1"/>
-          </p:cNvSpPr>
-          <p:nvPr>
-            <p:ph type="title"/>
-          </p:nvPr>
-        </p:nvSpPr>
-        <p:spPr>
-          <a:xfrm>
-            <a:off x="433620" y="445025"/>
-            <a:ext cx="8520600" cy="572700"/>
-          </a:xfrm>
-        </p:spPr>
-        <p:txBody>
-          <a:bodyPr/>
-          <a:lstStyle/>
-          <a:p>
-            <a:r>
-              <a:rPr lang="en-US" b="1" dirty="0">
-                <a:latin typeface="Avenir Next LT Pro" panose="020B0504020202020204" pitchFamily="34" charset="0"/>
-              </a:rPr>
-              <a:t>Implication 2 – Usability (Error Recovery)</a:t>
-            </a:r>
-            <a:endParaRPr lang="en-NZ" b="1" dirty="0">
-              <a:latin typeface="Avenir Next LT Pro" panose="020B0504020202020204" pitchFamily="34" charset="0"/>
-            </a:endParaRPr>
-          </a:p>
-        </p:txBody>
-      </p:sp>
-      <p:sp>
-        <p:nvSpPr>
-          <p:cNvPr id="3" name="Text Placeholder 2">
-            <a:extLst>
-              <a:ext uri="{FF2B5EF4-FFF2-40B4-BE49-F238E27FC236}">
-                <a16:creationId xmlns:a16="http://schemas.microsoft.com/office/drawing/2014/main" id="{1EB42CE1-67BF-466B-8C2C-7F21A8892B1E}"/>
-              </a:ext>
-            </a:extLst>
-          </p:cNvPr>
-          <p:cNvSpPr>
-            <a:spLocks noGrp="1"/>
-          </p:cNvSpPr>
-          <p:nvPr>
-            <p:ph type="body" idx="1"/>
-          </p:nvPr>
-        </p:nvSpPr>
-        <p:spPr/>
-        <p:txBody>
-          <a:bodyPr/>
-          <a:lstStyle/>
-          <a:p>
-            <a:pPr marL="114300" indent="0">
-              <a:buNone/>
-            </a:pPr>
-            <a:r>
-              <a:rPr lang="en-US" u="sng" dirty="0">
-                <a:solidFill>
-                  <a:schemeClr val="tx1"/>
-                </a:solidFill>
-                <a:latin typeface="Avenir Next LT Pro" panose="020B0504020202020204" pitchFamily="34" charset="0"/>
-              </a:rPr>
-              <a:t>Explain why it needs to be considered:</a:t>
-            </a:r>
-          </a:p>
-          <a:p>
-            <a:pPr marL="114300" indent="0">
-              <a:buNone/>
-            </a:pPr>
-            <a:r>
-              <a:rPr lang="en-US" dirty="0">
-                <a:solidFill>
-                  <a:schemeClr val="tx1"/>
-                </a:solidFill>
-                <a:latin typeface="Avenir Next LT Pro" panose="020B0504020202020204" pitchFamily="34" charset="0"/>
-              </a:rPr>
-              <a:t>This implication needs to be considered to make sure that the customer can move on to the next stage if they make an error; whether it was accidental or a mistake. Customers will know that something has gone wrong and, thus, will prevent any problems in the future if they make an error in their responses/answers. Otherwise, the program could lead to failure and stop responding, making the user frustrated.</a:t>
-            </a:r>
-          </a:p>
-          <a:p>
-            <a:pPr marL="114300" indent="0">
-              <a:buNone/>
-            </a:pPr>
-            <a:endParaRPr lang="en-US" dirty="0">
-              <a:latin typeface="Avenir Next LT Pro" panose="020B0504020202020204" pitchFamily="34" charset="0"/>
-            </a:endParaRPr>
-          </a:p>
-          <a:p>
-            <a:pPr marL="114300" indent="0">
-              <a:buNone/>
-            </a:pPr>
-            <a:endParaRPr lang="en-US" dirty="0">
-              <a:latin typeface="Avenir Next LT Pro" panose="020B0504020202020204" pitchFamily="34" charset="0"/>
-            </a:endParaRPr>
-          </a:p>
-          <a:p>
-            <a:pPr marL="114300" indent="0">
-              <a:buNone/>
-            </a:pPr>
-            <a:endParaRPr lang="en-NZ" dirty="0">
-              <a:latin typeface="Avenir Next LT Pro" panose="020B0504020202020204" pitchFamily="34" charset="0"/>
-            </a:endParaRPr>
-          </a:p>
-        </p:txBody>
-      </p:sp>
-    </p:spTree>
-    <p:extLst>
-      <p:ext uri="{BB962C8B-B14F-4D97-AF65-F5344CB8AC3E}">
-        <p14:creationId xmlns:p14="http://schemas.microsoft.com/office/powerpoint/2010/main" val="3102438580"/>
-      </p:ext>
-    </p:extLst>
-  </p:cSld>
-  <p:clrMapOvr>
-    <a:masterClrMapping/>
-  </p:clrMapOvr>
-</p:sld>
-</file>
-
-<file path=ppt/slides/slide70.xml><?xml version="1.0" encoding="utf-8"?>
+<file path=ppt/slides/slide76.xml><?xml version="1.0" encoding="utf-8"?>
 <p:sld xmlns:a="http://schemas.openxmlformats.org/drawingml/2006/main" xmlns:r="http://schemas.openxmlformats.org/officeDocument/2006/relationships" xmlns:p="http://schemas.openxmlformats.org/presentationml/2006/main">
   <p:cSld>
     <p:bg>
@@ -30615,7 +33116,7 @@
 </p:sld>
 </file>
 
-<file path=ppt/slides/slide71.xml><?xml version="1.0" encoding="utf-8"?>
+<file path=ppt/slides/slide77.xml><?xml version="1.0" encoding="utf-8"?>
 <p:sld xmlns:a="http://schemas.openxmlformats.org/drawingml/2006/main" xmlns:r="http://schemas.openxmlformats.org/officeDocument/2006/relationships" xmlns:p="http://schemas.openxmlformats.org/presentationml/2006/main">
   <p:cSld>
     <p:bg>
@@ -30721,7 +33222,7 @@
 </p:sld>
 </file>
 
-<file path=ppt/slides/slide72.xml><?xml version="1.0" encoding="utf-8"?>
+<file path=ppt/slides/slide78.xml><?xml version="1.0" encoding="utf-8"?>
 <p:sld xmlns:a="http://schemas.openxmlformats.org/drawingml/2006/main" xmlns:r="http://schemas.openxmlformats.org/officeDocument/2006/relationships" xmlns:p="http://schemas.openxmlformats.org/presentationml/2006/main">
   <p:cSld>
     <p:bg>
@@ -30843,7 +33344,7 @@
 </p:sld>
 </file>
 
-<file path=ppt/slides/slide73.xml><?xml version="1.0" encoding="utf-8"?>
+<file path=ppt/slides/slide79.xml><?xml version="1.0" encoding="utf-8"?>
 <p:sld xmlns:a="http://schemas.openxmlformats.org/drawingml/2006/main" xmlns:r="http://schemas.openxmlformats.org/officeDocument/2006/relationships" xmlns:p="http://schemas.openxmlformats.org/presentationml/2006/main">
   <p:cSld>
     <p:bg>
@@ -30958,85 +33459,6 @@
         <p14:creationId xmlns:p14="http://schemas.microsoft.com/office/powerpoint/2010/main" val="2422592500"/>
       </p:ext>
     </p:extLst>
-  </p:cSld>
-  <p:clrMapOvr>
-    <a:masterClrMapping/>
-  </p:clrMapOvr>
-</p:sld>
-</file>
-
-<file path=ppt/slides/slide74.xml><?xml version="1.0" encoding="utf-8"?>
-<p:sld xmlns:a="http://schemas.openxmlformats.org/drawingml/2006/main" xmlns:r="http://schemas.openxmlformats.org/officeDocument/2006/relationships" xmlns:p="http://schemas.openxmlformats.org/presentationml/2006/main">
-  <p:cSld>
-    <p:bg>
-      <p:bgPr>
-        <a:solidFill>
-          <a:srgbClr val="FFE599"/>
-        </a:solidFill>
-        <a:effectLst/>
-      </p:bgPr>
-    </p:bg>
-    <p:spTree>
-      <p:nvGrpSpPr>
-        <p:cNvPr id="1" name="Shape 89"/>
-        <p:cNvGrpSpPr/>
-        <p:nvPr/>
-      </p:nvGrpSpPr>
-      <p:grpSpPr>
-        <a:xfrm>
-          <a:off x="0" y="0"/>
-          <a:ext cx="0" cy="0"/>
-          <a:chOff x="0" y="0"/>
-          <a:chExt cx="0" cy="0"/>
-        </a:xfrm>
-      </p:grpSpPr>
-      <p:sp>
-        <p:nvSpPr>
-          <p:cNvPr id="90" name="Google Shape;90;p19"/>
-          <p:cNvSpPr txBox="1">
-            <a:spLocks noGrp="1"/>
-          </p:cNvSpPr>
-          <p:nvPr>
-            <p:ph type="body" idx="1"/>
-          </p:nvPr>
-        </p:nvSpPr>
-        <p:spPr>
-          <a:xfrm>
-            <a:off x="311700" y="397700"/>
-            <a:ext cx="8520600" cy="4171200"/>
-          </a:xfrm>
-          <a:prstGeom prst="rect">
-            <a:avLst/>
-          </a:prstGeom>
-        </p:spPr>
-        <p:txBody>
-          <a:bodyPr spcFirstLastPara="1" wrap="square" lIns="91425" tIns="91425" rIns="91425" bIns="91425" anchor="t" anchorCtr="0">
-            <a:noAutofit/>
-          </a:bodyPr>
-          <a:lstStyle/>
-          <a:p>
-            <a:pPr marL="0" lvl="0" indent="0" algn="l" rtl="0">
-              <a:spcBef>
-                <a:spcPts val="0"/>
-              </a:spcBef>
-              <a:spcAft>
-                <a:spcPts val="1600"/>
-              </a:spcAft>
-              <a:buNone/>
-            </a:pPr>
-            <a:r>
-              <a:rPr lang="en" b="1" i="1">
-                <a:solidFill>
-                  <a:srgbClr val="595959"/>
-                </a:solidFill>
-              </a:rPr>
-              <a:t>Discusses how the information from planning, testing and trialling of components assisted in the development of a high-quality outcome</a:t>
-            </a:r>
-            <a:endParaRPr/>
-          </a:p>
-        </p:txBody>
-      </p:sp>
-    </p:spTree>
   </p:cSld>
   <p:clrMapOvr>
     <a:masterClrMapping/>
@@ -31201,6 +33623,85 @@
         <p14:creationId xmlns:p14="http://schemas.microsoft.com/office/powerpoint/2010/main" val="1312020768"/>
       </p:ext>
     </p:extLst>
+  </p:cSld>
+  <p:clrMapOvr>
+    <a:masterClrMapping/>
+  </p:clrMapOvr>
+</p:sld>
+</file>
+
+<file path=ppt/slides/slide80.xml><?xml version="1.0" encoding="utf-8"?>
+<p:sld xmlns:a="http://schemas.openxmlformats.org/drawingml/2006/main" xmlns:r="http://schemas.openxmlformats.org/officeDocument/2006/relationships" xmlns:p="http://schemas.openxmlformats.org/presentationml/2006/main">
+  <p:cSld>
+    <p:bg>
+      <p:bgPr>
+        <a:solidFill>
+          <a:srgbClr val="FFE599"/>
+        </a:solidFill>
+        <a:effectLst/>
+      </p:bgPr>
+    </p:bg>
+    <p:spTree>
+      <p:nvGrpSpPr>
+        <p:cNvPr id="1" name="Shape 89"/>
+        <p:cNvGrpSpPr/>
+        <p:nvPr/>
+      </p:nvGrpSpPr>
+      <p:grpSpPr>
+        <a:xfrm>
+          <a:off x="0" y="0"/>
+          <a:ext cx="0" cy="0"/>
+          <a:chOff x="0" y="0"/>
+          <a:chExt cx="0" cy="0"/>
+        </a:xfrm>
+      </p:grpSpPr>
+      <p:sp>
+        <p:nvSpPr>
+          <p:cNvPr id="90" name="Google Shape;90;p19"/>
+          <p:cNvSpPr txBox="1">
+            <a:spLocks noGrp="1"/>
+          </p:cNvSpPr>
+          <p:nvPr>
+            <p:ph type="body" idx="1"/>
+          </p:nvPr>
+        </p:nvSpPr>
+        <p:spPr>
+          <a:xfrm>
+            <a:off x="311700" y="397700"/>
+            <a:ext cx="8520600" cy="4171200"/>
+          </a:xfrm>
+          <a:prstGeom prst="rect">
+            <a:avLst/>
+          </a:prstGeom>
+        </p:spPr>
+        <p:txBody>
+          <a:bodyPr spcFirstLastPara="1" wrap="square" lIns="91425" tIns="91425" rIns="91425" bIns="91425" anchor="t" anchorCtr="0">
+            <a:noAutofit/>
+          </a:bodyPr>
+          <a:lstStyle/>
+          <a:p>
+            <a:pPr marL="0" lvl="0" indent="0" algn="l" rtl="0">
+              <a:spcBef>
+                <a:spcPts val="0"/>
+              </a:spcBef>
+              <a:spcAft>
+                <a:spcPts val="1600"/>
+              </a:spcAft>
+              <a:buNone/>
+            </a:pPr>
+            <a:r>
+              <a:rPr lang="en" b="1" i="1">
+                <a:solidFill>
+                  <a:srgbClr val="595959"/>
+                </a:solidFill>
+              </a:rPr>
+              <a:t>Discusses how the information from planning, testing and trialling of components assisted in the development of a high-quality outcome</a:t>
+            </a:r>
+            <a:endParaRPr/>
+          </a:p>
+        </p:txBody>
+      </p:sp>
+    </p:spTree>
   </p:cSld>
   <p:clrMapOvr>
     <a:masterClrMapping/>

</xml_diff>

<commit_message>
Integrated confirm_cancel into main app.
Turned confirm_cancel into a function and integrated into main program.
</commit_message>
<xml_diff>
--- a/Danett Pepito - 000_91896 _ 91897 Documentation - 2150400 (Git).pptx
+++ b/Danett Pepito - 000_91896 _ 91897 Documentation - 2150400 (Git).pptx
@@ -5,7 +5,7 @@
     <p:sldMasterId id="2147483659" r:id="rId1"/>
   </p:sldMasterIdLst>
   <p:notesMasterIdLst>
-    <p:notesMasterId r:id="rId82"/>
+    <p:notesMasterId r:id="rId86"/>
   </p:notesMasterIdLst>
   <p:sldIdLst>
     <p:sldId id="256" r:id="rId2"/>
@@ -76,18 +76,22 @@
     <p:sldId id="335" r:id="rId67"/>
     <p:sldId id="336" r:id="rId68"/>
     <p:sldId id="337" r:id="rId69"/>
-    <p:sldId id="340" r:id="rId70"/>
-    <p:sldId id="282" r:id="rId71"/>
-    <p:sldId id="288" r:id="rId72"/>
-    <p:sldId id="290" r:id="rId73"/>
-    <p:sldId id="292" r:id="rId74"/>
-    <p:sldId id="291" r:id="rId75"/>
-    <p:sldId id="285" r:id="rId76"/>
-    <p:sldId id="261" r:id="rId77"/>
-    <p:sldId id="284" r:id="rId78"/>
-    <p:sldId id="286" r:id="rId79"/>
-    <p:sldId id="287" r:id="rId80"/>
-    <p:sldId id="262" r:id="rId81"/>
+    <p:sldId id="344" r:id="rId70"/>
+    <p:sldId id="343" r:id="rId71"/>
+    <p:sldId id="340" r:id="rId72"/>
+    <p:sldId id="341" r:id="rId73"/>
+    <p:sldId id="342" r:id="rId74"/>
+    <p:sldId id="282" r:id="rId75"/>
+    <p:sldId id="288" r:id="rId76"/>
+    <p:sldId id="290" r:id="rId77"/>
+    <p:sldId id="292" r:id="rId78"/>
+    <p:sldId id="291" r:id="rId79"/>
+    <p:sldId id="285" r:id="rId80"/>
+    <p:sldId id="261" r:id="rId81"/>
+    <p:sldId id="284" r:id="rId82"/>
+    <p:sldId id="286" r:id="rId83"/>
+    <p:sldId id="287" r:id="rId84"/>
+    <p:sldId id="262" r:id="rId85"/>
   </p:sldIdLst>
   <p:sldSz cx="9144000" cy="5143500" type="screen16x9"/>
   <p:notesSz cx="6858000" cy="9144000"/>
@@ -352,7 +356,7 @@
   <pc:docChgLst>
     <pc:chgData name="Danett Pepito" userId="ddef1e2176689e9a" providerId="LiveId" clId="{B2185394-3AFD-42B2-9285-3B672C598A56}"/>
     <pc:docChg chg="undo custSel addSld delSld modSld sldOrd">
-      <pc:chgData name="Danett Pepito" userId="ddef1e2176689e9a" providerId="LiveId" clId="{B2185394-3AFD-42B2-9285-3B672C598A56}" dt="2022-03-22T06:55:12.921" v="2776" actId="20577"/>
+      <pc:chgData name="Danett Pepito" userId="ddef1e2176689e9a" providerId="LiveId" clId="{B2185394-3AFD-42B2-9285-3B672C598A56}" dt="2022-03-22T07:08:14.804" v="2960" actId="1076"/>
       <pc:docMkLst>
         <pc:docMk/>
       </pc:docMkLst>
@@ -2740,13 +2744,13 @@
         </pc:picChg>
       </pc:sldChg>
       <pc:sldChg chg="addSp delSp modSp add mod">
-        <pc:chgData name="Danett Pepito" userId="ddef1e2176689e9a" providerId="LiveId" clId="{B2185394-3AFD-42B2-9285-3B672C598A56}" dt="2022-03-22T06:52:51.301" v="2728" actId="1076"/>
+        <pc:chgData name="Danett Pepito" userId="ddef1e2176689e9a" providerId="LiveId" clId="{B2185394-3AFD-42B2-9285-3B672C598A56}" dt="2022-03-22T07:05:03.086" v="2918" actId="1076"/>
         <pc:sldMkLst>
           <pc:docMk/>
           <pc:sldMk cId="963759518" sldId="337"/>
         </pc:sldMkLst>
         <pc:spChg chg="mod">
-          <ac:chgData name="Danett Pepito" userId="ddef1e2176689e9a" providerId="LiveId" clId="{B2185394-3AFD-42B2-9285-3B672C598A56}" dt="2022-03-22T06:52:05.741" v="2717" actId="20577"/>
+          <ac:chgData name="Danett Pepito" userId="ddef1e2176689e9a" providerId="LiveId" clId="{B2185394-3AFD-42B2-9285-3B672C598A56}" dt="2022-03-22T07:04:54.129" v="2913" actId="20577"/>
           <ac:spMkLst>
             <pc:docMk/>
             <pc:sldMk cId="963759518" sldId="337"/>
@@ -2754,7 +2758,7 @@
           </ac:spMkLst>
         </pc:spChg>
         <pc:picChg chg="add mod modCrop">
-          <ac:chgData name="Danett Pepito" userId="ddef1e2176689e9a" providerId="LiveId" clId="{B2185394-3AFD-42B2-9285-3B672C598A56}" dt="2022-03-22T06:52:46.527" v="2727" actId="14100"/>
+          <ac:chgData name="Danett Pepito" userId="ddef1e2176689e9a" providerId="LiveId" clId="{B2185394-3AFD-42B2-9285-3B672C598A56}" dt="2022-03-22T07:05:03.086" v="2918" actId="1076"/>
           <ac:picMkLst>
             <pc:docMk/>
             <pc:sldMk cId="963759518" sldId="337"/>
@@ -2769,8 +2773,8 @@
             <ac:picMk id="5" creationId="{611C9B7B-37F4-452A-82B3-8A7F77CCDBF4}"/>
           </ac:picMkLst>
         </pc:picChg>
-        <pc:picChg chg="add mod">
-          <ac:chgData name="Danett Pepito" userId="ddef1e2176689e9a" providerId="LiveId" clId="{B2185394-3AFD-42B2-9285-3B672C598A56}" dt="2022-03-22T06:52:51.301" v="2728" actId="1076"/>
+        <pc:picChg chg="add del mod">
+          <ac:chgData name="Danett Pepito" userId="ddef1e2176689e9a" providerId="LiveId" clId="{B2185394-3AFD-42B2-9285-3B672C598A56}" dt="2022-03-22T07:04:45.970" v="2911" actId="478"/>
           <ac:picMkLst>
             <pc:docMk/>
             <pc:sldMk cId="963759518" sldId="337"/>
@@ -2860,6 +2864,154 @@
             <pc:docMk/>
             <pc:sldMk cId="744605713" sldId="340"/>
             <ac:picMk id="6" creationId="{EC6BB872-C65F-4994-94A4-1017EC2E4B27}"/>
+          </ac:picMkLst>
+        </pc:picChg>
+      </pc:sldChg>
+      <pc:sldChg chg="addSp delSp modSp add mod">
+        <pc:chgData name="Danett Pepito" userId="ddef1e2176689e9a" providerId="LiveId" clId="{B2185394-3AFD-42B2-9285-3B672C598A56}" dt="2022-03-22T07:00:54.145" v="2898" actId="1076"/>
+        <pc:sldMkLst>
+          <pc:docMk/>
+          <pc:sldMk cId="2558664074" sldId="341"/>
+        </pc:sldMkLst>
+        <pc:spChg chg="mod">
+          <ac:chgData name="Danett Pepito" userId="ddef1e2176689e9a" providerId="LiveId" clId="{B2185394-3AFD-42B2-9285-3B672C598A56}" dt="2022-03-22T06:58:03.295" v="2781" actId="20577"/>
+          <ac:spMkLst>
+            <pc:docMk/>
+            <pc:sldMk cId="2558664074" sldId="341"/>
+            <ac:spMk id="73" creationId="{00000000-0000-0000-0000-000000000000}"/>
+          </ac:spMkLst>
+        </pc:spChg>
+        <pc:picChg chg="add mod">
+          <ac:chgData name="Danett Pepito" userId="ddef1e2176689e9a" providerId="LiveId" clId="{B2185394-3AFD-42B2-9285-3B672C598A56}" dt="2022-03-22T07:00:54.145" v="2898" actId="1076"/>
+          <ac:picMkLst>
+            <pc:docMk/>
+            <pc:sldMk cId="2558664074" sldId="341"/>
+            <ac:picMk id="4" creationId="{EFE735C4-592A-4BF7-A5B0-6FE68304E33F}"/>
+          </ac:picMkLst>
+        </pc:picChg>
+        <pc:picChg chg="del">
+          <ac:chgData name="Danett Pepito" userId="ddef1e2176689e9a" providerId="LiveId" clId="{B2185394-3AFD-42B2-9285-3B672C598A56}" dt="2022-03-22T06:58:10.973" v="2786" actId="478"/>
+          <ac:picMkLst>
+            <pc:docMk/>
+            <pc:sldMk cId="2558664074" sldId="341"/>
+            <ac:picMk id="5" creationId="{611C9B7B-37F4-452A-82B3-8A7F77CCDBF4}"/>
+          </ac:picMkLst>
+        </pc:picChg>
+      </pc:sldChg>
+      <pc:sldChg chg="delSp modSp add mod replId">
+        <pc:chgData name="Danett Pepito" userId="ddef1e2176689e9a" providerId="LiveId" clId="{B2185394-3AFD-42B2-9285-3B672C598A56}" dt="2022-03-22T07:00:06.709" v="2893" actId="20577"/>
+        <pc:sldMkLst>
+          <pc:docMk/>
+          <pc:sldMk cId="1883075721" sldId="342"/>
+        </pc:sldMkLst>
+        <pc:spChg chg="mod">
+          <ac:chgData name="Danett Pepito" userId="ddef1e2176689e9a" providerId="LiveId" clId="{B2185394-3AFD-42B2-9285-3B672C598A56}" dt="2022-03-22T06:58:07.462" v="2783" actId="20577"/>
+          <ac:spMkLst>
+            <pc:docMk/>
+            <pc:sldMk cId="1883075721" sldId="342"/>
+            <ac:spMk id="78" creationId="{00000000-0000-0000-0000-000000000000}"/>
+          </ac:spMkLst>
+        </pc:spChg>
+        <pc:graphicFrameChg chg="modGraphic">
+          <ac:chgData name="Danett Pepito" userId="ddef1e2176689e9a" providerId="LiveId" clId="{B2185394-3AFD-42B2-9285-3B672C598A56}" dt="2022-03-22T07:00:06.709" v="2893" actId="20577"/>
+          <ac:graphicFrameMkLst>
+            <pc:docMk/>
+            <pc:sldMk cId="1883075721" sldId="342"/>
+            <ac:graphicFrameMk id="79" creationId="{00000000-0000-0000-0000-000000000000}"/>
+          </ac:graphicFrameMkLst>
+        </pc:graphicFrameChg>
+        <pc:picChg chg="del">
+          <ac:chgData name="Danett Pepito" userId="ddef1e2176689e9a" providerId="LiveId" clId="{B2185394-3AFD-42B2-9285-3B672C598A56}" dt="2022-03-22T06:58:08.516" v="2784" actId="478"/>
+          <ac:picMkLst>
+            <pc:docMk/>
+            <pc:sldMk cId="1883075721" sldId="342"/>
+            <ac:picMk id="4" creationId="{385E23F3-E161-4735-8398-54A170841303}"/>
+          </ac:picMkLst>
+        </pc:picChg>
+        <pc:picChg chg="del">
+          <ac:chgData name="Danett Pepito" userId="ddef1e2176689e9a" providerId="LiveId" clId="{B2185394-3AFD-42B2-9285-3B672C598A56}" dt="2022-03-22T06:58:09.283" v="2785" actId="478"/>
+          <ac:picMkLst>
+            <pc:docMk/>
+            <pc:sldMk cId="1883075721" sldId="342"/>
+            <ac:picMk id="6" creationId="{EC6BB872-C65F-4994-94A4-1017EC2E4B27}"/>
+          </ac:picMkLst>
+        </pc:picChg>
+      </pc:sldChg>
+      <pc:sldChg chg="delSp modSp add mod">
+        <pc:chgData name="Danett Pepito" userId="ddef1e2176689e9a" providerId="LiveId" clId="{B2185394-3AFD-42B2-9285-3B672C598A56}" dt="2022-03-22T07:05:12.913" v="2923" actId="1076"/>
+        <pc:sldMkLst>
+          <pc:docMk/>
+          <pc:sldMk cId="2024435106" sldId="343"/>
+        </pc:sldMkLst>
+        <pc:spChg chg="mod">
+          <ac:chgData name="Danett Pepito" userId="ddef1e2176689e9a" providerId="LiveId" clId="{B2185394-3AFD-42B2-9285-3B672C598A56}" dt="2022-03-22T07:05:07.267" v="2920" actId="20577"/>
+          <ac:spMkLst>
+            <pc:docMk/>
+            <pc:sldMk cId="2024435106" sldId="343"/>
+            <ac:spMk id="73" creationId="{00000000-0000-0000-0000-000000000000}"/>
+          </ac:spMkLst>
+        </pc:spChg>
+        <pc:picChg chg="del">
+          <ac:chgData name="Danett Pepito" userId="ddef1e2176689e9a" providerId="LiveId" clId="{B2185394-3AFD-42B2-9285-3B672C598A56}" dt="2022-03-22T07:04:41.526" v="2910" actId="478"/>
+          <ac:picMkLst>
+            <pc:docMk/>
+            <pc:sldMk cId="2024435106" sldId="343"/>
+            <ac:picMk id="4" creationId="{1EE274FE-E52B-4AA7-99CA-A8DA4DEFC9B2}"/>
+          </ac:picMkLst>
+        </pc:picChg>
+        <pc:picChg chg="mod">
+          <ac:chgData name="Danett Pepito" userId="ddef1e2176689e9a" providerId="LiveId" clId="{B2185394-3AFD-42B2-9285-3B672C598A56}" dt="2022-03-22T07:05:12.913" v="2923" actId="1076"/>
+          <ac:picMkLst>
+            <pc:docMk/>
+            <pc:sldMk cId="2024435106" sldId="343"/>
+            <ac:picMk id="5" creationId="{A03343C5-CF33-44A1-92AB-3537F4E830A9}"/>
+          </ac:picMkLst>
+        </pc:picChg>
+      </pc:sldChg>
+      <pc:sldChg chg="addSp delSp modSp add mod ord">
+        <pc:chgData name="Danett Pepito" userId="ddef1e2176689e9a" providerId="LiveId" clId="{B2185394-3AFD-42B2-9285-3B672C598A56}" dt="2022-03-22T07:08:14.804" v="2960" actId="1076"/>
+        <pc:sldMkLst>
+          <pc:docMk/>
+          <pc:sldMk cId="2516317635" sldId="344"/>
+        </pc:sldMkLst>
+        <pc:spChg chg="mod">
+          <ac:chgData name="Danett Pepito" userId="ddef1e2176689e9a" providerId="LiveId" clId="{B2185394-3AFD-42B2-9285-3B672C598A56}" dt="2022-03-22T07:05:21.953" v="2950" actId="20577"/>
+          <ac:spMkLst>
+            <pc:docMk/>
+            <pc:sldMk cId="2516317635" sldId="344"/>
+            <ac:spMk id="78" creationId="{00000000-0000-0000-0000-000000000000}"/>
+          </ac:spMkLst>
+        </pc:spChg>
+        <pc:picChg chg="del">
+          <ac:chgData name="Danett Pepito" userId="ddef1e2176689e9a" providerId="LiveId" clId="{B2185394-3AFD-42B2-9285-3B672C598A56}" dt="2022-03-22T07:04:33.926" v="2908" actId="478"/>
+          <ac:picMkLst>
+            <pc:docMk/>
+            <pc:sldMk cId="2516317635" sldId="344"/>
+            <ac:picMk id="4" creationId="{4B5C1DD5-E373-4EB8-8281-8A5CD523DCA1}"/>
+          </ac:picMkLst>
+        </pc:picChg>
+        <pc:picChg chg="add mod">
+          <ac:chgData name="Danett Pepito" userId="ddef1e2176689e9a" providerId="LiveId" clId="{B2185394-3AFD-42B2-9285-3B672C598A56}" dt="2022-03-22T07:08:14.804" v="2960" actId="1076"/>
+          <ac:picMkLst>
+            <pc:docMk/>
+            <pc:sldMk cId="2516317635" sldId="344"/>
+            <ac:picMk id="5" creationId="{C8F7877E-62EE-45D9-8729-6F1860059594}"/>
+          </ac:picMkLst>
+        </pc:picChg>
+        <pc:picChg chg="del">
+          <ac:chgData name="Danett Pepito" userId="ddef1e2176689e9a" providerId="LiveId" clId="{B2185394-3AFD-42B2-9285-3B672C598A56}" dt="2022-03-22T07:04:34.833" v="2909" actId="478"/>
+          <ac:picMkLst>
+            <pc:docMk/>
+            <pc:sldMk cId="2516317635" sldId="344"/>
+            <ac:picMk id="6" creationId="{6476CB8F-7A1D-435E-92D3-F7A2572F01F7}"/>
+          </ac:picMkLst>
+        </pc:picChg>
+        <pc:picChg chg="add mod">
+          <ac:chgData name="Danett Pepito" userId="ddef1e2176689e9a" providerId="LiveId" clId="{B2185394-3AFD-42B2-9285-3B672C598A56}" dt="2022-03-22T07:08:07.137" v="2959" actId="14100"/>
+          <ac:picMkLst>
+            <pc:docMk/>
+            <pc:sldMk cId="2516317635" sldId="344"/>
+            <ac:picMk id="8" creationId="{6AB1E822-4D6B-4C9E-89A5-84CE0F6C0A7A}"/>
           </ac:picMkLst>
         </pc:picChg>
       </pc:sldChg>
@@ -9295,7 +9447,7 @@
     </p:spTree>
     <p:extLst>
       <p:ext uri="{BB962C8B-B14F-4D97-AF65-F5344CB8AC3E}">
-        <p14:creationId xmlns:p14="http://schemas.microsoft.com/office/powerpoint/2010/main" val="2769025122"/>
+        <p14:creationId xmlns:p14="http://schemas.microsoft.com/office/powerpoint/2010/main" val="2079619039"/>
       </p:ext>
     </p:extLst>
   </p:cSld>
@@ -9513,7 +9665,7 @@
     </p:spTree>
     <p:extLst>
       <p:ext uri="{BB962C8B-B14F-4D97-AF65-F5344CB8AC3E}">
-        <p14:creationId xmlns:p14="http://schemas.microsoft.com/office/powerpoint/2010/main" val="3006313543"/>
+        <p14:creationId xmlns:p14="http://schemas.microsoft.com/office/powerpoint/2010/main" val="1648286901"/>
       </p:ext>
     </p:extLst>
   </p:cSld>
@@ -9528,7 +9680,7 @@
   <p:cSld>
     <p:spTree>
       <p:nvGrpSpPr>
-        <p:cNvPr id="1" name="Shape 69"/>
+        <p:cNvPr id="1" name="Shape 74"/>
         <p:cNvGrpSpPr/>
         <p:nvPr/>
       </p:nvGrpSpPr>
@@ -9542,7 +9694,7 @@
       </p:grpSpPr>
       <p:sp>
         <p:nvSpPr>
-          <p:cNvPr id="70" name="Google Shape;70;gac10fef634_0_16:notes"/>
+          <p:cNvPr id="75" name="Google Shape;75;gac10fef634_0_20:notes"/>
           <p:cNvSpPr>
             <a:spLocks noGrp="1" noRot="1" noChangeAspect="1"/>
           </p:cNvSpPr>
@@ -9583,7 +9735,7 @@
       </p:sp>
       <p:sp>
         <p:nvSpPr>
-          <p:cNvPr id="71" name="Google Shape;71;gac10fef634_0_16:notes"/>
+          <p:cNvPr id="76" name="Google Shape;76;gac10fef634_0_20:notes"/>
           <p:cNvSpPr txBox="1">
             <a:spLocks noGrp="1"/>
           </p:cNvSpPr>
@@ -9622,7 +9774,7 @@
     </p:spTree>
     <p:extLst>
       <p:ext uri="{BB962C8B-B14F-4D97-AF65-F5344CB8AC3E}">
-        <p14:creationId xmlns:p14="http://schemas.microsoft.com/office/powerpoint/2010/main" val="2149026663"/>
+        <p14:creationId xmlns:p14="http://schemas.microsoft.com/office/powerpoint/2010/main" val="2769025122"/>
       </p:ext>
     </p:extLst>
   </p:cSld>
@@ -9731,7 +9883,7 @@
     </p:spTree>
     <p:extLst>
       <p:ext uri="{BB962C8B-B14F-4D97-AF65-F5344CB8AC3E}">
-        <p14:creationId xmlns:p14="http://schemas.microsoft.com/office/powerpoint/2010/main" val="3194274356"/>
+        <p14:creationId xmlns:p14="http://schemas.microsoft.com/office/powerpoint/2010/main" val="3616346353"/>
       </p:ext>
     </p:extLst>
   </p:cSld>
@@ -9742,6 +9894,115 @@
 </file>
 
 <file path=ppt/notesSlides/notesSlide63.xml><?xml version="1.0" encoding="utf-8"?>
+<p:notes xmlns:a="http://schemas.openxmlformats.org/drawingml/2006/main" xmlns:r="http://schemas.openxmlformats.org/officeDocument/2006/relationships" xmlns:p="http://schemas.openxmlformats.org/presentationml/2006/main" showMasterSp="0" showMasterPhAnim="0">
+  <p:cSld>
+    <p:spTree>
+      <p:nvGrpSpPr>
+        <p:cNvPr id="1" name="Shape 74"/>
+        <p:cNvGrpSpPr/>
+        <p:nvPr/>
+      </p:nvGrpSpPr>
+      <p:grpSpPr>
+        <a:xfrm>
+          <a:off x="0" y="0"/>
+          <a:ext cx="0" cy="0"/>
+          <a:chOff x="0" y="0"/>
+          <a:chExt cx="0" cy="0"/>
+        </a:xfrm>
+      </p:grpSpPr>
+      <p:sp>
+        <p:nvSpPr>
+          <p:cNvPr id="75" name="Google Shape;75;gac10fef634_0_20:notes"/>
+          <p:cNvSpPr>
+            <a:spLocks noGrp="1" noRot="1" noChangeAspect="1"/>
+          </p:cNvSpPr>
+          <p:nvPr>
+            <p:ph type="sldImg" idx="2"/>
+          </p:nvPr>
+        </p:nvSpPr>
+        <p:spPr>
+          <a:xfrm>
+            <a:off x="381000" y="685800"/>
+            <a:ext cx="6096000" cy="3429000"/>
+          </a:xfrm>
+          <a:custGeom>
+            <a:avLst/>
+            <a:gdLst/>
+            <a:ahLst/>
+            <a:cxnLst/>
+            <a:rect l="l" t="t" r="r" b="b"/>
+            <a:pathLst>
+              <a:path w="120000" h="120000" extrusionOk="0">
+                <a:moveTo>
+                  <a:pt x="0" y="0"/>
+                </a:moveTo>
+                <a:lnTo>
+                  <a:pt x="120000" y="0"/>
+                </a:lnTo>
+                <a:lnTo>
+                  <a:pt x="120000" y="120000"/>
+                </a:lnTo>
+                <a:lnTo>
+                  <a:pt x="0" y="120000"/>
+                </a:lnTo>
+                <a:close/>
+              </a:path>
+            </a:pathLst>
+          </a:custGeom>
+        </p:spPr>
+      </p:sp>
+      <p:sp>
+        <p:nvSpPr>
+          <p:cNvPr id="76" name="Google Shape;76;gac10fef634_0_20:notes"/>
+          <p:cNvSpPr txBox="1">
+            <a:spLocks noGrp="1"/>
+          </p:cNvSpPr>
+          <p:nvPr>
+            <p:ph type="body" idx="1"/>
+          </p:nvPr>
+        </p:nvSpPr>
+        <p:spPr>
+          <a:xfrm>
+            <a:off x="685800" y="4343400"/>
+            <a:ext cx="5486400" cy="4114800"/>
+          </a:xfrm>
+          <a:prstGeom prst="rect">
+            <a:avLst/>
+          </a:prstGeom>
+        </p:spPr>
+        <p:txBody>
+          <a:bodyPr spcFirstLastPara="1" wrap="square" lIns="91425" tIns="91425" rIns="91425" bIns="91425" anchor="t" anchorCtr="0">
+            <a:noAutofit/>
+          </a:bodyPr>
+          <a:lstStyle/>
+          <a:p>
+            <a:pPr marL="0" lvl="0" indent="0" algn="l" rtl="0">
+              <a:spcBef>
+                <a:spcPts val="0"/>
+              </a:spcBef>
+              <a:spcAft>
+                <a:spcPts val="0"/>
+              </a:spcAft>
+              <a:buNone/>
+            </a:pPr>
+            <a:endParaRPr/>
+          </a:p>
+        </p:txBody>
+      </p:sp>
+    </p:spTree>
+    <p:extLst>
+      <p:ext uri="{BB962C8B-B14F-4D97-AF65-F5344CB8AC3E}">
+        <p14:creationId xmlns:p14="http://schemas.microsoft.com/office/powerpoint/2010/main" val="4074846078"/>
+      </p:ext>
+    </p:extLst>
+  </p:cSld>
+  <p:clrMapOvr>
+    <a:masterClrMapping/>
+  </p:clrMapOvr>
+</p:notes>
+</file>
+
+<file path=ppt/notesSlides/notesSlide64.xml><?xml version="1.0" encoding="utf-8"?>
 <p:notes xmlns:a="http://schemas.openxmlformats.org/drawingml/2006/main" xmlns:r="http://schemas.openxmlformats.org/officeDocument/2006/relationships" xmlns:p="http://schemas.openxmlformats.org/presentationml/2006/main" showMasterSp="0" showMasterPhAnim="0">
   <p:cSld>
     <p:spTree>
@@ -9840,6 +10101,333 @@
     </p:spTree>
     <p:extLst>
       <p:ext uri="{BB962C8B-B14F-4D97-AF65-F5344CB8AC3E}">
+        <p14:creationId xmlns:p14="http://schemas.microsoft.com/office/powerpoint/2010/main" val="3006313543"/>
+      </p:ext>
+    </p:extLst>
+  </p:cSld>
+  <p:clrMapOvr>
+    <a:masterClrMapping/>
+  </p:clrMapOvr>
+</p:notes>
+</file>
+
+<file path=ppt/notesSlides/notesSlide65.xml><?xml version="1.0" encoding="utf-8"?>
+<p:notes xmlns:a="http://schemas.openxmlformats.org/drawingml/2006/main" xmlns:r="http://schemas.openxmlformats.org/officeDocument/2006/relationships" xmlns:p="http://schemas.openxmlformats.org/presentationml/2006/main" showMasterSp="0" showMasterPhAnim="0">
+  <p:cSld>
+    <p:spTree>
+      <p:nvGrpSpPr>
+        <p:cNvPr id="1" name="Shape 69"/>
+        <p:cNvGrpSpPr/>
+        <p:nvPr/>
+      </p:nvGrpSpPr>
+      <p:grpSpPr>
+        <a:xfrm>
+          <a:off x="0" y="0"/>
+          <a:ext cx="0" cy="0"/>
+          <a:chOff x="0" y="0"/>
+          <a:chExt cx="0" cy="0"/>
+        </a:xfrm>
+      </p:grpSpPr>
+      <p:sp>
+        <p:nvSpPr>
+          <p:cNvPr id="70" name="Google Shape;70;gac10fef634_0_16:notes"/>
+          <p:cNvSpPr>
+            <a:spLocks noGrp="1" noRot="1" noChangeAspect="1"/>
+          </p:cNvSpPr>
+          <p:nvPr>
+            <p:ph type="sldImg" idx="2"/>
+          </p:nvPr>
+        </p:nvSpPr>
+        <p:spPr>
+          <a:xfrm>
+            <a:off x="381000" y="685800"/>
+            <a:ext cx="6096000" cy="3429000"/>
+          </a:xfrm>
+          <a:custGeom>
+            <a:avLst/>
+            <a:gdLst/>
+            <a:ahLst/>
+            <a:cxnLst/>
+            <a:rect l="l" t="t" r="r" b="b"/>
+            <a:pathLst>
+              <a:path w="120000" h="120000" extrusionOk="0">
+                <a:moveTo>
+                  <a:pt x="0" y="0"/>
+                </a:moveTo>
+                <a:lnTo>
+                  <a:pt x="120000" y="0"/>
+                </a:lnTo>
+                <a:lnTo>
+                  <a:pt x="120000" y="120000"/>
+                </a:lnTo>
+                <a:lnTo>
+                  <a:pt x="0" y="120000"/>
+                </a:lnTo>
+                <a:close/>
+              </a:path>
+            </a:pathLst>
+          </a:custGeom>
+        </p:spPr>
+      </p:sp>
+      <p:sp>
+        <p:nvSpPr>
+          <p:cNvPr id="71" name="Google Shape;71;gac10fef634_0_16:notes"/>
+          <p:cNvSpPr txBox="1">
+            <a:spLocks noGrp="1"/>
+          </p:cNvSpPr>
+          <p:nvPr>
+            <p:ph type="body" idx="1"/>
+          </p:nvPr>
+        </p:nvSpPr>
+        <p:spPr>
+          <a:xfrm>
+            <a:off x="685800" y="4343400"/>
+            <a:ext cx="5486400" cy="4114800"/>
+          </a:xfrm>
+          <a:prstGeom prst="rect">
+            <a:avLst/>
+          </a:prstGeom>
+        </p:spPr>
+        <p:txBody>
+          <a:bodyPr spcFirstLastPara="1" wrap="square" lIns="91425" tIns="91425" rIns="91425" bIns="91425" anchor="t" anchorCtr="0">
+            <a:noAutofit/>
+          </a:bodyPr>
+          <a:lstStyle/>
+          <a:p>
+            <a:pPr marL="0" lvl="0" indent="0" algn="l" rtl="0">
+              <a:spcBef>
+                <a:spcPts val="0"/>
+              </a:spcBef>
+              <a:spcAft>
+                <a:spcPts val="0"/>
+              </a:spcAft>
+              <a:buNone/>
+            </a:pPr>
+            <a:endParaRPr/>
+          </a:p>
+        </p:txBody>
+      </p:sp>
+    </p:spTree>
+    <p:extLst>
+      <p:ext uri="{BB962C8B-B14F-4D97-AF65-F5344CB8AC3E}">
+        <p14:creationId xmlns:p14="http://schemas.microsoft.com/office/powerpoint/2010/main" val="2149026663"/>
+      </p:ext>
+    </p:extLst>
+  </p:cSld>
+  <p:clrMapOvr>
+    <a:masterClrMapping/>
+  </p:clrMapOvr>
+</p:notes>
+</file>
+
+<file path=ppt/notesSlides/notesSlide66.xml><?xml version="1.0" encoding="utf-8"?>
+<p:notes xmlns:a="http://schemas.openxmlformats.org/drawingml/2006/main" xmlns:r="http://schemas.openxmlformats.org/officeDocument/2006/relationships" xmlns:p="http://schemas.openxmlformats.org/presentationml/2006/main" showMasterSp="0" showMasterPhAnim="0">
+  <p:cSld>
+    <p:spTree>
+      <p:nvGrpSpPr>
+        <p:cNvPr id="1" name="Shape 69"/>
+        <p:cNvGrpSpPr/>
+        <p:nvPr/>
+      </p:nvGrpSpPr>
+      <p:grpSpPr>
+        <a:xfrm>
+          <a:off x="0" y="0"/>
+          <a:ext cx="0" cy="0"/>
+          <a:chOff x="0" y="0"/>
+          <a:chExt cx="0" cy="0"/>
+        </a:xfrm>
+      </p:grpSpPr>
+      <p:sp>
+        <p:nvSpPr>
+          <p:cNvPr id="70" name="Google Shape;70;gac10fef634_0_16:notes"/>
+          <p:cNvSpPr>
+            <a:spLocks noGrp="1" noRot="1" noChangeAspect="1"/>
+          </p:cNvSpPr>
+          <p:nvPr>
+            <p:ph type="sldImg" idx="2"/>
+          </p:nvPr>
+        </p:nvSpPr>
+        <p:spPr>
+          <a:xfrm>
+            <a:off x="381000" y="685800"/>
+            <a:ext cx="6096000" cy="3429000"/>
+          </a:xfrm>
+          <a:custGeom>
+            <a:avLst/>
+            <a:gdLst/>
+            <a:ahLst/>
+            <a:cxnLst/>
+            <a:rect l="l" t="t" r="r" b="b"/>
+            <a:pathLst>
+              <a:path w="120000" h="120000" extrusionOk="0">
+                <a:moveTo>
+                  <a:pt x="0" y="0"/>
+                </a:moveTo>
+                <a:lnTo>
+                  <a:pt x="120000" y="0"/>
+                </a:lnTo>
+                <a:lnTo>
+                  <a:pt x="120000" y="120000"/>
+                </a:lnTo>
+                <a:lnTo>
+                  <a:pt x="0" y="120000"/>
+                </a:lnTo>
+                <a:close/>
+              </a:path>
+            </a:pathLst>
+          </a:custGeom>
+        </p:spPr>
+      </p:sp>
+      <p:sp>
+        <p:nvSpPr>
+          <p:cNvPr id="71" name="Google Shape;71;gac10fef634_0_16:notes"/>
+          <p:cNvSpPr txBox="1">
+            <a:spLocks noGrp="1"/>
+          </p:cNvSpPr>
+          <p:nvPr>
+            <p:ph type="body" idx="1"/>
+          </p:nvPr>
+        </p:nvSpPr>
+        <p:spPr>
+          <a:xfrm>
+            <a:off x="685800" y="4343400"/>
+            <a:ext cx="5486400" cy="4114800"/>
+          </a:xfrm>
+          <a:prstGeom prst="rect">
+            <a:avLst/>
+          </a:prstGeom>
+        </p:spPr>
+        <p:txBody>
+          <a:bodyPr spcFirstLastPara="1" wrap="square" lIns="91425" tIns="91425" rIns="91425" bIns="91425" anchor="t" anchorCtr="0">
+            <a:noAutofit/>
+          </a:bodyPr>
+          <a:lstStyle/>
+          <a:p>
+            <a:pPr marL="0" lvl="0" indent="0" algn="l" rtl="0">
+              <a:spcBef>
+                <a:spcPts val="0"/>
+              </a:spcBef>
+              <a:spcAft>
+                <a:spcPts val="0"/>
+              </a:spcAft>
+              <a:buNone/>
+            </a:pPr>
+            <a:endParaRPr/>
+          </a:p>
+        </p:txBody>
+      </p:sp>
+    </p:spTree>
+    <p:extLst>
+      <p:ext uri="{BB962C8B-B14F-4D97-AF65-F5344CB8AC3E}">
+        <p14:creationId xmlns:p14="http://schemas.microsoft.com/office/powerpoint/2010/main" val="3194274356"/>
+      </p:ext>
+    </p:extLst>
+  </p:cSld>
+  <p:clrMapOvr>
+    <a:masterClrMapping/>
+  </p:clrMapOvr>
+</p:notes>
+</file>
+
+<file path=ppt/notesSlides/notesSlide67.xml><?xml version="1.0" encoding="utf-8"?>
+<p:notes xmlns:a="http://schemas.openxmlformats.org/drawingml/2006/main" xmlns:r="http://schemas.openxmlformats.org/officeDocument/2006/relationships" xmlns:p="http://schemas.openxmlformats.org/presentationml/2006/main" showMasterSp="0" showMasterPhAnim="0">
+  <p:cSld>
+    <p:spTree>
+      <p:nvGrpSpPr>
+        <p:cNvPr id="1" name="Shape 69"/>
+        <p:cNvGrpSpPr/>
+        <p:nvPr/>
+      </p:nvGrpSpPr>
+      <p:grpSpPr>
+        <a:xfrm>
+          <a:off x="0" y="0"/>
+          <a:ext cx="0" cy="0"/>
+          <a:chOff x="0" y="0"/>
+          <a:chExt cx="0" cy="0"/>
+        </a:xfrm>
+      </p:grpSpPr>
+      <p:sp>
+        <p:nvSpPr>
+          <p:cNvPr id="70" name="Google Shape;70;gac10fef634_0_16:notes"/>
+          <p:cNvSpPr>
+            <a:spLocks noGrp="1" noRot="1" noChangeAspect="1"/>
+          </p:cNvSpPr>
+          <p:nvPr>
+            <p:ph type="sldImg" idx="2"/>
+          </p:nvPr>
+        </p:nvSpPr>
+        <p:spPr>
+          <a:xfrm>
+            <a:off x="381000" y="685800"/>
+            <a:ext cx="6096000" cy="3429000"/>
+          </a:xfrm>
+          <a:custGeom>
+            <a:avLst/>
+            <a:gdLst/>
+            <a:ahLst/>
+            <a:cxnLst/>
+            <a:rect l="l" t="t" r="r" b="b"/>
+            <a:pathLst>
+              <a:path w="120000" h="120000" extrusionOk="0">
+                <a:moveTo>
+                  <a:pt x="0" y="0"/>
+                </a:moveTo>
+                <a:lnTo>
+                  <a:pt x="120000" y="0"/>
+                </a:lnTo>
+                <a:lnTo>
+                  <a:pt x="120000" y="120000"/>
+                </a:lnTo>
+                <a:lnTo>
+                  <a:pt x="0" y="120000"/>
+                </a:lnTo>
+                <a:close/>
+              </a:path>
+            </a:pathLst>
+          </a:custGeom>
+        </p:spPr>
+      </p:sp>
+      <p:sp>
+        <p:nvSpPr>
+          <p:cNvPr id="71" name="Google Shape;71;gac10fef634_0_16:notes"/>
+          <p:cNvSpPr txBox="1">
+            <a:spLocks noGrp="1"/>
+          </p:cNvSpPr>
+          <p:nvPr>
+            <p:ph type="body" idx="1"/>
+          </p:nvPr>
+        </p:nvSpPr>
+        <p:spPr>
+          <a:xfrm>
+            <a:off x="685800" y="4343400"/>
+            <a:ext cx="5486400" cy="4114800"/>
+          </a:xfrm>
+          <a:prstGeom prst="rect">
+            <a:avLst/>
+          </a:prstGeom>
+        </p:spPr>
+        <p:txBody>
+          <a:bodyPr spcFirstLastPara="1" wrap="square" lIns="91425" tIns="91425" rIns="91425" bIns="91425" anchor="t" anchorCtr="0">
+            <a:noAutofit/>
+          </a:bodyPr>
+          <a:lstStyle/>
+          <a:p>
+            <a:pPr marL="0" lvl="0" indent="0" algn="l" rtl="0">
+              <a:spcBef>
+                <a:spcPts val="0"/>
+              </a:spcBef>
+              <a:spcAft>
+                <a:spcPts val="0"/>
+              </a:spcAft>
+              <a:buNone/>
+            </a:pPr>
+            <a:endParaRPr/>
+          </a:p>
+        </p:txBody>
+      </p:sp>
+    </p:spTree>
+    <p:extLst>
+      <p:ext uri="{BB962C8B-B14F-4D97-AF65-F5344CB8AC3E}">
         <p14:creationId xmlns:p14="http://schemas.microsoft.com/office/powerpoint/2010/main" val="3014292639"/>
       </p:ext>
     </p:extLst>
@@ -9850,7 +10438,7 @@
 </p:notes>
 </file>
 
-<file path=ppt/notesSlides/notesSlide64.xml><?xml version="1.0" encoding="utf-8"?>
+<file path=ppt/notesSlides/notesSlide68.xml><?xml version="1.0" encoding="utf-8"?>
 <p:notes xmlns:a="http://schemas.openxmlformats.org/drawingml/2006/main" xmlns:r="http://schemas.openxmlformats.org/officeDocument/2006/relationships" xmlns:p="http://schemas.openxmlformats.org/presentationml/2006/main" showMasterSp="0" showMasterPhAnim="0">
   <p:cSld>
     <p:spTree>
@@ -9975,7 +10563,7 @@
 </p:notes>
 </file>
 
-<file path=ppt/notesSlides/notesSlide65.xml><?xml version="1.0" encoding="utf-8"?>
+<file path=ppt/notesSlides/notesSlide69.xml><?xml version="1.0" encoding="utf-8"?>
 <p:notes xmlns:a="http://schemas.openxmlformats.org/drawingml/2006/main" xmlns:r="http://schemas.openxmlformats.org/officeDocument/2006/relationships" xmlns:p="http://schemas.openxmlformats.org/presentationml/2006/main" showMasterSp="0" showMasterPhAnim="0">
   <p:cSld>
     <p:spTree>
@@ -10098,244 +10686,6 @@
         <p14:creationId xmlns:p14="http://schemas.microsoft.com/office/powerpoint/2010/main" val="511959585"/>
       </p:ext>
     </p:extLst>
-  </p:cSld>
-  <p:clrMapOvr>
-    <a:masterClrMapping/>
-  </p:clrMapOvr>
-</p:notes>
-</file>
-
-<file path=ppt/notesSlides/notesSlide66.xml><?xml version="1.0" encoding="utf-8"?>
-<p:notes xmlns:a="http://schemas.openxmlformats.org/drawingml/2006/main" xmlns:r="http://schemas.openxmlformats.org/officeDocument/2006/relationships" xmlns:p="http://schemas.openxmlformats.org/presentationml/2006/main" showMasterSp="0" showMasterPhAnim="0">
-  <p:cSld>
-    <p:spTree>
-      <p:nvGrpSpPr>
-        <p:cNvPr id="1" name="Shape 80"/>
-        <p:cNvGrpSpPr/>
-        <p:nvPr/>
-      </p:nvGrpSpPr>
-      <p:grpSpPr>
-        <a:xfrm>
-          <a:off x="0" y="0"/>
-          <a:ext cx="0" cy="0"/>
-          <a:chOff x="0" y="0"/>
-          <a:chExt cx="0" cy="0"/>
-        </a:xfrm>
-      </p:grpSpPr>
-      <p:sp>
-        <p:nvSpPr>
-          <p:cNvPr id="81" name="Google Shape;81;gac10fef634_0_25:notes"/>
-          <p:cNvSpPr>
-            <a:spLocks noGrp="1" noRot="1" noChangeAspect="1"/>
-          </p:cNvSpPr>
-          <p:nvPr>
-            <p:ph type="sldImg" idx="2"/>
-          </p:nvPr>
-        </p:nvSpPr>
-        <p:spPr>
-          <a:xfrm>
-            <a:off x="381000" y="685800"/>
-            <a:ext cx="6096000" cy="3429000"/>
-          </a:xfrm>
-          <a:custGeom>
-            <a:avLst/>
-            <a:gdLst/>
-            <a:ahLst/>
-            <a:cxnLst/>
-            <a:rect l="l" t="t" r="r" b="b"/>
-            <a:pathLst>
-              <a:path w="120000" h="120000" extrusionOk="0">
-                <a:moveTo>
-                  <a:pt x="0" y="0"/>
-                </a:moveTo>
-                <a:lnTo>
-                  <a:pt x="120000" y="0"/>
-                </a:lnTo>
-                <a:lnTo>
-                  <a:pt x="120000" y="120000"/>
-                </a:lnTo>
-                <a:lnTo>
-                  <a:pt x="0" y="120000"/>
-                </a:lnTo>
-                <a:close/>
-              </a:path>
-            </a:pathLst>
-          </a:custGeom>
-        </p:spPr>
-      </p:sp>
-      <p:sp>
-        <p:nvSpPr>
-          <p:cNvPr id="82" name="Google Shape;82;gac10fef634_0_25:notes"/>
-          <p:cNvSpPr txBox="1">
-            <a:spLocks noGrp="1"/>
-          </p:cNvSpPr>
-          <p:nvPr>
-            <p:ph type="body" idx="1"/>
-          </p:nvPr>
-        </p:nvSpPr>
-        <p:spPr>
-          <a:xfrm>
-            <a:off x="685800" y="4343400"/>
-            <a:ext cx="5486400" cy="4114800"/>
-          </a:xfrm>
-          <a:prstGeom prst="rect">
-            <a:avLst/>
-          </a:prstGeom>
-        </p:spPr>
-        <p:txBody>
-          <a:bodyPr spcFirstLastPara="1" wrap="square" lIns="91425" tIns="91425" rIns="91425" bIns="91425" anchor="t" anchorCtr="0">
-            <a:noAutofit/>
-          </a:bodyPr>
-          <a:lstStyle/>
-          <a:p>
-            <a:pPr marL="0" lvl="0" indent="0" algn="l" rtl="0">
-              <a:spcBef>
-                <a:spcPts val="0"/>
-              </a:spcBef>
-              <a:spcAft>
-                <a:spcPts val="0"/>
-              </a:spcAft>
-              <a:buClr>
-                <a:schemeClr val="dk1"/>
-              </a:buClr>
-              <a:buSzPts val="1100"/>
-              <a:buFont typeface="Arial"/>
-              <a:buNone/>
-            </a:pPr>
-            <a:r>
-              <a:rPr lang="en"/>
-              <a:t>Your version control evidence should go here.  This could be in the form of annotated screenshots which show you you managed this process or you could make a brief screencast explaining how you implemented version control.</a:t>
-            </a:r>
-            <a:endParaRPr/>
-          </a:p>
-          <a:p>
-            <a:pPr marL="0" lvl="0" indent="0" algn="l" rtl="0">
-              <a:spcBef>
-                <a:spcPts val="0"/>
-              </a:spcBef>
-              <a:spcAft>
-                <a:spcPts val="0"/>
-              </a:spcAft>
-              <a:buNone/>
-            </a:pPr>
-            <a:endParaRPr/>
-          </a:p>
-        </p:txBody>
-      </p:sp>
-    </p:spTree>
-    <p:extLst>
-      <p:ext uri="{BB962C8B-B14F-4D97-AF65-F5344CB8AC3E}">
-        <p14:creationId xmlns:p14="http://schemas.microsoft.com/office/powerpoint/2010/main" val="3815843750"/>
-      </p:ext>
-    </p:extLst>
-  </p:cSld>
-  <p:clrMapOvr>
-    <a:masterClrMapping/>
-  </p:clrMapOvr>
-</p:notes>
-</file>
-
-<file path=ppt/notesSlides/notesSlide67.xml><?xml version="1.0" encoding="utf-8"?>
-<p:notes xmlns:a="http://schemas.openxmlformats.org/drawingml/2006/main" xmlns:r="http://schemas.openxmlformats.org/officeDocument/2006/relationships" xmlns:p="http://schemas.openxmlformats.org/presentationml/2006/main" showMasterSp="0" showMasterPhAnim="0">
-  <p:cSld>
-    <p:spTree>
-      <p:nvGrpSpPr>
-        <p:cNvPr id="1" name="Shape 86"/>
-        <p:cNvGrpSpPr/>
-        <p:nvPr/>
-      </p:nvGrpSpPr>
-      <p:grpSpPr>
-        <a:xfrm>
-          <a:off x="0" y="0"/>
-          <a:ext cx="0" cy="0"/>
-          <a:chOff x="0" y="0"/>
-          <a:chExt cx="0" cy="0"/>
-        </a:xfrm>
-      </p:grpSpPr>
-      <p:sp>
-        <p:nvSpPr>
-          <p:cNvPr id="87" name="Google Shape;87;gac10fef634_0_30:notes"/>
-          <p:cNvSpPr>
-            <a:spLocks noGrp="1" noRot="1" noChangeAspect="1"/>
-          </p:cNvSpPr>
-          <p:nvPr>
-            <p:ph type="sldImg" idx="2"/>
-          </p:nvPr>
-        </p:nvSpPr>
-        <p:spPr>
-          <a:xfrm>
-            <a:off x="381000" y="685800"/>
-            <a:ext cx="6096000" cy="3429000"/>
-          </a:xfrm>
-          <a:custGeom>
-            <a:avLst/>
-            <a:gdLst/>
-            <a:ahLst/>
-            <a:cxnLst/>
-            <a:rect l="l" t="t" r="r" b="b"/>
-            <a:pathLst>
-              <a:path w="120000" h="120000" extrusionOk="0">
-                <a:moveTo>
-                  <a:pt x="0" y="0"/>
-                </a:moveTo>
-                <a:lnTo>
-                  <a:pt x="120000" y="0"/>
-                </a:lnTo>
-                <a:lnTo>
-                  <a:pt x="120000" y="120000"/>
-                </a:lnTo>
-                <a:lnTo>
-                  <a:pt x="0" y="120000"/>
-                </a:lnTo>
-                <a:close/>
-              </a:path>
-            </a:pathLst>
-          </a:custGeom>
-        </p:spPr>
-      </p:sp>
-      <p:sp>
-        <p:nvSpPr>
-          <p:cNvPr id="88" name="Google Shape;88;gac10fef634_0_30:notes"/>
-          <p:cNvSpPr txBox="1">
-            <a:spLocks noGrp="1"/>
-          </p:cNvSpPr>
-          <p:nvPr>
-            <p:ph type="body" idx="1"/>
-          </p:nvPr>
-        </p:nvSpPr>
-        <p:spPr>
-          <a:xfrm>
-            <a:off x="685800" y="4343400"/>
-            <a:ext cx="5486400" cy="4114800"/>
-          </a:xfrm>
-          <a:prstGeom prst="rect">
-            <a:avLst/>
-          </a:prstGeom>
-        </p:spPr>
-        <p:txBody>
-          <a:bodyPr spcFirstLastPara="1" wrap="square" lIns="91425" tIns="91425" rIns="91425" bIns="91425" anchor="t" anchorCtr="0">
-            <a:noAutofit/>
-          </a:bodyPr>
-          <a:lstStyle/>
-          <a:p>
-            <a:pPr marL="0" lvl="0" indent="0" algn="l" rtl="0">
-              <a:spcBef>
-                <a:spcPts val="0"/>
-              </a:spcBef>
-              <a:spcAft>
-                <a:spcPts val="0"/>
-              </a:spcAft>
-              <a:buNone/>
-            </a:pPr>
-            <a:r>
-              <a:rPr lang="en"/>
-              <a:t>Discusses how the information from planning, testing and trialling of components assisted in the development of a high-quality outcome</a:t>
-            </a:r>
-            <a:endParaRPr/>
-          </a:p>
-        </p:txBody>
-      </p:sp>
-    </p:spTree>
   </p:cSld>
   <p:clrMapOvr>
     <a:masterClrMapping/>
@@ -10445,6 +10795,244 @@
         <p14:creationId xmlns:p14="http://schemas.microsoft.com/office/powerpoint/2010/main" val="1164048984"/>
       </p:ext>
     </p:extLst>
+  </p:cSld>
+  <p:clrMapOvr>
+    <a:masterClrMapping/>
+  </p:clrMapOvr>
+</p:notes>
+</file>
+
+<file path=ppt/notesSlides/notesSlide70.xml><?xml version="1.0" encoding="utf-8"?>
+<p:notes xmlns:a="http://schemas.openxmlformats.org/drawingml/2006/main" xmlns:r="http://schemas.openxmlformats.org/officeDocument/2006/relationships" xmlns:p="http://schemas.openxmlformats.org/presentationml/2006/main" showMasterSp="0" showMasterPhAnim="0">
+  <p:cSld>
+    <p:spTree>
+      <p:nvGrpSpPr>
+        <p:cNvPr id="1" name="Shape 80"/>
+        <p:cNvGrpSpPr/>
+        <p:nvPr/>
+      </p:nvGrpSpPr>
+      <p:grpSpPr>
+        <a:xfrm>
+          <a:off x="0" y="0"/>
+          <a:ext cx="0" cy="0"/>
+          <a:chOff x="0" y="0"/>
+          <a:chExt cx="0" cy="0"/>
+        </a:xfrm>
+      </p:grpSpPr>
+      <p:sp>
+        <p:nvSpPr>
+          <p:cNvPr id="81" name="Google Shape;81;gac10fef634_0_25:notes"/>
+          <p:cNvSpPr>
+            <a:spLocks noGrp="1" noRot="1" noChangeAspect="1"/>
+          </p:cNvSpPr>
+          <p:nvPr>
+            <p:ph type="sldImg" idx="2"/>
+          </p:nvPr>
+        </p:nvSpPr>
+        <p:spPr>
+          <a:xfrm>
+            <a:off x="381000" y="685800"/>
+            <a:ext cx="6096000" cy="3429000"/>
+          </a:xfrm>
+          <a:custGeom>
+            <a:avLst/>
+            <a:gdLst/>
+            <a:ahLst/>
+            <a:cxnLst/>
+            <a:rect l="l" t="t" r="r" b="b"/>
+            <a:pathLst>
+              <a:path w="120000" h="120000" extrusionOk="0">
+                <a:moveTo>
+                  <a:pt x="0" y="0"/>
+                </a:moveTo>
+                <a:lnTo>
+                  <a:pt x="120000" y="0"/>
+                </a:lnTo>
+                <a:lnTo>
+                  <a:pt x="120000" y="120000"/>
+                </a:lnTo>
+                <a:lnTo>
+                  <a:pt x="0" y="120000"/>
+                </a:lnTo>
+                <a:close/>
+              </a:path>
+            </a:pathLst>
+          </a:custGeom>
+        </p:spPr>
+      </p:sp>
+      <p:sp>
+        <p:nvSpPr>
+          <p:cNvPr id="82" name="Google Shape;82;gac10fef634_0_25:notes"/>
+          <p:cNvSpPr txBox="1">
+            <a:spLocks noGrp="1"/>
+          </p:cNvSpPr>
+          <p:nvPr>
+            <p:ph type="body" idx="1"/>
+          </p:nvPr>
+        </p:nvSpPr>
+        <p:spPr>
+          <a:xfrm>
+            <a:off x="685800" y="4343400"/>
+            <a:ext cx="5486400" cy="4114800"/>
+          </a:xfrm>
+          <a:prstGeom prst="rect">
+            <a:avLst/>
+          </a:prstGeom>
+        </p:spPr>
+        <p:txBody>
+          <a:bodyPr spcFirstLastPara="1" wrap="square" lIns="91425" tIns="91425" rIns="91425" bIns="91425" anchor="t" anchorCtr="0">
+            <a:noAutofit/>
+          </a:bodyPr>
+          <a:lstStyle/>
+          <a:p>
+            <a:pPr marL="0" lvl="0" indent="0" algn="l" rtl="0">
+              <a:spcBef>
+                <a:spcPts val="0"/>
+              </a:spcBef>
+              <a:spcAft>
+                <a:spcPts val="0"/>
+              </a:spcAft>
+              <a:buClr>
+                <a:schemeClr val="dk1"/>
+              </a:buClr>
+              <a:buSzPts val="1100"/>
+              <a:buFont typeface="Arial"/>
+              <a:buNone/>
+            </a:pPr>
+            <a:r>
+              <a:rPr lang="en"/>
+              <a:t>Your version control evidence should go here.  This could be in the form of annotated screenshots which show you you managed this process or you could make a brief screencast explaining how you implemented version control.</a:t>
+            </a:r>
+            <a:endParaRPr/>
+          </a:p>
+          <a:p>
+            <a:pPr marL="0" lvl="0" indent="0" algn="l" rtl="0">
+              <a:spcBef>
+                <a:spcPts val="0"/>
+              </a:spcBef>
+              <a:spcAft>
+                <a:spcPts val="0"/>
+              </a:spcAft>
+              <a:buNone/>
+            </a:pPr>
+            <a:endParaRPr/>
+          </a:p>
+        </p:txBody>
+      </p:sp>
+    </p:spTree>
+    <p:extLst>
+      <p:ext uri="{BB962C8B-B14F-4D97-AF65-F5344CB8AC3E}">
+        <p14:creationId xmlns:p14="http://schemas.microsoft.com/office/powerpoint/2010/main" val="3815843750"/>
+      </p:ext>
+    </p:extLst>
+  </p:cSld>
+  <p:clrMapOvr>
+    <a:masterClrMapping/>
+  </p:clrMapOvr>
+</p:notes>
+</file>
+
+<file path=ppt/notesSlides/notesSlide71.xml><?xml version="1.0" encoding="utf-8"?>
+<p:notes xmlns:a="http://schemas.openxmlformats.org/drawingml/2006/main" xmlns:r="http://schemas.openxmlformats.org/officeDocument/2006/relationships" xmlns:p="http://schemas.openxmlformats.org/presentationml/2006/main" showMasterSp="0" showMasterPhAnim="0">
+  <p:cSld>
+    <p:spTree>
+      <p:nvGrpSpPr>
+        <p:cNvPr id="1" name="Shape 86"/>
+        <p:cNvGrpSpPr/>
+        <p:nvPr/>
+      </p:nvGrpSpPr>
+      <p:grpSpPr>
+        <a:xfrm>
+          <a:off x="0" y="0"/>
+          <a:ext cx="0" cy="0"/>
+          <a:chOff x="0" y="0"/>
+          <a:chExt cx="0" cy="0"/>
+        </a:xfrm>
+      </p:grpSpPr>
+      <p:sp>
+        <p:nvSpPr>
+          <p:cNvPr id="87" name="Google Shape;87;gac10fef634_0_30:notes"/>
+          <p:cNvSpPr>
+            <a:spLocks noGrp="1" noRot="1" noChangeAspect="1"/>
+          </p:cNvSpPr>
+          <p:nvPr>
+            <p:ph type="sldImg" idx="2"/>
+          </p:nvPr>
+        </p:nvSpPr>
+        <p:spPr>
+          <a:xfrm>
+            <a:off x="381000" y="685800"/>
+            <a:ext cx="6096000" cy="3429000"/>
+          </a:xfrm>
+          <a:custGeom>
+            <a:avLst/>
+            <a:gdLst/>
+            <a:ahLst/>
+            <a:cxnLst/>
+            <a:rect l="l" t="t" r="r" b="b"/>
+            <a:pathLst>
+              <a:path w="120000" h="120000" extrusionOk="0">
+                <a:moveTo>
+                  <a:pt x="0" y="0"/>
+                </a:moveTo>
+                <a:lnTo>
+                  <a:pt x="120000" y="0"/>
+                </a:lnTo>
+                <a:lnTo>
+                  <a:pt x="120000" y="120000"/>
+                </a:lnTo>
+                <a:lnTo>
+                  <a:pt x="0" y="120000"/>
+                </a:lnTo>
+                <a:close/>
+              </a:path>
+            </a:pathLst>
+          </a:custGeom>
+        </p:spPr>
+      </p:sp>
+      <p:sp>
+        <p:nvSpPr>
+          <p:cNvPr id="88" name="Google Shape;88;gac10fef634_0_30:notes"/>
+          <p:cNvSpPr txBox="1">
+            <a:spLocks noGrp="1"/>
+          </p:cNvSpPr>
+          <p:nvPr>
+            <p:ph type="body" idx="1"/>
+          </p:nvPr>
+        </p:nvSpPr>
+        <p:spPr>
+          <a:xfrm>
+            <a:off x="685800" y="4343400"/>
+            <a:ext cx="5486400" cy="4114800"/>
+          </a:xfrm>
+          <a:prstGeom prst="rect">
+            <a:avLst/>
+          </a:prstGeom>
+        </p:spPr>
+        <p:txBody>
+          <a:bodyPr spcFirstLastPara="1" wrap="square" lIns="91425" tIns="91425" rIns="91425" bIns="91425" anchor="t" anchorCtr="0">
+            <a:noAutofit/>
+          </a:bodyPr>
+          <a:lstStyle/>
+          <a:p>
+            <a:pPr marL="0" lvl="0" indent="0" algn="l" rtl="0">
+              <a:spcBef>
+                <a:spcPts val="0"/>
+              </a:spcBef>
+              <a:spcAft>
+                <a:spcPts val="0"/>
+              </a:spcAft>
+              <a:buNone/>
+            </a:pPr>
+            <a:r>
+              <a:rPr lang="en"/>
+              <a:t>Discusses how the information from planning, testing and trialling of components assisted in the development of a high-quality outcome</a:t>
+            </a:r>
+            <a:endParaRPr/>
+          </a:p>
+        </p:txBody>
+      </p:sp>
+    </p:spTree>
   </p:cSld>
   <p:clrMapOvr>
     <a:masterClrMapping/>
@@ -31936,7 +32524,7 @@
               <a:rPr lang="en" b="1" dirty="0">
                 <a:latin typeface="Avenir Next LT Pro" panose="020B0504020202020204" pitchFamily="34" charset="0"/>
               </a:rPr>
-              <a:t>Component 8 Version 2/Component 9 New Order or Exit Version 1 (Trello screenshot)</a:t>
+              <a:t>Component 8 Version 2 (Trello screenshot)</a:t>
             </a:r>
             <a:endParaRPr b="1" dirty="0">
               <a:latin typeface="Avenir Next LT Pro" panose="020B0504020202020204" pitchFamily="34" charset="0"/>
@@ -31960,19 +32548,745 @@
         </p:nvPicPr>
         <p:blipFill rotWithShape="1">
           <a:blip r:embed="rId4"/>
-          <a:srcRect r="75158"/>
+          <a:srcRect l="-3" r="183"/>
           <a:stretch/>
         </p:blipFill>
         <p:spPr>
           <a:xfrm>
-            <a:off x="203886" y="1743931"/>
-            <a:ext cx="1792554" cy="2047810"/>
+            <a:off x="277203" y="1510419"/>
+            <a:ext cx="8589594" cy="2442101"/>
           </a:xfrm>
           <a:prstGeom prst="rect">
             <a:avLst/>
           </a:prstGeom>
         </p:spPr>
       </p:pic>
+    </p:spTree>
+    <p:extLst>
+      <p:ext uri="{BB962C8B-B14F-4D97-AF65-F5344CB8AC3E}">
+        <p14:creationId xmlns:p14="http://schemas.microsoft.com/office/powerpoint/2010/main" val="963759518"/>
+      </p:ext>
+    </p:extLst>
+  </p:cSld>
+  <p:clrMapOvr>
+    <a:masterClrMapping/>
+  </p:clrMapOvr>
+</p:sld>
+</file>
+
+<file path=ppt/slides/slide69.xml><?xml version="1.0" encoding="utf-8"?>
+<p:sld xmlns:a="http://schemas.openxmlformats.org/drawingml/2006/main" xmlns:r="http://schemas.openxmlformats.org/officeDocument/2006/relationships" xmlns:p="http://schemas.openxmlformats.org/presentationml/2006/main">
+  <p:cSld>
+    <p:spTree>
+      <p:nvGrpSpPr>
+        <p:cNvPr id="1" name="Shape 77"/>
+        <p:cNvGrpSpPr/>
+        <p:nvPr/>
+      </p:nvGrpSpPr>
+      <p:grpSpPr>
+        <a:xfrm>
+          <a:off x="0" y="0"/>
+          <a:ext cx="0" cy="0"/>
+          <a:chOff x="0" y="0"/>
+          <a:chExt cx="0" cy="0"/>
+        </a:xfrm>
+      </p:grpSpPr>
+      <p:pic>
+        <p:nvPicPr>
+          <p:cNvPr id="3" name="Picture 2">
+            <a:extLst>
+              <a:ext uri="{FF2B5EF4-FFF2-40B4-BE49-F238E27FC236}">
+                <a16:creationId xmlns:a16="http://schemas.microsoft.com/office/drawing/2014/main" id="{E10C2034-E5C4-4ABB-8872-92315B5651AC}"/>
+              </a:ext>
+            </a:extLst>
+          </p:cNvPr>
+          <p:cNvPicPr>
+            <a:picLocks noChangeAspect="1"/>
+          </p:cNvPicPr>
+          <p:nvPr/>
+        </p:nvPicPr>
+        <p:blipFill>
+          <a:blip r:embed="rId3"/>
+          <a:stretch>
+            <a:fillRect/>
+          </a:stretch>
+        </p:blipFill>
+        <p:spPr>
+          <a:xfrm>
+            <a:off x="0" y="1970"/>
+            <a:ext cx="9144000" cy="5139559"/>
+          </a:xfrm>
+          <a:prstGeom prst="rect">
+            <a:avLst/>
+          </a:prstGeom>
+        </p:spPr>
+      </p:pic>
+      <p:sp>
+        <p:nvSpPr>
+          <p:cNvPr id="78" name="Google Shape;78;p17"/>
+          <p:cNvSpPr txBox="1">
+            <a:spLocks noGrp="1"/>
+          </p:cNvSpPr>
+          <p:nvPr>
+            <p:ph type="title"/>
+          </p:nvPr>
+        </p:nvSpPr>
+        <p:spPr>
+          <a:xfrm>
+            <a:off x="285722" y="105412"/>
+            <a:ext cx="8520600" cy="572700"/>
+          </a:xfrm>
+          <a:prstGeom prst="rect">
+            <a:avLst/>
+          </a:prstGeom>
+        </p:spPr>
+        <p:txBody>
+          <a:bodyPr spcFirstLastPara="1" wrap="square" lIns="91425" tIns="91425" rIns="91425" bIns="91425" anchor="t" anchorCtr="0">
+            <a:noAutofit/>
+          </a:bodyPr>
+          <a:lstStyle/>
+          <a:p>
+            <a:pPr marL="0" lvl="0" indent="0" algn="l" rtl="0">
+              <a:spcBef>
+                <a:spcPts val="0"/>
+              </a:spcBef>
+              <a:spcAft>
+                <a:spcPts val="0"/>
+              </a:spcAft>
+              <a:buNone/>
+            </a:pPr>
+            <a:r>
+              <a:rPr lang="en" b="1" dirty="0">
+                <a:latin typeface="Avenir Next LT Pro" panose="020B0504020202020204" pitchFamily="34" charset="0"/>
+              </a:rPr>
+              <a:t>Component 8 Version 2 - Test Plan (integrated into main app)</a:t>
+            </a:r>
+            <a:endParaRPr b="1" dirty="0">
+              <a:latin typeface="Avenir Next LT Pro" panose="020B0504020202020204" pitchFamily="34" charset="0"/>
+            </a:endParaRPr>
+          </a:p>
+        </p:txBody>
+      </p:sp>
+      <p:graphicFrame>
+        <p:nvGraphicFramePr>
+          <p:cNvPr id="79" name="Google Shape;79;p17"/>
+          <p:cNvGraphicFramePr/>
+          <p:nvPr/>
+        </p:nvGraphicFramePr>
+        <p:xfrm>
+          <a:off x="201902" y="3864638"/>
+          <a:ext cx="8520600" cy="1173450"/>
+        </p:xfrm>
+        <a:graphic>
+          <a:graphicData uri="http://schemas.openxmlformats.org/drawingml/2006/table">
+            <a:tbl>
+              <a:tblPr>
+                <a:noFill/>
+                <a:tableStyleId>{E1099E06-0E6B-448D-9D27-60429F06E6F4}</a:tableStyleId>
+              </a:tblPr>
+              <a:tblGrid>
+                <a:gridCol w="3653818">
+                  <a:extLst>
+                    <a:ext uri="{9D8B030D-6E8A-4147-A177-3AD203B41FA5}">
+                      <a16:colId xmlns:a16="http://schemas.microsoft.com/office/drawing/2014/main" val="20000"/>
+                    </a:ext>
+                  </a:extLst>
+                </a:gridCol>
+                <a:gridCol w="4866782">
+                  <a:extLst>
+                    <a:ext uri="{9D8B030D-6E8A-4147-A177-3AD203B41FA5}">
+                      <a16:colId xmlns:a16="http://schemas.microsoft.com/office/drawing/2014/main" val="20001"/>
+                    </a:ext>
+                  </a:extLst>
+                </a:gridCol>
+              </a:tblGrid>
+              <a:tr h="381000">
+                <a:tc>
+                  <a:txBody>
+                    <a:bodyPr/>
+                    <a:lstStyle/>
+                    <a:p>
+                      <a:pPr marL="0" lvl="0" indent="0" algn="l" rtl="0">
+                        <a:spcBef>
+                          <a:spcPts val="0"/>
+                        </a:spcBef>
+                        <a:spcAft>
+                          <a:spcPts val="0"/>
+                        </a:spcAft>
+                        <a:buNone/>
+                      </a:pPr>
+                      <a:r>
+                        <a:rPr lang="en" sz="1000" b="1" dirty="0">
+                          <a:latin typeface="Avenir Next LT Pro" panose="020B0504020202020204" pitchFamily="34" charset="0"/>
+                        </a:rPr>
+                        <a:t>Test Case</a:t>
+                      </a:r>
+                      <a:endParaRPr sz="1000" b="1" dirty="0">
+                        <a:latin typeface="Avenir Next LT Pro" panose="020B0504020202020204" pitchFamily="34" charset="0"/>
+                      </a:endParaRPr>
+                    </a:p>
+                  </a:txBody>
+                  <a:tcPr marL="91425" marR="91425" marT="91425" marB="91425">
+                    <a:solidFill>
+                      <a:srgbClr val="CCCCCC"/>
+                    </a:solidFill>
+                  </a:tcPr>
+                </a:tc>
+                <a:tc>
+                  <a:txBody>
+                    <a:bodyPr/>
+                    <a:lstStyle/>
+                    <a:p>
+                      <a:pPr marL="0" lvl="0" indent="0" algn="l" rtl="0">
+                        <a:spcBef>
+                          <a:spcPts val="0"/>
+                        </a:spcBef>
+                        <a:spcAft>
+                          <a:spcPts val="0"/>
+                        </a:spcAft>
+                        <a:buNone/>
+                      </a:pPr>
+                      <a:r>
+                        <a:rPr lang="en" sz="1000" b="1" dirty="0">
+                          <a:latin typeface="Avenir Next LT Pro" panose="020B0504020202020204" pitchFamily="34" charset="0"/>
+                        </a:rPr>
+                        <a:t>Expected Values</a:t>
+                      </a:r>
+                      <a:endParaRPr sz="1000" b="1" dirty="0">
+                        <a:latin typeface="Avenir Next LT Pro" panose="020B0504020202020204" pitchFamily="34" charset="0"/>
+                      </a:endParaRPr>
+                    </a:p>
+                  </a:txBody>
+                  <a:tcPr marL="91425" marR="91425" marT="91425" marB="91425">
+                    <a:solidFill>
+                      <a:srgbClr val="CCCCCC"/>
+                    </a:solidFill>
+                  </a:tcPr>
+                </a:tc>
+                <a:extLst>
+                  <a:ext uri="{0D108BD9-81ED-4DB2-BD59-A6C34878D82A}">
+                    <a16:rowId xmlns:a16="http://schemas.microsoft.com/office/drawing/2014/main" val="10000"/>
+                  </a:ext>
+                </a:extLst>
+              </a:tr>
+              <a:tr h="396200">
+                <a:tc>
+                  <a:txBody>
+                    <a:bodyPr/>
+                    <a:lstStyle/>
+                    <a:p>
+                      <a:pPr marL="0" lvl="0" indent="0" algn="l" rtl="0">
+                        <a:spcBef>
+                          <a:spcPts val="0"/>
+                        </a:spcBef>
+                        <a:spcAft>
+                          <a:spcPts val="0"/>
+                        </a:spcAft>
+                        <a:buNone/>
+                      </a:pPr>
+                      <a:r>
+                        <a:rPr lang="en-NZ" sz="1000" dirty="0">
+                          <a:latin typeface="Avenir Next LT Pro" panose="020B0504020202020204" pitchFamily="34" charset="0"/>
+                        </a:rPr>
+                        <a:t>Entered 1 Choose Confirm</a:t>
+                      </a:r>
+                    </a:p>
+                    <a:p>
+                      <a:pPr marL="0" lvl="0" indent="0" algn="l" rtl="0">
+                        <a:spcBef>
+                          <a:spcPts val="0"/>
+                        </a:spcBef>
+                        <a:spcAft>
+                          <a:spcPts val="0"/>
+                        </a:spcAft>
+                        <a:buNone/>
+                      </a:pPr>
+                      <a:r>
+                        <a:rPr lang="en-NZ" sz="1000" dirty="0">
+                          <a:latin typeface="Avenir Next LT Pro" panose="020B0504020202020204" pitchFamily="34" charset="0"/>
+                        </a:rPr>
+                        <a:t>Entered 2 Choose Cancel</a:t>
+                      </a:r>
+                    </a:p>
+                    <a:p>
+                      <a:pPr marL="0" lvl="0" indent="0" algn="l" rtl="0">
+                        <a:spcBef>
+                          <a:spcPts val="0"/>
+                        </a:spcBef>
+                        <a:spcAft>
+                          <a:spcPts val="0"/>
+                        </a:spcAft>
+                        <a:buNone/>
+                      </a:pPr>
+                      <a:r>
+                        <a:rPr lang="en-NZ" sz="1000" dirty="0">
+                          <a:latin typeface="Avenir Next LT Pro" panose="020B0504020202020204" pitchFamily="34" charset="0"/>
+                        </a:rPr>
+                        <a:t>Entered 4 </a:t>
+                      </a:r>
+                    </a:p>
+                    <a:p>
+                      <a:pPr marL="0" lvl="0" indent="0" algn="l" rtl="0">
+                        <a:spcBef>
+                          <a:spcPts val="0"/>
+                        </a:spcBef>
+                        <a:spcAft>
+                          <a:spcPts val="0"/>
+                        </a:spcAft>
+                        <a:buNone/>
+                      </a:pPr>
+                      <a:r>
+                        <a:rPr lang="en-NZ" sz="1000" dirty="0">
+                          <a:latin typeface="Avenir Next LT Pro" panose="020B0504020202020204" pitchFamily="34" charset="0"/>
+                        </a:rPr>
+                        <a:t>Entered s</a:t>
+                      </a:r>
+                    </a:p>
+                  </a:txBody>
+                  <a:tcPr marL="91425" marR="91425" marT="91425" marB="91425"/>
+                </a:tc>
+                <a:tc>
+                  <a:txBody>
+                    <a:bodyPr/>
+                    <a:lstStyle/>
+                    <a:p>
+                      <a:pPr marL="0" lvl="0" indent="0" algn="l" rtl="0">
+                        <a:spcBef>
+                          <a:spcPts val="0"/>
+                        </a:spcBef>
+                        <a:spcAft>
+                          <a:spcPts val="0"/>
+                        </a:spcAft>
+                        <a:buNone/>
+                      </a:pPr>
+                      <a:r>
+                        <a:rPr lang="en-NZ" sz="1000" dirty="0">
+                          <a:latin typeface="Avenir Next LT Pro" panose="020B0504020202020204" pitchFamily="34" charset="0"/>
+                        </a:rPr>
+                        <a:t>Confirm worked – printed “confirm”</a:t>
+                      </a:r>
+                    </a:p>
+                    <a:p>
+                      <a:pPr marL="0" lvl="0" indent="0" algn="l" rtl="0">
+                        <a:spcBef>
+                          <a:spcPts val="0"/>
+                        </a:spcBef>
+                        <a:spcAft>
+                          <a:spcPts val="0"/>
+                        </a:spcAft>
+                        <a:buNone/>
+                      </a:pPr>
+                      <a:r>
+                        <a:rPr lang="en-NZ" sz="1000" dirty="0">
+                          <a:latin typeface="Avenir Next LT Pro" panose="020B0504020202020204" pitchFamily="34" charset="0"/>
+                        </a:rPr>
+                        <a:t>Cancel worked – printed “cancel”</a:t>
+                      </a:r>
+                    </a:p>
+                    <a:p>
+                      <a:pPr marL="0" lvl="0" indent="0" algn="l" rtl="0">
+                        <a:spcBef>
+                          <a:spcPts val="0"/>
+                        </a:spcBef>
+                        <a:spcAft>
+                          <a:spcPts val="0"/>
+                        </a:spcAft>
+                        <a:buNone/>
+                      </a:pPr>
+                      <a:r>
+                        <a:rPr lang="en-NZ" sz="1000" dirty="0">
+                          <a:latin typeface="Avenir Next LT Pro" panose="020B0504020202020204" pitchFamily="34" charset="0"/>
+                        </a:rPr>
+                        <a:t>Printed “Please enter 1 or 2”</a:t>
+                      </a:r>
+                    </a:p>
+                    <a:p>
+                      <a:pPr marL="0" lvl="0" indent="0" algn="l" rtl="0">
+                        <a:spcBef>
+                          <a:spcPts val="0"/>
+                        </a:spcBef>
+                        <a:spcAft>
+                          <a:spcPts val="0"/>
+                        </a:spcAft>
+                        <a:buNone/>
+                      </a:pPr>
+                      <a:r>
+                        <a:rPr lang="en-NZ" sz="1000" dirty="0">
+                          <a:latin typeface="Avenir Next LT Pro" panose="020B0504020202020204" pitchFamily="34" charset="0"/>
+                        </a:rPr>
+                        <a:t>Printed “please enter a valid number”</a:t>
+                      </a:r>
+                      <a:endParaRPr sz="1000" dirty="0">
+                        <a:latin typeface="Avenir Next LT Pro" panose="020B0504020202020204" pitchFamily="34" charset="0"/>
+                      </a:endParaRPr>
+                    </a:p>
+                  </a:txBody>
+                  <a:tcPr marL="91425" marR="91425" marT="91425" marB="91425"/>
+                </a:tc>
+                <a:extLst>
+                  <a:ext uri="{0D108BD9-81ED-4DB2-BD59-A6C34878D82A}">
+                    <a16:rowId xmlns:a16="http://schemas.microsoft.com/office/drawing/2014/main" val="10001"/>
+                  </a:ext>
+                </a:extLst>
+              </a:tr>
+            </a:tbl>
+          </a:graphicData>
+        </a:graphic>
+      </p:graphicFrame>
+      <p:pic>
+        <p:nvPicPr>
+          <p:cNvPr id="5" name="Picture 4">
+            <a:extLst>
+              <a:ext uri="{FF2B5EF4-FFF2-40B4-BE49-F238E27FC236}">
+                <a16:creationId xmlns:a16="http://schemas.microsoft.com/office/drawing/2014/main" id="{C8F7877E-62EE-45D9-8729-6F1860059594}"/>
+              </a:ext>
+            </a:extLst>
+          </p:cNvPr>
+          <p:cNvPicPr>
+            <a:picLocks noChangeAspect="1"/>
+          </p:cNvPicPr>
+          <p:nvPr/>
+        </p:nvPicPr>
+        <p:blipFill>
+          <a:blip r:embed="rId4"/>
+          <a:stretch>
+            <a:fillRect/>
+          </a:stretch>
+        </p:blipFill>
+        <p:spPr>
+          <a:xfrm>
+            <a:off x="5355179" y="915295"/>
+            <a:ext cx="3298743" cy="2745311"/>
+          </a:xfrm>
+          <a:prstGeom prst="rect">
+            <a:avLst/>
+          </a:prstGeom>
+        </p:spPr>
+      </p:pic>
+      <p:pic>
+        <p:nvPicPr>
+          <p:cNvPr id="8" name="Picture 7">
+            <a:extLst>
+              <a:ext uri="{FF2B5EF4-FFF2-40B4-BE49-F238E27FC236}">
+                <a16:creationId xmlns:a16="http://schemas.microsoft.com/office/drawing/2014/main" id="{6AB1E822-4D6B-4C9E-89A5-84CE0F6C0A7A}"/>
+              </a:ext>
+            </a:extLst>
+          </p:cNvPr>
+          <p:cNvPicPr>
+            <a:picLocks noChangeAspect="1"/>
+          </p:cNvPicPr>
+          <p:nvPr/>
+        </p:nvPicPr>
+        <p:blipFill>
+          <a:blip r:embed="rId5"/>
+          <a:stretch>
+            <a:fillRect/>
+          </a:stretch>
+        </p:blipFill>
+        <p:spPr>
+          <a:xfrm>
+            <a:off x="652521" y="1123801"/>
+            <a:ext cx="3919479" cy="2536805"/>
+          </a:xfrm>
+          <a:prstGeom prst="rect">
+            <a:avLst/>
+          </a:prstGeom>
+        </p:spPr>
+      </p:pic>
+    </p:spTree>
+    <p:extLst>
+      <p:ext uri="{BB962C8B-B14F-4D97-AF65-F5344CB8AC3E}">
+        <p14:creationId xmlns:p14="http://schemas.microsoft.com/office/powerpoint/2010/main" val="2516317635"/>
+      </p:ext>
+    </p:extLst>
+  </p:cSld>
+  <p:clrMapOvr>
+    <a:masterClrMapping/>
+  </p:clrMapOvr>
+</p:sld>
+</file>
+
+<file path=ppt/slides/slide7.xml><?xml version="1.0" encoding="utf-8"?>
+<p:sld xmlns:a="http://schemas.openxmlformats.org/drawingml/2006/main" xmlns:r="http://schemas.openxmlformats.org/officeDocument/2006/relationships" xmlns:p="http://schemas.openxmlformats.org/presentationml/2006/main">
+  <p:cSld>
+    <p:bg>
+      <p:bgPr>
+        <a:solidFill>
+          <a:srgbClr val="FFCC66"/>
+        </a:solidFill>
+        <a:effectLst/>
+      </p:bgPr>
+    </p:bg>
+    <p:spTree>
+      <p:nvGrpSpPr>
+        <p:cNvPr id="1" name=""/>
+        <p:cNvGrpSpPr/>
+        <p:nvPr/>
+      </p:nvGrpSpPr>
+      <p:grpSpPr>
+        <a:xfrm>
+          <a:off x="0" y="0"/>
+          <a:ext cx="0" cy="0"/>
+          <a:chOff x="0" y="0"/>
+          <a:chExt cx="0" cy="0"/>
+        </a:xfrm>
+      </p:grpSpPr>
+      <p:pic>
+        <p:nvPicPr>
+          <p:cNvPr id="5" name="Picture 4">
+            <a:extLst>
+              <a:ext uri="{FF2B5EF4-FFF2-40B4-BE49-F238E27FC236}">
+                <a16:creationId xmlns:a16="http://schemas.microsoft.com/office/drawing/2014/main" id="{F55164D2-1D02-401E-AAD4-5D59D0238303}"/>
+              </a:ext>
+            </a:extLst>
+          </p:cNvPr>
+          <p:cNvPicPr>
+            <a:picLocks noChangeAspect="1"/>
+          </p:cNvPicPr>
+          <p:nvPr/>
+        </p:nvPicPr>
+        <p:blipFill>
+          <a:blip r:embed="rId2"/>
+          <a:stretch>
+            <a:fillRect/>
+          </a:stretch>
+        </p:blipFill>
+        <p:spPr>
+          <a:xfrm>
+            <a:off x="0" y="13181"/>
+            <a:ext cx="9144000" cy="5117138"/>
+          </a:xfrm>
+          <a:prstGeom prst="rect">
+            <a:avLst/>
+          </a:prstGeom>
+        </p:spPr>
+      </p:pic>
+      <p:sp>
+        <p:nvSpPr>
+          <p:cNvPr id="2" name="Title 1">
+            <a:extLst>
+              <a:ext uri="{FF2B5EF4-FFF2-40B4-BE49-F238E27FC236}">
+                <a16:creationId xmlns:a16="http://schemas.microsoft.com/office/drawing/2014/main" id="{5912979F-6922-40FD-B6E0-0506FA25714D}"/>
+              </a:ext>
+            </a:extLst>
+          </p:cNvPr>
+          <p:cNvSpPr>
+            <a:spLocks noGrp="1"/>
+          </p:cNvSpPr>
+          <p:nvPr>
+            <p:ph type="title"/>
+          </p:nvPr>
+        </p:nvSpPr>
+        <p:spPr>
+          <a:xfrm>
+            <a:off x="433620" y="445025"/>
+            <a:ext cx="8520600" cy="572700"/>
+          </a:xfrm>
+        </p:spPr>
+        <p:txBody>
+          <a:bodyPr/>
+          <a:lstStyle/>
+          <a:p>
+            <a:r>
+              <a:rPr lang="en-US" b="1" dirty="0">
+                <a:latin typeface="Avenir Next LT Pro" panose="020B0504020202020204" pitchFamily="34" charset="0"/>
+              </a:rPr>
+              <a:t>Implication 2 – Usability (Error Recovery)</a:t>
+            </a:r>
+            <a:endParaRPr lang="en-NZ" b="1" dirty="0">
+              <a:latin typeface="Avenir Next LT Pro" panose="020B0504020202020204" pitchFamily="34" charset="0"/>
+            </a:endParaRPr>
+          </a:p>
+        </p:txBody>
+      </p:sp>
+      <p:sp>
+        <p:nvSpPr>
+          <p:cNvPr id="3" name="Text Placeholder 2">
+            <a:extLst>
+              <a:ext uri="{FF2B5EF4-FFF2-40B4-BE49-F238E27FC236}">
+                <a16:creationId xmlns:a16="http://schemas.microsoft.com/office/drawing/2014/main" id="{1EB42CE1-67BF-466B-8C2C-7F21A8892B1E}"/>
+              </a:ext>
+            </a:extLst>
+          </p:cNvPr>
+          <p:cNvSpPr>
+            <a:spLocks noGrp="1"/>
+          </p:cNvSpPr>
+          <p:nvPr>
+            <p:ph type="body" idx="1"/>
+          </p:nvPr>
+        </p:nvSpPr>
+        <p:spPr/>
+        <p:txBody>
+          <a:bodyPr/>
+          <a:lstStyle/>
+          <a:p>
+            <a:pPr marL="114300" indent="0">
+              <a:buNone/>
+            </a:pPr>
+            <a:r>
+              <a:rPr lang="en-US" u="sng" dirty="0">
+                <a:solidFill>
+                  <a:schemeClr val="tx1"/>
+                </a:solidFill>
+                <a:latin typeface="Avenir Next LT Pro" panose="020B0504020202020204" pitchFamily="34" charset="0"/>
+              </a:rPr>
+              <a:t>Explain why it needs to be considered:</a:t>
+            </a:r>
+          </a:p>
+          <a:p>
+            <a:pPr marL="114300" indent="0">
+              <a:buNone/>
+            </a:pPr>
+            <a:r>
+              <a:rPr lang="en-US" dirty="0">
+                <a:solidFill>
+                  <a:schemeClr val="tx1"/>
+                </a:solidFill>
+                <a:latin typeface="Avenir Next LT Pro" panose="020B0504020202020204" pitchFamily="34" charset="0"/>
+              </a:rPr>
+              <a:t>This implication needs to be considered to make sure that the customer can move on to the next stage if they make an error; whether it was accidental or a mistake. Customers will know that something has gone wrong and, thus, will prevent any problems in the future if they make an error in their responses/answers. Otherwise, the program could lead to failure and stop responding, making the user frustrated.</a:t>
+            </a:r>
+          </a:p>
+          <a:p>
+            <a:pPr marL="114300" indent="0">
+              <a:buNone/>
+            </a:pPr>
+            <a:endParaRPr lang="en-US" dirty="0">
+              <a:latin typeface="Avenir Next LT Pro" panose="020B0504020202020204" pitchFamily="34" charset="0"/>
+            </a:endParaRPr>
+          </a:p>
+          <a:p>
+            <a:pPr marL="114300" indent="0">
+              <a:buNone/>
+            </a:pPr>
+            <a:endParaRPr lang="en-US" dirty="0">
+              <a:latin typeface="Avenir Next LT Pro" panose="020B0504020202020204" pitchFamily="34" charset="0"/>
+            </a:endParaRPr>
+          </a:p>
+          <a:p>
+            <a:pPr marL="114300" indent="0">
+              <a:buNone/>
+            </a:pPr>
+            <a:endParaRPr lang="en-NZ" dirty="0">
+              <a:latin typeface="Avenir Next LT Pro" panose="020B0504020202020204" pitchFamily="34" charset="0"/>
+            </a:endParaRPr>
+          </a:p>
+        </p:txBody>
+      </p:sp>
+    </p:spTree>
+    <p:extLst>
+      <p:ext uri="{BB962C8B-B14F-4D97-AF65-F5344CB8AC3E}">
+        <p14:creationId xmlns:p14="http://schemas.microsoft.com/office/powerpoint/2010/main" val="3102438580"/>
+      </p:ext>
+    </p:extLst>
+  </p:cSld>
+  <p:clrMapOvr>
+    <a:masterClrMapping/>
+  </p:clrMapOvr>
+</p:sld>
+</file>
+
+<file path=ppt/slides/slide70.xml><?xml version="1.0" encoding="utf-8"?>
+<p:sld xmlns:a="http://schemas.openxmlformats.org/drawingml/2006/main" xmlns:r="http://schemas.openxmlformats.org/officeDocument/2006/relationships" xmlns:p="http://schemas.openxmlformats.org/presentationml/2006/main">
+  <p:cSld>
+    <p:bg>
+      <p:bgPr>
+        <a:solidFill>
+          <a:srgbClr val="D9EAD3"/>
+        </a:solidFill>
+        <a:effectLst/>
+      </p:bgPr>
+    </p:bg>
+    <p:spTree>
+      <p:nvGrpSpPr>
+        <p:cNvPr id="1" name="Shape 72"/>
+        <p:cNvGrpSpPr/>
+        <p:nvPr/>
+      </p:nvGrpSpPr>
+      <p:grpSpPr>
+        <a:xfrm>
+          <a:off x="0" y="0"/>
+          <a:ext cx="0" cy="0"/>
+          <a:chOff x="0" y="0"/>
+          <a:chExt cx="0" cy="0"/>
+        </a:xfrm>
+      </p:grpSpPr>
+      <p:pic>
+        <p:nvPicPr>
+          <p:cNvPr id="3" name="Picture 2">
+            <a:extLst>
+              <a:ext uri="{FF2B5EF4-FFF2-40B4-BE49-F238E27FC236}">
+                <a16:creationId xmlns:a16="http://schemas.microsoft.com/office/drawing/2014/main" id="{2839E1E3-811C-4040-AD92-96ACD0E132E3}"/>
+              </a:ext>
+            </a:extLst>
+          </p:cNvPr>
+          <p:cNvPicPr>
+            <a:picLocks noChangeAspect="1"/>
+          </p:cNvPicPr>
+          <p:nvPr/>
+        </p:nvPicPr>
+        <p:blipFill>
+          <a:blip r:embed="rId3"/>
+          <a:stretch>
+            <a:fillRect/>
+          </a:stretch>
+        </p:blipFill>
+        <p:spPr>
+          <a:xfrm>
+            <a:off x="3500" y="0"/>
+            <a:ext cx="9136999" cy="5143500"/>
+          </a:xfrm>
+          <a:prstGeom prst="rect">
+            <a:avLst/>
+          </a:prstGeom>
+        </p:spPr>
+      </p:pic>
+      <p:sp>
+        <p:nvSpPr>
+          <p:cNvPr id="73" name="Google Shape;73;p16"/>
+          <p:cNvSpPr txBox="1">
+            <a:spLocks noGrp="1"/>
+          </p:cNvSpPr>
+          <p:nvPr>
+            <p:ph type="title"/>
+          </p:nvPr>
+        </p:nvSpPr>
+        <p:spPr>
+          <a:xfrm>
+            <a:off x="311699" y="315485"/>
+            <a:ext cx="8520600" cy="572700"/>
+          </a:xfrm>
+          <a:prstGeom prst="rect">
+            <a:avLst/>
+          </a:prstGeom>
+        </p:spPr>
+        <p:txBody>
+          <a:bodyPr spcFirstLastPara="1" wrap="square" lIns="91425" tIns="91425" rIns="91425" bIns="91425" anchor="t" anchorCtr="0">
+            <a:noAutofit/>
+          </a:bodyPr>
+          <a:lstStyle/>
+          <a:p>
+            <a:pPr marL="0" lvl="0" indent="0" algn="l" rtl="0">
+              <a:spcBef>
+                <a:spcPts val="0"/>
+              </a:spcBef>
+              <a:spcAft>
+                <a:spcPts val="0"/>
+              </a:spcAft>
+              <a:buNone/>
+            </a:pPr>
+            <a:r>
+              <a:rPr lang="en" b="1" dirty="0">
+                <a:latin typeface="Avenir Next LT Pro" panose="020B0504020202020204" pitchFamily="34" charset="0"/>
+              </a:rPr>
+              <a:t>Component 9 New Order or Exit Version 1 (Trello screenshot)</a:t>
+            </a:r>
+            <a:endParaRPr b="1" dirty="0">
+              <a:latin typeface="Avenir Next LT Pro" panose="020B0504020202020204" pitchFamily="34" charset="0"/>
+            </a:endParaRPr>
+          </a:p>
+        </p:txBody>
+      </p:sp>
       <p:pic>
         <p:nvPicPr>
           <p:cNvPr id="5" name="Picture 4">
@@ -31988,15 +33302,15 @@
           <p:nvPr/>
         </p:nvPicPr>
         <p:blipFill>
-          <a:blip r:embed="rId5"/>
+          <a:blip r:embed="rId4"/>
           <a:stretch>
             <a:fillRect/>
           </a:stretch>
         </p:blipFill>
         <p:spPr>
           <a:xfrm>
-            <a:off x="2138869" y="1744706"/>
-            <a:ext cx="6801245" cy="2047035"/>
+            <a:off x="520770" y="1721846"/>
+            <a:ext cx="8102460" cy="2438674"/>
           </a:xfrm>
           <a:prstGeom prst="rect">
             <a:avLst/>
@@ -32006,7 +33320,7 @@
     </p:spTree>
     <p:extLst>
       <p:ext uri="{BB962C8B-B14F-4D97-AF65-F5344CB8AC3E}">
-        <p14:creationId xmlns:p14="http://schemas.microsoft.com/office/powerpoint/2010/main" val="963759518"/>
+        <p14:creationId xmlns:p14="http://schemas.microsoft.com/office/powerpoint/2010/main" val="2024435106"/>
       </p:ext>
     </p:extLst>
   </p:cSld>
@@ -32016,7 +33330,7 @@
 </p:sld>
 </file>
 
-<file path=ppt/slides/slide69.xml><?xml version="1.0" encoding="utf-8"?>
+<file path=ppt/slides/slide71.xml><?xml version="1.0" encoding="utf-8"?>
 <p:sld xmlns:a="http://schemas.openxmlformats.org/drawingml/2006/main" xmlns:r="http://schemas.openxmlformats.org/officeDocument/2006/relationships" xmlns:p="http://schemas.openxmlformats.org/presentationml/2006/main">
   <p:cSld>
     <p:spTree>
@@ -32469,20 +33783,20 @@
 </p:sld>
 </file>
 
-<file path=ppt/slides/slide7.xml><?xml version="1.0" encoding="utf-8"?>
+<file path=ppt/slides/slide72.xml><?xml version="1.0" encoding="utf-8"?>
 <p:sld xmlns:a="http://schemas.openxmlformats.org/drawingml/2006/main" xmlns:r="http://schemas.openxmlformats.org/officeDocument/2006/relationships" xmlns:p="http://schemas.openxmlformats.org/presentationml/2006/main">
   <p:cSld>
     <p:bg>
       <p:bgPr>
         <a:solidFill>
-          <a:srgbClr val="FFCC66"/>
+          <a:srgbClr val="D9EAD3"/>
         </a:solidFill>
         <a:effectLst/>
       </p:bgPr>
     </p:bg>
     <p:spTree>
       <p:nvGrpSpPr>
-        <p:cNvPr id="1" name=""/>
+        <p:cNvPr id="1" name="Shape 72"/>
         <p:cNvGrpSpPr/>
         <p:nvPr/>
       </p:nvGrpSpPr>
@@ -32496,10 +33810,10 @@
       </p:grpSpPr>
       <p:pic>
         <p:nvPicPr>
-          <p:cNvPr id="5" name="Picture 4">
+          <p:cNvPr id="3" name="Picture 2">
             <a:extLst>
               <a:ext uri="{FF2B5EF4-FFF2-40B4-BE49-F238E27FC236}">
-                <a16:creationId xmlns:a16="http://schemas.microsoft.com/office/drawing/2014/main" id="{F55164D2-1D02-401E-AAD4-5D59D0238303}"/>
+                <a16:creationId xmlns:a16="http://schemas.microsoft.com/office/drawing/2014/main" id="{2839E1E3-811C-4040-AD92-96ACD0E132E3}"/>
               </a:ext>
             </a:extLst>
           </p:cNvPr>
@@ -32509,15 +33823,15 @@
           <p:nvPr/>
         </p:nvPicPr>
         <p:blipFill>
-          <a:blip r:embed="rId2"/>
+          <a:blip r:embed="rId3"/>
           <a:stretch>
             <a:fillRect/>
           </a:stretch>
         </p:blipFill>
         <p:spPr>
           <a:xfrm>
-            <a:off x="0" y="13181"/>
-            <a:ext cx="9144000" cy="5117138"/>
+            <a:off x="3500" y="0"/>
+            <a:ext cx="9136999" cy="5143500"/>
           </a:xfrm>
           <a:prstGeom prst="rect">
             <a:avLst/>
@@ -32526,14 +33840,8 @@
       </p:pic>
       <p:sp>
         <p:nvSpPr>
-          <p:cNvPr id="2" name="Title 1">
-            <a:extLst>
-              <a:ext uri="{FF2B5EF4-FFF2-40B4-BE49-F238E27FC236}">
-                <a16:creationId xmlns:a16="http://schemas.microsoft.com/office/drawing/2014/main" id="{5912979F-6922-40FD-B6E0-0506FA25714D}"/>
-              </a:ext>
-            </a:extLst>
-          </p:cNvPr>
-          <p:cNvSpPr>
+          <p:cNvPr id="73" name="Google Shape;73;p16"/>
+          <p:cNvSpPr txBox="1">
             <a:spLocks noGrp="1"/>
           </p:cNvSpPr>
           <p:nvPr>
@@ -32542,104 +33850,74 @@
         </p:nvSpPr>
         <p:spPr>
           <a:xfrm>
-            <a:off x="433620" y="445025"/>
+            <a:off x="311699" y="315485"/>
             <a:ext cx="8520600" cy="572700"/>
           </a:xfrm>
+          <a:prstGeom prst="rect">
+            <a:avLst/>
+          </a:prstGeom>
         </p:spPr>
         <p:txBody>
-          <a:bodyPr/>
+          <a:bodyPr spcFirstLastPara="1" wrap="square" lIns="91425" tIns="91425" rIns="91425" bIns="91425" anchor="t" anchorCtr="0">
+            <a:noAutofit/>
+          </a:bodyPr>
           <a:lstStyle/>
           <a:p>
+            <a:pPr marL="0" lvl="0" indent="0" algn="l" rtl="0">
+              <a:spcBef>
+                <a:spcPts val="0"/>
+              </a:spcBef>
+              <a:spcAft>
+                <a:spcPts val="0"/>
+              </a:spcAft>
+              <a:buNone/>
+            </a:pPr>
             <a:r>
-              <a:rPr lang="en-US" b="1" dirty="0">
+              <a:rPr lang="en" b="1" dirty="0">
                 <a:latin typeface="Avenir Next LT Pro" panose="020B0504020202020204" pitchFamily="34" charset="0"/>
               </a:rPr>
-              <a:t>Implication 2 – Usability (Error Recovery)</a:t>
+              <a:t>Component 9 Version 2 (Trello screenshot)</a:t>
             </a:r>
-            <a:endParaRPr lang="en-NZ" b="1" dirty="0">
+            <a:endParaRPr b="1" dirty="0">
               <a:latin typeface="Avenir Next LT Pro" panose="020B0504020202020204" pitchFamily="34" charset="0"/>
             </a:endParaRPr>
           </a:p>
         </p:txBody>
       </p:sp>
-      <p:sp>
-        <p:nvSpPr>
-          <p:cNvPr id="3" name="Text Placeholder 2">
+      <p:pic>
+        <p:nvPicPr>
+          <p:cNvPr id="4" name="Picture 3">
             <a:extLst>
               <a:ext uri="{FF2B5EF4-FFF2-40B4-BE49-F238E27FC236}">
-                <a16:creationId xmlns:a16="http://schemas.microsoft.com/office/drawing/2014/main" id="{1EB42CE1-67BF-466B-8C2C-7F21A8892B1E}"/>
+                <a16:creationId xmlns:a16="http://schemas.microsoft.com/office/drawing/2014/main" id="{EFE735C4-592A-4BF7-A5B0-6FE68304E33F}"/>
               </a:ext>
             </a:extLst>
           </p:cNvPr>
-          <p:cNvSpPr>
-            <a:spLocks noGrp="1"/>
-          </p:cNvSpPr>
-          <p:nvPr>
-            <p:ph type="body" idx="1"/>
-          </p:nvPr>
-        </p:nvSpPr>
-        <p:spPr/>
-        <p:txBody>
-          <a:bodyPr/>
-          <a:lstStyle/>
-          <a:p>
-            <a:pPr marL="114300" indent="0">
-              <a:buNone/>
-            </a:pPr>
-            <a:r>
-              <a:rPr lang="en-US" u="sng" dirty="0">
-                <a:solidFill>
-                  <a:schemeClr val="tx1"/>
-                </a:solidFill>
-                <a:latin typeface="Avenir Next LT Pro" panose="020B0504020202020204" pitchFamily="34" charset="0"/>
-              </a:rPr>
-              <a:t>Explain why it needs to be considered:</a:t>
-            </a:r>
-          </a:p>
-          <a:p>
-            <a:pPr marL="114300" indent="0">
-              <a:buNone/>
-            </a:pPr>
-            <a:r>
-              <a:rPr lang="en-US" dirty="0">
-                <a:solidFill>
-                  <a:schemeClr val="tx1"/>
-                </a:solidFill>
-                <a:latin typeface="Avenir Next LT Pro" panose="020B0504020202020204" pitchFamily="34" charset="0"/>
-              </a:rPr>
-              <a:t>This implication needs to be considered to make sure that the customer can move on to the next stage if they make an error; whether it was accidental or a mistake. Customers will know that something has gone wrong and, thus, will prevent any problems in the future if they make an error in their responses/answers. Otherwise, the program could lead to failure and stop responding, making the user frustrated.</a:t>
-            </a:r>
-          </a:p>
-          <a:p>
-            <a:pPr marL="114300" indent="0">
-              <a:buNone/>
-            </a:pPr>
-            <a:endParaRPr lang="en-US" dirty="0">
-              <a:latin typeface="Avenir Next LT Pro" panose="020B0504020202020204" pitchFamily="34" charset="0"/>
-            </a:endParaRPr>
-          </a:p>
-          <a:p>
-            <a:pPr marL="114300" indent="0">
-              <a:buNone/>
-            </a:pPr>
-            <a:endParaRPr lang="en-US" dirty="0">
-              <a:latin typeface="Avenir Next LT Pro" panose="020B0504020202020204" pitchFamily="34" charset="0"/>
-            </a:endParaRPr>
-          </a:p>
-          <a:p>
-            <a:pPr marL="114300" indent="0">
-              <a:buNone/>
-            </a:pPr>
-            <a:endParaRPr lang="en-NZ" dirty="0">
-              <a:latin typeface="Avenir Next LT Pro" panose="020B0504020202020204" pitchFamily="34" charset="0"/>
-            </a:endParaRPr>
-          </a:p>
-        </p:txBody>
-      </p:sp>
+          <p:cNvPicPr>
+            <a:picLocks noChangeAspect="1"/>
+          </p:cNvPicPr>
+          <p:nvPr/>
+        </p:nvPicPr>
+        <p:blipFill>
+          <a:blip r:embed="rId4"/>
+          <a:stretch>
+            <a:fillRect/>
+          </a:stretch>
+        </p:blipFill>
+        <p:spPr>
+          <a:xfrm>
+            <a:off x="627109" y="1447800"/>
+            <a:ext cx="8152985" cy="2610992"/>
+          </a:xfrm>
+          <a:prstGeom prst="rect">
+            <a:avLst/>
+          </a:prstGeom>
+        </p:spPr>
+      </p:pic>
     </p:spTree>
     <p:extLst>
       <p:ext uri="{BB962C8B-B14F-4D97-AF65-F5344CB8AC3E}">
-        <p14:creationId xmlns:p14="http://schemas.microsoft.com/office/powerpoint/2010/main" val="3102438580"/>
+        <p14:creationId xmlns:p14="http://schemas.microsoft.com/office/powerpoint/2010/main" val="2558664074"/>
       </p:ext>
     </p:extLst>
   </p:cSld>
@@ -32649,7 +33927,382 @@
 </p:sld>
 </file>
 
-<file path=ppt/slides/slide70.xml><?xml version="1.0" encoding="utf-8"?>
+<file path=ppt/slides/slide73.xml><?xml version="1.0" encoding="utf-8"?>
+<p:sld xmlns:a="http://schemas.openxmlformats.org/drawingml/2006/main" xmlns:r="http://schemas.openxmlformats.org/officeDocument/2006/relationships" xmlns:p="http://schemas.openxmlformats.org/presentationml/2006/main">
+  <p:cSld>
+    <p:spTree>
+      <p:nvGrpSpPr>
+        <p:cNvPr id="1" name="Shape 77"/>
+        <p:cNvGrpSpPr/>
+        <p:nvPr/>
+      </p:nvGrpSpPr>
+      <p:grpSpPr>
+        <a:xfrm>
+          <a:off x="0" y="0"/>
+          <a:ext cx="0" cy="0"/>
+          <a:chOff x="0" y="0"/>
+          <a:chExt cx="0" cy="0"/>
+        </a:xfrm>
+      </p:grpSpPr>
+      <p:pic>
+        <p:nvPicPr>
+          <p:cNvPr id="3" name="Picture 2">
+            <a:extLst>
+              <a:ext uri="{FF2B5EF4-FFF2-40B4-BE49-F238E27FC236}">
+                <a16:creationId xmlns:a16="http://schemas.microsoft.com/office/drawing/2014/main" id="{E10C2034-E5C4-4ABB-8872-92315B5651AC}"/>
+              </a:ext>
+            </a:extLst>
+          </p:cNvPr>
+          <p:cNvPicPr>
+            <a:picLocks noChangeAspect="1"/>
+          </p:cNvPicPr>
+          <p:nvPr/>
+        </p:nvPicPr>
+        <p:blipFill>
+          <a:blip r:embed="rId3"/>
+          <a:stretch>
+            <a:fillRect/>
+          </a:stretch>
+        </p:blipFill>
+        <p:spPr>
+          <a:xfrm>
+            <a:off x="0" y="1970"/>
+            <a:ext cx="9144000" cy="5139559"/>
+          </a:xfrm>
+          <a:prstGeom prst="rect">
+            <a:avLst/>
+          </a:prstGeom>
+        </p:spPr>
+      </p:pic>
+      <p:sp>
+        <p:nvSpPr>
+          <p:cNvPr id="78" name="Google Shape;78;p17"/>
+          <p:cNvSpPr txBox="1">
+            <a:spLocks noGrp="1"/>
+          </p:cNvSpPr>
+          <p:nvPr>
+            <p:ph type="title"/>
+          </p:nvPr>
+        </p:nvSpPr>
+        <p:spPr>
+          <a:xfrm>
+            <a:off x="285722" y="105412"/>
+            <a:ext cx="8520600" cy="572700"/>
+          </a:xfrm>
+          <a:prstGeom prst="rect">
+            <a:avLst/>
+          </a:prstGeom>
+        </p:spPr>
+        <p:txBody>
+          <a:bodyPr spcFirstLastPara="1" wrap="square" lIns="91425" tIns="91425" rIns="91425" bIns="91425" anchor="t" anchorCtr="0">
+            <a:noAutofit/>
+          </a:bodyPr>
+          <a:lstStyle/>
+          <a:p>
+            <a:pPr marL="0" lvl="0" indent="0" algn="l" rtl="0">
+              <a:spcBef>
+                <a:spcPts val="0"/>
+              </a:spcBef>
+              <a:spcAft>
+                <a:spcPts val="0"/>
+              </a:spcAft>
+              <a:buNone/>
+            </a:pPr>
+            <a:r>
+              <a:rPr lang="en" b="1" dirty="0">
+                <a:latin typeface="Avenir Next LT Pro" panose="020B0504020202020204" pitchFamily="34" charset="0"/>
+              </a:rPr>
+              <a:t>Component 9 Version 2 - Test Plan</a:t>
+            </a:r>
+            <a:endParaRPr b="1" dirty="0">
+              <a:latin typeface="Avenir Next LT Pro" panose="020B0504020202020204" pitchFamily="34" charset="0"/>
+            </a:endParaRPr>
+          </a:p>
+        </p:txBody>
+      </p:sp>
+      <p:graphicFrame>
+        <p:nvGraphicFramePr>
+          <p:cNvPr id="79" name="Google Shape;79;p17"/>
+          <p:cNvGraphicFramePr/>
+          <p:nvPr>
+            <p:extLst>
+              <p:ext uri="{D42A27DB-BD31-4B8C-83A1-F6EECF244321}">
+                <p14:modId xmlns:p14="http://schemas.microsoft.com/office/powerpoint/2010/main" val="2301221419"/>
+              </p:ext>
+            </p:extLst>
+          </p:nvPr>
+        </p:nvGraphicFramePr>
+        <p:xfrm>
+          <a:off x="201902" y="3864638"/>
+          <a:ext cx="8520600" cy="1173450"/>
+        </p:xfrm>
+        <a:graphic>
+          <a:graphicData uri="http://schemas.openxmlformats.org/drawingml/2006/table">
+            <a:tbl>
+              <a:tblPr>
+                <a:noFill/>
+                <a:tableStyleId>{E1099E06-0E6B-448D-9D27-60429F06E6F4}</a:tableStyleId>
+              </a:tblPr>
+              <a:tblGrid>
+                <a:gridCol w="3653818">
+                  <a:extLst>
+                    <a:ext uri="{9D8B030D-6E8A-4147-A177-3AD203B41FA5}">
+                      <a16:colId xmlns:a16="http://schemas.microsoft.com/office/drawing/2014/main" val="20000"/>
+                    </a:ext>
+                  </a:extLst>
+                </a:gridCol>
+                <a:gridCol w="4866782">
+                  <a:extLst>
+                    <a:ext uri="{9D8B030D-6E8A-4147-A177-3AD203B41FA5}">
+                      <a16:colId xmlns:a16="http://schemas.microsoft.com/office/drawing/2014/main" val="20001"/>
+                    </a:ext>
+                  </a:extLst>
+                </a:gridCol>
+              </a:tblGrid>
+              <a:tr h="381000">
+                <a:tc>
+                  <a:txBody>
+                    <a:bodyPr/>
+                    <a:lstStyle/>
+                    <a:p>
+                      <a:pPr marL="0" lvl="0" indent="0" algn="l" rtl="0">
+                        <a:spcBef>
+                          <a:spcPts val="0"/>
+                        </a:spcBef>
+                        <a:spcAft>
+                          <a:spcPts val="0"/>
+                        </a:spcAft>
+                        <a:buNone/>
+                      </a:pPr>
+                      <a:r>
+                        <a:rPr lang="en" sz="1000" b="1" dirty="0">
+                          <a:latin typeface="Avenir Next LT Pro" panose="020B0504020202020204" pitchFamily="34" charset="0"/>
+                        </a:rPr>
+                        <a:t>Test Case</a:t>
+                      </a:r>
+                      <a:endParaRPr sz="1000" b="1" dirty="0">
+                        <a:latin typeface="Avenir Next LT Pro" panose="020B0504020202020204" pitchFamily="34" charset="0"/>
+                      </a:endParaRPr>
+                    </a:p>
+                  </a:txBody>
+                  <a:tcPr marL="91425" marR="91425" marT="91425" marB="91425">
+                    <a:solidFill>
+                      <a:srgbClr val="CCCCCC"/>
+                    </a:solidFill>
+                  </a:tcPr>
+                </a:tc>
+                <a:tc>
+                  <a:txBody>
+                    <a:bodyPr/>
+                    <a:lstStyle/>
+                    <a:p>
+                      <a:pPr marL="0" lvl="0" indent="0" algn="l" rtl="0">
+                        <a:spcBef>
+                          <a:spcPts val="0"/>
+                        </a:spcBef>
+                        <a:spcAft>
+                          <a:spcPts val="0"/>
+                        </a:spcAft>
+                        <a:buNone/>
+                      </a:pPr>
+                      <a:r>
+                        <a:rPr lang="en" sz="1000" b="1" dirty="0">
+                          <a:latin typeface="Avenir Next LT Pro" panose="020B0504020202020204" pitchFamily="34" charset="0"/>
+                        </a:rPr>
+                        <a:t>Expected Values</a:t>
+                      </a:r>
+                      <a:endParaRPr sz="1000" b="1" dirty="0">
+                        <a:latin typeface="Avenir Next LT Pro" panose="020B0504020202020204" pitchFamily="34" charset="0"/>
+                      </a:endParaRPr>
+                    </a:p>
+                  </a:txBody>
+                  <a:tcPr marL="91425" marR="91425" marT="91425" marB="91425">
+                    <a:solidFill>
+                      <a:srgbClr val="CCCCCC"/>
+                    </a:solidFill>
+                  </a:tcPr>
+                </a:tc>
+                <a:extLst>
+                  <a:ext uri="{0D108BD9-81ED-4DB2-BD59-A6C34878D82A}">
+                    <a16:rowId xmlns:a16="http://schemas.microsoft.com/office/drawing/2014/main" val="10000"/>
+                  </a:ext>
+                </a:extLst>
+              </a:tr>
+              <a:tr h="396200">
+                <a:tc>
+                  <a:txBody>
+                    <a:bodyPr/>
+                    <a:lstStyle/>
+                    <a:p>
+                      <a:pPr marL="0" lvl="0" indent="0" algn="l" rtl="0">
+                        <a:spcBef>
+                          <a:spcPts val="0"/>
+                        </a:spcBef>
+                        <a:spcAft>
+                          <a:spcPts val="0"/>
+                        </a:spcAft>
+                        <a:buNone/>
+                      </a:pPr>
+                      <a:r>
+                        <a:rPr lang="en-NZ" sz="1000" dirty="0">
+                          <a:latin typeface="Avenir Next LT Pro" panose="020B0504020202020204" pitchFamily="34" charset="0"/>
+                        </a:rPr>
+                        <a:t>Entered 1 Choose new order</a:t>
+                      </a:r>
+                    </a:p>
+                    <a:p>
+                      <a:pPr marL="0" lvl="0" indent="0" algn="l" rtl="0">
+                        <a:spcBef>
+                          <a:spcPts val="0"/>
+                        </a:spcBef>
+                        <a:spcAft>
+                          <a:spcPts val="0"/>
+                        </a:spcAft>
+                        <a:buNone/>
+                      </a:pPr>
+                      <a:r>
+                        <a:rPr lang="en-NZ" sz="1000" dirty="0">
+                          <a:latin typeface="Avenir Next LT Pro" panose="020B0504020202020204" pitchFamily="34" charset="0"/>
+                        </a:rPr>
+                        <a:t>Entered 2 Choose exit</a:t>
+                      </a:r>
+                    </a:p>
+                    <a:p>
+                      <a:pPr marL="0" lvl="0" indent="0" algn="l" rtl="0">
+                        <a:spcBef>
+                          <a:spcPts val="0"/>
+                        </a:spcBef>
+                        <a:spcAft>
+                          <a:spcPts val="0"/>
+                        </a:spcAft>
+                        <a:buNone/>
+                      </a:pPr>
+                      <a:endParaRPr lang="en-NZ" sz="1000" dirty="0">
+                        <a:latin typeface="Avenir Next LT Pro" panose="020B0504020202020204" pitchFamily="34" charset="0"/>
+                      </a:endParaRPr>
+                    </a:p>
+                    <a:p>
+                      <a:pPr marL="0" lvl="0" indent="0" algn="l" rtl="0">
+                        <a:spcBef>
+                          <a:spcPts val="0"/>
+                        </a:spcBef>
+                        <a:spcAft>
+                          <a:spcPts val="0"/>
+                        </a:spcAft>
+                        <a:buNone/>
+                      </a:pPr>
+                      <a:r>
+                        <a:rPr lang="en-NZ" sz="1000" dirty="0">
+                          <a:latin typeface="Avenir Next LT Pro" panose="020B0504020202020204" pitchFamily="34" charset="0"/>
+                        </a:rPr>
+                        <a:t>Data remains in the order – cost and details list </a:t>
+                      </a:r>
+                    </a:p>
+                  </a:txBody>
+                  <a:tcPr marL="91425" marR="91425" marT="91425" marB="91425"/>
+                </a:tc>
+                <a:tc>
+                  <a:txBody>
+                    <a:bodyPr/>
+                    <a:lstStyle/>
+                    <a:p>
+                      <a:pPr marL="0" lvl="0" indent="0" algn="l" rtl="0">
+                        <a:spcBef>
+                          <a:spcPts val="0"/>
+                        </a:spcBef>
+                        <a:spcAft>
+                          <a:spcPts val="0"/>
+                        </a:spcAft>
+                        <a:buNone/>
+                      </a:pPr>
+                      <a:r>
+                        <a:rPr lang="en-NZ" sz="1000" dirty="0">
+                          <a:latin typeface="Avenir Next LT Pro" panose="020B0504020202020204" pitchFamily="34" charset="0"/>
+                        </a:rPr>
+                        <a:t>Confirm worked – printed “new order”</a:t>
+                      </a:r>
+                    </a:p>
+                    <a:p>
+                      <a:pPr marL="0" lvl="0" indent="0" algn="l" rtl="0">
+                        <a:spcBef>
+                          <a:spcPts val="0"/>
+                        </a:spcBef>
+                        <a:spcAft>
+                          <a:spcPts val="0"/>
+                        </a:spcAft>
+                        <a:buNone/>
+                      </a:pPr>
+                      <a:r>
+                        <a:rPr lang="en-NZ" sz="1000" dirty="0">
+                          <a:latin typeface="Avenir Next LT Pro" panose="020B0504020202020204" pitchFamily="34" charset="0"/>
+                        </a:rPr>
+                        <a:t>Cancel worked – printed “Exit”</a:t>
+                      </a:r>
+                    </a:p>
+                    <a:p>
+                      <a:pPr marL="0" lvl="0" indent="0" algn="l" rtl="0">
+                        <a:spcBef>
+                          <a:spcPts val="0"/>
+                        </a:spcBef>
+                        <a:spcAft>
+                          <a:spcPts val="0"/>
+                        </a:spcAft>
+                        <a:buNone/>
+                      </a:pPr>
+                      <a:r>
+                        <a:rPr lang="en-NZ" sz="1000" dirty="0">
+                          <a:latin typeface="Avenir Next LT Pro" panose="020B0504020202020204" pitchFamily="34" charset="0"/>
+                        </a:rPr>
+                        <a:t>“</a:t>
+                      </a:r>
+                    </a:p>
+                    <a:p>
+                      <a:pPr marL="0" lvl="0" indent="0" algn="l" rtl="0">
+                        <a:spcBef>
+                          <a:spcPts val="0"/>
+                        </a:spcBef>
+                        <a:spcAft>
+                          <a:spcPts val="0"/>
+                        </a:spcAft>
+                        <a:buNone/>
+                      </a:pPr>
+                      <a:r>
+                        <a:rPr lang="en-NZ" sz="1000" dirty="0">
+                          <a:latin typeface="Avenir Next LT Pro" panose="020B0504020202020204" pitchFamily="34" charset="0"/>
+                        </a:rPr>
+                        <a:t>Will need to clear data from these lists.</a:t>
+                      </a:r>
+                      <a:endParaRPr sz="1000" dirty="0">
+                        <a:latin typeface="Avenir Next LT Pro" panose="020B0504020202020204" pitchFamily="34" charset="0"/>
+                      </a:endParaRPr>
+                    </a:p>
+                  </a:txBody>
+                  <a:tcPr marL="91425" marR="91425" marT="91425" marB="91425"/>
+                </a:tc>
+                <a:extLst>
+                  <a:ext uri="{0D108BD9-81ED-4DB2-BD59-A6C34878D82A}">
+                    <a16:rowId xmlns:a16="http://schemas.microsoft.com/office/drawing/2014/main" val="10001"/>
+                  </a:ext>
+                </a:extLst>
+              </a:tr>
+            </a:tbl>
+          </a:graphicData>
+        </a:graphic>
+      </p:graphicFrame>
+    </p:spTree>
+    <p:extLst>
+      <p:ext uri="{BB962C8B-B14F-4D97-AF65-F5344CB8AC3E}">
+        <p14:creationId xmlns:p14="http://schemas.microsoft.com/office/powerpoint/2010/main" val="1883075721"/>
+      </p:ext>
+    </p:extLst>
+  </p:cSld>
+  <p:clrMapOvr>
+    <a:masterClrMapping/>
+  </p:clrMapOvr>
+</p:sld>
+</file>
+
+<file path=ppt/slides/slide74.xml><?xml version="1.0" encoding="utf-8"?>
 <p:sld xmlns:a="http://schemas.openxmlformats.org/drawingml/2006/main" xmlns:r="http://schemas.openxmlformats.org/officeDocument/2006/relationships" xmlns:p="http://schemas.openxmlformats.org/presentationml/2006/main">
   <p:cSld>
     <p:bg>
@@ -32751,7 +34404,7 @@
 </p:sld>
 </file>
 
-<file path=ppt/slides/slide71.xml><?xml version="1.0" encoding="utf-8"?>
+<file path=ppt/slides/slide75.xml><?xml version="1.0" encoding="utf-8"?>
 <p:sld xmlns:a="http://schemas.openxmlformats.org/drawingml/2006/main" xmlns:r="http://schemas.openxmlformats.org/officeDocument/2006/relationships" xmlns:p="http://schemas.openxmlformats.org/presentationml/2006/main">
   <p:cSld>
     <p:bg>
@@ -32822,7 +34475,7 @@
 </p:sld>
 </file>
 
-<file path=ppt/slides/slide72.xml><?xml version="1.0" encoding="utf-8"?>
+<file path=ppt/slides/slide76.xml><?xml version="1.0" encoding="utf-8"?>
 <p:sld xmlns:a="http://schemas.openxmlformats.org/drawingml/2006/main" xmlns:r="http://schemas.openxmlformats.org/officeDocument/2006/relationships" xmlns:p="http://schemas.openxmlformats.org/presentationml/2006/main">
   <p:cSld>
     <p:bg>
@@ -32892,7 +34545,7 @@
 </p:sld>
 </file>
 
-<file path=ppt/slides/slide73.xml><?xml version="1.0" encoding="utf-8"?>
+<file path=ppt/slides/slide77.xml><?xml version="1.0" encoding="utf-8"?>
 <p:sld xmlns:a="http://schemas.openxmlformats.org/drawingml/2006/main" xmlns:r="http://schemas.openxmlformats.org/officeDocument/2006/relationships" xmlns:p="http://schemas.openxmlformats.org/presentationml/2006/main">
   <p:cSld>
     <p:bg>
@@ -32963,7 +34616,7 @@
 </p:sld>
 </file>
 
-<file path=ppt/slides/slide74.xml><?xml version="1.0" encoding="utf-8"?>
+<file path=ppt/slides/slide78.xml><?xml version="1.0" encoding="utf-8"?>
 <p:sld xmlns:a="http://schemas.openxmlformats.org/drawingml/2006/main" xmlns:r="http://schemas.openxmlformats.org/officeDocument/2006/relationships" xmlns:p="http://schemas.openxmlformats.org/presentationml/2006/main">
   <p:cSld>
     <p:bg>
@@ -33033,7 +34686,7 @@
 </p:sld>
 </file>
 
-<file path=ppt/slides/slide75.xml><?xml version="1.0" encoding="utf-8"?>
+<file path=ppt/slides/slide79.xml><?xml version="1.0" encoding="utf-8"?>
 <p:sld xmlns:a="http://schemas.openxmlformats.org/drawingml/2006/main" xmlns:r="http://schemas.openxmlformats.org/officeDocument/2006/relationships" xmlns:p="http://schemas.openxmlformats.org/presentationml/2006/main">
   <p:cSld>
     <p:bg>
@@ -33135,7 +34788,171 @@
 </p:sld>
 </file>
 
-<file path=ppt/slides/slide76.xml><?xml version="1.0" encoding="utf-8"?>
+<file path=ppt/slides/slide8.xml><?xml version="1.0" encoding="utf-8"?>
+<p:sld xmlns:a="http://schemas.openxmlformats.org/drawingml/2006/main" xmlns:r="http://schemas.openxmlformats.org/officeDocument/2006/relationships" xmlns:p="http://schemas.openxmlformats.org/presentationml/2006/main">
+  <p:cSld>
+    <p:bg>
+      <p:bgPr>
+        <a:solidFill>
+          <a:schemeClr val="bg1">
+            <a:lumMod val="95000"/>
+          </a:schemeClr>
+        </a:solidFill>
+        <a:effectLst/>
+      </p:bgPr>
+    </p:bg>
+    <p:spTree>
+      <p:nvGrpSpPr>
+        <p:cNvPr id="1" name=""/>
+        <p:cNvGrpSpPr/>
+        <p:nvPr/>
+      </p:nvGrpSpPr>
+      <p:grpSpPr>
+        <a:xfrm>
+          <a:off x="0" y="0"/>
+          <a:ext cx="0" cy="0"/>
+          <a:chOff x="0" y="0"/>
+          <a:chExt cx="0" cy="0"/>
+        </a:xfrm>
+      </p:grpSpPr>
+      <p:pic>
+        <p:nvPicPr>
+          <p:cNvPr id="5" name="Picture 4">
+            <a:extLst>
+              <a:ext uri="{FF2B5EF4-FFF2-40B4-BE49-F238E27FC236}">
+                <a16:creationId xmlns:a16="http://schemas.microsoft.com/office/drawing/2014/main" id="{9B77A9BD-4F9C-48D6-A54B-8B1AD75A625B}"/>
+              </a:ext>
+            </a:extLst>
+          </p:cNvPr>
+          <p:cNvPicPr>
+            <a:picLocks noChangeAspect="1"/>
+          </p:cNvPicPr>
+          <p:nvPr/>
+        </p:nvPicPr>
+        <p:blipFill>
+          <a:blip r:embed="rId2"/>
+          <a:stretch>
+            <a:fillRect/>
+          </a:stretch>
+        </p:blipFill>
+        <p:spPr>
+          <a:xfrm>
+            <a:off x="0" y="6680"/>
+            <a:ext cx="9144000" cy="5130140"/>
+          </a:xfrm>
+          <a:prstGeom prst="rect">
+            <a:avLst/>
+          </a:prstGeom>
+        </p:spPr>
+      </p:pic>
+      <p:sp>
+        <p:nvSpPr>
+          <p:cNvPr id="2" name="Title 1">
+            <a:extLst>
+              <a:ext uri="{FF2B5EF4-FFF2-40B4-BE49-F238E27FC236}">
+                <a16:creationId xmlns:a16="http://schemas.microsoft.com/office/drawing/2014/main" id="{5912979F-6922-40FD-B6E0-0506FA25714D}"/>
+              </a:ext>
+            </a:extLst>
+          </p:cNvPr>
+          <p:cNvSpPr>
+            <a:spLocks noGrp="1"/>
+          </p:cNvSpPr>
+          <p:nvPr>
+            <p:ph type="title"/>
+          </p:nvPr>
+        </p:nvSpPr>
+        <p:spPr>
+          <a:xfrm>
+            <a:off x="403140" y="445025"/>
+            <a:ext cx="8520600" cy="572700"/>
+          </a:xfrm>
+        </p:spPr>
+        <p:txBody>
+          <a:bodyPr/>
+          <a:lstStyle/>
+          <a:p>
+            <a:r>
+              <a:rPr lang="en-US" b="1" dirty="0">
+                <a:latin typeface="Avenir Next LT Pro" panose="020B0504020202020204" pitchFamily="34" charset="0"/>
+              </a:rPr>
+              <a:t>Implication 2 – Usability (Error Recovery)</a:t>
+            </a:r>
+            <a:endParaRPr lang="en-NZ" b="1" dirty="0">
+              <a:latin typeface="Avenir Next LT Pro" panose="020B0504020202020204" pitchFamily="34" charset="0"/>
+            </a:endParaRPr>
+          </a:p>
+        </p:txBody>
+      </p:sp>
+      <p:sp>
+        <p:nvSpPr>
+          <p:cNvPr id="3" name="Text Placeholder 2">
+            <a:extLst>
+              <a:ext uri="{FF2B5EF4-FFF2-40B4-BE49-F238E27FC236}">
+                <a16:creationId xmlns:a16="http://schemas.microsoft.com/office/drawing/2014/main" id="{1EB42CE1-67BF-466B-8C2C-7F21A8892B1E}"/>
+              </a:ext>
+            </a:extLst>
+          </p:cNvPr>
+          <p:cNvSpPr>
+            <a:spLocks noGrp="1"/>
+          </p:cNvSpPr>
+          <p:nvPr>
+            <p:ph type="body" idx="1"/>
+          </p:nvPr>
+        </p:nvSpPr>
+        <p:spPr/>
+        <p:txBody>
+          <a:bodyPr/>
+          <a:lstStyle/>
+          <a:p>
+            <a:pPr marL="114300" indent="0">
+              <a:buNone/>
+            </a:pPr>
+            <a:r>
+              <a:rPr lang="en-US" u="sng" dirty="0">
+                <a:solidFill>
+                  <a:schemeClr val="tx1"/>
+                </a:solidFill>
+                <a:latin typeface="Avenir Next LT Pro" panose="020B0504020202020204" pitchFamily="34" charset="0"/>
+              </a:rPr>
+              <a:t>Explain how you plan to address the implication:</a:t>
+            </a:r>
+          </a:p>
+          <a:p>
+            <a:pPr marL="114300" indent="0">
+              <a:buNone/>
+            </a:pPr>
+            <a:r>
+              <a:rPr lang="en-US" dirty="0">
+                <a:solidFill>
+                  <a:schemeClr val="tx1"/>
+                </a:solidFill>
+                <a:latin typeface="Avenir Next LT Pro" panose="020B0504020202020204" pitchFamily="34" charset="0"/>
+              </a:rPr>
+              <a:t>I plan to address this implication by including good error messages that are easy to understand, with constructive and clear advice on how they can improve their input. This will allows customers to understand what made their answer invalid (they can easily understand what is going on).</a:t>
+            </a:r>
+          </a:p>
+          <a:p>
+            <a:pPr marL="114300" indent="0">
+              <a:buNone/>
+            </a:pPr>
+            <a:endParaRPr lang="en-NZ" dirty="0"/>
+          </a:p>
+        </p:txBody>
+      </p:sp>
+    </p:spTree>
+    <p:extLst>
+      <p:ext uri="{BB962C8B-B14F-4D97-AF65-F5344CB8AC3E}">
+        <p14:creationId xmlns:p14="http://schemas.microsoft.com/office/powerpoint/2010/main" val="1312020768"/>
+      </p:ext>
+    </p:extLst>
+  </p:cSld>
+  <p:clrMapOvr>
+    <a:masterClrMapping/>
+  </p:clrMapOvr>
+</p:sld>
+</file>
+
+<file path=ppt/slides/slide80.xml><?xml version="1.0" encoding="utf-8"?>
 <p:sld xmlns:a="http://schemas.openxmlformats.org/drawingml/2006/main" xmlns:r="http://schemas.openxmlformats.org/officeDocument/2006/relationships" xmlns:p="http://schemas.openxmlformats.org/presentationml/2006/main">
   <p:cSld>
     <p:bg>
@@ -33252,7 +35069,7 @@
 </p:sld>
 </file>
 
-<file path=ppt/slides/slide77.xml><?xml version="1.0" encoding="utf-8"?>
+<file path=ppt/slides/slide81.xml><?xml version="1.0" encoding="utf-8"?>
 <p:sld xmlns:a="http://schemas.openxmlformats.org/drawingml/2006/main" xmlns:r="http://schemas.openxmlformats.org/officeDocument/2006/relationships" xmlns:p="http://schemas.openxmlformats.org/presentationml/2006/main">
   <p:cSld>
     <p:bg>
@@ -33358,7 +35175,7 @@
 </p:sld>
 </file>
 
-<file path=ppt/slides/slide78.xml><?xml version="1.0" encoding="utf-8"?>
+<file path=ppt/slides/slide82.xml><?xml version="1.0" encoding="utf-8"?>
 <p:sld xmlns:a="http://schemas.openxmlformats.org/drawingml/2006/main" xmlns:r="http://schemas.openxmlformats.org/officeDocument/2006/relationships" xmlns:p="http://schemas.openxmlformats.org/presentationml/2006/main">
   <p:cSld>
     <p:bg>
@@ -33480,7 +35297,7 @@
 </p:sld>
 </file>
 
-<file path=ppt/slides/slide79.xml><?xml version="1.0" encoding="utf-8"?>
+<file path=ppt/slides/slide83.xml><?xml version="1.0" encoding="utf-8"?>
 <p:sld xmlns:a="http://schemas.openxmlformats.org/drawingml/2006/main" xmlns:r="http://schemas.openxmlformats.org/officeDocument/2006/relationships" xmlns:p="http://schemas.openxmlformats.org/presentationml/2006/main">
   <p:cSld>
     <p:bg>
@@ -33602,171 +35419,7 @@
 </p:sld>
 </file>
 
-<file path=ppt/slides/slide8.xml><?xml version="1.0" encoding="utf-8"?>
-<p:sld xmlns:a="http://schemas.openxmlformats.org/drawingml/2006/main" xmlns:r="http://schemas.openxmlformats.org/officeDocument/2006/relationships" xmlns:p="http://schemas.openxmlformats.org/presentationml/2006/main">
-  <p:cSld>
-    <p:bg>
-      <p:bgPr>
-        <a:solidFill>
-          <a:schemeClr val="bg1">
-            <a:lumMod val="95000"/>
-          </a:schemeClr>
-        </a:solidFill>
-        <a:effectLst/>
-      </p:bgPr>
-    </p:bg>
-    <p:spTree>
-      <p:nvGrpSpPr>
-        <p:cNvPr id="1" name=""/>
-        <p:cNvGrpSpPr/>
-        <p:nvPr/>
-      </p:nvGrpSpPr>
-      <p:grpSpPr>
-        <a:xfrm>
-          <a:off x="0" y="0"/>
-          <a:ext cx="0" cy="0"/>
-          <a:chOff x="0" y="0"/>
-          <a:chExt cx="0" cy="0"/>
-        </a:xfrm>
-      </p:grpSpPr>
-      <p:pic>
-        <p:nvPicPr>
-          <p:cNvPr id="5" name="Picture 4">
-            <a:extLst>
-              <a:ext uri="{FF2B5EF4-FFF2-40B4-BE49-F238E27FC236}">
-                <a16:creationId xmlns:a16="http://schemas.microsoft.com/office/drawing/2014/main" id="{9B77A9BD-4F9C-48D6-A54B-8B1AD75A625B}"/>
-              </a:ext>
-            </a:extLst>
-          </p:cNvPr>
-          <p:cNvPicPr>
-            <a:picLocks noChangeAspect="1"/>
-          </p:cNvPicPr>
-          <p:nvPr/>
-        </p:nvPicPr>
-        <p:blipFill>
-          <a:blip r:embed="rId2"/>
-          <a:stretch>
-            <a:fillRect/>
-          </a:stretch>
-        </p:blipFill>
-        <p:spPr>
-          <a:xfrm>
-            <a:off x="0" y="6680"/>
-            <a:ext cx="9144000" cy="5130140"/>
-          </a:xfrm>
-          <a:prstGeom prst="rect">
-            <a:avLst/>
-          </a:prstGeom>
-        </p:spPr>
-      </p:pic>
-      <p:sp>
-        <p:nvSpPr>
-          <p:cNvPr id="2" name="Title 1">
-            <a:extLst>
-              <a:ext uri="{FF2B5EF4-FFF2-40B4-BE49-F238E27FC236}">
-                <a16:creationId xmlns:a16="http://schemas.microsoft.com/office/drawing/2014/main" id="{5912979F-6922-40FD-B6E0-0506FA25714D}"/>
-              </a:ext>
-            </a:extLst>
-          </p:cNvPr>
-          <p:cNvSpPr>
-            <a:spLocks noGrp="1"/>
-          </p:cNvSpPr>
-          <p:nvPr>
-            <p:ph type="title"/>
-          </p:nvPr>
-        </p:nvSpPr>
-        <p:spPr>
-          <a:xfrm>
-            <a:off x="403140" y="445025"/>
-            <a:ext cx="8520600" cy="572700"/>
-          </a:xfrm>
-        </p:spPr>
-        <p:txBody>
-          <a:bodyPr/>
-          <a:lstStyle/>
-          <a:p>
-            <a:r>
-              <a:rPr lang="en-US" b="1" dirty="0">
-                <a:latin typeface="Avenir Next LT Pro" panose="020B0504020202020204" pitchFamily="34" charset="0"/>
-              </a:rPr>
-              <a:t>Implication 2 – Usability (Error Recovery)</a:t>
-            </a:r>
-            <a:endParaRPr lang="en-NZ" b="1" dirty="0">
-              <a:latin typeface="Avenir Next LT Pro" panose="020B0504020202020204" pitchFamily="34" charset="0"/>
-            </a:endParaRPr>
-          </a:p>
-        </p:txBody>
-      </p:sp>
-      <p:sp>
-        <p:nvSpPr>
-          <p:cNvPr id="3" name="Text Placeholder 2">
-            <a:extLst>
-              <a:ext uri="{FF2B5EF4-FFF2-40B4-BE49-F238E27FC236}">
-                <a16:creationId xmlns:a16="http://schemas.microsoft.com/office/drawing/2014/main" id="{1EB42CE1-67BF-466B-8C2C-7F21A8892B1E}"/>
-              </a:ext>
-            </a:extLst>
-          </p:cNvPr>
-          <p:cNvSpPr>
-            <a:spLocks noGrp="1"/>
-          </p:cNvSpPr>
-          <p:nvPr>
-            <p:ph type="body" idx="1"/>
-          </p:nvPr>
-        </p:nvSpPr>
-        <p:spPr/>
-        <p:txBody>
-          <a:bodyPr/>
-          <a:lstStyle/>
-          <a:p>
-            <a:pPr marL="114300" indent="0">
-              <a:buNone/>
-            </a:pPr>
-            <a:r>
-              <a:rPr lang="en-US" u="sng" dirty="0">
-                <a:solidFill>
-                  <a:schemeClr val="tx1"/>
-                </a:solidFill>
-                <a:latin typeface="Avenir Next LT Pro" panose="020B0504020202020204" pitchFamily="34" charset="0"/>
-              </a:rPr>
-              <a:t>Explain how you plan to address the implication:</a:t>
-            </a:r>
-          </a:p>
-          <a:p>
-            <a:pPr marL="114300" indent="0">
-              <a:buNone/>
-            </a:pPr>
-            <a:r>
-              <a:rPr lang="en-US" dirty="0">
-                <a:solidFill>
-                  <a:schemeClr val="tx1"/>
-                </a:solidFill>
-                <a:latin typeface="Avenir Next LT Pro" panose="020B0504020202020204" pitchFamily="34" charset="0"/>
-              </a:rPr>
-              <a:t>I plan to address this implication by including good error messages that are easy to understand, with constructive and clear advice on how they can improve their input. This will allows customers to understand what made their answer invalid (they can easily understand what is going on).</a:t>
-            </a:r>
-          </a:p>
-          <a:p>
-            <a:pPr marL="114300" indent="0">
-              <a:buNone/>
-            </a:pPr>
-            <a:endParaRPr lang="en-NZ" dirty="0"/>
-          </a:p>
-        </p:txBody>
-      </p:sp>
-    </p:spTree>
-    <p:extLst>
-      <p:ext uri="{BB962C8B-B14F-4D97-AF65-F5344CB8AC3E}">
-        <p14:creationId xmlns:p14="http://schemas.microsoft.com/office/powerpoint/2010/main" val="1312020768"/>
-      </p:ext>
-    </p:extLst>
-  </p:cSld>
-  <p:clrMapOvr>
-    <a:masterClrMapping/>
-  </p:clrMapOvr>
-</p:sld>
-</file>
-
-<file path=ppt/slides/slide80.xml><?xml version="1.0" encoding="utf-8"?>
+<file path=ppt/slides/slide84.xml><?xml version="1.0" encoding="utf-8"?>
 <p:sld xmlns:a="http://schemas.openxmlformats.org/drawingml/2006/main" xmlns:r="http://schemas.openxmlformats.org/officeDocument/2006/relationships" xmlns:p="http://schemas.openxmlformats.org/presentationml/2006/main">
   <p:cSld>
     <p:bg>

</xml_diff>

<commit_message>
Integrated new_transaction into main app
Created new_transaction into function (new_exit) and integrated into main app - new order or exit function.
</commit_message>
<xml_diff>
--- a/Danett Pepito - 000_91896 _ 91897 Documentation - 2150400 (Git).pptx
+++ b/Danett Pepito - 000_91896 _ 91897 Documentation - 2150400 (Git).pptx
@@ -356,7 +356,7 @@
   <pc:docChgLst>
     <pc:chgData name="Danett Pepito" userId="ddef1e2176689e9a" providerId="LiveId" clId="{B2185394-3AFD-42B2-9285-3B672C598A56}"/>
     <pc:docChg chg="undo custSel addSld delSld modSld sldOrd">
-      <pc:chgData name="Danett Pepito" userId="ddef1e2176689e9a" providerId="LiveId" clId="{B2185394-3AFD-42B2-9285-3B672C598A56}" dt="2022-03-22T07:08:14.804" v="2960" actId="1076"/>
+      <pc:chgData name="Danett Pepito" userId="ddef1e2176689e9a" providerId="LiveId" clId="{B2185394-3AFD-42B2-9285-3B672C598A56}" dt="2022-03-22T07:16:19.387" v="3017" actId="20577"/>
       <pc:docMkLst>
         <pc:docMk/>
       </pc:docMkLst>
@@ -2898,14 +2898,14 @@
           </ac:picMkLst>
         </pc:picChg>
       </pc:sldChg>
-      <pc:sldChg chg="delSp modSp add mod replId">
-        <pc:chgData name="Danett Pepito" userId="ddef1e2176689e9a" providerId="LiveId" clId="{B2185394-3AFD-42B2-9285-3B672C598A56}" dt="2022-03-22T07:00:06.709" v="2893" actId="20577"/>
+      <pc:sldChg chg="addSp delSp modSp add mod replId">
+        <pc:chgData name="Danett Pepito" userId="ddef1e2176689e9a" providerId="LiveId" clId="{B2185394-3AFD-42B2-9285-3B672C598A56}" dt="2022-03-22T07:16:19.387" v="3017" actId="20577"/>
         <pc:sldMkLst>
           <pc:docMk/>
           <pc:sldMk cId="1883075721" sldId="342"/>
         </pc:sldMkLst>
         <pc:spChg chg="mod">
-          <ac:chgData name="Danett Pepito" userId="ddef1e2176689e9a" providerId="LiveId" clId="{B2185394-3AFD-42B2-9285-3B672C598A56}" dt="2022-03-22T06:58:07.462" v="2783" actId="20577"/>
+          <ac:chgData name="Danett Pepito" userId="ddef1e2176689e9a" providerId="LiveId" clId="{B2185394-3AFD-42B2-9285-3B672C598A56}" dt="2022-03-22T07:16:19.387" v="3017" actId="20577"/>
           <ac:spMkLst>
             <pc:docMk/>
             <pc:sldMk cId="1883075721" sldId="342"/>
@@ -2913,19 +2913,35 @@
           </ac:spMkLst>
         </pc:spChg>
         <pc:graphicFrameChg chg="modGraphic">
-          <ac:chgData name="Danett Pepito" userId="ddef1e2176689e9a" providerId="LiveId" clId="{B2185394-3AFD-42B2-9285-3B672C598A56}" dt="2022-03-22T07:00:06.709" v="2893" actId="20577"/>
+          <ac:chgData name="Danett Pepito" userId="ddef1e2176689e9a" providerId="LiveId" clId="{B2185394-3AFD-42B2-9285-3B672C598A56}" dt="2022-03-22T07:15:44.822" v="2999" actId="20577"/>
           <ac:graphicFrameMkLst>
             <pc:docMk/>
             <pc:sldMk cId="1883075721" sldId="342"/>
             <ac:graphicFrameMk id="79" creationId="{00000000-0000-0000-0000-000000000000}"/>
           </ac:graphicFrameMkLst>
         </pc:graphicFrameChg>
+        <pc:picChg chg="add mod">
+          <ac:chgData name="Danett Pepito" userId="ddef1e2176689e9a" providerId="LiveId" clId="{B2185394-3AFD-42B2-9285-3B672C598A56}" dt="2022-03-22T07:15:37.277" v="2963" actId="1076"/>
+          <ac:picMkLst>
+            <pc:docMk/>
+            <pc:sldMk cId="1883075721" sldId="342"/>
+            <ac:picMk id="4" creationId="{12933F17-7B07-4335-95E8-74F53DDD9075}"/>
+          </ac:picMkLst>
+        </pc:picChg>
         <pc:picChg chg="del">
           <ac:chgData name="Danett Pepito" userId="ddef1e2176689e9a" providerId="LiveId" clId="{B2185394-3AFD-42B2-9285-3B672C598A56}" dt="2022-03-22T06:58:08.516" v="2784" actId="478"/>
           <ac:picMkLst>
             <pc:docMk/>
             <pc:sldMk cId="1883075721" sldId="342"/>
             <ac:picMk id="4" creationId="{385E23F3-E161-4735-8398-54A170841303}"/>
+          </ac:picMkLst>
+        </pc:picChg>
+        <pc:picChg chg="add mod">
+          <ac:chgData name="Danett Pepito" userId="ddef1e2176689e9a" providerId="LiveId" clId="{B2185394-3AFD-42B2-9285-3B672C598A56}" dt="2022-03-22T07:16:09.057" v="3004" actId="1076"/>
+          <ac:picMkLst>
+            <pc:docMk/>
+            <pc:sldMk cId="1883075721" sldId="342"/>
+            <ac:picMk id="6" creationId="{C9C35211-3E88-4C6B-B1E0-D5273229D348}"/>
           </ac:picMkLst>
         </pc:picChg>
         <pc:picChg chg="del">
@@ -34012,7 +34028,13 @@
               <a:rPr lang="en" b="1" dirty="0">
                 <a:latin typeface="Avenir Next LT Pro" panose="020B0504020202020204" pitchFamily="34" charset="0"/>
               </a:rPr>
-              <a:t>Component 9 Version 2 - Test Plan</a:t>
+              <a:t>Component 9 Version 2 - </a:t>
+            </a:r>
+            <a:r>
+              <a:rPr lang="en" b="1">
+                <a:latin typeface="Avenir Next LT Pro" panose="020B0504020202020204" pitchFamily="34" charset="0"/>
+              </a:rPr>
+              <a:t>Test Plan (integrated)</a:t>
             </a:r>
             <a:endParaRPr b="1" dirty="0">
               <a:latin typeface="Avenir Next LT Pro" panose="020B0504020202020204" pitchFamily="34" charset="0"/>
@@ -34027,7 +34049,7 @@
           <p:nvPr>
             <p:extLst>
               <p:ext uri="{D42A27DB-BD31-4B8C-83A1-F6EECF244321}">
-                <p14:modId xmlns:p14="http://schemas.microsoft.com/office/powerpoint/2010/main" val="2301221419"/>
+                <p14:modId xmlns:p14="http://schemas.microsoft.com/office/powerpoint/2010/main" val="714856609"/>
               </p:ext>
             </p:extLst>
           </p:nvPr>
@@ -34270,7 +34292,7 @@
                         <a:rPr lang="en-NZ" sz="1000" dirty="0">
                           <a:latin typeface="Avenir Next LT Pro" panose="020B0504020202020204" pitchFamily="34" charset="0"/>
                         </a:rPr>
-                        <a:t>Will need to clear data from these lists.</a:t>
+                        <a:t>Data cleared from the list</a:t>
                       </a:r>
                       <a:endParaRPr sz="1000" dirty="0">
                         <a:latin typeface="Avenir Next LT Pro" panose="020B0504020202020204" pitchFamily="34" charset="0"/>
@@ -34289,6 +34311,66 @@
           </a:graphicData>
         </a:graphic>
       </p:graphicFrame>
+      <p:pic>
+        <p:nvPicPr>
+          <p:cNvPr id="4" name="Picture 3">
+            <a:extLst>
+              <a:ext uri="{FF2B5EF4-FFF2-40B4-BE49-F238E27FC236}">
+                <a16:creationId xmlns:a16="http://schemas.microsoft.com/office/drawing/2014/main" id="{12933F17-7B07-4335-95E8-74F53DDD9075}"/>
+              </a:ext>
+            </a:extLst>
+          </p:cNvPr>
+          <p:cNvPicPr>
+            <a:picLocks noChangeAspect="1"/>
+          </p:cNvPicPr>
+          <p:nvPr/>
+        </p:nvPicPr>
+        <p:blipFill>
+          <a:blip r:embed="rId4"/>
+          <a:stretch>
+            <a:fillRect/>
+          </a:stretch>
+        </p:blipFill>
+        <p:spPr>
+          <a:xfrm>
+            <a:off x="5646760" y="752305"/>
+            <a:ext cx="2900278" cy="2953010"/>
+          </a:xfrm>
+          <a:prstGeom prst="rect">
+            <a:avLst/>
+          </a:prstGeom>
+        </p:spPr>
+      </p:pic>
+      <p:pic>
+        <p:nvPicPr>
+          <p:cNvPr id="6" name="Picture 5">
+            <a:extLst>
+              <a:ext uri="{FF2B5EF4-FFF2-40B4-BE49-F238E27FC236}">
+                <a16:creationId xmlns:a16="http://schemas.microsoft.com/office/drawing/2014/main" id="{C9C35211-3E88-4C6B-B1E0-D5273229D348}"/>
+              </a:ext>
+            </a:extLst>
+          </p:cNvPr>
+          <p:cNvPicPr>
+            <a:picLocks noChangeAspect="1"/>
+          </p:cNvPicPr>
+          <p:nvPr/>
+        </p:nvPicPr>
+        <p:blipFill>
+          <a:blip r:embed="rId5"/>
+          <a:stretch>
+            <a:fillRect/>
+          </a:stretch>
+        </p:blipFill>
+        <p:spPr>
+          <a:xfrm>
+            <a:off x="939263" y="752305"/>
+            <a:ext cx="3007897" cy="2950255"/>
+          </a:xfrm>
+          <a:prstGeom prst="rect">
+            <a:avLst/>
+          </a:prstGeom>
+        </p:spPr>
+      </p:pic>
     </p:spTree>
     <p:extLst>
       <p:ext uri="{BB962C8B-B14F-4D97-AF65-F5344CB8AC3E}">

</xml_diff>